<commit_message>
Updated wwt.github.com URLs to github.com
</commit_message>
<xml_diff>
--- a/curl-requests-foundations.pptx
+++ b/curl-requests-foundations.pptx
@@ -228,7 +228,7 @@
           <a:p>
             <a:fld id="{966F6F5D-167E-1849-B841-EB0817BB385A}" type="datetimeFigureOut">
               <a:rPr lang="en-US" smtClean="0"/>
-              <a:t>3/18/20</a:t>
+              <a:t>3/20/20</a:t>
             </a:fld>
             <a:endParaRPr lang="en-US"/>
           </a:p>
@@ -4782,12 +4782,14 @@
         </p:nvSpPr>
         <p:spPr>
           <a:xfrm>
-            <a:off x="1524000" y="6277281"/>
-            <a:ext cx="9144000" cy="495406"/>
+            <a:off x="98385" y="6277281"/>
+            <a:ext cx="11995229" cy="495406"/>
           </a:xfrm>
         </p:spPr>
         <p:txBody>
-          <a:bodyPr/>
+          <a:bodyPr>
+            <a:normAutofit/>
+          </a:bodyPr>
           <a:lstStyle/>
           <a:p>
             <a:r>
@@ -4800,7 +4802,7 @@
             </a:r>
             <a:r>
               <a:rPr lang="en-US" dirty="0"/>
-              <a:t> &amp; Python Requests with hands-on practice</a:t>
+              <a:t>, Python Requests, &amp; hands-on API practice with Cisco platforms</a:t>
             </a:r>
           </a:p>
         </p:txBody>
@@ -4853,17 +4855,23 @@
         </p:nvSpPr>
         <p:spPr>
           <a:xfrm>
-            <a:off x="1524000" y="983463"/>
-            <a:ext cx="9144000" cy="1285177"/>
+            <a:off x="98385" y="1051197"/>
+            <a:ext cx="11995230" cy="1285177"/>
           </a:xfrm>
         </p:spPr>
         <p:txBody>
-          <a:bodyPr/>
-          <a:lstStyle/>
-          <a:p>
+          <a:bodyPr>
+            <a:normAutofit/>
+          </a:bodyPr>
+          <a:lstStyle/>
+          <a:p>
+            <a:r>
+              <a:rPr lang="en-US" dirty="0" err="1"/>
+              <a:t>cURL</a:t>
+            </a:r>
             <a:r>
               <a:rPr lang="en-US" dirty="0"/>
-              <a:t>REST API Calls With HTTP</a:t>
+              <a:t> &amp; Python Requests Foundations</a:t>
             </a:r>
           </a:p>
         </p:txBody>
@@ -7423,7 +7431,7 @@
         <p:spPr/>
         <p:txBody>
           <a:bodyPr>
-            <a:normAutofit fontScale="92500" lnSpcReduction="10000"/>
+            <a:normAutofit/>
           </a:bodyPr>
           <a:lstStyle/>
           <a:p>
@@ -7461,7 +7469,7 @@
           <a:p>
             <a:r>
               <a:rPr lang="en-US" dirty="0"/>
-              <a:t>Connect to the ATC VPN</a:t>
+              <a:t>Download this presentation from WWT’s GitHub</a:t>
             </a:r>
           </a:p>
           <a:p>
@@ -7470,14 +7478,14 @@
               <a:rPr lang="en-US" dirty="0">
                 <a:hlinkClick r:id="rId5"/>
               </a:rPr>
-              <a:t>https://atc-support.apps.wwtatc.com/vpn_access</a:t>
+              <a:t>https://github.com/wwt/curl-requests-foundations</a:t>
             </a:r>
             <a:endParaRPr lang="en-US" dirty="0"/>
           </a:p>
           <a:p>
             <a:r>
               <a:rPr lang="en-US" dirty="0"/>
-              <a:t>Download this presentation from WWT’s internal GitHub</a:t>
+              <a:t>Install a code editor</a:t>
             </a:r>
           </a:p>
           <a:p>
@@ -7485,22 +7493,6 @@
             <a:r>
               <a:rPr lang="en-US" dirty="0">
                 <a:hlinkClick r:id="rId6"/>
-              </a:rPr>
-              <a:t>https://github.wwt.com/hullt/rest-api-http-foundations</a:t>
-            </a:r>
-            <a:endParaRPr lang="en-US" dirty="0"/>
-          </a:p>
-          <a:p>
-            <a:r>
-              <a:rPr lang="en-US" dirty="0"/>
-              <a:t>Install a code editor</a:t>
-            </a:r>
-          </a:p>
-          <a:p>
-            <a:pPr lvl="1"/>
-            <a:r>
-              <a:rPr lang="en-US" dirty="0">
-                <a:hlinkClick r:id="rId7"/>
               </a:rPr>
               <a:t>https://code.visualstudio.com/Download</a:t>
             </a:r>
@@ -8074,110 +8066,6 @@
                                           <p:spTgt spid="3">
                                             <p:txEl>
                                               <p:pRg st="8" end="8"/>
-                                            </p:txEl>
-                                          </p:spTgt>
-                                        </p:tgtEl>
-                                      </p:cBhvr>
-                                    </p:animEffect>
-                                  </p:childTnLst>
-                                </p:cTn>
-                              </p:par>
-                              <p:par>
-                                <p:cTn id="40" presetID="9" presetClass="entr" presetSubtype="0" fill="hold" grpId="0" nodeType="withEffect">
-                                  <p:stCondLst>
-                                    <p:cond delay="0"/>
-                                  </p:stCondLst>
-                                  <p:childTnLst>
-                                    <p:set>
-                                      <p:cBhvr>
-                                        <p:cTn id="41" dur="1" fill="hold">
-                                          <p:stCondLst>
-                                            <p:cond delay="0"/>
-                                          </p:stCondLst>
-                                        </p:cTn>
-                                        <p:tgtEl>
-                                          <p:spTgt spid="3">
-                                            <p:txEl>
-                                              <p:pRg st="9" end="9"/>
-                                            </p:txEl>
-                                          </p:spTgt>
-                                        </p:tgtEl>
-                                        <p:attrNameLst>
-                                          <p:attrName>style.visibility</p:attrName>
-                                        </p:attrNameLst>
-                                      </p:cBhvr>
-                                      <p:to>
-                                        <p:strVal val="visible"/>
-                                      </p:to>
-                                    </p:set>
-                                    <p:animEffect transition="in" filter="dissolve">
-                                      <p:cBhvr>
-                                        <p:cTn id="42" dur="500"/>
-                                        <p:tgtEl>
-                                          <p:spTgt spid="3">
-                                            <p:txEl>
-                                              <p:pRg st="9" end="9"/>
-                                            </p:txEl>
-                                          </p:spTgt>
-                                        </p:tgtEl>
-                                      </p:cBhvr>
-                                    </p:animEffect>
-                                  </p:childTnLst>
-                                </p:cTn>
-                              </p:par>
-                            </p:childTnLst>
-                          </p:cTn>
-                        </p:par>
-                      </p:childTnLst>
-                    </p:cTn>
-                  </p:par>
-                  <p:par>
-                    <p:cTn id="43" fill="hold">
-                      <p:stCondLst>
-                        <p:cond delay="indefinite"/>
-                      </p:stCondLst>
-                      <p:childTnLst>
-                        <p:par>
-                          <p:cTn id="44" fill="hold">
-                            <p:stCondLst>
-                              <p:cond delay="0"/>
-                            </p:stCondLst>
-                            <p:childTnLst>
-                              <p:par>
-                                <p:cTn id="45" presetID="9" presetClass="entr" presetSubtype="0" fill="hold" grpId="0" nodeType="clickEffect">
-                                  <p:stCondLst>
-                                    <p:cond delay="0"/>
-                                  </p:stCondLst>
-                                  <p:childTnLst>
-                                    <p:set>
-                                      <p:cBhvr>
-                                        <p:cTn id="46" dur="1" fill="hold">
-                                          <p:stCondLst>
-                                            <p:cond delay="0"/>
-                                          </p:stCondLst>
-                                        </p:cTn>
-                                        <p:tgtEl>
-                                          <p:spTgt spid="3">
-                                            <p:txEl>
-                                              <p:pRg st="10" end="10"/>
-                                            </p:txEl>
-                                          </p:spTgt>
-                                        </p:tgtEl>
-                                        <p:attrNameLst>
-                                          <p:attrName>style.visibility</p:attrName>
-                                        </p:attrNameLst>
-                                      </p:cBhvr>
-                                      <p:to>
-                                        <p:strVal val="visible"/>
-                                      </p:to>
-                                    </p:set>
-                                    <p:animEffect transition="in" filter="dissolve">
-                                      <p:cBhvr>
-                                        <p:cTn id="47" dur="500"/>
-                                        <p:tgtEl>
-                                          <p:spTgt spid="3">
-                                            <p:txEl>
-                                              <p:pRg st="10" end="10"/>
                                             </p:txEl>
                                           </p:spTgt>
                                         </p:tgtEl>

</xml_diff>

<commit_message>
Added content to 'Why are REST APIs Important' slide
</commit_message>
<xml_diff>
--- a/curl-requests-foundations.pptx
+++ b/curl-requests-foundations.pptx
@@ -228,7 +228,7 @@
           <a:p>
             <a:fld id="{966F6F5D-167E-1849-B841-EB0817BB385A}" type="datetimeFigureOut">
               <a:rPr lang="en-US" smtClean="0"/>
-              <a:t>3/20/20</a:t>
+              <a:t>3/30/20</a:t>
             </a:fld>
             <a:endParaRPr lang="en-US"/>
           </a:p>
@@ -1064,6 +1064,29 @@
               <a:t>// TODO</a:t>
             </a:r>
           </a:p>
+          <a:p>
+            <a:pPr marL="0" marR="0" lvl="0" indent="0" algn="l" defTabSz="914400" rtl="0" eaLnBrk="1" fontAlgn="auto" latinLnBrk="0" hangingPunct="1">
+              <a:lnSpc>
+                <a:spcPct val="100000"/>
+              </a:lnSpc>
+              <a:spcBef>
+                <a:spcPts val="0"/>
+              </a:spcBef>
+              <a:spcAft>
+                <a:spcPts val="0"/>
+              </a:spcAft>
+              <a:buClrTx/>
+              <a:buSzTx/>
+              <a:buFontTx/>
+              <a:buNone/>
+              <a:tabLst/>
+              <a:defRPr/>
+            </a:pPr>
+            <a:r>
+              <a:rPr lang="en-US" dirty="0"/>
+              <a:t>This is not a class on REST APIs (what they are) – separate topic in a separate presentation</a:t>
+            </a:r>
+          </a:p>
         </p:txBody>
       </p:sp>
       <p:sp>
@@ -1167,6 +1190,301 @@
               <a:rPr lang="en-US" dirty="0"/>
               <a:t>// TODO</a:t>
             </a:r>
+          </a:p>
+          <a:p>
+            <a:pPr marL="171450" marR="0" lvl="0" indent="-171450" algn="l" defTabSz="914400" rtl="0" eaLnBrk="1" fontAlgn="auto" latinLnBrk="0" hangingPunct="1">
+              <a:lnSpc>
+                <a:spcPct val="100000"/>
+              </a:lnSpc>
+              <a:spcBef>
+                <a:spcPts val="0"/>
+              </a:spcBef>
+              <a:spcAft>
+                <a:spcPts val="0"/>
+              </a:spcAft>
+              <a:buClrTx/>
+              <a:buSzTx/>
+              <a:buFont typeface="Arial" panose="020B0604020202020204" pitchFamily="34" charset="0"/>
+              <a:buChar char="•"/>
+              <a:tabLst/>
+              <a:defRPr/>
+            </a:pPr>
+            <a:r>
+              <a:rPr lang="en-US" dirty="0"/>
+              <a:t>Most Cisco products use REST APIs</a:t>
+            </a:r>
+          </a:p>
+          <a:p>
+            <a:pPr marL="171450" marR="0" lvl="0" indent="-171450" algn="l" defTabSz="914400" rtl="0" eaLnBrk="1" fontAlgn="auto" latinLnBrk="0" hangingPunct="1">
+              <a:lnSpc>
+                <a:spcPct val="100000"/>
+              </a:lnSpc>
+              <a:spcBef>
+                <a:spcPts val="0"/>
+              </a:spcBef>
+              <a:spcAft>
+                <a:spcPts val="0"/>
+              </a:spcAft>
+              <a:buClrTx/>
+              <a:buSzTx/>
+              <a:buFont typeface="Arial" panose="020B0604020202020204" pitchFamily="34" charset="0"/>
+              <a:buChar char="•"/>
+              <a:tabLst/>
+              <a:defRPr/>
+            </a:pPr>
+            <a:r>
+              <a:rPr lang="en-US" dirty="0"/>
+              <a:t>Simpler than RPC, SOAP, etc.</a:t>
+            </a:r>
+          </a:p>
+          <a:p>
+            <a:pPr marL="628650" marR="0" lvl="1" indent="-171450" algn="l" defTabSz="914400" rtl="0" eaLnBrk="1" fontAlgn="auto" latinLnBrk="0" hangingPunct="1">
+              <a:lnSpc>
+                <a:spcPct val="100000"/>
+              </a:lnSpc>
+              <a:spcBef>
+                <a:spcPts val="0"/>
+              </a:spcBef>
+              <a:spcAft>
+                <a:spcPts val="0"/>
+              </a:spcAft>
+              <a:buClrTx/>
+              <a:buSzTx/>
+              <a:buFont typeface="Arial" panose="020B0604020202020204" pitchFamily="34" charset="0"/>
+              <a:buChar char="•"/>
+              <a:tabLst/>
+              <a:defRPr/>
+            </a:pPr>
+            <a:r>
+              <a:rPr lang="en-US" dirty="0"/>
+              <a:t>https://</a:t>
+            </a:r>
+            <a:r>
+              <a:rPr lang="en-US" dirty="0" err="1"/>
+              <a:t>www.linkedin.com</a:t>
+            </a:r>
+            <a:r>
+              <a:rPr lang="en-US" dirty="0"/>
+              <a:t>/pulse/why-rest-</a:t>
+            </a:r>
+            <a:r>
+              <a:rPr lang="en-US" dirty="0" err="1"/>
+              <a:t>api</a:t>
+            </a:r>
+            <a:r>
+              <a:rPr lang="en-US" dirty="0"/>
+              <a:t>-so-popular-</a:t>
+            </a:r>
+            <a:r>
+              <a:rPr lang="en-US" dirty="0" err="1"/>
+              <a:t>mangesh</a:t>
+            </a:r>
+            <a:r>
+              <a:rPr lang="en-US" dirty="0"/>
+              <a:t>-</a:t>
+            </a:r>
+            <a:r>
+              <a:rPr lang="en-US" dirty="0" err="1"/>
+              <a:t>bulkar</a:t>
+            </a:r>
+            <a:r>
+              <a:rPr lang="en-US" dirty="0"/>
+              <a:t>/</a:t>
+            </a:r>
+          </a:p>
+          <a:p>
+            <a:pPr marL="628650" marR="0" lvl="1" indent="-171450" algn="l" defTabSz="914400" rtl="0" eaLnBrk="1" fontAlgn="auto" latinLnBrk="0" hangingPunct="1">
+              <a:lnSpc>
+                <a:spcPct val="100000"/>
+              </a:lnSpc>
+              <a:spcBef>
+                <a:spcPts val="0"/>
+              </a:spcBef>
+              <a:spcAft>
+                <a:spcPts val="0"/>
+              </a:spcAft>
+              <a:buClrTx/>
+              <a:buSzTx/>
+              <a:buFont typeface="Arial" panose="020B0604020202020204" pitchFamily="34" charset="0"/>
+              <a:buChar char="•"/>
+              <a:tabLst/>
+              <a:defRPr/>
+            </a:pPr>
+            <a:r>
+              <a:rPr lang="en-US" dirty="0"/>
+              <a:t>Client/server architecture – Uses HTTP verbs (less ambiguity)</a:t>
+            </a:r>
+          </a:p>
+          <a:p>
+            <a:pPr marL="628650" marR="0" lvl="1" indent="-171450" algn="l" defTabSz="914400" rtl="0" eaLnBrk="1" fontAlgn="auto" latinLnBrk="0" hangingPunct="1">
+              <a:lnSpc>
+                <a:spcPct val="100000"/>
+              </a:lnSpc>
+              <a:spcBef>
+                <a:spcPts val="0"/>
+              </a:spcBef>
+              <a:spcAft>
+                <a:spcPts val="0"/>
+              </a:spcAft>
+              <a:buClrTx/>
+              <a:buSzTx/>
+              <a:buFont typeface="Arial" panose="020B0604020202020204" pitchFamily="34" charset="0"/>
+              <a:buChar char="•"/>
+              <a:tabLst/>
+              <a:defRPr/>
+            </a:pPr>
+            <a:r>
+              <a:rPr lang="en-US" dirty="0"/>
+              <a:t>Widely documented</a:t>
+            </a:r>
+          </a:p>
+          <a:p>
+            <a:pPr marL="171450" marR="0" lvl="0" indent="-171450" algn="l" defTabSz="914400" rtl="0" eaLnBrk="1" fontAlgn="auto" latinLnBrk="0" hangingPunct="1">
+              <a:lnSpc>
+                <a:spcPct val="100000"/>
+              </a:lnSpc>
+              <a:spcBef>
+                <a:spcPts val="0"/>
+              </a:spcBef>
+              <a:spcAft>
+                <a:spcPts val="0"/>
+              </a:spcAft>
+              <a:buClrTx/>
+              <a:buSzTx/>
+              <a:buFont typeface="Arial" panose="020B0604020202020204" pitchFamily="34" charset="0"/>
+              <a:buChar char="•"/>
+              <a:tabLst/>
+              <a:defRPr/>
+            </a:pPr>
+            <a:r>
+              <a:rPr lang="en-US" dirty="0"/>
+              <a:t>Portable between REST clients</a:t>
+            </a:r>
+          </a:p>
+          <a:p>
+            <a:pPr marL="628650" marR="0" lvl="1" indent="-171450" algn="l" defTabSz="914400" rtl="0" eaLnBrk="1" fontAlgn="auto" latinLnBrk="0" hangingPunct="1">
+              <a:lnSpc>
+                <a:spcPct val="100000"/>
+              </a:lnSpc>
+              <a:spcBef>
+                <a:spcPts val="0"/>
+              </a:spcBef>
+              <a:spcAft>
+                <a:spcPts val="0"/>
+              </a:spcAft>
+              <a:buClrTx/>
+              <a:buSzTx/>
+              <a:buFont typeface="Arial" panose="020B0604020202020204" pitchFamily="34" charset="0"/>
+              <a:buChar char="•"/>
+              <a:tabLst/>
+              <a:defRPr/>
+            </a:pPr>
+            <a:r>
+              <a:rPr lang="en-US" dirty="0" err="1"/>
+              <a:t>cURL</a:t>
+            </a:r>
+            <a:endParaRPr lang="en-US" dirty="0"/>
+          </a:p>
+          <a:p>
+            <a:pPr marL="628650" marR="0" lvl="1" indent="-171450" algn="l" defTabSz="914400" rtl="0" eaLnBrk="1" fontAlgn="auto" latinLnBrk="0" hangingPunct="1">
+              <a:lnSpc>
+                <a:spcPct val="100000"/>
+              </a:lnSpc>
+              <a:spcBef>
+                <a:spcPts val="0"/>
+              </a:spcBef>
+              <a:spcAft>
+                <a:spcPts val="0"/>
+              </a:spcAft>
+              <a:buClrTx/>
+              <a:buSzTx/>
+              <a:buFont typeface="Arial" panose="020B0604020202020204" pitchFamily="34" charset="0"/>
+              <a:buChar char="•"/>
+              <a:tabLst/>
+              <a:defRPr/>
+            </a:pPr>
+            <a:r>
+              <a:rPr lang="en-US" dirty="0"/>
+              <a:t>Python</a:t>
+            </a:r>
+          </a:p>
+          <a:p>
+            <a:pPr marL="628650" marR="0" lvl="1" indent="-171450" algn="l" defTabSz="914400" rtl="0" eaLnBrk="1" fontAlgn="auto" latinLnBrk="0" hangingPunct="1">
+              <a:lnSpc>
+                <a:spcPct val="100000"/>
+              </a:lnSpc>
+              <a:spcBef>
+                <a:spcPts val="0"/>
+              </a:spcBef>
+              <a:spcAft>
+                <a:spcPts val="0"/>
+              </a:spcAft>
+              <a:buClrTx/>
+              <a:buSzTx/>
+              <a:buFont typeface="Arial" panose="020B0604020202020204" pitchFamily="34" charset="0"/>
+              <a:buChar char="•"/>
+              <a:tabLst/>
+              <a:defRPr/>
+            </a:pPr>
+            <a:r>
+              <a:rPr lang="en-US" dirty="0"/>
+              <a:t>Postman</a:t>
+            </a:r>
+          </a:p>
+          <a:p>
+            <a:pPr marL="628650" marR="0" lvl="1" indent="-171450" algn="l" defTabSz="914400" rtl="0" eaLnBrk="1" fontAlgn="auto" latinLnBrk="0" hangingPunct="1">
+              <a:lnSpc>
+                <a:spcPct val="100000"/>
+              </a:lnSpc>
+              <a:spcBef>
+                <a:spcPts val="0"/>
+              </a:spcBef>
+              <a:spcAft>
+                <a:spcPts val="0"/>
+              </a:spcAft>
+              <a:buClrTx/>
+              <a:buSzTx/>
+              <a:buFont typeface="Arial" panose="020B0604020202020204" pitchFamily="34" charset="0"/>
+              <a:buChar char="•"/>
+              <a:tabLst/>
+              <a:defRPr/>
+            </a:pPr>
+            <a:r>
+              <a:rPr lang="en-US" dirty="0"/>
+              <a:t>Etc.</a:t>
+            </a:r>
+          </a:p>
+          <a:p>
+            <a:pPr marL="171450" marR="0" lvl="0" indent="-171450" algn="l" defTabSz="914400" rtl="0" eaLnBrk="1" fontAlgn="auto" latinLnBrk="0" hangingPunct="1">
+              <a:lnSpc>
+                <a:spcPct val="100000"/>
+              </a:lnSpc>
+              <a:spcBef>
+                <a:spcPts val="0"/>
+              </a:spcBef>
+              <a:spcAft>
+                <a:spcPts val="0"/>
+              </a:spcAft>
+              <a:buClrTx/>
+              <a:buSzTx/>
+              <a:buFont typeface="Arial" panose="020B0604020202020204" pitchFamily="34" charset="0"/>
+              <a:buChar char="•"/>
+              <a:tabLst/>
+              <a:defRPr/>
+            </a:pPr>
+            <a:r>
+              <a:rPr lang="en-US" dirty="0"/>
+              <a:t>Our </a:t>
+            </a:r>
+            <a:r>
+              <a:rPr lang="en-US" dirty="0">
+                <a:solidFill>
+                  <a:srgbClr val="FFFF00"/>
+                </a:solidFill>
+              </a:rPr>
+              <a:t>customers want/need simple, automated infrastructures</a:t>
+            </a:r>
+            <a:endParaRPr lang="en-US" dirty="0"/>
           </a:p>
         </p:txBody>
       </p:sp>
@@ -7431,13 +7749,13 @@
         <p:spPr/>
         <p:txBody>
           <a:bodyPr>
-            <a:normAutofit/>
+            <a:normAutofit fontScale="92500" lnSpcReduction="10000"/>
           </a:bodyPr>
           <a:lstStyle/>
           <a:p>
             <a:r>
               <a:rPr lang="en-US" dirty="0"/>
-              <a:t>Have access to a Unix-style terminal (Linux, macOS, WSL, etc.)</a:t>
+              <a:t>Create a Docker Hub Account</a:t>
             </a:r>
           </a:p>
           <a:p>
@@ -7446,14 +7764,14 @@
               <a:rPr lang="en-US" dirty="0">
                 <a:hlinkClick r:id="rId3"/>
               </a:rPr>
-              <a:t>https://docs.microsoft.com/en-us/windows/wsl/install-win10</a:t>
+              <a:t>https://hub.docker.com/signup</a:t>
             </a:r>
             <a:endParaRPr lang="en-US" dirty="0"/>
           </a:p>
           <a:p>
             <a:r>
               <a:rPr lang="en-US" dirty="0"/>
-              <a:t>Download and install Python 3</a:t>
+              <a:t>Download and install Docker Desktop</a:t>
             </a:r>
           </a:p>
           <a:p>
@@ -7462,14 +7780,14 @@
               <a:rPr lang="en-US" dirty="0">
                 <a:hlinkClick r:id="rId4"/>
               </a:rPr>
-              <a:t>https://www.python.org/downloads/</a:t>
+              <a:t>https://www.docker.com/products/docker-desktop</a:t>
             </a:r>
             <a:endParaRPr lang="en-US" dirty="0"/>
           </a:p>
           <a:p>
             <a:r>
               <a:rPr lang="en-US" dirty="0"/>
-              <a:t>Download this presentation from WWT’s GitHub</a:t>
+              <a:t>Download this Docker Image from Docker Hub (wwt01)</a:t>
             </a:r>
           </a:p>
           <a:p>
@@ -7478,6 +7796,36 @@
               <a:rPr lang="en-US" dirty="0">
                 <a:hlinkClick r:id="rId5"/>
               </a:rPr>
+              <a:t>https://hub.docker.com/u/wwt01</a:t>
+            </a:r>
+            <a:r>
+              <a:rPr lang="en-US" dirty="0"/>
+              <a:t> </a:t>
+            </a:r>
+            <a:r>
+              <a:rPr lang="en-US" dirty="0">
+                <a:solidFill>
+                  <a:srgbClr val="FFFF00"/>
+                </a:solidFill>
+                <a:highlight>
+                  <a:srgbClr val="FF0000"/>
+                </a:highlight>
+              </a:rPr>
+              <a:t>**Need Complete URL**</a:t>
+            </a:r>
+          </a:p>
+          <a:p>
+            <a:r>
+              <a:rPr lang="en-US" dirty="0"/>
+              <a:t>Download this repo from WWT’s GitHub</a:t>
+            </a:r>
+          </a:p>
+          <a:p>
+            <a:pPr lvl="1"/>
+            <a:r>
+              <a:rPr lang="en-US" dirty="0">
+                <a:hlinkClick r:id="rId6"/>
+              </a:rPr>
               <a:t>https://github.com/wwt/curl-requests-foundations</a:t>
             </a:r>
             <a:endParaRPr lang="en-US" dirty="0"/>
@@ -7492,7 +7840,7 @@
             <a:pPr lvl="1"/>
             <a:r>
               <a:rPr lang="en-US" dirty="0">
-                <a:hlinkClick r:id="rId6"/>
+                <a:hlinkClick r:id="rId7"/>
               </a:rPr>
               <a:t>https://code.visualstudio.com/Download</a:t>
             </a:r>
@@ -8074,6 +8422,110 @@
                                   </p:childTnLst>
                                 </p:cTn>
                               </p:par>
+                              <p:par>
+                                <p:cTn id="40" presetID="9" presetClass="entr" presetSubtype="0" fill="hold" grpId="0" nodeType="withEffect">
+                                  <p:stCondLst>
+                                    <p:cond delay="0"/>
+                                  </p:stCondLst>
+                                  <p:childTnLst>
+                                    <p:set>
+                                      <p:cBhvr>
+                                        <p:cTn id="41" dur="1" fill="hold">
+                                          <p:stCondLst>
+                                            <p:cond delay="0"/>
+                                          </p:stCondLst>
+                                        </p:cTn>
+                                        <p:tgtEl>
+                                          <p:spTgt spid="3">
+                                            <p:txEl>
+                                              <p:pRg st="9" end="9"/>
+                                            </p:txEl>
+                                          </p:spTgt>
+                                        </p:tgtEl>
+                                        <p:attrNameLst>
+                                          <p:attrName>style.visibility</p:attrName>
+                                        </p:attrNameLst>
+                                      </p:cBhvr>
+                                      <p:to>
+                                        <p:strVal val="visible"/>
+                                      </p:to>
+                                    </p:set>
+                                    <p:animEffect transition="in" filter="dissolve">
+                                      <p:cBhvr>
+                                        <p:cTn id="42" dur="500"/>
+                                        <p:tgtEl>
+                                          <p:spTgt spid="3">
+                                            <p:txEl>
+                                              <p:pRg st="9" end="9"/>
+                                            </p:txEl>
+                                          </p:spTgt>
+                                        </p:tgtEl>
+                                      </p:cBhvr>
+                                    </p:animEffect>
+                                  </p:childTnLst>
+                                </p:cTn>
+                              </p:par>
+                            </p:childTnLst>
+                          </p:cTn>
+                        </p:par>
+                      </p:childTnLst>
+                    </p:cTn>
+                  </p:par>
+                  <p:par>
+                    <p:cTn id="43" fill="hold">
+                      <p:stCondLst>
+                        <p:cond delay="indefinite"/>
+                      </p:stCondLst>
+                      <p:childTnLst>
+                        <p:par>
+                          <p:cTn id="44" fill="hold">
+                            <p:stCondLst>
+                              <p:cond delay="0"/>
+                            </p:stCondLst>
+                            <p:childTnLst>
+                              <p:par>
+                                <p:cTn id="45" presetID="9" presetClass="entr" presetSubtype="0" fill="hold" grpId="0" nodeType="clickEffect">
+                                  <p:stCondLst>
+                                    <p:cond delay="0"/>
+                                  </p:stCondLst>
+                                  <p:childTnLst>
+                                    <p:set>
+                                      <p:cBhvr>
+                                        <p:cTn id="46" dur="1" fill="hold">
+                                          <p:stCondLst>
+                                            <p:cond delay="0"/>
+                                          </p:stCondLst>
+                                        </p:cTn>
+                                        <p:tgtEl>
+                                          <p:spTgt spid="3">
+                                            <p:txEl>
+                                              <p:pRg st="10" end="10"/>
+                                            </p:txEl>
+                                          </p:spTgt>
+                                        </p:tgtEl>
+                                        <p:attrNameLst>
+                                          <p:attrName>style.visibility</p:attrName>
+                                        </p:attrNameLst>
+                                      </p:cBhvr>
+                                      <p:to>
+                                        <p:strVal val="visible"/>
+                                      </p:to>
+                                    </p:set>
+                                    <p:animEffect transition="in" filter="dissolve">
+                                      <p:cBhvr>
+                                        <p:cTn id="47" dur="500"/>
+                                        <p:tgtEl>
+                                          <p:spTgt spid="3">
+                                            <p:txEl>
+                                              <p:pRg st="10" end="10"/>
+                                            </p:txEl>
+                                          </p:spTgt>
+                                        </p:tgtEl>
+                                      </p:cBhvr>
+                                    </p:animEffect>
+                                  </p:childTnLst>
+                                </p:cTn>
+                              </p:par>
                             </p:childTnLst>
                           </p:cTn>
                         </p:par>
@@ -8171,23 +8623,27 @@
         </p:nvSpPr>
         <p:spPr/>
         <p:txBody>
-          <a:bodyPr/>
+          <a:bodyPr>
+            <a:normAutofit lnSpcReduction="10000"/>
+          </a:bodyPr>
           <a:lstStyle/>
           <a:p>
             <a:r>
               <a:rPr lang="en-US" dirty="0">
                 <a:hlinkClick r:id="rId2"/>
               </a:rPr>
-              <a:t>https://en.wikipedia.org/wiki/CURL</a:t>
-            </a:r>
-            <a:endParaRPr lang="en-US" dirty="0"/>
+              <a:t>https://www.linkedin.com/pulse/why-rest-api-so-popular-mangesh-bulkar/</a:t>
+            </a:r>
+            <a:endParaRPr lang="en-US" dirty="0">
+              <a:hlinkClick r:id="rId3"/>
+            </a:endParaRPr>
           </a:p>
           <a:p>
             <a:r>
               <a:rPr lang="en-US" dirty="0">
                 <a:hlinkClick r:id="rId3"/>
               </a:rPr>
-              <a:t>https://en.wikipedia.org/wiki/Requests_%28software%29</a:t>
+              <a:t>https://en.wikipedia.org/wiki/CURL</a:t>
             </a:r>
             <a:endParaRPr lang="en-US" dirty="0"/>
           </a:p>
@@ -8196,7 +8652,7 @@
               <a:rPr lang="en-US" dirty="0">
                 <a:hlinkClick r:id="rId4"/>
               </a:rPr>
-              <a:t>https://curl.haxx.se</a:t>
+              <a:t>https://en.wikipedia.org/wiki/Requests_%28software%29</a:t>
             </a:r>
             <a:endParaRPr lang="en-US" dirty="0"/>
           </a:p>
@@ -8204,6 +8660,15 @@
             <a:r>
               <a:rPr lang="en-US" dirty="0">
                 <a:hlinkClick r:id="rId5"/>
+              </a:rPr>
+              <a:t>https://curl.haxx.se</a:t>
+            </a:r>
+            <a:endParaRPr lang="en-US" dirty="0"/>
+          </a:p>
+          <a:p>
+            <a:r>
+              <a:rPr lang="en-US" dirty="0">
+                <a:hlinkClick r:id="rId6"/>
               </a:rPr>
               <a:t>https://requests.readthedocs.io/en/master/</a:t>
             </a:r>
@@ -8590,24 +9055,26 @@
           </a:xfrm>
         </p:spPr>
         <p:txBody>
-          <a:bodyPr/>
+          <a:bodyPr>
+            <a:normAutofit/>
+          </a:bodyPr>
           <a:lstStyle/>
           <a:p>
             <a:r>
               <a:rPr lang="en-US" dirty="0"/>
-              <a:t>Programmatic interaction with…</a:t>
+              <a:t>Primary mechanism to interact with many infrastructure systems</a:t>
             </a:r>
           </a:p>
           <a:p>
             <a:r>
               <a:rPr lang="en-US" dirty="0"/>
-              <a:t>System automation and integration with…</a:t>
+              <a:t>Simple method to make CRUD requests</a:t>
             </a:r>
           </a:p>
           <a:p>
             <a:r>
               <a:rPr lang="en-US" dirty="0"/>
-              <a:t>Something else…</a:t>
+              <a:t>Portable syntax between REST clients</a:t>
             </a:r>
           </a:p>
         </p:txBody>
@@ -8637,7 +9104,7 @@
         </p:spPr>
         <p:txBody>
           <a:bodyPr vert="horz" lIns="91440" tIns="45720" rIns="91440" bIns="45720" rtlCol="0">
-            <a:normAutofit fontScale="77500" lnSpcReduction="20000"/>
+            <a:normAutofit/>
           </a:bodyPr>
           <a:lstStyle>
             <a:lvl1pPr marL="228600" indent="-228600" algn="l" defTabSz="914400" rtl="0" eaLnBrk="1" latinLnBrk="0" hangingPunct="1">
@@ -8814,7 +9281,7 @@
                   <a:srgbClr val="FFFF00"/>
                 </a:solidFill>
               </a:rPr>
-              <a:t>Translation – APIs are the foundation of automated infrastructures (what our customers want/need)</a:t>
+              <a:t>Translation – REST APIs are the foundation of automated infrastructures</a:t>
             </a:r>
           </a:p>
         </p:txBody>
@@ -8880,10 +9347,10 @@
       </p:sp>
       <p:pic>
         <p:nvPicPr>
-          <p:cNvPr id="7" name="Picture 6" descr="A close up of a sign&#10;&#10;Description automatically generated">
+          <p:cNvPr id="8" name="Picture 7" descr="A close up of a sign&#10;&#10;Description automatically generated">
             <a:extLst>
               <a:ext uri="{FF2B5EF4-FFF2-40B4-BE49-F238E27FC236}">
-                <a16:creationId xmlns:a16="http://schemas.microsoft.com/office/drawing/2014/main" id="{26F43F39-EACF-0745-93AC-CBF0EF4BF4CA}"/>
+                <a16:creationId xmlns:a16="http://schemas.microsoft.com/office/drawing/2014/main" id="{1967DB92-2CA2-4542-8835-E8EBE400FD7B}"/>
               </a:ext>
             </a:extLst>
           </p:cNvPr>
@@ -9200,7 +9667,7 @@
                                           </p:stCondLst>
                                         </p:cTn>
                                         <p:tgtEl>
-                                          <p:spTgt spid="7"/>
+                                          <p:spTgt spid="8"/>
                                         </p:tgtEl>
                                         <p:attrNameLst>
                                           <p:attrName>style.visibility</p:attrName>
@@ -9214,7 +9681,7 @@
                                       <p:cBhvr>
                                         <p:cTn id="27" dur="500" fill="hold"/>
                                         <p:tgtEl>
-                                          <p:spTgt spid="7"/>
+                                          <p:spTgt spid="8"/>
                                         </p:tgtEl>
                                         <p:attrNameLst>
                                           <p:attrName>ppt_w</p:attrName>
@@ -9237,7 +9704,7 @@
                                       <p:cBhvr>
                                         <p:cTn id="28" dur="500" fill="hold"/>
                                         <p:tgtEl>
-                                          <p:spTgt spid="7"/>
+                                          <p:spTgt spid="8"/>
                                         </p:tgtEl>
                                         <p:attrNameLst>
                                           <p:attrName>ppt_h</p:attrName>

</xml_diff>

<commit_message>
Built outline for slide with instructions to access the hands-on environment
</commit_message>
<xml_diff>
--- a/curl-requests-foundations.pptx
+++ b/curl-requests-foundations.pptx
@@ -231,7 +231,7 @@
           <a:p>
             <a:fld id="{966F6F5D-167E-1849-B841-EB0817BB385A}" type="datetimeFigureOut">
               <a:rPr lang="en-US" smtClean="0"/>
-              <a:t>3/30/20</a:t>
+              <a:t>3/31/20</a:t>
             </a:fld>
             <a:endParaRPr lang="en-US"/>
           </a:p>
@@ -1378,6 +1378,141 @@
               <a:rPr lang="en-US" dirty="0"/>
               <a:t>// TODO</a:t>
             </a:r>
+          </a:p>
+          <a:p>
+            <a:pPr marL="171450" marR="0" lvl="0" indent="-171450" algn="l" defTabSz="914400" rtl="0" eaLnBrk="1" fontAlgn="auto" latinLnBrk="0" hangingPunct="1">
+              <a:lnSpc>
+                <a:spcPct val="100000"/>
+              </a:lnSpc>
+              <a:spcBef>
+                <a:spcPts val="0"/>
+              </a:spcBef>
+              <a:spcAft>
+                <a:spcPts val="0"/>
+              </a:spcAft>
+              <a:buClrTx/>
+              <a:buSzTx/>
+              <a:buFont typeface="Arial" panose="020B0604020202020204" pitchFamily="34" charset="0"/>
+              <a:buChar char="•"/>
+              <a:tabLst/>
+              <a:defRPr/>
+            </a:pPr>
+            <a:r>
+              <a:rPr lang="en-US" dirty="0"/>
+              <a:t>A Docker container is available which has a ready-build development environment for all of the hands-on activities</a:t>
+            </a:r>
+          </a:p>
+          <a:p>
+            <a:pPr marL="628650" marR="0" lvl="1" indent="-171450" algn="l" defTabSz="914400" rtl="0" eaLnBrk="1" fontAlgn="auto" latinLnBrk="0" hangingPunct="1">
+              <a:lnSpc>
+                <a:spcPct val="100000"/>
+              </a:lnSpc>
+              <a:spcBef>
+                <a:spcPts val="0"/>
+              </a:spcBef>
+              <a:spcAft>
+                <a:spcPts val="0"/>
+              </a:spcAft>
+              <a:buClrTx/>
+              <a:buSzTx/>
+              <a:buFont typeface="Arial" panose="020B0604020202020204" pitchFamily="34" charset="0"/>
+              <a:buChar char="•"/>
+              <a:tabLst/>
+              <a:defRPr/>
+            </a:pPr>
+            <a:r>
+              <a:rPr lang="en-US" dirty="0"/>
+              <a:t>This will run on any Docker host, no dependency concerns</a:t>
+            </a:r>
+          </a:p>
+          <a:p>
+            <a:pPr marL="171450" marR="0" lvl="0" indent="-171450" algn="l" defTabSz="914400" rtl="0" eaLnBrk="1" fontAlgn="auto" latinLnBrk="0" hangingPunct="1">
+              <a:lnSpc>
+                <a:spcPct val="100000"/>
+              </a:lnSpc>
+              <a:spcBef>
+                <a:spcPts val="0"/>
+              </a:spcBef>
+              <a:spcAft>
+                <a:spcPts val="0"/>
+              </a:spcAft>
+              <a:buClrTx/>
+              <a:buSzTx/>
+              <a:buFont typeface="Arial" panose="020B0604020202020204" pitchFamily="34" charset="0"/>
+              <a:buChar char="•"/>
+              <a:tabLst/>
+              <a:defRPr/>
+            </a:pPr>
+            <a:r>
+              <a:rPr lang="en-US" dirty="0"/>
+              <a:t>This isn’t a Docker class but here are some basic commands to use Docker for the hands-on activities</a:t>
+            </a:r>
+          </a:p>
+          <a:p>
+            <a:pPr marL="171450" marR="0" lvl="0" indent="-171450" algn="l" defTabSz="914400" rtl="0" eaLnBrk="1" fontAlgn="auto" latinLnBrk="0" hangingPunct="1">
+              <a:lnSpc>
+                <a:spcPct val="100000"/>
+              </a:lnSpc>
+              <a:spcBef>
+                <a:spcPts val="0"/>
+              </a:spcBef>
+              <a:spcAft>
+                <a:spcPts val="0"/>
+              </a:spcAft>
+              <a:buClrTx/>
+              <a:buSzTx/>
+              <a:buFont typeface="Arial" panose="020B0604020202020204" pitchFamily="34" charset="0"/>
+              <a:buChar char="•"/>
+              <a:tabLst/>
+              <a:defRPr/>
+            </a:pPr>
+            <a:r>
+              <a:rPr lang="en-US" dirty="0"/>
+              <a:t>Create/use a local folder to organize all of your projects (/development, /code, etc.)</a:t>
+            </a:r>
+          </a:p>
+          <a:p>
+            <a:pPr marL="171450" marR="0" lvl="0" indent="-171450" algn="l" defTabSz="914400" rtl="0" eaLnBrk="1" fontAlgn="auto" latinLnBrk="0" hangingPunct="1">
+              <a:lnSpc>
+                <a:spcPct val="100000"/>
+              </a:lnSpc>
+              <a:spcBef>
+                <a:spcPts val="0"/>
+              </a:spcBef>
+              <a:spcAft>
+                <a:spcPts val="0"/>
+              </a:spcAft>
+              <a:buClrTx/>
+              <a:buSzTx/>
+              <a:buFont typeface="Arial" panose="020B0604020202020204" pitchFamily="34" charset="0"/>
+              <a:buChar char="•"/>
+              <a:tabLst/>
+              <a:defRPr/>
+            </a:pPr>
+            <a:r>
+              <a:rPr lang="en-US" dirty="0"/>
+              <a:t>Download and run the Docker image from Docker Hub</a:t>
+            </a:r>
+          </a:p>
+          <a:p>
+            <a:pPr marL="171450" marR="0" lvl="0" indent="-171450" algn="l" defTabSz="914400" rtl="0" eaLnBrk="1" fontAlgn="auto" latinLnBrk="0" hangingPunct="1">
+              <a:lnSpc>
+                <a:spcPct val="100000"/>
+              </a:lnSpc>
+              <a:spcBef>
+                <a:spcPts val="0"/>
+              </a:spcBef>
+              <a:spcAft>
+                <a:spcPts val="0"/>
+              </a:spcAft>
+              <a:buClrTx/>
+              <a:buSzTx/>
+              <a:buFont typeface="Arial" panose="020B0604020202020204" pitchFamily="34" charset="0"/>
+              <a:buChar char="•"/>
+              <a:tabLst/>
+              <a:defRPr/>
+            </a:pPr>
+            <a:endParaRPr lang="en-US" dirty="0"/>
           </a:p>
         </p:txBody>
       </p:sp>
@@ -9667,7 +9802,7 @@
         <p:spPr/>
         <p:txBody>
           <a:bodyPr>
-            <a:normAutofit fontScale="92500" lnSpcReduction="10000"/>
+            <a:normAutofit/>
           </a:bodyPr>
           <a:lstStyle/>
           <a:p>
@@ -9705,7 +9840,7 @@
           <a:p>
             <a:r>
               <a:rPr lang="en-US" dirty="0"/>
-              <a:t>Download this Docker Image from Docker Hub (wwt01)</a:t>
+              <a:t>Download this repo from WWT’s GitHub</a:t>
             </a:r>
           </a:p>
           <a:p>
@@ -9714,28 +9849,14 @@
               <a:rPr lang="en-US" dirty="0">
                 <a:hlinkClick r:id="rId5"/>
               </a:rPr>
-              <a:t>https://hub.docker.com/u/wwt01</a:t>
-            </a:r>
-            <a:r>
-              <a:rPr lang="en-US" dirty="0"/>
-              <a:t> </a:t>
-            </a:r>
-            <a:r>
-              <a:rPr lang="en-US" dirty="0">
-                <a:solidFill>
-                  <a:srgbClr val="FFFF00"/>
-                </a:solidFill>
-                <a:highlight>
-                  <a:srgbClr val="FF0000"/>
-                </a:highlight>
-              </a:rPr>
-              <a:t>**Need Complete URL**</a:t>
-            </a:r>
-          </a:p>
-          <a:p>
-            <a:r>
-              <a:rPr lang="en-US" dirty="0"/>
-              <a:t>Download this repo from WWT’s GitHub</a:t>
+              <a:t>https://github.com/wwt/curl-requests-foundations</a:t>
+            </a:r>
+            <a:endParaRPr lang="en-US" dirty="0"/>
+          </a:p>
+          <a:p>
+            <a:r>
+              <a:rPr lang="en-US" dirty="0"/>
+              <a:t>Install a code editor</a:t>
             </a:r>
           </a:p>
           <a:p>
@@ -9743,22 +9864,6 @@
             <a:r>
               <a:rPr lang="en-US" dirty="0">
                 <a:hlinkClick r:id="rId6"/>
-              </a:rPr>
-              <a:t>https://github.com/wwt/curl-requests-foundations</a:t>
-            </a:r>
-            <a:endParaRPr lang="en-US" dirty="0"/>
-          </a:p>
-          <a:p>
-            <a:r>
-              <a:rPr lang="en-US" dirty="0"/>
-              <a:t>Install a code editor</a:t>
-            </a:r>
-          </a:p>
-          <a:p>
-            <a:pPr lvl="1"/>
-            <a:r>
-              <a:rPr lang="en-US" dirty="0">
-                <a:hlinkClick r:id="rId7"/>
               </a:rPr>
               <a:t>https://code.visualstudio.com/Download</a:t>
             </a:r>
@@ -10340,110 +10445,6 @@
                                   </p:childTnLst>
                                 </p:cTn>
                               </p:par>
-                              <p:par>
-                                <p:cTn id="40" presetID="9" presetClass="entr" presetSubtype="0" fill="hold" grpId="0" nodeType="withEffect">
-                                  <p:stCondLst>
-                                    <p:cond delay="0"/>
-                                  </p:stCondLst>
-                                  <p:childTnLst>
-                                    <p:set>
-                                      <p:cBhvr>
-                                        <p:cTn id="41" dur="1" fill="hold">
-                                          <p:stCondLst>
-                                            <p:cond delay="0"/>
-                                          </p:stCondLst>
-                                        </p:cTn>
-                                        <p:tgtEl>
-                                          <p:spTgt spid="3">
-                                            <p:txEl>
-                                              <p:pRg st="9" end="9"/>
-                                            </p:txEl>
-                                          </p:spTgt>
-                                        </p:tgtEl>
-                                        <p:attrNameLst>
-                                          <p:attrName>style.visibility</p:attrName>
-                                        </p:attrNameLst>
-                                      </p:cBhvr>
-                                      <p:to>
-                                        <p:strVal val="visible"/>
-                                      </p:to>
-                                    </p:set>
-                                    <p:animEffect transition="in" filter="dissolve">
-                                      <p:cBhvr>
-                                        <p:cTn id="42" dur="500"/>
-                                        <p:tgtEl>
-                                          <p:spTgt spid="3">
-                                            <p:txEl>
-                                              <p:pRg st="9" end="9"/>
-                                            </p:txEl>
-                                          </p:spTgt>
-                                        </p:tgtEl>
-                                      </p:cBhvr>
-                                    </p:animEffect>
-                                  </p:childTnLst>
-                                </p:cTn>
-                              </p:par>
-                            </p:childTnLst>
-                          </p:cTn>
-                        </p:par>
-                      </p:childTnLst>
-                    </p:cTn>
-                  </p:par>
-                  <p:par>
-                    <p:cTn id="43" fill="hold">
-                      <p:stCondLst>
-                        <p:cond delay="indefinite"/>
-                      </p:stCondLst>
-                      <p:childTnLst>
-                        <p:par>
-                          <p:cTn id="44" fill="hold">
-                            <p:stCondLst>
-                              <p:cond delay="0"/>
-                            </p:stCondLst>
-                            <p:childTnLst>
-                              <p:par>
-                                <p:cTn id="45" presetID="9" presetClass="entr" presetSubtype="0" fill="hold" grpId="0" nodeType="clickEffect">
-                                  <p:stCondLst>
-                                    <p:cond delay="0"/>
-                                  </p:stCondLst>
-                                  <p:childTnLst>
-                                    <p:set>
-                                      <p:cBhvr>
-                                        <p:cTn id="46" dur="1" fill="hold">
-                                          <p:stCondLst>
-                                            <p:cond delay="0"/>
-                                          </p:stCondLst>
-                                        </p:cTn>
-                                        <p:tgtEl>
-                                          <p:spTgt spid="3">
-                                            <p:txEl>
-                                              <p:pRg st="10" end="10"/>
-                                            </p:txEl>
-                                          </p:spTgt>
-                                        </p:tgtEl>
-                                        <p:attrNameLst>
-                                          <p:attrName>style.visibility</p:attrName>
-                                        </p:attrNameLst>
-                                      </p:cBhvr>
-                                      <p:to>
-                                        <p:strVal val="visible"/>
-                                      </p:to>
-                                    </p:set>
-                                    <p:animEffect transition="in" filter="dissolve">
-                                      <p:cBhvr>
-                                        <p:cTn id="47" dur="500"/>
-                                        <p:tgtEl>
-                                          <p:spTgt spid="3">
-                                            <p:txEl>
-                                              <p:pRg st="10" end="10"/>
-                                            </p:txEl>
-                                          </p:spTgt>
-                                        </p:tgtEl>
-                                      </p:cBhvr>
-                                    </p:animEffect>
-                                  </p:childTnLst>
-                                </p:cTn>
-                              </p:par>
                             </p:childTnLst>
                           </p:cTn>
                         </p:par>
@@ -11318,7 +11319,7 @@
           <a:p>
             <a:r>
               <a:rPr lang="en-US" dirty="0"/>
-              <a:t>Start the Development Environment</a:t>
+              <a:t>Access the Hands-On Environment</a:t>
             </a:r>
           </a:p>
         </p:txBody>
@@ -11400,23 +11401,239 @@
         </p:nvSpPr>
         <p:spPr>
           <a:xfrm>
-            <a:off x="838200" y="1825625"/>
-            <a:ext cx="10515600" cy="4351338"/>
+            <a:off x="606703" y="1527858"/>
+            <a:ext cx="11002701" cy="4965017"/>
           </a:xfrm>
         </p:spPr>
         <p:txBody>
-          <a:bodyPr/>
-          <a:lstStyle/>
-          <a:p>
-            <a:r>
-              <a:rPr lang="en-US" dirty="0"/>
-              <a:t>Instructions to run the </a:t>
+          <a:bodyPr>
+            <a:normAutofit/>
+          </a:bodyPr>
+          <a:lstStyle/>
+          <a:p>
+            <a:r>
+              <a:rPr lang="en-US" dirty="0"/>
+              <a:t>Open your preferred terminal (bash, PowerShell, </a:t>
+            </a:r>
+            <a:r>
+              <a:rPr lang="en-US" dirty="0" err="1"/>
+              <a:t>zsh</a:t>
+            </a:r>
+            <a:r>
+              <a:rPr lang="en-US" dirty="0"/>
+              <a:t>, etc.)</a:t>
+            </a:r>
+          </a:p>
+          <a:p>
+            <a:r>
+              <a:rPr lang="en-US" dirty="0"/>
+              <a:t>Create and switch to a local folder</a:t>
+            </a:r>
+          </a:p>
+          <a:p>
+            <a:pPr marL="457200" lvl="1" indent="0">
+              <a:buNone/>
+            </a:pPr>
+            <a:r>
+              <a:rPr lang="en-US" b="1" i="1" dirty="0" err="1">
+                <a:solidFill>
+                  <a:srgbClr val="FFFF00"/>
+                </a:solidFill>
+              </a:rPr>
+              <a:t>mkdir</a:t>
+            </a:r>
+            <a:r>
+              <a:rPr lang="en-US" b="1" i="1" dirty="0">
+                <a:solidFill>
+                  <a:srgbClr val="FFFF00"/>
+                </a:solidFill>
+              </a:rPr>
+              <a:t> ~/code &amp;&amp; cd ~/code</a:t>
+            </a:r>
+          </a:p>
+          <a:p>
+            <a:r>
+              <a:rPr lang="en-US" dirty="0"/>
+              <a:t>Create a Docker Container for </a:t>
             </a:r>
             <a:r>
               <a:rPr lang="en-US"/>
-              <a:t>Docker Container</a:t>
+              <a:t>the hands-on exercises</a:t>
             </a:r>
             <a:endParaRPr lang="en-US" dirty="0"/>
+          </a:p>
+          <a:p>
+            <a:pPr marL="457200" lvl="1" indent="0">
+              <a:buNone/>
+            </a:pPr>
+            <a:r>
+              <a:rPr lang="en-US" b="1" i="1" dirty="0">
+                <a:solidFill>
+                  <a:srgbClr val="FFFF00"/>
+                </a:solidFill>
+              </a:rPr>
+              <a:t>docker container run -</a:t>
+            </a:r>
+            <a:r>
+              <a:rPr lang="en-US" b="1" i="1" dirty="0" err="1">
+                <a:solidFill>
+                  <a:srgbClr val="FFFF00"/>
+                </a:solidFill>
+              </a:rPr>
+              <a:t>itv</a:t>
+            </a:r>
+            <a:r>
+              <a:rPr lang="en-US" b="1" i="1" dirty="0">
+                <a:solidFill>
+                  <a:srgbClr val="FFFF00"/>
+                </a:solidFill>
+              </a:rPr>
+              <a:t> ~/code:/code --name </a:t>
+            </a:r>
+            <a:r>
+              <a:rPr lang="en-US" b="1" i="1" dirty="0">
+                <a:solidFill>
+                  <a:srgbClr val="FFFF00"/>
+                </a:solidFill>
+                <a:highlight>
+                  <a:srgbClr val="800080"/>
+                </a:highlight>
+              </a:rPr>
+              <a:t>curl_pyreq1</a:t>
+            </a:r>
+            <a:r>
+              <a:rPr lang="en-US" b="1" i="1" dirty="0">
+                <a:solidFill>
+                  <a:srgbClr val="FFFF00"/>
+                </a:solidFill>
+              </a:rPr>
+              <a:t> </a:t>
+            </a:r>
+            <a:r>
+              <a:rPr lang="en-US" b="1" i="1" dirty="0">
+                <a:solidFill>
+                  <a:srgbClr val="FFFF00"/>
+                </a:solidFill>
+                <a:highlight>
+                  <a:srgbClr val="FF0000"/>
+                </a:highlight>
+              </a:rPr>
+              <a:t>wwt01/</a:t>
+            </a:r>
+            <a:r>
+              <a:rPr lang="en-US" b="1" i="1" dirty="0" err="1">
+                <a:solidFill>
+                  <a:srgbClr val="FFFF00"/>
+                </a:solidFill>
+                <a:highlight>
+                  <a:srgbClr val="FF0000"/>
+                </a:highlight>
+              </a:rPr>
+              <a:t>curl_pyreq</a:t>
+            </a:r>
+            <a:endParaRPr lang="en-US" b="1" i="1" dirty="0">
+              <a:solidFill>
+                <a:srgbClr val="FFFF00"/>
+              </a:solidFill>
+            </a:endParaRPr>
+          </a:p>
+          <a:p>
+            <a:r>
+              <a:rPr lang="en-US" dirty="0"/>
+              <a:t>Detach from the Docker Container</a:t>
+            </a:r>
+          </a:p>
+          <a:p>
+            <a:pPr marL="457200" lvl="1" indent="0">
+              <a:buNone/>
+            </a:pPr>
+            <a:r>
+              <a:rPr lang="en-US" b="1" i="1" dirty="0">
+                <a:solidFill>
+                  <a:srgbClr val="FFFF00"/>
+                </a:solidFill>
+              </a:rPr>
+              <a:t>control + p + q</a:t>
+            </a:r>
+            <a:endParaRPr lang="en-US" dirty="0"/>
+          </a:p>
+          <a:p>
+            <a:r>
+              <a:rPr lang="en-US" dirty="0"/>
+              <a:t>Stop, start, and attach the Docker Container</a:t>
+            </a:r>
+          </a:p>
+          <a:p>
+            <a:pPr marL="457200" lvl="1" indent="0">
+              <a:buNone/>
+            </a:pPr>
+            <a:r>
+              <a:rPr lang="en-US" b="1" i="1" dirty="0">
+                <a:solidFill>
+                  <a:srgbClr val="FFFF00"/>
+                </a:solidFill>
+              </a:rPr>
+              <a:t>docker container stop </a:t>
+            </a:r>
+            <a:r>
+              <a:rPr lang="en-US" b="1" i="1" dirty="0">
+                <a:solidFill>
+                  <a:srgbClr val="FFFF00"/>
+                </a:solidFill>
+                <a:highlight>
+                  <a:srgbClr val="800080"/>
+                </a:highlight>
+              </a:rPr>
+              <a:t>curl_pyreq1</a:t>
+            </a:r>
+          </a:p>
+          <a:p>
+            <a:pPr marL="457200" lvl="1" indent="0">
+              <a:buNone/>
+            </a:pPr>
+            <a:r>
+              <a:rPr lang="en-US" b="1" i="1" dirty="0">
+                <a:solidFill>
+                  <a:srgbClr val="FFFF00"/>
+                </a:solidFill>
+              </a:rPr>
+              <a:t>docker container start </a:t>
+            </a:r>
+            <a:r>
+              <a:rPr lang="en-US" b="1" i="1" dirty="0">
+                <a:solidFill>
+                  <a:srgbClr val="FFFF00"/>
+                </a:solidFill>
+                <a:highlight>
+                  <a:srgbClr val="800080"/>
+                </a:highlight>
+              </a:rPr>
+              <a:t>curl_pyreq1</a:t>
+            </a:r>
+          </a:p>
+          <a:p>
+            <a:pPr marL="457200" lvl="1" indent="0">
+              <a:buNone/>
+            </a:pPr>
+            <a:r>
+              <a:rPr lang="en-US" b="1" i="1" dirty="0">
+                <a:solidFill>
+                  <a:srgbClr val="FFFF00"/>
+                </a:solidFill>
+              </a:rPr>
+              <a:t>docker container attach </a:t>
+            </a:r>
+            <a:r>
+              <a:rPr lang="en-US" b="1" i="1" dirty="0">
+                <a:solidFill>
+                  <a:srgbClr val="FFFF00"/>
+                </a:solidFill>
+                <a:highlight>
+                  <a:srgbClr val="800080"/>
+                </a:highlight>
+              </a:rPr>
+              <a:t>curl_pyreq1</a:t>
+            </a:r>
           </a:p>
         </p:txBody>
       </p:sp>

</xml_diff>

<commit_message>
Refined 'cURL Command Options' slide to essential details
</commit_message>
<xml_diff>
--- a/curl-requests-foundations.pptx
+++ b/curl-requests-foundations.pptx
@@ -5,33 +5,35 @@
     <p:sldMasterId id="2147483660" r:id="rId1"/>
   </p:sldMasterIdLst>
   <p:notesMasterIdLst>
-    <p:notesMasterId r:id="rId26"/>
+    <p:notesMasterId r:id="rId28"/>
   </p:notesMasterIdLst>
   <p:sldIdLst>
     <p:sldId id="256" r:id="rId2"/>
     <p:sldId id="276" r:id="rId3"/>
     <p:sldId id="337" r:id="rId4"/>
-    <p:sldId id="277" r:id="rId5"/>
-    <p:sldId id="272" r:id="rId6"/>
-    <p:sldId id="278" r:id="rId7"/>
-    <p:sldId id="257" r:id="rId8"/>
-    <p:sldId id="327" r:id="rId9"/>
-    <p:sldId id="281" r:id="rId10"/>
-    <p:sldId id="336" r:id="rId11"/>
-    <p:sldId id="331" r:id="rId12"/>
-    <p:sldId id="270" r:id="rId13"/>
-    <p:sldId id="332" r:id="rId14"/>
-    <p:sldId id="326" r:id="rId15"/>
-    <p:sldId id="322" r:id="rId16"/>
-    <p:sldId id="329" r:id="rId17"/>
-    <p:sldId id="330" r:id="rId18"/>
-    <p:sldId id="328" r:id="rId19"/>
-    <p:sldId id="333" r:id="rId20"/>
-    <p:sldId id="334" r:id="rId21"/>
-    <p:sldId id="335" r:id="rId22"/>
-    <p:sldId id="311" r:id="rId23"/>
-    <p:sldId id="321" r:id="rId24"/>
-    <p:sldId id="280" r:id="rId25"/>
+    <p:sldId id="338" r:id="rId5"/>
+    <p:sldId id="277" r:id="rId6"/>
+    <p:sldId id="272" r:id="rId7"/>
+    <p:sldId id="278" r:id="rId8"/>
+    <p:sldId id="257" r:id="rId9"/>
+    <p:sldId id="327" r:id="rId10"/>
+    <p:sldId id="281" r:id="rId11"/>
+    <p:sldId id="339" r:id="rId12"/>
+    <p:sldId id="336" r:id="rId13"/>
+    <p:sldId id="331" r:id="rId14"/>
+    <p:sldId id="270" r:id="rId15"/>
+    <p:sldId id="332" r:id="rId16"/>
+    <p:sldId id="326" r:id="rId17"/>
+    <p:sldId id="322" r:id="rId18"/>
+    <p:sldId id="329" r:id="rId19"/>
+    <p:sldId id="330" r:id="rId20"/>
+    <p:sldId id="328" r:id="rId21"/>
+    <p:sldId id="333" r:id="rId22"/>
+    <p:sldId id="334" r:id="rId23"/>
+    <p:sldId id="335" r:id="rId24"/>
+    <p:sldId id="311" r:id="rId25"/>
+    <p:sldId id="321" r:id="rId26"/>
+    <p:sldId id="280" r:id="rId27"/>
   </p:sldIdLst>
   <p:sldSz cx="12192000" cy="6858000"/>
   <p:notesSz cx="6858000" cy="9144000"/>
@@ -687,7 +689,7 @@
           <a:p>
             <a:fld id="{020CF8D1-BA82-5045-ACF9-1AA42AD6A519}" type="slidenum">
               <a:rPr lang="en-US" smtClean="0"/>
-              <a:t>11</a:t>
+              <a:t>13</a:t>
             </a:fld>
             <a:endParaRPr lang="en-US"/>
           </a:p>
@@ -791,7 +793,7 @@
           <a:p>
             <a:fld id="{020CF8D1-BA82-5045-ACF9-1AA42AD6A519}" type="slidenum">
               <a:rPr lang="en-US" smtClean="0"/>
-              <a:t>12</a:t>
+              <a:t>14</a:t>
             </a:fld>
             <a:endParaRPr lang="en-US"/>
           </a:p>
@@ -895,7 +897,7 @@
           <a:p>
             <a:fld id="{020CF8D1-BA82-5045-ACF9-1AA42AD6A519}" type="slidenum">
               <a:rPr lang="en-US" smtClean="0"/>
-              <a:t>15</a:t>
+              <a:t>17</a:t>
             </a:fld>
             <a:endParaRPr lang="en-US"/>
           </a:p>
@@ -999,7 +1001,7 @@
           <a:p>
             <a:fld id="{020CF8D1-BA82-5045-ACF9-1AA42AD6A519}" type="slidenum">
               <a:rPr lang="en-US" smtClean="0"/>
-              <a:t>17</a:t>
+              <a:t>19</a:t>
             </a:fld>
             <a:endParaRPr lang="en-US"/>
           </a:p>
@@ -1103,7 +1105,7 @@
           <a:p>
             <a:fld id="{020CF8D1-BA82-5045-ACF9-1AA42AD6A519}" type="slidenum">
               <a:rPr lang="en-US" smtClean="0"/>
-              <a:t>19</a:t>
+              <a:t>21</a:t>
             </a:fld>
             <a:endParaRPr lang="en-US"/>
           </a:p>
@@ -1207,7 +1209,7 @@
           <a:p>
             <a:fld id="{020CF8D1-BA82-5045-ACF9-1AA42AD6A519}" type="slidenum">
               <a:rPr lang="en-US" smtClean="0"/>
-              <a:t>21</a:t>
+              <a:t>23</a:t>
             </a:fld>
             <a:endParaRPr lang="en-US"/>
           </a:p>
@@ -1660,7 +1662,7 @@
           <a:p>
             <a:fld id="{020CF8D1-BA82-5045-ACF9-1AA42AD6A519}" type="slidenum">
               <a:rPr lang="en-US" smtClean="0"/>
-              <a:t>4</a:t>
+              <a:t>5</a:t>
             </a:fld>
             <a:endParaRPr lang="en-US"/>
           </a:p>
@@ -2059,7 +2061,7 @@
           <a:p>
             <a:fld id="{020CF8D1-BA82-5045-ACF9-1AA42AD6A519}" type="slidenum">
               <a:rPr lang="en-US" smtClean="0"/>
-              <a:t>5</a:t>
+              <a:t>6</a:t>
             </a:fld>
             <a:endParaRPr lang="en-US"/>
           </a:p>
@@ -2163,7 +2165,7 @@
           <a:p>
             <a:fld id="{020CF8D1-BA82-5045-ACF9-1AA42AD6A519}" type="slidenum">
               <a:rPr lang="en-US" smtClean="0"/>
-              <a:t>6</a:t>
+              <a:t>7</a:t>
             </a:fld>
             <a:endParaRPr lang="en-US"/>
           </a:p>
@@ -2267,7 +2269,7 @@
           <a:p>
             <a:fld id="{020CF8D1-BA82-5045-ACF9-1AA42AD6A519}" type="slidenum">
               <a:rPr lang="en-US" smtClean="0"/>
-              <a:t>7</a:t>
+              <a:t>8</a:t>
             </a:fld>
             <a:endParaRPr lang="en-US"/>
           </a:p>
@@ -2354,7 +2356,7 @@
           <a:p>
             <a:fld id="{020CF8D1-BA82-5045-ACF9-1AA42AD6A519}" type="slidenum">
               <a:rPr lang="en-US" smtClean="0"/>
-              <a:t>9</a:t>
+              <a:t>10</a:t>
             </a:fld>
             <a:endParaRPr lang="en-US"/>
           </a:p>
@@ -2442,7 +2444,7 @@
           <a:p>
             <a:fld id="{020CF8D1-BA82-5045-ACF9-1AA42AD6A519}" type="slidenum">
               <a:rPr lang="en-US" smtClean="0"/>
-              <a:t>10</a:t>
+              <a:t>12</a:t>
             </a:fld>
             <a:endParaRPr lang="en-US"/>
           </a:p>
@@ -6076,6 +6078,706 @@
       </p:grpSpPr>
       <p:sp>
         <p:nvSpPr>
+          <p:cNvPr id="2" name="Title 1">
+            <a:extLst>
+              <a:ext uri="{FF2B5EF4-FFF2-40B4-BE49-F238E27FC236}">
+                <a16:creationId xmlns:a16="http://schemas.microsoft.com/office/drawing/2014/main" id="{178FC9BC-162C-754A-A134-D392F08CDBEE}"/>
+              </a:ext>
+            </a:extLst>
+          </p:cNvPr>
+          <p:cNvSpPr>
+            <a:spLocks noGrp="1"/>
+          </p:cNvSpPr>
+          <p:nvPr>
+            <p:ph type="title"/>
+          </p:nvPr>
+        </p:nvSpPr>
+        <p:spPr/>
+        <p:txBody>
+          <a:bodyPr/>
+          <a:lstStyle/>
+          <a:p>
+            <a:r>
+              <a:rPr lang="en-US" dirty="0" err="1"/>
+              <a:t>cURL</a:t>
+            </a:r>
+            <a:r>
+              <a:rPr lang="en-US" dirty="0"/>
+              <a:t> Syntax Format</a:t>
+            </a:r>
+          </a:p>
+        </p:txBody>
+      </p:sp>
+      <p:sp>
+        <p:nvSpPr>
+          <p:cNvPr id="3" name="Content Placeholder 2">
+            <a:extLst>
+              <a:ext uri="{FF2B5EF4-FFF2-40B4-BE49-F238E27FC236}">
+                <a16:creationId xmlns:a16="http://schemas.microsoft.com/office/drawing/2014/main" id="{0ECC7DC7-0671-F543-9991-CF8210E2567B}"/>
+              </a:ext>
+            </a:extLst>
+          </p:cNvPr>
+          <p:cNvSpPr>
+            <a:spLocks noGrp="1"/>
+          </p:cNvSpPr>
+          <p:nvPr>
+            <p:ph idx="1"/>
+          </p:nvPr>
+        </p:nvSpPr>
+        <p:spPr/>
+        <p:txBody>
+          <a:bodyPr/>
+          <a:lstStyle/>
+          <a:p>
+            <a:r>
+              <a:rPr lang="en-US" dirty="0"/>
+              <a:t>Format</a:t>
+            </a:r>
+          </a:p>
+          <a:p>
+            <a:pPr marL="457200" lvl="1" indent="0">
+              <a:buNone/>
+            </a:pPr>
+            <a:r>
+              <a:rPr lang="en-US" sz="2800" b="1" i="1" dirty="0">
+                <a:solidFill>
+                  <a:srgbClr val="FFFF00"/>
+                </a:solidFill>
+              </a:rPr>
+              <a:t>curl [OPTIONS] </a:t>
+            </a:r>
+            <a:r>
+              <a:rPr lang="en-US" sz="2800" b="1" i="1" dirty="0" err="1">
+                <a:solidFill>
+                  <a:srgbClr val="FFFF00"/>
+                </a:solidFill>
+              </a:rPr>
+              <a:t>url</a:t>
+            </a:r>
+            <a:endParaRPr lang="en-US" sz="2800" dirty="0"/>
+          </a:p>
+          <a:p>
+            <a:r>
+              <a:rPr lang="en-US" dirty="0"/>
+              <a:t>Open your preferred terminal (bash, PowerShell, </a:t>
+            </a:r>
+            <a:r>
+              <a:rPr lang="en-US" dirty="0" err="1"/>
+              <a:t>zsh</a:t>
+            </a:r>
+            <a:r>
+              <a:rPr lang="en-US" dirty="0"/>
+              <a:t>, etc.)</a:t>
+            </a:r>
+          </a:p>
+          <a:p>
+            <a:r>
+              <a:rPr lang="en-US" dirty="0"/>
+              <a:t>Enter the commands:</a:t>
+            </a:r>
+          </a:p>
+          <a:p>
+            <a:pPr marL="457200" lvl="1" indent="0">
+              <a:buNone/>
+            </a:pPr>
+            <a:r>
+              <a:rPr lang="en-US" sz="2800" b="1" i="1" dirty="0">
+                <a:solidFill>
+                  <a:srgbClr val="FFFF00"/>
+                </a:solidFill>
+              </a:rPr>
+              <a:t>curl --version </a:t>
+            </a:r>
+            <a:r>
+              <a:rPr lang="en-US" sz="2800" b="1" dirty="0"/>
+              <a:t>or </a:t>
+            </a:r>
+            <a:r>
+              <a:rPr lang="en-US" sz="2800" b="1" i="1" dirty="0">
+                <a:solidFill>
+                  <a:srgbClr val="FFFF00"/>
+                </a:solidFill>
+              </a:rPr>
+              <a:t>curl -V</a:t>
+            </a:r>
+          </a:p>
+          <a:p>
+            <a:pPr marL="457200" lvl="1" indent="0">
+              <a:buNone/>
+            </a:pPr>
+            <a:r>
+              <a:rPr lang="en-US" sz="2800" b="1" i="1" dirty="0">
+                <a:solidFill>
+                  <a:srgbClr val="FFFF00"/>
+                </a:solidFill>
+              </a:rPr>
+              <a:t>curl https://</a:t>
+            </a:r>
+            <a:r>
+              <a:rPr lang="en-US" sz="2800" b="1" i="1" dirty="0" err="1">
+                <a:solidFill>
+                  <a:srgbClr val="FFFF00"/>
+                </a:solidFill>
+              </a:rPr>
+              <a:t>www.whatsmyua.info</a:t>
+            </a:r>
+            <a:endParaRPr lang="en-US" sz="2800" b="1" i="1" dirty="0">
+              <a:solidFill>
+                <a:srgbClr val="FFFF00"/>
+              </a:solidFill>
+            </a:endParaRPr>
+          </a:p>
+        </p:txBody>
+      </p:sp>
+      <p:sp>
+        <p:nvSpPr>
+          <p:cNvPr id="4" name="Date Placeholder 3">
+            <a:extLst>
+              <a:ext uri="{FF2B5EF4-FFF2-40B4-BE49-F238E27FC236}">
+                <a16:creationId xmlns:a16="http://schemas.microsoft.com/office/drawing/2014/main" id="{38C6DDB4-CE9E-4843-86A9-EFC27330D02F}"/>
+              </a:ext>
+            </a:extLst>
+          </p:cNvPr>
+          <p:cNvSpPr>
+            <a:spLocks noGrp="1"/>
+          </p:cNvSpPr>
+          <p:nvPr>
+            <p:ph type="dt" sz="half" idx="10"/>
+          </p:nvPr>
+        </p:nvSpPr>
+        <p:spPr/>
+        <p:txBody>
+          <a:bodyPr/>
+          <a:lstStyle/>
+          <a:p>
+            <a:r>
+              <a:rPr lang="en-US"/>
+              <a:t>World Wide Technology ©</a:t>
+            </a:r>
+            <a:endParaRPr lang="en-US" dirty="0"/>
+          </a:p>
+        </p:txBody>
+      </p:sp>
+      <p:sp>
+        <p:nvSpPr>
+          <p:cNvPr id="5" name="Slide Number Placeholder 4">
+            <a:extLst>
+              <a:ext uri="{FF2B5EF4-FFF2-40B4-BE49-F238E27FC236}">
+                <a16:creationId xmlns:a16="http://schemas.microsoft.com/office/drawing/2014/main" id="{09AD6D8E-DFAE-8E42-9152-B189D9284AD9}"/>
+              </a:ext>
+            </a:extLst>
+          </p:cNvPr>
+          <p:cNvSpPr>
+            <a:spLocks noGrp="1"/>
+          </p:cNvSpPr>
+          <p:nvPr>
+            <p:ph type="sldNum" sz="quarter" idx="12"/>
+          </p:nvPr>
+        </p:nvSpPr>
+        <p:spPr/>
+        <p:txBody>
+          <a:bodyPr/>
+          <a:lstStyle/>
+          <a:p>
+            <a:fld id="{A44B02FA-DD2D-1844-AE35-8B2EAB0CF4EF}" type="slidenum">
+              <a:rPr lang="en-US" smtClean="0"/>
+              <a:pPr/>
+              <a:t>10</a:t>
+            </a:fld>
+            <a:endParaRPr lang="en-US" dirty="0"/>
+          </a:p>
+        </p:txBody>
+      </p:sp>
+    </p:spTree>
+    <p:extLst>
+      <p:ext uri="{BB962C8B-B14F-4D97-AF65-F5344CB8AC3E}">
+        <p14:creationId xmlns:p14="http://schemas.microsoft.com/office/powerpoint/2010/main" val="593970204"/>
+      </p:ext>
+    </p:extLst>
+  </p:cSld>
+  <p:clrMapOvr>
+    <a:masterClrMapping/>
+  </p:clrMapOvr>
+  <mc:AlternateContent xmlns:mc="http://schemas.openxmlformats.org/markup-compatibility/2006" xmlns:p14="http://schemas.microsoft.com/office/powerpoint/2010/main">
+    <mc:Choice Requires="p14">
+      <p:transition spd="med" p14:dur="700">
+        <p:fade/>
+      </p:transition>
+    </mc:Choice>
+    <mc:Fallback xmlns="">
+      <p:transition spd="med">
+        <p:fade/>
+      </p:transition>
+    </mc:Fallback>
+  </mc:AlternateContent>
+  <p:timing>
+    <p:tnLst>
+      <p:par>
+        <p:cTn id="1" dur="indefinite" restart="never" nodeType="tmRoot">
+          <p:childTnLst>
+            <p:seq concurrent="1" nextAc="seek">
+              <p:cTn id="2" dur="indefinite" nodeType="mainSeq">
+                <p:childTnLst>
+                  <p:par>
+                    <p:cTn id="3" fill="hold">
+                      <p:stCondLst>
+                        <p:cond delay="indefinite"/>
+                      </p:stCondLst>
+                      <p:childTnLst>
+                        <p:par>
+                          <p:cTn id="4" fill="hold">
+                            <p:stCondLst>
+                              <p:cond delay="0"/>
+                            </p:stCondLst>
+                            <p:childTnLst>
+                              <p:par>
+                                <p:cTn id="5" presetID="9" presetClass="entr" presetSubtype="0" fill="hold" grpId="0" nodeType="clickEffect">
+                                  <p:stCondLst>
+                                    <p:cond delay="0"/>
+                                  </p:stCondLst>
+                                  <p:childTnLst>
+                                    <p:set>
+                                      <p:cBhvr>
+                                        <p:cTn id="6" dur="1" fill="hold">
+                                          <p:stCondLst>
+                                            <p:cond delay="0"/>
+                                          </p:stCondLst>
+                                        </p:cTn>
+                                        <p:tgtEl>
+                                          <p:spTgt spid="3">
+                                            <p:txEl>
+                                              <p:pRg st="0" end="0"/>
+                                            </p:txEl>
+                                          </p:spTgt>
+                                        </p:tgtEl>
+                                        <p:attrNameLst>
+                                          <p:attrName>style.visibility</p:attrName>
+                                        </p:attrNameLst>
+                                      </p:cBhvr>
+                                      <p:to>
+                                        <p:strVal val="visible"/>
+                                      </p:to>
+                                    </p:set>
+                                    <p:animEffect transition="in" filter="dissolve">
+                                      <p:cBhvr>
+                                        <p:cTn id="7" dur="500"/>
+                                        <p:tgtEl>
+                                          <p:spTgt spid="3">
+                                            <p:txEl>
+                                              <p:pRg st="0" end="0"/>
+                                            </p:txEl>
+                                          </p:spTgt>
+                                        </p:tgtEl>
+                                      </p:cBhvr>
+                                    </p:animEffect>
+                                  </p:childTnLst>
+                                </p:cTn>
+                              </p:par>
+                              <p:par>
+                                <p:cTn id="8" presetID="9" presetClass="entr" presetSubtype="0" fill="hold" grpId="0" nodeType="withEffect">
+                                  <p:stCondLst>
+                                    <p:cond delay="0"/>
+                                  </p:stCondLst>
+                                  <p:childTnLst>
+                                    <p:set>
+                                      <p:cBhvr>
+                                        <p:cTn id="9" dur="1" fill="hold">
+                                          <p:stCondLst>
+                                            <p:cond delay="0"/>
+                                          </p:stCondLst>
+                                        </p:cTn>
+                                        <p:tgtEl>
+                                          <p:spTgt spid="3">
+                                            <p:txEl>
+                                              <p:pRg st="1" end="1"/>
+                                            </p:txEl>
+                                          </p:spTgt>
+                                        </p:tgtEl>
+                                        <p:attrNameLst>
+                                          <p:attrName>style.visibility</p:attrName>
+                                        </p:attrNameLst>
+                                      </p:cBhvr>
+                                      <p:to>
+                                        <p:strVal val="visible"/>
+                                      </p:to>
+                                    </p:set>
+                                    <p:animEffect transition="in" filter="dissolve">
+                                      <p:cBhvr>
+                                        <p:cTn id="10" dur="500"/>
+                                        <p:tgtEl>
+                                          <p:spTgt spid="3">
+                                            <p:txEl>
+                                              <p:pRg st="1" end="1"/>
+                                            </p:txEl>
+                                          </p:spTgt>
+                                        </p:tgtEl>
+                                      </p:cBhvr>
+                                    </p:animEffect>
+                                  </p:childTnLst>
+                                </p:cTn>
+                              </p:par>
+                            </p:childTnLst>
+                          </p:cTn>
+                        </p:par>
+                      </p:childTnLst>
+                    </p:cTn>
+                  </p:par>
+                  <p:par>
+                    <p:cTn id="11" fill="hold">
+                      <p:stCondLst>
+                        <p:cond delay="indefinite"/>
+                      </p:stCondLst>
+                      <p:childTnLst>
+                        <p:par>
+                          <p:cTn id="12" fill="hold">
+                            <p:stCondLst>
+                              <p:cond delay="0"/>
+                            </p:stCondLst>
+                            <p:childTnLst>
+                              <p:par>
+                                <p:cTn id="13" presetID="9" presetClass="entr" presetSubtype="0" fill="hold" grpId="0" nodeType="clickEffect">
+                                  <p:stCondLst>
+                                    <p:cond delay="0"/>
+                                  </p:stCondLst>
+                                  <p:childTnLst>
+                                    <p:set>
+                                      <p:cBhvr>
+                                        <p:cTn id="14" dur="1" fill="hold">
+                                          <p:stCondLst>
+                                            <p:cond delay="0"/>
+                                          </p:stCondLst>
+                                        </p:cTn>
+                                        <p:tgtEl>
+                                          <p:spTgt spid="3">
+                                            <p:txEl>
+                                              <p:pRg st="2" end="2"/>
+                                            </p:txEl>
+                                          </p:spTgt>
+                                        </p:tgtEl>
+                                        <p:attrNameLst>
+                                          <p:attrName>style.visibility</p:attrName>
+                                        </p:attrNameLst>
+                                      </p:cBhvr>
+                                      <p:to>
+                                        <p:strVal val="visible"/>
+                                      </p:to>
+                                    </p:set>
+                                    <p:animEffect transition="in" filter="dissolve">
+                                      <p:cBhvr>
+                                        <p:cTn id="15" dur="500"/>
+                                        <p:tgtEl>
+                                          <p:spTgt spid="3">
+                                            <p:txEl>
+                                              <p:pRg st="2" end="2"/>
+                                            </p:txEl>
+                                          </p:spTgt>
+                                        </p:tgtEl>
+                                      </p:cBhvr>
+                                    </p:animEffect>
+                                  </p:childTnLst>
+                                </p:cTn>
+                              </p:par>
+                            </p:childTnLst>
+                          </p:cTn>
+                        </p:par>
+                      </p:childTnLst>
+                    </p:cTn>
+                  </p:par>
+                  <p:par>
+                    <p:cTn id="16" fill="hold">
+                      <p:stCondLst>
+                        <p:cond delay="indefinite"/>
+                      </p:stCondLst>
+                      <p:childTnLst>
+                        <p:par>
+                          <p:cTn id="17" fill="hold">
+                            <p:stCondLst>
+                              <p:cond delay="0"/>
+                            </p:stCondLst>
+                            <p:childTnLst>
+                              <p:par>
+                                <p:cTn id="18" presetID="9" presetClass="entr" presetSubtype="0" fill="hold" grpId="0" nodeType="clickEffect">
+                                  <p:stCondLst>
+                                    <p:cond delay="0"/>
+                                  </p:stCondLst>
+                                  <p:childTnLst>
+                                    <p:set>
+                                      <p:cBhvr>
+                                        <p:cTn id="19" dur="1" fill="hold">
+                                          <p:stCondLst>
+                                            <p:cond delay="0"/>
+                                          </p:stCondLst>
+                                        </p:cTn>
+                                        <p:tgtEl>
+                                          <p:spTgt spid="3">
+                                            <p:txEl>
+                                              <p:pRg st="3" end="3"/>
+                                            </p:txEl>
+                                          </p:spTgt>
+                                        </p:tgtEl>
+                                        <p:attrNameLst>
+                                          <p:attrName>style.visibility</p:attrName>
+                                        </p:attrNameLst>
+                                      </p:cBhvr>
+                                      <p:to>
+                                        <p:strVal val="visible"/>
+                                      </p:to>
+                                    </p:set>
+                                    <p:animEffect transition="in" filter="dissolve">
+                                      <p:cBhvr>
+                                        <p:cTn id="20" dur="500"/>
+                                        <p:tgtEl>
+                                          <p:spTgt spid="3">
+                                            <p:txEl>
+                                              <p:pRg st="3" end="3"/>
+                                            </p:txEl>
+                                          </p:spTgt>
+                                        </p:tgtEl>
+                                      </p:cBhvr>
+                                    </p:animEffect>
+                                  </p:childTnLst>
+                                </p:cTn>
+                              </p:par>
+                              <p:par>
+                                <p:cTn id="21" presetID="9" presetClass="entr" presetSubtype="0" fill="hold" grpId="0" nodeType="withEffect">
+                                  <p:stCondLst>
+                                    <p:cond delay="0"/>
+                                  </p:stCondLst>
+                                  <p:childTnLst>
+                                    <p:set>
+                                      <p:cBhvr>
+                                        <p:cTn id="22" dur="1" fill="hold">
+                                          <p:stCondLst>
+                                            <p:cond delay="0"/>
+                                          </p:stCondLst>
+                                        </p:cTn>
+                                        <p:tgtEl>
+                                          <p:spTgt spid="3">
+                                            <p:txEl>
+                                              <p:pRg st="4" end="4"/>
+                                            </p:txEl>
+                                          </p:spTgt>
+                                        </p:tgtEl>
+                                        <p:attrNameLst>
+                                          <p:attrName>style.visibility</p:attrName>
+                                        </p:attrNameLst>
+                                      </p:cBhvr>
+                                      <p:to>
+                                        <p:strVal val="visible"/>
+                                      </p:to>
+                                    </p:set>
+                                    <p:animEffect transition="in" filter="dissolve">
+                                      <p:cBhvr>
+                                        <p:cTn id="23" dur="500"/>
+                                        <p:tgtEl>
+                                          <p:spTgt spid="3">
+                                            <p:txEl>
+                                              <p:pRg st="4" end="4"/>
+                                            </p:txEl>
+                                          </p:spTgt>
+                                        </p:tgtEl>
+                                      </p:cBhvr>
+                                    </p:animEffect>
+                                  </p:childTnLst>
+                                </p:cTn>
+                              </p:par>
+                              <p:par>
+                                <p:cTn id="24" presetID="9" presetClass="entr" presetSubtype="0" fill="hold" grpId="0" nodeType="withEffect">
+                                  <p:stCondLst>
+                                    <p:cond delay="0"/>
+                                  </p:stCondLst>
+                                  <p:childTnLst>
+                                    <p:set>
+                                      <p:cBhvr>
+                                        <p:cTn id="25" dur="1" fill="hold">
+                                          <p:stCondLst>
+                                            <p:cond delay="0"/>
+                                          </p:stCondLst>
+                                        </p:cTn>
+                                        <p:tgtEl>
+                                          <p:spTgt spid="3">
+                                            <p:txEl>
+                                              <p:pRg st="5" end="5"/>
+                                            </p:txEl>
+                                          </p:spTgt>
+                                        </p:tgtEl>
+                                        <p:attrNameLst>
+                                          <p:attrName>style.visibility</p:attrName>
+                                        </p:attrNameLst>
+                                      </p:cBhvr>
+                                      <p:to>
+                                        <p:strVal val="visible"/>
+                                      </p:to>
+                                    </p:set>
+                                    <p:animEffect transition="in" filter="dissolve">
+                                      <p:cBhvr>
+                                        <p:cTn id="26" dur="500"/>
+                                        <p:tgtEl>
+                                          <p:spTgt spid="3">
+                                            <p:txEl>
+                                              <p:pRg st="5" end="5"/>
+                                            </p:txEl>
+                                          </p:spTgt>
+                                        </p:tgtEl>
+                                      </p:cBhvr>
+                                    </p:animEffect>
+                                  </p:childTnLst>
+                                </p:cTn>
+                              </p:par>
+                            </p:childTnLst>
+                          </p:cTn>
+                        </p:par>
+                      </p:childTnLst>
+                    </p:cTn>
+                  </p:par>
+                </p:childTnLst>
+              </p:cTn>
+              <p:prevCondLst>
+                <p:cond evt="onPrev" delay="0">
+                  <p:tgtEl>
+                    <p:sldTgt/>
+                  </p:tgtEl>
+                </p:cond>
+              </p:prevCondLst>
+              <p:nextCondLst>
+                <p:cond evt="onNext" delay="0">
+                  <p:tgtEl>
+                    <p:sldTgt/>
+                  </p:tgtEl>
+                </p:cond>
+              </p:nextCondLst>
+            </p:seq>
+          </p:childTnLst>
+        </p:cTn>
+      </p:par>
+    </p:tnLst>
+    <p:bldLst>
+      <p:bldP spid="3" grpId="0" build="p"/>
+    </p:bldLst>
+  </p:timing>
+</p:sld>
+</file>
+
+<file path=ppt/slides/slide11.xml><?xml version="1.0" encoding="utf-8"?>
+<p:sld xmlns:a="http://schemas.openxmlformats.org/drawingml/2006/main" xmlns:r="http://schemas.openxmlformats.org/officeDocument/2006/relationships" xmlns:p="http://schemas.openxmlformats.org/presentationml/2006/main">
+  <p:cSld>
+    <p:spTree>
+      <p:nvGrpSpPr>
+        <p:cNvPr id="1" name=""/>
+        <p:cNvGrpSpPr/>
+        <p:nvPr/>
+      </p:nvGrpSpPr>
+      <p:grpSpPr>
+        <a:xfrm>
+          <a:off x="0" y="0"/>
+          <a:ext cx="0" cy="0"/>
+          <a:chOff x="0" y="0"/>
+          <a:chExt cx="0" cy="0"/>
+        </a:xfrm>
+      </p:grpSpPr>
+      <p:sp>
+        <p:nvSpPr>
+          <p:cNvPr id="4" name="Date Placeholder 3">
+            <a:extLst>
+              <a:ext uri="{FF2B5EF4-FFF2-40B4-BE49-F238E27FC236}">
+                <a16:creationId xmlns:a16="http://schemas.microsoft.com/office/drawing/2014/main" id="{0CD670A9-B06A-3448-BABA-FAD627500859}"/>
+              </a:ext>
+            </a:extLst>
+          </p:cNvPr>
+          <p:cNvSpPr>
+            <a:spLocks noGrp="1"/>
+          </p:cNvSpPr>
+          <p:nvPr>
+            <p:ph type="dt" sz="half" idx="10"/>
+          </p:nvPr>
+        </p:nvSpPr>
+        <p:spPr/>
+        <p:txBody>
+          <a:bodyPr/>
+          <a:lstStyle/>
+          <a:p>
+            <a:r>
+              <a:rPr lang="en-US"/>
+              <a:t>World Wide Technology ©</a:t>
+            </a:r>
+            <a:endParaRPr lang="en-US" dirty="0"/>
+          </a:p>
+        </p:txBody>
+      </p:sp>
+      <p:sp>
+        <p:nvSpPr>
+          <p:cNvPr id="5" name="Slide Number Placeholder 4">
+            <a:extLst>
+              <a:ext uri="{FF2B5EF4-FFF2-40B4-BE49-F238E27FC236}">
+                <a16:creationId xmlns:a16="http://schemas.microsoft.com/office/drawing/2014/main" id="{119DACAD-17C1-C249-A498-C4A1A1ADD334}"/>
+              </a:ext>
+            </a:extLst>
+          </p:cNvPr>
+          <p:cNvSpPr>
+            <a:spLocks noGrp="1"/>
+          </p:cNvSpPr>
+          <p:nvPr>
+            <p:ph type="sldNum" sz="quarter" idx="12"/>
+          </p:nvPr>
+        </p:nvSpPr>
+        <p:spPr/>
+        <p:txBody>
+          <a:bodyPr/>
+          <a:lstStyle/>
+          <a:p>
+            <a:fld id="{A44B02FA-DD2D-1844-AE35-8B2EAB0CF4EF}" type="slidenum">
+              <a:rPr lang="en-US" smtClean="0"/>
+              <a:pPr/>
+              <a:t>11</a:t>
+            </a:fld>
+            <a:endParaRPr lang="en-US" dirty="0"/>
+          </a:p>
+        </p:txBody>
+      </p:sp>
+    </p:spTree>
+    <p:extLst>
+      <p:ext uri="{BB962C8B-B14F-4D97-AF65-F5344CB8AC3E}">
+        <p14:creationId xmlns:p14="http://schemas.microsoft.com/office/powerpoint/2010/main" val="1942152772"/>
+      </p:ext>
+    </p:extLst>
+  </p:cSld>
+  <p:clrMapOvr>
+    <a:masterClrMapping/>
+  </p:clrMapOvr>
+  <mc:AlternateContent xmlns:mc="http://schemas.openxmlformats.org/markup-compatibility/2006" xmlns:p14="http://schemas.microsoft.com/office/powerpoint/2010/main">
+    <mc:Choice Requires="p14">
+      <p:transition spd="med" p14:dur="700">
+        <p:fade/>
+      </p:transition>
+    </mc:Choice>
+    <mc:Fallback xmlns="">
+      <p:transition spd="med">
+        <p:fade/>
+      </p:transition>
+    </mc:Fallback>
+  </mc:AlternateContent>
+</p:sld>
+</file>
+
+<file path=ppt/slides/slide12.xml><?xml version="1.0" encoding="utf-8"?>
+<p:sld xmlns:a="http://schemas.openxmlformats.org/drawingml/2006/main" xmlns:r="http://schemas.openxmlformats.org/officeDocument/2006/relationships" xmlns:p="http://schemas.openxmlformats.org/presentationml/2006/main">
+  <p:cSld>
+    <p:spTree>
+      <p:nvGrpSpPr>
+        <p:cNvPr id="1" name=""/>
+        <p:cNvGrpSpPr/>
+        <p:nvPr/>
+      </p:nvGrpSpPr>
+      <p:grpSpPr>
+        <a:xfrm>
+          <a:off x="0" y="0"/>
+          <a:ext cx="0" cy="0"/>
+          <a:chOff x="0" y="0"/>
+          <a:chExt cx="0" cy="0"/>
+        </a:xfrm>
+      </p:grpSpPr>
+      <p:sp>
+        <p:nvSpPr>
           <p:cNvPr id="3" name="Content Placeholder 2">
             <a:extLst>
               <a:ext uri="{FF2B5EF4-FFF2-40B4-BE49-F238E27FC236}">
@@ -6093,7 +6795,7 @@
         <p:spPr/>
         <p:txBody>
           <a:bodyPr>
-            <a:normAutofit fontScale="77500" lnSpcReduction="20000"/>
+            <a:normAutofit fontScale="92500" lnSpcReduction="10000"/>
           </a:bodyPr>
           <a:lstStyle/>
           <a:p>
@@ -6107,30 +6809,8 @@
             </a:r>
             <a:r>
               <a:rPr lang="en-US" dirty="0"/>
-              <a:t> command flags are common</a:t>
-            </a:r>
-          </a:p>
-          <a:p>
-            <a:pPr marL="457200" lvl="1" indent="0">
-              <a:buNone/>
-            </a:pPr>
-            <a:r>
-              <a:rPr lang="en-US" sz="2800" b="1" i="1" dirty="0">
-                <a:solidFill>
-                  <a:srgbClr val="FFFF00"/>
-                </a:solidFill>
-              </a:rPr>
-              <a:t>curl [FLAGS] </a:t>
-            </a:r>
-            <a:r>
-              <a:rPr lang="en-US" sz="2800" b="1" i="1" dirty="0" err="1">
-                <a:solidFill>
-                  <a:srgbClr val="FFFF00"/>
-                </a:solidFill>
-              </a:rPr>
-              <a:t>url</a:t>
-            </a:r>
-            <a:endParaRPr lang="en-US" sz="2800" dirty="0"/>
+              <a:t> command options are common</a:t>
+            </a:r>
           </a:p>
           <a:p>
             <a:pPr lvl="1"/>
@@ -6144,7 +6824,27 @@
             </a:r>
             <a:r>
               <a:rPr lang="en-US" dirty="0"/>
-              <a:t>– HTTP method (GET, POST, PUT, DELETE) – default is GET</a:t>
+              <a:t>or</a:t>
+            </a:r>
+            <a:r>
+              <a:rPr lang="en-US" dirty="0">
+                <a:solidFill>
+                  <a:srgbClr val="FFFF00"/>
+                </a:solidFill>
+              </a:rPr>
+              <a:t> --request </a:t>
+            </a:r>
+            <a:r>
+              <a:rPr lang="en-US" dirty="0"/>
+              <a:t>– HTTP method (GET </a:t>
+            </a:r>
+            <a:r>
+              <a:rPr lang="en-US"/>
+              <a:t>(default), </a:t>
+            </a:r>
+            <a:r>
+              <a:rPr lang="en-US" dirty="0"/>
+              <a:t>POST, PUT, DELETE)</a:t>
             </a:r>
           </a:p>
           <a:p>
@@ -6174,6 +6874,38 @@
               <a:t> </a:t>
             </a:r>
             <a:r>
+              <a:rPr lang="en-US" i="1" dirty="0">
+                <a:solidFill>
+                  <a:srgbClr val="FFFF00"/>
+                </a:solidFill>
+              </a:rPr>
+              <a:t>&lt;</a:t>
+            </a:r>
+            <a:r>
+              <a:rPr lang="en-US" i="1" dirty="0" err="1">
+                <a:solidFill>
+                  <a:srgbClr val="FFFF00"/>
+                </a:solidFill>
+              </a:rPr>
+              <a:t>url</a:t>
+            </a:r>
+            <a:r>
+              <a:rPr lang="en-US" i="1" dirty="0">
+                <a:solidFill>
+                  <a:srgbClr val="FFFF00"/>
+                </a:solidFill>
+              </a:rPr>
+              <a:t>&gt;</a:t>
+            </a:r>
+            <a:r>
+              <a:rPr lang="en-US" dirty="0">
+                <a:solidFill>
+                  <a:srgbClr val="FFFF00"/>
+                </a:solidFill>
+              </a:rPr>
+              <a:t> </a:t>
+            </a:r>
+            <a:r>
               <a:rPr lang="en-US" dirty="0"/>
               <a:t>– Request URL</a:t>
             </a:r>
@@ -6190,7 +6922,19 @@
             </a:r>
             <a:r>
               <a:rPr lang="en-US" dirty="0"/>
-              <a:t>– HTTP client header to send(key/value pairs, one per -H (multiple -H allowed)</a:t>
+              <a:t>or</a:t>
+            </a:r>
+            <a:r>
+              <a:rPr lang="en-US" dirty="0">
+                <a:solidFill>
+                  <a:srgbClr val="FFFF00"/>
+                </a:solidFill>
+              </a:rPr>
+              <a:t> --header</a:t>
+            </a:r>
+            <a:r>
+              <a:rPr lang="en-US" dirty="0"/>
+              <a:t>– HTTP client header(s)</a:t>
             </a:r>
           </a:p>
           <a:p>
@@ -6217,35 +6961,36 @@
             </a:r>
             <a:r>
               <a:rPr lang="en-US" dirty="0"/>
-              <a:t>– HTTP PUT/POST (multiple -d/--data flags allowed)</a:t>
-            </a:r>
-          </a:p>
-          <a:p>
-            <a:pPr lvl="2"/>
-            <a:r>
-              <a:rPr lang="en-US" dirty="0"/>
-              <a:t>{"key1":"value1","key2":"value2"}</a:t>
-            </a:r>
-          </a:p>
-          <a:p>
-            <a:pPr lvl="2"/>
-            <a:r>
-              <a:rPr lang="en-US" dirty="0"/>
-              <a:t>content-type application/x-www-form-</a:t>
-            </a:r>
-            <a:r>
-              <a:rPr lang="en-US" dirty="0" err="1"/>
-              <a:t>urlencoded</a:t>
-            </a:r>
-            <a:r>
-              <a:rPr lang="en-US" dirty="0"/>
-              <a:t> or use --</a:t>
-            </a:r>
-            <a:r>
-              <a:rPr lang="en-US" dirty="0" err="1"/>
-              <a:t>dataraw</a:t>
-            </a:r>
-            <a:endParaRPr lang="en-US" dirty="0"/>
+              <a:t>or</a:t>
+            </a:r>
+            <a:r>
+              <a:rPr lang="en-US" dirty="0">
+                <a:solidFill>
+                  <a:srgbClr val="FFFF00"/>
+                </a:solidFill>
+              </a:rPr>
+              <a:t> --data-</a:t>
+            </a:r>
+            <a:r>
+              <a:rPr lang="en-US" dirty="0" err="1">
+                <a:solidFill>
+                  <a:srgbClr val="FFFF00"/>
+                </a:solidFill>
+              </a:rPr>
+              <a:t>urlencode</a:t>
+            </a:r>
+            <a:r>
+              <a:rPr lang="en-US" dirty="0">
+                <a:solidFill>
+                  <a:srgbClr val="FFFF00"/>
+                </a:solidFill>
+              </a:rPr>
+              <a:t> </a:t>
+            </a:r>
+            <a:r>
+              <a:rPr lang="en-US" dirty="0"/>
+              <a:t>– HTTP PUT/POST data</a:t>
+            </a:r>
           </a:p>
           <a:p>
             <a:pPr lvl="1"/>
@@ -6275,7 +7020,46 @@
             </a:r>
             <a:r>
               <a:rPr lang="en-US" dirty="0"/>
-              <a:t>– include server response headers in STDOUT</a:t>
+              <a:t>or</a:t>
+            </a:r>
+            <a:r>
+              <a:rPr lang="en-US" dirty="0">
+                <a:solidFill>
+                  <a:srgbClr val="FFFF00"/>
+                </a:solidFill>
+              </a:rPr>
+              <a:t> --include </a:t>
+            </a:r>
+            <a:r>
+              <a:rPr lang="en-US" dirty="0"/>
+              <a:t>– include response headers in STDOUT</a:t>
+            </a:r>
+          </a:p>
+          <a:p>
+            <a:pPr lvl="1"/>
+            <a:r>
+              <a:rPr lang="en-US" dirty="0">
+                <a:solidFill>
+                  <a:srgbClr val="FFFF00"/>
+                </a:solidFill>
+              </a:rPr>
+              <a:t>-I </a:t>
+            </a:r>
+            <a:r>
+              <a:rPr lang="en-US" dirty="0"/>
+              <a:t>or</a:t>
+            </a:r>
+            <a:r>
+              <a:rPr lang="en-US" dirty="0">
+                <a:solidFill>
+                  <a:srgbClr val="FFFF00"/>
+                </a:solidFill>
+              </a:rPr>
+              <a:t> --head</a:t>
+            </a:r>
+            <a:r>
+              <a:rPr lang="en-US" dirty="0"/>
+              <a:t> – display ONLY response headers in STDOUT</a:t>
             </a:r>
           </a:p>
           <a:p>
@@ -6290,6 +7074,18 @@
             </a:r>
             <a:r>
               <a:rPr lang="en-US" dirty="0"/>
+              <a:t>or</a:t>
+            </a:r>
+            <a:r>
+              <a:rPr lang="en-US" dirty="0">
+                <a:solidFill>
+                  <a:srgbClr val="FFFF00"/>
+                </a:solidFill>
+              </a:rPr>
+              <a:t> --insecure </a:t>
+            </a:r>
+            <a:r>
+              <a:rPr lang="en-US" dirty="0"/>
               <a:t>– allow self-signed certificates (insecure SSL)</a:t>
             </a:r>
           </a:p>
@@ -6305,7 +7101,137 @@
             </a:r>
             <a:r>
               <a:rPr lang="en-US" dirty="0"/>
-              <a:t>– follow redirects (location)</a:t>
+              <a:t>or</a:t>
+            </a:r>
+            <a:r>
+              <a:rPr lang="en-US" dirty="0">
+                <a:solidFill>
+                  <a:srgbClr val="FFFF00"/>
+                </a:solidFill>
+              </a:rPr>
+              <a:t> --location </a:t>
+            </a:r>
+            <a:r>
+              <a:rPr lang="en-US" dirty="0"/>
+              <a:t>– follow redirects </a:t>
+            </a:r>
+          </a:p>
+          <a:p>
+            <a:pPr lvl="1"/>
+            <a:r>
+              <a:rPr lang="en-US" dirty="0">
+                <a:solidFill>
+                  <a:srgbClr val="FFFF00"/>
+                </a:solidFill>
+              </a:rPr>
+              <a:t>-o </a:t>
+            </a:r>
+            <a:r>
+              <a:rPr lang="en-US" i="1" dirty="0">
+                <a:solidFill>
+                  <a:srgbClr val="FFFF00"/>
+                </a:solidFill>
+              </a:rPr>
+              <a:t>&lt;</a:t>
+            </a:r>
+            <a:r>
+              <a:rPr lang="en-US" i="1" dirty="0" err="1">
+                <a:solidFill>
+                  <a:srgbClr val="FFFF00"/>
+                </a:solidFill>
+              </a:rPr>
+              <a:t>file_name</a:t>
+            </a:r>
+            <a:r>
+              <a:rPr lang="en-US" i="1" dirty="0">
+                <a:solidFill>
+                  <a:srgbClr val="FFFF00"/>
+                </a:solidFill>
+              </a:rPr>
+              <a:t>&gt;</a:t>
+            </a:r>
+            <a:r>
+              <a:rPr lang="en-US" dirty="0">
+                <a:solidFill>
+                  <a:srgbClr val="FFFF00"/>
+                </a:solidFill>
+              </a:rPr>
+              <a:t> </a:t>
+            </a:r>
+            <a:r>
+              <a:rPr lang="en-US" dirty="0"/>
+              <a:t>or</a:t>
+            </a:r>
+            <a:r>
+              <a:rPr lang="en-US" dirty="0">
+                <a:solidFill>
+                  <a:srgbClr val="FFFF00"/>
+                </a:solidFill>
+              </a:rPr>
+              <a:t> --output </a:t>
+            </a:r>
+            <a:r>
+              <a:rPr lang="en-US" i="1" dirty="0">
+                <a:solidFill>
+                  <a:srgbClr val="FFFF00"/>
+                </a:solidFill>
+              </a:rPr>
+              <a:t>&lt;</a:t>
+            </a:r>
+            <a:r>
+              <a:rPr lang="en-US" i="1" dirty="0" err="1">
+                <a:solidFill>
+                  <a:srgbClr val="FFFF00"/>
+                </a:solidFill>
+              </a:rPr>
+              <a:t>file_name</a:t>
+            </a:r>
+            <a:r>
+              <a:rPr lang="en-US" i="1" dirty="0">
+                <a:solidFill>
+                  <a:srgbClr val="FFFF00"/>
+                </a:solidFill>
+              </a:rPr>
+              <a:t>&gt;</a:t>
+            </a:r>
+            <a:r>
+              <a:rPr lang="en-US" dirty="0">
+                <a:solidFill>
+                  <a:srgbClr val="FFFF00"/>
+                </a:solidFill>
+              </a:rPr>
+              <a:t> </a:t>
+            </a:r>
+            <a:r>
+              <a:rPr lang="en-US" dirty="0"/>
+              <a:t>– write response to a file instead of STDOUT</a:t>
+            </a:r>
+          </a:p>
+          <a:p>
+            <a:pPr lvl="1"/>
+            <a:r>
+              <a:rPr lang="en-US" dirty="0">
+                <a:solidFill>
+                  <a:srgbClr val="FFFF00"/>
+                </a:solidFill>
+              </a:rPr>
+              <a:t>-u </a:t>
+            </a:r>
+            <a:r>
+              <a:rPr lang="en-US" dirty="0"/>
+              <a:t>or</a:t>
+            </a:r>
+            <a:r>
+              <a:rPr lang="en-US" dirty="0">
+                <a:solidFill>
+                  <a:srgbClr val="FFFF00"/>
+                </a:solidFill>
+              </a:rPr>
+              <a:t> --user</a:t>
+            </a:r>
+            <a:r>
+              <a:rPr lang="en-US" dirty="0"/>
+              <a:t> – HTTP Basic Authentication credentials in a key/value pair</a:t>
             </a:r>
           </a:p>
           <a:p>
@@ -6320,114 +7246,20 @@
             </a:r>
             <a:r>
               <a:rPr lang="en-US" dirty="0"/>
-              <a:t>– display detailed request and response information (verbose)</a:t>
-            </a:r>
-          </a:p>
-          <a:p>
-            <a:pPr lvl="1"/>
+              <a:t>or</a:t>
+            </a:r>
             <a:r>
               <a:rPr lang="en-US" dirty="0">
                 <a:solidFill>
                   <a:srgbClr val="FFFF00"/>
                 </a:solidFill>
               </a:rPr>
-              <a:t>-o </a:t>
-            </a:r>
-            <a:r>
-              <a:rPr lang="en-US" i="1" dirty="0" err="1">
-                <a:solidFill>
-                  <a:srgbClr val="FFFF00"/>
-                </a:solidFill>
-              </a:rPr>
-              <a:t>file_name</a:t>
-            </a:r>
-            <a:r>
-              <a:rPr lang="en-US" dirty="0">
-                <a:solidFill>
-                  <a:srgbClr val="FFFF00"/>
-                </a:solidFill>
-              </a:rPr>
-              <a:t> </a:t>
-            </a:r>
-            <a:r>
-              <a:rPr lang="en-US" dirty="0"/>
-              <a:t>– write response output to a file instead of STDOUT</a:t>
-            </a:r>
-          </a:p>
-          <a:p>
-            <a:pPr lvl="1"/>
-            <a:r>
-              <a:rPr lang="en-US" dirty="0">
-                <a:solidFill>
-                  <a:srgbClr val="FFFF00"/>
-                </a:solidFill>
-              </a:rPr>
-              <a:t>-I </a:t>
-            </a:r>
-            <a:r>
-              <a:rPr lang="en-US" dirty="0"/>
-              <a:t>or</a:t>
-            </a:r>
-            <a:r>
-              <a:rPr lang="en-US" dirty="0">
-                <a:solidFill>
-                  <a:srgbClr val="FFFF00"/>
-                </a:solidFill>
-              </a:rPr>
-              <a:t> --head</a:t>
-            </a:r>
-            <a:r>
-              <a:rPr lang="en-US" dirty="0"/>
-              <a:t> – display ONLY response headers in STDOU</a:t>
-            </a:r>
-          </a:p>
-          <a:p>
-            <a:pPr lvl="1"/>
-            <a:r>
-              <a:rPr lang="en-US" dirty="0">
-                <a:solidFill>
-                  <a:srgbClr val="FFFF00"/>
-                </a:solidFill>
-              </a:rPr>
-              <a:t>-u </a:t>
-            </a:r>
-            <a:r>
-              <a:rPr lang="en-US" dirty="0"/>
-              <a:t>or</a:t>
-            </a:r>
-            <a:r>
-              <a:rPr lang="en-US" dirty="0">
-                <a:solidFill>
-                  <a:srgbClr val="FFFF00"/>
-                </a:solidFill>
-              </a:rPr>
-              <a:t> --user</a:t>
-            </a:r>
-            <a:r>
-              <a:rPr lang="en-US" dirty="0"/>
-              <a:t> – credentials key/value pair</a:t>
-            </a:r>
-          </a:p>
-          <a:p>
-            <a:pPr lvl="1"/>
-            <a:r>
-              <a:rPr lang="en-US" dirty="0">
-                <a:solidFill>
-                  <a:srgbClr val="FFFF00"/>
-                </a:solidFill>
-              </a:rPr>
-              <a:t>--basic </a:t>
-            </a:r>
-            <a:r>
-              <a:rPr lang="en-US" dirty="0"/>
-              <a:t>– Use HTTP Basic Authentication</a:t>
-            </a:r>
-          </a:p>
-          <a:p>
-            <a:pPr marL="0" indent="0">
-              <a:buNone/>
-            </a:pPr>
-            <a:endParaRPr lang="en-US" dirty="0"/>
+              <a:t> --verbose </a:t>
+            </a:r>
+            <a:r>
+              <a:rPr lang="en-US" dirty="0"/>
+              <a:t>– display detailed info for debugging (headers, TLS handshake, etc.)</a:t>
+            </a:r>
           </a:p>
         </p:txBody>
       </p:sp>
@@ -6458,7 +7290,7 @@
             </a:r>
             <a:r>
               <a:rPr lang="en-US" dirty="0"/>
-              <a:t> Command Flags</a:t>
+              <a:t> Command Options</a:t>
             </a:r>
           </a:p>
         </p:txBody>
@@ -6516,7 +7348,7 @@
             <a:fld id="{A44B02FA-DD2D-1844-AE35-8B2EAB0CF4EF}" type="slidenum">
               <a:rPr lang="en-US" smtClean="0"/>
               <a:pPr/>
-              <a:t>10</a:t>
+              <a:t>12</a:t>
             </a:fld>
             <a:endParaRPr lang="en-US" dirty="0"/>
           </a:p>
@@ -6973,15 +7805,33 @@
                                   </p:childTnLst>
                                 </p:cTn>
                               </p:par>
+                            </p:childTnLst>
+                          </p:cTn>
+                        </p:par>
+                      </p:childTnLst>
+                    </p:cTn>
+                  </p:par>
+                  <p:par>
+                    <p:cTn id="38" fill="hold">
+                      <p:stCondLst>
+                        <p:cond delay="indefinite"/>
+                      </p:stCondLst>
+                      <p:childTnLst>
+                        <p:par>
+                          <p:cTn id="39" fill="hold">
+                            <p:stCondLst>
+                              <p:cond delay="0"/>
+                            </p:stCondLst>
+                            <p:childTnLst>
                               <p:par>
-                                <p:cTn id="38" presetID="9" presetClass="entr" presetSubtype="0" fill="hold" grpId="0" nodeType="withEffect">
+                                <p:cTn id="40" presetID="9" presetClass="entr" presetSubtype="0" fill="hold" grpId="0" nodeType="clickEffect">
                                   <p:stCondLst>
                                     <p:cond delay="0"/>
                                   </p:stCondLst>
                                   <p:childTnLst>
                                     <p:set>
                                       <p:cBhvr>
-                                        <p:cTn id="39" dur="1" fill="hold">
+                                        <p:cTn id="41" dur="1" fill="hold">
                                           <p:stCondLst>
                                             <p:cond delay="0"/>
                                           </p:stCondLst>
@@ -7003,7 +7853,7 @@
                                     </p:set>
                                     <p:animEffect transition="in" filter="dissolve">
                                       <p:cBhvr>
-                                        <p:cTn id="40" dur="500"/>
+                                        <p:cTn id="42" dur="500"/>
                                         <p:tgtEl>
                                           <p:spTgt spid="3">
                                             <p:txEl>
@@ -7023,26 +7873,26 @@
                     </p:cTn>
                   </p:par>
                   <p:par>
-                    <p:cTn id="41" fill="hold">
+                    <p:cTn id="43" fill="hold">
                       <p:stCondLst>
                         <p:cond delay="indefinite"/>
                       </p:stCondLst>
                       <p:childTnLst>
                         <p:par>
-                          <p:cTn id="42" fill="hold">
+                          <p:cTn id="44" fill="hold">
                             <p:stCondLst>
                               <p:cond delay="0"/>
                             </p:stCondLst>
                             <p:childTnLst>
                               <p:par>
-                                <p:cTn id="43" presetID="9" presetClass="entr" presetSubtype="0" fill="hold" grpId="0" nodeType="clickEffect">
+                                <p:cTn id="45" presetID="9" presetClass="entr" presetSubtype="0" fill="hold" grpId="0" nodeType="clickEffect">
                                   <p:stCondLst>
                                     <p:cond delay="0"/>
                                   </p:stCondLst>
                                   <p:childTnLst>
                                     <p:set>
                                       <p:cBhvr>
-                                        <p:cTn id="44" dur="1" fill="hold">
+                                        <p:cTn id="46" dur="1" fill="hold">
                                           <p:stCondLst>
                                             <p:cond delay="0"/>
                                           </p:stCondLst>
@@ -7064,7 +7914,7 @@
                                     </p:set>
                                     <p:animEffect transition="in" filter="dissolve">
                                       <p:cBhvr>
-                                        <p:cTn id="45" dur="500"/>
+                                        <p:cTn id="47" dur="500"/>
                                         <p:tgtEl>
                                           <p:spTgt spid="3">
                                             <p:txEl>
@@ -7084,26 +7934,26 @@
                     </p:cTn>
                   </p:par>
                   <p:par>
-                    <p:cTn id="46" fill="hold">
+                    <p:cTn id="48" fill="hold">
                       <p:stCondLst>
                         <p:cond delay="indefinite"/>
                       </p:stCondLst>
                       <p:childTnLst>
                         <p:par>
-                          <p:cTn id="47" fill="hold">
+                          <p:cTn id="49" fill="hold">
                             <p:stCondLst>
                               <p:cond delay="0"/>
                             </p:stCondLst>
                             <p:childTnLst>
                               <p:par>
-                                <p:cTn id="48" presetID="9" presetClass="entr" presetSubtype="0" fill="hold" grpId="0" nodeType="clickEffect">
+                                <p:cTn id="50" presetID="9" presetClass="entr" presetSubtype="0" fill="hold" grpId="0" nodeType="clickEffect">
                                   <p:stCondLst>
                                     <p:cond delay="0"/>
                                   </p:stCondLst>
                                   <p:childTnLst>
                                     <p:set>
                                       <p:cBhvr>
-                                        <p:cTn id="49" dur="1" fill="hold">
+                                        <p:cTn id="51" dur="1" fill="hold">
                                           <p:stCondLst>
                                             <p:cond delay="0"/>
                                           </p:stCondLst>
@@ -7125,7 +7975,7 @@
                                     </p:set>
                                     <p:animEffect transition="in" filter="dissolve">
                                       <p:cBhvr>
-                                        <p:cTn id="50" dur="500"/>
+                                        <p:cTn id="52" dur="500"/>
                                         <p:tgtEl>
                                           <p:spTgt spid="3">
                                             <p:txEl>
@@ -7145,26 +7995,26 @@
                     </p:cTn>
                   </p:par>
                   <p:par>
-                    <p:cTn id="51" fill="hold">
+                    <p:cTn id="53" fill="hold">
                       <p:stCondLst>
                         <p:cond delay="indefinite"/>
                       </p:stCondLst>
                       <p:childTnLst>
                         <p:par>
-                          <p:cTn id="52" fill="hold">
+                          <p:cTn id="54" fill="hold">
                             <p:stCondLst>
                               <p:cond delay="0"/>
                             </p:stCondLst>
                             <p:childTnLst>
                               <p:par>
-                                <p:cTn id="53" presetID="9" presetClass="entr" presetSubtype="0" fill="hold" grpId="0" nodeType="clickEffect">
+                                <p:cTn id="55" presetID="9" presetClass="entr" presetSubtype="0" fill="hold" grpId="0" nodeType="clickEffect">
                                   <p:stCondLst>
                                     <p:cond delay="0"/>
                                   </p:stCondLst>
                                   <p:childTnLst>
                                     <p:set>
                                       <p:cBhvr>
-                                        <p:cTn id="54" dur="1" fill="hold">
+                                        <p:cTn id="56" dur="1" fill="hold">
                                           <p:stCondLst>
                                             <p:cond delay="0"/>
                                           </p:stCondLst>
@@ -7186,7 +8036,7 @@
                                     </p:set>
                                     <p:animEffect transition="in" filter="dissolve">
                                       <p:cBhvr>
-                                        <p:cTn id="55" dur="500"/>
+                                        <p:cTn id="57" dur="500"/>
                                         <p:tgtEl>
                                           <p:spTgt spid="3">
                                             <p:txEl>
@@ -7206,26 +8056,26 @@
                     </p:cTn>
                   </p:par>
                   <p:par>
-                    <p:cTn id="56" fill="hold">
+                    <p:cTn id="58" fill="hold">
                       <p:stCondLst>
                         <p:cond delay="indefinite"/>
                       </p:stCondLst>
                       <p:childTnLst>
                         <p:par>
-                          <p:cTn id="57" fill="hold">
+                          <p:cTn id="59" fill="hold">
                             <p:stCondLst>
                               <p:cond delay="0"/>
                             </p:stCondLst>
                             <p:childTnLst>
                               <p:par>
-                                <p:cTn id="58" presetID="9" presetClass="entr" presetSubtype="0" fill="hold" grpId="0" nodeType="clickEffect">
+                                <p:cTn id="60" presetID="9" presetClass="entr" presetSubtype="0" fill="hold" grpId="0" nodeType="clickEffect">
                                   <p:stCondLst>
                                     <p:cond delay="0"/>
                                   </p:stCondLst>
                                   <p:childTnLst>
                                     <p:set>
                                       <p:cBhvr>
-                                        <p:cTn id="59" dur="1" fill="hold">
+                                        <p:cTn id="61" dur="1" fill="hold">
                                           <p:stCondLst>
                                             <p:cond delay="0"/>
                                           </p:stCondLst>
@@ -7247,255 +8097,11 @@
                                     </p:set>
                                     <p:animEffect transition="in" filter="dissolve">
                                       <p:cBhvr>
-                                        <p:cTn id="60" dur="500"/>
+                                        <p:cTn id="62" dur="500"/>
                                         <p:tgtEl>
                                           <p:spTgt spid="3">
                                             <p:txEl>
                                               <p:pRg st="11" end="11"/>
-                                            </p:txEl>
-                                          </p:spTgt>
-                                        </p:tgtEl>
-                                      </p:cBhvr>
-                                    </p:animEffect>
-                                  </p:childTnLst>
-                                </p:cTn>
-                              </p:par>
-                            </p:childTnLst>
-                          </p:cTn>
-                        </p:par>
-                      </p:childTnLst>
-                    </p:cTn>
-                  </p:par>
-                  <p:par>
-                    <p:cTn id="61" fill="hold">
-                      <p:stCondLst>
-                        <p:cond delay="indefinite"/>
-                      </p:stCondLst>
-                      <p:childTnLst>
-                        <p:par>
-                          <p:cTn id="62" fill="hold">
-                            <p:stCondLst>
-                              <p:cond delay="0"/>
-                            </p:stCondLst>
-                            <p:childTnLst>
-                              <p:par>
-                                <p:cTn id="63" presetID="9" presetClass="entr" presetSubtype="0" fill="hold" grpId="0" nodeType="clickEffect">
-                                  <p:stCondLst>
-                                    <p:cond delay="0"/>
-                                  </p:stCondLst>
-                                  <p:childTnLst>
-                                    <p:set>
-                                      <p:cBhvr>
-                                        <p:cTn id="64" dur="1" fill="hold">
-                                          <p:stCondLst>
-                                            <p:cond delay="0"/>
-                                          </p:stCondLst>
-                                        </p:cTn>
-                                        <p:tgtEl>
-                                          <p:spTgt spid="3">
-                                            <p:txEl>
-                                              <p:pRg st="12" end="12"/>
-                                            </p:txEl>
-                                          </p:spTgt>
-                                        </p:tgtEl>
-                                        <p:attrNameLst>
-                                          <p:attrName>style.visibility</p:attrName>
-                                        </p:attrNameLst>
-                                      </p:cBhvr>
-                                      <p:to>
-                                        <p:strVal val="visible"/>
-                                      </p:to>
-                                    </p:set>
-                                    <p:animEffect transition="in" filter="dissolve">
-                                      <p:cBhvr>
-                                        <p:cTn id="65" dur="500"/>
-                                        <p:tgtEl>
-                                          <p:spTgt spid="3">
-                                            <p:txEl>
-                                              <p:pRg st="12" end="12"/>
-                                            </p:txEl>
-                                          </p:spTgt>
-                                        </p:tgtEl>
-                                      </p:cBhvr>
-                                    </p:animEffect>
-                                  </p:childTnLst>
-                                </p:cTn>
-                              </p:par>
-                            </p:childTnLst>
-                          </p:cTn>
-                        </p:par>
-                      </p:childTnLst>
-                    </p:cTn>
-                  </p:par>
-                  <p:par>
-                    <p:cTn id="66" fill="hold">
-                      <p:stCondLst>
-                        <p:cond delay="indefinite"/>
-                      </p:stCondLst>
-                      <p:childTnLst>
-                        <p:par>
-                          <p:cTn id="67" fill="hold">
-                            <p:stCondLst>
-                              <p:cond delay="0"/>
-                            </p:stCondLst>
-                            <p:childTnLst>
-                              <p:par>
-                                <p:cTn id="68" presetID="9" presetClass="entr" presetSubtype="0" fill="hold" grpId="0" nodeType="clickEffect">
-                                  <p:stCondLst>
-                                    <p:cond delay="0"/>
-                                  </p:stCondLst>
-                                  <p:childTnLst>
-                                    <p:set>
-                                      <p:cBhvr>
-                                        <p:cTn id="69" dur="1" fill="hold">
-                                          <p:stCondLst>
-                                            <p:cond delay="0"/>
-                                          </p:stCondLst>
-                                        </p:cTn>
-                                        <p:tgtEl>
-                                          <p:spTgt spid="3">
-                                            <p:txEl>
-                                              <p:pRg st="13" end="13"/>
-                                            </p:txEl>
-                                          </p:spTgt>
-                                        </p:tgtEl>
-                                        <p:attrNameLst>
-                                          <p:attrName>style.visibility</p:attrName>
-                                        </p:attrNameLst>
-                                      </p:cBhvr>
-                                      <p:to>
-                                        <p:strVal val="visible"/>
-                                      </p:to>
-                                    </p:set>
-                                    <p:animEffect transition="in" filter="dissolve">
-                                      <p:cBhvr>
-                                        <p:cTn id="70" dur="500"/>
-                                        <p:tgtEl>
-                                          <p:spTgt spid="3">
-                                            <p:txEl>
-                                              <p:pRg st="13" end="13"/>
-                                            </p:txEl>
-                                          </p:spTgt>
-                                        </p:tgtEl>
-                                      </p:cBhvr>
-                                    </p:animEffect>
-                                  </p:childTnLst>
-                                </p:cTn>
-                              </p:par>
-                            </p:childTnLst>
-                          </p:cTn>
-                        </p:par>
-                      </p:childTnLst>
-                    </p:cTn>
-                  </p:par>
-                  <p:par>
-                    <p:cTn id="71" fill="hold">
-                      <p:stCondLst>
-                        <p:cond delay="indefinite"/>
-                      </p:stCondLst>
-                      <p:childTnLst>
-                        <p:par>
-                          <p:cTn id="72" fill="hold">
-                            <p:stCondLst>
-                              <p:cond delay="0"/>
-                            </p:stCondLst>
-                            <p:childTnLst>
-                              <p:par>
-                                <p:cTn id="73" presetID="9" presetClass="entr" presetSubtype="0" fill="hold" grpId="0" nodeType="clickEffect">
-                                  <p:stCondLst>
-                                    <p:cond delay="0"/>
-                                  </p:stCondLst>
-                                  <p:childTnLst>
-                                    <p:set>
-                                      <p:cBhvr>
-                                        <p:cTn id="74" dur="1" fill="hold">
-                                          <p:stCondLst>
-                                            <p:cond delay="0"/>
-                                          </p:stCondLst>
-                                        </p:cTn>
-                                        <p:tgtEl>
-                                          <p:spTgt spid="3">
-                                            <p:txEl>
-                                              <p:pRg st="14" end="14"/>
-                                            </p:txEl>
-                                          </p:spTgt>
-                                        </p:tgtEl>
-                                        <p:attrNameLst>
-                                          <p:attrName>style.visibility</p:attrName>
-                                        </p:attrNameLst>
-                                      </p:cBhvr>
-                                      <p:to>
-                                        <p:strVal val="visible"/>
-                                      </p:to>
-                                    </p:set>
-                                    <p:animEffect transition="in" filter="dissolve">
-                                      <p:cBhvr>
-                                        <p:cTn id="75" dur="500"/>
-                                        <p:tgtEl>
-                                          <p:spTgt spid="3">
-                                            <p:txEl>
-                                              <p:pRg st="14" end="14"/>
-                                            </p:txEl>
-                                          </p:spTgt>
-                                        </p:tgtEl>
-                                      </p:cBhvr>
-                                    </p:animEffect>
-                                  </p:childTnLst>
-                                </p:cTn>
-                              </p:par>
-                            </p:childTnLst>
-                          </p:cTn>
-                        </p:par>
-                      </p:childTnLst>
-                    </p:cTn>
-                  </p:par>
-                  <p:par>
-                    <p:cTn id="76" fill="hold">
-                      <p:stCondLst>
-                        <p:cond delay="indefinite"/>
-                      </p:stCondLst>
-                      <p:childTnLst>
-                        <p:par>
-                          <p:cTn id="77" fill="hold">
-                            <p:stCondLst>
-                              <p:cond delay="0"/>
-                            </p:stCondLst>
-                            <p:childTnLst>
-                              <p:par>
-                                <p:cTn id="78" presetID="9" presetClass="entr" presetSubtype="0" fill="hold" grpId="0" nodeType="clickEffect">
-                                  <p:stCondLst>
-                                    <p:cond delay="0"/>
-                                  </p:stCondLst>
-                                  <p:childTnLst>
-                                    <p:set>
-                                      <p:cBhvr>
-                                        <p:cTn id="79" dur="1" fill="hold">
-                                          <p:stCondLst>
-                                            <p:cond delay="0"/>
-                                          </p:stCondLst>
-                                        </p:cTn>
-                                        <p:tgtEl>
-                                          <p:spTgt spid="3">
-                                            <p:txEl>
-                                              <p:pRg st="15" end="15"/>
-                                            </p:txEl>
-                                          </p:spTgt>
-                                        </p:tgtEl>
-                                        <p:attrNameLst>
-                                          <p:attrName>style.visibility</p:attrName>
-                                        </p:attrNameLst>
-                                      </p:cBhvr>
-                                      <p:to>
-                                        <p:strVal val="visible"/>
-                                      </p:to>
-                                    </p:set>
-                                    <p:animEffect transition="in" filter="dissolve">
-                                      <p:cBhvr>
-                                        <p:cTn id="80" dur="500"/>
-                                        <p:tgtEl>
-                                          <p:spTgt spid="3">
-                                            <p:txEl>
-                                              <p:pRg st="15" end="15"/>
                                             </p:txEl>
                                           </p:spTgt>
                                         </p:tgtEl>
@@ -7538,7 +8144,7 @@
 </p:sld>
 </file>
 
-<file path=ppt/slides/slide11.xml><?xml version="1.0" encoding="utf-8"?>
+<file path=ppt/slides/slide13.xml><?xml version="1.0" encoding="utf-8"?>
 <p:sld xmlns:a="http://schemas.openxmlformats.org/drawingml/2006/main" xmlns:r="http://schemas.openxmlformats.org/officeDocument/2006/relationships" xmlns:p="http://schemas.openxmlformats.org/presentationml/2006/main">
   <p:cSld>
     <p:spTree>
@@ -7646,7 +8252,7 @@
 </p:sld>
 </file>
 
-<file path=ppt/slides/slide12.xml><?xml version="1.0" encoding="utf-8"?>
+<file path=ppt/slides/slide14.xml><?xml version="1.0" encoding="utf-8"?>
 <p:sld xmlns:a="http://schemas.openxmlformats.org/drawingml/2006/main" xmlns:r="http://schemas.openxmlformats.org/officeDocument/2006/relationships" xmlns:p="http://schemas.openxmlformats.org/presentationml/2006/main">
   <p:cSld>
     <p:spTree>
@@ -8003,7 +8609,7 @@
             <a:fld id="{A44B02FA-DD2D-1844-AE35-8B2EAB0CF4EF}" type="slidenum">
               <a:rPr lang="en-US" smtClean="0"/>
               <a:pPr/>
-              <a:t>12</a:t>
+              <a:t>14</a:t>
             </a:fld>
             <a:endParaRPr lang="en-US" dirty="0"/>
           </a:p>
@@ -8174,7 +8780,7 @@
 </p:sld>
 </file>
 
-<file path=ppt/slides/slide13.xml><?xml version="1.0" encoding="utf-8"?>
+<file path=ppt/slides/slide15.xml><?xml version="1.0" encoding="utf-8"?>
 <p:sld xmlns:a="http://schemas.openxmlformats.org/drawingml/2006/main" xmlns:r="http://schemas.openxmlformats.org/officeDocument/2006/relationships" xmlns:p="http://schemas.openxmlformats.org/presentationml/2006/main">
   <p:cSld>
     <p:spTree>
@@ -8314,7 +8920,7 @@
             <a:fld id="{A44B02FA-DD2D-1844-AE35-8B2EAB0CF4EF}" type="slidenum">
               <a:rPr lang="en-US" smtClean="0"/>
               <a:pPr/>
-              <a:t>13</a:t>
+              <a:t>15</a:t>
             </a:fld>
             <a:endParaRPr lang="en-US" dirty="0"/>
           </a:p>
@@ -8345,7 +8951,7 @@
 </p:sld>
 </file>
 
-<file path=ppt/slides/slide14.xml><?xml version="1.0" encoding="utf-8"?>
+<file path=ppt/slides/slide16.xml><?xml version="1.0" encoding="utf-8"?>
 <p:sld xmlns:a="http://schemas.openxmlformats.org/drawingml/2006/main" xmlns:r="http://schemas.openxmlformats.org/officeDocument/2006/relationships" xmlns:p="http://schemas.openxmlformats.org/presentationml/2006/main">
   <p:cSld>
     <p:spTree>
@@ -8443,7 +9049,7 @@
             <a:fld id="{A44B02FA-DD2D-1844-AE35-8B2EAB0CF4EF}" type="slidenum">
               <a:rPr lang="en-US" smtClean="0"/>
               <a:pPr/>
-              <a:t>14</a:t>
+              <a:t>16</a:t>
             </a:fld>
             <a:endParaRPr lang="en-US" dirty="0"/>
           </a:p>
@@ -8945,346 +9551,6 @@
 </p:sld>
 </file>
 
-<file path=ppt/slides/slide15.xml><?xml version="1.0" encoding="utf-8"?>
-<p:sld xmlns:a="http://schemas.openxmlformats.org/drawingml/2006/main" xmlns:r="http://schemas.openxmlformats.org/officeDocument/2006/relationships" xmlns:p="http://schemas.openxmlformats.org/presentationml/2006/main">
-  <p:cSld>
-    <p:spTree>
-      <p:nvGrpSpPr>
-        <p:cNvPr id="1" name=""/>
-        <p:cNvGrpSpPr/>
-        <p:nvPr/>
-      </p:nvGrpSpPr>
-      <p:grpSpPr>
-        <a:xfrm>
-          <a:off x="0" y="0"/>
-          <a:ext cx="0" cy="0"/>
-          <a:chOff x="0" y="0"/>
-          <a:chExt cx="0" cy="0"/>
-        </a:xfrm>
-      </p:grpSpPr>
-      <p:sp>
-        <p:nvSpPr>
-          <p:cNvPr id="2" name="Title 1">
-            <a:extLst>
-              <a:ext uri="{FF2B5EF4-FFF2-40B4-BE49-F238E27FC236}">
-                <a16:creationId xmlns:a16="http://schemas.microsoft.com/office/drawing/2014/main" id="{9D8D6E4C-FC36-3E4C-9387-96DD20072D9D}"/>
-              </a:ext>
-            </a:extLst>
-          </p:cNvPr>
-          <p:cNvSpPr>
-            <a:spLocks noGrp="1"/>
-          </p:cNvSpPr>
-          <p:nvPr>
-            <p:ph type="ctrTitle"/>
-          </p:nvPr>
-        </p:nvSpPr>
-        <p:spPr>
-          <a:xfrm>
-            <a:off x="1524000" y="914013"/>
-            <a:ext cx="9144000" cy="2387600"/>
-          </a:xfrm>
-        </p:spPr>
-        <p:txBody>
-          <a:bodyPr/>
-          <a:lstStyle/>
-          <a:p>
-            <a:r>
-              <a:rPr lang="en-US" dirty="0"/>
-              <a:t>Part IV</a:t>
-            </a:r>
-          </a:p>
-        </p:txBody>
-      </p:sp>
-      <p:sp>
-        <p:nvSpPr>
-          <p:cNvPr id="3" name="Subtitle 2">
-            <a:extLst>
-              <a:ext uri="{FF2B5EF4-FFF2-40B4-BE49-F238E27FC236}">
-                <a16:creationId xmlns:a16="http://schemas.microsoft.com/office/drawing/2014/main" id="{0451A0DE-9D64-5A48-94B5-5B4E42709819}"/>
-              </a:ext>
-            </a:extLst>
-          </p:cNvPr>
-          <p:cNvSpPr>
-            <a:spLocks noGrp="1"/>
-          </p:cNvSpPr>
-          <p:nvPr>
-            <p:ph type="subTitle" idx="1"/>
-          </p:nvPr>
-        </p:nvSpPr>
-        <p:spPr>
-          <a:xfrm>
-            <a:off x="1524000" y="3393688"/>
-            <a:ext cx="9144000" cy="1655762"/>
-          </a:xfrm>
-        </p:spPr>
-        <p:txBody>
-          <a:bodyPr/>
-          <a:lstStyle/>
-          <a:p>
-            <a:r>
-              <a:rPr lang="en-US" dirty="0"/>
-              <a:t>Cisco Platform APIs Overview</a:t>
-            </a:r>
-          </a:p>
-        </p:txBody>
-      </p:sp>
-    </p:spTree>
-    <p:extLst>
-      <p:ext uri="{BB962C8B-B14F-4D97-AF65-F5344CB8AC3E}">
-        <p14:creationId xmlns:p14="http://schemas.microsoft.com/office/powerpoint/2010/main" val="899135878"/>
-      </p:ext>
-    </p:extLst>
-  </p:cSld>
-  <p:clrMapOvr>
-    <a:masterClrMapping/>
-  </p:clrMapOvr>
-  <mc:AlternateContent xmlns:mc="http://schemas.openxmlformats.org/markup-compatibility/2006" xmlns:p14="http://schemas.microsoft.com/office/powerpoint/2010/main">
-    <mc:Choice Requires="p14">
-      <p:transition spd="med" p14:dur="700">
-        <p:fade/>
-      </p:transition>
-    </mc:Choice>
-    <mc:Fallback xmlns="">
-      <p:transition spd="med">
-        <p:fade/>
-      </p:transition>
-    </mc:Fallback>
-  </mc:AlternateContent>
-</p:sld>
-</file>
-
-<file path=ppt/slides/slide16.xml><?xml version="1.0" encoding="utf-8"?>
-<p:sld xmlns:a="http://schemas.openxmlformats.org/drawingml/2006/main" xmlns:r="http://schemas.openxmlformats.org/officeDocument/2006/relationships" xmlns:p="http://schemas.openxmlformats.org/presentationml/2006/main">
-  <p:cSld>
-    <p:spTree>
-      <p:nvGrpSpPr>
-        <p:cNvPr id="1" name=""/>
-        <p:cNvGrpSpPr/>
-        <p:nvPr/>
-      </p:nvGrpSpPr>
-      <p:grpSpPr>
-        <a:xfrm>
-          <a:off x="0" y="0"/>
-          <a:ext cx="0" cy="0"/>
-          <a:chOff x="0" y="0"/>
-          <a:chExt cx="0" cy="0"/>
-        </a:xfrm>
-      </p:grpSpPr>
-      <p:sp>
-        <p:nvSpPr>
-          <p:cNvPr id="2" name="Title 1">
-            <a:extLst>
-              <a:ext uri="{FF2B5EF4-FFF2-40B4-BE49-F238E27FC236}">
-                <a16:creationId xmlns:a16="http://schemas.microsoft.com/office/drawing/2014/main" id="{EB7C4089-1746-624B-8E73-D3DAB8E88CDD}"/>
-              </a:ext>
-            </a:extLst>
-          </p:cNvPr>
-          <p:cNvSpPr>
-            <a:spLocks noGrp="1"/>
-          </p:cNvSpPr>
-          <p:nvPr>
-            <p:ph type="title"/>
-          </p:nvPr>
-        </p:nvSpPr>
-        <p:spPr/>
-        <p:txBody>
-          <a:bodyPr/>
-          <a:lstStyle/>
-          <a:p>
-            <a:r>
-              <a:rPr lang="en-US" dirty="0"/>
-              <a:t>Outline</a:t>
-            </a:r>
-          </a:p>
-        </p:txBody>
-      </p:sp>
-      <p:sp>
-        <p:nvSpPr>
-          <p:cNvPr id="3" name="Content Placeholder 2">
-            <a:extLst>
-              <a:ext uri="{FF2B5EF4-FFF2-40B4-BE49-F238E27FC236}">
-                <a16:creationId xmlns:a16="http://schemas.microsoft.com/office/drawing/2014/main" id="{65426B10-0364-A849-B3A4-1D0DA409155A}"/>
-              </a:ext>
-            </a:extLst>
-          </p:cNvPr>
-          <p:cNvSpPr>
-            <a:spLocks noGrp="1"/>
-          </p:cNvSpPr>
-          <p:nvPr>
-            <p:ph idx="1"/>
-          </p:nvPr>
-        </p:nvSpPr>
-        <p:spPr/>
-        <p:txBody>
-          <a:bodyPr>
-            <a:normAutofit lnSpcReduction="10000"/>
-          </a:bodyPr>
-          <a:lstStyle/>
-          <a:p>
-            <a:r>
-              <a:rPr lang="en-US" dirty="0"/>
-              <a:t>For each of these platforms:</a:t>
-            </a:r>
-          </a:p>
-          <a:p>
-            <a:pPr lvl="1"/>
-            <a:r>
-              <a:rPr lang="en-US" dirty="0"/>
-              <a:t>DNAC</a:t>
-            </a:r>
-          </a:p>
-          <a:p>
-            <a:pPr lvl="1"/>
-            <a:r>
-              <a:rPr lang="en-US" dirty="0" err="1"/>
-              <a:t>Webex</a:t>
-            </a:r>
-            <a:r>
-              <a:rPr lang="en-US" dirty="0"/>
-              <a:t> Teams</a:t>
-            </a:r>
-          </a:p>
-          <a:p>
-            <a:pPr lvl="1"/>
-            <a:r>
-              <a:rPr lang="en-US" dirty="0"/>
-              <a:t>Meraki</a:t>
-            </a:r>
-          </a:p>
-          <a:p>
-            <a:pPr lvl="1"/>
-            <a:r>
-              <a:rPr lang="en-US" dirty="0"/>
-              <a:t>ACI</a:t>
-            </a:r>
-          </a:p>
-          <a:p>
-            <a:pPr lvl="1"/>
-            <a:r>
-              <a:rPr lang="en-US" dirty="0"/>
-              <a:t>Firepower</a:t>
-            </a:r>
-          </a:p>
-          <a:p>
-            <a:pPr lvl="1"/>
-            <a:r>
-              <a:rPr lang="en-US" dirty="0"/>
-              <a:t>SD-WAN</a:t>
-            </a:r>
-          </a:p>
-          <a:p>
-            <a:r>
-              <a:rPr lang="en-US" dirty="0"/>
-              <a:t>Perform the following tasks:</a:t>
-            </a:r>
-          </a:p>
-          <a:p>
-            <a:pPr lvl="1"/>
-            <a:r>
-              <a:rPr lang="en-US" dirty="0"/>
-              <a:t>Platform summary overview</a:t>
-            </a:r>
-          </a:p>
-          <a:p>
-            <a:pPr lvl="1"/>
-            <a:r>
-              <a:rPr lang="en-US" dirty="0"/>
-              <a:t>Review API documentation </a:t>
-            </a:r>
-          </a:p>
-          <a:p>
-            <a:pPr lvl="1"/>
-            <a:r>
-              <a:rPr lang="en-US" dirty="0"/>
-              <a:t>Review resources available for programmatic access/practice/testing</a:t>
-            </a:r>
-          </a:p>
-        </p:txBody>
-      </p:sp>
-      <p:sp>
-        <p:nvSpPr>
-          <p:cNvPr id="4" name="Date Placeholder 3">
-            <a:extLst>
-              <a:ext uri="{FF2B5EF4-FFF2-40B4-BE49-F238E27FC236}">
-                <a16:creationId xmlns:a16="http://schemas.microsoft.com/office/drawing/2014/main" id="{7ECEAF79-F4AC-E94E-9E55-220D0D396924}"/>
-              </a:ext>
-            </a:extLst>
-          </p:cNvPr>
-          <p:cNvSpPr>
-            <a:spLocks noGrp="1"/>
-          </p:cNvSpPr>
-          <p:nvPr>
-            <p:ph type="dt" sz="half" idx="10"/>
-          </p:nvPr>
-        </p:nvSpPr>
-        <p:spPr/>
-        <p:txBody>
-          <a:bodyPr/>
-          <a:lstStyle/>
-          <a:p>
-            <a:r>
-              <a:rPr lang="en-US"/>
-              <a:t>World Wide Technology ©</a:t>
-            </a:r>
-            <a:endParaRPr lang="en-US" dirty="0"/>
-          </a:p>
-        </p:txBody>
-      </p:sp>
-      <p:sp>
-        <p:nvSpPr>
-          <p:cNvPr id="5" name="Slide Number Placeholder 4">
-            <a:extLst>
-              <a:ext uri="{FF2B5EF4-FFF2-40B4-BE49-F238E27FC236}">
-                <a16:creationId xmlns:a16="http://schemas.microsoft.com/office/drawing/2014/main" id="{372DC1A4-CE8B-DB4A-8F86-2508518C35D3}"/>
-              </a:ext>
-            </a:extLst>
-          </p:cNvPr>
-          <p:cNvSpPr>
-            <a:spLocks noGrp="1"/>
-          </p:cNvSpPr>
-          <p:nvPr>
-            <p:ph type="sldNum" sz="quarter" idx="12"/>
-          </p:nvPr>
-        </p:nvSpPr>
-        <p:spPr/>
-        <p:txBody>
-          <a:bodyPr/>
-          <a:lstStyle/>
-          <a:p>
-            <a:fld id="{A44B02FA-DD2D-1844-AE35-8B2EAB0CF4EF}" type="slidenum">
-              <a:rPr lang="en-US" smtClean="0"/>
-              <a:pPr/>
-              <a:t>16</a:t>
-            </a:fld>
-            <a:endParaRPr lang="en-US" dirty="0"/>
-          </a:p>
-        </p:txBody>
-      </p:sp>
-    </p:spTree>
-    <p:extLst>
-      <p:ext uri="{BB962C8B-B14F-4D97-AF65-F5344CB8AC3E}">
-        <p14:creationId xmlns:p14="http://schemas.microsoft.com/office/powerpoint/2010/main" val="1513264745"/>
-      </p:ext>
-    </p:extLst>
-  </p:cSld>
-  <p:clrMapOvr>
-    <a:masterClrMapping/>
-  </p:clrMapOvr>
-  <mc:AlternateContent xmlns:mc="http://schemas.openxmlformats.org/markup-compatibility/2006" xmlns:p14="http://schemas.microsoft.com/office/powerpoint/2010/main">
-    <mc:Choice Requires="p14">
-      <p:transition spd="med" p14:dur="700">
-        <p:fade/>
-      </p:transition>
-    </mc:Choice>
-    <mc:Fallback xmlns="">
-      <p:transition spd="med">
-        <p:fade/>
-      </p:transition>
-    </mc:Fallback>
-  </mc:AlternateContent>
-</p:sld>
-</file>
-
 <file path=ppt/slides/slide17.xml><?xml version="1.0" encoding="utf-8"?>
 <p:sld xmlns:a="http://schemas.openxmlformats.org/drawingml/2006/main" xmlns:r="http://schemas.openxmlformats.org/officeDocument/2006/relationships" xmlns:p="http://schemas.openxmlformats.org/presentationml/2006/main">
   <p:cSld>
@@ -9330,7 +9596,7 @@
           <a:p>
             <a:r>
               <a:rPr lang="en-US" dirty="0"/>
-              <a:t>Part V</a:t>
+              <a:t>Part IV</a:t>
             </a:r>
           </a:p>
         </p:txBody>
@@ -9363,20 +9629,15 @@
           <a:p>
             <a:r>
               <a:rPr lang="en-US" dirty="0"/>
-              <a:t>Interact With Cisco Platform APIs Using </a:t>
-            </a:r>
-            <a:r>
-              <a:rPr lang="en-US" dirty="0" err="1"/>
-              <a:t>cURL</a:t>
-            </a:r>
-            <a:endParaRPr lang="en-US" dirty="0"/>
+              <a:t>Cisco Platform APIs Overview</a:t>
+            </a:r>
           </a:p>
         </p:txBody>
       </p:sp>
     </p:spTree>
     <p:extLst>
       <p:ext uri="{BB962C8B-B14F-4D97-AF65-F5344CB8AC3E}">
-        <p14:creationId xmlns:p14="http://schemas.microsoft.com/office/powerpoint/2010/main" val="2203929534"/>
+        <p14:creationId xmlns:p14="http://schemas.microsoft.com/office/powerpoint/2010/main" val="899135878"/>
       </p:ext>
     </p:extLst>
   </p:cSld>
@@ -9461,7 +9722,9 @@
         </p:nvSpPr>
         <p:spPr/>
         <p:txBody>
-          <a:bodyPr/>
+          <a:bodyPr>
+            <a:normAutofit lnSpcReduction="10000"/>
+          </a:bodyPr>
           <a:lstStyle/>
           <a:p>
             <a:r>
@@ -9502,6 +9765,20 @@
             </a:r>
           </a:p>
           <a:p>
+            <a:pPr lvl="1"/>
+            <a:r>
+              <a:rPr lang="en-US" dirty="0"/>
+              <a:t>Firepower</a:t>
+            </a:r>
+          </a:p>
+          <a:p>
+            <a:pPr lvl="1"/>
+            <a:r>
+              <a:rPr lang="en-US" dirty="0"/>
+              <a:t>SD-WAN</a:t>
+            </a:r>
+          </a:p>
+          <a:p>
             <a:r>
               <a:rPr lang="en-US" dirty="0"/>
               <a:t>Perform the following tasks:</a:t>
@@ -9511,37 +9788,21 @@
             <a:pPr lvl="1"/>
             <a:r>
               <a:rPr lang="en-US" dirty="0"/>
-              <a:t>Understand authentication methodology</a:t>
+              <a:t>Platform summary overview</a:t>
             </a:r>
           </a:p>
           <a:p>
             <a:pPr lvl="1"/>
             <a:r>
               <a:rPr lang="en-US" dirty="0"/>
-              <a:t>Build </a:t>
-            </a:r>
-            <a:r>
-              <a:rPr lang="en-US" dirty="0" err="1"/>
-              <a:t>cURL</a:t>
-            </a:r>
-            <a:r>
-              <a:rPr lang="en-US" dirty="0"/>
-              <a:t> request to authenticate</a:t>
+              <a:t>Review API documentation </a:t>
             </a:r>
           </a:p>
           <a:p>
             <a:pPr lvl="1"/>
             <a:r>
               <a:rPr lang="en-US" dirty="0"/>
-              <a:t>Build </a:t>
-            </a:r>
-            <a:r>
-              <a:rPr lang="en-US" dirty="0" err="1"/>
-              <a:t>cURL</a:t>
-            </a:r>
-            <a:r>
-              <a:rPr lang="en-US" dirty="0"/>
-              <a:t> request(s) to read/write data</a:t>
+              <a:t>Review resources available for programmatic access/practice/testing</a:t>
             </a:r>
           </a:p>
         </p:txBody>
@@ -9608,7 +9869,7 @@
     </p:spTree>
     <p:extLst>
       <p:ext uri="{BB962C8B-B14F-4D97-AF65-F5344CB8AC3E}">
-        <p14:creationId xmlns:p14="http://schemas.microsoft.com/office/powerpoint/2010/main" val="2063027843"/>
+        <p14:creationId xmlns:p14="http://schemas.microsoft.com/office/powerpoint/2010/main" val="1513264745"/>
       </p:ext>
     </p:extLst>
   </p:cSld>
@@ -9675,7 +9936,7 @@
           <a:p>
             <a:r>
               <a:rPr lang="en-US" dirty="0"/>
-              <a:t>Part VI</a:t>
+              <a:t>Part V</a:t>
             </a:r>
           </a:p>
         </p:txBody>
@@ -9708,15 +9969,20 @@
           <a:p>
             <a:r>
               <a:rPr lang="en-US" dirty="0"/>
-              <a:t>Interact With Cisco Platform APIs Using Python Requests</a:t>
-            </a:r>
+              <a:t>Interact With Cisco Platform APIs Using </a:t>
+            </a:r>
+            <a:r>
+              <a:rPr lang="en-US" dirty="0" err="1"/>
+              <a:t>cURL</a:t>
+            </a:r>
+            <a:endParaRPr lang="en-US" dirty="0"/>
           </a:p>
         </p:txBody>
       </p:sp>
     </p:spTree>
     <p:extLst>
       <p:ext uri="{BB962C8B-B14F-4D97-AF65-F5344CB8AC3E}">
-        <p14:creationId xmlns:p14="http://schemas.microsoft.com/office/powerpoint/2010/main" val="4218248441"/>
+        <p14:creationId xmlns:p14="http://schemas.microsoft.com/office/powerpoint/2010/main" val="2203929534"/>
       </p:ext>
     </p:extLst>
   </p:cSld>
@@ -10592,21 +10858,37 @@
             <a:pPr lvl="1"/>
             <a:r>
               <a:rPr lang="en-US" dirty="0"/>
-              <a:t>Review authentication methodology</a:t>
+              <a:t>Understand authentication methodology</a:t>
             </a:r>
           </a:p>
           <a:p>
             <a:pPr lvl="1"/>
             <a:r>
               <a:rPr lang="en-US" dirty="0"/>
-              <a:t>Build Python scripts to authenticate</a:t>
+              <a:t>Build </a:t>
+            </a:r>
+            <a:r>
+              <a:rPr lang="en-US" dirty="0" err="1"/>
+              <a:t>cURL</a:t>
+            </a:r>
+            <a:r>
+              <a:rPr lang="en-US" dirty="0"/>
+              <a:t> request to authenticate</a:t>
             </a:r>
           </a:p>
           <a:p>
             <a:pPr lvl="1"/>
             <a:r>
               <a:rPr lang="en-US" dirty="0"/>
-              <a:t>Build Python scripts to read/write data</a:t>
+              <a:t>Build </a:t>
+            </a:r>
+            <a:r>
+              <a:rPr lang="en-US" dirty="0" err="1"/>
+              <a:t>cURL</a:t>
+            </a:r>
+            <a:r>
+              <a:rPr lang="en-US" dirty="0"/>
+              <a:t> request(s) to read/write data</a:t>
             </a:r>
           </a:p>
         </p:txBody>
@@ -10673,7 +10955,7 @@
     </p:spTree>
     <p:extLst>
       <p:ext uri="{BB962C8B-B14F-4D97-AF65-F5344CB8AC3E}">
-        <p14:creationId xmlns:p14="http://schemas.microsoft.com/office/powerpoint/2010/main" val="232106193"/>
+        <p14:creationId xmlns:p14="http://schemas.microsoft.com/office/powerpoint/2010/main" val="2063027843"/>
       </p:ext>
     </p:extLst>
   </p:cSld>
@@ -10740,7 +11022,7 @@
           <a:p>
             <a:r>
               <a:rPr lang="en-US" dirty="0"/>
-              <a:t>Part VII</a:t>
+              <a:t>Part VI</a:t>
             </a:r>
           </a:p>
         </p:txBody>
@@ -10773,7 +11055,7 @@
           <a:p>
             <a:r>
               <a:rPr lang="en-US" dirty="0"/>
-              <a:t>Quiz, Practice Resources, &amp; References</a:t>
+              <a:t>Interact With Cisco Platform APIs Using Python Requests</a:t>
             </a:r>
           </a:p>
         </p:txBody>
@@ -10781,7 +11063,7 @@
     </p:spTree>
     <p:extLst>
       <p:ext uri="{BB962C8B-B14F-4D97-AF65-F5344CB8AC3E}">
-        <p14:creationId xmlns:p14="http://schemas.microsoft.com/office/powerpoint/2010/main" val="3392886013"/>
+        <p14:creationId xmlns:p14="http://schemas.microsoft.com/office/powerpoint/2010/main" val="4218248441"/>
       </p:ext>
     </p:extLst>
   </p:cSld>
@@ -10843,7 +11125,7 @@
           <a:p>
             <a:r>
               <a:rPr lang="en-US" dirty="0"/>
-              <a:t>Slide Template</a:t>
+              <a:t>Outline</a:t>
             </a:r>
           </a:p>
         </p:txBody>
@@ -10871,7 +11153,66 @@
           <a:p>
             <a:r>
               <a:rPr lang="en-US" dirty="0"/>
-              <a:t>Body template</a:t>
+              <a:t>For each of these platforms:</a:t>
+            </a:r>
+          </a:p>
+          <a:p>
+            <a:pPr lvl="1"/>
+            <a:r>
+              <a:rPr lang="en-US" dirty="0"/>
+              <a:t>DNAC</a:t>
+            </a:r>
+          </a:p>
+          <a:p>
+            <a:pPr lvl="1"/>
+            <a:r>
+              <a:rPr lang="en-US" dirty="0" err="1"/>
+              <a:t>Webex</a:t>
+            </a:r>
+            <a:r>
+              <a:rPr lang="en-US" dirty="0"/>
+              <a:t> Teams</a:t>
+            </a:r>
+          </a:p>
+          <a:p>
+            <a:pPr lvl="1"/>
+            <a:r>
+              <a:rPr lang="en-US" dirty="0"/>
+              <a:t>Meraki</a:t>
+            </a:r>
+          </a:p>
+          <a:p>
+            <a:pPr lvl="1"/>
+            <a:r>
+              <a:rPr lang="en-US" dirty="0"/>
+              <a:t>ACI</a:t>
+            </a:r>
+          </a:p>
+          <a:p>
+            <a:r>
+              <a:rPr lang="en-US" dirty="0"/>
+              <a:t>Perform the following tasks:</a:t>
+            </a:r>
+          </a:p>
+          <a:p>
+            <a:pPr lvl="1"/>
+            <a:r>
+              <a:rPr lang="en-US" dirty="0"/>
+              <a:t>Review authentication methodology</a:t>
+            </a:r>
+          </a:p>
+          <a:p>
+            <a:pPr lvl="1"/>
+            <a:r>
+              <a:rPr lang="en-US" dirty="0"/>
+              <a:t>Build Python scripts to authenticate</a:t>
+            </a:r>
+          </a:p>
+          <a:p>
+            <a:pPr lvl="1"/>
+            <a:r>
+              <a:rPr lang="en-US" dirty="0"/>
+              <a:t>Build Python scripts to read/write data</a:t>
             </a:r>
           </a:p>
         </p:txBody>
@@ -10938,7 +11279,7 @@
     </p:spTree>
     <p:extLst>
       <p:ext uri="{BB962C8B-B14F-4D97-AF65-F5344CB8AC3E}">
-        <p14:creationId xmlns:p14="http://schemas.microsoft.com/office/powerpoint/2010/main" val="2709408928"/>
+        <p14:creationId xmlns:p14="http://schemas.microsoft.com/office/powerpoint/2010/main" val="232106193"/>
       </p:ext>
     </p:extLst>
   </p:cSld>
@@ -10982,7 +11323,7 @@
           <p:cNvPr id="2" name="Title 1">
             <a:extLst>
               <a:ext uri="{FF2B5EF4-FFF2-40B4-BE49-F238E27FC236}">
-                <a16:creationId xmlns:a16="http://schemas.microsoft.com/office/drawing/2014/main" id="{EB7C4089-1746-624B-8E73-D3DAB8E88CDD}"/>
+                <a16:creationId xmlns:a16="http://schemas.microsoft.com/office/drawing/2014/main" id="{9D8D6E4C-FC36-3E4C-9387-96DD20072D9D}"/>
               </a:ext>
             </a:extLst>
           </p:cNvPr>
@@ -10990,27 +11331,32 @@
             <a:spLocks noGrp="1"/>
           </p:cNvSpPr>
           <p:nvPr>
-            <p:ph type="title"/>
-          </p:nvPr>
-        </p:nvSpPr>
-        <p:spPr/>
+            <p:ph type="ctrTitle"/>
+          </p:nvPr>
+        </p:nvSpPr>
+        <p:spPr>
+          <a:xfrm>
+            <a:off x="1524000" y="914013"/>
+            <a:ext cx="9144000" cy="2387600"/>
+          </a:xfrm>
+        </p:spPr>
         <p:txBody>
           <a:bodyPr/>
           <a:lstStyle/>
           <a:p>
             <a:r>
               <a:rPr lang="en-US" dirty="0"/>
-              <a:t>References</a:t>
-            </a:r>
-          </a:p>
-        </p:txBody>
-      </p:sp>
-      <p:sp>
-        <p:nvSpPr>
-          <p:cNvPr id="3" name="Content Placeholder 2">
+              <a:t>Part VII</a:t>
+            </a:r>
+          </a:p>
+        </p:txBody>
+      </p:sp>
+      <p:sp>
+        <p:nvSpPr>
+          <p:cNvPr id="3" name="Subtitle 2">
             <a:extLst>
               <a:ext uri="{FF2B5EF4-FFF2-40B4-BE49-F238E27FC236}">
-                <a16:creationId xmlns:a16="http://schemas.microsoft.com/office/drawing/2014/main" id="{65426B10-0364-A849-B3A4-1D0DA409155A}"/>
+                <a16:creationId xmlns:a16="http://schemas.microsoft.com/office/drawing/2014/main" id="{0451A0DE-9D64-5A48-94B5-5B4E42709819}"/>
               </a:ext>
             </a:extLst>
           </p:cNvPr>
@@ -11018,145 +11364,30 @@
             <a:spLocks noGrp="1"/>
           </p:cNvSpPr>
           <p:nvPr>
-            <p:ph idx="1"/>
-          </p:nvPr>
-        </p:nvSpPr>
-        <p:spPr/>
-        <p:txBody>
-          <a:bodyPr>
-            <a:normAutofit lnSpcReduction="10000"/>
-          </a:bodyPr>
-          <a:lstStyle/>
-          <a:p>
-            <a:r>
-              <a:rPr lang="en-US" dirty="0">
-                <a:hlinkClick r:id="rId2"/>
-              </a:rPr>
-              <a:t>https://www.linkedin.com/pulse/why-rest-api-so-popular-mangesh-bulkar/</a:t>
-            </a:r>
-            <a:endParaRPr lang="en-US" dirty="0">
-              <a:hlinkClick r:id="rId3"/>
-            </a:endParaRPr>
-          </a:p>
-          <a:p>
-            <a:r>
-              <a:rPr lang="en-US" dirty="0">
-                <a:hlinkClick r:id="rId3"/>
-              </a:rPr>
-              <a:t>https://en.wikipedia.org/wiki/CURL</a:t>
-            </a:r>
-            <a:endParaRPr lang="en-US" dirty="0"/>
-          </a:p>
-          <a:p>
-            <a:r>
-              <a:rPr lang="en-US" dirty="0">
-                <a:hlinkClick r:id="rId4"/>
-              </a:rPr>
-              <a:t>https://en.wikipedia.org/wiki/Requests_%28software%29</a:t>
-            </a:r>
-            <a:endParaRPr lang="en-US" dirty="0"/>
-          </a:p>
-          <a:p>
-            <a:r>
-              <a:rPr lang="en-US" dirty="0">
-                <a:hlinkClick r:id="rId5"/>
-              </a:rPr>
-              <a:t>https://curl.haxx.se</a:t>
-            </a:r>
-            <a:endParaRPr lang="en-US" dirty="0"/>
-          </a:p>
-          <a:p>
-            <a:r>
-              <a:rPr lang="en-US" dirty="0">
-                <a:hlinkClick r:id="rId6"/>
-              </a:rPr>
-              <a:t>https://requests.readthedocs.io/en/master/</a:t>
-            </a:r>
-            <a:endParaRPr lang="en-US" dirty="0"/>
-          </a:p>
-          <a:p>
-            <a:r>
-              <a:rPr lang="en-US" dirty="0"/>
-              <a:t>Cisco API documentation #1</a:t>
-            </a:r>
-          </a:p>
-          <a:p>
-            <a:r>
-              <a:rPr lang="en-US" dirty="0"/>
-              <a:t>Cisco API documentation #2</a:t>
-            </a:r>
-          </a:p>
-          <a:p>
-            <a:r>
-              <a:rPr lang="en-US" dirty="0"/>
-              <a:t>Cisco API documentation #3</a:t>
-            </a:r>
-          </a:p>
-        </p:txBody>
-      </p:sp>
-      <p:sp>
-        <p:nvSpPr>
-          <p:cNvPr id="4" name="Date Placeholder 3">
-            <a:extLst>
-              <a:ext uri="{FF2B5EF4-FFF2-40B4-BE49-F238E27FC236}">
-                <a16:creationId xmlns:a16="http://schemas.microsoft.com/office/drawing/2014/main" id="{7ECEAF79-F4AC-E94E-9E55-220D0D396924}"/>
-              </a:ext>
-            </a:extLst>
-          </p:cNvPr>
-          <p:cNvSpPr>
-            <a:spLocks noGrp="1"/>
-          </p:cNvSpPr>
-          <p:nvPr>
-            <p:ph type="dt" sz="half" idx="10"/>
-          </p:nvPr>
-        </p:nvSpPr>
-        <p:spPr/>
+            <p:ph type="subTitle" idx="1"/>
+          </p:nvPr>
+        </p:nvSpPr>
+        <p:spPr>
+          <a:xfrm>
+            <a:off x="1524000" y="3393688"/>
+            <a:ext cx="9144000" cy="1655762"/>
+          </a:xfrm>
+        </p:spPr>
         <p:txBody>
           <a:bodyPr/>
           <a:lstStyle/>
           <a:p>
             <a:r>
-              <a:rPr lang="en-US"/>
-              <a:t>World Wide Technology ©</a:t>
-            </a:r>
-            <a:endParaRPr lang="en-US" dirty="0"/>
-          </a:p>
-        </p:txBody>
-      </p:sp>
-      <p:sp>
-        <p:nvSpPr>
-          <p:cNvPr id="5" name="Slide Number Placeholder 4">
-            <a:extLst>
-              <a:ext uri="{FF2B5EF4-FFF2-40B4-BE49-F238E27FC236}">
-                <a16:creationId xmlns:a16="http://schemas.microsoft.com/office/drawing/2014/main" id="{372DC1A4-CE8B-DB4A-8F86-2508518C35D3}"/>
-              </a:ext>
-            </a:extLst>
-          </p:cNvPr>
-          <p:cNvSpPr>
-            <a:spLocks noGrp="1"/>
-          </p:cNvSpPr>
-          <p:nvPr>
-            <p:ph type="sldNum" sz="quarter" idx="12"/>
-          </p:nvPr>
-        </p:nvSpPr>
-        <p:spPr/>
-        <p:txBody>
-          <a:bodyPr/>
-          <a:lstStyle/>
-          <a:p>
-            <a:fld id="{A44B02FA-DD2D-1844-AE35-8B2EAB0CF4EF}" type="slidenum">
-              <a:rPr lang="en-US" smtClean="0"/>
-              <a:pPr/>
-              <a:t>23</a:t>
-            </a:fld>
-            <a:endParaRPr lang="en-US" dirty="0"/>
+              <a:rPr lang="en-US" dirty="0"/>
+              <a:t>Quiz, Practice Resources, &amp; References</a:t>
+            </a:r>
           </a:p>
         </p:txBody>
       </p:sp>
     </p:spTree>
     <p:extLst>
       <p:ext uri="{BB962C8B-B14F-4D97-AF65-F5344CB8AC3E}">
-        <p14:creationId xmlns:p14="http://schemas.microsoft.com/office/powerpoint/2010/main" val="3225595977"/>
+        <p14:creationId xmlns:p14="http://schemas.microsoft.com/office/powerpoint/2010/main" val="3392886013"/>
       </p:ext>
     </p:extLst>
   </p:cSld>
@@ -11197,6 +11428,381 @@
       </p:grpSpPr>
       <p:sp>
         <p:nvSpPr>
+          <p:cNvPr id="2" name="Title 1">
+            <a:extLst>
+              <a:ext uri="{FF2B5EF4-FFF2-40B4-BE49-F238E27FC236}">
+                <a16:creationId xmlns:a16="http://schemas.microsoft.com/office/drawing/2014/main" id="{EB7C4089-1746-624B-8E73-D3DAB8E88CDD}"/>
+              </a:ext>
+            </a:extLst>
+          </p:cNvPr>
+          <p:cNvSpPr>
+            <a:spLocks noGrp="1"/>
+          </p:cNvSpPr>
+          <p:nvPr>
+            <p:ph type="title"/>
+          </p:nvPr>
+        </p:nvSpPr>
+        <p:spPr/>
+        <p:txBody>
+          <a:bodyPr/>
+          <a:lstStyle/>
+          <a:p>
+            <a:r>
+              <a:rPr lang="en-US" dirty="0"/>
+              <a:t>Slide Template</a:t>
+            </a:r>
+          </a:p>
+        </p:txBody>
+      </p:sp>
+      <p:sp>
+        <p:nvSpPr>
+          <p:cNvPr id="3" name="Content Placeholder 2">
+            <a:extLst>
+              <a:ext uri="{FF2B5EF4-FFF2-40B4-BE49-F238E27FC236}">
+                <a16:creationId xmlns:a16="http://schemas.microsoft.com/office/drawing/2014/main" id="{65426B10-0364-A849-B3A4-1D0DA409155A}"/>
+              </a:ext>
+            </a:extLst>
+          </p:cNvPr>
+          <p:cNvSpPr>
+            <a:spLocks noGrp="1"/>
+          </p:cNvSpPr>
+          <p:nvPr>
+            <p:ph idx="1"/>
+          </p:nvPr>
+        </p:nvSpPr>
+        <p:spPr/>
+        <p:txBody>
+          <a:bodyPr/>
+          <a:lstStyle/>
+          <a:p>
+            <a:r>
+              <a:rPr lang="en-US" dirty="0"/>
+              <a:t>Body template</a:t>
+            </a:r>
+          </a:p>
+        </p:txBody>
+      </p:sp>
+      <p:sp>
+        <p:nvSpPr>
+          <p:cNvPr id="4" name="Date Placeholder 3">
+            <a:extLst>
+              <a:ext uri="{FF2B5EF4-FFF2-40B4-BE49-F238E27FC236}">
+                <a16:creationId xmlns:a16="http://schemas.microsoft.com/office/drawing/2014/main" id="{7ECEAF79-F4AC-E94E-9E55-220D0D396924}"/>
+              </a:ext>
+            </a:extLst>
+          </p:cNvPr>
+          <p:cNvSpPr>
+            <a:spLocks noGrp="1"/>
+          </p:cNvSpPr>
+          <p:nvPr>
+            <p:ph type="dt" sz="half" idx="10"/>
+          </p:nvPr>
+        </p:nvSpPr>
+        <p:spPr/>
+        <p:txBody>
+          <a:bodyPr/>
+          <a:lstStyle/>
+          <a:p>
+            <a:r>
+              <a:rPr lang="en-US"/>
+              <a:t>World Wide Technology ©</a:t>
+            </a:r>
+            <a:endParaRPr lang="en-US" dirty="0"/>
+          </a:p>
+        </p:txBody>
+      </p:sp>
+      <p:sp>
+        <p:nvSpPr>
+          <p:cNvPr id="5" name="Slide Number Placeholder 4">
+            <a:extLst>
+              <a:ext uri="{FF2B5EF4-FFF2-40B4-BE49-F238E27FC236}">
+                <a16:creationId xmlns:a16="http://schemas.microsoft.com/office/drawing/2014/main" id="{372DC1A4-CE8B-DB4A-8F86-2508518C35D3}"/>
+              </a:ext>
+            </a:extLst>
+          </p:cNvPr>
+          <p:cNvSpPr>
+            <a:spLocks noGrp="1"/>
+          </p:cNvSpPr>
+          <p:nvPr>
+            <p:ph type="sldNum" sz="quarter" idx="12"/>
+          </p:nvPr>
+        </p:nvSpPr>
+        <p:spPr/>
+        <p:txBody>
+          <a:bodyPr/>
+          <a:lstStyle/>
+          <a:p>
+            <a:fld id="{A44B02FA-DD2D-1844-AE35-8B2EAB0CF4EF}" type="slidenum">
+              <a:rPr lang="en-US" smtClean="0"/>
+              <a:pPr/>
+              <a:t>24</a:t>
+            </a:fld>
+            <a:endParaRPr lang="en-US" dirty="0"/>
+          </a:p>
+        </p:txBody>
+      </p:sp>
+    </p:spTree>
+    <p:extLst>
+      <p:ext uri="{BB962C8B-B14F-4D97-AF65-F5344CB8AC3E}">
+        <p14:creationId xmlns:p14="http://schemas.microsoft.com/office/powerpoint/2010/main" val="2709408928"/>
+      </p:ext>
+    </p:extLst>
+  </p:cSld>
+  <p:clrMapOvr>
+    <a:masterClrMapping/>
+  </p:clrMapOvr>
+  <mc:AlternateContent xmlns:mc="http://schemas.openxmlformats.org/markup-compatibility/2006" xmlns:p14="http://schemas.microsoft.com/office/powerpoint/2010/main">
+    <mc:Choice Requires="p14">
+      <p:transition spd="med" p14:dur="700">
+        <p:fade/>
+      </p:transition>
+    </mc:Choice>
+    <mc:Fallback xmlns="">
+      <p:transition spd="med">
+        <p:fade/>
+      </p:transition>
+    </mc:Fallback>
+  </mc:AlternateContent>
+</p:sld>
+</file>
+
+<file path=ppt/slides/slide25.xml><?xml version="1.0" encoding="utf-8"?>
+<p:sld xmlns:a="http://schemas.openxmlformats.org/drawingml/2006/main" xmlns:r="http://schemas.openxmlformats.org/officeDocument/2006/relationships" xmlns:p="http://schemas.openxmlformats.org/presentationml/2006/main">
+  <p:cSld>
+    <p:spTree>
+      <p:nvGrpSpPr>
+        <p:cNvPr id="1" name=""/>
+        <p:cNvGrpSpPr/>
+        <p:nvPr/>
+      </p:nvGrpSpPr>
+      <p:grpSpPr>
+        <a:xfrm>
+          <a:off x="0" y="0"/>
+          <a:ext cx="0" cy="0"/>
+          <a:chOff x="0" y="0"/>
+          <a:chExt cx="0" cy="0"/>
+        </a:xfrm>
+      </p:grpSpPr>
+      <p:sp>
+        <p:nvSpPr>
+          <p:cNvPr id="2" name="Title 1">
+            <a:extLst>
+              <a:ext uri="{FF2B5EF4-FFF2-40B4-BE49-F238E27FC236}">
+                <a16:creationId xmlns:a16="http://schemas.microsoft.com/office/drawing/2014/main" id="{EB7C4089-1746-624B-8E73-D3DAB8E88CDD}"/>
+              </a:ext>
+            </a:extLst>
+          </p:cNvPr>
+          <p:cNvSpPr>
+            <a:spLocks noGrp="1"/>
+          </p:cNvSpPr>
+          <p:nvPr>
+            <p:ph type="title"/>
+          </p:nvPr>
+        </p:nvSpPr>
+        <p:spPr/>
+        <p:txBody>
+          <a:bodyPr/>
+          <a:lstStyle/>
+          <a:p>
+            <a:r>
+              <a:rPr lang="en-US" dirty="0"/>
+              <a:t>References</a:t>
+            </a:r>
+          </a:p>
+        </p:txBody>
+      </p:sp>
+      <p:sp>
+        <p:nvSpPr>
+          <p:cNvPr id="3" name="Content Placeholder 2">
+            <a:extLst>
+              <a:ext uri="{FF2B5EF4-FFF2-40B4-BE49-F238E27FC236}">
+                <a16:creationId xmlns:a16="http://schemas.microsoft.com/office/drawing/2014/main" id="{65426B10-0364-A849-B3A4-1D0DA409155A}"/>
+              </a:ext>
+            </a:extLst>
+          </p:cNvPr>
+          <p:cNvSpPr>
+            <a:spLocks noGrp="1"/>
+          </p:cNvSpPr>
+          <p:nvPr>
+            <p:ph idx="1"/>
+          </p:nvPr>
+        </p:nvSpPr>
+        <p:spPr/>
+        <p:txBody>
+          <a:bodyPr>
+            <a:normAutofit lnSpcReduction="10000"/>
+          </a:bodyPr>
+          <a:lstStyle/>
+          <a:p>
+            <a:r>
+              <a:rPr lang="en-US" dirty="0">
+                <a:hlinkClick r:id="rId2"/>
+              </a:rPr>
+              <a:t>https://www.linkedin.com/pulse/why-rest-api-so-popular-mangesh-bulkar/</a:t>
+            </a:r>
+            <a:endParaRPr lang="en-US" dirty="0">
+              <a:hlinkClick r:id="rId3"/>
+            </a:endParaRPr>
+          </a:p>
+          <a:p>
+            <a:r>
+              <a:rPr lang="en-US" dirty="0">
+                <a:hlinkClick r:id="rId3"/>
+              </a:rPr>
+              <a:t>https://en.wikipedia.org/wiki/CURL</a:t>
+            </a:r>
+            <a:endParaRPr lang="en-US" dirty="0"/>
+          </a:p>
+          <a:p>
+            <a:r>
+              <a:rPr lang="en-US" dirty="0">
+                <a:hlinkClick r:id="rId4"/>
+              </a:rPr>
+              <a:t>https://en.wikipedia.org/wiki/Requests_%28software%29</a:t>
+            </a:r>
+            <a:endParaRPr lang="en-US" dirty="0"/>
+          </a:p>
+          <a:p>
+            <a:r>
+              <a:rPr lang="en-US" dirty="0">
+                <a:hlinkClick r:id="rId5"/>
+              </a:rPr>
+              <a:t>https://curl.haxx.se</a:t>
+            </a:r>
+            <a:endParaRPr lang="en-US" dirty="0"/>
+          </a:p>
+          <a:p>
+            <a:r>
+              <a:rPr lang="en-US" dirty="0">
+                <a:hlinkClick r:id="rId6"/>
+              </a:rPr>
+              <a:t>https://requests.readthedocs.io/en/master/</a:t>
+            </a:r>
+            <a:endParaRPr lang="en-US" dirty="0"/>
+          </a:p>
+          <a:p>
+            <a:r>
+              <a:rPr lang="en-US" dirty="0"/>
+              <a:t>Cisco API documentation #1</a:t>
+            </a:r>
+          </a:p>
+          <a:p>
+            <a:r>
+              <a:rPr lang="en-US" dirty="0"/>
+              <a:t>Cisco API documentation #2</a:t>
+            </a:r>
+          </a:p>
+          <a:p>
+            <a:r>
+              <a:rPr lang="en-US" dirty="0"/>
+              <a:t>Cisco API documentation #3</a:t>
+            </a:r>
+          </a:p>
+        </p:txBody>
+      </p:sp>
+      <p:sp>
+        <p:nvSpPr>
+          <p:cNvPr id="4" name="Date Placeholder 3">
+            <a:extLst>
+              <a:ext uri="{FF2B5EF4-FFF2-40B4-BE49-F238E27FC236}">
+                <a16:creationId xmlns:a16="http://schemas.microsoft.com/office/drawing/2014/main" id="{7ECEAF79-F4AC-E94E-9E55-220D0D396924}"/>
+              </a:ext>
+            </a:extLst>
+          </p:cNvPr>
+          <p:cNvSpPr>
+            <a:spLocks noGrp="1"/>
+          </p:cNvSpPr>
+          <p:nvPr>
+            <p:ph type="dt" sz="half" idx="10"/>
+          </p:nvPr>
+        </p:nvSpPr>
+        <p:spPr/>
+        <p:txBody>
+          <a:bodyPr/>
+          <a:lstStyle/>
+          <a:p>
+            <a:r>
+              <a:rPr lang="en-US"/>
+              <a:t>World Wide Technology ©</a:t>
+            </a:r>
+            <a:endParaRPr lang="en-US" dirty="0"/>
+          </a:p>
+        </p:txBody>
+      </p:sp>
+      <p:sp>
+        <p:nvSpPr>
+          <p:cNvPr id="5" name="Slide Number Placeholder 4">
+            <a:extLst>
+              <a:ext uri="{FF2B5EF4-FFF2-40B4-BE49-F238E27FC236}">
+                <a16:creationId xmlns:a16="http://schemas.microsoft.com/office/drawing/2014/main" id="{372DC1A4-CE8B-DB4A-8F86-2508518C35D3}"/>
+              </a:ext>
+            </a:extLst>
+          </p:cNvPr>
+          <p:cNvSpPr>
+            <a:spLocks noGrp="1"/>
+          </p:cNvSpPr>
+          <p:nvPr>
+            <p:ph type="sldNum" sz="quarter" idx="12"/>
+          </p:nvPr>
+        </p:nvSpPr>
+        <p:spPr/>
+        <p:txBody>
+          <a:bodyPr/>
+          <a:lstStyle/>
+          <a:p>
+            <a:fld id="{A44B02FA-DD2D-1844-AE35-8B2EAB0CF4EF}" type="slidenum">
+              <a:rPr lang="en-US" smtClean="0"/>
+              <a:pPr/>
+              <a:t>25</a:t>
+            </a:fld>
+            <a:endParaRPr lang="en-US" dirty="0"/>
+          </a:p>
+        </p:txBody>
+      </p:sp>
+    </p:spTree>
+    <p:extLst>
+      <p:ext uri="{BB962C8B-B14F-4D97-AF65-F5344CB8AC3E}">
+        <p14:creationId xmlns:p14="http://schemas.microsoft.com/office/powerpoint/2010/main" val="3225595977"/>
+      </p:ext>
+    </p:extLst>
+  </p:cSld>
+  <p:clrMapOvr>
+    <a:masterClrMapping/>
+  </p:clrMapOvr>
+  <mc:AlternateContent xmlns:mc="http://schemas.openxmlformats.org/markup-compatibility/2006" xmlns:p14="http://schemas.microsoft.com/office/powerpoint/2010/main">
+    <mc:Choice Requires="p14">
+      <p:transition spd="med" p14:dur="700">
+        <p:fade/>
+      </p:transition>
+    </mc:Choice>
+    <mc:Fallback xmlns="">
+      <p:transition spd="med">
+        <p:fade/>
+      </p:transition>
+    </mc:Fallback>
+  </mc:AlternateContent>
+</p:sld>
+</file>
+
+<file path=ppt/slides/slide26.xml><?xml version="1.0" encoding="utf-8"?>
+<p:sld xmlns:a="http://schemas.openxmlformats.org/drawingml/2006/main" xmlns:r="http://schemas.openxmlformats.org/officeDocument/2006/relationships" xmlns:p="http://schemas.openxmlformats.org/presentationml/2006/main">
+  <p:cSld>
+    <p:spTree>
+      <p:nvGrpSpPr>
+        <p:cNvPr id="1" name=""/>
+        <p:cNvGrpSpPr/>
+        <p:nvPr/>
+      </p:nvGrpSpPr>
+      <p:grpSpPr>
+        <a:xfrm>
+          <a:off x="0" y="0"/>
+          <a:ext cx="0" cy="0"/>
+          <a:chOff x="0" y="0"/>
+          <a:chExt cx="0" cy="0"/>
+        </a:xfrm>
+      </p:grpSpPr>
+      <p:sp>
+        <p:nvSpPr>
           <p:cNvPr id="4" name="Date Placeholder 3">
             <a:extLst>
               <a:ext uri="{FF2B5EF4-FFF2-40B4-BE49-F238E27FC236}">
@@ -11248,7 +11854,7 @@
             <a:fld id="{A44B02FA-DD2D-1844-AE35-8B2EAB0CF4EF}" type="slidenum">
               <a:rPr lang="en-US" smtClean="0"/>
               <a:pPr/>
-              <a:t>24</a:t>
+              <a:t>26</a:t>
             </a:fld>
             <a:endParaRPr lang="en-US" dirty="0"/>
           </a:p>
@@ -11454,13 +12060,8 @@
           <a:p>
             <a:r>
               <a:rPr lang="en-US" dirty="0"/>
-              <a:t>Create a Docker Container for </a:t>
-            </a:r>
-            <a:r>
-              <a:rPr lang="en-US"/>
-              <a:t>the hands-on exercises</a:t>
-            </a:r>
-            <a:endParaRPr lang="en-US" dirty="0"/>
+              <a:t>Create a Docker Container for the hands-on exercises</a:t>
+            </a:r>
           </a:p>
           <a:p>
             <a:pPr marL="457200" lvl="1" indent="0">
@@ -11681,6 +12282,107 @@
       </p:grpSpPr>
       <p:sp>
         <p:nvSpPr>
+          <p:cNvPr id="4" name="Date Placeholder 3">
+            <a:extLst>
+              <a:ext uri="{FF2B5EF4-FFF2-40B4-BE49-F238E27FC236}">
+                <a16:creationId xmlns:a16="http://schemas.microsoft.com/office/drawing/2014/main" id="{0CD670A9-B06A-3448-BABA-FAD627500859}"/>
+              </a:ext>
+            </a:extLst>
+          </p:cNvPr>
+          <p:cNvSpPr>
+            <a:spLocks noGrp="1"/>
+          </p:cNvSpPr>
+          <p:nvPr>
+            <p:ph type="dt" sz="half" idx="10"/>
+          </p:nvPr>
+        </p:nvSpPr>
+        <p:spPr/>
+        <p:txBody>
+          <a:bodyPr/>
+          <a:lstStyle/>
+          <a:p>
+            <a:r>
+              <a:rPr lang="en-US"/>
+              <a:t>World Wide Technology ©</a:t>
+            </a:r>
+            <a:endParaRPr lang="en-US" dirty="0"/>
+          </a:p>
+        </p:txBody>
+      </p:sp>
+      <p:sp>
+        <p:nvSpPr>
+          <p:cNvPr id="5" name="Slide Number Placeholder 4">
+            <a:extLst>
+              <a:ext uri="{FF2B5EF4-FFF2-40B4-BE49-F238E27FC236}">
+                <a16:creationId xmlns:a16="http://schemas.microsoft.com/office/drawing/2014/main" id="{119DACAD-17C1-C249-A498-C4A1A1ADD334}"/>
+              </a:ext>
+            </a:extLst>
+          </p:cNvPr>
+          <p:cNvSpPr>
+            <a:spLocks noGrp="1"/>
+          </p:cNvSpPr>
+          <p:nvPr>
+            <p:ph type="sldNum" sz="quarter" idx="12"/>
+          </p:nvPr>
+        </p:nvSpPr>
+        <p:spPr/>
+        <p:txBody>
+          <a:bodyPr/>
+          <a:lstStyle/>
+          <a:p>
+            <a:fld id="{A44B02FA-DD2D-1844-AE35-8B2EAB0CF4EF}" type="slidenum">
+              <a:rPr lang="en-US" smtClean="0"/>
+              <a:pPr/>
+              <a:t>4</a:t>
+            </a:fld>
+            <a:endParaRPr lang="en-US" dirty="0"/>
+          </a:p>
+        </p:txBody>
+      </p:sp>
+    </p:spTree>
+    <p:extLst>
+      <p:ext uri="{BB962C8B-B14F-4D97-AF65-F5344CB8AC3E}">
+        <p14:creationId xmlns:p14="http://schemas.microsoft.com/office/powerpoint/2010/main" val="3701252343"/>
+      </p:ext>
+    </p:extLst>
+  </p:cSld>
+  <p:clrMapOvr>
+    <a:masterClrMapping/>
+  </p:clrMapOvr>
+  <mc:AlternateContent xmlns:mc="http://schemas.openxmlformats.org/markup-compatibility/2006" xmlns:p14="http://schemas.microsoft.com/office/powerpoint/2010/main">
+    <mc:Choice Requires="p14">
+      <p:transition spd="med" p14:dur="700">
+        <p:fade/>
+      </p:transition>
+    </mc:Choice>
+    <mc:Fallback xmlns="">
+      <p:transition spd="med">
+        <p:fade/>
+      </p:transition>
+    </mc:Fallback>
+  </mc:AlternateContent>
+</p:sld>
+</file>
+
+<file path=ppt/slides/slide5.xml><?xml version="1.0" encoding="utf-8"?>
+<p:sld xmlns:a="http://schemas.openxmlformats.org/drawingml/2006/main" xmlns:r="http://schemas.openxmlformats.org/officeDocument/2006/relationships" xmlns:p="http://schemas.openxmlformats.org/presentationml/2006/main">
+  <p:cSld>
+    <p:spTree>
+      <p:nvGrpSpPr>
+        <p:cNvPr id="1" name=""/>
+        <p:cNvGrpSpPr/>
+        <p:nvPr/>
+      </p:nvGrpSpPr>
+      <p:grpSpPr>
+        <a:xfrm>
+          <a:off x="0" y="0"/>
+          <a:ext cx="0" cy="0"/>
+          <a:chOff x="0" y="0"/>
+          <a:chExt cx="0" cy="0"/>
+        </a:xfrm>
+      </p:grpSpPr>
+      <p:sp>
+        <p:nvSpPr>
           <p:cNvPr id="2" name="Title 1">
             <a:extLst>
               <a:ext uri="{FF2B5EF4-FFF2-40B4-BE49-F238E27FC236}">
@@ -11770,7 +12472,7 @@
 </p:sld>
 </file>
 
-<file path=ppt/slides/slide5.xml><?xml version="1.0" encoding="utf-8"?>
+<file path=ppt/slides/slide6.xml><?xml version="1.0" encoding="utf-8"?>
 <p:sld xmlns:a="http://schemas.openxmlformats.org/drawingml/2006/main" xmlns:r="http://schemas.openxmlformats.org/officeDocument/2006/relationships" xmlns:p="http://schemas.openxmlformats.org/presentationml/2006/main">
   <p:cSld>
     <p:spTree>
@@ -12122,7 +12824,7 @@
             <a:fld id="{A44B02FA-DD2D-1844-AE35-8B2EAB0CF4EF}" type="slidenum">
               <a:rPr lang="en-US" smtClean="0"/>
               <a:pPr/>
-              <a:t>5</a:t>
+              <a:t>6</a:t>
             </a:fld>
             <a:endParaRPr lang="en-US" dirty="0"/>
           </a:p>
@@ -12544,7 +13246,7 @@
 </p:sld>
 </file>
 
-<file path=ppt/slides/slide6.xml><?xml version="1.0" encoding="utf-8"?>
+<file path=ppt/slides/slide7.xml><?xml version="1.0" encoding="utf-8"?>
 <p:sld xmlns:a="http://schemas.openxmlformats.org/drawingml/2006/main" xmlns:r="http://schemas.openxmlformats.org/officeDocument/2006/relationships" xmlns:p="http://schemas.openxmlformats.org/presentationml/2006/main">
   <p:cSld>
     <p:spTree>
@@ -12657,7 +13359,7 @@
 </p:sld>
 </file>
 
-<file path=ppt/slides/slide7.xml><?xml version="1.0" encoding="utf-8"?>
+<file path=ppt/slides/slide8.xml><?xml version="1.0" encoding="utf-8"?>
 <p:sld xmlns:a="http://schemas.openxmlformats.org/drawingml/2006/main" xmlns:r="http://schemas.openxmlformats.org/officeDocument/2006/relationships" xmlns:p="http://schemas.openxmlformats.org/presentationml/2006/main">
   <p:cSld>
     <p:spTree>
@@ -13038,7 +13740,7 @@
             <a:fld id="{A44B02FA-DD2D-1844-AE35-8B2EAB0CF4EF}" type="slidenum">
               <a:rPr lang="en-US" smtClean="0"/>
               <a:pPr/>
-              <a:t>7</a:t>
+              <a:t>8</a:t>
             </a:fld>
             <a:endParaRPr lang="en-US" dirty="0"/>
           </a:p>
@@ -13209,7 +13911,7 @@
 </p:sld>
 </file>
 
-<file path=ppt/slides/slide8.xml><?xml version="1.0" encoding="utf-8"?>
+<file path=ppt/slides/slide9.xml><?xml version="1.0" encoding="utf-8"?>
 <p:sld xmlns:a="http://schemas.openxmlformats.org/drawingml/2006/main" xmlns:r="http://schemas.openxmlformats.org/officeDocument/2006/relationships" xmlns:p="http://schemas.openxmlformats.org/presentationml/2006/main">
   <p:cSld>
     <p:spTree>
@@ -13361,7 +14063,7 @@
             <a:fld id="{A44B02FA-DD2D-1844-AE35-8B2EAB0CF4EF}" type="slidenum">
               <a:rPr lang="en-US" smtClean="0"/>
               <a:pPr/>
-              <a:t>8</a:t>
+              <a:t>9</a:t>
             </a:fld>
             <a:endParaRPr lang="en-US" dirty="0"/>
           </a:p>
@@ -13389,405 +14091,6 @@
       </p:transition>
     </mc:Fallback>
   </mc:AlternateContent>
-</p:sld>
-</file>
-
-<file path=ppt/slides/slide9.xml><?xml version="1.0" encoding="utf-8"?>
-<p:sld xmlns:a="http://schemas.openxmlformats.org/drawingml/2006/main" xmlns:r="http://schemas.openxmlformats.org/officeDocument/2006/relationships" xmlns:p="http://schemas.openxmlformats.org/presentationml/2006/main">
-  <p:cSld>
-    <p:spTree>
-      <p:nvGrpSpPr>
-        <p:cNvPr id="1" name=""/>
-        <p:cNvGrpSpPr/>
-        <p:nvPr/>
-      </p:nvGrpSpPr>
-      <p:grpSpPr>
-        <a:xfrm>
-          <a:off x="0" y="0"/>
-          <a:ext cx="0" cy="0"/>
-          <a:chOff x="0" y="0"/>
-          <a:chExt cx="0" cy="0"/>
-        </a:xfrm>
-      </p:grpSpPr>
-      <p:sp>
-        <p:nvSpPr>
-          <p:cNvPr id="2" name="Title 1">
-            <a:extLst>
-              <a:ext uri="{FF2B5EF4-FFF2-40B4-BE49-F238E27FC236}">
-                <a16:creationId xmlns:a16="http://schemas.microsoft.com/office/drawing/2014/main" id="{178FC9BC-162C-754A-A134-D392F08CDBEE}"/>
-              </a:ext>
-            </a:extLst>
-          </p:cNvPr>
-          <p:cNvSpPr>
-            <a:spLocks noGrp="1"/>
-          </p:cNvSpPr>
-          <p:nvPr>
-            <p:ph type="title"/>
-          </p:nvPr>
-        </p:nvSpPr>
-        <p:spPr/>
-        <p:txBody>
-          <a:bodyPr/>
-          <a:lstStyle/>
-          <a:p>
-            <a:r>
-              <a:rPr lang="en-US" dirty="0" err="1"/>
-              <a:t>cURL</a:t>
-            </a:r>
-            <a:r>
-              <a:rPr lang="en-US" dirty="0"/>
-              <a:t> Syntax Format</a:t>
-            </a:r>
-          </a:p>
-        </p:txBody>
-      </p:sp>
-      <p:sp>
-        <p:nvSpPr>
-          <p:cNvPr id="3" name="Content Placeholder 2">
-            <a:extLst>
-              <a:ext uri="{FF2B5EF4-FFF2-40B4-BE49-F238E27FC236}">
-                <a16:creationId xmlns:a16="http://schemas.microsoft.com/office/drawing/2014/main" id="{0ECC7DC7-0671-F543-9991-CF8210E2567B}"/>
-              </a:ext>
-            </a:extLst>
-          </p:cNvPr>
-          <p:cNvSpPr>
-            <a:spLocks noGrp="1"/>
-          </p:cNvSpPr>
-          <p:nvPr>
-            <p:ph idx="1"/>
-          </p:nvPr>
-        </p:nvSpPr>
-        <p:spPr/>
-        <p:txBody>
-          <a:bodyPr/>
-          <a:lstStyle/>
-          <a:p>
-            <a:r>
-              <a:rPr lang="en-US" dirty="0"/>
-              <a:t>Open your preferred terminal (bash, PowerShell, </a:t>
-            </a:r>
-            <a:r>
-              <a:rPr lang="en-US" dirty="0" err="1"/>
-              <a:t>zsh</a:t>
-            </a:r>
-            <a:r>
-              <a:rPr lang="en-US" dirty="0"/>
-              <a:t>, etc.)</a:t>
-            </a:r>
-          </a:p>
-          <a:p>
-            <a:r>
-              <a:rPr lang="en-US" dirty="0"/>
-              <a:t>Enter the command:</a:t>
-            </a:r>
-          </a:p>
-          <a:p>
-            <a:pPr marL="457200" lvl="1" indent="0">
-              <a:buNone/>
-            </a:pPr>
-            <a:r>
-              <a:rPr lang="en-US" sz="2800" b="1" i="1" dirty="0">
-                <a:solidFill>
-                  <a:srgbClr val="FFFF00"/>
-                </a:solidFill>
-              </a:rPr>
-              <a:t>curl https://</a:t>
-            </a:r>
-            <a:r>
-              <a:rPr lang="en-US" sz="2800" b="1" i="1" dirty="0" err="1">
-                <a:solidFill>
-                  <a:srgbClr val="FFFF00"/>
-                </a:solidFill>
-              </a:rPr>
-              <a:t>www.website.com</a:t>
-            </a:r>
-            <a:endParaRPr lang="en-US" sz="2800" b="1" i="1" dirty="0">
-              <a:solidFill>
-                <a:srgbClr val="FFFF00"/>
-              </a:solidFill>
-            </a:endParaRPr>
-          </a:p>
-        </p:txBody>
-      </p:sp>
-      <p:sp>
-        <p:nvSpPr>
-          <p:cNvPr id="4" name="Date Placeholder 3">
-            <a:extLst>
-              <a:ext uri="{FF2B5EF4-FFF2-40B4-BE49-F238E27FC236}">
-                <a16:creationId xmlns:a16="http://schemas.microsoft.com/office/drawing/2014/main" id="{38C6DDB4-CE9E-4843-86A9-EFC27330D02F}"/>
-              </a:ext>
-            </a:extLst>
-          </p:cNvPr>
-          <p:cNvSpPr>
-            <a:spLocks noGrp="1"/>
-          </p:cNvSpPr>
-          <p:nvPr>
-            <p:ph type="dt" sz="half" idx="10"/>
-          </p:nvPr>
-        </p:nvSpPr>
-        <p:spPr/>
-        <p:txBody>
-          <a:bodyPr/>
-          <a:lstStyle/>
-          <a:p>
-            <a:r>
-              <a:rPr lang="en-US"/>
-              <a:t>World Wide Technology ©</a:t>
-            </a:r>
-            <a:endParaRPr lang="en-US" dirty="0"/>
-          </a:p>
-        </p:txBody>
-      </p:sp>
-      <p:sp>
-        <p:nvSpPr>
-          <p:cNvPr id="5" name="Slide Number Placeholder 4">
-            <a:extLst>
-              <a:ext uri="{FF2B5EF4-FFF2-40B4-BE49-F238E27FC236}">
-                <a16:creationId xmlns:a16="http://schemas.microsoft.com/office/drawing/2014/main" id="{09AD6D8E-DFAE-8E42-9152-B189D9284AD9}"/>
-              </a:ext>
-            </a:extLst>
-          </p:cNvPr>
-          <p:cNvSpPr>
-            <a:spLocks noGrp="1"/>
-          </p:cNvSpPr>
-          <p:nvPr>
-            <p:ph type="sldNum" sz="quarter" idx="12"/>
-          </p:nvPr>
-        </p:nvSpPr>
-        <p:spPr/>
-        <p:txBody>
-          <a:bodyPr/>
-          <a:lstStyle/>
-          <a:p>
-            <a:fld id="{A44B02FA-DD2D-1844-AE35-8B2EAB0CF4EF}" type="slidenum">
-              <a:rPr lang="en-US" smtClean="0"/>
-              <a:pPr/>
-              <a:t>9</a:t>
-            </a:fld>
-            <a:endParaRPr lang="en-US" dirty="0"/>
-          </a:p>
-        </p:txBody>
-      </p:sp>
-    </p:spTree>
-    <p:extLst>
-      <p:ext uri="{BB962C8B-B14F-4D97-AF65-F5344CB8AC3E}">
-        <p14:creationId xmlns:p14="http://schemas.microsoft.com/office/powerpoint/2010/main" val="593970204"/>
-      </p:ext>
-    </p:extLst>
-  </p:cSld>
-  <p:clrMapOvr>
-    <a:masterClrMapping/>
-  </p:clrMapOvr>
-  <mc:AlternateContent xmlns:mc="http://schemas.openxmlformats.org/markup-compatibility/2006" xmlns:p14="http://schemas.microsoft.com/office/powerpoint/2010/main">
-    <mc:Choice Requires="p14">
-      <p:transition spd="med" p14:dur="700">
-        <p:fade/>
-      </p:transition>
-    </mc:Choice>
-    <mc:Fallback xmlns="">
-      <p:transition spd="med">
-        <p:fade/>
-      </p:transition>
-    </mc:Fallback>
-  </mc:AlternateContent>
-  <p:timing>
-    <p:tnLst>
-      <p:par>
-        <p:cTn id="1" dur="indefinite" restart="never" nodeType="tmRoot">
-          <p:childTnLst>
-            <p:seq concurrent="1" nextAc="seek">
-              <p:cTn id="2" dur="indefinite" nodeType="mainSeq">
-                <p:childTnLst>
-                  <p:par>
-                    <p:cTn id="3" fill="hold">
-                      <p:stCondLst>
-                        <p:cond delay="indefinite"/>
-                      </p:stCondLst>
-                      <p:childTnLst>
-                        <p:par>
-                          <p:cTn id="4" fill="hold">
-                            <p:stCondLst>
-                              <p:cond delay="0"/>
-                            </p:stCondLst>
-                            <p:childTnLst>
-                              <p:par>
-                                <p:cTn id="5" presetID="9" presetClass="entr" presetSubtype="0" fill="hold" grpId="0" nodeType="clickEffect">
-                                  <p:stCondLst>
-                                    <p:cond delay="0"/>
-                                  </p:stCondLst>
-                                  <p:childTnLst>
-                                    <p:set>
-                                      <p:cBhvr>
-                                        <p:cTn id="6" dur="1" fill="hold">
-                                          <p:stCondLst>
-                                            <p:cond delay="0"/>
-                                          </p:stCondLst>
-                                        </p:cTn>
-                                        <p:tgtEl>
-                                          <p:spTgt spid="3">
-                                            <p:txEl>
-                                              <p:pRg st="0" end="0"/>
-                                            </p:txEl>
-                                          </p:spTgt>
-                                        </p:tgtEl>
-                                        <p:attrNameLst>
-                                          <p:attrName>style.visibility</p:attrName>
-                                        </p:attrNameLst>
-                                      </p:cBhvr>
-                                      <p:to>
-                                        <p:strVal val="visible"/>
-                                      </p:to>
-                                    </p:set>
-                                    <p:animEffect transition="in" filter="dissolve">
-                                      <p:cBhvr>
-                                        <p:cTn id="7" dur="500"/>
-                                        <p:tgtEl>
-                                          <p:spTgt spid="3">
-                                            <p:txEl>
-                                              <p:pRg st="0" end="0"/>
-                                            </p:txEl>
-                                          </p:spTgt>
-                                        </p:tgtEl>
-                                      </p:cBhvr>
-                                    </p:animEffect>
-                                  </p:childTnLst>
-                                </p:cTn>
-                              </p:par>
-                            </p:childTnLst>
-                          </p:cTn>
-                        </p:par>
-                      </p:childTnLst>
-                    </p:cTn>
-                  </p:par>
-                  <p:par>
-                    <p:cTn id="8" fill="hold">
-                      <p:stCondLst>
-                        <p:cond delay="indefinite"/>
-                      </p:stCondLst>
-                      <p:childTnLst>
-                        <p:par>
-                          <p:cTn id="9" fill="hold">
-                            <p:stCondLst>
-                              <p:cond delay="0"/>
-                            </p:stCondLst>
-                            <p:childTnLst>
-                              <p:par>
-                                <p:cTn id="10" presetID="9" presetClass="entr" presetSubtype="0" fill="hold" grpId="0" nodeType="clickEffect">
-                                  <p:stCondLst>
-                                    <p:cond delay="0"/>
-                                  </p:stCondLst>
-                                  <p:childTnLst>
-                                    <p:set>
-                                      <p:cBhvr>
-                                        <p:cTn id="11" dur="1" fill="hold">
-                                          <p:stCondLst>
-                                            <p:cond delay="0"/>
-                                          </p:stCondLst>
-                                        </p:cTn>
-                                        <p:tgtEl>
-                                          <p:spTgt spid="3">
-                                            <p:txEl>
-                                              <p:pRg st="1" end="1"/>
-                                            </p:txEl>
-                                          </p:spTgt>
-                                        </p:tgtEl>
-                                        <p:attrNameLst>
-                                          <p:attrName>style.visibility</p:attrName>
-                                        </p:attrNameLst>
-                                      </p:cBhvr>
-                                      <p:to>
-                                        <p:strVal val="visible"/>
-                                      </p:to>
-                                    </p:set>
-                                    <p:animEffect transition="in" filter="dissolve">
-                                      <p:cBhvr>
-                                        <p:cTn id="12" dur="500"/>
-                                        <p:tgtEl>
-                                          <p:spTgt spid="3">
-                                            <p:txEl>
-                                              <p:pRg st="1" end="1"/>
-                                            </p:txEl>
-                                          </p:spTgt>
-                                        </p:tgtEl>
-                                      </p:cBhvr>
-                                    </p:animEffect>
-                                  </p:childTnLst>
-                                </p:cTn>
-                              </p:par>
-                              <p:par>
-                                <p:cTn id="13" presetID="9" presetClass="entr" presetSubtype="0" fill="hold" grpId="0" nodeType="withEffect">
-                                  <p:stCondLst>
-                                    <p:cond delay="0"/>
-                                  </p:stCondLst>
-                                  <p:childTnLst>
-                                    <p:set>
-                                      <p:cBhvr>
-                                        <p:cTn id="14" dur="1" fill="hold">
-                                          <p:stCondLst>
-                                            <p:cond delay="0"/>
-                                          </p:stCondLst>
-                                        </p:cTn>
-                                        <p:tgtEl>
-                                          <p:spTgt spid="3">
-                                            <p:txEl>
-                                              <p:pRg st="2" end="2"/>
-                                            </p:txEl>
-                                          </p:spTgt>
-                                        </p:tgtEl>
-                                        <p:attrNameLst>
-                                          <p:attrName>style.visibility</p:attrName>
-                                        </p:attrNameLst>
-                                      </p:cBhvr>
-                                      <p:to>
-                                        <p:strVal val="visible"/>
-                                      </p:to>
-                                    </p:set>
-                                    <p:animEffect transition="in" filter="dissolve">
-                                      <p:cBhvr>
-                                        <p:cTn id="15" dur="500"/>
-                                        <p:tgtEl>
-                                          <p:spTgt spid="3">
-                                            <p:txEl>
-                                              <p:pRg st="2" end="2"/>
-                                            </p:txEl>
-                                          </p:spTgt>
-                                        </p:tgtEl>
-                                      </p:cBhvr>
-                                    </p:animEffect>
-                                  </p:childTnLst>
-                                </p:cTn>
-                              </p:par>
-                            </p:childTnLst>
-                          </p:cTn>
-                        </p:par>
-                      </p:childTnLst>
-                    </p:cTn>
-                  </p:par>
-                </p:childTnLst>
-              </p:cTn>
-              <p:prevCondLst>
-                <p:cond evt="onPrev" delay="0">
-                  <p:tgtEl>
-                    <p:sldTgt/>
-                  </p:tgtEl>
-                </p:cond>
-              </p:prevCondLst>
-              <p:nextCondLst>
-                <p:cond evt="onNext" delay="0">
-                  <p:tgtEl>
-                    <p:sldTgt/>
-                  </p:tgtEl>
-                </p:cond>
-              </p:nextCondLst>
-            </p:seq>
-          </p:childTnLst>
-        </p:cTn>
-      </p:par>
-    </p:tnLst>
-    <p:bldLst>
-      <p:bldP spid="3" grpId="0" build="p"/>
-    </p:bldLst>
-  </p:timing>
 </p:sld>
 </file>
 

</xml_diff>

<commit_message>
Minor formatting edits to 'cURL Syntax Format' slide
</commit_message>
<xml_diff>
--- a/curl-requests-foundations.pptx
+++ b/curl-requests-foundations.pptx
@@ -648,27 +648,11 @@
           <a:bodyPr/>
           <a:lstStyle/>
           <a:p>
-            <a:pPr marL="0" marR="0" lvl="0" indent="0" algn="l" defTabSz="914400" rtl="0" eaLnBrk="1" fontAlgn="auto" latinLnBrk="0" hangingPunct="1">
-              <a:lnSpc>
-                <a:spcPct val="100000"/>
-              </a:lnSpc>
-              <a:spcBef>
-                <a:spcPts val="0"/>
-              </a:spcBef>
-              <a:spcAft>
-                <a:spcPts val="0"/>
-              </a:spcAft>
-              <a:buClrTx/>
-              <a:buSzTx/>
-              <a:buFontTx/>
-              <a:buNone/>
-              <a:tabLst/>
-              <a:defRPr/>
-            </a:pPr>
             <a:r>
               <a:rPr lang="en-US" dirty="0"/>
               <a:t>// TODO</a:t>
             </a:r>
+            <a:endParaRPr lang="en-US" b="0" i="0" u="none" dirty="0"/>
           </a:p>
         </p:txBody>
       </p:sp>
@@ -689,7 +673,7 @@
           <a:p>
             <a:fld id="{020CF8D1-BA82-5045-ACF9-1AA42AD6A519}" type="slidenum">
               <a:rPr lang="en-US" smtClean="0"/>
-              <a:t>13</a:t>
+              <a:t>12</a:t>
             </a:fld>
             <a:endParaRPr lang="en-US"/>
           </a:p>
@@ -698,7 +682,7 @@
     </p:spTree>
     <p:extLst>
       <p:ext uri="{BB962C8B-B14F-4D97-AF65-F5344CB8AC3E}">
-        <p14:creationId xmlns:p14="http://schemas.microsoft.com/office/powerpoint/2010/main" val="778062090"/>
+        <p14:creationId xmlns:p14="http://schemas.microsoft.com/office/powerpoint/2010/main" val="2398170700"/>
       </p:ext>
     </p:extLst>
   </p:cSld>
@@ -793,7 +777,7 @@
           <a:p>
             <a:fld id="{020CF8D1-BA82-5045-ACF9-1AA42AD6A519}" type="slidenum">
               <a:rPr lang="en-US" smtClean="0"/>
-              <a:t>14</a:t>
+              <a:t>13</a:t>
             </a:fld>
             <a:endParaRPr lang="en-US"/>
           </a:p>
@@ -802,7 +786,7 @@
     </p:spTree>
     <p:extLst>
       <p:ext uri="{BB962C8B-B14F-4D97-AF65-F5344CB8AC3E}">
-        <p14:creationId xmlns:p14="http://schemas.microsoft.com/office/powerpoint/2010/main" val="520155400"/>
+        <p14:creationId xmlns:p14="http://schemas.microsoft.com/office/powerpoint/2010/main" val="778062090"/>
       </p:ext>
     </p:extLst>
   </p:cSld>
@@ -897,7 +881,7 @@
           <a:p>
             <a:fld id="{020CF8D1-BA82-5045-ACF9-1AA42AD6A519}" type="slidenum">
               <a:rPr lang="en-US" smtClean="0"/>
-              <a:t>17</a:t>
+              <a:t>14</a:t>
             </a:fld>
             <a:endParaRPr lang="en-US"/>
           </a:p>
@@ -906,7 +890,7 @@
     </p:spTree>
     <p:extLst>
       <p:ext uri="{BB962C8B-B14F-4D97-AF65-F5344CB8AC3E}">
-        <p14:creationId xmlns:p14="http://schemas.microsoft.com/office/powerpoint/2010/main" val="2058049328"/>
+        <p14:creationId xmlns:p14="http://schemas.microsoft.com/office/powerpoint/2010/main" val="520155400"/>
       </p:ext>
     </p:extLst>
   </p:cSld>
@@ -1001,7 +985,7 @@
           <a:p>
             <a:fld id="{020CF8D1-BA82-5045-ACF9-1AA42AD6A519}" type="slidenum">
               <a:rPr lang="en-US" smtClean="0"/>
-              <a:t>19</a:t>
+              <a:t>17</a:t>
             </a:fld>
             <a:endParaRPr lang="en-US"/>
           </a:p>
@@ -1010,7 +994,7 @@
     </p:spTree>
     <p:extLst>
       <p:ext uri="{BB962C8B-B14F-4D97-AF65-F5344CB8AC3E}">
-        <p14:creationId xmlns:p14="http://schemas.microsoft.com/office/powerpoint/2010/main" val="3481472389"/>
+        <p14:creationId xmlns:p14="http://schemas.microsoft.com/office/powerpoint/2010/main" val="2058049328"/>
       </p:ext>
     </p:extLst>
   </p:cSld>
@@ -1105,6 +1089,110 @@
           <a:p>
             <a:fld id="{020CF8D1-BA82-5045-ACF9-1AA42AD6A519}" type="slidenum">
               <a:rPr lang="en-US" smtClean="0"/>
+              <a:t>19</a:t>
+            </a:fld>
+            <a:endParaRPr lang="en-US"/>
+          </a:p>
+        </p:txBody>
+      </p:sp>
+    </p:spTree>
+    <p:extLst>
+      <p:ext uri="{BB962C8B-B14F-4D97-AF65-F5344CB8AC3E}">
+        <p14:creationId xmlns:p14="http://schemas.microsoft.com/office/powerpoint/2010/main" val="3481472389"/>
+      </p:ext>
+    </p:extLst>
+  </p:cSld>
+  <p:clrMapOvr>
+    <a:masterClrMapping/>
+  </p:clrMapOvr>
+</p:notes>
+</file>
+
+<file path=ppt/notesSlides/notesSlide15.xml><?xml version="1.0" encoding="utf-8"?>
+<p:notes xmlns:a="http://schemas.openxmlformats.org/drawingml/2006/main" xmlns:r="http://schemas.openxmlformats.org/officeDocument/2006/relationships" xmlns:p="http://schemas.openxmlformats.org/presentationml/2006/main">
+  <p:cSld>
+    <p:spTree>
+      <p:nvGrpSpPr>
+        <p:cNvPr id="1" name=""/>
+        <p:cNvGrpSpPr/>
+        <p:nvPr/>
+      </p:nvGrpSpPr>
+      <p:grpSpPr>
+        <a:xfrm>
+          <a:off x="0" y="0"/>
+          <a:ext cx="0" cy="0"/>
+          <a:chOff x="0" y="0"/>
+          <a:chExt cx="0" cy="0"/>
+        </a:xfrm>
+      </p:grpSpPr>
+      <p:sp>
+        <p:nvSpPr>
+          <p:cNvPr id="2" name="Slide Image Placeholder 1"/>
+          <p:cNvSpPr>
+            <a:spLocks noGrp="1" noRot="1" noChangeAspect="1"/>
+          </p:cNvSpPr>
+          <p:nvPr>
+            <p:ph type="sldImg"/>
+          </p:nvPr>
+        </p:nvSpPr>
+        <p:spPr/>
+      </p:sp>
+      <p:sp>
+        <p:nvSpPr>
+          <p:cNvPr id="3" name="Notes Placeholder 2"/>
+          <p:cNvSpPr>
+            <a:spLocks noGrp="1"/>
+          </p:cNvSpPr>
+          <p:nvPr>
+            <p:ph type="body" idx="1"/>
+          </p:nvPr>
+        </p:nvSpPr>
+        <p:spPr/>
+        <p:txBody>
+          <a:bodyPr/>
+          <a:lstStyle/>
+          <a:p>
+            <a:pPr marL="0" marR="0" lvl="0" indent="0" algn="l" defTabSz="914400" rtl="0" eaLnBrk="1" fontAlgn="auto" latinLnBrk="0" hangingPunct="1">
+              <a:lnSpc>
+                <a:spcPct val="100000"/>
+              </a:lnSpc>
+              <a:spcBef>
+                <a:spcPts val="0"/>
+              </a:spcBef>
+              <a:spcAft>
+                <a:spcPts val="0"/>
+              </a:spcAft>
+              <a:buClrTx/>
+              <a:buSzTx/>
+              <a:buFontTx/>
+              <a:buNone/>
+              <a:tabLst/>
+              <a:defRPr/>
+            </a:pPr>
+            <a:r>
+              <a:rPr lang="en-US" dirty="0"/>
+              <a:t>// TODO</a:t>
+            </a:r>
+          </a:p>
+        </p:txBody>
+      </p:sp>
+      <p:sp>
+        <p:nvSpPr>
+          <p:cNvPr id="4" name="Slide Number Placeholder 3"/>
+          <p:cNvSpPr>
+            <a:spLocks noGrp="1"/>
+          </p:cNvSpPr>
+          <p:nvPr>
+            <p:ph type="sldNum" sz="quarter" idx="5"/>
+          </p:nvPr>
+        </p:nvSpPr>
+        <p:spPr/>
+        <p:txBody>
+          <a:bodyPr/>
+          <a:lstStyle/>
+          <a:p>
+            <a:fld id="{020CF8D1-BA82-5045-ACF9-1AA42AD6A519}" type="slidenum">
+              <a:rPr lang="en-US" smtClean="0"/>
               <a:t>21</a:t>
             </a:fld>
             <a:endParaRPr lang="en-US"/>
@@ -1124,7 +1212,7 @@
 </p:notes>
 </file>
 
-<file path=ppt/notesSlides/notesSlide15.xml><?xml version="1.0" encoding="utf-8"?>
+<file path=ppt/notesSlides/notesSlide16.xml><?xml version="1.0" encoding="utf-8"?>
 <p:notes xmlns:a="http://schemas.openxmlformats.org/drawingml/2006/main" xmlns:r="http://schemas.openxmlformats.org/officeDocument/2006/relationships" xmlns:p="http://schemas.openxmlformats.org/presentationml/2006/main">
   <p:cSld>
     <p:spTree>
@@ -2333,7 +2421,7 @@
           <a:lstStyle/>
           <a:p>
             <a:r>
-              <a:rPr lang="en-US" b="0" i="0" dirty="0"/>
+              <a:rPr lang="en-US" dirty="0"/>
               <a:t>// TODO</a:t>
             </a:r>
           </a:p>
@@ -2356,7 +2444,7 @@
           <a:p>
             <a:fld id="{020CF8D1-BA82-5045-ACF9-1AA42AD6A519}" type="slidenum">
               <a:rPr lang="en-US" smtClean="0"/>
-              <a:t>10</a:t>
+              <a:t>9</a:t>
             </a:fld>
             <a:endParaRPr lang="en-US"/>
           </a:p>
@@ -2365,7 +2453,7 @@
     </p:spTree>
     <p:extLst>
       <p:ext uri="{BB962C8B-B14F-4D97-AF65-F5344CB8AC3E}">
-        <p14:creationId xmlns:p14="http://schemas.microsoft.com/office/powerpoint/2010/main" val="2968376506"/>
+        <p14:creationId xmlns:p14="http://schemas.microsoft.com/office/powerpoint/2010/main" val="381129055"/>
       </p:ext>
     </p:extLst>
   </p:cSld>
@@ -2420,10 +2508,9 @@
           <a:lstStyle/>
           <a:p>
             <a:r>
-              <a:rPr lang="en-US" dirty="0"/>
+              <a:rPr lang="en-US" b="0" i="0" dirty="0"/>
               <a:t>// TODO</a:t>
             </a:r>
-            <a:endParaRPr lang="en-US" b="0" i="0" u="none" dirty="0"/>
           </a:p>
         </p:txBody>
       </p:sp>
@@ -2444,7 +2531,7 @@
           <a:p>
             <a:fld id="{020CF8D1-BA82-5045-ACF9-1AA42AD6A519}" type="slidenum">
               <a:rPr lang="en-US" smtClean="0"/>
-              <a:t>12</a:t>
+              <a:t>10</a:t>
             </a:fld>
             <a:endParaRPr lang="en-US"/>
           </a:p>
@@ -2453,7 +2540,7 @@
     </p:spTree>
     <p:extLst>
       <p:ext uri="{BB962C8B-B14F-4D97-AF65-F5344CB8AC3E}">
-        <p14:creationId xmlns:p14="http://schemas.microsoft.com/office/powerpoint/2010/main" val="2398170700"/>
+        <p14:creationId xmlns:p14="http://schemas.microsoft.com/office/powerpoint/2010/main" val="2968376506"/>
       </p:ext>
     </p:extLst>
   </p:cSld>
@@ -6144,7 +6231,7 @@
                   <a:srgbClr val="FFFF00"/>
                 </a:solidFill>
               </a:rPr>
-              <a:t>curl [OPTIONS] </a:t>
+              <a:t>curl [options…] &lt;</a:t>
             </a:r>
             <a:r>
               <a:rPr lang="en-US" sz="2800" b="1" i="1" dirty="0" err="1">
@@ -6154,6 +6241,14 @@
               </a:rPr>
               <a:t>url</a:t>
             </a:r>
+            <a:r>
+              <a:rPr lang="en-US" sz="2800" b="1" i="1" dirty="0">
+                <a:solidFill>
+                  <a:srgbClr val="FFFF00"/>
+                </a:solidFill>
+              </a:rPr>
+              <a:t>&gt;</a:t>
+            </a:r>
             <a:endParaRPr lang="en-US" sz="2800" dirty="0"/>
           </a:p>
           <a:p>
@@ -6211,21 +6306,8 @@
                   <a:srgbClr val="FFFF00"/>
                 </a:solidFill>
               </a:rPr>
-              <a:t>curl https://</a:t>
-            </a:r>
-            <a:r>
-              <a:rPr lang="en-US" sz="2800" b="1" i="1" dirty="0" err="1">
-                <a:solidFill>
-                  <a:srgbClr val="FFFF00"/>
-                </a:solidFill>
-              </a:rPr>
-              <a:t>www.whatsmyua.info</a:t>
-            </a:r>
-            <a:endParaRPr lang="en-US" sz="2800" b="1" i="1" dirty="0">
-              <a:solidFill>
-                <a:srgbClr val="FFFF00"/>
-              </a:solidFill>
-            </a:endParaRPr>
+              <a:t>curl https://www.whatsmyua.info</a:t>
+            </a:r>
           </a:p>
         </p:txBody>
       </p:sp>
@@ -6836,15 +6918,7 @@
             </a:r>
             <a:r>
               <a:rPr lang="en-US" dirty="0"/>
-              <a:t>– HTTP method (GET </a:t>
-            </a:r>
-            <a:r>
-              <a:rPr lang="en-US"/>
-              <a:t>(default), </a:t>
-            </a:r>
-            <a:r>
-              <a:rPr lang="en-US" dirty="0"/>
-              <a:t>POST, PUT, DELETE)</a:t>
+              <a:t>– HTTP method (GET (default), POST, PUT, DELETE)</a:t>
             </a:r>
           </a:p>
           <a:p>
@@ -6871,18 +6945,10 @@
                   <a:srgbClr val="FFFF00"/>
                 </a:solidFill>
               </a:rPr>
-              <a:t> </a:t>
-            </a:r>
-            <a:r>
-              <a:rPr lang="en-US" i="1" dirty="0">
-                <a:solidFill>
-                  <a:srgbClr val="FFFF00"/>
-                </a:solidFill>
-              </a:rPr>
-              <a:t>&lt;</a:t>
-            </a:r>
-            <a:r>
-              <a:rPr lang="en-US" i="1" dirty="0" err="1">
+              <a:t> &lt;</a:t>
+            </a:r>
+            <a:r>
+              <a:rPr lang="en-US" dirty="0" err="1">
                 <a:solidFill>
                   <a:srgbClr val="FFFF00"/>
                 </a:solidFill>
@@ -6890,12 +6956,86 @@
               <a:t>url</a:t>
             </a:r>
             <a:r>
-              <a:rPr lang="en-US" i="1" dirty="0">
+              <a:rPr lang="en-US" dirty="0">
                 <a:solidFill>
                   <a:srgbClr val="FFFF00"/>
                 </a:solidFill>
               </a:rPr>
-              <a:t>&gt;</a:t>
+              <a:t>&gt; </a:t>
+            </a:r>
+            <a:r>
+              <a:rPr lang="en-US" dirty="0"/>
+              <a:t>– Request URL</a:t>
+            </a:r>
+          </a:p>
+          <a:p>
+            <a:pPr lvl="1"/>
+            <a:r>
+              <a:rPr lang="en-US" dirty="0">
+                <a:solidFill>
+                  <a:srgbClr val="FFFF00"/>
+                </a:solidFill>
+              </a:rPr>
+              <a:t>-H </a:t>
+            </a:r>
+            <a:r>
+              <a:rPr lang="en-US" dirty="0"/>
+              <a:t>or</a:t>
+            </a:r>
+            <a:r>
+              <a:rPr lang="en-US" dirty="0">
+                <a:solidFill>
+                  <a:srgbClr val="FFFF00"/>
+                </a:solidFill>
+              </a:rPr>
+              <a:t> --header</a:t>
+            </a:r>
+            <a:r>
+              <a:rPr lang="en-US" dirty="0"/>
+              <a:t>– HTTP client header(s)</a:t>
+            </a:r>
+          </a:p>
+          <a:p>
+            <a:pPr lvl="1"/>
+            <a:r>
+              <a:rPr lang="en-US" dirty="0">
+                <a:solidFill>
+                  <a:srgbClr val="FFFF00"/>
+                </a:solidFill>
+              </a:rPr>
+              <a:t>-d </a:t>
+            </a:r>
+            <a:r>
+              <a:rPr lang="en-US" dirty="0"/>
+              <a:t>or</a:t>
+            </a:r>
+            <a:r>
+              <a:rPr lang="en-US" dirty="0">
+                <a:solidFill>
+                  <a:srgbClr val="FFFF00"/>
+                </a:solidFill>
+              </a:rPr>
+              <a:t> --data </a:t>
+            </a:r>
+            <a:r>
+              <a:rPr lang="en-US" dirty="0"/>
+              <a:t>or</a:t>
+            </a:r>
+            <a:r>
+              <a:rPr lang="en-US" dirty="0">
+                <a:solidFill>
+                  <a:srgbClr val="FFFF00"/>
+                </a:solidFill>
+              </a:rPr>
+              <a:t> --data-</a:t>
+            </a:r>
+            <a:r>
+              <a:rPr lang="en-US" dirty="0" err="1">
+                <a:solidFill>
+                  <a:srgbClr val="FFFF00"/>
+                </a:solidFill>
+              </a:rPr>
+              <a:t>urlencode</a:t>
             </a:r>
             <a:r>
               <a:rPr lang="en-US" dirty="0">
@@ -6907,88 +7047,6 @@
             </a:r>
             <a:r>
               <a:rPr lang="en-US" dirty="0"/>
-              <a:t>– Request URL</a:t>
-            </a:r>
-          </a:p>
-          <a:p>
-            <a:pPr lvl="1"/>
-            <a:r>
-              <a:rPr lang="en-US" dirty="0">
-                <a:solidFill>
-                  <a:srgbClr val="FFFF00"/>
-                </a:solidFill>
-              </a:rPr>
-              <a:t>-H </a:t>
-            </a:r>
-            <a:r>
-              <a:rPr lang="en-US" dirty="0"/>
-              <a:t>or</a:t>
-            </a:r>
-            <a:r>
-              <a:rPr lang="en-US" dirty="0">
-                <a:solidFill>
-                  <a:srgbClr val="FFFF00"/>
-                </a:solidFill>
-              </a:rPr>
-              <a:t> --header</a:t>
-            </a:r>
-            <a:r>
-              <a:rPr lang="en-US" dirty="0"/>
-              <a:t>– HTTP client header(s)</a:t>
-            </a:r>
-          </a:p>
-          <a:p>
-            <a:pPr lvl="1"/>
-            <a:r>
-              <a:rPr lang="en-US" dirty="0">
-                <a:solidFill>
-                  <a:srgbClr val="FFFF00"/>
-                </a:solidFill>
-              </a:rPr>
-              <a:t>-d </a:t>
-            </a:r>
-            <a:r>
-              <a:rPr lang="en-US" dirty="0"/>
-              <a:t>or</a:t>
-            </a:r>
-            <a:r>
-              <a:rPr lang="en-US" dirty="0">
-                <a:solidFill>
-                  <a:srgbClr val="FFFF00"/>
-                </a:solidFill>
-              </a:rPr>
-              <a:t> --data </a:t>
-            </a:r>
-            <a:r>
-              <a:rPr lang="en-US" dirty="0"/>
-              <a:t>or</a:t>
-            </a:r>
-            <a:r>
-              <a:rPr lang="en-US" dirty="0">
-                <a:solidFill>
-                  <a:srgbClr val="FFFF00"/>
-                </a:solidFill>
-              </a:rPr>
-              <a:t> --data-</a:t>
-            </a:r>
-            <a:r>
-              <a:rPr lang="en-US" dirty="0" err="1">
-                <a:solidFill>
-                  <a:srgbClr val="FFFF00"/>
-                </a:solidFill>
-              </a:rPr>
-              <a:t>urlencode</a:t>
-            </a:r>
-            <a:r>
-              <a:rPr lang="en-US" dirty="0">
-                <a:solidFill>
-                  <a:srgbClr val="FFFF00"/>
-                </a:solidFill>
-              </a:rPr>
-              <a:t> </a:t>
-            </a:r>
-            <a:r>
-              <a:rPr lang="en-US" dirty="0"/>
               <a:t>– HTTP PUT/POST data</a:t>
             </a:r>
           </a:p>
@@ -7124,18 +7182,10 @@
                   <a:srgbClr val="FFFF00"/>
                 </a:solidFill>
               </a:rPr>
-              <a:t>-o </a:t>
-            </a:r>
-            <a:r>
-              <a:rPr lang="en-US" i="1" dirty="0">
-                <a:solidFill>
-                  <a:srgbClr val="FFFF00"/>
-                </a:solidFill>
-              </a:rPr>
-              <a:t>&lt;</a:t>
-            </a:r>
-            <a:r>
-              <a:rPr lang="en-US" i="1" dirty="0" err="1">
+              <a:t>-o &lt;</a:t>
+            </a:r>
+            <a:r>
+              <a:rPr lang="en-US" dirty="0" err="1">
                 <a:solidFill>
                   <a:srgbClr val="FFFF00"/>
                 </a:solidFill>
@@ -7143,20 +7193,12 @@
               <a:t>file_name</a:t>
             </a:r>
             <a:r>
-              <a:rPr lang="en-US" i="1" dirty="0">
-                <a:solidFill>
-                  <a:srgbClr val="FFFF00"/>
-                </a:solidFill>
-              </a:rPr>
-              <a:t>&gt;</a:t>
-            </a:r>
-            <a:r>
               <a:rPr lang="en-US" dirty="0">
                 <a:solidFill>
                   <a:srgbClr val="FFFF00"/>
                 </a:solidFill>
               </a:rPr>
-              <a:t> </a:t>
+              <a:t>&gt; </a:t>
             </a:r>
             <a:r>
               <a:rPr lang="en-US" dirty="0"/>
@@ -7168,18 +7210,10 @@
                   <a:srgbClr val="FFFF00"/>
                 </a:solidFill>
               </a:rPr>
-              <a:t> --output </a:t>
-            </a:r>
-            <a:r>
-              <a:rPr lang="en-US" i="1" dirty="0">
-                <a:solidFill>
-                  <a:srgbClr val="FFFF00"/>
-                </a:solidFill>
-              </a:rPr>
-              <a:t>&lt;</a:t>
-            </a:r>
-            <a:r>
-              <a:rPr lang="en-US" i="1" dirty="0" err="1">
+              <a:t> --output &lt;</a:t>
+            </a:r>
+            <a:r>
+              <a:rPr lang="en-US" dirty="0" err="1">
                 <a:solidFill>
                   <a:srgbClr val="FFFF00"/>
                 </a:solidFill>
@@ -7187,20 +7221,12 @@
               <a:t>file_name</a:t>
             </a:r>
             <a:r>
-              <a:rPr lang="en-US" i="1" dirty="0">
-                <a:solidFill>
-                  <a:srgbClr val="FFFF00"/>
-                </a:solidFill>
-              </a:rPr>
-              <a:t>&gt;</a:t>
-            </a:r>
-            <a:r>
               <a:rPr lang="en-US" dirty="0">
                 <a:solidFill>
                   <a:srgbClr val="FFFF00"/>
                 </a:solidFill>
               </a:rPr>
-              <a:t> </a:t>
+              <a:t>&gt; </a:t>
             </a:r>
             <a:r>
               <a:rPr lang="en-US" dirty="0"/>
@@ -13991,14 +14017,10 @@
             </a:r>
             <a:r>
               <a:rPr lang="en-US" dirty="0"/>
-              <a:t> command flag definitions</a:t>
-            </a:r>
-          </a:p>
-          <a:p>
-            <a:r>
-              <a:rPr lang="en-US" dirty="0"/>
-              <a:t>Basic </a:t>
-            </a:r>
+              <a:t> command option definitions</a:t>
+            </a:r>
+          </a:p>
+          <a:p>
             <a:r>
               <a:rPr lang="en-US" dirty="0" err="1"/>
               <a:t>cURL</a:t>

</xml_diff>

<commit_message>
Removed 'www.' from sample cURL command, for brevity
</commit_message>
<xml_diff>
--- a/curl-requests-foundations.pptx
+++ b/curl-requests-foundations.pptx
@@ -6578,7 +6578,7 @@
                   <a:srgbClr val="FFFF00"/>
                 </a:solidFill>
               </a:rPr>
-              <a:t>www.whatsmyua.info</a:t>
+              <a:t>whatsmyua.info</a:t>
             </a:r>
             <a:r>
               <a:rPr lang="en-US" sz="2800" b="1" i="1" dirty="0">
@@ -6681,10 +6681,10 @@
       </p:sp>
       <p:sp>
         <p:nvSpPr>
-          <p:cNvPr id="7" name="Rectangle 6">
+          <p:cNvPr id="8" name="Rectangle 7">
             <a:extLst>
               <a:ext uri="{FF2B5EF4-FFF2-40B4-BE49-F238E27FC236}">
-                <a16:creationId xmlns:a16="http://schemas.microsoft.com/office/drawing/2014/main" id="{711B4F6A-3227-AA48-9B9B-D28C475E3FCA}"/>
+                <a16:creationId xmlns:a16="http://schemas.microsoft.com/office/drawing/2014/main" id="{D58E649F-E375-614D-8A53-9704053A894D}"/>
               </a:ext>
             </a:extLst>
           </p:cNvPr>
@@ -6693,8 +6693,8 @@
         </p:nvSpPr>
         <p:spPr>
           <a:xfrm>
-            <a:off x="1998489" y="4199486"/>
-            <a:ext cx="4438316" cy="404925"/>
+            <a:off x="6436804" y="4199486"/>
+            <a:ext cx="1673727" cy="404925"/>
           </a:xfrm>
           <a:prstGeom prst="rect">
             <a:avLst/>
@@ -6735,10 +6735,10 @@
       </p:sp>
       <p:sp>
         <p:nvSpPr>
-          <p:cNvPr id="8" name="Rectangle 7">
+          <p:cNvPr id="7" name="Rectangle 6">
             <a:extLst>
               <a:ext uri="{FF2B5EF4-FFF2-40B4-BE49-F238E27FC236}">
-                <a16:creationId xmlns:a16="http://schemas.microsoft.com/office/drawing/2014/main" id="{D58E649F-E375-614D-8A53-9704053A894D}"/>
+                <a16:creationId xmlns:a16="http://schemas.microsoft.com/office/drawing/2014/main" id="{711B4F6A-3227-AA48-9B9B-D28C475E3FCA}"/>
               </a:ext>
             </a:extLst>
           </p:cNvPr>
@@ -6747,8 +6747,8 @@
         </p:nvSpPr>
         <p:spPr>
           <a:xfrm>
-            <a:off x="6436804" y="4199486"/>
-            <a:ext cx="1673727" cy="404925"/>
+            <a:off x="1998489" y="4199486"/>
+            <a:ext cx="4438316" cy="404925"/>
           </a:xfrm>
           <a:prstGeom prst="rect">
             <a:avLst/>
@@ -7258,8 +7258,8 @@
     </p:tnLst>
     <p:bldLst>
       <p:bldP spid="3" grpId="0" build="p"/>
+      <p:bldP spid="8" grpId="0" animBg="1"/>
       <p:bldP spid="7" grpId="0" animBg="1"/>
-      <p:bldP spid="8" grpId="0" animBg="1"/>
     </p:bldLst>
   </p:timing>
 </p:sld>

</xml_diff>

<commit_message>
Completed the second of two cURL command example slides
</commit_message>
<xml_diff>
--- a/curl-requests-foundations.pptx
+++ b/curl-requests-foundations.pptx
@@ -236,7 +236,7 @@
           <a:p>
             <a:fld id="{966F6F5D-167E-1849-B841-EB0817BB385A}" type="datetimeFigureOut">
               <a:rPr lang="en-US" smtClean="0"/>
-              <a:t>4/1/20</a:t>
+              <a:t>4/2/20</a:t>
             </a:fld>
             <a:endParaRPr lang="en-US"/>
           </a:p>
@@ -849,26 +849,6 @@
             <a:r>
               <a:rPr lang="en-US" b="0" i="0" dirty="0"/>
               <a:t>// TODO</a:t>
-            </a:r>
-          </a:p>
-          <a:p>
-            <a:pPr marL="171450" indent="-171450">
-              <a:buFont typeface="Arial" panose="020B0604020202020204" pitchFamily="34" charset="0"/>
-              <a:buChar char="•"/>
-            </a:pPr>
-            <a:r>
-              <a:rPr lang="en-US" b="0" i="0" dirty="0"/>
-              <a:t>The backslash at the end of a terminal line indicates a line break for a multi-line command</a:t>
-            </a:r>
-          </a:p>
-          <a:p>
-            <a:pPr marL="628650" lvl="1" indent="-171450">
-              <a:buFont typeface="Arial" panose="020B0604020202020204" pitchFamily="34" charset="0"/>
-              <a:buChar char="•"/>
-            </a:pPr>
-            <a:r>
-              <a:rPr lang="en-US" b="0" i="0" dirty="0"/>
-              <a:t>This can make it easier to read long commands</a:t>
             </a:r>
           </a:p>
         </p:txBody>
@@ -6693,7 +6673,7 @@
         </p:nvSpPr>
         <p:spPr>
           <a:xfrm>
-            <a:off x="6436804" y="4199486"/>
+            <a:off x="5593080" y="4199486"/>
             <a:ext cx="1673727" cy="404925"/>
           </a:xfrm>
           <a:prstGeom prst="rect">
@@ -6747,8 +6727,8 @@
         </p:nvSpPr>
         <p:spPr>
           <a:xfrm>
-            <a:off x="1998489" y="4199486"/>
-            <a:ext cx="4438316" cy="404925"/>
+            <a:off x="1975629" y="4199486"/>
+            <a:ext cx="3617451" cy="404925"/>
           </a:xfrm>
           <a:prstGeom prst="rect">
             <a:avLst/>
@@ -10742,38 +10722,6 @@
       </p:grpSpPr>
       <p:sp>
         <p:nvSpPr>
-          <p:cNvPr id="2" name="Title 1">
-            <a:extLst>
-              <a:ext uri="{FF2B5EF4-FFF2-40B4-BE49-F238E27FC236}">
-                <a16:creationId xmlns:a16="http://schemas.microsoft.com/office/drawing/2014/main" id="{AC0D55DF-385E-9A4F-AB08-FEBC11990B8B}"/>
-              </a:ext>
-            </a:extLst>
-          </p:cNvPr>
-          <p:cNvSpPr>
-            <a:spLocks noGrp="1"/>
-          </p:cNvSpPr>
-          <p:nvPr>
-            <p:ph type="title"/>
-          </p:nvPr>
-        </p:nvSpPr>
-        <p:spPr/>
-        <p:txBody>
-          <a:bodyPr/>
-          <a:lstStyle/>
-          <a:p>
-            <a:r>
-              <a:rPr lang="en-US" dirty="0" err="1"/>
-              <a:t>cURL</a:t>
-            </a:r>
-            <a:r>
-              <a:rPr lang="en-US" dirty="0"/>
-              <a:t> Command Examples Continued</a:t>
-            </a:r>
-          </a:p>
-        </p:txBody>
-      </p:sp>
-      <p:sp>
-        <p:nvSpPr>
           <p:cNvPr id="3" name="Content Placeholder 2">
             <a:extLst>
               <a:ext uri="{FF2B5EF4-FFF2-40B4-BE49-F238E27FC236}">
@@ -10791,7 +10739,7 @@
         <p:spPr/>
         <p:txBody>
           <a:bodyPr>
-            <a:normAutofit fontScale="92500" lnSpcReduction="10000"/>
+            <a:normAutofit fontScale="92500"/>
           </a:bodyPr>
           <a:lstStyle/>
           <a:p>
@@ -10804,7 +10752,7 @@
                   <a:srgbClr val="FFFF00"/>
                 </a:solidFill>
               </a:rPr>
-              <a:t>curl -X GET --</a:t>
+              <a:t>curl -IX GET --</a:t>
             </a:r>
             <a:r>
               <a:rPr lang="en-US" sz="2400" b="1" i="1" dirty="0" err="1">
@@ -10836,20 +10784,7 @@
                   <a:srgbClr val="FFFF00"/>
                 </a:solidFill>
               </a:rPr>
-              <a:t>/posts/1 \</a:t>
-            </a:r>
-          </a:p>
-          <a:p>
-            <a:pPr marL="0" indent="0">
-              <a:buNone/>
-            </a:pPr>
-            <a:r>
-              <a:rPr lang="en-US" sz="2400" b="1" i="1" dirty="0">
-                <a:solidFill>
-                  <a:srgbClr val="FFFF00"/>
-                </a:solidFill>
-              </a:rPr>
-              <a:t>-H 'Accept: application/json' </a:t>
+              <a:t>/posts/1</a:t>
             </a:r>
           </a:p>
           <a:p>
@@ -10874,7 +10809,7 @@
           <a:p>
             <a:r>
               <a:rPr lang="en-US" sz="2400" dirty="0"/>
-              <a:t>Include a header to indicate we will only accept responses in a JSON format</a:t>
+              <a:t>Display ONLY the response headers in the terminal</a:t>
             </a:r>
           </a:p>
           <a:p>
@@ -10911,7 +10846,7 @@
                   <a:srgbClr val="FFFF00"/>
                 </a:solidFill>
               </a:rPr>
-              <a:t>jsonplaceholder.typicode.com</a:t>
+              <a:t>sandboxdnac.cisco.com</a:t>
             </a:r>
             <a:r>
               <a:rPr lang="en-US" sz="2400" b="1" i="1" dirty="0">
@@ -10919,33 +10854,65 @@
                   <a:srgbClr val="FFFF00"/>
                 </a:solidFill>
               </a:rPr>
-              <a:t>/posts \</a:t>
-            </a:r>
-          </a:p>
-          <a:p>
-            <a:pPr marL="0" indent="0">
-              <a:buNone/>
-            </a:pPr>
+              <a:t>/</a:t>
+            </a:r>
+            <a:r>
+              <a:rPr lang="en-US" sz="2400" b="1" i="1" dirty="0" err="1">
+                <a:solidFill>
+                  <a:srgbClr val="FFFF00"/>
+                </a:solidFill>
+              </a:rPr>
+              <a:t>dna</a:t>
+            </a:r>
             <a:r>
               <a:rPr lang="en-US" sz="2400" b="1" i="1" dirty="0">
                 <a:solidFill>
                   <a:srgbClr val="FFFF00"/>
                 </a:solidFill>
               </a:rPr>
-              <a:t>-H 'Content-Type: application/json' \</a:t>
-            </a:r>
-          </a:p>
-          <a:p>
-            <a:pPr marL="0" indent="0">
-              <a:buNone/>
-            </a:pPr>
+              <a:t>/system/</a:t>
+            </a:r>
+            <a:r>
+              <a:rPr lang="en-US" sz="2400" b="1" i="1" dirty="0" err="1">
+                <a:solidFill>
+                  <a:srgbClr val="FFFF00"/>
+                </a:solidFill>
+              </a:rPr>
+              <a:t>api</a:t>
+            </a:r>
             <a:r>
               <a:rPr lang="en-US" sz="2400" b="1" i="1" dirty="0">
                 <a:solidFill>
                   <a:srgbClr val="FFFF00"/>
                 </a:solidFill>
               </a:rPr>
-              <a:t>-id '{"id":101, "userId":1, "</a:t>
+              <a:t>/v1/auth/token \</a:t>
+            </a:r>
+          </a:p>
+          <a:p>
+            <a:pPr marL="0" indent="0">
+              <a:buNone/>
+            </a:pPr>
+            <a:r>
+              <a:rPr lang="en-US" sz="2400" b="1" i="1" dirty="0">
+                <a:solidFill>
+                  <a:srgbClr val="FFFF00"/>
+                </a:solidFill>
+              </a:rPr>
+              <a:t>-u $DNAC_USER:$DNAC_PW \</a:t>
+            </a:r>
+          </a:p>
+          <a:p>
+            <a:pPr marL="0" indent="0">
+              <a:buNone/>
+            </a:pPr>
+            <a:r>
+              <a:rPr lang="en-US" sz="2400" b="1" i="1" dirty="0">
+                <a:solidFill>
+                  <a:srgbClr val="FFFF00"/>
+                </a:solidFill>
+              </a:rPr>
+              <a:t>-</a:t>
             </a:r>
             <a:r>
               <a:rPr lang="en-US" sz="2400" b="1" i="1" dirty="0" err="1">
@@ -10953,7 +10920,7 @@
                   <a:srgbClr val="FFFF00"/>
                 </a:solidFill>
               </a:rPr>
-              <a:t>title":"Hello</a:t>
+              <a:t>vo</a:t>
             </a:r>
             <a:r>
               <a:rPr lang="en-US" sz="2400" b="1" i="1" dirty="0">
@@ -10961,7 +10928,7 @@
                   <a:srgbClr val="FFFF00"/>
                 </a:solidFill>
               </a:rPr>
-              <a:t>", "</a:t>
+              <a:t> </a:t>
             </a:r>
             <a:r>
               <a:rPr lang="en-US" sz="2400" b="1" i="1" dirty="0" err="1">
@@ -10969,16 +10936,13 @@
                   <a:srgbClr val="FFFF00"/>
                 </a:solidFill>
               </a:rPr>
-              <a:t>body":"Hello</a:t>
-            </a:r>
-            <a:r>
-              <a:rPr lang="en-US" sz="2400" b="1" i="1" dirty="0">
-                <a:solidFill>
-                  <a:srgbClr val="FFFF00"/>
-                </a:solidFill>
-              </a:rPr>
-              <a:t> World!"}'</a:t>
-            </a:r>
+              <a:t>token.txt</a:t>
+            </a:r>
+            <a:endParaRPr lang="en-US" sz="2400" b="1" i="1" dirty="0">
+              <a:solidFill>
+                <a:srgbClr val="FFFF00"/>
+              </a:solidFill>
+            </a:endParaRPr>
           </a:p>
           <a:p>
             <a:r>
@@ -10987,11 +10951,27 @@
             </a:r>
             <a:r>
               <a:rPr lang="en-US" sz="2400" dirty="0" err="1"/>
-              <a:t>jsonplaceholder.typicode.com</a:t>
+              <a:t>sandboxdnac.cisco.com</a:t>
             </a:r>
             <a:r>
               <a:rPr lang="en-US" sz="2400" dirty="0"/>
-              <a:t>/posts</a:t>
+              <a:t>/</a:t>
+            </a:r>
+            <a:r>
+              <a:rPr lang="en-US" sz="2400" dirty="0" err="1"/>
+              <a:t>dna</a:t>
+            </a:r>
+            <a:r>
+              <a:rPr lang="en-US" sz="2400" dirty="0"/>
+              <a:t>/system/</a:t>
+            </a:r>
+            <a:r>
+              <a:rPr lang="en-US" sz="2400" dirty="0" err="1"/>
+              <a:t>api</a:t>
+            </a:r>
+            <a:r>
+              <a:rPr lang="en-US" sz="2400" dirty="0"/>
+              <a:t>/v1/auth/token</a:t>
             </a:r>
             <a:endParaRPr lang="en-US" sz="2400" dirty="0">
               <a:solidFill>
@@ -11002,88 +10982,41 @@
           <a:p>
             <a:r>
               <a:rPr lang="en-US" sz="2400" dirty="0"/>
-              <a:t>Include a header indicating the request body is in a JSON format</a:t>
+              <a:t>Send credentials via HTTP Basic Authentication</a:t>
             </a:r>
           </a:p>
           <a:p>
             <a:r>
               <a:rPr lang="en-US" sz="2400" dirty="0"/>
-              <a:t>Display the response headers in the terminal</a:t>
+              <a:t>Display verbose/debugging information</a:t>
             </a:r>
           </a:p>
           <a:p>
             <a:r>
               <a:rPr lang="en-US" sz="2400" dirty="0"/>
-              <a:t>Body payload in JSON format</a:t>
-            </a:r>
-          </a:p>
-        </p:txBody>
-      </p:sp>
-      <p:sp>
-        <p:nvSpPr>
-          <p:cNvPr id="4" name="Date Placeholder 3">
+              <a:t>Write the response to the file </a:t>
+            </a:r>
+            <a:r>
+              <a:rPr lang="en-US" sz="2400" i="1" dirty="0"/>
+              <a:t>‘</a:t>
+            </a:r>
+            <a:r>
+              <a:rPr lang="en-US" sz="2400" i="1" dirty="0" err="1"/>
+              <a:t>token.txt</a:t>
+            </a:r>
+            <a:r>
+              <a:rPr lang="en-US" sz="2400" i="1" dirty="0"/>
+              <a:t>’</a:t>
+            </a:r>
+          </a:p>
+        </p:txBody>
+      </p:sp>
+      <p:sp>
+        <p:nvSpPr>
+          <p:cNvPr id="11" name="Rectangle 10">
             <a:extLst>
               <a:ext uri="{FF2B5EF4-FFF2-40B4-BE49-F238E27FC236}">
-                <a16:creationId xmlns:a16="http://schemas.microsoft.com/office/drawing/2014/main" id="{6E8781CE-B8A7-7540-B619-28D099093D8B}"/>
-              </a:ext>
-            </a:extLst>
-          </p:cNvPr>
-          <p:cNvSpPr>
-            <a:spLocks noGrp="1"/>
-          </p:cNvSpPr>
-          <p:nvPr>
-            <p:ph type="dt" sz="half" idx="10"/>
-          </p:nvPr>
-        </p:nvSpPr>
-        <p:spPr/>
-        <p:txBody>
-          <a:bodyPr/>
-          <a:lstStyle/>
-          <a:p>
-            <a:r>
-              <a:rPr lang="en-US"/>
-              <a:t>World Wide Technology ©</a:t>
-            </a:r>
-            <a:endParaRPr lang="en-US" dirty="0"/>
-          </a:p>
-        </p:txBody>
-      </p:sp>
-      <p:sp>
-        <p:nvSpPr>
-          <p:cNvPr id="5" name="Slide Number Placeholder 4">
-            <a:extLst>
-              <a:ext uri="{FF2B5EF4-FFF2-40B4-BE49-F238E27FC236}">
-                <a16:creationId xmlns:a16="http://schemas.microsoft.com/office/drawing/2014/main" id="{222BEAA2-2326-1F4D-9BCE-0FC3EC23B201}"/>
-              </a:ext>
-            </a:extLst>
-          </p:cNvPr>
-          <p:cNvSpPr>
-            <a:spLocks noGrp="1"/>
-          </p:cNvSpPr>
-          <p:nvPr>
-            <p:ph type="sldNum" sz="quarter" idx="12"/>
-          </p:nvPr>
-        </p:nvSpPr>
-        <p:spPr/>
-        <p:txBody>
-          <a:bodyPr/>
-          <a:lstStyle/>
-          <a:p>
-            <a:fld id="{A44B02FA-DD2D-1844-AE35-8B2EAB0CF4EF}" type="slidenum">
-              <a:rPr lang="en-US" smtClean="0"/>
-              <a:pPr/>
-              <a:t>14</a:t>
-            </a:fld>
-            <a:endParaRPr lang="en-US" dirty="0"/>
-          </a:p>
-        </p:txBody>
-      </p:sp>
-      <p:sp>
-        <p:nvSpPr>
-          <p:cNvPr id="6" name="Rectangle 5">
-            <a:extLst>
-              <a:ext uri="{FF2B5EF4-FFF2-40B4-BE49-F238E27FC236}">
-                <a16:creationId xmlns:a16="http://schemas.microsoft.com/office/drawing/2014/main" id="{8026FF69-6C82-7043-9603-B53878D1AFAB}"/>
+                <a16:creationId xmlns:a16="http://schemas.microsoft.com/office/drawing/2014/main" id="{1100B6A1-8FC9-164E-B48D-5AEB1EF6BDB2}"/>
               </a:ext>
             </a:extLst>
           </p:cNvPr>
@@ -11092,8 +11025,8 @@
         </p:nvSpPr>
         <p:spPr>
           <a:xfrm>
-            <a:off x="909614" y="1825622"/>
-            <a:ext cx="1316950" cy="346075"/>
+            <a:off x="2365512" y="3139186"/>
+            <a:ext cx="8178410" cy="346075"/>
           </a:xfrm>
           <a:prstGeom prst="rect">
             <a:avLst/>
@@ -11146,8 +11079,8 @@
         </p:nvSpPr>
         <p:spPr>
           <a:xfrm>
-            <a:off x="2226564" y="1825624"/>
-            <a:ext cx="5916168" cy="346075"/>
+            <a:off x="2293257" y="1834768"/>
+            <a:ext cx="5912489" cy="346075"/>
           </a:xfrm>
           <a:prstGeom prst="rect">
             <a:avLst/>
@@ -11188,10 +11121,10 @@
       </p:sp>
       <p:sp>
         <p:nvSpPr>
-          <p:cNvPr id="8" name="Rectangle 7">
+          <p:cNvPr id="6" name="Rectangle 5">
             <a:extLst>
               <a:ext uri="{FF2B5EF4-FFF2-40B4-BE49-F238E27FC236}">
-                <a16:creationId xmlns:a16="http://schemas.microsoft.com/office/drawing/2014/main" id="{CC38C9D9-1C2E-0A43-B57E-01A9B796FCD1}"/>
+                <a16:creationId xmlns:a16="http://schemas.microsoft.com/office/drawing/2014/main" id="{8026FF69-6C82-7043-9603-B53878D1AFAB}"/>
               </a:ext>
             </a:extLst>
           </p:cNvPr>
@@ -11200,62 +11133,8 @@
         </p:nvSpPr>
         <p:spPr>
           <a:xfrm>
-            <a:off x="8142732" y="1825623"/>
-            <a:ext cx="192024" cy="346075"/>
-          </a:xfrm>
-          <a:prstGeom prst="rect">
-            <a:avLst/>
-          </a:prstGeom>
-          <a:solidFill>
-            <a:srgbClr val="FFC000">
-              <a:alpha val="40000"/>
-            </a:srgbClr>
-          </a:solidFill>
-          <a:ln>
-            <a:noFill/>
-          </a:ln>
-        </p:spPr>
-        <p:style>
-          <a:lnRef idx="2">
-            <a:schemeClr val="accent1">
-              <a:shade val="50000"/>
-            </a:schemeClr>
-          </a:lnRef>
-          <a:fillRef idx="1">
-            <a:schemeClr val="accent1"/>
-          </a:fillRef>
-          <a:effectRef idx="0">
-            <a:schemeClr val="accent1"/>
-          </a:effectRef>
-          <a:fontRef idx="minor">
-            <a:schemeClr val="lt1"/>
-          </a:fontRef>
-        </p:style>
-        <p:txBody>
-          <a:bodyPr rtlCol="0" anchor="ctr"/>
-          <a:lstStyle/>
-          <a:p>
-            <a:pPr algn="ctr"/>
-            <a:endParaRPr lang="en-US" dirty="0"/>
-          </a:p>
-        </p:txBody>
-      </p:sp>
-      <p:sp>
-        <p:nvSpPr>
-          <p:cNvPr id="9" name="Rectangle 8">
-            <a:extLst>
-              <a:ext uri="{FF2B5EF4-FFF2-40B4-BE49-F238E27FC236}">
-                <a16:creationId xmlns:a16="http://schemas.microsoft.com/office/drawing/2014/main" id="{12CE5C1F-FFE1-524B-888F-DCB5B4780F99}"/>
-              </a:ext>
-            </a:extLst>
-          </p:cNvPr>
-          <p:cNvSpPr/>
-          <p:nvPr/>
-        </p:nvSpPr>
-        <p:spPr>
-          <a:xfrm>
-            <a:off x="909614" y="2206297"/>
-            <a:ext cx="3317408" cy="346075"/>
+            <a:off x="909614" y="1834766"/>
+            <a:ext cx="1383643" cy="346075"/>
           </a:xfrm>
           <a:prstGeom prst="rect">
             <a:avLst/>
@@ -11308,7 +11187,7 @@
         </p:nvSpPr>
         <p:spPr>
           <a:xfrm>
-            <a:off x="909614" y="3414088"/>
+            <a:off x="909614" y="3139184"/>
             <a:ext cx="1455898" cy="346075"/>
           </a:xfrm>
           <a:prstGeom prst="rect">
@@ -11350,10 +11229,10 @@
       </p:sp>
       <p:sp>
         <p:nvSpPr>
-          <p:cNvPr id="11" name="Rectangle 10">
+          <p:cNvPr id="12" name="Rectangle 11">
             <a:extLst>
               <a:ext uri="{FF2B5EF4-FFF2-40B4-BE49-F238E27FC236}">
-                <a16:creationId xmlns:a16="http://schemas.microsoft.com/office/drawing/2014/main" id="{1100B6A1-8FC9-164E-B48D-5AEB1EF6BDB2}"/>
+                <a16:creationId xmlns:a16="http://schemas.microsoft.com/office/drawing/2014/main" id="{F0D062B1-76F5-1E43-B067-441BE8AF1B26}"/>
               </a:ext>
             </a:extLst>
           </p:cNvPr>
@@ -11362,8 +11241,8 @@
         </p:nvSpPr>
         <p:spPr>
           <a:xfrm>
-            <a:off x="2365512" y="3414090"/>
-            <a:ext cx="5840234" cy="346075"/>
+            <a:off x="909614" y="3554226"/>
+            <a:ext cx="3509986" cy="346075"/>
           </a:xfrm>
           <a:prstGeom prst="rect">
             <a:avLst/>
@@ -11404,10 +11283,101 @@
       </p:sp>
       <p:sp>
         <p:nvSpPr>
-          <p:cNvPr id="12" name="Rectangle 11">
+          <p:cNvPr id="2" name="Title 1">
             <a:extLst>
               <a:ext uri="{FF2B5EF4-FFF2-40B4-BE49-F238E27FC236}">
-                <a16:creationId xmlns:a16="http://schemas.microsoft.com/office/drawing/2014/main" id="{F0D062B1-76F5-1E43-B067-441BE8AF1B26}"/>
+                <a16:creationId xmlns:a16="http://schemas.microsoft.com/office/drawing/2014/main" id="{AC0D55DF-385E-9A4F-AB08-FEBC11990B8B}"/>
+              </a:ext>
+            </a:extLst>
+          </p:cNvPr>
+          <p:cNvSpPr>
+            <a:spLocks noGrp="1"/>
+          </p:cNvSpPr>
+          <p:nvPr>
+            <p:ph type="title"/>
+          </p:nvPr>
+        </p:nvSpPr>
+        <p:spPr/>
+        <p:txBody>
+          <a:bodyPr/>
+          <a:lstStyle/>
+          <a:p>
+            <a:r>
+              <a:rPr lang="en-US" dirty="0" err="1"/>
+              <a:t>cURL</a:t>
+            </a:r>
+            <a:r>
+              <a:rPr lang="en-US" dirty="0"/>
+              <a:t> Command Examples Continued</a:t>
+            </a:r>
+          </a:p>
+        </p:txBody>
+      </p:sp>
+      <p:sp>
+        <p:nvSpPr>
+          <p:cNvPr id="4" name="Date Placeholder 3">
+            <a:extLst>
+              <a:ext uri="{FF2B5EF4-FFF2-40B4-BE49-F238E27FC236}">
+                <a16:creationId xmlns:a16="http://schemas.microsoft.com/office/drawing/2014/main" id="{6E8781CE-B8A7-7540-B619-28D099093D8B}"/>
+              </a:ext>
+            </a:extLst>
+          </p:cNvPr>
+          <p:cNvSpPr>
+            <a:spLocks noGrp="1"/>
+          </p:cNvSpPr>
+          <p:nvPr>
+            <p:ph type="dt" sz="half" idx="10"/>
+          </p:nvPr>
+        </p:nvSpPr>
+        <p:spPr/>
+        <p:txBody>
+          <a:bodyPr/>
+          <a:lstStyle/>
+          <a:p>
+            <a:r>
+              <a:rPr lang="en-US"/>
+              <a:t>World Wide Technology ©</a:t>
+            </a:r>
+            <a:endParaRPr lang="en-US" dirty="0"/>
+          </a:p>
+        </p:txBody>
+      </p:sp>
+      <p:sp>
+        <p:nvSpPr>
+          <p:cNvPr id="5" name="Slide Number Placeholder 4">
+            <a:extLst>
+              <a:ext uri="{FF2B5EF4-FFF2-40B4-BE49-F238E27FC236}">
+                <a16:creationId xmlns:a16="http://schemas.microsoft.com/office/drawing/2014/main" id="{222BEAA2-2326-1F4D-9BCE-0FC3EC23B201}"/>
+              </a:ext>
+            </a:extLst>
+          </p:cNvPr>
+          <p:cNvSpPr>
+            <a:spLocks noGrp="1"/>
+          </p:cNvSpPr>
+          <p:nvPr>
+            <p:ph type="sldNum" sz="quarter" idx="12"/>
+          </p:nvPr>
+        </p:nvSpPr>
+        <p:spPr/>
+        <p:txBody>
+          <a:bodyPr/>
+          <a:lstStyle/>
+          <a:p>
+            <a:fld id="{A44B02FA-DD2D-1844-AE35-8B2EAB0CF4EF}" type="slidenum">
+              <a:rPr lang="en-US" smtClean="0"/>
+              <a:pPr/>
+              <a:t>14</a:t>
+            </a:fld>
+            <a:endParaRPr lang="en-US" dirty="0"/>
+          </a:p>
+        </p:txBody>
+      </p:sp>
+      <p:sp>
+        <p:nvSpPr>
+          <p:cNvPr id="13" name="Rectangle 12">
+            <a:extLst>
+              <a:ext uri="{FF2B5EF4-FFF2-40B4-BE49-F238E27FC236}">
+                <a16:creationId xmlns:a16="http://schemas.microsoft.com/office/drawing/2014/main" id="{ECAD06B7-E735-D041-A877-3DAA3A185FC4}"/>
               </a:ext>
             </a:extLst>
           </p:cNvPr>
@@ -11416,8 +11386,8 @@
         </p:nvSpPr>
         <p:spPr>
           <a:xfrm>
-            <a:off x="909613" y="3794763"/>
-            <a:ext cx="4246807" cy="346075"/>
+            <a:off x="1152728" y="3971498"/>
+            <a:ext cx="1306116" cy="346075"/>
           </a:xfrm>
           <a:prstGeom prst="rect">
             <a:avLst/>
@@ -11458,10 +11428,10 @@
       </p:sp>
       <p:sp>
         <p:nvSpPr>
-          <p:cNvPr id="13" name="Rectangle 12">
+          <p:cNvPr id="15" name="Rectangle 14">
             <a:extLst>
               <a:ext uri="{FF2B5EF4-FFF2-40B4-BE49-F238E27FC236}">
-                <a16:creationId xmlns:a16="http://schemas.microsoft.com/office/drawing/2014/main" id="{ECAD06B7-E735-D041-A877-3DAA3A185FC4}"/>
+                <a16:creationId xmlns:a16="http://schemas.microsoft.com/office/drawing/2014/main" id="{B679387D-B1E9-5145-9D8F-5D43A6FA5EEE}"/>
               </a:ext>
             </a:extLst>
           </p:cNvPr>
@@ -11470,8 +11440,8 @@
         </p:nvSpPr>
         <p:spPr>
           <a:xfrm>
-            <a:off x="909613" y="4175435"/>
-            <a:ext cx="198516" cy="346075"/>
+            <a:off x="911236" y="3971498"/>
+            <a:ext cx="241492" cy="346075"/>
           </a:xfrm>
           <a:prstGeom prst="rect">
             <a:avLst/>
@@ -11512,10 +11482,10 @@
       </p:sp>
       <p:sp>
         <p:nvSpPr>
-          <p:cNvPr id="14" name="Rectangle 13">
+          <p:cNvPr id="16" name="Rectangle 15">
             <a:extLst>
               <a:ext uri="{FF2B5EF4-FFF2-40B4-BE49-F238E27FC236}">
-                <a16:creationId xmlns:a16="http://schemas.microsoft.com/office/drawing/2014/main" id="{00602D00-5324-D14C-A172-33657E9029B7}"/>
+                <a16:creationId xmlns:a16="http://schemas.microsoft.com/office/drawing/2014/main" id="{D8B40A51-E9D9-C042-8150-D2136E003E28}"/>
               </a:ext>
             </a:extLst>
           </p:cNvPr>
@@ -11524,16 +11494,16 @@
         </p:nvSpPr>
         <p:spPr>
           <a:xfrm>
-            <a:off x="1108128" y="4175435"/>
-            <a:ext cx="7314759" cy="346075"/>
+            <a:off x="1410696" y="1834766"/>
+            <a:ext cx="192024" cy="346075"/>
           </a:xfrm>
           <a:prstGeom prst="rect">
             <a:avLst/>
           </a:prstGeom>
           <a:solidFill>
-            <a:schemeClr val="tx1">
+            <a:srgbClr val="FFC000">
               <a:alpha val="40000"/>
-            </a:schemeClr>
+            </a:srgbClr>
           </a:solidFill>
           <a:ln>
             <a:noFill/>
@@ -11652,21 +11622,30 @@
                             </p:childTnLst>
                           </p:cTn>
                         </p:par>
+                      </p:childTnLst>
+                    </p:cTn>
+                  </p:par>
+                  <p:par>
+                    <p:cTn id="8" fill="hold">
+                      <p:stCondLst>
+                        <p:cond delay="indefinite"/>
+                      </p:stCondLst>
+                      <p:childTnLst>
                         <p:par>
-                          <p:cTn id="8" fill="hold">
+                          <p:cTn id="9" fill="hold">
                             <p:stCondLst>
-                              <p:cond delay="2000"/>
+                              <p:cond delay="0"/>
                             </p:stCondLst>
                             <p:childTnLst>
                               <p:par>
-                                <p:cTn id="9" presetID="22" presetClass="entr" presetSubtype="8" fill="hold" nodeType="afterEffect">
+                                <p:cTn id="10" presetID="9" presetClass="entr" presetSubtype="0" fill="hold" nodeType="clickEffect">
                                   <p:stCondLst>
                                     <p:cond delay="0"/>
                                   </p:stCondLst>
                                   <p:childTnLst>
                                     <p:set>
                                       <p:cBhvr>
-                                        <p:cTn id="10" dur="1" fill="hold">
+                                        <p:cTn id="11" dur="1" fill="hold">
                                           <p:stCondLst>
                                             <p:cond delay="0"/>
                                           </p:stCondLst>
@@ -11686,9 +11665,9 @@
                                         <p:strVal val="visible"/>
                                       </p:to>
                                     </p:set>
-                                    <p:animEffect transition="in" filter="wipe(left)">
+                                    <p:animEffect transition="in" filter="dissolve">
                                       <p:cBhvr>
-                                        <p:cTn id="11" dur="1000"/>
+                                        <p:cTn id="12" dur="500"/>
                                         <p:tgtEl>
                                           <p:spTgt spid="3">
                                             <p:txEl>
@@ -11708,87 +11687,26 @@
                     </p:cTn>
                   </p:par>
                   <p:par>
-                    <p:cTn id="12" fill="hold">
+                    <p:cTn id="13" fill="hold">
                       <p:stCondLst>
                         <p:cond delay="indefinite"/>
                       </p:stCondLst>
                       <p:childTnLst>
                         <p:par>
-                          <p:cTn id="13" fill="hold">
+                          <p:cTn id="14" fill="hold">
                             <p:stCondLst>
                               <p:cond delay="0"/>
                             </p:stCondLst>
                             <p:childTnLst>
                               <p:par>
-                                <p:cTn id="14" presetID="9" presetClass="entr" presetSubtype="0" fill="hold" nodeType="clickEffect">
+                                <p:cTn id="15" presetID="22" presetClass="entr" presetSubtype="8" fill="hold" grpId="0" nodeType="clickEffect">
                                   <p:stCondLst>
                                     <p:cond delay="0"/>
                                   </p:stCondLst>
                                   <p:childTnLst>
                                     <p:set>
                                       <p:cBhvr>
-                                        <p:cTn id="15" dur="1" fill="hold">
-                                          <p:stCondLst>
-                                            <p:cond delay="0"/>
-                                          </p:stCondLst>
-                                        </p:cTn>
-                                        <p:tgtEl>
-                                          <p:spTgt spid="3">
-                                            <p:txEl>
-                                              <p:pRg st="2" end="2"/>
-                                            </p:txEl>
-                                          </p:spTgt>
-                                        </p:tgtEl>
-                                        <p:attrNameLst>
-                                          <p:attrName>style.visibility</p:attrName>
-                                        </p:attrNameLst>
-                                      </p:cBhvr>
-                                      <p:to>
-                                        <p:strVal val="visible"/>
-                                      </p:to>
-                                    </p:set>
-                                    <p:animEffect transition="in" filter="dissolve">
-                                      <p:cBhvr>
-                                        <p:cTn id="16" dur="500"/>
-                                        <p:tgtEl>
-                                          <p:spTgt spid="3">
-                                            <p:txEl>
-                                              <p:pRg st="2" end="2"/>
-                                            </p:txEl>
-                                          </p:spTgt>
-                                        </p:tgtEl>
-                                      </p:cBhvr>
-                                    </p:animEffect>
-                                  </p:childTnLst>
-                                </p:cTn>
-                              </p:par>
-                            </p:childTnLst>
-                          </p:cTn>
-                        </p:par>
-                      </p:childTnLst>
-                    </p:cTn>
-                  </p:par>
-                  <p:par>
-                    <p:cTn id="17" fill="hold">
-                      <p:stCondLst>
-                        <p:cond delay="indefinite"/>
-                      </p:stCondLst>
-                      <p:childTnLst>
-                        <p:par>
-                          <p:cTn id="18" fill="hold">
-                            <p:stCondLst>
-                              <p:cond delay="0"/>
-                            </p:stCondLst>
-                            <p:childTnLst>
-                              <p:par>
-                                <p:cTn id="19" presetID="22" presetClass="entr" presetSubtype="8" fill="hold" grpId="0" nodeType="clickEffect">
-                                  <p:stCondLst>
-                                    <p:cond delay="0"/>
-                                  </p:stCondLst>
-                                  <p:childTnLst>
-                                    <p:set>
-                                      <p:cBhvr>
-                                        <p:cTn id="20" dur="1" fill="hold">
+                                        <p:cTn id="16" dur="1" fill="hold">
                                           <p:stCondLst>
                                             <p:cond delay="0"/>
                                           </p:stCondLst>
@@ -11806,9 +11724,53 @@
                                     </p:set>
                                     <p:animEffect transition="in" filter="wipe(left)">
                                       <p:cBhvr>
-                                        <p:cTn id="21" dur="500"/>
+                                        <p:cTn id="17" dur="500"/>
                                         <p:tgtEl>
                                           <p:spTgt spid="6"/>
+                                        </p:tgtEl>
+                                      </p:cBhvr>
+                                    </p:animEffect>
+                                  </p:childTnLst>
+                                </p:cTn>
+                              </p:par>
+                            </p:childTnLst>
+                          </p:cTn>
+                        </p:par>
+                        <p:par>
+                          <p:cTn id="18" fill="hold">
+                            <p:stCondLst>
+                              <p:cond delay="500"/>
+                            </p:stCondLst>
+                            <p:childTnLst>
+                              <p:par>
+                                <p:cTn id="19" presetID="22" presetClass="entr" presetSubtype="8" fill="hold" grpId="0" nodeType="afterEffect">
+                                  <p:stCondLst>
+                                    <p:cond delay="500"/>
+                                  </p:stCondLst>
+                                  <p:childTnLst>
+                                    <p:set>
+                                      <p:cBhvr>
+                                        <p:cTn id="20" dur="1" fill="hold">
+                                          <p:stCondLst>
+                                            <p:cond delay="0"/>
+                                          </p:stCondLst>
+                                        </p:cTn>
+                                        <p:tgtEl>
+                                          <p:spTgt spid="7"/>
+                                        </p:tgtEl>
+                                        <p:attrNameLst>
+                                          <p:attrName>style.visibility</p:attrName>
+                                        </p:attrNameLst>
+                                      </p:cBhvr>
+                                      <p:to>
+                                        <p:strVal val="visible"/>
+                                      </p:to>
+                                    </p:set>
+                                    <p:animEffect transition="in" filter="wipe(left)">
+                                      <p:cBhvr>
+                                        <p:cTn id="21" dur="1000"/>
+                                        <p:tgtEl>
+                                          <p:spTgt spid="7"/>
                                         </p:tgtEl>
                                       </p:cBhvr>
                                     </p:animEffect>
@@ -11834,7 +11796,7 @@
                             </p:stCondLst>
                             <p:childTnLst>
                               <p:par>
-                                <p:cTn id="24" presetID="22" presetClass="entr" presetSubtype="8" fill="hold" grpId="0" nodeType="clickEffect">
+                                <p:cTn id="24" presetID="9" presetClass="entr" presetSubtype="0" fill="hold" nodeType="clickEffect">
                                   <p:stCondLst>
                                     <p:cond delay="0"/>
                                   </p:stCondLst>
@@ -11847,7 +11809,11 @@
                                           </p:stCondLst>
                                         </p:cTn>
                                         <p:tgtEl>
-                                          <p:spTgt spid="7"/>
+                                          <p:spTgt spid="3">
+                                            <p:txEl>
+                                              <p:pRg st="2" end="2"/>
+                                            </p:txEl>
+                                          </p:spTgt>
                                         </p:tgtEl>
                                         <p:attrNameLst>
                                           <p:attrName>style.visibility</p:attrName>
@@ -11857,11 +11823,15 @@
                                         <p:strVal val="visible"/>
                                       </p:to>
                                     </p:set>
-                                    <p:animEffect transition="in" filter="wipe(left)">
+                                    <p:animEffect transition="in" filter="dissolve">
                                       <p:cBhvr>
-                                        <p:cTn id="26" dur="1000"/>
+                                        <p:cTn id="26" dur="500"/>
                                         <p:tgtEl>
-                                          <p:spTgt spid="7"/>
+                                          <p:spTgt spid="3">
+                                            <p:txEl>
+                                              <p:pRg st="2" end="2"/>
+                                            </p:txEl>
+                                          </p:spTgt>
                                         </p:tgtEl>
                                       </p:cBhvr>
                                     </p:animEffect>
@@ -11900,7 +11870,7 @@
                                           </p:stCondLst>
                                         </p:cTn>
                                         <p:tgtEl>
-                                          <p:spTgt spid="8"/>
+                                          <p:spTgt spid="16"/>
                                         </p:tgtEl>
                                         <p:attrNameLst>
                                           <p:attrName>style.visibility</p:attrName>
@@ -11914,7 +11884,7 @@
                                       <p:cBhvr>
                                         <p:cTn id="31" dur="500"/>
                                         <p:tgtEl>
-                                          <p:spTgt spid="8"/>
+                                          <p:spTgt spid="16"/>
                                         </p:tgtEl>
                                       </p:cBhvr>
                                     </p:animEffect>
@@ -11940,7 +11910,7 @@
                             </p:stCondLst>
                             <p:childTnLst>
                               <p:par>
-                                <p:cTn id="34" presetID="9" presetClass="entr" presetSubtype="0" fill="hold" nodeType="clickEffect">
+                                <p:cTn id="34" presetID="22" presetClass="entr" presetSubtype="8" fill="hold" nodeType="clickEffect">
                                   <p:stCondLst>
                                     <p:cond delay="0"/>
                                   </p:stCondLst>
@@ -11967,9 +11937,9 @@
                                         <p:strVal val="visible"/>
                                       </p:to>
                                     </p:set>
-                                    <p:animEffect transition="in" filter="dissolve">
+                                    <p:animEffect transition="in" filter="wipe(left)">
                                       <p:cBhvr>
-                                        <p:cTn id="36" dur="500"/>
+                                        <p:cTn id="36" dur="2000"/>
                                         <p:tgtEl>
                                           <p:spTgt spid="3">
                                             <p:txEl>
@@ -11985,83 +11955,21 @@
                             </p:childTnLst>
                           </p:cTn>
                         </p:par>
-                      </p:childTnLst>
-                    </p:cTn>
-                  </p:par>
-                  <p:par>
-                    <p:cTn id="37" fill="hold">
-                      <p:stCondLst>
-                        <p:cond delay="indefinite"/>
-                      </p:stCondLst>
-                      <p:childTnLst>
                         <p:par>
-                          <p:cTn id="38" fill="hold">
+                          <p:cTn id="37" fill="hold">
                             <p:stCondLst>
-                              <p:cond delay="0"/>
+                              <p:cond delay="2000"/>
                             </p:stCondLst>
                             <p:childTnLst>
                               <p:par>
-                                <p:cTn id="39" presetID="22" presetClass="entr" presetSubtype="8" fill="hold" grpId="0" nodeType="clickEffect">
+                                <p:cTn id="38" presetID="22" presetClass="entr" presetSubtype="8" fill="hold" nodeType="afterEffect">
                                   <p:stCondLst>
                                     <p:cond delay="0"/>
                                   </p:stCondLst>
                                   <p:childTnLst>
                                     <p:set>
                                       <p:cBhvr>
-                                        <p:cTn id="40" dur="1" fill="hold">
-                                          <p:stCondLst>
-                                            <p:cond delay="0"/>
-                                          </p:stCondLst>
-                                        </p:cTn>
-                                        <p:tgtEl>
-                                          <p:spTgt spid="9"/>
-                                        </p:tgtEl>
-                                        <p:attrNameLst>
-                                          <p:attrName>style.visibility</p:attrName>
-                                        </p:attrNameLst>
-                                      </p:cBhvr>
-                                      <p:to>
-                                        <p:strVal val="visible"/>
-                                      </p:to>
-                                    </p:set>
-                                    <p:animEffect transition="in" filter="wipe(left)">
-                                      <p:cBhvr>
-                                        <p:cTn id="41" dur="1000"/>
-                                        <p:tgtEl>
-                                          <p:spTgt spid="9"/>
-                                        </p:tgtEl>
-                                      </p:cBhvr>
-                                    </p:animEffect>
-                                  </p:childTnLst>
-                                </p:cTn>
-                              </p:par>
-                            </p:childTnLst>
-                          </p:cTn>
-                        </p:par>
-                      </p:childTnLst>
-                    </p:cTn>
-                  </p:par>
-                  <p:par>
-                    <p:cTn id="42" fill="hold">
-                      <p:stCondLst>
-                        <p:cond delay="indefinite"/>
-                      </p:stCondLst>
-                      <p:childTnLst>
-                        <p:par>
-                          <p:cTn id="43" fill="hold">
-                            <p:stCondLst>
-                              <p:cond delay="0"/>
-                            </p:stCondLst>
-                            <p:childTnLst>
-                              <p:par>
-                                <p:cTn id="44" presetID="22" presetClass="entr" presetSubtype="8" fill="hold" nodeType="clickEffect">
-                                  <p:stCondLst>
-                                    <p:cond delay="0"/>
-                                  </p:stCondLst>
-                                  <p:childTnLst>
-                                    <p:set>
-                                      <p:cBhvr>
-                                        <p:cTn id="45" dur="1" fill="hold">
+                                        <p:cTn id="39" dur="1" fill="hold">
                                           <p:stCondLst>
                                             <p:cond delay="0"/>
                                           </p:stCondLst>
@@ -12083,7 +11991,7 @@
                                     </p:set>
                                     <p:animEffect transition="in" filter="wipe(left)">
                                       <p:cBhvr>
-                                        <p:cTn id="46" dur="2000"/>
+                                        <p:cTn id="40" dur="1000"/>
                                         <p:tgtEl>
                                           <p:spTgt spid="3">
                                             <p:txEl>
@@ -12100,20 +12008,20 @@
                           </p:cTn>
                         </p:par>
                         <p:par>
-                          <p:cTn id="47" fill="hold">
+                          <p:cTn id="41" fill="hold">
                             <p:stCondLst>
-                              <p:cond delay="2000"/>
+                              <p:cond delay="3000"/>
                             </p:stCondLst>
                             <p:childTnLst>
                               <p:par>
-                                <p:cTn id="48" presetID="22" presetClass="entr" presetSubtype="8" fill="hold" nodeType="afterEffect">
+                                <p:cTn id="42" presetID="22" presetClass="entr" presetSubtype="8" fill="hold" nodeType="afterEffect">
                                   <p:stCondLst>
                                     <p:cond delay="0"/>
                                   </p:stCondLst>
                                   <p:childTnLst>
                                     <p:set>
                                       <p:cBhvr>
-                                        <p:cTn id="49" dur="1" fill="hold">
+                                        <p:cTn id="43" dur="1" fill="hold">
                                           <p:stCondLst>
                                             <p:cond delay="0"/>
                                           </p:stCondLst>
@@ -12135,7 +12043,7 @@
                                     </p:set>
                                     <p:animEffect transition="in" filter="wipe(left)">
                                       <p:cBhvr>
-                                        <p:cTn id="50" dur="1000"/>
+                                        <p:cTn id="44" dur="750"/>
                                         <p:tgtEl>
                                           <p:spTgt spid="3">
                                             <p:txEl>
@@ -12151,21 +12059,30 @@
                             </p:childTnLst>
                           </p:cTn>
                         </p:par>
+                      </p:childTnLst>
+                    </p:cTn>
+                  </p:par>
+                  <p:par>
+                    <p:cTn id="45" fill="hold">
+                      <p:stCondLst>
+                        <p:cond delay="indefinite"/>
+                      </p:stCondLst>
+                      <p:childTnLst>
                         <p:par>
-                          <p:cTn id="51" fill="hold">
+                          <p:cTn id="46" fill="hold">
                             <p:stCondLst>
-                              <p:cond delay="3000"/>
+                              <p:cond delay="0"/>
                             </p:stCondLst>
                             <p:childTnLst>
                               <p:par>
-                                <p:cTn id="52" presetID="22" presetClass="entr" presetSubtype="8" fill="hold" nodeType="afterEffect">
+                                <p:cTn id="47" presetID="9" presetClass="entr" presetSubtype="0" fill="hold" nodeType="clickEffect">
                                   <p:stCondLst>
                                     <p:cond delay="0"/>
                                   </p:stCondLst>
                                   <p:childTnLst>
                                     <p:set>
                                       <p:cBhvr>
-                                        <p:cTn id="53" dur="1" fill="hold">
+                                        <p:cTn id="48" dur="1" fill="hold">
                                           <p:stCondLst>
                                             <p:cond delay="0"/>
                                           </p:stCondLst>
@@ -12185,9 +12102,9 @@
                                         <p:strVal val="visible"/>
                                       </p:to>
                                     </p:set>
-                                    <p:animEffect transition="in" filter="wipe(left)">
+                                    <p:animEffect transition="in" filter="dissolve">
                                       <p:cBhvr>
-                                        <p:cTn id="54" dur="2000"/>
+                                        <p:cTn id="49" dur="500"/>
                                         <p:tgtEl>
                                           <p:spTgt spid="3">
                                             <p:txEl>
@@ -12207,26 +12124,123 @@
                     </p:cTn>
                   </p:par>
                   <p:par>
-                    <p:cTn id="55" fill="hold">
+                    <p:cTn id="50" fill="hold">
                       <p:stCondLst>
                         <p:cond delay="indefinite"/>
                       </p:stCondLst>
                       <p:childTnLst>
                         <p:par>
-                          <p:cTn id="56" fill="hold">
+                          <p:cTn id="51" fill="hold">
                             <p:stCondLst>
                               <p:cond delay="0"/>
                             </p:stCondLst>
                             <p:childTnLst>
                               <p:par>
-                                <p:cTn id="57" presetID="9" presetClass="entr" presetSubtype="0" fill="hold" nodeType="clickEffect">
+                                <p:cTn id="52" presetID="22" presetClass="entr" presetSubtype="8" fill="hold" grpId="0" nodeType="clickEffect">
                                   <p:stCondLst>
                                     <p:cond delay="0"/>
                                   </p:stCondLst>
                                   <p:childTnLst>
                                     <p:set>
                                       <p:cBhvr>
-                                        <p:cTn id="58" dur="1" fill="hold">
+                                        <p:cTn id="53" dur="1" fill="hold">
+                                          <p:stCondLst>
+                                            <p:cond delay="0"/>
+                                          </p:stCondLst>
+                                        </p:cTn>
+                                        <p:tgtEl>
+                                          <p:spTgt spid="10"/>
+                                        </p:tgtEl>
+                                        <p:attrNameLst>
+                                          <p:attrName>style.visibility</p:attrName>
+                                        </p:attrNameLst>
+                                      </p:cBhvr>
+                                      <p:to>
+                                        <p:strVal val="visible"/>
+                                      </p:to>
+                                    </p:set>
+                                    <p:animEffect transition="in" filter="wipe(left)">
+                                      <p:cBhvr>
+                                        <p:cTn id="54" dur="500"/>
+                                        <p:tgtEl>
+                                          <p:spTgt spid="10"/>
+                                        </p:tgtEl>
+                                      </p:cBhvr>
+                                    </p:animEffect>
+                                  </p:childTnLst>
+                                </p:cTn>
+                              </p:par>
+                            </p:childTnLst>
+                          </p:cTn>
+                        </p:par>
+                        <p:par>
+                          <p:cTn id="55" fill="hold">
+                            <p:stCondLst>
+                              <p:cond delay="500"/>
+                            </p:stCondLst>
+                            <p:childTnLst>
+                              <p:par>
+                                <p:cTn id="56" presetID="22" presetClass="entr" presetSubtype="8" fill="hold" grpId="0" nodeType="afterEffect">
+                                  <p:stCondLst>
+                                    <p:cond delay="500"/>
+                                  </p:stCondLst>
+                                  <p:childTnLst>
+                                    <p:set>
+                                      <p:cBhvr>
+                                        <p:cTn id="57" dur="1" fill="hold">
+                                          <p:stCondLst>
+                                            <p:cond delay="0"/>
+                                          </p:stCondLst>
+                                        </p:cTn>
+                                        <p:tgtEl>
+                                          <p:spTgt spid="11"/>
+                                        </p:tgtEl>
+                                        <p:attrNameLst>
+                                          <p:attrName>style.visibility</p:attrName>
+                                        </p:attrNameLst>
+                                      </p:cBhvr>
+                                      <p:to>
+                                        <p:strVal val="visible"/>
+                                      </p:to>
+                                    </p:set>
+                                    <p:animEffect transition="in" filter="wipe(left)">
+                                      <p:cBhvr>
+                                        <p:cTn id="58" dur="1000"/>
+                                        <p:tgtEl>
+                                          <p:spTgt spid="11"/>
+                                        </p:tgtEl>
+                                      </p:cBhvr>
+                                    </p:animEffect>
+                                  </p:childTnLst>
+                                </p:cTn>
+                              </p:par>
+                            </p:childTnLst>
+                          </p:cTn>
+                        </p:par>
+                      </p:childTnLst>
+                    </p:cTn>
+                  </p:par>
+                  <p:par>
+                    <p:cTn id="59" fill="hold">
+                      <p:stCondLst>
+                        <p:cond delay="indefinite"/>
+                      </p:stCondLst>
+                      <p:childTnLst>
+                        <p:par>
+                          <p:cTn id="60" fill="hold">
+                            <p:stCondLst>
+                              <p:cond delay="0"/>
+                            </p:stCondLst>
+                            <p:childTnLst>
+                              <p:par>
+                                <p:cTn id="61" presetID="9" presetClass="entr" presetSubtype="0" fill="hold" nodeType="clickEffect">
+                                  <p:stCondLst>
+                                    <p:cond delay="0"/>
+                                  </p:stCondLst>
+                                  <p:childTnLst>
+                                    <p:set>
+                                      <p:cBhvr>
+                                        <p:cTn id="62" dur="1" fill="hold">
                                           <p:stCondLst>
                                             <p:cond delay="0"/>
                                           </p:stCondLst>
@@ -12248,7 +12262,7 @@
                                     </p:set>
                                     <p:animEffect transition="in" filter="dissolve">
                                       <p:cBhvr>
-                                        <p:cTn id="59" dur="500"/>
+                                        <p:cTn id="63" dur="500"/>
                                         <p:tgtEl>
                                           <p:spTgt spid="3">
                                             <p:txEl>
@@ -12268,32 +12282,32 @@
                     </p:cTn>
                   </p:par>
                   <p:par>
-                    <p:cTn id="60" fill="hold">
+                    <p:cTn id="64" fill="hold">
                       <p:stCondLst>
                         <p:cond delay="indefinite"/>
                       </p:stCondLst>
                       <p:childTnLst>
                         <p:par>
-                          <p:cTn id="61" fill="hold">
+                          <p:cTn id="65" fill="hold">
                             <p:stCondLst>
                               <p:cond delay="0"/>
                             </p:stCondLst>
                             <p:childTnLst>
                               <p:par>
-                                <p:cTn id="62" presetID="22" presetClass="entr" presetSubtype="8" fill="hold" grpId="0" nodeType="clickEffect">
+                                <p:cTn id="66" presetID="22" presetClass="entr" presetSubtype="8" fill="hold" grpId="0" nodeType="clickEffect">
                                   <p:stCondLst>
                                     <p:cond delay="0"/>
                                   </p:stCondLst>
                                   <p:childTnLst>
                                     <p:set>
                                       <p:cBhvr>
-                                        <p:cTn id="63" dur="1" fill="hold">
+                                        <p:cTn id="67" dur="1" fill="hold">
                                           <p:stCondLst>
                                             <p:cond delay="0"/>
                                           </p:stCondLst>
                                         </p:cTn>
                                         <p:tgtEl>
-                                          <p:spTgt spid="10"/>
+                                          <p:spTgt spid="12"/>
                                         </p:tgtEl>
                                         <p:attrNameLst>
                                           <p:attrName>style.visibility</p:attrName>
@@ -12305,9 +12319,9 @@
                                     </p:set>
                                     <p:animEffect transition="in" filter="wipe(left)">
                                       <p:cBhvr>
-                                        <p:cTn id="64" dur="500"/>
+                                        <p:cTn id="68" dur="1000"/>
                                         <p:tgtEl>
-                                          <p:spTgt spid="10"/>
+                                          <p:spTgt spid="12"/>
                                         </p:tgtEl>
                                       </p:cBhvr>
                                     </p:animEffect>
@@ -12321,79 +12335,26 @@
                     </p:cTn>
                   </p:par>
                   <p:par>
-                    <p:cTn id="65" fill="hold">
+                    <p:cTn id="69" fill="hold">
                       <p:stCondLst>
                         <p:cond delay="indefinite"/>
                       </p:stCondLst>
                       <p:childTnLst>
                         <p:par>
-                          <p:cTn id="66" fill="hold">
+                          <p:cTn id="70" fill="hold">
                             <p:stCondLst>
                               <p:cond delay="0"/>
                             </p:stCondLst>
                             <p:childTnLst>
                               <p:par>
-                                <p:cTn id="67" presetID="22" presetClass="entr" presetSubtype="8" fill="hold" grpId="0" nodeType="clickEffect">
+                                <p:cTn id="71" presetID="9" presetClass="entr" presetSubtype="0" fill="hold" nodeType="clickEffect">
                                   <p:stCondLst>
                                     <p:cond delay="0"/>
                                   </p:stCondLst>
                                   <p:childTnLst>
                                     <p:set>
                                       <p:cBhvr>
-                                        <p:cTn id="68" dur="1" fill="hold">
-                                          <p:stCondLst>
-                                            <p:cond delay="0"/>
-                                          </p:stCondLst>
-                                        </p:cTn>
-                                        <p:tgtEl>
-                                          <p:spTgt spid="11"/>
-                                        </p:tgtEl>
-                                        <p:attrNameLst>
-                                          <p:attrName>style.visibility</p:attrName>
-                                        </p:attrNameLst>
-                                      </p:cBhvr>
-                                      <p:to>
-                                        <p:strVal val="visible"/>
-                                      </p:to>
-                                    </p:set>
-                                    <p:animEffect transition="in" filter="wipe(left)">
-                                      <p:cBhvr>
-                                        <p:cTn id="69" dur="1000"/>
-                                        <p:tgtEl>
-                                          <p:spTgt spid="11"/>
-                                        </p:tgtEl>
-                                      </p:cBhvr>
-                                    </p:animEffect>
-                                  </p:childTnLst>
-                                </p:cTn>
-                              </p:par>
-                            </p:childTnLst>
-                          </p:cTn>
-                        </p:par>
-                      </p:childTnLst>
-                    </p:cTn>
-                  </p:par>
-                  <p:par>
-                    <p:cTn id="70" fill="hold">
-                      <p:stCondLst>
-                        <p:cond delay="indefinite"/>
-                      </p:stCondLst>
-                      <p:childTnLst>
-                        <p:par>
-                          <p:cTn id="71" fill="hold">
-                            <p:stCondLst>
-                              <p:cond delay="0"/>
-                            </p:stCondLst>
-                            <p:childTnLst>
-                              <p:par>
-                                <p:cTn id="72" presetID="9" presetClass="entr" presetSubtype="0" fill="hold" nodeType="clickEffect">
-                                  <p:stCondLst>
-                                    <p:cond delay="0"/>
-                                  </p:stCondLst>
-                                  <p:childTnLst>
-                                    <p:set>
-                                      <p:cBhvr>
-                                        <p:cTn id="73" dur="1" fill="hold">
+                                        <p:cTn id="72" dur="1" fill="hold">
                                           <p:stCondLst>
                                             <p:cond delay="0"/>
                                           </p:stCondLst>
@@ -12415,7 +12376,7 @@
                                     </p:set>
                                     <p:animEffect transition="in" filter="dissolve">
                                       <p:cBhvr>
-                                        <p:cTn id="74" dur="500"/>
+                                        <p:cTn id="73" dur="500"/>
                                         <p:tgtEl>
                                           <p:spTgt spid="3">
                                             <p:txEl>
@@ -12435,32 +12396,32 @@
                     </p:cTn>
                   </p:par>
                   <p:par>
-                    <p:cTn id="75" fill="hold">
+                    <p:cTn id="74" fill="hold">
                       <p:stCondLst>
                         <p:cond delay="indefinite"/>
                       </p:stCondLst>
                       <p:childTnLst>
                         <p:par>
-                          <p:cTn id="76" fill="hold">
+                          <p:cTn id="75" fill="hold">
                             <p:stCondLst>
                               <p:cond delay="0"/>
                             </p:stCondLst>
                             <p:childTnLst>
                               <p:par>
-                                <p:cTn id="77" presetID="22" presetClass="entr" presetSubtype="8" fill="hold" grpId="0" nodeType="clickEffect">
+                                <p:cTn id="76" presetID="22" presetClass="entr" presetSubtype="8" fill="hold" grpId="0" nodeType="clickEffect">
                                   <p:stCondLst>
                                     <p:cond delay="0"/>
                                   </p:stCondLst>
                                   <p:childTnLst>
                                     <p:set>
                                       <p:cBhvr>
-                                        <p:cTn id="78" dur="1" fill="hold">
+                                        <p:cTn id="77" dur="1" fill="hold">
                                           <p:stCondLst>
                                             <p:cond delay="0"/>
                                           </p:stCondLst>
                                         </p:cTn>
                                         <p:tgtEl>
-                                          <p:spTgt spid="12"/>
+                                          <p:spTgt spid="15"/>
                                         </p:tgtEl>
                                         <p:attrNameLst>
                                           <p:attrName>style.visibility</p:attrName>
@@ -12472,9 +12433,9 @@
                                     </p:set>
                                     <p:animEffect transition="in" filter="wipe(left)">
                                       <p:cBhvr>
-                                        <p:cTn id="79" dur="1000"/>
+                                        <p:cTn id="78" dur="250"/>
                                         <p:tgtEl>
-                                          <p:spTgt spid="12"/>
+                                          <p:spTgt spid="15"/>
                                         </p:tgtEl>
                                       </p:cBhvr>
                                     </p:animEffect>
@@ -12488,26 +12449,26 @@
                     </p:cTn>
                   </p:par>
                   <p:par>
-                    <p:cTn id="80" fill="hold">
+                    <p:cTn id="79" fill="hold">
                       <p:stCondLst>
                         <p:cond delay="indefinite"/>
                       </p:stCondLst>
                       <p:childTnLst>
                         <p:par>
-                          <p:cTn id="81" fill="hold">
+                          <p:cTn id="80" fill="hold">
                             <p:stCondLst>
                               <p:cond delay="0"/>
                             </p:stCondLst>
                             <p:childTnLst>
                               <p:par>
-                                <p:cTn id="82" presetID="9" presetClass="entr" presetSubtype="0" fill="hold" nodeType="clickEffect">
+                                <p:cTn id="81" presetID="9" presetClass="entr" presetSubtype="0" fill="hold" nodeType="clickEffect">
                                   <p:stCondLst>
                                     <p:cond delay="0"/>
                                   </p:stCondLst>
                                   <p:childTnLst>
                                     <p:set>
                                       <p:cBhvr>
-                                        <p:cTn id="83" dur="1" fill="hold">
+                                        <p:cTn id="82" dur="1" fill="hold">
                                           <p:stCondLst>
                                             <p:cond delay="0"/>
                                           </p:stCondLst>
@@ -12529,7 +12490,7 @@
                                     </p:set>
                                     <p:animEffect transition="in" filter="dissolve">
                                       <p:cBhvr>
-                                        <p:cTn id="84" dur="500"/>
+                                        <p:cTn id="83" dur="500"/>
                                         <p:tgtEl>
                                           <p:spTgt spid="3">
                                             <p:txEl>
@@ -12549,26 +12510,26 @@
                     </p:cTn>
                   </p:par>
                   <p:par>
-                    <p:cTn id="85" fill="hold">
+                    <p:cTn id="84" fill="hold">
                       <p:stCondLst>
                         <p:cond delay="indefinite"/>
                       </p:stCondLst>
                       <p:childTnLst>
                         <p:par>
-                          <p:cTn id="86" fill="hold">
+                          <p:cTn id="85" fill="hold">
                             <p:stCondLst>
                               <p:cond delay="0"/>
                             </p:stCondLst>
                             <p:childTnLst>
                               <p:par>
-                                <p:cTn id="87" presetID="22" presetClass="entr" presetSubtype="8" fill="hold" grpId="0" nodeType="clickEffect">
+                                <p:cTn id="86" presetID="22" presetClass="entr" presetSubtype="8" fill="hold" grpId="0" nodeType="clickEffect">
                                   <p:stCondLst>
                                     <p:cond delay="0"/>
                                   </p:stCondLst>
                                   <p:childTnLst>
                                     <p:set>
                                       <p:cBhvr>
-                                        <p:cTn id="88" dur="1" fill="hold">
+                                        <p:cTn id="87" dur="1" fill="hold">
                                           <p:stCondLst>
                                             <p:cond delay="0"/>
                                           </p:stCondLst>
@@ -12586,123 +12547,9 @@
                                     </p:set>
                                     <p:animEffect transition="in" filter="wipe(left)">
                                       <p:cBhvr>
-                                        <p:cTn id="89" dur="250"/>
+                                        <p:cTn id="88" dur="250"/>
                                         <p:tgtEl>
                                           <p:spTgt spid="13"/>
-                                        </p:tgtEl>
-                                      </p:cBhvr>
-                                    </p:animEffect>
-                                  </p:childTnLst>
-                                </p:cTn>
-                              </p:par>
-                            </p:childTnLst>
-                          </p:cTn>
-                        </p:par>
-                      </p:childTnLst>
-                    </p:cTn>
-                  </p:par>
-                  <p:par>
-                    <p:cTn id="90" fill="hold">
-                      <p:stCondLst>
-                        <p:cond delay="indefinite"/>
-                      </p:stCondLst>
-                      <p:childTnLst>
-                        <p:par>
-                          <p:cTn id="91" fill="hold">
-                            <p:stCondLst>
-                              <p:cond delay="0"/>
-                            </p:stCondLst>
-                            <p:childTnLst>
-                              <p:par>
-                                <p:cTn id="92" presetID="9" presetClass="entr" presetSubtype="0" fill="hold" nodeType="clickEffect">
-                                  <p:stCondLst>
-                                    <p:cond delay="0"/>
-                                  </p:stCondLst>
-                                  <p:childTnLst>
-                                    <p:set>
-                                      <p:cBhvr>
-                                        <p:cTn id="93" dur="1" fill="hold">
-                                          <p:stCondLst>
-                                            <p:cond delay="0"/>
-                                          </p:stCondLst>
-                                        </p:cTn>
-                                        <p:tgtEl>
-                                          <p:spTgt spid="3">
-                                            <p:txEl>
-                                              <p:pRg st="10" end="10"/>
-                                            </p:txEl>
-                                          </p:spTgt>
-                                        </p:tgtEl>
-                                        <p:attrNameLst>
-                                          <p:attrName>style.visibility</p:attrName>
-                                        </p:attrNameLst>
-                                      </p:cBhvr>
-                                      <p:to>
-                                        <p:strVal val="visible"/>
-                                      </p:to>
-                                    </p:set>
-                                    <p:animEffect transition="in" filter="dissolve">
-                                      <p:cBhvr>
-                                        <p:cTn id="94" dur="500"/>
-                                        <p:tgtEl>
-                                          <p:spTgt spid="3">
-                                            <p:txEl>
-                                              <p:pRg st="10" end="10"/>
-                                            </p:txEl>
-                                          </p:spTgt>
-                                        </p:tgtEl>
-                                      </p:cBhvr>
-                                    </p:animEffect>
-                                  </p:childTnLst>
-                                </p:cTn>
-                              </p:par>
-                            </p:childTnLst>
-                          </p:cTn>
-                        </p:par>
-                      </p:childTnLst>
-                    </p:cTn>
-                  </p:par>
-                  <p:par>
-                    <p:cTn id="95" fill="hold">
-                      <p:stCondLst>
-                        <p:cond delay="indefinite"/>
-                      </p:stCondLst>
-                      <p:childTnLst>
-                        <p:par>
-                          <p:cTn id="96" fill="hold">
-                            <p:stCondLst>
-                              <p:cond delay="0"/>
-                            </p:stCondLst>
-                            <p:childTnLst>
-                              <p:par>
-                                <p:cTn id="97" presetID="22" presetClass="entr" presetSubtype="8" fill="hold" grpId="0" nodeType="clickEffect">
-                                  <p:stCondLst>
-                                    <p:cond delay="0"/>
-                                  </p:stCondLst>
-                                  <p:childTnLst>
-                                    <p:set>
-                                      <p:cBhvr>
-                                        <p:cTn id="98" dur="1" fill="hold">
-                                          <p:stCondLst>
-                                            <p:cond delay="0"/>
-                                          </p:stCondLst>
-                                        </p:cTn>
-                                        <p:tgtEl>
-                                          <p:spTgt spid="14"/>
-                                        </p:tgtEl>
-                                        <p:attrNameLst>
-                                          <p:attrName>style.visibility</p:attrName>
-                                        </p:attrNameLst>
-                                      </p:cBhvr>
-                                      <p:to>
-                                        <p:strVal val="visible"/>
-                                      </p:to>
-                                    </p:set>
-                                    <p:animEffect transition="in" filter="wipe(left)">
-                                      <p:cBhvr>
-                                        <p:cTn id="99" dur="1000"/>
-                                        <p:tgtEl>
-                                          <p:spTgt spid="14"/>
                                         </p:tgtEl>
                                       </p:cBhvr>
                                     </p:animEffect>
@@ -12737,15 +12584,14 @@
       </p:par>
     </p:tnLst>
     <p:bldLst>
+      <p:bldP spid="11" grpId="0" animBg="1"/>
+      <p:bldP spid="7" grpId="0" animBg="1"/>
       <p:bldP spid="6" grpId="0" animBg="1"/>
-      <p:bldP spid="7" grpId="0" animBg="1"/>
-      <p:bldP spid="8" grpId="0" animBg="1"/>
-      <p:bldP spid="9" grpId="0" animBg="1"/>
       <p:bldP spid="10" grpId="0" animBg="1"/>
-      <p:bldP spid="11" grpId="0" animBg="1"/>
       <p:bldP spid="12" grpId="0" animBg="1"/>
       <p:bldP spid="13" grpId="0" animBg="1"/>
-      <p:bldP spid="14" grpId="0" animBg="1"/>
+      <p:bldP spid="15" grpId="0" animBg="1"/>
+      <p:bldP spid="16" grpId="0" animBg="1"/>
     </p:bldLst>
   </p:timing>
 </p:sld>

</xml_diff>

<commit_message>
Added third cURL command example slide
</commit_message>
<xml_diff>
--- a/curl-requests-foundations.pptx
+++ b/curl-requests-foundations.pptx
@@ -16,16 +16,16 @@
     <p:sldId id="272" r:id="rId7"/>
     <p:sldId id="278" r:id="rId8"/>
     <p:sldId id="257" r:id="rId9"/>
-    <p:sldId id="327" r:id="rId10"/>
-    <p:sldId id="281" r:id="rId11"/>
-    <p:sldId id="339" r:id="rId12"/>
-    <p:sldId id="336" r:id="rId13"/>
-    <p:sldId id="347" r:id="rId14"/>
-    <p:sldId id="348" r:id="rId15"/>
+    <p:sldId id="281" r:id="rId10"/>
+    <p:sldId id="339" r:id="rId11"/>
+    <p:sldId id="336" r:id="rId12"/>
+    <p:sldId id="347" r:id="rId13"/>
+    <p:sldId id="348" r:id="rId14"/>
+    <p:sldId id="350" r:id="rId15"/>
     <p:sldId id="349" r:id="rId16"/>
     <p:sldId id="331" r:id="rId17"/>
-    <p:sldId id="270" r:id="rId18"/>
-    <p:sldId id="332" r:id="rId19"/>
+    <p:sldId id="332" r:id="rId18"/>
+    <p:sldId id="270" r:id="rId19"/>
     <p:sldId id="326" r:id="rId20"/>
     <p:sldId id="322" r:id="rId21"/>
     <p:sldId id="329" r:id="rId22"/>
@@ -652,10 +652,29 @@
           <a:lstStyle/>
           <a:p>
             <a:r>
-              <a:rPr lang="en-US" dirty="0"/>
+              <a:rPr lang="en-US" b="0" i="0" dirty="0"/>
               <a:t>// TODO</a:t>
             </a:r>
-            <a:endParaRPr lang="en-US" b="0" i="0" u="none" dirty="0"/>
+          </a:p>
+          <a:p>
+            <a:pPr marL="171450" indent="-171450">
+              <a:buFont typeface="Arial" panose="020B0604020202020204" pitchFamily="34" charset="0"/>
+              <a:buChar char="•"/>
+            </a:pPr>
+            <a:r>
+              <a:rPr lang="en-US" b="0" i="0" dirty="0"/>
+              <a:t>The backslash at the end of a terminal line indicates a line break for a multi-line command</a:t>
+            </a:r>
+          </a:p>
+          <a:p>
+            <a:pPr marL="628650" lvl="1" indent="-171450">
+              <a:buFont typeface="Arial" panose="020B0604020202020204" pitchFamily="34" charset="0"/>
+              <a:buChar char="•"/>
+            </a:pPr>
+            <a:r>
+              <a:rPr lang="en-US" b="0" i="0" dirty="0"/>
+              <a:t>This can make it easier to read long commands</a:t>
+            </a:r>
           </a:p>
         </p:txBody>
       </p:sp>
@@ -685,7 +704,7 @@
     </p:spTree>
     <p:extLst>
       <p:ext uri="{BB962C8B-B14F-4D97-AF65-F5344CB8AC3E}">
-        <p14:creationId xmlns:p14="http://schemas.microsoft.com/office/powerpoint/2010/main" val="2398170700"/>
+        <p14:creationId xmlns:p14="http://schemas.microsoft.com/office/powerpoint/2010/main" val="2627601707"/>
       </p:ext>
     </p:extLst>
   </p:cSld>
@@ -744,26 +763,6 @@
               <a:t>// TODO</a:t>
             </a:r>
           </a:p>
-          <a:p>
-            <a:pPr marL="171450" indent="-171450">
-              <a:buFont typeface="Arial" panose="020B0604020202020204" pitchFamily="34" charset="0"/>
-              <a:buChar char="•"/>
-            </a:pPr>
-            <a:r>
-              <a:rPr lang="en-US" b="0" i="0" dirty="0"/>
-              <a:t>The backslash at the end of a terminal line indicates a line break for a multi-line command</a:t>
-            </a:r>
-          </a:p>
-          <a:p>
-            <a:pPr marL="628650" lvl="1" indent="-171450">
-              <a:buFont typeface="Arial" panose="020B0604020202020204" pitchFamily="34" charset="0"/>
-              <a:buChar char="•"/>
-            </a:pPr>
-            <a:r>
-              <a:rPr lang="en-US" b="0" i="0" dirty="0"/>
-              <a:t>This can make it easier to read long commands</a:t>
-            </a:r>
-          </a:p>
         </p:txBody>
       </p:sp>
       <p:sp>
@@ -792,7 +791,7 @@
     </p:spTree>
     <p:extLst>
       <p:ext uri="{BB962C8B-B14F-4D97-AF65-F5344CB8AC3E}">
-        <p14:creationId xmlns:p14="http://schemas.microsoft.com/office/powerpoint/2010/main" val="2627601707"/>
+        <p14:creationId xmlns:p14="http://schemas.microsoft.com/office/powerpoint/2010/main" val="3177663895"/>
       </p:ext>
     </p:extLst>
   </p:cSld>
@@ -879,7 +878,7 @@
     </p:spTree>
     <p:extLst>
       <p:ext uri="{BB962C8B-B14F-4D97-AF65-F5344CB8AC3E}">
-        <p14:creationId xmlns:p14="http://schemas.microsoft.com/office/powerpoint/2010/main" val="3177663895"/>
+        <p14:creationId xmlns:p14="http://schemas.microsoft.com/office/powerpoint/2010/main" val="2068569343"/>
       </p:ext>
     </p:extLst>
   </p:cSld>
@@ -1078,7 +1077,7 @@
           <a:p>
             <a:fld id="{020CF8D1-BA82-5045-ACF9-1AA42AD6A519}" type="slidenum">
               <a:rPr lang="en-US" smtClean="0"/>
-              <a:t>17</a:t>
+              <a:t>18</a:t>
             </a:fld>
             <a:endParaRPr lang="en-US"/>
           </a:p>
@@ -2645,8 +2644,28 @@
           <a:lstStyle/>
           <a:p>
             <a:r>
-              <a:rPr lang="en-US" dirty="0"/>
+              <a:rPr lang="en-US" b="0" i="0" dirty="0"/>
               <a:t>// TODO</a:t>
+            </a:r>
+          </a:p>
+          <a:p>
+            <a:pPr marL="171450" indent="-171450">
+              <a:buFont typeface="Arial" panose="020B0604020202020204" pitchFamily="34" charset="0"/>
+              <a:buChar char="•"/>
+            </a:pPr>
+            <a:r>
+              <a:rPr lang="en-US" b="0" i="0" dirty="0"/>
+              <a:t>You could enter only the base URL and that will return the full HTML response that your web browser will see.</a:t>
+            </a:r>
+          </a:p>
+          <a:p>
+            <a:pPr marL="628650" lvl="1" indent="-171450">
+              <a:buFont typeface="Arial" panose="020B0604020202020204" pitchFamily="34" charset="0"/>
+              <a:buChar char="•"/>
+            </a:pPr>
+            <a:r>
+              <a:rPr lang="en-US" b="0" i="0" dirty="0"/>
+              <a:t>From the CLI, that’s a lot of data to parse, for a human or a computer, so we will instead use a URL to the API endpoint which returns a much more human and computer readable format.</a:t>
             </a:r>
           </a:p>
         </p:txBody>
@@ -2677,7 +2696,7 @@
     </p:spTree>
     <p:extLst>
       <p:ext uri="{BB962C8B-B14F-4D97-AF65-F5344CB8AC3E}">
-        <p14:creationId xmlns:p14="http://schemas.microsoft.com/office/powerpoint/2010/main" val="381129055"/>
+        <p14:creationId xmlns:p14="http://schemas.microsoft.com/office/powerpoint/2010/main" val="2968376506"/>
       </p:ext>
     </p:extLst>
   </p:cSld>
@@ -2732,29 +2751,10 @@
           <a:lstStyle/>
           <a:p>
             <a:r>
-              <a:rPr lang="en-US" b="0" i="0" dirty="0"/>
+              <a:rPr lang="en-US" dirty="0"/>
               <a:t>// TODO</a:t>
             </a:r>
-          </a:p>
-          <a:p>
-            <a:pPr marL="171450" indent="-171450">
-              <a:buFont typeface="Arial" panose="020B0604020202020204" pitchFamily="34" charset="0"/>
-              <a:buChar char="•"/>
-            </a:pPr>
-            <a:r>
-              <a:rPr lang="en-US" b="0" i="0" dirty="0"/>
-              <a:t>You could enter only the base URL and that will return the full HTML response that your web browser will see.</a:t>
-            </a:r>
-          </a:p>
-          <a:p>
-            <a:pPr marL="628650" lvl="1" indent="-171450">
-              <a:buFont typeface="Arial" panose="020B0604020202020204" pitchFamily="34" charset="0"/>
-              <a:buChar char="•"/>
-            </a:pPr>
-            <a:r>
-              <a:rPr lang="en-US" b="0" i="0" dirty="0"/>
-              <a:t>From the CLI, that’s a lot of data to parse, for a human or a computer, so we will instead use a URL to the API endpoint which returns a much more human and computer readable format.</a:t>
-            </a:r>
+            <a:endParaRPr lang="en-US" b="0" i="0" u="none" dirty="0"/>
           </a:p>
         </p:txBody>
       </p:sp>
@@ -2775,7 +2775,7 @@
           <a:p>
             <a:fld id="{020CF8D1-BA82-5045-ACF9-1AA42AD6A519}" type="slidenum">
               <a:rPr lang="en-US" smtClean="0"/>
-              <a:t>10</a:t>
+              <a:t>11</a:t>
             </a:fld>
             <a:endParaRPr lang="en-US"/>
           </a:p>
@@ -2784,7 +2784,7 @@
     </p:spTree>
     <p:extLst>
       <p:ext uri="{BB962C8B-B14F-4D97-AF65-F5344CB8AC3E}">
-        <p14:creationId xmlns:p14="http://schemas.microsoft.com/office/powerpoint/2010/main" val="2968376506"/>
+        <p14:creationId xmlns:p14="http://schemas.microsoft.com/office/powerpoint/2010/main" val="2398170700"/>
       </p:ext>
     </p:extLst>
   </p:cSld>
@@ -6409,861 +6409,6 @@
       </p:grpSpPr>
       <p:sp>
         <p:nvSpPr>
-          <p:cNvPr id="2" name="Title 1">
-            <a:extLst>
-              <a:ext uri="{FF2B5EF4-FFF2-40B4-BE49-F238E27FC236}">
-                <a16:creationId xmlns:a16="http://schemas.microsoft.com/office/drawing/2014/main" id="{178FC9BC-162C-754A-A134-D392F08CDBEE}"/>
-              </a:ext>
-            </a:extLst>
-          </p:cNvPr>
-          <p:cNvSpPr>
-            <a:spLocks noGrp="1"/>
-          </p:cNvSpPr>
-          <p:nvPr>
-            <p:ph type="title"/>
-          </p:nvPr>
-        </p:nvSpPr>
-        <p:spPr/>
-        <p:txBody>
-          <a:bodyPr/>
-          <a:lstStyle/>
-          <a:p>
-            <a:r>
-              <a:rPr lang="en-US" dirty="0" err="1"/>
-              <a:t>cURL</a:t>
-            </a:r>
-            <a:r>
-              <a:rPr lang="en-US" dirty="0"/>
-              <a:t> Syntax Format</a:t>
-            </a:r>
-          </a:p>
-        </p:txBody>
-      </p:sp>
-      <p:sp>
-        <p:nvSpPr>
-          <p:cNvPr id="3" name="Content Placeholder 2">
-            <a:extLst>
-              <a:ext uri="{FF2B5EF4-FFF2-40B4-BE49-F238E27FC236}">
-                <a16:creationId xmlns:a16="http://schemas.microsoft.com/office/drawing/2014/main" id="{0ECC7DC7-0671-F543-9991-CF8210E2567B}"/>
-              </a:ext>
-            </a:extLst>
-          </p:cNvPr>
-          <p:cNvSpPr>
-            <a:spLocks noGrp="1"/>
-          </p:cNvSpPr>
-          <p:nvPr>
-            <p:ph idx="1"/>
-          </p:nvPr>
-        </p:nvSpPr>
-        <p:spPr/>
-        <p:txBody>
-          <a:bodyPr/>
-          <a:lstStyle/>
-          <a:p>
-            <a:r>
-              <a:rPr lang="en-US" dirty="0"/>
-              <a:t>Format</a:t>
-            </a:r>
-          </a:p>
-          <a:p>
-            <a:pPr marL="457200" lvl="1" indent="0">
-              <a:buNone/>
-            </a:pPr>
-            <a:r>
-              <a:rPr lang="en-US" sz="2800" b="1" i="1" dirty="0">
-                <a:solidFill>
-                  <a:srgbClr val="FFFF00"/>
-                </a:solidFill>
-              </a:rPr>
-              <a:t>curl [options…] &lt;</a:t>
-            </a:r>
-            <a:r>
-              <a:rPr lang="en-US" sz="2800" b="1" i="1" dirty="0" err="1">
-                <a:solidFill>
-                  <a:srgbClr val="FFFF00"/>
-                </a:solidFill>
-              </a:rPr>
-              <a:t>url</a:t>
-            </a:r>
-            <a:r>
-              <a:rPr lang="en-US" sz="2800" b="1" i="1" dirty="0">
-                <a:solidFill>
-                  <a:srgbClr val="FFFF00"/>
-                </a:solidFill>
-              </a:rPr>
-              <a:t>&gt;</a:t>
-            </a:r>
-            <a:endParaRPr lang="en-US" sz="2800" dirty="0"/>
-          </a:p>
-          <a:p>
-            <a:r>
-              <a:rPr lang="en-US" dirty="0"/>
-              <a:t>Open your preferred terminal (bash, PowerShell, </a:t>
-            </a:r>
-            <a:r>
-              <a:rPr lang="en-US" dirty="0" err="1"/>
-              <a:t>zsh</a:t>
-            </a:r>
-            <a:r>
-              <a:rPr lang="en-US" dirty="0"/>
-              <a:t>, etc.)</a:t>
-            </a:r>
-          </a:p>
-          <a:p>
-            <a:r>
-              <a:rPr lang="en-US" dirty="0"/>
-              <a:t>Enter the commands:</a:t>
-            </a:r>
-          </a:p>
-          <a:p>
-            <a:pPr marL="457200" lvl="1" indent="0">
-              <a:buNone/>
-            </a:pPr>
-            <a:r>
-              <a:rPr lang="en-US" sz="2800" b="1" i="1" dirty="0">
-                <a:solidFill>
-                  <a:srgbClr val="FFFF00"/>
-                </a:solidFill>
-              </a:rPr>
-              <a:t>curl --version </a:t>
-            </a:r>
-            <a:r>
-              <a:rPr lang="en-US" sz="2800" b="1" dirty="0"/>
-              <a:t>or </a:t>
-            </a:r>
-            <a:r>
-              <a:rPr lang="en-US" sz="2800" b="1" i="1" dirty="0">
-                <a:solidFill>
-                  <a:srgbClr val="FFFF00"/>
-                </a:solidFill>
-              </a:rPr>
-              <a:t>curl -V</a:t>
-            </a:r>
-          </a:p>
-          <a:p>
-            <a:pPr marL="457200" lvl="1" indent="0">
-              <a:buNone/>
-            </a:pPr>
-            <a:r>
-              <a:rPr lang="en-US" sz="2800" b="1" i="1" dirty="0">
-                <a:solidFill>
-                  <a:srgbClr val="FFFF00"/>
-                </a:solidFill>
-              </a:rPr>
-              <a:t>curl https://</a:t>
-            </a:r>
-            <a:r>
-              <a:rPr lang="en-US" sz="2800" b="1" i="1" dirty="0" err="1">
-                <a:solidFill>
-                  <a:srgbClr val="FFFF00"/>
-                </a:solidFill>
-              </a:rPr>
-              <a:t>whatsmyua.info</a:t>
-            </a:r>
-            <a:r>
-              <a:rPr lang="en-US" sz="2800" b="1" i="1" dirty="0">
-                <a:solidFill>
-                  <a:srgbClr val="FFFF00"/>
-                </a:solidFill>
-              </a:rPr>
-              <a:t>/</a:t>
-            </a:r>
-            <a:r>
-              <a:rPr lang="en-US" sz="2800" b="1" i="1" dirty="0" err="1">
-                <a:solidFill>
-                  <a:srgbClr val="FFFF00"/>
-                </a:solidFill>
-              </a:rPr>
-              <a:t>api</a:t>
-            </a:r>
-            <a:r>
-              <a:rPr lang="en-US" sz="2800" b="1" i="1" dirty="0">
-                <a:solidFill>
-                  <a:srgbClr val="FFFF00"/>
-                </a:solidFill>
-              </a:rPr>
-              <a:t>/v1/</a:t>
-            </a:r>
-            <a:r>
-              <a:rPr lang="en-US" sz="2800" b="1" i="1" dirty="0" err="1">
-                <a:solidFill>
-                  <a:srgbClr val="FFFF00"/>
-                </a:solidFill>
-              </a:rPr>
-              <a:t>ua</a:t>
-            </a:r>
-            <a:endParaRPr lang="en-US" sz="2800" b="1" i="1" dirty="0">
-              <a:solidFill>
-                <a:srgbClr val="FFFF00"/>
-              </a:solidFill>
-            </a:endParaRPr>
-          </a:p>
-        </p:txBody>
-      </p:sp>
-      <p:sp>
-        <p:nvSpPr>
-          <p:cNvPr id="4" name="Date Placeholder 3">
-            <a:extLst>
-              <a:ext uri="{FF2B5EF4-FFF2-40B4-BE49-F238E27FC236}">
-                <a16:creationId xmlns:a16="http://schemas.microsoft.com/office/drawing/2014/main" id="{38C6DDB4-CE9E-4843-86A9-EFC27330D02F}"/>
-              </a:ext>
-            </a:extLst>
-          </p:cNvPr>
-          <p:cNvSpPr>
-            <a:spLocks noGrp="1"/>
-          </p:cNvSpPr>
-          <p:nvPr>
-            <p:ph type="dt" sz="half" idx="10"/>
-          </p:nvPr>
-        </p:nvSpPr>
-        <p:spPr/>
-        <p:txBody>
-          <a:bodyPr/>
-          <a:lstStyle/>
-          <a:p>
-            <a:r>
-              <a:rPr lang="en-US"/>
-              <a:t>World Wide Technology ©</a:t>
-            </a:r>
-            <a:endParaRPr lang="en-US" dirty="0"/>
-          </a:p>
-        </p:txBody>
-      </p:sp>
-      <p:sp>
-        <p:nvSpPr>
-          <p:cNvPr id="5" name="Slide Number Placeholder 4">
-            <a:extLst>
-              <a:ext uri="{FF2B5EF4-FFF2-40B4-BE49-F238E27FC236}">
-                <a16:creationId xmlns:a16="http://schemas.microsoft.com/office/drawing/2014/main" id="{09AD6D8E-DFAE-8E42-9152-B189D9284AD9}"/>
-              </a:ext>
-            </a:extLst>
-          </p:cNvPr>
-          <p:cNvSpPr>
-            <a:spLocks noGrp="1"/>
-          </p:cNvSpPr>
-          <p:nvPr>
-            <p:ph type="sldNum" sz="quarter" idx="12"/>
-          </p:nvPr>
-        </p:nvSpPr>
-        <p:spPr/>
-        <p:txBody>
-          <a:bodyPr/>
-          <a:lstStyle/>
-          <a:p>
-            <a:fld id="{A44B02FA-DD2D-1844-AE35-8B2EAB0CF4EF}" type="slidenum">
-              <a:rPr lang="en-US" smtClean="0"/>
-              <a:pPr/>
-              <a:t>10</a:t>
-            </a:fld>
-            <a:endParaRPr lang="en-US" dirty="0"/>
-          </a:p>
-        </p:txBody>
-      </p:sp>
-      <p:sp>
-        <p:nvSpPr>
-          <p:cNvPr id="8" name="Rectangle 7">
-            <a:extLst>
-              <a:ext uri="{FF2B5EF4-FFF2-40B4-BE49-F238E27FC236}">
-                <a16:creationId xmlns:a16="http://schemas.microsoft.com/office/drawing/2014/main" id="{D58E649F-E375-614D-8A53-9704053A894D}"/>
-              </a:ext>
-            </a:extLst>
-          </p:cNvPr>
-          <p:cNvSpPr/>
-          <p:nvPr/>
-        </p:nvSpPr>
-        <p:spPr>
-          <a:xfrm>
-            <a:off x="5593080" y="4199486"/>
-            <a:ext cx="1673727" cy="404925"/>
-          </a:xfrm>
-          <a:prstGeom prst="rect">
-            <a:avLst/>
-          </a:prstGeom>
-          <a:solidFill>
-            <a:schemeClr val="tx1">
-              <a:alpha val="40000"/>
-            </a:schemeClr>
-          </a:solidFill>
-          <a:ln>
-            <a:noFill/>
-          </a:ln>
-        </p:spPr>
-        <p:style>
-          <a:lnRef idx="2">
-            <a:schemeClr val="accent1">
-              <a:shade val="50000"/>
-            </a:schemeClr>
-          </a:lnRef>
-          <a:fillRef idx="1">
-            <a:schemeClr val="accent1"/>
-          </a:fillRef>
-          <a:effectRef idx="0">
-            <a:schemeClr val="accent1"/>
-          </a:effectRef>
-          <a:fontRef idx="minor">
-            <a:schemeClr val="lt1"/>
-          </a:fontRef>
-        </p:style>
-        <p:txBody>
-          <a:bodyPr rtlCol="0" anchor="ctr"/>
-          <a:lstStyle/>
-          <a:p>
-            <a:pPr algn="ctr"/>
-            <a:endParaRPr lang="en-US" dirty="0"/>
-          </a:p>
-        </p:txBody>
-      </p:sp>
-      <p:sp>
-        <p:nvSpPr>
-          <p:cNvPr id="7" name="Rectangle 6">
-            <a:extLst>
-              <a:ext uri="{FF2B5EF4-FFF2-40B4-BE49-F238E27FC236}">
-                <a16:creationId xmlns:a16="http://schemas.microsoft.com/office/drawing/2014/main" id="{711B4F6A-3227-AA48-9B9B-D28C475E3FCA}"/>
-              </a:ext>
-            </a:extLst>
-          </p:cNvPr>
-          <p:cNvSpPr/>
-          <p:nvPr/>
-        </p:nvSpPr>
-        <p:spPr>
-          <a:xfrm>
-            <a:off x="1975629" y="4199486"/>
-            <a:ext cx="3617451" cy="404925"/>
-          </a:xfrm>
-          <a:prstGeom prst="rect">
-            <a:avLst/>
-          </a:prstGeom>
-          <a:solidFill>
-            <a:schemeClr val="tx1">
-              <a:alpha val="40000"/>
-            </a:schemeClr>
-          </a:solidFill>
-          <a:ln>
-            <a:noFill/>
-          </a:ln>
-        </p:spPr>
-        <p:style>
-          <a:lnRef idx="2">
-            <a:schemeClr val="accent1">
-              <a:shade val="50000"/>
-            </a:schemeClr>
-          </a:lnRef>
-          <a:fillRef idx="1">
-            <a:schemeClr val="accent1"/>
-          </a:fillRef>
-          <a:effectRef idx="0">
-            <a:schemeClr val="accent1"/>
-          </a:effectRef>
-          <a:fontRef idx="minor">
-            <a:schemeClr val="lt1"/>
-          </a:fontRef>
-        </p:style>
-        <p:txBody>
-          <a:bodyPr rtlCol="0" anchor="ctr"/>
-          <a:lstStyle/>
-          <a:p>
-            <a:pPr algn="ctr"/>
-            <a:endParaRPr lang="en-US" dirty="0"/>
-          </a:p>
-        </p:txBody>
-      </p:sp>
-    </p:spTree>
-    <p:extLst>
-      <p:ext uri="{BB962C8B-B14F-4D97-AF65-F5344CB8AC3E}">
-        <p14:creationId xmlns:p14="http://schemas.microsoft.com/office/powerpoint/2010/main" val="593970204"/>
-      </p:ext>
-    </p:extLst>
-  </p:cSld>
-  <p:clrMapOvr>
-    <a:masterClrMapping/>
-  </p:clrMapOvr>
-  <mc:AlternateContent xmlns:mc="http://schemas.openxmlformats.org/markup-compatibility/2006" xmlns:p14="http://schemas.microsoft.com/office/powerpoint/2010/main">
-    <mc:Choice Requires="p14">
-      <p:transition spd="med" p14:dur="700">
-        <p:fade/>
-      </p:transition>
-    </mc:Choice>
-    <mc:Fallback xmlns="">
-      <p:transition spd="med">
-        <p:fade/>
-      </p:transition>
-    </mc:Fallback>
-  </mc:AlternateContent>
-  <p:timing>
-    <p:tnLst>
-      <p:par>
-        <p:cTn id="1" dur="indefinite" restart="never" nodeType="tmRoot">
-          <p:childTnLst>
-            <p:seq concurrent="1" nextAc="seek">
-              <p:cTn id="2" dur="indefinite" nodeType="mainSeq">
-                <p:childTnLst>
-                  <p:par>
-                    <p:cTn id="3" fill="hold">
-                      <p:stCondLst>
-                        <p:cond delay="indefinite"/>
-                      </p:stCondLst>
-                      <p:childTnLst>
-                        <p:par>
-                          <p:cTn id="4" fill="hold">
-                            <p:stCondLst>
-                              <p:cond delay="0"/>
-                            </p:stCondLst>
-                            <p:childTnLst>
-                              <p:par>
-                                <p:cTn id="5" presetID="9" presetClass="entr" presetSubtype="0" fill="hold" grpId="0" nodeType="clickEffect">
-                                  <p:stCondLst>
-                                    <p:cond delay="0"/>
-                                  </p:stCondLst>
-                                  <p:childTnLst>
-                                    <p:set>
-                                      <p:cBhvr>
-                                        <p:cTn id="6" dur="1" fill="hold">
-                                          <p:stCondLst>
-                                            <p:cond delay="0"/>
-                                          </p:stCondLst>
-                                        </p:cTn>
-                                        <p:tgtEl>
-                                          <p:spTgt spid="3">
-                                            <p:txEl>
-                                              <p:pRg st="0" end="0"/>
-                                            </p:txEl>
-                                          </p:spTgt>
-                                        </p:tgtEl>
-                                        <p:attrNameLst>
-                                          <p:attrName>style.visibility</p:attrName>
-                                        </p:attrNameLst>
-                                      </p:cBhvr>
-                                      <p:to>
-                                        <p:strVal val="visible"/>
-                                      </p:to>
-                                    </p:set>
-                                    <p:animEffect transition="in" filter="dissolve">
-                                      <p:cBhvr>
-                                        <p:cTn id="7" dur="500"/>
-                                        <p:tgtEl>
-                                          <p:spTgt spid="3">
-                                            <p:txEl>
-                                              <p:pRg st="0" end="0"/>
-                                            </p:txEl>
-                                          </p:spTgt>
-                                        </p:tgtEl>
-                                      </p:cBhvr>
-                                    </p:animEffect>
-                                  </p:childTnLst>
-                                </p:cTn>
-                              </p:par>
-                              <p:par>
-                                <p:cTn id="8" presetID="9" presetClass="entr" presetSubtype="0" fill="hold" grpId="0" nodeType="withEffect">
-                                  <p:stCondLst>
-                                    <p:cond delay="0"/>
-                                  </p:stCondLst>
-                                  <p:childTnLst>
-                                    <p:set>
-                                      <p:cBhvr>
-                                        <p:cTn id="9" dur="1" fill="hold">
-                                          <p:stCondLst>
-                                            <p:cond delay="0"/>
-                                          </p:stCondLst>
-                                        </p:cTn>
-                                        <p:tgtEl>
-                                          <p:spTgt spid="3">
-                                            <p:txEl>
-                                              <p:pRg st="1" end="1"/>
-                                            </p:txEl>
-                                          </p:spTgt>
-                                        </p:tgtEl>
-                                        <p:attrNameLst>
-                                          <p:attrName>style.visibility</p:attrName>
-                                        </p:attrNameLst>
-                                      </p:cBhvr>
-                                      <p:to>
-                                        <p:strVal val="visible"/>
-                                      </p:to>
-                                    </p:set>
-                                    <p:animEffect transition="in" filter="dissolve">
-                                      <p:cBhvr>
-                                        <p:cTn id="10" dur="500"/>
-                                        <p:tgtEl>
-                                          <p:spTgt spid="3">
-                                            <p:txEl>
-                                              <p:pRg st="1" end="1"/>
-                                            </p:txEl>
-                                          </p:spTgt>
-                                        </p:tgtEl>
-                                      </p:cBhvr>
-                                    </p:animEffect>
-                                  </p:childTnLst>
-                                </p:cTn>
-                              </p:par>
-                            </p:childTnLst>
-                          </p:cTn>
-                        </p:par>
-                      </p:childTnLst>
-                    </p:cTn>
-                  </p:par>
-                  <p:par>
-                    <p:cTn id="11" fill="hold">
-                      <p:stCondLst>
-                        <p:cond delay="indefinite"/>
-                      </p:stCondLst>
-                      <p:childTnLst>
-                        <p:par>
-                          <p:cTn id="12" fill="hold">
-                            <p:stCondLst>
-                              <p:cond delay="0"/>
-                            </p:stCondLst>
-                            <p:childTnLst>
-                              <p:par>
-                                <p:cTn id="13" presetID="9" presetClass="entr" presetSubtype="0" fill="hold" grpId="0" nodeType="clickEffect">
-                                  <p:stCondLst>
-                                    <p:cond delay="0"/>
-                                  </p:stCondLst>
-                                  <p:childTnLst>
-                                    <p:set>
-                                      <p:cBhvr>
-                                        <p:cTn id="14" dur="1" fill="hold">
-                                          <p:stCondLst>
-                                            <p:cond delay="0"/>
-                                          </p:stCondLst>
-                                        </p:cTn>
-                                        <p:tgtEl>
-                                          <p:spTgt spid="3">
-                                            <p:txEl>
-                                              <p:pRg st="2" end="2"/>
-                                            </p:txEl>
-                                          </p:spTgt>
-                                        </p:tgtEl>
-                                        <p:attrNameLst>
-                                          <p:attrName>style.visibility</p:attrName>
-                                        </p:attrNameLst>
-                                      </p:cBhvr>
-                                      <p:to>
-                                        <p:strVal val="visible"/>
-                                      </p:to>
-                                    </p:set>
-                                    <p:animEffect transition="in" filter="dissolve">
-                                      <p:cBhvr>
-                                        <p:cTn id="15" dur="500"/>
-                                        <p:tgtEl>
-                                          <p:spTgt spid="3">
-                                            <p:txEl>
-                                              <p:pRg st="2" end="2"/>
-                                            </p:txEl>
-                                          </p:spTgt>
-                                        </p:tgtEl>
-                                      </p:cBhvr>
-                                    </p:animEffect>
-                                  </p:childTnLst>
-                                </p:cTn>
-                              </p:par>
-                            </p:childTnLst>
-                          </p:cTn>
-                        </p:par>
-                      </p:childTnLst>
-                    </p:cTn>
-                  </p:par>
-                  <p:par>
-                    <p:cTn id="16" fill="hold">
-                      <p:stCondLst>
-                        <p:cond delay="indefinite"/>
-                      </p:stCondLst>
-                      <p:childTnLst>
-                        <p:par>
-                          <p:cTn id="17" fill="hold">
-                            <p:stCondLst>
-                              <p:cond delay="0"/>
-                            </p:stCondLst>
-                            <p:childTnLst>
-                              <p:par>
-                                <p:cTn id="18" presetID="9" presetClass="entr" presetSubtype="0" fill="hold" grpId="0" nodeType="clickEffect">
-                                  <p:stCondLst>
-                                    <p:cond delay="0"/>
-                                  </p:stCondLst>
-                                  <p:childTnLst>
-                                    <p:set>
-                                      <p:cBhvr>
-                                        <p:cTn id="19" dur="1" fill="hold">
-                                          <p:stCondLst>
-                                            <p:cond delay="0"/>
-                                          </p:stCondLst>
-                                        </p:cTn>
-                                        <p:tgtEl>
-                                          <p:spTgt spid="3">
-                                            <p:txEl>
-                                              <p:pRg st="3" end="3"/>
-                                            </p:txEl>
-                                          </p:spTgt>
-                                        </p:tgtEl>
-                                        <p:attrNameLst>
-                                          <p:attrName>style.visibility</p:attrName>
-                                        </p:attrNameLst>
-                                      </p:cBhvr>
-                                      <p:to>
-                                        <p:strVal val="visible"/>
-                                      </p:to>
-                                    </p:set>
-                                    <p:animEffect transition="in" filter="dissolve">
-                                      <p:cBhvr>
-                                        <p:cTn id="20" dur="500"/>
-                                        <p:tgtEl>
-                                          <p:spTgt spid="3">
-                                            <p:txEl>
-                                              <p:pRg st="3" end="3"/>
-                                            </p:txEl>
-                                          </p:spTgt>
-                                        </p:tgtEl>
-                                      </p:cBhvr>
-                                    </p:animEffect>
-                                  </p:childTnLst>
-                                </p:cTn>
-                              </p:par>
-                              <p:par>
-                                <p:cTn id="21" presetID="9" presetClass="entr" presetSubtype="0" fill="hold" grpId="0" nodeType="withEffect">
-                                  <p:stCondLst>
-                                    <p:cond delay="0"/>
-                                  </p:stCondLst>
-                                  <p:childTnLst>
-                                    <p:set>
-                                      <p:cBhvr>
-                                        <p:cTn id="22" dur="1" fill="hold">
-                                          <p:stCondLst>
-                                            <p:cond delay="0"/>
-                                          </p:stCondLst>
-                                        </p:cTn>
-                                        <p:tgtEl>
-                                          <p:spTgt spid="3">
-                                            <p:txEl>
-                                              <p:pRg st="4" end="4"/>
-                                            </p:txEl>
-                                          </p:spTgt>
-                                        </p:tgtEl>
-                                        <p:attrNameLst>
-                                          <p:attrName>style.visibility</p:attrName>
-                                        </p:attrNameLst>
-                                      </p:cBhvr>
-                                      <p:to>
-                                        <p:strVal val="visible"/>
-                                      </p:to>
-                                    </p:set>
-                                    <p:animEffect transition="in" filter="dissolve">
-                                      <p:cBhvr>
-                                        <p:cTn id="23" dur="500"/>
-                                        <p:tgtEl>
-                                          <p:spTgt spid="3">
-                                            <p:txEl>
-                                              <p:pRg st="4" end="4"/>
-                                            </p:txEl>
-                                          </p:spTgt>
-                                        </p:tgtEl>
-                                      </p:cBhvr>
-                                    </p:animEffect>
-                                  </p:childTnLst>
-                                </p:cTn>
-                              </p:par>
-                              <p:par>
-                                <p:cTn id="24" presetID="9" presetClass="entr" presetSubtype="0" fill="hold" grpId="0" nodeType="withEffect">
-                                  <p:stCondLst>
-                                    <p:cond delay="0"/>
-                                  </p:stCondLst>
-                                  <p:childTnLst>
-                                    <p:set>
-                                      <p:cBhvr>
-                                        <p:cTn id="25" dur="1" fill="hold">
-                                          <p:stCondLst>
-                                            <p:cond delay="0"/>
-                                          </p:stCondLst>
-                                        </p:cTn>
-                                        <p:tgtEl>
-                                          <p:spTgt spid="3">
-                                            <p:txEl>
-                                              <p:pRg st="5" end="5"/>
-                                            </p:txEl>
-                                          </p:spTgt>
-                                        </p:tgtEl>
-                                        <p:attrNameLst>
-                                          <p:attrName>style.visibility</p:attrName>
-                                        </p:attrNameLst>
-                                      </p:cBhvr>
-                                      <p:to>
-                                        <p:strVal val="visible"/>
-                                      </p:to>
-                                    </p:set>
-                                    <p:animEffect transition="in" filter="dissolve">
-                                      <p:cBhvr>
-                                        <p:cTn id="26" dur="500"/>
-                                        <p:tgtEl>
-                                          <p:spTgt spid="3">
-                                            <p:txEl>
-                                              <p:pRg st="5" end="5"/>
-                                            </p:txEl>
-                                          </p:spTgt>
-                                        </p:tgtEl>
-                                      </p:cBhvr>
-                                    </p:animEffect>
-                                  </p:childTnLst>
-                                </p:cTn>
-                              </p:par>
-                            </p:childTnLst>
-                          </p:cTn>
-                        </p:par>
-                      </p:childTnLst>
-                    </p:cTn>
-                  </p:par>
-                  <p:par>
-                    <p:cTn id="27" fill="hold">
-                      <p:stCondLst>
-                        <p:cond delay="indefinite"/>
-                      </p:stCondLst>
-                      <p:childTnLst>
-                        <p:par>
-                          <p:cTn id="28" fill="hold">
-                            <p:stCondLst>
-                              <p:cond delay="0"/>
-                            </p:stCondLst>
-                            <p:childTnLst>
-                              <p:par>
-                                <p:cTn id="29" presetID="22" presetClass="entr" presetSubtype="8" fill="hold" grpId="0" nodeType="clickEffect">
-                                  <p:stCondLst>
-                                    <p:cond delay="0"/>
-                                  </p:stCondLst>
-                                  <p:childTnLst>
-                                    <p:set>
-                                      <p:cBhvr>
-                                        <p:cTn id="30" dur="1" fill="hold">
-                                          <p:stCondLst>
-                                            <p:cond delay="0"/>
-                                          </p:stCondLst>
-                                        </p:cTn>
-                                        <p:tgtEl>
-                                          <p:spTgt spid="7"/>
-                                        </p:tgtEl>
-                                        <p:attrNameLst>
-                                          <p:attrName>style.visibility</p:attrName>
-                                        </p:attrNameLst>
-                                      </p:cBhvr>
-                                      <p:to>
-                                        <p:strVal val="visible"/>
-                                      </p:to>
-                                    </p:set>
-                                    <p:animEffect transition="in" filter="wipe(left)">
-                                      <p:cBhvr>
-                                        <p:cTn id="31" dur="1000"/>
-                                        <p:tgtEl>
-                                          <p:spTgt spid="7"/>
-                                        </p:tgtEl>
-                                      </p:cBhvr>
-                                    </p:animEffect>
-                                  </p:childTnLst>
-                                </p:cTn>
-                              </p:par>
-                            </p:childTnLst>
-                          </p:cTn>
-                        </p:par>
-                      </p:childTnLst>
-                    </p:cTn>
-                  </p:par>
-                  <p:par>
-                    <p:cTn id="32" fill="hold">
-                      <p:stCondLst>
-                        <p:cond delay="indefinite"/>
-                      </p:stCondLst>
-                      <p:childTnLst>
-                        <p:par>
-                          <p:cTn id="33" fill="hold">
-                            <p:stCondLst>
-                              <p:cond delay="0"/>
-                            </p:stCondLst>
-                            <p:childTnLst>
-                              <p:par>
-                                <p:cTn id="34" presetID="22" presetClass="entr" presetSubtype="8" fill="hold" grpId="0" nodeType="clickEffect">
-                                  <p:stCondLst>
-                                    <p:cond delay="0"/>
-                                  </p:stCondLst>
-                                  <p:childTnLst>
-                                    <p:set>
-                                      <p:cBhvr>
-                                        <p:cTn id="35" dur="1" fill="hold">
-                                          <p:stCondLst>
-                                            <p:cond delay="0"/>
-                                          </p:stCondLst>
-                                        </p:cTn>
-                                        <p:tgtEl>
-                                          <p:spTgt spid="8"/>
-                                        </p:tgtEl>
-                                        <p:attrNameLst>
-                                          <p:attrName>style.visibility</p:attrName>
-                                        </p:attrNameLst>
-                                      </p:cBhvr>
-                                      <p:to>
-                                        <p:strVal val="visible"/>
-                                      </p:to>
-                                    </p:set>
-                                    <p:animEffect transition="in" filter="wipe(left)">
-                                      <p:cBhvr>
-                                        <p:cTn id="36" dur="1000"/>
-                                        <p:tgtEl>
-                                          <p:spTgt spid="8"/>
-                                        </p:tgtEl>
-                                      </p:cBhvr>
-                                    </p:animEffect>
-                                  </p:childTnLst>
-                                </p:cTn>
-                              </p:par>
-                            </p:childTnLst>
-                          </p:cTn>
-                        </p:par>
-                      </p:childTnLst>
-                    </p:cTn>
-                  </p:par>
-                </p:childTnLst>
-              </p:cTn>
-              <p:prevCondLst>
-                <p:cond evt="onPrev" delay="0">
-                  <p:tgtEl>
-                    <p:sldTgt/>
-                  </p:tgtEl>
-                </p:cond>
-              </p:prevCondLst>
-              <p:nextCondLst>
-                <p:cond evt="onNext" delay="0">
-                  <p:tgtEl>
-                    <p:sldTgt/>
-                  </p:tgtEl>
-                </p:cond>
-              </p:nextCondLst>
-            </p:seq>
-          </p:childTnLst>
-        </p:cTn>
-      </p:par>
-    </p:tnLst>
-    <p:bldLst>
-      <p:bldP spid="3" grpId="0" build="p"/>
-      <p:bldP spid="8" grpId="0" animBg="1"/>
-      <p:bldP spid="7" grpId="0" animBg="1"/>
-    </p:bldLst>
-  </p:timing>
-</p:sld>
-</file>
-
-<file path=ppt/slides/slide11.xml><?xml version="1.0" encoding="utf-8"?>
-<p:sld xmlns:a="http://schemas.openxmlformats.org/drawingml/2006/main" xmlns:r="http://schemas.openxmlformats.org/officeDocument/2006/relationships" xmlns:p="http://schemas.openxmlformats.org/presentationml/2006/main">
-  <p:cSld>
-    <p:spTree>
-      <p:nvGrpSpPr>
-        <p:cNvPr id="1" name=""/>
-        <p:cNvGrpSpPr/>
-        <p:nvPr/>
-      </p:nvGrpSpPr>
-      <p:grpSpPr>
-        <a:xfrm>
-          <a:off x="0" y="0"/>
-          <a:ext cx="0" cy="0"/>
-          <a:chOff x="0" y="0"/>
-          <a:chExt cx="0" cy="0"/>
-        </a:xfrm>
-      </p:grpSpPr>
-      <p:sp>
-        <p:nvSpPr>
           <p:cNvPr id="4" name="Date Placeholder 3">
             <a:extLst>
               <a:ext uri="{FF2B5EF4-FFF2-40B4-BE49-F238E27FC236}">
@@ -7315,7 +6460,7 @@
             <a:fld id="{A44B02FA-DD2D-1844-AE35-8B2EAB0CF4EF}" type="slidenum">
               <a:rPr lang="en-US" smtClean="0"/>
               <a:pPr/>
-              <a:t>11</a:t>
+              <a:t>10</a:t>
             </a:fld>
             <a:endParaRPr lang="en-US" dirty="0"/>
           </a:p>
@@ -7346,7 +6491,7 @@
 </p:sld>
 </file>
 
-<file path=ppt/slides/slide12.xml><?xml version="1.0" encoding="utf-8"?>
+<file path=ppt/slides/slide11.xml><?xml version="1.0" encoding="utf-8"?>
 <p:sld xmlns:a="http://schemas.openxmlformats.org/drawingml/2006/main" xmlns:r="http://schemas.openxmlformats.org/officeDocument/2006/relationships" xmlns:p="http://schemas.openxmlformats.org/presentationml/2006/main">
   <p:cSld>
     <p:spTree>
@@ -7879,7 +7024,7 @@
             <a:fld id="{A44B02FA-DD2D-1844-AE35-8B2EAB0CF4EF}" type="slidenum">
               <a:rPr lang="en-US" smtClean="0"/>
               <a:pPr/>
-              <a:t>12</a:t>
+              <a:t>11</a:t>
             </a:fld>
             <a:endParaRPr lang="en-US" dirty="0"/>
           </a:p>
@@ -8675,7 +7820,7 @@
 </p:sld>
 </file>
 
-<file path=ppt/slides/slide13.xml><?xml version="1.0" encoding="utf-8"?>
+<file path=ppt/slides/slide12.xml><?xml version="1.0" encoding="utf-8"?>
 <p:sld xmlns:a="http://schemas.openxmlformats.org/drawingml/2006/main" xmlns:r="http://schemas.openxmlformats.org/officeDocument/2006/relationships" xmlns:p="http://schemas.openxmlformats.org/presentationml/2006/main">
   <p:cSld>
     <p:spTree>
@@ -9024,7 +8169,7 @@
             <a:fld id="{A44B02FA-DD2D-1844-AE35-8B2EAB0CF4EF}" type="slidenum">
               <a:rPr lang="en-US" smtClean="0"/>
               <a:pPr/>
-              <a:t>13</a:t>
+              <a:t>12</a:t>
             </a:fld>
             <a:endParaRPr lang="en-US" dirty="0"/>
           </a:p>
@@ -10703,7 +9848,7 @@
 </p:sld>
 </file>
 
-<file path=ppt/slides/slide14.xml><?xml version="1.0" encoding="utf-8"?>
+<file path=ppt/slides/slide13.xml><?xml version="1.0" encoding="utf-8"?>
 <p:sld xmlns:a="http://schemas.openxmlformats.org/drawingml/2006/main" xmlns:r="http://schemas.openxmlformats.org/officeDocument/2006/relationships" xmlns:p="http://schemas.openxmlformats.org/presentationml/2006/main">
   <p:cSld>
     <p:spTree>
@@ -11366,7 +10511,7 @@
             <a:fld id="{A44B02FA-DD2D-1844-AE35-8B2EAB0CF4EF}" type="slidenum">
               <a:rPr lang="en-US" smtClean="0"/>
               <a:pPr/>
-              <a:t>14</a:t>
+              <a:t>13</a:t>
             </a:fld>
             <a:endParaRPr lang="en-US" dirty="0"/>
           </a:p>
@@ -12597,6 +11742,2004 @@
 </p:sld>
 </file>
 
+<file path=ppt/slides/slide14.xml><?xml version="1.0" encoding="utf-8"?>
+<p:sld xmlns:a="http://schemas.openxmlformats.org/drawingml/2006/main" xmlns:r="http://schemas.openxmlformats.org/officeDocument/2006/relationships" xmlns:p="http://schemas.openxmlformats.org/presentationml/2006/main">
+  <p:cSld>
+    <p:spTree>
+      <p:nvGrpSpPr>
+        <p:cNvPr id="1" name=""/>
+        <p:cNvGrpSpPr/>
+        <p:nvPr/>
+      </p:nvGrpSpPr>
+      <p:grpSpPr>
+        <a:xfrm>
+          <a:off x="0" y="0"/>
+          <a:ext cx="0" cy="0"/>
+          <a:chOff x="0" y="0"/>
+          <a:chExt cx="0" cy="0"/>
+        </a:xfrm>
+      </p:grpSpPr>
+      <p:sp>
+        <p:nvSpPr>
+          <p:cNvPr id="11" name="Rectangle 10">
+            <a:extLst>
+              <a:ext uri="{FF2B5EF4-FFF2-40B4-BE49-F238E27FC236}">
+                <a16:creationId xmlns:a16="http://schemas.microsoft.com/office/drawing/2014/main" id="{1100B6A1-8FC9-164E-B48D-5AEB1EF6BDB2}"/>
+              </a:ext>
+            </a:extLst>
+          </p:cNvPr>
+          <p:cNvSpPr/>
+          <p:nvPr/>
+        </p:nvSpPr>
+        <p:spPr>
+          <a:xfrm>
+            <a:off x="2365512" y="3139186"/>
+            <a:ext cx="8178410" cy="346075"/>
+          </a:xfrm>
+          <a:prstGeom prst="rect">
+            <a:avLst/>
+          </a:prstGeom>
+          <a:solidFill>
+            <a:schemeClr val="tx1">
+              <a:alpha val="40000"/>
+            </a:schemeClr>
+          </a:solidFill>
+          <a:ln>
+            <a:noFill/>
+          </a:ln>
+        </p:spPr>
+        <p:style>
+          <a:lnRef idx="2">
+            <a:schemeClr val="accent1">
+              <a:shade val="50000"/>
+            </a:schemeClr>
+          </a:lnRef>
+          <a:fillRef idx="1">
+            <a:schemeClr val="accent1"/>
+          </a:fillRef>
+          <a:effectRef idx="0">
+            <a:schemeClr val="accent1"/>
+          </a:effectRef>
+          <a:fontRef idx="minor">
+            <a:schemeClr val="lt1"/>
+          </a:fontRef>
+        </p:style>
+        <p:txBody>
+          <a:bodyPr rtlCol="0" anchor="ctr"/>
+          <a:lstStyle/>
+          <a:p>
+            <a:pPr algn="ctr"/>
+            <a:endParaRPr lang="en-US" dirty="0"/>
+          </a:p>
+        </p:txBody>
+      </p:sp>
+      <p:sp>
+        <p:nvSpPr>
+          <p:cNvPr id="7" name="Rectangle 6">
+            <a:extLst>
+              <a:ext uri="{FF2B5EF4-FFF2-40B4-BE49-F238E27FC236}">
+                <a16:creationId xmlns:a16="http://schemas.microsoft.com/office/drawing/2014/main" id="{D7F10BD3-DB22-7043-8433-B6CE34EB4FEE}"/>
+              </a:ext>
+            </a:extLst>
+          </p:cNvPr>
+          <p:cNvSpPr/>
+          <p:nvPr/>
+        </p:nvSpPr>
+        <p:spPr>
+          <a:xfrm>
+            <a:off x="2293257" y="1834768"/>
+            <a:ext cx="5912489" cy="346075"/>
+          </a:xfrm>
+          <a:prstGeom prst="rect">
+            <a:avLst/>
+          </a:prstGeom>
+          <a:solidFill>
+            <a:schemeClr val="tx1">
+              <a:alpha val="40000"/>
+            </a:schemeClr>
+          </a:solidFill>
+          <a:ln>
+            <a:noFill/>
+          </a:ln>
+        </p:spPr>
+        <p:style>
+          <a:lnRef idx="2">
+            <a:schemeClr val="accent1">
+              <a:shade val="50000"/>
+            </a:schemeClr>
+          </a:lnRef>
+          <a:fillRef idx="1">
+            <a:schemeClr val="accent1"/>
+          </a:fillRef>
+          <a:effectRef idx="0">
+            <a:schemeClr val="accent1"/>
+          </a:effectRef>
+          <a:fontRef idx="minor">
+            <a:schemeClr val="lt1"/>
+          </a:fontRef>
+        </p:style>
+        <p:txBody>
+          <a:bodyPr rtlCol="0" anchor="ctr"/>
+          <a:lstStyle/>
+          <a:p>
+            <a:pPr algn="ctr"/>
+            <a:endParaRPr lang="en-US" dirty="0"/>
+          </a:p>
+        </p:txBody>
+      </p:sp>
+      <p:sp>
+        <p:nvSpPr>
+          <p:cNvPr id="6" name="Rectangle 5">
+            <a:extLst>
+              <a:ext uri="{FF2B5EF4-FFF2-40B4-BE49-F238E27FC236}">
+                <a16:creationId xmlns:a16="http://schemas.microsoft.com/office/drawing/2014/main" id="{8026FF69-6C82-7043-9603-B53878D1AFAB}"/>
+              </a:ext>
+            </a:extLst>
+          </p:cNvPr>
+          <p:cNvSpPr/>
+          <p:nvPr/>
+        </p:nvSpPr>
+        <p:spPr>
+          <a:xfrm>
+            <a:off x="909614" y="1834766"/>
+            <a:ext cx="1383643" cy="346075"/>
+          </a:xfrm>
+          <a:prstGeom prst="rect">
+            <a:avLst/>
+          </a:prstGeom>
+          <a:solidFill>
+            <a:schemeClr val="tx1">
+              <a:alpha val="40000"/>
+            </a:schemeClr>
+          </a:solidFill>
+          <a:ln>
+            <a:noFill/>
+          </a:ln>
+        </p:spPr>
+        <p:style>
+          <a:lnRef idx="2">
+            <a:schemeClr val="accent1">
+              <a:shade val="50000"/>
+            </a:schemeClr>
+          </a:lnRef>
+          <a:fillRef idx="1">
+            <a:schemeClr val="accent1"/>
+          </a:fillRef>
+          <a:effectRef idx="0">
+            <a:schemeClr val="accent1"/>
+          </a:effectRef>
+          <a:fontRef idx="minor">
+            <a:schemeClr val="lt1"/>
+          </a:fontRef>
+        </p:style>
+        <p:txBody>
+          <a:bodyPr rtlCol="0" anchor="ctr"/>
+          <a:lstStyle/>
+          <a:p>
+            <a:pPr algn="ctr"/>
+            <a:endParaRPr lang="en-US" dirty="0"/>
+          </a:p>
+        </p:txBody>
+      </p:sp>
+      <p:sp>
+        <p:nvSpPr>
+          <p:cNvPr id="10" name="Rectangle 9">
+            <a:extLst>
+              <a:ext uri="{FF2B5EF4-FFF2-40B4-BE49-F238E27FC236}">
+                <a16:creationId xmlns:a16="http://schemas.microsoft.com/office/drawing/2014/main" id="{64381E93-0DB0-5942-AC90-7ABA3E07F410}"/>
+              </a:ext>
+            </a:extLst>
+          </p:cNvPr>
+          <p:cNvSpPr/>
+          <p:nvPr/>
+        </p:nvSpPr>
+        <p:spPr>
+          <a:xfrm>
+            <a:off x="909614" y="3139184"/>
+            <a:ext cx="1455898" cy="346075"/>
+          </a:xfrm>
+          <a:prstGeom prst="rect">
+            <a:avLst/>
+          </a:prstGeom>
+          <a:solidFill>
+            <a:schemeClr val="tx1">
+              <a:alpha val="40000"/>
+            </a:schemeClr>
+          </a:solidFill>
+          <a:ln>
+            <a:noFill/>
+          </a:ln>
+        </p:spPr>
+        <p:style>
+          <a:lnRef idx="2">
+            <a:schemeClr val="accent1">
+              <a:shade val="50000"/>
+            </a:schemeClr>
+          </a:lnRef>
+          <a:fillRef idx="1">
+            <a:schemeClr val="accent1"/>
+          </a:fillRef>
+          <a:effectRef idx="0">
+            <a:schemeClr val="accent1"/>
+          </a:effectRef>
+          <a:fontRef idx="minor">
+            <a:schemeClr val="lt1"/>
+          </a:fontRef>
+        </p:style>
+        <p:txBody>
+          <a:bodyPr rtlCol="0" anchor="ctr"/>
+          <a:lstStyle/>
+          <a:p>
+            <a:pPr algn="ctr"/>
+            <a:endParaRPr lang="en-US" dirty="0"/>
+          </a:p>
+        </p:txBody>
+      </p:sp>
+      <p:sp>
+        <p:nvSpPr>
+          <p:cNvPr id="12" name="Rectangle 11">
+            <a:extLst>
+              <a:ext uri="{FF2B5EF4-FFF2-40B4-BE49-F238E27FC236}">
+                <a16:creationId xmlns:a16="http://schemas.microsoft.com/office/drawing/2014/main" id="{F0D062B1-76F5-1E43-B067-441BE8AF1B26}"/>
+              </a:ext>
+            </a:extLst>
+          </p:cNvPr>
+          <p:cNvSpPr/>
+          <p:nvPr/>
+        </p:nvSpPr>
+        <p:spPr>
+          <a:xfrm>
+            <a:off x="909614" y="3554226"/>
+            <a:ext cx="3509986" cy="346075"/>
+          </a:xfrm>
+          <a:prstGeom prst="rect">
+            <a:avLst/>
+          </a:prstGeom>
+          <a:solidFill>
+            <a:schemeClr val="tx1">
+              <a:alpha val="40000"/>
+            </a:schemeClr>
+          </a:solidFill>
+          <a:ln>
+            <a:noFill/>
+          </a:ln>
+        </p:spPr>
+        <p:style>
+          <a:lnRef idx="2">
+            <a:schemeClr val="accent1">
+              <a:shade val="50000"/>
+            </a:schemeClr>
+          </a:lnRef>
+          <a:fillRef idx="1">
+            <a:schemeClr val="accent1"/>
+          </a:fillRef>
+          <a:effectRef idx="0">
+            <a:schemeClr val="accent1"/>
+          </a:effectRef>
+          <a:fontRef idx="minor">
+            <a:schemeClr val="lt1"/>
+          </a:fontRef>
+        </p:style>
+        <p:txBody>
+          <a:bodyPr rtlCol="0" anchor="ctr"/>
+          <a:lstStyle/>
+          <a:p>
+            <a:pPr algn="ctr"/>
+            <a:endParaRPr lang="en-US" dirty="0"/>
+          </a:p>
+        </p:txBody>
+      </p:sp>
+      <p:sp>
+        <p:nvSpPr>
+          <p:cNvPr id="2" name="Title 1">
+            <a:extLst>
+              <a:ext uri="{FF2B5EF4-FFF2-40B4-BE49-F238E27FC236}">
+                <a16:creationId xmlns:a16="http://schemas.microsoft.com/office/drawing/2014/main" id="{AC0D55DF-385E-9A4F-AB08-FEBC11990B8B}"/>
+              </a:ext>
+            </a:extLst>
+          </p:cNvPr>
+          <p:cNvSpPr>
+            <a:spLocks noGrp="1"/>
+          </p:cNvSpPr>
+          <p:nvPr>
+            <p:ph type="title"/>
+          </p:nvPr>
+        </p:nvSpPr>
+        <p:spPr/>
+        <p:txBody>
+          <a:bodyPr/>
+          <a:lstStyle/>
+          <a:p>
+            <a:r>
+              <a:rPr lang="en-US" dirty="0" err="1"/>
+              <a:t>cURL</a:t>
+            </a:r>
+            <a:r>
+              <a:rPr lang="en-US" dirty="0"/>
+              <a:t> Command Examples Continued</a:t>
+            </a:r>
+          </a:p>
+        </p:txBody>
+      </p:sp>
+      <p:sp>
+        <p:nvSpPr>
+          <p:cNvPr id="4" name="Date Placeholder 3">
+            <a:extLst>
+              <a:ext uri="{FF2B5EF4-FFF2-40B4-BE49-F238E27FC236}">
+                <a16:creationId xmlns:a16="http://schemas.microsoft.com/office/drawing/2014/main" id="{6E8781CE-B8A7-7540-B619-28D099093D8B}"/>
+              </a:ext>
+            </a:extLst>
+          </p:cNvPr>
+          <p:cNvSpPr>
+            <a:spLocks noGrp="1"/>
+          </p:cNvSpPr>
+          <p:nvPr>
+            <p:ph type="dt" sz="half" idx="10"/>
+          </p:nvPr>
+        </p:nvSpPr>
+        <p:spPr/>
+        <p:txBody>
+          <a:bodyPr/>
+          <a:lstStyle/>
+          <a:p>
+            <a:r>
+              <a:rPr lang="en-US"/>
+              <a:t>World Wide Technology ©</a:t>
+            </a:r>
+            <a:endParaRPr lang="en-US" dirty="0"/>
+          </a:p>
+        </p:txBody>
+      </p:sp>
+      <p:sp>
+        <p:nvSpPr>
+          <p:cNvPr id="5" name="Slide Number Placeholder 4">
+            <a:extLst>
+              <a:ext uri="{FF2B5EF4-FFF2-40B4-BE49-F238E27FC236}">
+                <a16:creationId xmlns:a16="http://schemas.microsoft.com/office/drawing/2014/main" id="{222BEAA2-2326-1F4D-9BCE-0FC3EC23B201}"/>
+              </a:ext>
+            </a:extLst>
+          </p:cNvPr>
+          <p:cNvSpPr>
+            <a:spLocks noGrp="1"/>
+          </p:cNvSpPr>
+          <p:nvPr>
+            <p:ph type="sldNum" sz="quarter" idx="12"/>
+          </p:nvPr>
+        </p:nvSpPr>
+        <p:spPr/>
+        <p:txBody>
+          <a:bodyPr/>
+          <a:lstStyle/>
+          <a:p>
+            <a:fld id="{A44B02FA-DD2D-1844-AE35-8B2EAB0CF4EF}" type="slidenum">
+              <a:rPr lang="en-US" smtClean="0"/>
+              <a:pPr/>
+              <a:t>14</a:t>
+            </a:fld>
+            <a:endParaRPr lang="en-US" dirty="0"/>
+          </a:p>
+        </p:txBody>
+      </p:sp>
+      <p:sp>
+        <p:nvSpPr>
+          <p:cNvPr id="13" name="Rectangle 12">
+            <a:extLst>
+              <a:ext uri="{FF2B5EF4-FFF2-40B4-BE49-F238E27FC236}">
+                <a16:creationId xmlns:a16="http://schemas.microsoft.com/office/drawing/2014/main" id="{ECAD06B7-E735-D041-A877-3DAA3A185FC4}"/>
+              </a:ext>
+            </a:extLst>
+          </p:cNvPr>
+          <p:cNvSpPr/>
+          <p:nvPr/>
+        </p:nvSpPr>
+        <p:spPr>
+          <a:xfrm>
+            <a:off x="1152728" y="3971498"/>
+            <a:ext cx="1306116" cy="346075"/>
+          </a:xfrm>
+          <a:prstGeom prst="rect">
+            <a:avLst/>
+          </a:prstGeom>
+          <a:solidFill>
+            <a:schemeClr val="tx1">
+              <a:alpha val="40000"/>
+            </a:schemeClr>
+          </a:solidFill>
+          <a:ln>
+            <a:noFill/>
+          </a:ln>
+        </p:spPr>
+        <p:style>
+          <a:lnRef idx="2">
+            <a:schemeClr val="accent1">
+              <a:shade val="50000"/>
+            </a:schemeClr>
+          </a:lnRef>
+          <a:fillRef idx="1">
+            <a:schemeClr val="accent1"/>
+          </a:fillRef>
+          <a:effectRef idx="0">
+            <a:schemeClr val="accent1"/>
+          </a:effectRef>
+          <a:fontRef idx="minor">
+            <a:schemeClr val="lt1"/>
+          </a:fontRef>
+        </p:style>
+        <p:txBody>
+          <a:bodyPr rtlCol="0" anchor="ctr"/>
+          <a:lstStyle/>
+          <a:p>
+            <a:pPr algn="ctr"/>
+            <a:endParaRPr lang="en-US" dirty="0"/>
+          </a:p>
+        </p:txBody>
+      </p:sp>
+      <p:sp>
+        <p:nvSpPr>
+          <p:cNvPr id="15" name="Rectangle 14">
+            <a:extLst>
+              <a:ext uri="{FF2B5EF4-FFF2-40B4-BE49-F238E27FC236}">
+                <a16:creationId xmlns:a16="http://schemas.microsoft.com/office/drawing/2014/main" id="{B679387D-B1E9-5145-9D8F-5D43A6FA5EEE}"/>
+              </a:ext>
+            </a:extLst>
+          </p:cNvPr>
+          <p:cNvSpPr/>
+          <p:nvPr/>
+        </p:nvSpPr>
+        <p:spPr>
+          <a:xfrm>
+            <a:off x="911236" y="3971498"/>
+            <a:ext cx="241492" cy="346075"/>
+          </a:xfrm>
+          <a:prstGeom prst="rect">
+            <a:avLst/>
+          </a:prstGeom>
+          <a:solidFill>
+            <a:schemeClr val="tx1">
+              <a:alpha val="40000"/>
+            </a:schemeClr>
+          </a:solidFill>
+          <a:ln>
+            <a:noFill/>
+          </a:ln>
+        </p:spPr>
+        <p:style>
+          <a:lnRef idx="2">
+            <a:schemeClr val="accent1">
+              <a:shade val="50000"/>
+            </a:schemeClr>
+          </a:lnRef>
+          <a:fillRef idx="1">
+            <a:schemeClr val="accent1"/>
+          </a:fillRef>
+          <a:effectRef idx="0">
+            <a:schemeClr val="accent1"/>
+          </a:effectRef>
+          <a:fontRef idx="minor">
+            <a:schemeClr val="lt1"/>
+          </a:fontRef>
+        </p:style>
+        <p:txBody>
+          <a:bodyPr rtlCol="0" anchor="ctr"/>
+          <a:lstStyle/>
+          <a:p>
+            <a:pPr algn="ctr"/>
+            <a:endParaRPr lang="en-US" dirty="0"/>
+          </a:p>
+        </p:txBody>
+      </p:sp>
+      <p:sp>
+        <p:nvSpPr>
+          <p:cNvPr id="16" name="Rectangle 15">
+            <a:extLst>
+              <a:ext uri="{FF2B5EF4-FFF2-40B4-BE49-F238E27FC236}">
+                <a16:creationId xmlns:a16="http://schemas.microsoft.com/office/drawing/2014/main" id="{D8B40A51-E9D9-C042-8150-D2136E003E28}"/>
+              </a:ext>
+            </a:extLst>
+          </p:cNvPr>
+          <p:cNvSpPr/>
+          <p:nvPr/>
+        </p:nvSpPr>
+        <p:spPr>
+          <a:xfrm>
+            <a:off x="1410696" y="1834766"/>
+            <a:ext cx="192024" cy="346075"/>
+          </a:xfrm>
+          <a:prstGeom prst="rect">
+            <a:avLst/>
+          </a:prstGeom>
+          <a:solidFill>
+            <a:srgbClr val="FFC000">
+              <a:alpha val="40000"/>
+            </a:srgbClr>
+          </a:solidFill>
+          <a:ln>
+            <a:noFill/>
+          </a:ln>
+        </p:spPr>
+        <p:style>
+          <a:lnRef idx="2">
+            <a:schemeClr val="accent1">
+              <a:shade val="50000"/>
+            </a:schemeClr>
+          </a:lnRef>
+          <a:fillRef idx="1">
+            <a:schemeClr val="accent1"/>
+          </a:fillRef>
+          <a:effectRef idx="0">
+            <a:schemeClr val="accent1"/>
+          </a:effectRef>
+          <a:fontRef idx="minor">
+            <a:schemeClr val="lt1"/>
+          </a:fontRef>
+        </p:style>
+        <p:txBody>
+          <a:bodyPr rtlCol="0" anchor="ctr"/>
+          <a:lstStyle/>
+          <a:p>
+            <a:pPr algn="ctr"/>
+            <a:endParaRPr lang="en-US" dirty="0"/>
+          </a:p>
+        </p:txBody>
+      </p:sp>
+      <p:sp>
+        <p:nvSpPr>
+          <p:cNvPr id="3" name="Content Placeholder 2">
+            <a:extLst>
+              <a:ext uri="{FF2B5EF4-FFF2-40B4-BE49-F238E27FC236}">
+                <a16:creationId xmlns:a16="http://schemas.microsoft.com/office/drawing/2014/main" id="{4CB23FD9-ADE0-084E-A8CC-44CA0BA25AB3}"/>
+              </a:ext>
+            </a:extLst>
+          </p:cNvPr>
+          <p:cNvSpPr>
+            <a:spLocks noGrp="1"/>
+          </p:cNvSpPr>
+          <p:nvPr>
+            <p:ph idx="1"/>
+          </p:nvPr>
+        </p:nvSpPr>
+        <p:spPr/>
+        <p:txBody>
+          <a:bodyPr>
+            <a:normAutofit fontScale="92500" lnSpcReduction="10000"/>
+          </a:bodyPr>
+          <a:lstStyle/>
+          <a:p>
+            <a:pPr marL="0" indent="0">
+              <a:buNone/>
+            </a:pPr>
+            <a:r>
+              <a:rPr lang="en-US" sz="2400" b="1" i="1" dirty="0">
+                <a:solidFill>
+                  <a:srgbClr val="FFFF00"/>
+                </a:solidFill>
+              </a:rPr>
+              <a:t>curl -</a:t>
+            </a:r>
+            <a:r>
+              <a:rPr lang="en-US" sz="2400" b="1" i="1" dirty="0" err="1">
+                <a:solidFill>
+                  <a:srgbClr val="FFFF00"/>
+                </a:solidFill>
+              </a:rPr>
+              <a:t>iLX</a:t>
+            </a:r>
+            <a:r>
+              <a:rPr lang="en-US" sz="2400" b="1" i="1" dirty="0">
+                <a:solidFill>
+                  <a:srgbClr val="FFFF00"/>
+                </a:solidFill>
+              </a:rPr>
+              <a:t> GET --</a:t>
+            </a:r>
+            <a:r>
+              <a:rPr lang="en-US" sz="2400" b="1" i="1" dirty="0" err="1">
+                <a:solidFill>
+                  <a:srgbClr val="FFFF00"/>
+                </a:solidFill>
+              </a:rPr>
+              <a:t>url</a:t>
+            </a:r>
+            <a:r>
+              <a:rPr lang="en-US" sz="2400" b="1" i="1" dirty="0">
+                <a:solidFill>
+                  <a:srgbClr val="FFFF00"/>
+                </a:solidFill>
+              </a:rPr>
+              <a:t> https://</a:t>
+            </a:r>
+            <a:r>
+              <a:rPr lang="en-US" sz="2400" b="1" i="1" dirty="0" err="1">
+                <a:solidFill>
+                  <a:srgbClr val="FFFF00"/>
+                </a:solidFill>
+              </a:rPr>
+              <a:t>api.meraki.com</a:t>
+            </a:r>
+            <a:r>
+              <a:rPr lang="en-US" sz="2400" b="1" i="1" dirty="0">
+                <a:solidFill>
+                  <a:srgbClr val="FFFF00"/>
+                </a:solidFill>
+              </a:rPr>
+              <a:t>/</a:t>
+            </a:r>
+            <a:r>
+              <a:rPr lang="en-US" sz="2400" b="1" i="1" dirty="0" err="1">
+                <a:solidFill>
+                  <a:srgbClr val="FFFF00"/>
+                </a:solidFill>
+              </a:rPr>
+              <a:t>api</a:t>
+            </a:r>
+            <a:r>
+              <a:rPr lang="en-US" sz="2400" b="1" i="1" dirty="0">
+                <a:solidFill>
+                  <a:srgbClr val="FFFF00"/>
+                </a:solidFill>
+              </a:rPr>
+              <a:t>/v0/organizations \</a:t>
+            </a:r>
+          </a:p>
+          <a:p>
+            <a:pPr marL="0" indent="0">
+              <a:buNone/>
+            </a:pPr>
+            <a:r>
+              <a:rPr lang="en-US" sz="2400" b="1" i="1" dirty="0">
+                <a:solidFill>
+                  <a:srgbClr val="FFFF00"/>
+                </a:solidFill>
+              </a:rPr>
+              <a:t>-H X-Cisco-Meraki-API-Key:$MERAKI_API_KEY \</a:t>
+            </a:r>
+          </a:p>
+          <a:p>
+            <a:pPr marL="0" indent="0">
+              <a:buNone/>
+            </a:pPr>
+            <a:r>
+              <a:rPr lang="en-US" sz="2400" b="1" i="1" dirty="0">
+                <a:solidFill>
+                  <a:srgbClr val="FFFF00"/>
+                </a:solidFill>
+              </a:rPr>
+              <a:t>-H 'Accept: application/json' </a:t>
+            </a:r>
+          </a:p>
+          <a:p>
+            <a:pPr marL="0" indent="0">
+              <a:buNone/>
+            </a:pPr>
+            <a:r>
+              <a:rPr lang="en-US" sz="2400" dirty="0"/>
+              <a:t>Send a GET request to https://</a:t>
+            </a:r>
+            <a:r>
+              <a:rPr lang="en-US" sz="2400" dirty="0" err="1"/>
+              <a:t>jsonplaceholder.typicode.com</a:t>
+            </a:r>
+            <a:r>
+              <a:rPr lang="en-US" sz="2400" dirty="0"/>
+              <a:t>/posts/1</a:t>
+            </a:r>
+            <a:endParaRPr lang="en-US" sz="2400" dirty="0">
+              <a:solidFill>
+                <a:srgbClr val="FFFF00"/>
+              </a:solidFill>
+            </a:endParaRPr>
+          </a:p>
+          <a:p>
+            <a:r>
+              <a:rPr lang="en-US" sz="2400" dirty="0"/>
+              <a:t>Display ONLY the response headers in the terminal</a:t>
+            </a:r>
+          </a:p>
+          <a:p>
+            <a:pPr marL="0" indent="0">
+              <a:buNone/>
+            </a:pPr>
+            <a:r>
+              <a:rPr lang="en-US" sz="2400" b="1" i="1" dirty="0">
+                <a:solidFill>
+                  <a:srgbClr val="FFFF00"/>
+                </a:solidFill>
+              </a:rPr>
+              <a:t>curl -X POST --</a:t>
+            </a:r>
+            <a:r>
+              <a:rPr lang="en-US" sz="2400" b="1" i="1" dirty="0" err="1">
+                <a:solidFill>
+                  <a:srgbClr val="FFFF00"/>
+                </a:solidFill>
+              </a:rPr>
+              <a:t>url</a:t>
+            </a:r>
+            <a:r>
+              <a:rPr lang="en-US" sz="2400" b="1" i="1" dirty="0">
+                <a:solidFill>
+                  <a:srgbClr val="FFFF00"/>
+                </a:solidFill>
+              </a:rPr>
+              <a:t> https://</a:t>
+            </a:r>
+            <a:r>
+              <a:rPr lang="en-US" sz="2400" b="1" i="1" dirty="0" err="1">
+                <a:solidFill>
+                  <a:srgbClr val="FFFF00"/>
+                </a:solidFill>
+              </a:rPr>
+              <a:t>sandboxdnac.cisco.com</a:t>
+            </a:r>
+            <a:r>
+              <a:rPr lang="en-US" sz="2400" b="1" i="1" dirty="0">
+                <a:solidFill>
+                  <a:srgbClr val="FFFF00"/>
+                </a:solidFill>
+              </a:rPr>
+              <a:t>/</a:t>
+            </a:r>
+            <a:r>
+              <a:rPr lang="en-US" sz="2400" b="1" i="1" dirty="0" err="1">
+                <a:solidFill>
+                  <a:srgbClr val="FFFF00"/>
+                </a:solidFill>
+              </a:rPr>
+              <a:t>dna</a:t>
+            </a:r>
+            <a:r>
+              <a:rPr lang="en-US" sz="2400" b="1" i="1" dirty="0">
+                <a:solidFill>
+                  <a:srgbClr val="FFFF00"/>
+                </a:solidFill>
+              </a:rPr>
+              <a:t>/system/</a:t>
+            </a:r>
+            <a:r>
+              <a:rPr lang="en-US" sz="2400" b="1" i="1" dirty="0" err="1">
+                <a:solidFill>
+                  <a:srgbClr val="FFFF00"/>
+                </a:solidFill>
+              </a:rPr>
+              <a:t>api</a:t>
+            </a:r>
+            <a:r>
+              <a:rPr lang="en-US" sz="2400" b="1" i="1" dirty="0">
+                <a:solidFill>
+                  <a:srgbClr val="FFFF00"/>
+                </a:solidFill>
+              </a:rPr>
+              <a:t>/v1/auth/token \</a:t>
+            </a:r>
+          </a:p>
+          <a:p>
+            <a:pPr marL="0" indent="0">
+              <a:buNone/>
+            </a:pPr>
+            <a:r>
+              <a:rPr lang="en-US" sz="2400" b="1" i="1" dirty="0">
+                <a:solidFill>
+                  <a:srgbClr val="FFFF00"/>
+                </a:solidFill>
+              </a:rPr>
+              <a:t>-u $DNAC_USER:$DNAC_PW \</a:t>
+            </a:r>
+          </a:p>
+          <a:p>
+            <a:pPr marL="0" indent="0">
+              <a:buNone/>
+            </a:pPr>
+            <a:r>
+              <a:rPr lang="en-US" sz="2400" b="1" i="1" dirty="0">
+                <a:solidFill>
+                  <a:srgbClr val="FFFF00"/>
+                </a:solidFill>
+              </a:rPr>
+              <a:t>-</a:t>
+            </a:r>
+            <a:r>
+              <a:rPr lang="en-US" sz="2400" b="1" i="1" dirty="0" err="1">
+                <a:solidFill>
+                  <a:srgbClr val="FFFF00"/>
+                </a:solidFill>
+              </a:rPr>
+              <a:t>vo</a:t>
+            </a:r>
+            <a:r>
+              <a:rPr lang="en-US" sz="2400" b="1" i="1" dirty="0">
+                <a:solidFill>
+                  <a:srgbClr val="FFFF00"/>
+                </a:solidFill>
+              </a:rPr>
+              <a:t> </a:t>
+            </a:r>
+            <a:r>
+              <a:rPr lang="en-US" sz="2400" b="1" i="1" dirty="0" err="1">
+                <a:solidFill>
+                  <a:srgbClr val="FFFF00"/>
+                </a:solidFill>
+              </a:rPr>
+              <a:t>token.txt</a:t>
+            </a:r>
+            <a:endParaRPr lang="en-US" sz="2400" b="1" i="1" dirty="0">
+              <a:solidFill>
+                <a:srgbClr val="FFFF00"/>
+              </a:solidFill>
+            </a:endParaRPr>
+          </a:p>
+          <a:p>
+            <a:r>
+              <a:rPr lang="en-US" sz="2400" dirty="0"/>
+              <a:t>Send a POST request to https://</a:t>
+            </a:r>
+            <a:r>
+              <a:rPr lang="en-US" sz="2400" dirty="0" err="1"/>
+              <a:t>sandboxdnac.cisco.com</a:t>
+            </a:r>
+            <a:r>
+              <a:rPr lang="en-US" sz="2400" dirty="0"/>
+              <a:t>/</a:t>
+            </a:r>
+            <a:r>
+              <a:rPr lang="en-US" sz="2400" dirty="0" err="1"/>
+              <a:t>dna</a:t>
+            </a:r>
+            <a:r>
+              <a:rPr lang="en-US" sz="2400" dirty="0"/>
+              <a:t>/system/</a:t>
+            </a:r>
+            <a:r>
+              <a:rPr lang="en-US" sz="2400" dirty="0" err="1"/>
+              <a:t>api</a:t>
+            </a:r>
+            <a:r>
+              <a:rPr lang="en-US" sz="2400" dirty="0"/>
+              <a:t>/v1/auth/token</a:t>
+            </a:r>
+            <a:endParaRPr lang="en-US" sz="2400" dirty="0">
+              <a:solidFill>
+                <a:srgbClr val="FFFF00"/>
+              </a:solidFill>
+            </a:endParaRPr>
+          </a:p>
+          <a:p>
+            <a:r>
+              <a:rPr lang="en-US" sz="2400" dirty="0"/>
+              <a:t>Send credentials via HTTP Basic Authentication</a:t>
+            </a:r>
+          </a:p>
+          <a:p>
+            <a:r>
+              <a:rPr lang="en-US" sz="2400" dirty="0"/>
+              <a:t>Display verbose/debugging information</a:t>
+            </a:r>
+          </a:p>
+        </p:txBody>
+      </p:sp>
+    </p:spTree>
+    <p:extLst>
+      <p:ext uri="{BB962C8B-B14F-4D97-AF65-F5344CB8AC3E}">
+        <p14:creationId xmlns:p14="http://schemas.microsoft.com/office/powerpoint/2010/main" val="1583025813"/>
+      </p:ext>
+    </p:extLst>
+  </p:cSld>
+  <p:clrMapOvr>
+    <a:masterClrMapping/>
+  </p:clrMapOvr>
+  <mc:AlternateContent xmlns:mc="http://schemas.openxmlformats.org/markup-compatibility/2006" xmlns:p14="http://schemas.microsoft.com/office/powerpoint/2010/main">
+    <mc:Choice Requires="p14">
+      <p:transition spd="med" p14:dur="700">
+        <p:fade/>
+      </p:transition>
+    </mc:Choice>
+    <mc:Fallback xmlns="">
+      <p:transition spd="med">
+        <p:fade/>
+      </p:transition>
+    </mc:Fallback>
+  </mc:AlternateContent>
+  <p:timing>
+    <p:tnLst>
+      <p:par>
+        <p:cTn id="1" dur="indefinite" restart="never" nodeType="tmRoot">
+          <p:childTnLst>
+            <p:seq concurrent="1" nextAc="seek">
+              <p:cTn id="2" dur="indefinite" nodeType="mainSeq">
+                <p:childTnLst>
+                  <p:par>
+                    <p:cTn id="3" fill="hold">
+                      <p:stCondLst>
+                        <p:cond delay="indefinite"/>
+                      </p:stCondLst>
+                      <p:childTnLst>
+                        <p:par>
+                          <p:cTn id="4" fill="hold">
+                            <p:stCondLst>
+                              <p:cond delay="0"/>
+                            </p:stCondLst>
+                            <p:childTnLst>
+                              <p:par>
+                                <p:cTn id="5" presetID="9" presetClass="entr" presetSubtype="0" fill="hold" nodeType="clickEffect">
+                                  <p:stCondLst>
+                                    <p:cond delay="0"/>
+                                  </p:stCondLst>
+                                  <p:childTnLst>
+                                    <p:set>
+                                      <p:cBhvr>
+                                        <p:cTn id="6" dur="1" fill="hold">
+                                          <p:stCondLst>
+                                            <p:cond delay="0"/>
+                                          </p:stCondLst>
+                                        </p:cTn>
+                                        <p:tgtEl>
+                                          <p:spTgt spid="3">
+                                            <p:txEl>
+                                              <p:pRg st="0" end="0"/>
+                                            </p:txEl>
+                                          </p:spTgt>
+                                        </p:tgtEl>
+                                        <p:attrNameLst>
+                                          <p:attrName>style.visibility</p:attrName>
+                                        </p:attrNameLst>
+                                      </p:cBhvr>
+                                      <p:to>
+                                        <p:strVal val="visible"/>
+                                      </p:to>
+                                    </p:set>
+                                    <p:animEffect transition="in" filter="dissolve">
+                                      <p:cBhvr>
+                                        <p:cTn id="7" dur="500"/>
+                                        <p:tgtEl>
+                                          <p:spTgt spid="3">
+                                            <p:txEl>
+                                              <p:pRg st="0" end="0"/>
+                                            </p:txEl>
+                                          </p:spTgt>
+                                        </p:tgtEl>
+                                      </p:cBhvr>
+                                    </p:animEffect>
+                                  </p:childTnLst>
+                                </p:cTn>
+                              </p:par>
+                            </p:childTnLst>
+                          </p:cTn>
+                        </p:par>
+                      </p:childTnLst>
+                    </p:cTn>
+                  </p:par>
+                  <p:par>
+                    <p:cTn id="8" fill="hold">
+                      <p:stCondLst>
+                        <p:cond delay="indefinite"/>
+                      </p:stCondLst>
+                      <p:childTnLst>
+                        <p:par>
+                          <p:cTn id="9" fill="hold">
+                            <p:stCondLst>
+                              <p:cond delay="0"/>
+                            </p:stCondLst>
+                            <p:childTnLst>
+                              <p:par>
+                                <p:cTn id="10" presetID="9" presetClass="entr" presetSubtype="0" fill="hold" nodeType="clickEffect">
+                                  <p:stCondLst>
+                                    <p:cond delay="0"/>
+                                  </p:stCondLst>
+                                  <p:childTnLst>
+                                    <p:set>
+                                      <p:cBhvr>
+                                        <p:cTn id="11" dur="1" fill="hold">
+                                          <p:stCondLst>
+                                            <p:cond delay="0"/>
+                                          </p:stCondLst>
+                                        </p:cTn>
+                                        <p:tgtEl>
+                                          <p:spTgt spid="3">
+                                            <p:txEl>
+                                              <p:pRg st="1" end="1"/>
+                                            </p:txEl>
+                                          </p:spTgt>
+                                        </p:tgtEl>
+                                        <p:attrNameLst>
+                                          <p:attrName>style.visibility</p:attrName>
+                                        </p:attrNameLst>
+                                      </p:cBhvr>
+                                      <p:to>
+                                        <p:strVal val="visible"/>
+                                      </p:to>
+                                    </p:set>
+                                    <p:animEffect transition="in" filter="dissolve">
+                                      <p:cBhvr>
+                                        <p:cTn id="12" dur="500"/>
+                                        <p:tgtEl>
+                                          <p:spTgt spid="3">
+                                            <p:txEl>
+                                              <p:pRg st="1" end="1"/>
+                                            </p:txEl>
+                                          </p:spTgt>
+                                        </p:tgtEl>
+                                      </p:cBhvr>
+                                    </p:animEffect>
+                                  </p:childTnLst>
+                                </p:cTn>
+                              </p:par>
+                            </p:childTnLst>
+                          </p:cTn>
+                        </p:par>
+                      </p:childTnLst>
+                    </p:cTn>
+                  </p:par>
+                  <p:par>
+                    <p:cTn id="13" fill="hold">
+                      <p:stCondLst>
+                        <p:cond delay="indefinite"/>
+                      </p:stCondLst>
+                      <p:childTnLst>
+                        <p:par>
+                          <p:cTn id="14" fill="hold">
+                            <p:stCondLst>
+                              <p:cond delay="0"/>
+                            </p:stCondLst>
+                            <p:childTnLst>
+                              <p:par>
+                                <p:cTn id="15" presetID="9" presetClass="entr" presetSubtype="0" fill="hold" nodeType="clickEffect">
+                                  <p:stCondLst>
+                                    <p:cond delay="0"/>
+                                  </p:stCondLst>
+                                  <p:childTnLst>
+                                    <p:set>
+                                      <p:cBhvr>
+                                        <p:cTn id="16" dur="1" fill="hold">
+                                          <p:stCondLst>
+                                            <p:cond delay="0"/>
+                                          </p:stCondLst>
+                                        </p:cTn>
+                                        <p:tgtEl>
+                                          <p:spTgt spid="3">
+                                            <p:txEl>
+                                              <p:pRg st="2" end="2"/>
+                                            </p:txEl>
+                                          </p:spTgt>
+                                        </p:tgtEl>
+                                        <p:attrNameLst>
+                                          <p:attrName>style.visibility</p:attrName>
+                                        </p:attrNameLst>
+                                      </p:cBhvr>
+                                      <p:to>
+                                        <p:strVal val="visible"/>
+                                      </p:to>
+                                    </p:set>
+                                    <p:animEffect transition="in" filter="dissolve">
+                                      <p:cBhvr>
+                                        <p:cTn id="17" dur="500"/>
+                                        <p:tgtEl>
+                                          <p:spTgt spid="3">
+                                            <p:txEl>
+                                              <p:pRg st="2" end="2"/>
+                                            </p:txEl>
+                                          </p:spTgt>
+                                        </p:tgtEl>
+                                      </p:cBhvr>
+                                    </p:animEffect>
+                                  </p:childTnLst>
+                                </p:cTn>
+                              </p:par>
+                            </p:childTnLst>
+                          </p:cTn>
+                        </p:par>
+                      </p:childTnLst>
+                    </p:cTn>
+                  </p:par>
+                  <p:par>
+                    <p:cTn id="18" fill="hold">
+                      <p:stCondLst>
+                        <p:cond delay="indefinite"/>
+                      </p:stCondLst>
+                      <p:childTnLst>
+                        <p:par>
+                          <p:cTn id="19" fill="hold">
+                            <p:stCondLst>
+                              <p:cond delay="0"/>
+                            </p:stCondLst>
+                            <p:childTnLst>
+                              <p:par>
+                                <p:cTn id="20" presetID="9" presetClass="entr" presetSubtype="0" fill="hold" nodeType="clickEffect">
+                                  <p:stCondLst>
+                                    <p:cond delay="0"/>
+                                  </p:stCondLst>
+                                  <p:childTnLst>
+                                    <p:set>
+                                      <p:cBhvr>
+                                        <p:cTn id="21" dur="1" fill="hold">
+                                          <p:stCondLst>
+                                            <p:cond delay="0"/>
+                                          </p:stCondLst>
+                                        </p:cTn>
+                                        <p:tgtEl>
+                                          <p:spTgt spid="3">
+                                            <p:txEl>
+                                              <p:pRg st="3" end="3"/>
+                                            </p:txEl>
+                                          </p:spTgt>
+                                        </p:tgtEl>
+                                        <p:attrNameLst>
+                                          <p:attrName>style.visibility</p:attrName>
+                                        </p:attrNameLst>
+                                      </p:cBhvr>
+                                      <p:to>
+                                        <p:strVal val="visible"/>
+                                      </p:to>
+                                    </p:set>
+                                    <p:animEffect transition="in" filter="dissolve">
+                                      <p:cBhvr>
+                                        <p:cTn id="22" dur="500"/>
+                                        <p:tgtEl>
+                                          <p:spTgt spid="3">
+                                            <p:txEl>
+                                              <p:pRg st="3" end="3"/>
+                                            </p:txEl>
+                                          </p:spTgt>
+                                        </p:tgtEl>
+                                      </p:cBhvr>
+                                    </p:animEffect>
+                                  </p:childTnLst>
+                                </p:cTn>
+                              </p:par>
+                            </p:childTnLst>
+                          </p:cTn>
+                        </p:par>
+                      </p:childTnLst>
+                    </p:cTn>
+                  </p:par>
+                  <p:par>
+                    <p:cTn id="23" fill="hold">
+                      <p:stCondLst>
+                        <p:cond delay="indefinite"/>
+                      </p:stCondLst>
+                      <p:childTnLst>
+                        <p:par>
+                          <p:cTn id="24" fill="hold">
+                            <p:stCondLst>
+                              <p:cond delay="0"/>
+                            </p:stCondLst>
+                            <p:childTnLst>
+                              <p:par>
+                                <p:cTn id="25" presetID="22" presetClass="entr" presetSubtype="8" fill="hold" grpId="0" nodeType="clickEffect">
+                                  <p:stCondLst>
+                                    <p:cond delay="0"/>
+                                  </p:stCondLst>
+                                  <p:childTnLst>
+                                    <p:set>
+                                      <p:cBhvr>
+                                        <p:cTn id="26" dur="1" fill="hold">
+                                          <p:stCondLst>
+                                            <p:cond delay="0"/>
+                                          </p:stCondLst>
+                                        </p:cTn>
+                                        <p:tgtEl>
+                                          <p:spTgt spid="6"/>
+                                        </p:tgtEl>
+                                        <p:attrNameLst>
+                                          <p:attrName>style.visibility</p:attrName>
+                                        </p:attrNameLst>
+                                      </p:cBhvr>
+                                      <p:to>
+                                        <p:strVal val="visible"/>
+                                      </p:to>
+                                    </p:set>
+                                    <p:animEffect transition="in" filter="wipe(left)">
+                                      <p:cBhvr>
+                                        <p:cTn id="27" dur="500"/>
+                                        <p:tgtEl>
+                                          <p:spTgt spid="6"/>
+                                        </p:tgtEl>
+                                      </p:cBhvr>
+                                    </p:animEffect>
+                                  </p:childTnLst>
+                                </p:cTn>
+                              </p:par>
+                            </p:childTnLst>
+                          </p:cTn>
+                        </p:par>
+                        <p:par>
+                          <p:cTn id="28" fill="hold">
+                            <p:stCondLst>
+                              <p:cond delay="500"/>
+                            </p:stCondLst>
+                            <p:childTnLst>
+                              <p:par>
+                                <p:cTn id="29" presetID="22" presetClass="entr" presetSubtype="8" fill="hold" grpId="0" nodeType="afterEffect">
+                                  <p:stCondLst>
+                                    <p:cond delay="500"/>
+                                  </p:stCondLst>
+                                  <p:childTnLst>
+                                    <p:set>
+                                      <p:cBhvr>
+                                        <p:cTn id="30" dur="1" fill="hold">
+                                          <p:stCondLst>
+                                            <p:cond delay="0"/>
+                                          </p:stCondLst>
+                                        </p:cTn>
+                                        <p:tgtEl>
+                                          <p:spTgt spid="7"/>
+                                        </p:tgtEl>
+                                        <p:attrNameLst>
+                                          <p:attrName>style.visibility</p:attrName>
+                                        </p:attrNameLst>
+                                      </p:cBhvr>
+                                      <p:to>
+                                        <p:strVal val="visible"/>
+                                      </p:to>
+                                    </p:set>
+                                    <p:animEffect transition="in" filter="wipe(left)">
+                                      <p:cBhvr>
+                                        <p:cTn id="31" dur="1000"/>
+                                        <p:tgtEl>
+                                          <p:spTgt spid="7"/>
+                                        </p:tgtEl>
+                                      </p:cBhvr>
+                                    </p:animEffect>
+                                  </p:childTnLst>
+                                </p:cTn>
+                              </p:par>
+                            </p:childTnLst>
+                          </p:cTn>
+                        </p:par>
+                      </p:childTnLst>
+                    </p:cTn>
+                  </p:par>
+                  <p:par>
+                    <p:cTn id="32" fill="hold">
+                      <p:stCondLst>
+                        <p:cond delay="indefinite"/>
+                      </p:stCondLst>
+                      <p:childTnLst>
+                        <p:par>
+                          <p:cTn id="33" fill="hold">
+                            <p:stCondLst>
+                              <p:cond delay="0"/>
+                            </p:stCondLst>
+                            <p:childTnLst>
+                              <p:par>
+                                <p:cTn id="34" presetID="9" presetClass="entr" presetSubtype="0" fill="hold" nodeType="clickEffect">
+                                  <p:stCondLst>
+                                    <p:cond delay="0"/>
+                                  </p:stCondLst>
+                                  <p:childTnLst>
+                                    <p:set>
+                                      <p:cBhvr>
+                                        <p:cTn id="35" dur="1" fill="hold">
+                                          <p:stCondLst>
+                                            <p:cond delay="0"/>
+                                          </p:stCondLst>
+                                        </p:cTn>
+                                        <p:tgtEl>
+                                          <p:spTgt spid="3">
+                                            <p:txEl>
+                                              <p:pRg st="4" end="4"/>
+                                            </p:txEl>
+                                          </p:spTgt>
+                                        </p:tgtEl>
+                                        <p:attrNameLst>
+                                          <p:attrName>style.visibility</p:attrName>
+                                        </p:attrNameLst>
+                                      </p:cBhvr>
+                                      <p:to>
+                                        <p:strVal val="visible"/>
+                                      </p:to>
+                                    </p:set>
+                                    <p:animEffect transition="in" filter="dissolve">
+                                      <p:cBhvr>
+                                        <p:cTn id="36" dur="500"/>
+                                        <p:tgtEl>
+                                          <p:spTgt spid="3">
+                                            <p:txEl>
+                                              <p:pRg st="4" end="4"/>
+                                            </p:txEl>
+                                          </p:spTgt>
+                                        </p:tgtEl>
+                                      </p:cBhvr>
+                                    </p:animEffect>
+                                  </p:childTnLst>
+                                </p:cTn>
+                              </p:par>
+                            </p:childTnLst>
+                          </p:cTn>
+                        </p:par>
+                      </p:childTnLst>
+                    </p:cTn>
+                  </p:par>
+                  <p:par>
+                    <p:cTn id="37" fill="hold">
+                      <p:stCondLst>
+                        <p:cond delay="indefinite"/>
+                      </p:stCondLst>
+                      <p:childTnLst>
+                        <p:par>
+                          <p:cTn id="38" fill="hold">
+                            <p:stCondLst>
+                              <p:cond delay="0"/>
+                            </p:stCondLst>
+                            <p:childTnLst>
+                              <p:par>
+                                <p:cTn id="39" presetID="22" presetClass="entr" presetSubtype="8" fill="hold" grpId="0" nodeType="clickEffect">
+                                  <p:stCondLst>
+                                    <p:cond delay="0"/>
+                                  </p:stCondLst>
+                                  <p:childTnLst>
+                                    <p:set>
+                                      <p:cBhvr>
+                                        <p:cTn id="40" dur="1" fill="hold">
+                                          <p:stCondLst>
+                                            <p:cond delay="0"/>
+                                          </p:stCondLst>
+                                        </p:cTn>
+                                        <p:tgtEl>
+                                          <p:spTgt spid="16"/>
+                                        </p:tgtEl>
+                                        <p:attrNameLst>
+                                          <p:attrName>style.visibility</p:attrName>
+                                        </p:attrNameLst>
+                                      </p:cBhvr>
+                                      <p:to>
+                                        <p:strVal val="visible"/>
+                                      </p:to>
+                                    </p:set>
+                                    <p:animEffect transition="in" filter="wipe(left)">
+                                      <p:cBhvr>
+                                        <p:cTn id="41" dur="500"/>
+                                        <p:tgtEl>
+                                          <p:spTgt spid="16"/>
+                                        </p:tgtEl>
+                                      </p:cBhvr>
+                                    </p:animEffect>
+                                  </p:childTnLst>
+                                </p:cTn>
+                              </p:par>
+                            </p:childTnLst>
+                          </p:cTn>
+                        </p:par>
+                      </p:childTnLst>
+                    </p:cTn>
+                  </p:par>
+                  <p:par>
+                    <p:cTn id="42" fill="hold">
+                      <p:stCondLst>
+                        <p:cond delay="indefinite"/>
+                      </p:stCondLst>
+                      <p:childTnLst>
+                        <p:par>
+                          <p:cTn id="43" fill="hold">
+                            <p:stCondLst>
+                              <p:cond delay="0"/>
+                            </p:stCondLst>
+                            <p:childTnLst>
+                              <p:par>
+                                <p:cTn id="44" presetID="22" presetClass="entr" presetSubtype="8" fill="hold" nodeType="clickEffect">
+                                  <p:stCondLst>
+                                    <p:cond delay="0"/>
+                                  </p:stCondLst>
+                                  <p:childTnLst>
+                                    <p:set>
+                                      <p:cBhvr>
+                                        <p:cTn id="45" dur="1" fill="hold">
+                                          <p:stCondLst>
+                                            <p:cond delay="0"/>
+                                          </p:stCondLst>
+                                        </p:cTn>
+                                        <p:tgtEl>
+                                          <p:spTgt spid="3">
+                                            <p:txEl>
+                                              <p:pRg st="5" end="5"/>
+                                            </p:txEl>
+                                          </p:spTgt>
+                                        </p:tgtEl>
+                                        <p:attrNameLst>
+                                          <p:attrName>style.visibility</p:attrName>
+                                        </p:attrNameLst>
+                                      </p:cBhvr>
+                                      <p:to>
+                                        <p:strVal val="visible"/>
+                                      </p:to>
+                                    </p:set>
+                                    <p:animEffect transition="in" filter="wipe(left)">
+                                      <p:cBhvr>
+                                        <p:cTn id="46" dur="2000"/>
+                                        <p:tgtEl>
+                                          <p:spTgt spid="3">
+                                            <p:txEl>
+                                              <p:pRg st="5" end="5"/>
+                                            </p:txEl>
+                                          </p:spTgt>
+                                        </p:tgtEl>
+                                      </p:cBhvr>
+                                    </p:animEffect>
+                                  </p:childTnLst>
+                                </p:cTn>
+                              </p:par>
+                            </p:childTnLst>
+                          </p:cTn>
+                        </p:par>
+                        <p:par>
+                          <p:cTn id="47" fill="hold">
+                            <p:stCondLst>
+                              <p:cond delay="2000"/>
+                            </p:stCondLst>
+                            <p:childTnLst>
+                              <p:par>
+                                <p:cTn id="48" presetID="22" presetClass="entr" presetSubtype="8" fill="hold" nodeType="afterEffect">
+                                  <p:stCondLst>
+                                    <p:cond delay="0"/>
+                                  </p:stCondLst>
+                                  <p:childTnLst>
+                                    <p:set>
+                                      <p:cBhvr>
+                                        <p:cTn id="49" dur="1" fill="hold">
+                                          <p:stCondLst>
+                                            <p:cond delay="0"/>
+                                          </p:stCondLst>
+                                        </p:cTn>
+                                        <p:tgtEl>
+                                          <p:spTgt spid="3">
+                                            <p:txEl>
+                                              <p:pRg st="6" end="6"/>
+                                            </p:txEl>
+                                          </p:spTgt>
+                                        </p:tgtEl>
+                                        <p:attrNameLst>
+                                          <p:attrName>style.visibility</p:attrName>
+                                        </p:attrNameLst>
+                                      </p:cBhvr>
+                                      <p:to>
+                                        <p:strVal val="visible"/>
+                                      </p:to>
+                                    </p:set>
+                                    <p:animEffect transition="in" filter="wipe(left)">
+                                      <p:cBhvr>
+                                        <p:cTn id="50" dur="1000"/>
+                                        <p:tgtEl>
+                                          <p:spTgt spid="3">
+                                            <p:txEl>
+                                              <p:pRg st="6" end="6"/>
+                                            </p:txEl>
+                                          </p:spTgt>
+                                        </p:tgtEl>
+                                      </p:cBhvr>
+                                    </p:animEffect>
+                                  </p:childTnLst>
+                                </p:cTn>
+                              </p:par>
+                            </p:childTnLst>
+                          </p:cTn>
+                        </p:par>
+                        <p:par>
+                          <p:cTn id="51" fill="hold">
+                            <p:stCondLst>
+                              <p:cond delay="3000"/>
+                            </p:stCondLst>
+                            <p:childTnLst>
+                              <p:par>
+                                <p:cTn id="52" presetID="22" presetClass="entr" presetSubtype="8" fill="hold" nodeType="afterEffect">
+                                  <p:stCondLst>
+                                    <p:cond delay="0"/>
+                                  </p:stCondLst>
+                                  <p:childTnLst>
+                                    <p:set>
+                                      <p:cBhvr>
+                                        <p:cTn id="53" dur="1" fill="hold">
+                                          <p:stCondLst>
+                                            <p:cond delay="0"/>
+                                          </p:stCondLst>
+                                        </p:cTn>
+                                        <p:tgtEl>
+                                          <p:spTgt spid="3">
+                                            <p:txEl>
+                                              <p:pRg st="7" end="7"/>
+                                            </p:txEl>
+                                          </p:spTgt>
+                                        </p:tgtEl>
+                                        <p:attrNameLst>
+                                          <p:attrName>style.visibility</p:attrName>
+                                        </p:attrNameLst>
+                                      </p:cBhvr>
+                                      <p:to>
+                                        <p:strVal val="visible"/>
+                                      </p:to>
+                                    </p:set>
+                                    <p:animEffect transition="in" filter="wipe(left)">
+                                      <p:cBhvr>
+                                        <p:cTn id="54" dur="750"/>
+                                        <p:tgtEl>
+                                          <p:spTgt spid="3">
+                                            <p:txEl>
+                                              <p:pRg st="7" end="7"/>
+                                            </p:txEl>
+                                          </p:spTgt>
+                                        </p:tgtEl>
+                                      </p:cBhvr>
+                                    </p:animEffect>
+                                  </p:childTnLst>
+                                </p:cTn>
+                              </p:par>
+                            </p:childTnLst>
+                          </p:cTn>
+                        </p:par>
+                      </p:childTnLst>
+                    </p:cTn>
+                  </p:par>
+                  <p:par>
+                    <p:cTn id="55" fill="hold">
+                      <p:stCondLst>
+                        <p:cond delay="indefinite"/>
+                      </p:stCondLst>
+                      <p:childTnLst>
+                        <p:par>
+                          <p:cTn id="56" fill="hold">
+                            <p:stCondLst>
+                              <p:cond delay="0"/>
+                            </p:stCondLst>
+                            <p:childTnLst>
+                              <p:par>
+                                <p:cTn id="57" presetID="9" presetClass="entr" presetSubtype="0" fill="hold" nodeType="clickEffect">
+                                  <p:stCondLst>
+                                    <p:cond delay="0"/>
+                                  </p:stCondLst>
+                                  <p:childTnLst>
+                                    <p:set>
+                                      <p:cBhvr>
+                                        <p:cTn id="58" dur="1" fill="hold">
+                                          <p:stCondLst>
+                                            <p:cond delay="0"/>
+                                          </p:stCondLst>
+                                        </p:cTn>
+                                        <p:tgtEl>
+                                          <p:spTgt spid="3">
+                                            <p:txEl>
+                                              <p:pRg st="8" end="8"/>
+                                            </p:txEl>
+                                          </p:spTgt>
+                                        </p:tgtEl>
+                                        <p:attrNameLst>
+                                          <p:attrName>style.visibility</p:attrName>
+                                        </p:attrNameLst>
+                                      </p:cBhvr>
+                                      <p:to>
+                                        <p:strVal val="visible"/>
+                                      </p:to>
+                                    </p:set>
+                                    <p:animEffect transition="in" filter="dissolve">
+                                      <p:cBhvr>
+                                        <p:cTn id="59" dur="500"/>
+                                        <p:tgtEl>
+                                          <p:spTgt spid="3">
+                                            <p:txEl>
+                                              <p:pRg st="8" end="8"/>
+                                            </p:txEl>
+                                          </p:spTgt>
+                                        </p:tgtEl>
+                                      </p:cBhvr>
+                                    </p:animEffect>
+                                  </p:childTnLst>
+                                </p:cTn>
+                              </p:par>
+                            </p:childTnLst>
+                          </p:cTn>
+                        </p:par>
+                      </p:childTnLst>
+                    </p:cTn>
+                  </p:par>
+                  <p:par>
+                    <p:cTn id="60" fill="hold">
+                      <p:stCondLst>
+                        <p:cond delay="indefinite"/>
+                      </p:stCondLst>
+                      <p:childTnLst>
+                        <p:par>
+                          <p:cTn id="61" fill="hold">
+                            <p:stCondLst>
+                              <p:cond delay="0"/>
+                            </p:stCondLst>
+                            <p:childTnLst>
+                              <p:par>
+                                <p:cTn id="62" presetID="22" presetClass="entr" presetSubtype="8" fill="hold" grpId="0" nodeType="clickEffect">
+                                  <p:stCondLst>
+                                    <p:cond delay="0"/>
+                                  </p:stCondLst>
+                                  <p:childTnLst>
+                                    <p:set>
+                                      <p:cBhvr>
+                                        <p:cTn id="63" dur="1" fill="hold">
+                                          <p:stCondLst>
+                                            <p:cond delay="0"/>
+                                          </p:stCondLst>
+                                        </p:cTn>
+                                        <p:tgtEl>
+                                          <p:spTgt spid="10"/>
+                                        </p:tgtEl>
+                                        <p:attrNameLst>
+                                          <p:attrName>style.visibility</p:attrName>
+                                        </p:attrNameLst>
+                                      </p:cBhvr>
+                                      <p:to>
+                                        <p:strVal val="visible"/>
+                                      </p:to>
+                                    </p:set>
+                                    <p:animEffect transition="in" filter="wipe(left)">
+                                      <p:cBhvr>
+                                        <p:cTn id="64" dur="500"/>
+                                        <p:tgtEl>
+                                          <p:spTgt spid="10"/>
+                                        </p:tgtEl>
+                                      </p:cBhvr>
+                                    </p:animEffect>
+                                  </p:childTnLst>
+                                </p:cTn>
+                              </p:par>
+                            </p:childTnLst>
+                          </p:cTn>
+                        </p:par>
+                        <p:par>
+                          <p:cTn id="65" fill="hold">
+                            <p:stCondLst>
+                              <p:cond delay="500"/>
+                            </p:stCondLst>
+                            <p:childTnLst>
+                              <p:par>
+                                <p:cTn id="66" presetID="22" presetClass="entr" presetSubtype="8" fill="hold" grpId="0" nodeType="afterEffect">
+                                  <p:stCondLst>
+                                    <p:cond delay="500"/>
+                                  </p:stCondLst>
+                                  <p:childTnLst>
+                                    <p:set>
+                                      <p:cBhvr>
+                                        <p:cTn id="67" dur="1" fill="hold">
+                                          <p:stCondLst>
+                                            <p:cond delay="0"/>
+                                          </p:stCondLst>
+                                        </p:cTn>
+                                        <p:tgtEl>
+                                          <p:spTgt spid="11"/>
+                                        </p:tgtEl>
+                                        <p:attrNameLst>
+                                          <p:attrName>style.visibility</p:attrName>
+                                        </p:attrNameLst>
+                                      </p:cBhvr>
+                                      <p:to>
+                                        <p:strVal val="visible"/>
+                                      </p:to>
+                                    </p:set>
+                                    <p:animEffect transition="in" filter="wipe(left)">
+                                      <p:cBhvr>
+                                        <p:cTn id="68" dur="1000"/>
+                                        <p:tgtEl>
+                                          <p:spTgt spid="11"/>
+                                        </p:tgtEl>
+                                      </p:cBhvr>
+                                    </p:animEffect>
+                                  </p:childTnLst>
+                                </p:cTn>
+                              </p:par>
+                            </p:childTnLst>
+                          </p:cTn>
+                        </p:par>
+                      </p:childTnLst>
+                    </p:cTn>
+                  </p:par>
+                  <p:par>
+                    <p:cTn id="69" fill="hold">
+                      <p:stCondLst>
+                        <p:cond delay="indefinite"/>
+                      </p:stCondLst>
+                      <p:childTnLst>
+                        <p:par>
+                          <p:cTn id="70" fill="hold">
+                            <p:stCondLst>
+                              <p:cond delay="0"/>
+                            </p:stCondLst>
+                            <p:childTnLst>
+                              <p:par>
+                                <p:cTn id="71" presetID="9" presetClass="entr" presetSubtype="0" fill="hold" nodeType="clickEffect">
+                                  <p:stCondLst>
+                                    <p:cond delay="0"/>
+                                  </p:stCondLst>
+                                  <p:childTnLst>
+                                    <p:set>
+                                      <p:cBhvr>
+                                        <p:cTn id="72" dur="1" fill="hold">
+                                          <p:stCondLst>
+                                            <p:cond delay="0"/>
+                                          </p:stCondLst>
+                                        </p:cTn>
+                                        <p:tgtEl>
+                                          <p:spTgt spid="3">
+                                            <p:txEl>
+                                              <p:pRg st="9" end="9"/>
+                                            </p:txEl>
+                                          </p:spTgt>
+                                        </p:tgtEl>
+                                        <p:attrNameLst>
+                                          <p:attrName>style.visibility</p:attrName>
+                                        </p:attrNameLst>
+                                      </p:cBhvr>
+                                      <p:to>
+                                        <p:strVal val="visible"/>
+                                      </p:to>
+                                    </p:set>
+                                    <p:animEffect transition="in" filter="dissolve">
+                                      <p:cBhvr>
+                                        <p:cTn id="73" dur="500"/>
+                                        <p:tgtEl>
+                                          <p:spTgt spid="3">
+                                            <p:txEl>
+                                              <p:pRg st="9" end="9"/>
+                                            </p:txEl>
+                                          </p:spTgt>
+                                        </p:tgtEl>
+                                      </p:cBhvr>
+                                    </p:animEffect>
+                                  </p:childTnLst>
+                                </p:cTn>
+                              </p:par>
+                            </p:childTnLst>
+                          </p:cTn>
+                        </p:par>
+                      </p:childTnLst>
+                    </p:cTn>
+                  </p:par>
+                  <p:par>
+                    <p:cTn id="74" fill="hold">
+                      <p:stCondLst>
+                        <p:cond delay="indefinite"/>
+                      </p:stCondLst>
+                      <p:childTnLst>
+                        <p:par>
+                          <p:cTn id="75" fill="hold">
+                            <p:stCondLst>
+                              <p:cond delay="0"/>
+                            </p:stCondLst>
+                            <p:childTnLst>
+                              <p:par>
+                                <p:cTn id="76" presetID="22" presetClass="entr" presetSubtype="8" fill="hold" grpId="0" nodeType="clickEffect">
+                                  <p:stCondLst>
+                                    <p:cond delay="0"/>
+                                  </p:stCondLst>
+                                  <p:childTnLst>
+                                    <p:set>
+                                      <p:cBhvr>
+                                        <p:cTn id="77" dur="1" fill="hold">
+                                          <p:stCondLst>
+                                            <p:cond delay="0"/>
+                                          </p:stCondLst>
+                                        </p:cTn>
+                                        <p:tgtEl>
+                                          <p:spTgt spid="12"/>
+                                        </p:tgtEl>
+                                        <p:attrNameLst>
+                                          <p:attrName>style.visibility</p:attrName>
+                                        </p:attrNameLst>
+                                      </p:cBhvr>
+                                      <p:to>
+                                        <p:strVal val="visible"/>
+                                      </p:to>
+                                    </p:set>
+                                    <p:animEffect transition="in" filter="wipe(left)">
+                                      <p:cBhvr>
+                                        <p:cTn id="78" dur="1000"/>
+                                        <p:tgtEl>
+                                          <p:spTgt spid="12"/>
+                                        </p:tgtEl>
+                                      </p:cBhvr>
+                                    </p:animEffect>
+                                  </p:childTnLst>
+                                </p:cTn>
+                              </p:par>
+                            </p:childTnLst>
+                          </p:cTn>
+                        </p:par>
+                      </p:childTnLst>
+                    </p:cTn>
+                  </p:par>
+                  <p:par>
+                    <p:cTn id="79" fill="hold">
+                      <p:stCondLst>
+                        <p:cond delay="indefinite"/>
+                      </p:stCondLst>
+                      <p:childTnLst>
+                        <p:par>
+                          <p:cTn id="80" fill="hold">
+                            <p:stCondLst>
+                              <p:cond delay="0"/>
+                            </p:stCondLst>
+                            <p:childTnLst>
+                              <p:par>
+                                <p:cTn id="81" presetID="9" presetClass="entr" presetSubtype="0" fill="hold" nodeType="clickEffect">
+                                  <p:stCondLst>
+                                    <p:cond delay="0"/>
+                                  </p:stCondLst>
+                                  <p:childTnLst>
+                                    <p:set>
+                                      <p:cBhvr>
+                                        <p:cTn id="82" dur="1" fill="hold">
+                                          <p:stCondLst>
+                                            <p:cond delay="0"/>
+                                          </p:stCondLst>
+                                        </p:cTn>
+                                        <p:tgtEl>
+                                          <p:spTgt spid="3">
+                                            <p:txEl>
+                                              <p:pRg st="10" end="10"/>
+                                            </p:txEl>
+                                          </p:spTgt>
+                                        </p:tgtEl>
+                                        <p:attrNameLst>
+                                          <p:attrName>style.visibility</p:attrName>
+                                        </p:attrNameLst>
+                                      </p:cBhvr>
+                                      <p:to>
+                                        <p:strVal val="visible"/>
+                                      </p:to>
+                                    </p:set>
+                                    <p:animEffect transition="in" filter="dissolve">
+                                      <p:cBhvr>
+                                        <p:cTn id="83" dur="500"/>
+                                        <p:tgtEl>
+                                          <p:spTgt spid="3">
+                                            <p:txEl>
+                                              <p:pRg st="10" end="10"/>
+                                            </p:txEl>
+                                          </p:spTgt>
+                                        </p:tgtEl>
+                                      </p:cBhvr>
+                                    </p:animEffect>
+                                  </p:childTnLst>
+                                </p:cTn>
+                              </p:par>
+                            </p:childTnLst>
+                          </p:cTn>
+                        </p:par>
+                      </p:childTnLst>
+                    </p:cTn>
+                  </p:par>
+                  <p:par>
+                    <p:cTn id="84" fill="hold">
+                      <p:stCondLst>
+                        <p:cond delay="indefinite"/>
+                      </p:stCondLst>
+                      <p:childTnLst>
+                        <p:par>
+                          <p:cTn id="85" fill="hold">
+                            <p:stCondLst>
+                              <p:cond delay="0"/>
+                            </p:stCondLst>
+                            <p:childTnLst>
+                              <p:par>
+                                <p:cTn id="86" presetID="22" presetClass="entr" presetSubtype="8" fill="hold" grpId="0" nodeType="clickEffect">
+                                  <p:stCondLst>
+                                    <p:cond delay="0"/>
+                                  </p:stCondLst>
+                                  <p:childTnLst>
+                                    <p:set>
+                                      <p:cBhvr>
+                                        <p:cTn id="87" dur="1" fill="hold">
+                                          <p:stCondLst>
+                                            <p:cond delay="0"/>
+                                          </p:stCondLst>
+                                        </p:cTn>
+                                        <p:tgtEl>
+                                          <p:spTgt spid="15"/>
+                                        </p:tgtEl>
+                                        <p:attrNameLst>
+                                          <p:attrName>style.visibility</p:attrName>
+                                        </p:attrNameLst>
+                                      </p:cBhvr>
+                                      <p:to>
+                                        <p:strVal val="visible"/>
+                                      </p:to>
+                                    </p:set>
+                                    <p:animEffect transition="in" filter="wipe(left)">
+                                      <p:cBhvr>
+                                        <p:cTn id="88" dur="250"/>
+                                        <p:tgtEl>
+                                          <p:spTgt spid="15"/>
+                                        </p:tgtEl>
+                                      </p:cBhvr>
+                                    </p:animEffect>
+                                  </p:childTnLst>
+                                </p:cTn>
+                              </p:par>
+                            </p:childTnLst>
+                          </p:cTn>
+                        </p:par>
+                      </p:childTnLst>
+                    </p:cTn>
+                  </p:par>
+                  <p:par>
+                    <p:cTn id="89" fill="hold">
+                      <p:stCondLst>
+                        <p:cond delay="indefinite"/>
+                      </p:stCondLst>
+                      <p:childTnLst>
+                        <p:par>
+                          <p:cTn id="90" fill="hold">
+                            <p:stCondLst>
+                              <p:cond delay="0"/>
+                            </p:stCondLst>
+                            <p:childTnLst>
+                              <p:par>
+                                <p:cTn id="91" presetID="22" presetClass="entr" presetSubtype="8" fill="hold" grpId="0" nodeType="clickEffect">
+                                  <p:stCondLst>
+                                    <p:cond delay="0"/>
+                                  </p:stCondLst>
+                                  <p:childTnLst>
+                                    <p:set>
+                                      <p:cBhvr>
+                                        <p:cTn id="92" dur="1" fill="hold">
+                                          <p:stCondLst>
+                                            <p:cond delay="0"/>
+                                          </p:stCondLst>
+                                        </p:cTn>
+                                        <p:tgtEl>
+                                          <p:spTgt spid="13"/>
+                                        </p:tgtEl>
+                                        <p:attrNameLst>
+                                          <p:attrName>style.visibility</p:attrName>
+                                        </p:attrNameLst>
+                                      </p:cBhvr>
+                                      <p:to>
+                                        <p:strVal val="visible"/>
+                                      </p:to>
+                                    </p:set>
+                                    <p:animEffect transition="in" filter="wipe(left)">
+                                      <p:cBhvr>
+                                        <p:cTn id="93" dur="250"/>
+                                        <p:tgtEl>
+                                          <p:spTgt spid="13"/>
+                                        </p:tgtEl>
+                                      </p:cBhvr>
+                                    </p:animEffect>
+                                  </p:childTnLst>
+                                </p:cTn>
+                              </p:par>
+                            </p:childTnLst>
+                          </p:cTn>
+                        </p:par>
+                      </p:childTnLst>
+                    </p:cTn>
+                  </p:par>
+                </p:childTnLst>
+              </p:cTn>
+              <p:prevCondLst>
+                <p:cond evt="onPrev" delay="0">
+                  <p:tgtEl>
+                    <p:sldTgt/>
+                  </p:tgtEl>
+                </p:cond>
+              </p:prevCondLst>
+              <p:nextCondLst>
+                <p:cond evt="onNext" delay="0">
+                  <p:tgtEl>
+                    <p:sldTgt/>
+                  </p:tgtEl>
+                </p:cond>
+              </p:nextCondLst>
+            </p:seq>
+          </p:childTnLst>
+        </p:cTn>
+      </p:par>
+    </p:tnLst>
+    <p:bldLst>
+      <p:bldP spid="11" grpId="0" animBg="1"/>
+      <p:bldP spid="7" grpId="0" animBg="1"/>
+      <p:bldP spid="6" grpId="0" animBg="1"/>
+      <p:bldP spid="10" grpId="0" animBg="1"/>
+      <p:bldP spid="12" grpId="0" animBg="1"/>
+      <p:bldP spid="13" grpId="0" animBg="1"/>
+      <p:bldP spid="15" grpId="0" animBg="1"/>
+      <p:bldP spid="16" grpId="0" animBg="1"/>
+    </p:bldLst>
+  </p:timing>
+</p:sld>
+</file>
+
 <file path=ppt/slides/slide15.xml><?xml version="1.0" encoding="utf-8"?>
 <p:sld xmlns:a="http://schemas.openxmlformats.org/drawingml/2006/main" xmlns:r="http://schemas.openxmlformats.org/officeDocument/2006/relationships" xmlns:p="http://schemas.openxmlformats.org/presentationml/2006/main">
   <p:cSld>
@@ -12807,6 +13950,177 @@
 </file>
 
 <file path=ppt/slides/slide17.xml><?xml version="1.0" encoding="utf-8"?>
+<p:sld xmlns:a="http://schemas.openxmlformats.org/drawingml/2006/main" xmlns:r="http://schemas.openxmlformats.org/officeDocument/2006/relationships" xmlns:p="http://schemas.openxmlformats.org/presentationml/2006/main">
+  <p:cSld>
+    <p:spTree>
+      <p:nvGrpSpPr>
+        <p:cNvPr id="1" name=""/>
+        <p:cNvGrpSpPr/>
+        <p:nvPr/>
+      </p:nvGrpSpPr>
+      <p:grpSpPr>
+        <a:xfrm>
+          <a:off x="0" y="0"/>
+          <a:ext cx="0" cy="0"/>
+          <a:chOff x="0" y="0"/>
+          <a:chExt cx="0" cy="0"/>
+        </a:xfrm>
+      </p:grpSpPr>
+      <p:sp>
+        <p:nvSpPr>
+          <p:cNvPr id="2" name="Title 1">
+            <a:extLst>
+              <a:ext uri="{FF2B5EF4-FFF2-40B4-BE49-F238E27FC236}">
+                <a16:creationId xmlns:a16="http://schemas.microsoft.com/office/drawing/2014/main" id="{EB7C4089-1746-624B-8E73-D3DAB8E88CDD}"/>
+              </a:ext>
+            </a:extLst>
+          </p:cNvPr>
+          <p:cNvSpPr>
+            <a:spLocks noGrp="1"/>
+          </p:cNvSpPr>
+          <p:nvPr>
+            <p:ph type="title"/>
+          </p:nvPr>
+        </p:nvSpPr>
+        <p:spPr/>
+        <p:txBody>
+          <a:bodyPr/>
+          <a:lstStyle/>
+          <a:p>
+            <a:r>
+              <a:rPr lang="en-US" dirty="0"/>
+              <a:t>Outline</a:t>
+            </a:r>
+          </a:p>
+        </p:txBody>
+      </p:sp>
+      <p:sp>
+        <p:nvSpPr>
+          <p:cNvPr id="3" name="Content Placeholder 2">
+            <a:extLst>
+              <a:ext uri="{FF2B5EF4-FFF2-40B4-BE49-F238E27FC236}">
+                <a16:creationId xmlns:a16="http://schemas.microsoft.com/office/drawing/2014/main" id="{65426B10-0364-A849-B3A4-1D0DA409155A}"/>
+              </a:ext>
+            </a:extLst>
+          </p:cNvPr>
+          <p:cNvSpPr>
+            <a:spLocks noGrp="1"/>
+          </p:cNvSpPr>
+          <p:nvPr>
+            <p:ph idx="1"/>
+          </p:nvPr>
+        </p:nvSpPr>
+        <p:spPr/>
+        <p:txBody>
+          <a:bodyPr>
+            <a:normAutofit/>
+          </a:bodyPr>
+          <a:lstStyle/>
+          <a:p>
+            <a:r>
+              <a:rPr lang="en-US" dirty="0"/>
+              <a:t>Requests Library overview</a:t>
+            </a:r>
+          </a:p>
+          <a:p>
+            <a:r>
+              <a:rPr lang="en-US" dirty="0"/>
+              <a:t>Requests methods, arguments, and objects</a:t>
+            </a:r>
+          </a:p>
+          <a:p>
+            <a:r>
+              <a:rPr lang="en-US" dirty="0"/>
+              <a:t>Basic Requests examples and exercises</a:t>
+            </a:r>
+          </a:p>
+        </p:txBody>
+      </p:sp>
+      <p:sp>
+        <p:nvSpPr>
+          <p:cNvPr id="4" name="Date Placeholder 3">
+            <a:extLst>
+              <a:ext uri="{FF2B5EF4-FFF2-40B4-BE49-F238E27FC236}">
+                <a16:creationId xmlns:a16="http://schemas.microsoft.com/office/drawing/2014/main" id="{7ECEAF79-F4AC-E94E-9E55-220D0D396924}"/>
+              </a:ext>
+            </a:extLst>
+          </p:cNvPr>
+          <p:cNvSpPr>
+            <a:spLocks noGrp="1"/>
+          </p:cNvSpPr>
+          <p:nvPr>
+            <p:ph type="dt" sz="half" idx="10"/>
+          </p:nvPr>
+        </p:nvSpPr>
+        <p:spPr/>
+        <p:txBody>
+          <a:bodyPr/>
+          <a:lstStyle/>
+          <a:p>
+            <a:r>
+              <a:rPr lang="en-US"/>
+              <a:t>World Wide Technology ©</a:t>
+            </a:r>
+            <a:endParaRPr lang="en-US" dirty="0"/>
+          </a:p>
+        </p:txBody>
+      </p:sp>
+      <p:sp>
+        <p:nvSpPr>
+          <p:cNvPr id="5" name="Slide Number Placeholder 4">
+            <a:extLst>
+              <a:ext uri="{FF2B5EF4-FFF2-40B4-BE49-F238E27FC236}">
+                <a16:creationId xmlns:a16="http://schemas.microsoft.com/office/drawing/2014/main" id="{372DC1A4-CE8B-DB4A-8F86-2508518C35D3}"/>
+              </a:ext>
+            </a:extLst>
+          </p:cNvPr>
+          <p:cNvSpPr>
+            <a:spLocks noGrp="1"/>
+          </p:cNvSpPr>
+          <p:nvPr>
+            <p:ph type="sldNum" sz="quarter" idx="12"/>
+          </p:nvPr>
+        </p:nvSpPr>
+        <p:spPr/>
+        <p:txBody>
+          <a:bodyPr/>
+          <a:lstStyle/>
+          <a:p>
+            <a:fld id="{A44B02FA-DD2D-1844-AE35-8B2EAB0CF4EF}" type="slidenum">
+              <a:rPr lang="en-US" smtClean="0"/>
+              <a:pPr/>
+              <a:t>17</a:t>
+            </a:fld>
+            <a:endParaRPr lang="en-US" dirty="0"/>
+          </a:p>
+        </p:txBody>
+      </p:sp>
+    </p:spTree>
+    <p:extLst>
+      <p:ext uri="{BB962C8B-B14F-4D97-AF65-F5344CB8AC3E}">
+        <p14:creationId xmlns:p14="http://schemas.microsoft.com/office/powerpoint/2010/main" val="2739176637"/>
+      </p:ext>
+    </p:extLst>
+  </p:cSld>
+  <p:clrMapOvr>
+    <a:masterClrMapping/>
+  </p:clrMapOvr>
+  <mc:AlternateContent xmlns:mc="http://schemas.openxmlformats.org/markup-compatibility/2006" xmlns:p14="http://schemas.microsoft.com/office/powerpoint/2010/main">
+    <mc:Choice Requires="p14">
+      <p:transition spd="med" p14:dur="700">
+        <p:fade/>
+      </p:transition>
+    </mc:Choice>
+    <mc:Fallback xmlns="">
+      <p:transition spd="med">
+        <p:fade/>
+      </p:transition>
+    </mc:Fallback>
+  </mc:AlternateContent>
+</p:sld>
+</file>
+
+<file path=ppt/slides/slide18.xml><?xml version="1.0" encoding="utf-8"?>
 <p:sld xmlns:a="http://schemas.openxmlformats.org/drawingml/2006/main" xmlns:r="http://schemas.openxmlformats.org/officeDocument/2006/relationships" xmlns:p="http://schemas.openxmlformats.org/presentationml/2006/main">
   <p:cSld>
     <p:spTree>
@@ -13163,7 +14477,7 @@
             <a:fld id="{A44B02FA-DD2D-1844-AE35-8B2EAB0CF4EF}" type="slidenum">
               <a:rPr lang="en-US" smtClean="0"/>
               <a:pPr/>
-              <a:t>17</a:t>
+              <a:t>18</a:t>
             </a:fld>
             <a:endParaRPr lang="en-US" dirty="0"/>
           </a:p>
@@ -13331,177 +14645,6 @@
       <p:bldP spid="5" grpId="0"/>
     </p:bldLst>
   </p:timing>
-</p:sld>
-</file>
-
-<file path=ppt/slides/slide18.xml><?xml version="1.0" encoding="utf-8"?>
-<p:sld xmlns:a="http://schemas.openxmlformats.org/drawingml/2006/main" xmlns:r="http://schemas.openxmlformats.org/officeDocument/2006/relationships" xmlns:p="http://schemas.openxmlformats.org/presentationml/2006/main">
-  <p:cSld>
-    <p:spTree>
-      <p:nvGrpSpPr>
-        <p:cNvPr id="1" name=""/>
-        <p:cNvGrpSpPr/>
-        <p:nvPr/>
-      </p:nvGrpSpPr>
-      <p:grpSpPr>
-        <a:xfrm>
-          <a:off x="0" y="0"/>
-          <a:ext cx="0" cy="0"/>
-          <a:chOff x="0" y="0"/>
-          <a:chExt cx="0" cy="0"/>
-        </a:xfrm>
-      </p:grpSpPr>
-      <p:sp>
-        <p:nvSpPr>
-          <p:cNvPr id="2" name="Title 1">
-            <a:extLst>
-              <a:ext uri="{FF2B5EF4-FFF2-40B4-BE49-F238E27FC236}">
-                <a16:creationId xmlns:a16="http://schemas.microsoft.com/office/drawing/2014/main" id="{EB7C4089-1746-624B-8E73-D3DAB8E88CDD}"/>
-              </a:ext>
-            </a:extLst>
-          </p:cNvPr>
-          <p:cNvSpPr>
-            <a:spLocks noGrp="1"/>
-          </p:cNvSpPr>
-          <p:nvPr>
-            <p:ph type="title"/>
-          </p:nvPr>
-        </p:nvSpPr>
-        <p:spPr/>
-        <p:txBody>
-          <a:bodyPr/>
-          <a:lstStyle/>
-          <a:p>
-            <a:r>
-              <a:rPr lang="en-US" dirty="0"/>
-              <a:t>Outline</a:t>
-            </a:r>
-          </a:p>
-        </p:txBody>
-      </p:sp>
-      <p:sp>
-        <p:nvSpPr>
-          <p:cNvPr id="3" name="Content Placeholder 2">
-            <a:extLst>
-              <a:ext uri="{FF2B5EF4-FFF2-40B4-BE49-F238E27FC236}">
-                <a16:creationId xmlns:a16="http://schemas.microsoft.com/office/drawing/2014/main" id="{65426B10-0364-A849-B3A4-1D0DA409155A}"/>
-              </a:ext>
-            </a:extLst>
-          </p:cNvPr>
-          <p:cNvSpPr>
-            <a:spLocks noGrp="1"/>
-          </p:cNvSpPr>
-          <p:nvPr>
-            <p:ph idx="1"/>
-          </p:nvPr>
-        </p:nvSpPr>
-        <p:spPr/>
-        <p:txBody>
-          <a:bodyPr>
-            <a:normAutofit/>
-          </a:bodyPr>
-          <a:lstStyle/>
-          <a:p>
-            <a:r>
-              <a:rPr lang="en-US" dirty="0"/>
-              <a:t>Requests Library overview</a:t>
-            </a:r>
-          </a:p>
-          <a:p>
-            <a:r>
-              <a:rPr lang="en-US" dirty="0"/>
-              <a:t>Requests methods, arguments, and objects</a:t>
-            </a:r>
-          </a:p>
-          <a:p>
-            <a:r>
-              <a:rPr lang="en-US" dirty="0"/>
-              <a:t>Basic Requests examples and exercises</a:t>
-            </a:r>
-          </a:p>
-        </p:txBody>
-      </p:sp>
-      <p:sp>
-        <p:nvSpPr>
-          <p:cNvPr id="4" name="Date Placeholder 3">
-            <a:extLst>
-              <a:ext uri="{FF2B5EF4-FFF2-40B4-BE49-F238E27FC236}">
-                <a16:creationId xmlns:a16="http://schemas.microsoft.com/office/drawing/2014/main" id="{7ECEAF79-F4AC-E94E-9E55-220D0D396924}"/>
-              </a:ext>
-            </a:extLst>
-          </p:cNvPr>
-          <p:cNvSpPr>
-            <a:spLocks noGrp="1"/>
-          </p:cNvSpPr>
-          <p:nvPr>
-            <p:ph type="dt" sz="half" idx="10"/>
-          </p:nvPr>
-        </p:nvSpPr>
-        <p:spPr/>
-        <p:txBody>
-          <a:bodyPr/>
-          <a:lstStyle/>
-          <a:p>
-            <a:r>
-              <a:rPr lang="en-US"/>
-              <a:t>World Wide Technology ©</a:t>
-            </a:r>
-            <a:endParaRPr lang="en-US" dirty="0"/>
-          </a:p>
-        </p:txBody>
-      </p:sp>
-      <p:sp>
-        <p:nvSpPr>
-          <p:cNvPr id="5" name="Slide Number Placeholder 4">
-            <a:extLst>
-              <a:ext uri="{FF2B5EF4-FFF2-40B4-BE49-F238E27FC236}">
-                <a16:creationId xmlns:a16="http://schemas.microsoft.com/office/drawing/2014/main" id="{372DC1A4-CE8B-DB4A-8F86-2508518C35D3}"/>
-              </a:ext>
-            </a:extLst>
-          </p:cNvPr>
-          <p:cNvSpPr>
-            <a:spLocks noGrp="1"/>
-          </p:cNvSpPr>
-          <p:nvPr>
-            <p:ph type="sldNum" sz="quarter" idx="12"/>
-          </p:nvPr>
-        </p:nvSpPr>
-        <p:spPr/>
-        <p:txBody>
-          <a:bodyPr/>
-          <a:lstStyle/>
-          <a:p>
-            <a:fld id="{A44B02FA-DD2D-1844-AE35-8B2EAB0CF4EF}" type="slidenum">
-              <a:rPr lang="en-US" smtClean="0"/>
-              <a:pPr/>
-              <a:t>18</a:t>
-            </a:fld>
-            <a:endParaRPr lang="en-US" dirty="0"/>
-          </a:p>
-        </p:txBody>
-      </p:sp>
-    </p:spTree>
-    <p:extLst>
-      <p:ext uri="{BB962C8B-B14F-4D97-AF65-F5344CB8AC3E}">
-        <p14:creationId xmlns:p14="http://schemas.microsoft.com/office/powerpoint/2010/main" val="2739176637"/>
-      </p:ext>
-    </p:extLst>
-  </p:cSld>
-  <p:clrMapOvr>
-    <a:masterClrMapping/>
-  </p:clrMapOvr>
-  <mc:AlternateContent xmlns:mc="http://schemas.openxmlformats.org/markup-compatibility/2006" xmlns:p14="http://schemas.microsoft.com/office/powerpoint/2010/main">
-    <mc:Choice Requires="p14">
-      <p:transition spd="med" p14:dur="700">
-        <p:fade/>
-      </p:transition>
-    </mc:Choice>
-    <mc:Fallback xmlns="">
-      <p:transition spd="med">
-        <p:fade/>
-      </p:transition>
-    </mc:Fallback>
-  </mc:AlternateContent>
 </p:sld>
 </file>
 
@@ -18487,7 +19630,7 @@
           <p:cNvPr id="2" name="Title 1">
             <a:extLst>
               <a:ext uri="{FF2B5EF4-FFF2-40B4-BE49-F238E27FC236}">
-                <a16:creationId xmlns:a16="http://schemas.microsoft.com/office/drawing/2014/main" id="{EB7C4089-1746-624B-8E73-D3DAB8E88CDD}"/>
+                <a16:creationId xmlns:a16="http://schemas.microsoft.com/office/drawing/2014/main" id="{178FC9BC-162C-754A-A134-D392F08CDBEE}"/>
               </a:ext>
             </a:extLst>
           </p:cNvPr>
@@ -18504,8 +19647,12 @@
           <a:lstStyle/>
           <a:p>
             <a:r>
+              <a:rPr lang="en-US" dirty="0" err="1"/>
+              <a:t>cURL</a:t>
+            </a:r>
+            <a:r>
               <a:rPr lang="en-US" dirty="0"/>
-              <a:t>Outline</a:t>
+              <a:t> Syntax Format</a:t>
             </a:r>
           </a:p>
         </p:txBody>
@@ -18515,7 +19662,7 @@
           <p:cNvPr id="3" name="Content Placeholder 2">
             <a:extLst>
               <a:ext uri="{FF2B5EF4-FFF2-40B4-BE49-F238E27FC236}">
-                <a16:creationId xmlns:a16="http://schemas.microsoft.com/office/drawing/2014/main" id="{65426B10-0364-A849-B3A4-1D0DA409155A}"/>
+                <a16:creationId xmlns:a16="http://schemas.microsoft.com/office/drawing/2014/main" id="{0ECC7DC7-0671-F543-9991-CF8210E2567B}"/>
               </a:ext>
             </a:extLst>
           </p:cNvPr>
@@ -18528,35 +19675,146 @@
         </p:nvSpPr>
         <p:spPr/>
         <p:txBody>
-          <a:bodyPr>
-            <a:normAutofit/>
-          </a:bodyPr>
+          <a:bodyPr/>
           <a:lstStyle/>
           <a:p>
             <a:r>
               <a:rPr lang="en-US" dirty="0"/>
-              <a:t>Syntax format</a:t>
-            </a:r>
-          </a:p>
-          <a:p>
+              <a:t>Format</a:t>
+            </a:r>
+          </a:p>
+          <a:p>
+            <a:pPr marL="457200" lvl="1" indent="0">
+              <a:buNone/>
+            </a:pPr>
+            <a:r>
+              <a:rPr lang="en-US" sz="2800" b="1" i="1" dirty="0">
+                <a:solidFill>
+                  <a:srgbClr val="FFFF00"/>
+                </a:solidFill>
+              </a:rPr>
+              <a:t>curl [options…] &lt;</a:t>
+            </a:r>
+            <a:r>
+              <a:rPr lang="en-US" sz="2800" b="1" i="1" dirty="0" err="1">
+                <a:solidFill>
+                  <a:srgbClr val="FFFF00"/>
+                </a:solidFill>
+              </a:rPr>
+              <a:t>url</a:t>
+            </a:r>
+            <a:r>
+              <a:rPr lang="en-US" sz="2800" b="1" i="1" dirty="0">
+                <a:solidFill>
+                  <a:srgbClr val="FFFF00"/>
+                </a:solidFill>
+              </a:rPr>
+              <a:t>&gt;</a:t>
+            </a:r>
+            <a:endParaRPr lang="en-US" sz="2800" dirty="0"/>
+          </a:p>
+          <a:p>
+            <a:r>
+              <a:rPr lang="en-US" dirty="0"/>
+              <a:t>Open your preferred terminal (bash, PowerShell, </a:t>
+            </a:r>
             <a:r>
               <a:rPr lang="en-US" dirty="0" err="1"/>
-              <a:t>cURL</a:t>
+              <a:t>zsh</a:t>
             </a:r>
             <a:r>
               <a:rPr lang="en-US" dirty="0"/>
-              <a:t> command option definitions</a:t>
-            </a:r>
-          </a:p>
-          <a:p>
-            <a:r>
-              <a:rPr lang="en-US" dirty="0" err="1"/>
-              <a:t>cURL</a:t>
-            </a:r>
+              <a:t>, etc.)</a:t>
+            </a:r>
+          </a:p>
+          <a:p>
             <a:r>
               <a:rPr lang="en-US" dirty="0"/>
-              <a:t> examples and exercises</a:t>
-            </a:r>
+              <a:t>Enter the commands:</a:t>
+            </a:r>
+          </a:p>
+          <a:p>
+            <a:pPr marL="457200" lvl="1" indent="0">
+              <a:buNone/>
+            </a:pPr>
+            <a:r>
+              <a:rPr lang="en-US" sz="2800" b="1" i="1" dirty="0">
+                <a:solidFill>
+                  <a:srgbClr val="FFFF00"/>
+                </a:solidFill>
+              </a:rPr>
+              <a:t>curl --version </a:t>
+            </a:r>
+            <a:r>
+              <a:rPr lang="en-US" sz="2800" b="1" dirty="0"/>
+              <a:t>or </a:t>
+            </a:r>
+            <a:r>
+              <a:rPr lang="en-US" sz="2800" b="1" i="1" dirty="0">
+                <a:solidFill>
+                  <a:srgbClr val="FFFF00"/>
+                </a:solidFill>
+              </a:rPr>
+              <a:t>curl -V</a:t>
+            </a:r>
+          </a:p>
+          <a:p>
+            <a:pPr marL="457200" lvl="1" indent="0">
+              <a:buNone/>
+            </a:pPr>
+            <a:r>
+              <a:rPr lang="en-US" sz="2800" b="1" i="1" dirty="0">
+                <a:solidFill>
+                  <a:srgbClr val="FFFF00"/>
+                </a:solidFill>
+              </a:rPr>
+              <a:t>curl https://</a:t>
+            </a:r>
+            <a:r>
+              <a:rPr lang="en-US" sz="2800" b="1" i="1" dirty="0" err="1">
+                <a:solidFill>
+                  <a:srgbClr val="FFFF00"/>
+                </a:solidFill>
+              </a:rPr>
+              <a:t>whatsmyua.info</a:t>
+            </a:r>
+            <a:r>
+              <a:rPr lang="en-US" sz="2800" b="1" i="1" dirty="0">
+                <a:solidFill>
+                  <a:srgbClr val="FFFF00"/>
+                </a:solidFill>
+              </a:rPr>
+              <a:t>/</a:t>
+            </a:r>
+            <a:r>
+              <a:rPr lang="en-US" sz="2800" b="1" i="1" dirty="0" err="1">
+                <a:solidFill>
+                  <a:srgbClr val="FFFF00"/>
+                </a:solidFill>
+              </a:rPr>
+              <a:t>api</a:t>
+            </a:r>
+            <a:r>
+              <a:rPr lang="en-US" sz="2800" b="1" i="1" dirty="0">
+                <a:solidFill>
+                  <a:srgbClr val="FFFF00"/>
+                </a:solidFill>
+              </a:rPr>
+              <a:t>/v1/</a:t>
+            </a:r>
+            <a:r>
+              <a:rPr lang="en-US" sz="2800" b="1" i="1" dirty="0" err="1">
+                <a:solidFill>
+                  <a:srgbClr val="FFFF00"/>
+                </a:solidFill>
+              </a:rPr>
+              <a:t>ua</a:t>
+            </a:r>
+            <a:endParaRPr lang="en-US" sz="2800" b="1" i="1" dirty="0">
+              <a:solidFill>
+                <a:srgbClr val="FFFF00"/>
+              </a:solidFill>
+            </a:endParaRPr>
           </a:p>
         </p:txBody>
       </p:sp>
@@ -18565,7 +19823,7 @@
           <p:cNvPr id="4" name="Date Placeholder 3">
             <a:extLst>
               <a:ext uri="{FF2B5EF4-FFF2-40B4-BE49-F238E27FC236}">
-                <a16:creationId xmlns:a16="http://schemas.microsoft.com/office/drawing/2014/main" id="{7ECEAF79-F4AC-E94E-9E55-220D0D396924}"/>
+                <a16:creationId xmlns:a16="http://schemas.microsoft.com/office/drawing/2014/main" id="{38C6DDB4-CE9E-4843-86A9-EFC27330D02F}"/>
               </a:ext>
             </a:extLst>
           </p:cNvPr>
@@ -18594,7 +19852,7 @@
           <p:cNvPr id="5" name="Slide Number Placeholder 4">
             <a:extLst>
               <a:ext uri="{FF2B5EF4-FFF2-40B4-BE49-F238E27FC236}">
-                <a16:creationId xmlns:a16="http://schemas.microsoft.com/office/drawing/2014/main" id="{372DC1A4-CE8B-DB4A-8F86-2508518C35D3}"/>
+                <a16:creationId xmlns:a16="http://schemas.microsoft.com/office/drawing/2014/main" id="{09AD6D8E-DFAE-8E42-9152-B189D9284AD9}"/>
               </a:ext>
             </a:extLst>
           </p:cNvPr>
@@ -18619,10 +19877,118 @@
           </a:p>
         </p:txBody>
       </p:sp>
+      <p:sp>
+        <p:nvSpPr>
+          <p:cNvPr id="8" name="Rectangle 7">
+            <a:extLst>
+              <a:ext uri="{FF2B5EF4-FFF2-40B4-BE49-F238E27FC236}">
+                <a16:creationId xmlns:a16="http://schemas.microsoft.com/office/drawing/2014/main" id="{D58E649F-E375-614D-8A53-9704053A894D}"/>
+              </a:ext>
+            </a:extLst>
+          </p:cNvPr>
+          <p:cNvSpPr/>
+          <p:nvPr/>
+        </p:nvSpPr>
+        <p:spPr>
+          <a:xfrm>
+            <a:off x="5593080" y="4199486"/>
+            <a:ext cx="1673727" cy="404925"/>
+          </a:xfrm>
+          <a:prstGeom prst="rect">
+            <a:avLst/>
+          </a:prstGeom>
+          <a:solidFill>
+            <a:schemeClr val="tx1">
+              <a:alpha val="40000"/>
+            </a:schemeClr>
+          </a:solidFill>
+          <a:ln>
+            <a:noFill/>
+          </a:ln>
+        </p:spPr>
+        <p:style>
+          <a:lnRef idx="2">
+            <a:schemeClr val="accent1">
+              <a:shade val="50000"/>
+            </a:schemeClr>
+          </a:lnRef>
+          <a:fillRef idx="1">
+            <a:schemeClr val="accent1"/>
+          </a:fillRef>
+          <a:effectRef idx="0">
+            <a:schemeClr val="accent1"/>
+          </a:effectRef>
+          <a:fontRef idx="minor">
+            <a:schemeClr val="lt1"/>
+          </a:fontRef>
+        </p:style>
+        <p:txBody>
+          <a:bodyPr rtlCol="0" anchor="ctr"/>
+          <a:lstStyle/>
+          <a:p>
+            <a:pPr algn="ctr"/>
+            <a:endParaRPr lang="en-US" dirty="0"/>
+          </a:p>
+        </p:txBody>
+      </p:sp>
+      <p:sp>
+        <p:nvSpPr>
+          <p:cNvPr id="7" name="Rectangle 6">
+            <a:extLst>
+              <a:ext uri="{FF2B5EF4-FFF2-40B4-BE49-F238E27FC236}">
+                <a16:creationId xmlns:a16="http://schemas.microsoft.com/office/drawing/2014/main" id="{711B4F6A-3227-AA48-9B9B-D28C475E3FCA}"/>
+              </a:ext>
+            </a:extLst>
+          </p:cNvPr>
+          <p:cNvSpPr/>
+          <p:nvPr/>
+        </p:nvSpPr>
+        <p:spPr>
+          <a:xfrm>
+            <a:off x="1975629" y="4199486"/>
+            <a:ext cx="3617451" cy="404925"/>
+          </a:xfrm>
+          <a:prstGeom prst="rect">
+            <a:avLst/>
+          </a:prstGeom>
+          <a:solidFill>
+            <a:schemeClr val="tx1">
+              <a:alpha val="40000"/>
+            </a:schemeClr>
+          </a:solidFill>
+          <a:ln>
+            <a:noFill/>
+          </a:ln>
+        </p:spPr>
+        <p:style>
+          <a:lnRef idx="2">
+            <a:schemeClr val="accent1">
+              <a:shade val="50000"/>
+            </a:schemeClr>
+          </a:lnRef>
+          <a:fillRef idx="1">
+            <a:schemeClr val="accent1"/>
+          </a:fillRef>
+          <a:effectRef idx="0">
+            <a:schemeClr val="accent1"/>
+          </a:effectRef>
+          <a:fontRef idx="minor">
+            <a:schemeClr val="lt1"/>
+          </a:fontRef>
+        </p:style>
+        <p:txBody>
+          <a:bodyPr rtlCol="0" anchor="ctr"/>
+          <a:lstStyle/>
+          <a:p>
+            <a:pPr algn="ctr"/>
+            <a:endParaRPr lang="en-US" dirty="0"/>
+          </a:p>
+        </p:txBody>
+      </p:sp>
     </p:spTree>
     <p:extLst>
       <p:ext uri="{BB962C8B-B14F-4D97-AF65-F5344CB8AC3E}">
-        <p14:creationId xmlns:p14="http://schemas.microsoft.com/office/powerpoint/2010/main" val="1440297303"/>
+        <p14:creationId xmlns:p14="http://schemas.microsoft.com/office/powerpoint/2010/main" val="593970204"/>
       </p:ext>
     </p:extLst>
   </p:cSld>
@@ -18641,6 +20007,459 @@
       </p:transition>
     </mc:Fallback>
   </mc:AlternateContent>
+  <p:timing>
+    <p:tnLst>
+      <p:par>
+        <p:cTn id="1" dur="indefinite" restart="never" nodeType="tmRoot">
+          <p:childTnLst>
+            <p:seq concurrent="1" nextAc="seek">
+              <p:cTn id="2" dur="indefinite" nodeType="mainSeq">
+                <p:childTnLst>
+                  <p:par>
+                    <p:cTn id="3" fill="hold">
+                      <p:stCondLst>
+                        <p:cond delay="indefinite"/>
+                      </p:stCondLst>
+                      <p:childTnLst>
+                        <p:par>
+                          <p:cTn id="4" fill="hold">
+                            <p:stCondLst>
+                              <p:cond delay="0"/>
+                            </p:stCondLst>
+                            <p:childTnLst>
+                              <p:par>
+                                <p:cTn id="5" presetID="9" presetClass="entr" presetSubtype="0" fill="hold" grpId="0" nodeType="clickEffect">
+                                  <p:stCondLst>
+                                    <p:cond delay="0"/>
+                                  </p:stCondLst>
+                                  <p:childTnLst>
+                                    <p:set>
+                                      <p:cBhvr>
+                                        <p:cTn id="6" dur="1" fill="hold">
+                                          <p:stCondLst>
+                                            <p:cond delay="0"/>
+                                          </p:stCondLst>
+                                        </p:cTn>
+                                        <p:tgtEl>
+                                          <p:spTgt spid="3">
+                                            <p:txEl>
+                                              <p:pRg st="0" end="0"/>
+                                            </p:txEl>
+                                          </p:spTgt>
+                                        </p:tgtEl>
+                                        <p:attrNameLst>
+                                          <p:attrName>style.visibility</p:attrName>
+                                        </p:attrNameLst>
+                                      </p:cBhvr>
+                                      <p:to>
+                                        <p:strVal val="visible"/>
+                                      </p:to>
+                                    </p:set>
+                                    <p:animEffect transition="in" filter="dissolve">
+                                      <p:cBhvr>
+                                        <p:cTn id="7" dur="500"/>
+                                        <p:tgtEl>
+                                          <p:spTgt spid="3">
+                                            <p:txEl>
+                                              <p:pRg st="0" end="0"/>
+                                            </p:txEl>
+                                          </p:spTgt>
+                                        </p:tgtEl>
+                                      </p:cBhvr>
+                                    </p:animEffect>
+                                  </p:childTnLst>
+                                </p:cTn>
+                              </p:par>
+                              <p:par>
+                                <p:cTn id="8" presetID="9" presetClass="entr" presetSubtype="0" fill="hold" grpId="0" nodeType="withEffect">
+                                  <p:stCondLst>
+                                    <p:cond delay="0"/>
+                                  </p:stCondLst>
+                                  <p:childTnLst>
+                                    <p:set>
+                                      <p:cBhvr>
+                                        <p:cTn id="9" dur="1" fill="hold">
+                                          <p:stCondLst>
+                                            <p:cond delay="0"/>
+                                          </p:stCondLst>
+                                        </p:cTn>
+                                        <p:tgtEl>
+                                          <p:spTgt spid="3">
+                                            <p:txEl>
+                                              <p:pRg st="1" end="1"/>
+                                            </p:txEl>
+                                          </p:spTgt>
+                                        </p:tgtEl>
+                                        <p:attrNameLst>
+                                          <p:attrName>style.visibility</p:attrName>
+                                        </p:attrNameLst>
+                                      </p:cBhvr>
+                                      <p:to>
+                                        <p:strVal val="visible"/>
+                                      </p:to>
+                                    </p:set>
+                                    <p:animEffect transition="in" filter="dissolve">
+                                      <p:cBhvr>
+                                        <p:cTn id="10" dur="500"/>
+                                        <p:tgtEl>
+                                          <p:spTgt spid="3">
+                                            <p:txEl>
+                                              <p:pRg st="1" end="1"/>
+                                            </p:txEl>
+                                          </p:spTgt>
+                                        </p:tgtEl>
+                                      </p:cBhvr>
+                                    </p:animEffect>
+                                  </p:childTnLst>
+                                </p:cTn>
+                              </p:par>
+                            </p:childTnLst>
+                          </p:cTn>
+                        </p:par>
+                      </p:childTnLst>
+                    </p:cTn>
+                  </p:par>
+                  <p:par>
+                    <p:cTn id="11" fill="hold">
+                      <p:stCondLst>
+                        <p:cond delay="indefinite"/>
+                      </p:stCondLst>
+                      <p:childTnLst>
+                        <p:par>
+                          <p:cTn id="12" fill="hold">
+                            <p:stCondLst>
+                              <p:cond delay="0"/>
+                            </p:stCondLst>
+                            <p:childTnLst>
+                              <p:par>
+                                <p:cTn id="13" presetID="9" presetClass="entr" presetSubtype="0" fill="hold" grpId="0" nodeType="clickEffect">
+                                  <p:stCondLst>
+                                    <p:cond delay="0"/>
+                                  </p:stCondLst>
+                                  <p:childTnLst>
+                                    <p:set>
+                                      <p:cBhvr>
+                                        <p:cTn id="14" dur="1" fill="hold">
+                                          <p:stCondLst>
+                                            <p:cond delay="0"/>
+                                          </p:stCondLst>
+                                        </p:cTn>
+                                        <p:tgtEl>
+                                          <p:spTgt spid="3">
+                                            <p:txEl>
+                                              <p:pRg st="2" end="2"/>
+                                            </p:txEl>
+                                          </p:spTgt>
+                                        </p:tgtEl>
+                                        <p:attrNameLst>
+                                          <p:attrName>style.visibility</p:attrName>
+                                        </p:attrNameLst>
+                                      </p:cBhvr>
+                                      <p:to>
+                                        <p:strVal val="visible"/>
+                                      </p:to>
+                                    </p:set>
+                                    <p:animEffect transition="in" filter="dissolve">
+                                      <p:cBhvr>
+                                        <p:cTn id="15" dur="500"/>
+                                        <p:tgtEl>
+                                          <p:spTgt spid="3">
+                                            <p:txEl>
+                                              <p:pRg st="2" end="2"/>
+                                            </p:txEl>
+                                          </p:spTgt>
+                                        </p:tgtEl>
+                                      </p:cBhvr>
+                                    </p:animEffect>
+                                  </p:childTnLst>
+                                </p:cTn>
+                              </p:par>
+                            </p:childTnLst>
+                          </p:cTn>
+                        </p:par>
+                      </p:childTnLst>
+                    </p:cTn>
+                  </p:par>
+                  <p:par>
+                    <p:cTn id="16" fill="hold">
+                      <p:stCondLst>
+                        <p:cond delay="indefinite"/>
+                      </p:stCondLst>
+                      <p:childTnLst>
+                        <p:par>
+                          <p:cTn id="17" fill="hold">
+                            <p:stCondLst>
+                              <p:cond delay="0"/>
+                            </p:stCondLst>
+                            <p:childTnLst>
+                              <p:par>
+                                <p:cTn id="18" presetID="9" presetClass="entr" presetSubtype="0" fill="hold" grpId="0" nodeType="clickEffect">
+                                  <p:stCondLst>
+                                    <p:cond delay="0"/>
+                                  </p:stCondLst>
+                                  <p:childTnLst>
+                                    <p:set>
+                                      <p:cBhvr>
+                                        <p:cTn id="19" dur="1" fill="hold">
+                                          <p:stCondLst>
+                                            <p:cond delay="0"/>
+                                          </p:stCondLst>
+                                        </p:cTn>
+                                        <p:tgtEl>
+                                          <p:spTgt spid="3">
+                                            <p:txEl>
+                                              <p:pRg st="3" end="3"/>
+                                            </p:txEl>
+                                          </p:spTgt>
+                                        </p:tgtEl>
+                                        <p:attrNameLst>
+                                          <p:attrName>style.visibility</p:attrName>
+                                        </p:attrNameLst>
+                                      </p:cBhvr>
+                                      <p:to>
+                                        <p:strVal val="visible"/>
+                                      </p:to>
+                                    </p:set>
+                                    <p:animEffect transition="in" filter="dissolve">
+                                      <p:cBhvr>
+                                        <p:cTn id="20" dur="500"/>
+                                        <p:tgtEl>
+                                          <p:spTgt spid="3">
+                                            <p:txEl>
+                                              <p:pRg st="3" end="3"/>
+                                            </p:txEl>
+                                          </p:spTgt>
+                                        </p:tgtEl>
+                                      </p:cBhvr>
+                                    </p:animEffect>
+                                  </p:childTnLst>
+                                </p:cTn>
+                              </p:par>
+                              <p:par>
+                                <p:cTn id="21" presetID="9" presetClass="entr" presetSubtype="0" fill="hold" grpId="0" nodeType="withEffect">
+                                  <p:stCondLst>
+                                    <p:cond delay="0"/>
+                                  </p:stCondLst>
+                                  <p:childTnLst>
+                                    <p:set>
+                                      <p:cBhvr>
+                                        <p:cTn id="22" dur="1" fill="hold">
+                                          <p:stCondLst>
+                                            <p:cond delay="0"/>
+                                          </p:stCondLst>
+                                        </p:cTn>
+                                        <p:tgtEl>
+                                          <p:spTgt spid="3">
+                                            <p:txEl>
+                                              <p:pRg st="4" end="4"/>
+                                            </p:txEl>
+                                          </p:spTgt>
+                                        </p:tgtEl>
+                                        <p:attrNameLst>
+                                          <p:attrName>style.visibility</p:attrName>
+                                        </p:attrNameLst>
+                                      </p:cBhvr>
+                                      <p:to>
+                                        <p:strVal val="visible"/>
+                                      </p:to>
+                                    </p:set>
+                                    <p:animEffect transition="in" filter="dissolve">
+                                      <p:cBhvr>
+                                        <p:cTn id="23" dur="500"/>
+                                        <p:tgtEl>
+                                          <p:spTgt spid="3">
+                                            <p:txEl>
+                                              <p:pRg st="4" end="4"/>
+                                            </p:txEl>
+                                          </p:spTgt>
+                                        </p:tgtEl>
+                                      </p:cBhvr>
+                                    </p:animEffect>
+                                  </p:childTnLst>
+                                </p:cTn>
+                              </p:par>
+                              <p:par>
+                                <p:cTn id="24" presetID="9" presetClass="entr" presetSubtype="0" fill="hold" grpId="0" nodeType="withEffect">
+                                  <p:stCondLst>
+                                    <p:cond delay="0"/>
+                                  </p:stCondLst>
+                                  <p:childTnLst>
+                                    <p:set>
+                                      <p:cBhvr>
+                                        <p:cTn id="25" dur="1" fill="hold">
+                                          <p:stCondLst>
+                                            <p:cond delay="0"/>
+                                          </p:stCondLst>
+                                        </p:cTn>
+                                        <p:tgtEl>
+                                          <p:spTgt spid="3">
+                                            <p:txEl>
+                                              <p:pRg st="5" end="5"/>
+                                            </p:txEl>
+                                          </p:spTgt>
+                                        </p:tgtEl>
+                                        <p:attrNameLst>
+                                          <p:attrName>style.visibility</p:attrName>
+                                        </p:attrNameLst>
+                                      </p:cBhvr>
+                                      <p:to>
+                                        <p:strVal val="visible"/>
+                                      </p:to>
+                                    </p:set>
+                                    <p:animEffect transition="in" filter="dissolve">
+                                      <p:cBhvr>
+                                        <p:cTn id="26" dur="500"/>
+                                        <p:tgtEl>
+                                          <p:spTgt spid="3">
+                                            <p:txEl>
+                                              <p:pRg st="5" end="5"/>
+                                            </p:txEl>
+                                          </p:spTgt>
+                                        </p:tgtEl>
+                                      </p:cBhvr>
+                                    </p:animEffect>
+                                  </p:childTnLst>
+                                </p:cTn>
+                              </p:par>
+                            </p:childTnLst>
+                          </p:cTn>
+                        </p:par>
+                      </p:childTnLst>
+                    </p:cTn>
+                  </p:par>
+                  <p:par>
+                    <p:cTn id="27" fill="hold">
+                      <p:stCondLst>
+                        <p:cond delay="indefinite"/>
+                      </p:stCondLst>
+                      <p:childTnLst>
+                        <p:par>
+                          <p:cTn id="28" fill="hold">
+                            <p:stCondLst>
+                              <p:cond delay="0"/>
+                            </p:stCondLst>
+                            <p:childTnLst>
+                              <p:par>
+                                <p:cTn id="29" presetID="22" presetClass="entr" presetSubtype="8" fill="hold" grpId="0" nodeType="clickEffect">
+                                  <p:stCondLst>
+                                    <p:cond delay="0"/>
+                                  </p:stCondLst>
+                                  <p:childTnLst>
+                                    <p:set>
+                                      <p:cBhvr>
+                                        <p:cTn id="30" dur="1" fill="hold">
+                                          <p:stCondLst>
+                                            <p:cond delay="0"/>
+                                          </p:stCondLst>
+                                        </p:cTn>
+                                        <p:tgtEl>
+                                          <p:spTgt spid="7"/>
+                                        </p:tgtEl>
+                                        <p:attrNameLst>
+                                          <p:attrName>style.visibility</p:attrName>
+                                        </p:attrNameLst>
+                                      </p:cBhvr>
+                                      <p:to>
+                                        <p:strVal val="visible"/>
+                                      </p:to>
+                                    </p:set>
+                                    <p:animEffect transition="in" filter="wipe(left)">
+                                      <p:cBhvr>
+                                        <p:cTn id="31" dur="1000"/>
+                                        <p:tgtEl>
+                                          <p:spTgt spid="7"/>
+                                        </p:tgtEl>
+                                      </p:cBhvr>
+                                    </p:animEffect>
+                                  </p:childTnLst>
+                                </p:cTn>
+                              </p:par>
+                            </p:childTnLst>
+                          </p:cTn>
+                        </p:par>
+                      </p:childTnLst>
+                    </p:cTn>
+                  </p:par>
+                  <p:par>
+                    <p:cTn id="32" fill="hold">
+                      <p:stCondLst>
+                        <p:cond delay="indefinite"/>
+                      </p:stCondLst>
+                      <p:childTnLst>
+                        <p:par>
+                          <p:cTn id="33" fill="hold">
+                            <p:stCondLst>
+                              <p:cond delay="0"/>
+                            </p:stCondLst>
+                            <p:childTnLst>
+                              <p:par>
+                                <p:cTn id="34" presetID="22" presetClass="entr" presetSubtype="8" fill="hold" grpId="0" nodeType="clickEffect">
+                                  <p:stCondLst>
+                                    <p:cond delay="0"/>
+                                  </p:stCondLst>
+                                  <p:childTnLst>
+                                    <p:set>
+                                      <p:cBhvr>
+                                        <p:cTn id="35" dur="1" fill="hold">
+                                          <p:stCondLst>
+                                            <p:cond delay="0"/>
+                                          </p:stCondLst>
+                                        </p:cTn>
+                                        <p:tgtEl>
+                                          <p:spTgt spid="8"/>
+                                        </p:tgtEl>
+                                        <p:attrNameLst>
+                                          <p:attrName>style.visibility</p:attrName>
+                                        </p:attrNameLst>
+                                      </p:cBhvr>
+                                      <p:to>
+                                        <p:strVal val="visible"/>
+                                      </p:to>
+                                    </p:set>
+                                    <p:animEffect transition="in" filter="wipe(left)">
+                                      <p:cBhvr>
+                                        <p:cTn id="36" dur="1000"/>
+                                        <p:tgtEl>
+                                          <p:spTgt spid="8"/>
+                                        </p:tgtEl>
+                                      </p:cBhvr>
+                                    </p:animEffect>
+                                  </p:childTnLst>
+                                </p:cTn>
+                              </p:par>
+                            </p:childTnLst>
+                          </p:cTn>
+                        </p:par>
+                      </p:childTnLst>
+                    </p:cTn>
+                  </p:par>
+                </p:childTnLst>
+              </p:cTn>
+              <p:prevCondLst>
+                <p:cond evt="onPrev" delay="0">
+                  <p:tgtEl>
+                    <p:sldTgt/>
+                  </p:tgtEl>
+                </p:cond>
+              </p:prevCondLst>
+              <p:nextCondLst>
+                <p:cond evt="onNext" delay="0">
+                  <p:tgtEl>
+                    <p:sldTgt/>
+                  </p:tgtEl>
+                </p:cond>
+              </p:nextCondLst>
+            </p:seq>
+          </p:childTnLst>
+        </p:cTn>
+      </p:par>
+    </p:tnLst>
+    <p:bldLst>
+      <p:bldP spid="3" grpId="0" build="p"/>
+      <p:bldP spid="8" grpId="0" animBg="1"/>
+      <p:bldP spid="7" grpId="0" animBg="1"/>
+    </p:bldLst>
+  </p:timing>
 </p:sld>
 </file>
 

</xml_diff>

<commit_message>
Added Requests slide with example GET from Meraki
</commit_message>
<xml_diff>
--- a/curl-requests-foundations.pptx
+++ b/curl-requests-foundations.pptx
@@ -5,7 +5,7 @@
     <p:sldMasterId id="2147483660" r:id="rId1"/>
   </p:sldMasterIdLst>
   <p:notesMasterIdLst>
-    <p:notesMasterId r:id="rId54"/>
+    <p:notesMasterId r:id="rId52"/>
   </p:notesMasterIdLst>
   <p:sldIdLst>
     <p:sldId id="256" r:id="rId2"/>
@@ -46,20 +46,18 @@
     <p:sldId id="368" r:id="rId37"/>
     <p:sldId id="377" r:id="rId38"/>
     <p:sldId id="372" r:id="rId39"/>
-    <p:sldId id="373" r:id="rId40"/>
-    <p:sldId id="374" r:id="rId41"/>
-    <p:sldId id="375" r:id="rId42"/>
-    <p:sldId id="376" r:id="rId43"/>
-    <p:sldId id="322" r:id="rId44"/>
-    <p:sldId id="329" r:id="rId45"/>
-    <p:sldId id="330" r:id="rId46"/>
-    <p:sldId id="328" r:id="rId47"/>
-    <p:sldId id="333" r:id="rId48"/>
-    <p:sldId id="334" r:id="rId49"/>
-    <p:sldId id="335" r:id="rId50"/>
-    <p:sldId id="311" r:id="rId51"/>
-    <p:sldId id="321" r:id="rId52"/>
-    <p:sldId id="280" r:id="rId53"/>
+    <p:sldId id="375" r:id="rId40"/>
+    <p:sldId id="376" r:id="rId41"/>
+    <p:sldId id="322" r:id="rId42"/>
+    <p:sldId id="329" r:id="rId43"/>
+    <p:sldId id="330" r:id="rId44"/>
+    <p:sldId id="328" r:id="rId45"/>
+    <p:sldId id="333" r:id="rId46"/>
+    <p:sldId id="334" r:id="rId47"/>
+    <p:sldId id="335" r:id="rId48"/>
+    <p:sldId id="311" r:id="rId49"/>
+    <p:sldId id="321" r:id="rId50"/>
+    <p:sldId id="280" r:id="rId51"/>
   </p:sldIdLst>
   <p:sldSz cx="12192000" cy="6858000"/>
   <p:notesSz cx="6858000" cy="9144000"/>
@@ -259,7 +257,7 @@
           <a:p>
             <a:fld id="{966F6F5D-167E-1849-B841-EB0817BB385A}" type="datetimeFigureOut">
               <a:rPr lang="en-US" smtClean="0"/>
-              <a:t>4/11/20</a:t>
+              <a:t>4/12/20</a:t>
             </a:fld>
             <a:endParaRPr lang="en-US"/>
           </a:p>
@@ -1933,6 +1931,16 @@
               <a:t>// TODO</a:t>
             </a:r>
           </a:p>
+          <a:p>
+            <a:pPr marL="171450" indent="-171450">
+              <a:buFont typeface="Arial" panose="020B0604020202020204" pitchFamily="34" charset="0"/>
+              <a:buChar char="•"/>
+            </a:pPr>
+            <a:r>
+              <a:rPr lang="en-US" b="0" i="0" dirty="0"/>
+              <a:t>Import the Python Requests module</a:t>
+            </a:r>
+          </a:p>
         </p:txBody>
       </p:sp>
       <p:sp>
@@ -2107,6 +2115,44 @@
               <a:t>// TODO</a:t>
             </a:r>
           </a:p>
+          <a:p>
+            <a:pPr marL="171450" indent="-171450">
+              <a:buFont typeface="Arial" panose="020B0604020202020204" pitchFamily="34" charset="0"/>
+              <a:buChar char="•"/>
+            </a:pPr>
+            <a:r>
+              <a:rPr lang="en-US" b="0" i="0" dirty="0"/>
+              <a:t>The container has pre-configured environment variables which store Cisco </a:t>
+            </a:r>
+            <a:r>
+              <a:rPr lang="en-US" b="0" i="0" dirty="0" err="1"/>
+              <a:t>DevNet</a:t>
+            </a:r>
+            <a:r>
+              <a:rPr lang="en-US" b="0" i="0" dirty="0"/>
+              <a:t> sandbox DNAC API credentials</a:t>
+            </a:r>
+          </a:p>
+          <a:p>
+            <a:pPr marL="171450" indent="-171450">
+              <a:buFont typeface="Arial" panose="020B0604020202020204" pitchFamily="34" charset="0"/>
+              <a:buChar char="•"/>
+            </a:pPr>
+            <a:r>
+              <a:rPr lang="en-US" b="0" i="0" dirty="0"/>
+              <a:t>The Python OS module can access environment variables in the container or other underlying OS</a:t>
+            </a:r>
+          </a:p>
+          <a:p>
+            <a:pPr marL="171450" indent="-171450">
+              <a:buFont typeface="Arial" panose="020B0604020202020204" pitchFamily="34" charset="0"/>
+              <a:buChar char="•"/>
+            </a:pPr>
+            <a:r>
+              <a:rPr lang="en-US" b="0" i="0" dirty="0"/>
+              <a:t>HTTP Basic auth requires uses a Python tuple object with username and password sent as the keyword argument ‘auth’</a:t>
+            </a:r>
+          </a:p>
         </p:txBody>
       </p:sp>
       <p:sp>
@@ -2201,7 +2247,15 @@
             </a:pPr>
             <a:r>
               <a:rPr lang="en-US" b="0" i="0" dirty="0"/>
-              <a:t>Omitted the -X option</a:t>
+              <a:t>Importing the </a:t>
+            </a:r>
+            <a:r>
+              <a:rPr lang="en-US" b="0" i="0" dirty="0" err="1"/>
+              <a:t>pprint</a:t>
+            </a:r>
+            <a:r>
+              <a:rPr lang="en-US" b="0" i="0" dirty="0"/>
+              <a:t> module to print the JSON response in a more friendly format</a:t>
             </a:r>
           </a:p>
           <a:p>
@@ -2211,7 +2265,35 @@
             </a:pPr>
             <a:r>
               <a:rPr lang="en-US" b="0" i="0" dirty="0"/>
-              <a:t>The server will return a HTTP ‘302 Found’ message and a message about redirection in the body but not the information we requested</a:t>
+              <a:t>Use the Meraki API key stored as a container environment variable</a:t>
+            </a:r>
+          </a:p>
+          <a:p>
+            <a:pPr marL="171450" indent="-171450">
+              <a:buFont typeface="Arial" panose="020B0604020202020204" pitchFamily="34" charset="0"/>
+              <a:buChar char="•"/>
+            </a:pPr>
+            <a:r>
+              <a:rPr lang="en-US" b="0" i="0" dirty="0"/>
+              <a:t>Use the native JSON response object to display</a:t>
+            </a:r>
+          </a:p>
+          <a:p>
+            <a:pPr marL="171450" indent="-171450">
+              <a:buFont typeface="Arial" panose="020B0604020202020204" pitchFamily="34" charset="0"/>
+              <a:buChar char="•"/>
+            </a:pPr>
+            <a:r>
+              <a:rPr lang="en-US" b="0" i="0" dirty="0"/>
+              <a:t>Notice that, in contrast to </a:t>
+            </a:r>
+            <a:r>
+              <a:rPr lang="en-US" b="0" i="0" dirty="0" err="1"/>
+              <a:t>cURL</a:t>
+            </a:r>
+            <a:r>
+              <a:rPr lang="en-US" b="0" i="0" dirty="0"/>
+              <a:t>, Python Requests automatically follows redirects</a:t>
             </a:r>
           </a:p>
         </p:txBody>
@@ -2242,7 +2324,7 @@
     </p:spTree>
     <p:extLst>
       <p:ext uri="{BB962C8B-B14F-4D97-AF65-F5344CB8AC3E}">
-        <p14:creationId xmlns:p14="http://schemas.microsoft.com/office/powerpoint/2010/main" val="282347769"/>
+        <p14:creationId xmlns:p14="http://schemas.microsoft.com/office/powerpoint/2010/main" val="3127940262"/>
       </p:ext>
     </p:extLst>
   </p:cSld>
@@ -2296,27 +2378,26 @@
           <a:bodyPr/>
           <a:lstStyle/>
           <a:p>
-            <a:r>
-              <a:rPr lang="en-US" b="0" i="0" dirty="0"/>
+            <a:pPr marL="0" marR="0" lvl="0" indent="0" algn="l" defTabSz="914400" rtl="0" eaLnBrk="1" fontAlgn="auto" latinLnBrk="0" hangingPunct="1">
+              <a:lnSpc>
+                <a:spcPct val="100000"/>
+              </a:lnSpc>
+              <a:spcBef>
+                <a:spcPts val="0"/>
+              </a:spcBef>
+              <a:spcAft>
+                <a:spcPts val="0"/>
+              </a:spcAft>
+              <a:buClrTx/>
+              <a:buSzTx/>
+              <a:buFontTx/>
+              <a:buNone/>
+              <a:tabLst/>
+              <a:defRPr/>
+            </a:pPr>
+            <a:r>
+              <a:rPr lang="en-US" dirty="0"/>
               <a:t>// TODO</a:t>
-            </a:r>
-          </a:p>
-          <a:p>
-            <a:pPr marL="171450" indent="-171450">
-              <a:buFont typeface="Arial" panose="020B0604020202020204" pitchFamily="34" charset="0"/>
-              <a:buChar char="•"/>
-            </a:pPr>
-            <a:r>
-              <a:rPr lang="en-US" b="0" i="0" dirty="0"/>
-              <a:t>Adding the -L option returns a 200 OK because </a:t>
-            </a:r>
-            <a:r>
-              <a:rPr lang="en-US" b="0" i="0" dirty="0" err="1"/>
-              <a:t>cURL</a:t>
-            </a:r>
-            <a:r>
-              <a:rPr lang="en-US" b="0" i="0" dirty="0"/>
-              <a:t> can follow redirects</a:t>
             </a:r>
           </a:p>
         </p:txBody>
@@ -2347,7 +2428,7 @@
     </p:spTree>
     <p:extLst>
       <p:ext uri="{BB962C8B-B14F-4D97-AF65-F5344CB8AC3E}">
-        <p14:creationId xmlns:p14="http://schemas.microsoft.com/office/powerpoint/2010/main" val="3127940262"/>
+        <p14:creationId xmlns:p14="http://schemas.microsoft.com/office/powerpoint/2010/main" val="2058049328"/>
       </p:ext>
     </p:extLst>
   </p:cSld>
@@ -2451,7 +2532,7 @@
     </p:spTree>
     <p:extLst>
       <p:ext uri="{BB962C8B-B14F-4D97-AF65-F5344CB8AC3E}">
-        <p14:creationId xmlns:p14="http://schemas.microsoft.com/office/powerpoint/2010/main" val="2058049328"/>
+        <p14:creationId xmlns:p14="http://schemas.microsoft.com/office/powerpoint/2010/main" val="3481472389"/>
       </p:ext>
     </p:extLst>
   </p:cSld>
@@ -2555,7 +2636,7 @@
     </p:spTree>
     <p:extLst>
       <p:ext uri="{BB962C8B-B14F-4D97-AF65-F5344CB8AC3E}">
-        <p14:creationId xmlns:p14="http://schemas.microsoft.com/office/powerpoint/2010/main" val="3481472389"/>
+        <p14:creationId xmlns:p14="http://schemas.microsoft.com/office/powerpoint/2010/main" val="3252389655"/>
       </p:ext>
     </p:extLst>
   </p:cSld>
@@ -2659,7 +2740,7 @@
     </p:spTree>
     <p:extLst>
       <p:ext uri="{BB962C8B-B14F-4D97-AF65-F5344CB8AC3E}">
-        <p14:creationId xmlns:p14="http://schemas.microsoft.com/office/powerpoint/2010/main" val="3252389655"/>
+        <p14:creationId xmlns:p14="http://schemas.microsoft.com/office/powerpoint/2010/main" val="4152409612"/>
       </p:ext>
     </p:extLst>
   </p:cSld>
@@ -2899,110 +2980,6 @@
     <p:extLst>
       <p:ext uri="{BB962C8B-B14F-4D97-AF65-F5344CB8AC3E}">
         <p14:creationId xmlns:p14="http://schemas.microsoft.com/office/powerpoint/2010/main" val="3892212133"/>
-      </p:ext>
-    </p:extLst>
-  </p:cSld>
-  <p:clrMapOvr>
-    <a:masterClrMapping/>
-  </p:clrMapOvr>
-</p:notes>
-</file>
-
-<file path=ppt/notesSlides/notesSlide30.xml><?xml version="1.0" encoding="utf-8"?>
-<p:notes xmlns:a="http://schemas.openxmlformats.org/drawingml/2006/main" xmlns:r="http://schemas.openxmlformats.org/officeDocument/2006/relationships" xmlns:p="http://schemas.openxmlformats.org/presentationml/2006/main">
-  <p:cSld>
-    <p:spTree>
-      <p:nvGrpSpPr>
-        <p:cNvPr id="1" name=""/>
-        <p:cNvGrpSpPr/>
-        <p:nvPr/>
-      </p:nvGrpSpPr>
-      <p:grpSpPr>
-        <a:xfrm>
-          <a:off x="0" y="0"/>
-          <a:ext cx="0" cy="0"/>
-          <a:chOff x="0" y="0"/>
-          <a:chExt cx="0" cy="0"/>
-        </a:xfrm>
-      </p:grpSpPr>
-      <p:sp>
-        <p:nvSpPr>
-          <p:cNvPr id="2" name="Slide Image Placeholder 1"/>
-          <p:cNvSpPr>
-            <a:spLocks noGrp="1" noRot="1" noChangeAspect="1"/>
-          </p:cNvSpPr>
-          <p:nvPr>
-            <p:ph type="sldImg"/>
-          </p:nvPr>
-        </p:nvSpPr>
-        <p:spPr/>
-      </p:sp>
-      <p:sp>
-        <p:nvSpPr>
-          <p:cNvPr id="3" name="Notes Placeholder 2"/>
-          <p:cNvSpPr>
-            <a:spLocks noGrp="1"/>
-          </p:cNvSpPr>
-          <p:nvPr>
-            <p:ph type="body" idx="1"/>
-          </p:nvPr>
-        </p:nvSpPr>
-        <p:spPr/>
-        <p:txBody>
-          <a:bodyPr/>
-          <a:lstStyle/>
-          <a:p>
-            <a:pPr marL="0" marR="0" lvl="0" indent="0" algn="l" defTabSz="914400" rtl="0" eaLnBrk="1" fontAlgn="auto" latinLnBrk="0" hangingPunct="1">
-              <a:lnSpc>
-                <a:spcPct val="100000"/>
-              </a:lnSpc>
-              <a:spcBef>
-                <a:spcPts val="0"/>
-              </a:spcBef>
-              <a:spcAft>
-                <a:spcPts val="0"/>
-              </a:spcAft>
-              <a:buClrTx/>
-              <a:buSzTx/>
-              <a:buFontTx/>
-              <a:buNone/>
-              <a:tabLst/>
-              <a:defRPr/>
-            </a:pPr>
-            <a:r>
-              <a:rPr lang="en-US" dirty="0"/>
-              <a:t>// TODO</a:t>
-            </a:r>
-          </a:p>
-        </p:txBody>
-      </p:sp>
-      <p:sp>
-        <p:nvSpPr>
-          <p:cNvPr id="4" name="Slide Number Placeholder 3"/>
-          <p:cNvSpPr>
-            <a:spLocks noGrp="1"/>
-          </p:cNvSpPr>
-          <p:nvPr>
-            <p:ph type="sldNum" sz="quarter" idx="5"/>
-          </p:nvPr>
-        </p:nvSpPr>
-        <p:spPr/>
-        <p:txBody>
-          <a:bodyPr/>
-          <a:lstStyle/>
-          <a:p>
-            <a:fld id="{020CF8D1-BA82-5045-ACF9-1AA42AD6A519}" type="slidenum">
-              <a:rPr lang="en-US" smtClean="0"/>
-              <a:t>49</a:t>
-            </a:fld>
-            <a:endParaRPr lang="en-US"/>
-          </a:p>
-        </p:txBody>
-      </p:sp>
-    </p:spTree>
-    <p:extLst>
-      <p:ext uri="{BB962C8B-B14F-4D97-AF65-F5344CB8AC3E}">
-        <p14:creationId xmlns:p14="http://schemas.microsoft.com/office/powerpoint/2010/main" val="4152409612"/>
       </p:ext>
     </p:extLst>
   </p:cSld>
@@ -14488,7 +14465,15 @@
           <a:p>
             <a:r>
               <a:rPr lang="en-US" sz="2400" dirty="0"/>
-              <a:t>Include a header to indicate we will only accept any response format</a:t>
+              <a:t>Include a header to indicate we </a:t>
+            </a:r>
+            <a:r>
+              <a:rPr lang="en-US" sz="2400"/>
+              <a:t>will accept </a:t>
+            </a:r>
+            <a:r>
+              <a:rPr lang="en-US" sz="2400" dirty="0"/>
+              <a:t>any response format</a:t>
             </a:r>
           </a:p>
           <a:p>
@@ -26221,7 +26206,12 @@
             <p:ph idx="1"/>
           </p:nvPr>
         </p:nvSpPr>
-        <p:spPr/>
+        <p:spPr>
+          <a:xfrm>
+            <a:off x="838200" y="1825625"/>
+            <a:ext cx="10515600" cy="4667250"/>
+          </a:xfrm>
+        </p:spPr>
         <p:txBody>
           <a:bodyPr>
             <a:normAutofit/>
@@ -26237,7 +26227,7 @@
                   <a:srgbClr val="FFFF00"/>
                 </a:solidFill>
               </a:rPr>
-              <a:t>curl --</a:t>
+              <a:t>from </a:t>
             </a:r>
             <a:r>
               <a:rPr lang="en-US" sz="2400" b="1" i="1" dirty="0" err="1">
@@ -26245,7 +26235,7 @@
                   <a:srgbClr val="FFFF00"/>
                 </a:solidFill>
               </a:rPr>
-              <a:t>url</a:t>
+              <a:t>pprint</a:t>
             </a:r>
             <a:r>
               <a:rPr lang="en-US" sz="2400" b="1" i="1" dirty="0">
@@ -26253,7 +26243,7 @@
                   <a:srgbClr val="FFFF00"/>
                 </a:solidFill>
               </a:rPr>
-              <a:t> https://</a:t>
+              <a:t> import </a:t>
             </a:r>
             <a:r>
               <a:rPr lang="en-US" sz="2400" b="1" i="1" dirty="0" err="1">
@@ -26261,65 +26251,7 @@
                   <a:srgbClr val="FFFF00"/>
                 </a:solidFill>
               </a:rPr>
-              <a:t>api.meraki.com</a:t>
-            </a:r>
-            <a:r>
-              <a:rPr lang="en-US" sz="2400" b="1" i="1" dirty="0">
-                <a:solidFill>
-                  <a:srgbClr val="FFFF00"/>
-                </a:solidFill>
-              </a:rPr>
-              <a:t>/</a:t>
-            </a:r>
-            <a:r>
-              <a:rPr lang="en-US" sz="2400" b="1" i="1" dirty="0" err="1">
-                <a:solidFill>
-                  <a:srgbClr val="FFFF00"/>
-                </a:solidFill>
-              </a:rPr>
-              <a:t>api</a:t>
-            </a:r>
-            <a:r>
-              <a:rPr lang="en-US" sz="2400" b="1" i="1" dirty="0">
-                <a:solidFill>
-                  <a:srgbClr val="FFFF00"/>
-                </a:solidFill>
-              </a:rPr>
-              <a:t>/v0/organizations \</a:t>
-            </a:r>
-          </a:p>
-          <a:p>
-            <a:pPr marL="0" indent="0">
-              <a:buNone/>
-            </a:pPr>
-            <a:r>
-              <a:rPr lang="en-US" sz="2400" b="1" i="1" dirty="0">
-                <a:solidFill>
-                  <a:srgbClr val="FFFF00"/>
-                </a:solidFill>
-              </a:rPr>
-              <a:t>-H X-Cisco-Meraki-API-Key:$MERAKI_API_KEY \</a:t>
-            </a:r>
-          </a:p>
-          <a:p>
-            <a:pPr marL="0" indent="0">
-              <a:buNone/>
-            </a:pPr>
-            <a:r>
-              <a:rPr lang="en-US" sz="2400" b="1" i="1" dirty="0">
-                <a:solidFill>
-                  <a:srgbClr val="FFFF00"/>
-                </a:solidFill>
-              </a:rPr>
-              <a:t>-H 'Accept: */*' -</a:t>
-            </a:r>
-            <a:r>
-              <a:rPr lang="en-US" sz="2400" b="1" i="1" dirty="0" err="1">
-                <a:solidFill>
-                  <a:srgbClr val="FFFF00"/>
-                </a:solidFill>
-              </a:rPr>
-              <a:t>i</a:t>
+              <a:t>pprint</a:t>
             </a:r>
             <a:endParaRPr lang="en-US" sz="2400" b="1" i="1" dirty="0">
               <a:solidFill>
@@ -26328,53 +26260,365 @@
             </a:endParaRPr>
           </a:p>
           <a:p>
+            <a:pPr marL="0" indent="0">
+              <a:buNone/>
+            </a:pPr>
+            <a:r>
+              <a:rPr lang="en-US" sz="2400" b="1" i="1" dirty="0" err="1">
+                <a:solidFill>
+                  <a:srgbClr val="FFFF00"/>
+                </a:solidFill>
+              </a:rPr>
+              <a:t>req_url</a:t>
+            </a:r>
+            <a:r>
+              <a:rPr lang="en-US" sz="2400" b="1" i="1" dirty="0">
+                <a:solidFill>
+                  <a:srgbClr val="FFFF00"/>
+                </a:solidFill>
+              </a:rPr>
+              <a:t> = 'https://</a:t>
+            </a:r>
+            <a:r>
+              <a:rPr lang="en-US" sz="2400" b="1" i="1" dirty="0" err="1">
+                <a:solidFill>
+                  <a:srgbClr val="FFFF00"/>
+                </a:solidFill>
+              </a:rPr>
+              <a:t>api.meraki.com</a:t>
+            </a:r>
+            <a:r>
+              <a:rPr lang="en-US" sz="2400" b="1" i="1" dirty="0">
+                <a:solidFill>
+                  <a:srgbClr val="FFFF00"/>
+                </a:solidFill>
+              </a:rPr>
+              <a:t>/</a:t>
+            </a:r>
+            <a:r>
+              <a:rPr lang="en-US" sz="2400" b="1" i="1" dirty="0" err="1">
+                <a:solidFill>
+                  <a:srgbClr val="FFFF00"/>
+                </a:solidFill>
+              </a:rPr>
+              <a:t>api</a:t>
+            </a:r>
+            <a:r>
+              <a:rPr lang="en-US" sz="2400" b="1" i="1" dirty="0">
+                <a:solidFill>
+                  <a:srgbClr val="FFFF00"/>
+                </a:solidFill>
+              </a:rPr>
+              <a:t>/v0/organizations'</a:t>
+            </a:r>
+          </a:p>
+          <a:p>
+            <a:pPr marL="0" indent="0">
+              <a:buNone/>
+            </a:pPr>
+            <a:r>
+              <a:rPr lang="en-US" sz="2400" b="1" i="1" dirty="0" err="1">
+                <a:solidFill>
+                  <a:srgbClr val="FFFF00"/>
+                </a:solidFill>
+              </a:rPr>
+              <a:t>req_headers</a:t>
+            </a:r>
+            <a:r>
+              <a:rPr lang="en-US" sz="2400" b="1" i="1" dirty="0">
+                <a:solidFill>
+                  <a:srgbClr val="FFFF00"/>
+                </a:solidFill>
+              </a:rPr>
+              <a:t> = {'X-Cisco-Meraki-API-Key':</a:t>
+            </a:r>
+            <a:r>
+              <a:rPr lang="en-US" sz="2400" b="1" i="1" dirty="0" err="1">
+                <a:solidFill>
+                  <a:srgbClr val="FFFF00"/>
+                </a:solidFill>
+              </a:rPr>
+              <a:t>os.getenv</a:t>
+            </a:r>
+            <a:r>
+              <a:rPr lang="en-US" sz="2400" b="1" i="1" dirty="0">
+                <a:solidFill>
+                  <a:srgbClr val="FFFF00"/>
+                </a:solidFill>
+              </a:rPr>
+              <a:t>('MERAKI_API_KEY')}</a:t>
+            </a:r>
+          </a:p>
+          <a:p>
+            <a:pPr marL="0" indent="0">
+              <a:buNone/>
+            </a:pPr>
+            <a:r>
+              <a:rPr lang="en-US" sz="2400" b="1" i="1" dirty="0">
+                <a:solidFill>
+                  <a:srgbClr val="FFFF00"/>
+                </a:solidFill>
+              </a:rPr>
+              <a:t>response = </a:t>
+            </a:r>
+            <a:r>
+              <a:rPr lang="en-US" sz="2400" b="1" i="1" dirty="0" err="1">
+                <a:solidFill>
+                  <a:srgbClr val="FFFF00"/>
+                </a:solidFill>
+              </a:rPr>
+              <a:t>requests.get</a:t>
+            </a:r>
+            <a:r>
+              <a:rPr lang="en-US" sz="2400" b="1" i="1" dirty="0">
+                <a:solidFill>
+                  <a:srgbClr val="FFFF00"/>
+                </a:solidFill>
+              </a:rPr>
+              <a:t>(</a:t>
+            </a:r>
+            <a:r>
+              <a:rPr lang="en-US" sz="2400" b="1" i="1" dirty="0" err="1">
+                <a:solidFill>
+                  <a:srgbClr val="FFFF00"/>
+                </a:solidFill>
+              </a:rPr>
+              <a:t>req_url</a:t>
+            </a:r>
+            <a:r>
+              <a:rPr lang="en-US" sz="2400" b="1" i="1" dirty="0">
+                <a:solidFill>
+                  <a:srgbClr val="FFFF00"/>
+                </a:solidFill>
+              </a:rPr>
+              <a:t>, headers=</a:t>
+            </a:r>
+            <a:r>
+              <a:rPr lang="en-US" sz="2400" b="1" i="1" dirty="0" err="1">
+                <a:solidFill>
+                  <a:srgbClr val="FFFF00"/>
+                </a:solidFill>
+              </a:rPr>
+              <a:t>req_headers</a:t>
+            </a:r>
+            <a:r>
+              <a:rPr lang="en-US" sz="2400" b="1" i="1" dirty="0">
+                <a:solidFill>
+                  <a:srgbClr val="FFFF00"/>
+                </a:solidFill>
+              </a:rPr>
+              <a:t>)</a:t>
+            </a:r>
+          </a:p>
+          <a:p>
+            <a:pPr marL="0" indent="0">
+              <a:buNone/>
+            </a:pPr>
+            <a:r>
+              <a:rPr lang="en-US" sz="2400" b="1" i="1" dirty="0">
+                <a:solidFill>
+                  <a:srgbClr val="FFFF00"/>
+                </a:solidFill>
+              </a:rPr>
+              <a:t>print(f'{</a:t>
+            </a:r>
+            <a:r>
+              <a:rPr lang="en-US" sz="2400" b="1" i="1" dirty="0" err="1">
+                <a:solidFill>
+                  <a:srgbClr val="FFFF00"/>
+                </a:solidFill>
+              </a:rPr>
+              <a:t>response.status_code</a:t>
+            </a:r>
+            <a:r>
+              <a:rPr lang="en-US" sz="2400" b="1" i="1" dirty="0">
+                <a:solidFill>
+                  <a:srgbClr val="FFFF00"/>
+                </a:solidFill>
+              </a:rPr>
+              <a:t>} {</a:t>
+            </a:r>
+            <a:r>
+              <a:rPr lang="en-US" sz="2400" b="1" i="1" dirty="0" err="1">
+                <a:solidFill>
+                  <a:srgbClr val="FFFF00"/>
+                </a:solidFill>
+              </a:rPr>
+              <a:t>response.reason</a:t>
+            </a:r>
+            <a:r>
+              <a:rPr lang="en-US" sz="2400" b="1" i="1" dirty="0">
+                <a:solidFill>
+                  <a:srgbClr val="FFFF00"/>
+                </a:solidFill>
+              </a:rPr>
+              <a:t>}\n')</a:t>
+            </a:r>
+          </a:p>
+          <a:p>
+            <a:pPr marL="0" indent="0">
+              <a:buNone/>
+            </a:pPr>
+            <a:r>
+              <a:rPr lang="en-US" sz="2400" b="1" i="1" dirty="0" err="1">
+                <a:solidFill>
+                  <a:srgbClr val="FFFF00"/>
+                </a:solidFill>
+              </a:rPr>
+              <a:t>pprint</a:t>
+            </a:r>
+            <a:r>
+              <a:rPr lang="en-US" sz="2400" b="1" i="1" dirty="0">
+                <a:solidFill>
+                  <a:srgbClr val="FFFF00"/>
+                </a:solidFill>
+              </a:rPr>
+              <a:t>(</a:t>
+            </a:r>
+            <a:r>
+              <a:rPr lang="en-US" sz="2400" b="1" i="1" dirty="0" err="1">
+                <a:solidFill>
+                  <a:srgbClr val="FFFF00"/>
+                </a:solidFill>
+              </a:rPr>
+              <a:t>response.json</a:t>
+            </a:r>
+            <a:r>
+              <a:rPr lang="en-US" sz="2400" b="1" i="1" dirty="0">
+                <a:solidFill>
+                  <a:srgbClr val="FFFF00"/>
+                </a:solidFill>
+              </a:rPr>
+              <a:t>())</a:t>
+            </a:r>
+          </a:p>
+          <a:p>
             <a:r>
               <a:rPr lang="en-US" sz="2400" dirty="0"/>
-              <a:t>Send a GET request to https://</a:t>
+              <a:t>Import the </a:t>
             </a:r>
             <a:r>
               <a:rPr lang="en-US" sz="2400" dirty="0" err="1"/>
-              <a:t>api.meraki.com</a:t>
+              <a:t>pprint</a:t>
             </a:r>
             <a:r>
               <a:rPr lang="en-US" sz="2400" dirty="0"/>
-              <a:t>/</a:t>
-            </a:r>
-            <a:r>
-              <a:rPr lang="en-US" sz="2400" dirty="0" err="1"/>
-              <a:t>api</a:t>
-            </a:r>
+              <a:t> module &amp; update the URL for Meraki</a:t>
+            </a:r>
+          </a:p>
+          <a:p>
             <a:r>
               <a:rPr lang="en-US" sz="2400" dirty="0"/>
-              <a:t>/v0/organizations</a:t>
+              <a:t>Update the headers to include a Meraki API key</a:t>
             </a:r>
           </a:p>
           <a:p>
             <a:r>
               <a:rPr lang="en-US" sz="2400" dirty="0"/>
-              <a:t>Include a header to send an API key for authorization</a:t>
+              <a:t>Perform an HTTP GET and store the response object in a variable</a:t>
             </a:r>
           </a:p>
           <a:p>
             <a:r>
               <a:rPr lang="en-US" sz="2400" dirty="0"/>
-              <a:t>Include a header to indicate we will only accept any response format</a:t>
-            </a:r>
-          </a:p>
-          <a:p>
-            <a:r>
-              <a:rPr lang="en-US" sz="2400" dirty="0"/>
-              <a:t>Display the response headers in the terminal</a:t>
-            </a:r>
-          </a:p>
-        </p:txBody>
-      </p:sp>
-      <p:sp>
-        <p:nvSpPr>
-          <p:cNvPr id="11" name="Rectangle 10">
+              <a:t>Print the status code, reason, and JSON-formatted response to the terminal</a:t>
+            </a:r>
+          </a:p>
+        </p:txBody>
+      </p:sp>
+      <p:sp>
+        <p:nvSpPr>
+          <p:cNvPr id="2" name="Title 1">
             <a:extLst>
               <a:ext uri="{FF2B5EF4-FFF2-40B4-BE49-F238E27FC236}">
-                <a16:creationId xmlns:a16="http://schemas.microsoft.com/office/drawing/2014/main" id="{1100B6A1-8FC9-164E-B48D-5AEB1EF6BDB2}"/>
+                <a16:creationId xmlns:a16="http://schemas.microsoft.com/office/drawing/2014/main" id="{AC0D55DF-385E-9A4F-AB08-FEBC11990B8B}"/>
+              </a:ext>
+            </a:extLst>
+          </p:cNvPr>
+          <p:cNvSpPr>
+            <a:spLocks noGrp="1"/>
+          </p:cNvSpPr>
+          <p:nvPr>
+            <p:ph type="title"/>
+          </p:nvPr>
+        </p:nvSpPr>
+        <p:spPr/>
+        <p:txBody>
+          <a:bodyPr/>
+          <a:lstStyle/>
+          <a:p>
+            <a:r>
+              <a:rPr lang="en-US" dirty="0"/>
+              <a:t>Python Requests Code Examples</a:t>
+            </a:r>
+          </a:p>
+        </p:txBody>
+      </p:sp>
+      <p:sp>
+        <p:nvSpPr>
+          <p:cNvPr id="4" name="Date Placeholder 3">
+            <a:extLst>
+              <a:ext uri="{FF2B5EF4-FFF2-40B4-BE49-F238E27FC236}">
+                <a16:creationId xmlns:a16="http://schemas.microsoft.com/office/drawing/2014/main" id="{6E8781CE-B8A7-7540-B619-28D099093D8B}"/>
+              </a:ext>
+            </a:extLst>
+          </p:cNvPr>
+          <p:cNvSpPr>
+            <a:spLocks noGrp="1"/>
+          </p:cNvSpPr>
+          <p:nvPr>
+            <p:ph type="dt" sz="half" idx="10"/>
+          </p:nvPr>
+        </p:nvSpPr>
+        <p:spPr/>
+        <p:txBody>
+          <a:bodyPr/>
+          <a:lstStyle/>
+          <a:p>
+            <a:r>
+              <a:rPr lang="en-US"/>
+              <a:t>World Wide Technology ©</a:t>
+            </a:r>
+            <a:endParaRPr lang="en-US" dirty="0"/>
+          </a:p>
+        </p:txBody>
+      </p:sp>
+      <p:sp>
+        <p:nvSpPr>
+          <p:cNvPr id="5" name="Slide Number Placeholder 4">
+            <a:extLst>
+              <a:ext uri="{FF2B5EF4-FFF2-40B4-BE49-F238E27FC236}">
+                <a16:creationId xmlns:a16="http://schemas.microsoft.com/office/drawing/2014/main" id="{222BEAA2-2326-1F4D-9BCE-0FC3EC23B201}"/>
+              </a:ext>
+            </a:extLst>
+          </p:cNvPr>
+          <p:cNvSpPr>
+            <a:spLocks noGrp="1"/>
+          </p:cNvSpPr>
+          <p:nvPr>
+            <p:ph type="sldNum" sz="quarter" idx="12"/>
+          </p:nvPr>
+        </p:nvSpPr>
+        <p:spPr/>
+        <p:txBody>
+          <a:bodyPr/>
+          <a:lstStyle/>
+          <a:p>
+            <a:fld id="{A44B02FA-DD2D-1844-AE35-8B2EAB0CF4EF}" type="slidenum">
+              <a:rPr lang="en-US" smtClean="0"/>
+              <a:pPr/>
+              <a:t>39</a:t>
+            </a:fld>
+            <a:endParaRPr lang="en-US" dirty="0"/>
+          </a:p>
+        </p:txBody>
+      </p:sp>
+      <p:sp>
+        <p:nvSpPr>
+          <p:cNvPr id="10" name="Rectangle 9">
+            <a:extLst>
+              <a:ext uri="{FF2B5EF4-FFF2-40B4-BE49-F238E27FC236}">
+                <a16:creationId xmlns:a16="http://schemas.microsoft.com/office/drawing/2014/main" id="{123E9647-4959-894B-88A7-50F561C54802}"/>
               </a:ext>
             </a:extLst>
           </p:cNvPr>
@@ -26383,8 +26627,8 @@
         </p:nvSpPr>
         <p:spPr>
           <a:xfrm>
-            <a:off x="909614" y="2309906"/>
-            <a:ext cx="6020907" cy="346075"/>
+            <a:off x="909612" y="1864140"/>
+            <a:ext cx="3262338" cy="346075"/>
           </a:xfrm>
           <a:prstGeom prst="rect">
             <a:avLst/>
@@ -26425,10 +26669,10 @@
       </p:sp>
       <p:sp>
         <p:nvSpPr>
-          <p:cNvPr id="7" name="Rectangle 6">
+          <p:cNvPr id="11" name="Rectangle 10">
             <a:extLst>
               <a:ext uri="{FF2B5EF4-FFF2-40B4-BE49-F238E27FC236}">
-                <a16:creationId xmlns:a16="http://schemas.microsoft.com/office/drawing/2014/main" id="{D7F10BD3-DB22-7043-8433-B6CE34EB4FEE}"/>
+                <a16:creationId xmlns:a16="http://schemas.microsoft.com/office/drawing/2014/main" id="{0A7FB891-F098-6F4A-BF30-BE78636DB4E4}"/>
               </a:ext>
             </a:extLst>
           </p:cNvPr>
@@ -26437,8 +26681,8 @@
         </p:nvSpPr>
         <p:spPr>
           <a:xfrm>
-            <a:off x="909614" y="1863769"/>
-            <a:ext cx="7149718" cy="346075"/>
+            <a:off x="909613" y="2323382"/>
+            <a:ext cx="7184256" cy="346075"/>
           </a:xfrm>
           <a:prstGeom prst="rect">
             <a:avLst/>
@@ -26482,7 +26726,7 @@
           <p:cNvPr id="12" name="Rectangle 11">
             <a:extLst>
               <a:ext uri="{FF2B5EF4-FFF2-40B4-BE49-F238E27FC236}">
-                <a16:creationId xmlns:a16="http://schemas.microsoft.com/office/drawing/2014/main" id="{F0D062B1-76F5-1E43-B067-441BE8AF1B26}"/>
+                <a16:creationId xmlns:a16="http://schemas.microsoft.com/office/drawing/2014/main" id="{A086482E-CA60-A944-BE73-D8148FD5A789}"/>
               </a:ext>
             </a:extLst>
           </p:cNvPr>
@@ -26491,8 +26735,8 @@
         </p:nvSpPr>
         <p:spPr>
           <a:xfrm>
-            <a:off x="909614" y="2762349"/>
-            <a:ext cx="1978629" cy="346075"/>
+            <a:off x="909612" y="2772143"/>
+            <a:ext cx="9098781" cy="346075"/>
           </a:xfrm>
           <a:prstGeom prst="rect">
             <a:avLst/>
@@ -26533,97 +26777,10 @@
       </p:sp>
       <p:sp>
         <p:nvSpPr>
-          <p:cNvPr id="2" name="Title 1">
+          <p:cNvPr id="13" name="Rectangle 12">
             <a:extLst>
               <a:ext uri="{FF2B5EF4-FFF2-40B4-BE49-F238E27FC236}">
-                <a16:creationId xmlns:a16="http://schemas.microsoft.com/office/drawing/2014/main" id="{AC0D55DF-385E-9A4F-AB08-FEBC11990B8B}"/>
-              </a:ext>
-            </a:extLst>
-          </p:cNvPr>
-          <p:cNvSpPr>
-            <a:spLocks noGrp="1"/>
-          </p:cNvSpPr>
-          <p:nvPr>
-            <p:ph type="title"/>
-          </p:nvPr>
-        </p:nvSpPr>
-        <p:spPr/>
-        <p:txBody>
-          <a:bodyPr/>
-          <a:lstStyle/>
-          <a:p>
-            <a:r>
-              <a:rPr lang="en-US" dirty="0"/>
-              <a:t>Python Requests Code Examples</a:t>
-            </a:r>
-          </a:p>
-        </p:txBody>
-      </p:sp>
-      <p:sp>
-        <p:nvSpPr>
-          <p:cNvPr id="4" name="Date Placeholder 3">
-            <a:extLst>
-              <a:ext uri="{FF2B5EF4-FFF2-40B4-BE49-F238E27FC236}">
-                <a16:creationId xmlns:a16="http://schemas.microsoft.com/office/drawing/2014/main" id="{6E8781CE-B8A7-7540-B619-28D099093D8B}"/>
-              </a:ext>
-            </a:extLst>
-          </p:cNvPr>
-          <p:cNvSpPr>
-            <a:spLocks noGrp="1"/>
-          </p:cNvSpPr>
-          <p:nvPr>
-            <p:ph type="dt" sz="half" idx="10"/>
-          </p:nvPr>
-        </p:nvSpPr>
-        <p:spPr/>
-        <p:txBody>
-          <a:bodyPr/>
-          <a:lstStyle/>
-          <a:p>
-            <a:r>
-              <a:rPr lang="en-US"/>
-              <a:t>World Wide Technology ©</a:t>
-            </a:r>
-            <a:endParaRPr lang="en-US" dirty="0"/>
-          </a:p>
-        </p:txBody>
-      </p:sp>
-      <p:sp>
-        <p:nvSpPr>
-          <p:cNvPr id="5" name="Slide Number Placeholder 4">
-            <a:extLst>
-              <a:ext uri="{FF2B5EF4-FFF2-40B4-BE49-F238E27FC236}">
-                <a16:creationId xmlns:a16="http://schemas.microsoft.com/office/drawing/2014/main" id="{222BEAA2-2326-1F4D-9BCE-0FC3EC23B201}"/>
-              </a:ext>
-            </a:extLst>
-          </p:cNvPr>
-          <p:cNvSpPr>
-            <a:spLocks noGrp="1"/>
-          </p:cNvSpPr>
-          <p:nvPr>
-            <p:ph type="sldNum" sz="quarter" idx="12"/>
-          </p:nvPr>
-        </p:nvSpPr>
-        <p:spPr/>
-        <p:txBody>
-          <a:bodyPr/>
-          <a:lstStyle/>
-          <a:p>
-            <a:fld id="{A44B02FA-DD2D-1844-AE35-8B2EAB0CF4EF}" type="slidenum">
-              <a:rPr lang="en-US" smtClean="0"/>
-              <a:pPr/>
-              <a:t>39</a:t>
-            </a:fld>
-            <a:endParaRPr lang="en-US" dirty="0"/>
-          </a:p>
-        </p:txBody>
-      </p:sp>
-      <p:sp>
-        <p:nvSpPr>
-          <p:cNvPr id="14" name="Rectangle 13">
-            <a:extLst>
-              <a:ext uri="{FF2B5EF4-FFF2-40B4-BE49-F238E27FC236}">
-                <a16:creationId xmlns:a16="http://schemas.microsoft.com/office/drawing/2014/main" id="{703DD973-53B4-D748-BA5C-78AAF3C74B72}"/>
+                <a16:creationId xmlns:a16="http://schemas.microsoft.com/office/drawing/2014/main" id="{60600C1A-0AEF-AE46-9476-DD02A0F21C15}"/>
               </a:ext>
             </a:extLst>
           </p:cNvPr>
@@ -26632,8 +26789,8 @@
         </p:nvSpPr>
         <p:spPr>
           <a:xfrm>
-            <a:off x="2888243" y="2763417"/>
-            <a:ext cx="283779" cy="346075"/>
+            <a:off x="909612" y="3225258"/>
+            <a:ext cx="7019951" cy="346075"/>
           </a:xfrm>
           <a:prstGeom prst="rect">
             <a:avLst/>
@@ -26672,10 +26829,118 @@
           </a:p>
         </p:txBody>
       </p:sp>
+      <p:sp>
+        <p:nvSpPr>
+          <p:cNvPr id="14" name="Rectangle 13">
+            <a:extLst>
+              <a:ext uri="{FF2B5EF4-FFF2-40B4-BE49-F238E27FC236}">
+                <a16:creationId xmlns:a16="http://schemas.microsoft.com/office/drawing/2014/main" id="{8737245F-87A7-EB4D-B8E9-AC54A1A034FC}"/>
+              </a:ext>
+            </a:extLst>
+          </p:cNvPr>
+          <p:cNvSpPr/>
+          <p:nvPr/>
+        </p:nvSpPr>
+        <p:spPr>
+          <a:xfrm>
+            <a:off x="909612" y="3684500"/>
+            <a:ext cx="6648655" cy="346075"/>
+          </a:xfrm>
+          <a:prstGeom prst="rect">
+            <a:avLst/>
+          </a:prstGeom>
+          <a:solidFill>
+            <a:schemeClr val="tx1">
+              <a:alpha val="40000"/>
+            </a:schemeClr>
+          </a:solidFill>
+          <a:ln>
+            <a:noFill/>
+          </a:ln>
+        </p:spPr>
+        <p:style>
+          <a:lnRef idx="2">
+            <a:schemeClr val="accent1">
+              <a:shade val="50000"/>
+            </a:schemeClr>
+          </a:lnRef>
+          <a:fillRef idx="1">
+            <a:schemeClr val="accent1"/>
+          </a:fillRef>
+          <a:effectRef idx="0">
+            <a:schemeClr val="accent1"/>
+          </a:effectRef>
+          <a:fontRef idx="minor">
+            <a:schemeClr val="lt1"/>
+          </a:fontRef>
+        </p:style>
+        <p:txBody>
+          <a:bodyPr rtlCol="0" anchor="ctr"/>
+          <a:lstStyle/>
+          <a:p>
+            <a:pPr algn="ctr"/>
+            <a:endParaRPr lang="en-US" dirty="0"/>
+          </a:p>
+        </p:txBody>
+      </p:sp>
+      <p:sp>
+        <p:nvSpPr>
+          <p:cNvPr id="15" name="Rectangle 14">
+            <a:extLst>
+              <a:ext uri="{FF2B5EF4-FFF2-40B4-BE49-F238E27FC236}">
+                <a16:creationId xmlns:a16="http://schemas.microsoft.com/office/drawing/2014/main" id="{48CDC9C6-099B-1A4D-AE31-B3B2FCBE5370}"/>
+              </a:ext>
+            </a:extLst>
+          </p:cNvPr>
+          <p:cNvSpPr/>
+          <p:nvPr/>
+        </p:nvSpPr>
+        <p:spPr>
+          <a:xfrm>
+            <a:off x="909612" y="4143742"/>
+            <a:ext cx="2940869" cy="346075"/>
+          </a:xfrm>
+          <a:prstGeom prst="rect">
+            <a:avLst/>
+          </a:prstGeom>
+          <a:solidFill>
+            <a:schemeClr val="tx1">
+              <a:alpha val="40000"/>
+            </a:schemeClr>
+          </a:solidFill>
+          <a:ln>
+            <a:noFill/>
+          </a:ln>
+        </p:spPr>
+        <p:style>
+          <a:lnRef idx="2">
+            <a:schemeClr val="accent1">
+              <a:shade val="50000"/>
+            </a:schemeClr>
+          </a:lnRef>
+          <a:fillRef idx="1">
+            <a:schemeClr val="accent1"/>
+          </a:fillRef>
+          <a:effectRef idx="0">
+            <a:schemeClr val="accent1"/>
+          </a:effectRef>
+          <a:fontRef idx="minor">
+            <a:schemeClr val="lt1"/>
+          </a:fontRef>
+        </p:style>
+        <p:txBody>
+          <a:bodyPr rtlCol="0" anchor="ctr"/>
+          <a:lstStyle/>
+          <a:p>
+            <a:pPr algn="ctr"/>
+            <a:endParaRPr lang="en-US" dirty="0"/>
+          </a:p>
+        </p:txBody>
+      </p:sp>
     </p:spTree>
     <p:extLst>
       <p:ext uri="{BB962C8B-B14F-4D97-AF65-F5344CB8AC3E}">
-        <p14:creationId xmlns:p14="http://schemas.microsoft.com/office/powerpoint/2010/main" val="2140970284"/>
+        <p14:creationId xmlns:p14="http://schemas.microsoft.com/office/powerpoint/2010/main" val="2094831133"/>
       </p:ext>
     </p:extLst>
   </p:cSld>
@@ -26706,6 +26971,9 @@
                     <p:cTn id="3" fill="hold">
                       <p:stCondLst>
                         <p:cond delay="indefinite"/>
+                        <p:cond evt="onBegin" delay="0">
+                          <p:tn val="2"/>
+                        </p:cond>
                       </p:stCondLst>
                       <p:childTnLst>
                         <p:par>
@@ -26715,7 +26983,7 @@
                             </p:stCondLst>
                             <p:childTnLst>
                               <p:par>
-                                <p:cTn id="5" presetID="22" presetClass="entr" presetSubtype="8" fill="hold" nodeType="clickEffect">
+                                <p:cTn id="5" presetID="22" presetClass="entr" presetSubtype="8" fill="hold" grpId="0" nodeType="afterEffect">
                                   <p:stCondLst>
                                     <p:cond delay="0"/>
                                   </p:stCondLst>
@@ -26728,11 +26996,7 @@
                                           </p:stCondLst>
                                         </p:cTn>
                                         <p:tgtEl>
-                                          <p:spTgt spid="3">
-                                            <p:txEl>
-                                              <p:pRg st="0" end="0"/>
-                                            </p:txEl>
-                                          </p:spTgt>
+                                          <p:spTgt spid="10"/>
                                         </p:tgtEl>
                                         <p:attrNameLst>
                                           <p:attrName>style.visibility</p:attrName>
@@ -26744,13 +27008,9 @@
                                     </p:set>
                                     <p:animEffect transition="in" filter="wipe(left)">
                                       <p:cBhvr>
-                                        <p:cTn id="7" dur="2000"/>
-                                        <p:tgtEl>
-                                          <p:spTgt spid="3">
-                                            <p:txEl>
-                                              <p:pRg st="0" end="0"/>
-                                            </p:txEl>
-                                          </p:spTgt>
+                                        <p:cTn id="7" dur="500"/>
+                                        <p:tgtEl>
+                                          <p:spTgt spid="10"/>
                                         </p:tgtEl>
                                       </p:cBhvr>
                                     </p:animEffect>
@@ -26763,11 +27023,11 @@
                         <p:par>
                           <p:cTn id="8" fill="hold">
                             <p:stCondLst>
-                              <p:cond delay="2000"/>
+                              <p:cond delay="500"/>
                             </p:stCondLst>
                             <p:childTnLst>
                               <p:par>
-                                <p:cTn id="9" presetID="22" presetClass="entr" presetSubtype="8" fill="hold" nodeType="afterEffect">
+                                <p:cTn id="9" presetID="22" presetClass="entr" presetSubtype="8" fill="hold" grpId="0" nodeType="afterEffect">
                                   <p:stCondLst>
                                     <p:cond delay="0"/>
                                   </p:stCondLst>
@@ -26780,11 +27040,7 @@
                                           </p:stCondLst>
                                         </p:cTn>
                                         <p:tgtEl>
-                                          <p:spTgt spid="3">
-                                            <p:txEl>
-                                              <p:pRg st="1" end="1"/>
-                                            </p:txEl>
-                                          </p:spTgt>
+                                          <p:spTgt spid="11"/>
                                         </p:tgtEl>
                                         <p:attrNameLst>
                                           <p:attrName>style.visibility</p:attrName>
@@ -26796,13 +27052,9 @@
                                     </p:set>
                                     <p:animEffect transition="in" filter="wipe(left)">
                                       <p:cBhvr>
-                                        <p:cTn id="11" dur="2000"/>
-                                        <p:tgtEl>
-                                          <p:spTgt spid="3">
-                                            <p:txEl>
-                                              <p:pRg st="1" end="1"/>
-                                            </p:txEl>
-                                          </p:spTgt>
+                                        <p:cTn id="11" dur="1000"/>
+                                        <p:tgtEl>
+                                          <p:spTgt spid="11"/>
                                         </p:tgtEl>
                                       </p:cBhvr>
                                     </p:animEffect>
@@ -26815,11 +27067,11 @@
                         <p:par>
                           <p:cTn id="12" fill="hold">
                             <p:stCondLst>
-                              <p:cond delay="4000"/>
+                              <p:cond delay="1500"/>
                             </p:stCondLst>
                             <p:childTnLst>
                               <p:par>
-                                <p:cTn id="13" presetID="22" presetClass="entr" presetSubtype="8" fill="hold" nodeType="afterEffect">
+                                <p:cTn id="13" presetID="22" presetClass="entr" presetSubtype="8" fill="hold" grpId="0" nodeType="afterEffect">
                                   <p:stCondLst>
                                     <p:cond delay="0"/>
                                   </p:stCondLst>
@@ -26832,11 +27084,7 @@
                                           </p:stCondLst>
                                         </p:cTn>
                                         <p:tgtEl>
-                                          <p:spTgt spid="3">
-                                            <p:txEl>
-                                              <p:pRg st="2" end="2"/>
-                                            </p:txEl>
-                                          </p:spTgt>
+                                          <p:spTgt spid="12"/>
                                         </p:tgtEl>
                                         <p:attrNameLst>
                                           <p:attrName>style.visibility</p:attrName>
@@ -26850,72 +27098,7 @@
                                       <p:cBhvr>
                                         <p:cTn id="15" dur="1000"/>
                                         <p:tgtEl>
-                                          <p:spTgt spid="3">
-                                            <p:txEl>
-                                              <p:pRg st="2" end="2"/>
-                                            </p:txEl>
-                                          </p:spTgt>
-                                        </p:tgtEl>
-                                      </p:cBhvr>
-                                    </p:animEffect>
-                                  </p:childTnLst>
-                                </p:cTn>
-                              </p:par>
-                            </p:childTnLst>
-                          </p:cTn>
-                        </p:par>
-                      </p:childTnLst>
-                    </p:cTn>
-                  </p:par>
-                  <p:par>
-                    <p:cTn id="16" fill="hold">
-                      <p:stCondLst>
-                        <p:cond delay="indefinite"/>
-                      </p:stCondLst>
-                      <p:childTnLst>
-                        <p:par>
-                          <p:cTn id="17" fill="hold">
-                            <p:stCondLst>
-                              <p:cond delay="0"/>
-                            </p:stCondLst>
-                            <p:childTnLst>
-                              <p:par>
-                                <p:cTn id="18" presetID="9" presetClass="entr" presetSubtype="0" fill="hold" nodeType="clickEffect">
-                                  <p:stCondLst>
-                                    <p:cond delay="0"/>
-                                  </p:stCondLst>
-                                  <p:childTnLst>
-                                    <p:set>
-                                      <p:cBhvr>
-                                        <p:cTn id="19" dur="1" fill="hold">
-                                          <p:stCondLst>
-                                            <p:cond delay="0"/>
-                                          </p:stCondLst>
-                                        </p:cTn>
-                                        <p:tgtEl>
-                                          <p:spTgt spid="3">
-                                            <p:txEl>
-                                              <p:pRg st="3" end="3"/>
-                                            </p:txEl>
-                                          </p:spTgt>
-                                        </p:tgtEl>
-                                        <p:attrNameLst>
-                                          <p:attrName>style.visibility</p:attrName>
-                                        </p:attrNameLst>
-                                      </p:cBhvr>
-                                      <p:to>
-                                        <p:strVal val="visible"/>
-                                      </p:to>
-                                    </p:set>
-                                    <p:animEffect transition="in" filter="dissolve">
-                                      <p:cBhvr>
-                                        <p:cTn id="20" dur="500"/>
-                                        <p:tgtEl>
-                                          <p:spTgt spid="3">
-                                            <p:txEl>
-                                              <p:pRg st="3" end="3"/>
-                                            </p:txEl>
-                                          </p:spTgt>
+                                          <p:spTgt spid="12"/>
                                         </p:tgtEl>
                                       </p:cBhvr>
                                     </p:animEffect>
@@ -26926,26 +27109,26 @@
                           </p:cTn>
                         </p:par>
                         <p:par>
-                          <p:cTn id="21" fill="hold">
+                          <p:cTn id="16" fill="hold">
                             <p:stCondLst>
-                              <p:cond delay="500"/>
+                              <p:cond delay="2500"/>
                             </p:stCondLst>
                             <p:childTnLst>
                               <p:par>
-                                <p:cTn id="22" presetID="22" presetClass="entr" presetSubtype="8" fill="hold" grpId="0" nodeType="afterEffect">
+                                <p:cTn id="17" presetID="22" presetClass="entr" presetSubtype="8" fill="hold" grpId="0" nodeType="afterEffect">
                                   <p:stCondLst>
-                                    <p:cond delay="500"/>
+                                    <p:cond delay="0"/>
                                   </p:stCondLst>
                                   <p:childTnLst>
                                     <p:set>
                                       <p:cBhvr>
-                                        <p:cTn id="23" dur="1" fill="hold">
+                                        <p:cTn id="18" dur="1" fill="hold">
                                           <p:stCondLst>
                                             <p:cond delay="0"/>
                                           </p:stCondLst>
                                         </p:cTn>
                                         <p:tgtEl>
-                                          <p:spTgt spid="7"/>
+                                          <p:spTgt spid="13"/>
                                         </p:tgtEl>
                                         <p:attrNameLst>
                                           <p:attrName>style.visibility</p:attrName>
@@ -26957,70 +27140,9 @@
                                     </p:set>
                                     <p:animEffect transition="in" filter="wipe(left)">
                                       <p:cBhvr>
-                                        <p:cTn id="24" dur="1000"/>
-                                        <p:tgtEl>
-                                          <p:spTgt spid="7"/>
-                                        </p:tgtEl>
-                                      </p:cBhvr>
-                                    </p:animEffect>
-                                  </p:childTnLst>
-                                </p:cTn>
-                              </p:par>
-                            </p:childTnLst>
-                          </p:cTn>
-                        </p:par>
-                      </p:childTnLst>
-                    </p:cTn>
-                  </p:par>
-                  <p:par>
-                    <p:cTn id="25" fill="hold">
-                      <p:stCondLst>
-                        <p:cond delay="indefinite"/>
-                      </p:stCondLst>
-                      <p:childTnLst>
-                        <p:par>
-                          <p:cTn id="26" fill="hold">
-                            <p:stCondLst>
-                              <p:cond delay="0"/>
-                            </p:stCondLst>
-                            <p:childTnLst>
-                              <p:par>
-                                <p:cTn id="27" presetID="9" presetClass="entr" presetSubtype="0" fill="hold" nodeType="clickEffect">
-                                  <p:stCondLst>
-                                    <p:cond delay="0"/>
-                                  </p:stCondLst>
-                                  <p:childTnLst>
-                                    <p:set>
-                                      <p:cBhvr>
-                                        <p:cTn id="28" dur="1" fill="hold">
-                                          <p:stCondLst>
-                                            <p:cond delay="0"/>
-                                          </p:stCondLst>
-                                        </p:cTn>
-                                        <p:tgtEl>
-                                          <p:spTgt spid="3">
-                                            <p:txEl>
-                                              <p:pRg st="4" end="4"/>
-                                            </p:txEl>
-                                          </p:spTgt>
-                                        </p:tgtEl>
-                                        <p:attrNameLst>
-                                          <p:attrName>style.visibility</p:attrName>
-                                        </p:attrNameLst>
-                                      </p:cBhvr>
-                                      <p:to>
-                                        <p:strVal val="visible"/>
-                                      </p:to>
-                                    </p:set>
-                                    <p:animEffect transition="in" filter="dissolve">
-                                      <p:cBhvr>
-                                        <p:cTn id="29" dur="500"/>
-                                        <p:tgtEl>
-                                          <p:spTgt spid="3">
-                                            <p:txEl>
-                                              <p:pRg st="4" end="4"/>
-                                            </p:txEl>
-                                          </p:spTgt>
+                                        <p:cTn id="19" dur="1000"/>
+                                        <p:tgtEl>
+                                          <p:spTgt spid="13"/>
                                         </p:tgtEl>
                                       </p:cBhvr>
                                     </p:animEffect>
@@ -27031,26 +27153,26 @@
                           </p:cTn>
                         </p:par>
                         <p:par>
-                          <p:cTn id="30" fill="hold">
+                          <p:cTn id="20" fill="hold">
                             <p:stCondLst>
-                              <p:cond delay="500"/>
+                              <p:cond delay="3500"/>
                             </p:stCondLst>
                             <p:childTnLst>
                               <p:par>
-                                <p:cTn id="31" presetID="22" presetClass="entr" presetSubtype="8" fill="hold" grpId="0" nodeType="afterEffect">
+                                <p:cTn id="21" presetID="22" presetClass="entr" presetSubtype="8" fill="hold" grpId="0" nodeType="afterEffect">
                                   <p:stCondLst>
-                                    <p:cond delay="500"/>
+                                    <p:cond delay="0"/>
                                   </p:stCondLst>
                                   <p:childTnLst>
                                     <p:set>
                                       <p:cBhvr>
-                                        <p:cTn id="32" dur="1" fill="hold">
+                                        <p:cTn id="22" dur="1" fill="hold">
                                           <p:stCondLst>
                                             <p:cond delay="0"/>
                                           </p:stCondLst>
                                         </p:cTn>
                                         <p:tgtEl>
-                                          <p:spTgt spid="11"/>
+                                          <p:spTgt spid="14"/>
                                         </p:tgtEl>
                                         <p:attrNameLst>
                                           <p:attrName>style.visibility</p:attrName>
@@ -27062,70 +27184,9 @@
                                     </p:set>
                                     <p:animEffect transition="in" filter="wipe(left)">
                                       <p:cBhvr>
-                                        <p:cTn id="33" dur="1000"/>
-                                        <p:tgtEl>
-                                          <p:spTgt spid="11"/>
-                                        </p:tgtEl>
-                                      </p:cBhvr>
-                                    </p:animEffect>
-                                  </p:childTnLst>
-                                </p:cTn>
-                              </p:par>
-                            </p:childTnLst>
-                          </p:cTn>
-                        </p:par>
-                      </p:childTnLst>
-                    </p:cTn>
-                  </p:par>
-                  <p:par>
-                    <p:cTn id="34" fill="hold">
-                      <p:stCondLst>
-                        <p:cond delay="indefinite"/>
-                      </p:stCondLst>
-                      <p:childTnLst>
-                        <p:par>
-                          <p:cTn id="35" fill="hold">
-                            <p:stCondLst>
-                              <p:cond delay="0"/>
-                            </p:stCondLst>
-                            <p:childTnLst>
-                              <p:par>
-                                <p:cTn id="36" presetID="9" presetClass="entr" presetSubtype="0" fill="hold" nodeType="clickEffect">
-                                  <p:stCondLst>
-                                    <p:cond delay="0"/>
-                                  </p:stCondLst>
-                                  <p:childTnLst>
-                                    <p:set>
-                                      <p:cBhvr>
-                                        <p:cTn id="37" dur="1" fill="hold">
-                                          <p:stCondLst>
-                                            <p:cond delay="0"/>
-                                          </p:stCondLst>
-                                        </p:cTn>
-                                        <p:tgtEl>
-                                          <p:spTgt spid="3">
-                                            <p:txEl>
-                                              <p:pRg st="5" end="5"/>
-                                            </p:txEl>
-                                          </p:spTgt>
-                                        </p:tgtEl>
-                                        <p:attrNameLst>
-                                          <p:attrName>style.visibility</p:attrName>
-                                        </p:attrNameLst>
-                                      </p:cBhvr>
-                                      <p:to>
-                                        <p:strVal val="visible"/>
-                                      </p:to>
-                                    </p:set>
-                                    <p:animEffect transition="in" filter="dissolve">
-                                      <p:cBhvr>
-                                        <p:cTn id="38" dur="500"/>
-                                        <p:tgtEl>
-                                          <p:spTgt spid="3">
-                                            <p:txEl>
-                                              <p:pRg st="5" end="5"/>
-                                            </p:txEl>
-                                          </p:spTgt>
+                                        <p:cTn id="23" dur="1000"/>
+                                        <p:tgtEl>
+                                          <p:spTgt spid="14"/>
                                         </p:tgtEl>
                                       </p:cBhvr>
                                     </p:animEffect>
@@ -27136,26 +27197,26 @@
                           </p:cTn>
                         </p:par>
                         <p:par>
-                          <p:cTn id="39" fill="hold">
+                          <p:cTn id="24" fill="hold">
                             <p:stCondLst>
-                              <p:cond delay="500"/>
+                              <p:cond delay="4500"/>
                             </p:stCondLst>
                             <p:childTnLst>
                               <p:par>
-                                <p:cTn id="40" presetID="22" presetClass="entr" presetSubtype="8" fill="hold" grpId="0" nodeType="afterEffect">
+                                <p:cTn id="25" presetID="22" presetClass="entr" presetSubtype="8" fill="hold" grpId="0" nodeType="afterEffect">
                                   <p:stCondLst>
-                                    <p:cond delay="500"/>
+                                    <p:cond delay="0"/>
                                   </p:stCondLst>
                                   <p:childTnLst>
                                     <p:set>
                                       <p:cBhvr>
-                                        <p:cTn id="41" dur="1" fill="hold">
+                                        <p:cTn id="26" dur="1" fill="hold">
                                           <p:stCondLst>
                                             <p:cond delay="0"/>
                                           </p:stCondLst>
                                         </p:cTn>
                                         <p:tgtEl>
-                                          <p:spTgt spid="12"/>
+                                          <p:spTgt spid="15"/>
                                         </p:tgtEl>
                                         <p:attrNameLst>
                                           <p:attrName>style.visibility</p:attrName>
@@ -27167,114 +27228,9 @@
                                     </p:set>
                                     <p:animEffect transition="in" filter="wipe(left)">
                                       <p:cBhvr>
-                                        <p:cTn id="42" dur="500"/>
-                                        <p:tgtEl>
-                                          <p:spTgt spid="12"/>
-                                        </p:tgtEl>
-                                      </p:cBhvr>
-                                    </p:animEffect>
-                                  </p:childTnLst>
-                                </p:cTn>
-                              </p:par>
-                            </p:childTnLst>
-                          </p:cTn>
-                        </p:par>
-                      </p:childTnLst>
-                    </p:cTn>
-                  </p:par>
-                  <p:par>
-                    <p:cTn id="43" fill="hold">
-                      <p:stCondLst>
-                        <p:cond delay="indefinite"/>
-                      </p:stCondLst>
-                      <p:childTnLst>
-                        <p:par>
-                          <p:cTn id="44" fill="hold">
-                            <p:stCondLst>
-                              <p:cond delay="0"/>
-                            </p:stCondLst>
-                            <p:childTnLst>
-                              <p:par>
-                                <p:cTn id="45" presetID="9" presetClass="entr" presetSubtype="0" fill="hold" nodeType="clickEffect">
-                                  <p:stCondLst>
-                                    <p:cond delay="0"/>
-                                  </p:stCondLst>
-                                  <p:childTnLst>
-                                    <p:set>
-                                      <p:cBhvr>
-                                        <p:cTn id="46" dur="1" fill="hold">
-                                          <p:stCondLst>
-                                            <p:cond delay="0"/>
-                                          </p:stCondLst>
-                                        </p:cTn>
-                                        <p:tgtEl>
-                                          <p:spTgt spid="3">
-                                            <p:txEl>
-                                              <p:pRg st="6" end="6"/>
-                                            </p:txEl>
-                                          </p:spTgt>
-                                        </p:tgtEl>
-                                        <p:attrNameLst>
-                                          <p:attrName>style.visibility</p:attrName>
-                                        </p:attrNameLst>
-                                      </p:cBhvr>
-                                      <p:to>
-                                        <p:strVal val="visible"/>
-                                      </p:to>
-                                    </p:set>
-                                    <p:animEffect transition="in" filter="dissolve">
-                                      <p:cBhvr>
-                                        <p:cTn id="47" dur="500"/>
-                                        <p:tgtEl>
-                                          <p:spTgt spid="3">
-                                            <p:txEl>
-                                              <p:pRg st="6" end="6"/>
-                                            </p:txEl>
-                                          </p:spTgt>
-                                        </p:tgtEl>
-                                      </p:cBhvr>
-                                    </p:animEffect>
-                                  </p:childTnLst>
-                                </p:cTn>
-                              </p:par>
-                            </p:childTnLst>
-                          </p:cTn>
-                        </p:par>
-                        <p:par>
-                          <p:cTn id="48" fill="hold">
-                            <p:stCondLst>
-                              <p:cond delay="500"/>
-                            </p:stCondLst>
-                            <p:childTnLst>
-                              <p:par>
-                                <p:cTn id="49" presetID="22" presetClass="entr" presetSubtype="8" fill="hold" grpId="0" nodeType="afterEffect">
-                                  <p:stCondLst>
-                                    <p:cond delay="500"/>
-                                  </p:stCondLst>
-                                  <p:childTnLst>
-                                    <p:set>
-                                      <p:cBhvr>
-                                        <p:cTn id="50" dur="1" fill="hold">
-                                          <p:stCondLst>
-                                            <p:cond delay="0"/>
-                                          </p:stCondLst>
-                                        </p:cTn>
-                                        <p:tgtEl>
-                                          <p:spTgt spid="14"/>
-                                        </p:tgtEl>
-                                        <p:attrNameLst>
-                                          <p:attrName>style.visibility</p:attrName>
-                                        </p:attrNameLst>
-                                      </p:cBhvr>
-                                      <p:to>
-                                        <p:strVal val="visible"/>
-                                      </p:to>
-                                    </p:set>
-                                    <p:animEffect transition="in" filter="wipe(left)">
-                                      <p:cBhvr>
-                                        <p:cTn id="51" dur="250"/>
-                                        <p:tgtEl>
-                                          <p:spTgt spid="14"/>
+                                        <p:cTn id="27" dur="1000"/>
+                                        <p:tgtEl>
+                                          <p:spTgt spid="15"/>
                                         </p:tgtEl>
                                       </p:cBhvr>
                                     </p:animEffect>
@@ -27309,10 +27265,12 @@
       </p:par>
     </p:tnLst>
     <p:bldLst>
+      <p:bldP spid="10" grpId="0" animBg="1"/>
       <p:bldP spid="11" grpId="0" animBg="1"/>
-      <p:bldP spid="7" grpId="0" animBg="1"/>
       <p:bldP spid="12" grpId="0" animBg="1"/>
+      <p:bldP spid="13" grpId="0" animBg="1"/>
       <p:bldP spid="14" grpId="0" animBg="1"/>
+      <p:bldP spid="15" grpId="0" animBg="1"/>
     </p:bldLst>
   </p:timing>
 </p:sld>
@@ -27498,7 +27456,7 @@
     </p:spTree>
     <p:extLst>
       <p:ext uri="{BB962C8B-B14F-4D97-AF65-F5344CB8AC3E}">
-        <p14:creationId xmlns:p14="http://schemas.microsoft.com/office/powerpoint/2010/main" val="3025731542"/>
+        <p14:creationId xmlns:p14="http://schemas.microsoft.com/office/powerpoint/2010/main" val="4243232459"/>
       </p:ext>
     </p:extLst>
   </p:cSld>
@@ -27539,10 +27497,10 @@
       </p:grpSpPr>
       <p:sp>
         <p:nvSpPr>
-          <p:cNvPr id="3" name="Content Placeholder 2">
+          <p:cNvPr id="2" name="Title 1">
             <a:extLst>
               <a:ext uri="{FF2B5EF4-FFF2-40B4-BE49-F238E27FC236}">
-                <a16:creationId xmlns:a16="http://schemas.microsoft.com/office/drawing/2014/main" id="{4CB23FD9-ADE0-084E-A8CC-44CA0BA25AB3}"/>
+                <a16:creationId xmlns:a16="http://schemas.microsoft.com/office/drawing/2014/main" id="{9D8D6E4C-FC36-3E4C-9387-96DD20072D9D}"/>
               </a:ext>
             </a:extLst>
           </p:cNvPr>
@@ -27550,145 +27508,32 @@
             <a:spLocks noGrp="1"/>
           </p:cNvSpPr>
           <p:nvPr>
-            <p:ph idx="1"/>
+            <p:ph type="ctrTitle"/>
           </p:nvPr>
         </p:nvSpPr>
-        <p:spPr/>
-        <p:txBody>
-          <a:bodyPr>
-            <a:normAutofit/>
-          </a:bodyPr>
+        <p:spPr>
+          <a:xfrm>
+            <a:off x="1524000" y="914013"/>
+            <a:ext cx="9144000" cy="2387600"/>
+          </a:xfrm>
+        </p:spPr>
+        <p:txBody>
+          <a:bodyPr/>
           <a:lstStyle/>
           <a:p>
-            <a:pPr marL="0" indent="0">
-              <a:buNone/>
-            </a:pPr>
-            <a:r>
-              <a:rPr lang="en-US" sz="2400" b="1" i="1" dirty="0">
-                <a:solidFill>
-                  <a:srgbClr val="FFFF00"/>
-                </a:solidFill>
-              </a:rPr>
-              <a:t>curl --</a:t>
-            </a:r>
-            <a:r>
-              <a:rPr lang="en-US" sz="2400" b="1" i="1" dirty="0" err="1">
-                <a:solidFill>
-                  <a:srgbClr val="FFFF00"/>
-                </a:solidFill>
-              </a:rPr>
-              <a:t>url</a:t>
-            </a:r>
-            <a:r>
-              <a:rPr lang="en-US" sz="2400" b="1" i="1" dirty="0">
-                <a:solidFill>
-                  <a:srgbClr val="FFFF00"/>
-                </a:solidFill>
-              </a:rPr>
-              <a:t> https://</a:t>
-            </a:r>
-            <a:r>
-              <a:rPr lang="en-US" sz="2400" b="1" i="1" dirty="0" err="1">
-                <a:solidFill>
-                  <a:srgbClr val="FFFF00"/>
-                </a:solidFill>
-              </a:rPr>
-              <a:t>api.meraki.com</a:t>
-            </a:r>
-            <a:r>
-              <a:rPr lang="en-US" sz="2400" b="1" i="1" dirty="0">
-                <a:solidFill>
-                  <a:srgbClr val="FFFF00"/>
-                </a:solidFill>
-              </a:rPr>
-              <a:t>/</a:t>
-            </a:r>
-            <a:r>
-              <a:rPr lang="en-US" sz="2400" b="1" i="1" dirty="0" err="1">
-                <a:solidFill>
-                  <a:srgbClr val="FFFF00"/>
-                </a:solidFill>
-              </a:rPr>
-              <a:t>api</a:t>
-            </a:r>
-            <a:r>
-              <a:rPr lang="en-US" sz="2400" b="1" i="1" dirty="0">
-                <a:solidFill>
-                  <a:srgbClr val="FFFF00"/>
-                </a:solidFill>
-              </a:rPr>
-              <a:t>/v0/organizations \</a:t>
-            </a:r>
-          </a:p>
-          <a:p>
-            <a:pPr marL="0" indent="0">
-              <a:buNone/>
-            </a:pPr>
-            <a:r>
-              <a:rPr lang="en-US" sz="2400" b="1" i="1" dirty="0">
-                <a:solidFill>
-                  <a:srgbClr val="FFFF00"/>
-                </a:solidFill>
-              </a:rPr>
-              <a:t>-H X-Cisco-Meraki-API-Key:$MERAKI_API_KEY \</a:t>
-            </a:r>
-          </a:p>
-          <a:p>
-            <a:pPr marL="0" indent="0">
-              <a:buNone/>
-            </a:pPr>
-            <a:r>
-              <a:rPr lang="en-US" sz="2400" b="1" i="1" dirty="0">
-                <a:solidFill>
-                  <a:srgbClr val="FFFF00"/>
-                </a:solidFill>
-              </a:rPr>
-              <a:t>-H 'Accept: */*' -</a:t>
-            </a:r>
-            <a:r>
-              <a:rPr lang="en-US" sz="2400" b="1" i="1" dirty="0" err="1">
-                <a:solidFill>
-                  <a:srgbClr val="FFFF00"/>
-                </a:solidFill>
-              </a:rPr>
-              <a:t>i</a:t>
-            </a:r>
-            <a:r>
-              <a:rPr lang="en-US" sz="2400" b="1" i="1" dirty="0">
-                <a:solidFill>
-                  <a:srgbClr val="FFFF00"/>
-                </a:solidFill>
-              </a:rPr>
-              <a:t> \</a:t>
-            </a:r>
-          </a:p>
-          <a:p>
-            <a:pPr marL="0" indent="0">
-              <a:buNone/>
-            </a:pPr>
-            <a:r>
-              <a:rPr lang="en-US" sz="2400" b="1" i="1" dirty="0">
-                <a:solidFill>
-                  <a:srgbClr val="FFFF00"/>
-                </a:solidFill>
-              </a:rPr>
-              <a:t>-L</a:t>
-            </a:r>
-          </a:p>
-          <a:p>
-            <a:r>
-              <a:rPr lang="en-US" sz="2400" dirty="0"/>
-              <a:t>Follow redirects</a:t>
-            </a:r>
-          </a:p>
-        </p:txBody>
-      </p:sp>
-      <p:sp>
-        <p:nvSpPr>
-          <p:cNvPr id="2" name="Title 1">
+            <a:r>
+              <a:rPr lang="en-US" dirty="0"/>
+              <a:t>Part IV</a:t>
+            </a:r>
+          </a:p>
+        </p:txBody>
+      </p:sp>
+      <p:sp>
+        <p:nvSpPr>
+          <p:cNvPr id="3" name="Subtitle 2">
             <a:extLst>
               <a:ext uri="{FF2B5EF4-FFF2-40B4-BE49-F238E27FC236}">
-                <a16:creationId xmlns:a16="http://schemas.microsoft.com/office/drawing/2014/main" id="{AC0D55DF-385E-9A4F-AB08-FEBC11990B8B}"/>
+                <a16:creationId xmlns:a16="http://schemas.microsoft.com/office/drawing/2014/main" id="{0451A0DE-9D64-5A48-94B5-5B4E42709819}"/>
               </a:ext>
             </a:extLst>
           </p:cNvPr>
@@ -27696,84 +27541,30 @@
             <a:spLocks noGrp="1"/>
           </p:cNvSpPr>
           <p:nvPr>
-            <p:ph type="title"/>
+            <p:ph type="subTitle" idx="1"/>
           </p:nvPr>
         </p:nvSpPr>
-        <p:spPr/>
+        <p:spPr>
+          <a:xfrm>
+            <a:off x="1524000" y="3393688"/>
+            <a:ext cx="9144000" cy="1655762"/>
+          </a:xfrm>
+        </p:spPr>
         <p:txBody>
           <a:bodyPr/>
           <a:lstStyle/>
           <a:p>
             <a:r>
               <a:rPr lang="en-US" dirty="0"/>
-              <a:t>Python Requests Code Examples</a:t>
-            </a:r>
-          </a:p>
-        </p:txBody>
-      </p:sp>
-      <p:sp>
-        <p:nvSpPr>
-          <p:cNvPr id="4" name="Date Placeholder 3">
-            <a:extLst>
-              <a:ext uri="{FF2B5EF4-FFF2-40B4-BE49-F238E27FC236}">
-                <a16:creationId xmlns:a16="http://schemas.microsoft.com/office/drawing/2014/main" id="{6E8781CE-B8A7-7540-B619-28D099093D8B}"/>
-              </a:ext>
-            </a:extLst>
-          </p:cNvPr>
-          <p:cNvSpPr>
-            <a:spLocks noGrp="1"/>
-          </p:cNvSpPr>
-          <p:nvPr>
-            <p:ph type="dt" sz="half" idx="10"/>
-          </p:nvPr>
-        </p:nvSpPr>
-        <p:spPr/>
-        <p:txBody>
-          <a:bodyPr/>
-          <a:lstStyle/>
-          <a:p>
-            <a:r>
-              <a:rPr lang="en-US"/>
-              <a:t>World Wide Technology ©</a:t>
-            </a:r>
-            <a:endParaRPr lang="en-US" dirty="0"/>
-          </a:p>
-        </p:txBody>
-      </p:sp>
-      <p:sp>
-        <p:nvSpPr>
-          <p:cNvPr id="5" name="Slide Number Placeholder 4">
-            <a:extLst>
-              <a:ext uri="{FF2B5EF4-FFF2-40B4-BE49-F238E27FC236}">
-                <a16:creationId xmlns:a16="http://schemas.microsoft.com/office/drawing/2014/main" id="{222BEAA2-2326-1F4D-9BCE-0FC3EC23B201}"/>
-              </a:ext>
-            </a:extLst>
-          </p:cNvPr>
-          <p:cNvSpPr>
-            <a:spLocks noGrp="1"/>
-          </p:cNvSpPr>
-          <p:nvPr>
-            <p:ph type="sldNum" sz="quarter" idx="12"/>
-          </p:nvPr>
-        </p:nvSpPr>
-        <p:spPr/>
-        <p:txBody>
-          <a:bodyPr/>
-          <a:lstStyle/>
-          <a:p>
-            <a:fld id="{A44B02FA-DD2D-1844-AE35-8B2EAB0CF4EF}" type="slidenum">
-              <a:rPr lang="en-US" smtClean="0"/>
-              <a:pPr/>
-              <a:t>41</a:t>
-            </a:fld>
-            <a:endParaRPr lang="en-US" dirty="0"/>
+              <a:t>Cisco Platform APIs Overview</a:t>
+            </a:r>
           </a:p>
         </p:txBody>
       </p:sp>
     </p:spTree>
     <p:extLst>
       <p:ext uri="{BB962C8B-B14F-4D97-AF65-F5344CB8AC3E}">
-        <p14:creationId xmlns:p14="http://schemas.microsoft.com/office/powerpoint/2010/main" val="2094831133"/>
+        <p14:creationId xmlns:p14="http://schemas.microsoft.com/office/powerpoint/2010/main" val="899135878"/>
       </p:ext>
     </p:extLst>
   </p:cSld>
@@ -27792,149 +27583,6 @@
       </p:transition>
     </mc:Fallback>
   </mc:AlternateContent>
-  <p:timing>
-    <p:tnLst>
-      <p:par>
-        <p:cTn id="1" dur="indefinite" restart="never" nodeType="tmRoot">
-          <p:childTnLst>
-            <p:seq concurrent="1" nextAc="seek">
-              <p:cTn id="2" dur="indefinite" nodeType="mainSeq">
-                <p:childTnLst>
-                  <p:par>
-                    <p:cTn id="3" fill="hold">
-                      <p:stCondLst>
-                        <p:cond delay="indefinite"/>
-                      </p:stCondLst>
-                      <p:childTnLst>
-                        <p:par>
-                          <p:cTn id="4" fill="hold">
-                            <p:stCondLst>
-                              <p:cond delay="0"/>
-                            </p:stCondLst>
-                            <p:childTnLst>
-                              <p:par>
-                                <p:cTn id="5" presetID="22" presetClass="entr" presetSubtype="8" fill="hold" nodeType="clickEffect">
-                                  <p:stCondLst>
-                                    <p:cond delay="0"/>
-                                  </p:stCondLst>
-                                  <p:childTnLst>
-                                    <p:set>
-                                      <p:cBhvr>
-                                        <p:cTn id="6" dur="1" fill="hold">
-                                          <p:stCondLst>
-                                            <p:cond delay="0"/>
-                                          </p:stCondLst>
-                                        </p:cTn>
-                                        <p:tgtEl>
-                                          <p:spTgt spid="3">
-                                            <p:txEl>
-                                              <p:pRg st="3" end="3"/>
-                                            </p:txEl>
-                                          </p:spTgt>
-                                        </p:tgtEl>
-                                        <p:attrNameLst>
-                                          <p:attrName>style.visibility</p:attrName>
-                                        </p:attrNameLst>
-                                      </p:cBhvr>
-                                      <p:to>
-                                        <p:strVal val="visible"/>
-                                      </p:to>
-                                    </p:set>
-                                    <p:animEffect transition="in" filter="wipe(left)">
-                                      <p:cBhvr>
-                                        <p:cTn id="7" dur="500"/>
-                                        <p:tgtEl>
-                                          <p:spTgt spid="3">
-                                            <p:txEl>
-                                              <p:pRg st="3" end="3"/>
-                                            </p:txEl>
-                                          </p:spTgt>
-                                        </p:tgtEl>
-                                      </p:cBhvr>
-                                    </p:animEffect>
-                                  </p:childTnLst>
-                                </p:cTn>
-                              </p:par>
-                            </p:childTnLst>
-                          </p:cTn>
-                        </p:par>
-                        <p:par>
-                          <p:cTn id="8" fill="hold">
-                            <p:stCondLst>
-                              <p:cond delay="500"/>
-                            </p:stCondLst>
-                            <p:childTnLst>
-                              <p:par>
-                                <p:cTn id="9" presetID="9" presetClass="entr" presetSubtype="0" fill="hold" nodeType="afterEffect">
-                                  <p:stCondLst>
-                                    <p:cond delay="500"/>
-                                  </p:stCondLst>
-                                  <p:childTnLst>
-                                    <p:set>
-                                      <p:cBhvr>
-                                        <p:cTn id="10" dur="1" fill="hold">
-                                          <p:stCondLst>
-                                            <p:cond delay="0"/>
-                                          </p:stCondLst>
-                                        </p:cTn>
-                                        <p:tgtEl>
-                                          <p:spTgt spid="3">
-                                            <p:txEl>
-                                              <p:pRg st="4" end="4"/>
-                                            </p:txEl>
-                                          </p:spTgt>
-                                        </p:tgtEl>
-                                        <p:attrNameLst>
-                                          <p:attrName>style.visibility</p:attrName>
-                                        </p:attrNameLst>
-                                      </p:cBhvr>
-                                      <p:to>
-                                        <p:strVal val="visible"/>
-                                      </p:to>
-                                    </p:set>
-                                    <p:animEffect transition="in" filter="dissolve">
-                                      <p:cBhvr>
-                                        <p:cTn id="11" dur="500"/>
-                                        <p:tgtEl>
-                                          <p:spTgt spid="3">
-                                            <p:txEl>
-                                              <p:pRg st="4" end="4"/>
-                                            </p:txEl>
-                                          </p:spTgt>
-                                        </p:tgtEl>
-                                      </p:cBhvr>
-                                    </p:animEffect>
-                                  </p:childTnLst>
-                                </p:cTn>
-                              </p:par>
-                            </p:childTnLst>
-                          </p:cTn>
-                        </p:par>
-                      </p:childTnLst>
-                    </p:cTn>
-                  </p:par>
-                </p:childTnLst>
-              </p:cTn>
-              <p:prevCondLst>
-                <p:cond evt="onPrev" delay="0">
-                  <p:tgtEl>
-                    <p:sldTgt/>
-                  </p:tgtEl>
-                </p:cond>
-              </p:prevCondLst>
-              <p:nextCondLst>
-                <p:cond evt="onNext" delay="0">
-                  <p:tgtEl>
-                    <p:sldTgt/>
-                  </p:tgtEl>
-                </p:cond>
-              </p:nextCondLst>
-            </p:seq>
-          </p:childTnLst>
-        </p:cTn>
-      </p:par>
-    </p:tnLst>
-  </p:timing>
 </p:sld>
 </file>
 
@@ -27957,10 +27605,141 @@
       </p:grpSpPr>
       <p:sp>
         <p:nvSpPr>
+          <p:cNvPr id="2" name="Title 1">
+            <a:extLst>
+              <a:ext uri="{FF2B5EF4-FFF2-40B4-BE49-F238E27FC236}">
+                <a16:creationId xmlns:a16="http://schemas.microsoft.com/office/drawing/2014/main" id="{EB7C4089-1746-624B-8E73-D3DAB8E88CDD}"/>
+              </a:ext>
+            </a:extLst>
+          </p:cNvPr>
+          <p:cNvSpPr>
+            <a:spLocks noGrp="1"/>
+          </p:cNvSpPr>
+          <p:nvPr>
+            <p:ph type="title"/>
+          </p:nvPr>
+        </p:nvSpPr>
+        <p:spPr/>
+        <p:txBody>
+          <a:bodyPr/>
+          <a:lstStyle/>
+          <a:p>
+            <a:r>
+              <a:rPr lang="en-US" dirty="0"/>
+              <a:t>Outline</a:t>
+            </a:r>
+          </a:p>
+        </p:txBody>
+      </p:sp>
+      <p:sp>
+        <p:nvSpPr>
+          <p:cNvPr id="3" name="Content Placeholder 2">
+            <a:extLst>
+              <a:ext uri="{FF2B5EF4-FFF2-40B4-BE49-F238E27FC236}">
+                <a16:creationId xmlns:a16="http://schemas.microsoft.com/office/drawing/2014/main" id="{65426B10-0364-A849-B3A4-1D0DA409155A}"/>
+              </a:ext>
+            </a:extLst>
+          </p:cNvPr>
+          <p:cNvSpPr>
+            <a:spLocks noGrp="1"/>
+          </p:cNvSpPr>
+          <p:nvPr>
+            <p:ph idx="1"/>
+          </p:nvPr>
+        </p:nvSpPr>
+        <p:spPr/>
+        <p:txBody>
+          <a:bodyPr>
+            <a:normAutofit lnSpcReduction="10000"/>
+          </a:bodyPr>
+          <a:lstStyle/>
+          <a:p>
+            <a:r>
+              <a:rPr lang="en-US" dirty="0"/>
+              <a:t>For each of these platforms:</a:t>
+            </a:r>
+          </a:p>
+          <a:p>
+            <a:pPr lvl="1"/>
+            <a:r>
+              <a:rPr lang="en-US" dirty="0"/>
+              <a:t>DNAC</a:t>
+            </a:r>
+          </a:p>
+          <a:p>
+            <a:pPr lvl="1"/>
+            <a:r>
+              <a:rPr lang="en-US" dirty="0" err="1"/>
+              <a:t>Webex</a:t>
+            </a:r>
+            <a:r>
+              <a:rPr lang="en-US" dirty="0"/>
+              <a:t> Teams</a:t>
+            </a:r>
+          </a:p>
+          <a:p>
+            <a:pPr lvl="1"/>
+            <a:r>
+              <a:rPr lang="en-US" dirty="0"/>
+              <a:t>Meraki</a:t>
+            </a:r>
+          </a:p>
+          <a:p>
+            <a:pPr lvl="1"/>
+            <a:r>
+              <a:rPr lang="en-US" dirty="0"/>
+              <a:t>ACI</a:t>
+            </a:r>
+          </a:p>
+          <a:p>
+            <a:pPr lvl="1"/>
+            <a:r>
+              <a:rPr lang="en-US" dirty="0"/>
+              <a:t>Firepower</a:t>
+            </a:r>
+          </a:p>
+          <a:p>
+            <a:pPr lvl="1"/>
+            <a:r>
+              <a:rPr lang="en-US" dirty="0"/>
+              <a:t>SD-WAN</a:t>
+            </a:r>
+          </a:p>
+          <a:p>
+            <a:r>
+              <a:rPr lang="en-US" dirty="0"/>
+              <a:t>Perform the following tasks:</a:t>
+            </a:r>
+          </a:p>
+          <a:p>
+            <a:pPr lvl="1"/>
+            <a:r>
+              <a:rPr lang="en-US" dirty="0"/>
+              <a:t>Platform summary overview</a:t>
+            </a:r>
+          </a:p>
+          <a:p>
+            <a:pPr lvl="1"/>
+            <a:r>
+              <a:rPr lang="en-US" dirty="0"/>
+              <a:t>Review API documentation </a:t>
+            </a:r>
+          </a:p>
+          <a:p>
+            <a:pPr lvl="1"/>
+            <a:r>
+              <a:rPr lang="en-US" dirty="0"/>
+              <a:t>Review resources available for programmatic access/practice/testing</a:t>
+            </a:r>
+          </a:p>
+        </p:txBody>
+      </p:sp>
+      <p:sp>
+        <p:nvSpPr>
           <p:cNvPr id="4" name="Date Placeholder 3">
             <a:extLst>
               <a:ext uri="{FF2B5EF4-FFF2-40B4-BE49-F238E27FC236}">
-                <a16:creationId xmlns:a16="http://schemas.microsoft.com/office/drawing/2014/main" id="{0CD670A9-B06A-3448-BABA-FAD627500859}"/>
+                <a16:creationId xmlns:a16="http://schemas.microsoft.com/office/drawing/2014/main" id="{7ECEAF79-F4AC-E94E-9E55-220D0D396924}"/>
               </a:ext>
             </a:extLst>
           </p:cNvPr>
@@ -27989,7 +27768,7 @@
           <p:cNvPr id="5" name="Slide Number Placeholder 4">
             <a:extLst>
               <a:ext uri="{FF2B5EF4-FFF2-40B4-BE49-F238E27FC236}">
-                <a16:creationId xmlns:a16="http://schemas.microsoft.com/office/drawing/2014/main" id="{119DACAD-17C1-C249-A498-C4A1A1ADD334}"/>
+                <a16:creationId xmlns:a16="http://schemas.microsoft.com/office/drawing/2014/main" id="{372DC1A4-CE8B-DB4A-8F86-2508518C35D3}"/>
               </a:ext>
             </a:extLst>
           </p:cNvPr>
@@ -28017,7 +27796,7 @@
     </p:spTree>
     <p:extLst>
       <p:ext uri="{BB962C8B-B14F-4D97-AF65-F5344CB8AC3E}">
-        <p14:creationId xmlns:p14="http://schemas.microsoft.com/office/powerpoint/2010/main" val="4243232459"/>
+        <p14:creationId xmlns:p14="http://schemas.microsoft.com/office/powerpoint/2010/main" val="1513264745"/>
       </p:ext>
     </p:extLst>
   </p:cSld>
@@ -28084,7 +27863,7 @@
           <a:p>
             <a:r>
               <a:rPr lang="en-US" dirty="0"/>
-              <a:t>Part IV</a:t>
+              <a:t>Part V</a:t>
             </a:r>
           </a:p>
         </p:txBody>
@@ -28117,15 +27896,20 @@
           <a:p>
             <a:r>
               <a:rPr lang="en-US" dirty="0"/>
-              <a:t>Cisco Platform APIs Overview</a:t>
-            </a:r>
+              <a:t>Interact With Cisco Platform APIs Using </a:t>
+            </a:r>
+            <a:r>
+              <a:rPr lang="en-US" dirty="0" err="1"/>
+              <a:t>cURL</a:t>
+            </a:r>
+            <a:endParaRPr lang="en-US" dirty="0"/>
           </a:p>
         </p:txBody>
       </p:sp>
     </p:spTree>
     <p:extLst>
       <p:ext uri="{BB962C8B-B14F-4D97-AF65-F5344CB8AC3E}">
-        <p14:creationId xmlns:p14="http://schemas.microsoft.com/office/powerpoint/2010/main" val="899135878"/>
+        <p14:creationId xmlns:p14="http://schemas.microsoft.com/office/powerpoint/2010/main" val="2203929534"/>
       </p:ext>
     </p:extLst>
   </p:cSld>
@@ -28210,9 +27994,7 @@
         </p:nvSpPr>
         <p:spPr/>
         <p:txBody>
-          <a:bodyPr>
-            <a:normAutofit lnSpcReduction="10000"/>
-          </a:bodyPr>
+          <a:bodyPr/>
           <a:lstStyle/>
           <a:p>
             <a:r>
@@ -28253,20 +28035,6 @@
             </a:r>
           </a:p>
           <a:p>
-            <a:pPr lvl="1"/>
-            <a:r>
-              <a:rPr lang="en-US" dirty="0"/>
-              <a:t>Firepower</a:t>
-            </a:r>
-          </a:p>
-          <a:p>
-            <a:pPr lvl="1"/>
-            <a:r>
-              <a:rPr lang="en-US" dirty="0"/>
-              <a:t>SD-WAN</a:t>
-            </a:r>
-          </a:p>
-          <a:p>
             <a:r>
               <a:rPr lang="en-US" dirty="0"/>
               <a:t>Perform the following tasks:</a:t>
@@ -28276,21 +28044,37 @@
             <a:pPr lvl="1"/>
             <a:r>
               <a:rPr lang="en-US" dirty="0"/>
-              <a:t>Platform summary overview</a:t>
+              <a:t>Understand authentication methodology</a:t>
             </a:r>
           </a:p>
           <a:p>
             <a:pPr lvl="1"/>
             <a:r>
               <a:rPr lang="en-US" dirty="0"/>
-              <a:t>Review API documentation </a:t>
+              <a:t>Build </a:t>
+            </a:r>
+            <a:r>
+              <a:rPr lang="en-US" dirty="0" err="1"/>
+              <a:t>cURL</a:t>
+            </a:r>
+            <a:r>
+              <a:rPr lang="en-US" dirty="0"/>
+              <a:t> request to authenticate</a:t>
             </a:r>
           </a:p>
           <a:p>
             <a:pPr lvl="1"/>
             <a:r>
               <a:rPr lang="en-US" dirty="0"/>
-              <a:t>Review resources available for programmatic access/practice/testing</a:t>
+              <a:t>Build </a:t>
+            </a:r>
+            <a:r>
+              <a:rPr lang="en-US" dirty="0" err="1"/>
+              <a:t>cURL</a:t>
+            </a:r>
+            <a:r>
+              <a:rPr lang="en-US" dirty="0"/>
+              <a:t> request(s) to read/write data</a:t>
             </a:r>
           </a:p>
         </p:txBody>
@@ -28357,7 +28141,7 @@
     </p:spTree>
     <p:extLst>
       <p:ext uri="{BB962C8B-B14F-4D97-AF65-F5344CB8AC3E}">
-        <p14:creationId xmlns:p14="http://schemas.microsoft.com/office/powerpoint/2010/main" val="1513264745"/>
+        <p14:creationId xmlns:p14="http://schemas.microsoft.com/office/powerpoint/2010/main" val="2063027843"/>
       </p:ext>
     </p:extLst>
   </p:cSld>
@@ -28424,7 +28208,7 @@
           <a:p>
             <a:r>
               <a:rPr lang="en-US" dirty="0"/>
-              <a:t>Part V</a:t>
+              <a:t>Part VI</a:t>
             </a:r>
           </a:p>
         </p:txBody>
@@ -28457,20 +28241,15 @@
           <a:p>
             <a:r>
               <a:rPr lang="en-US" dirty="0"/>
-              <a:t>Interact With Cisco Platform APIs Using </a:t>
-            </a:r>
-            <a:r>
-              <a:rPr lang="en-US" dirty="0" err="1"/>
-              <a:t>cURL</a:t>
-            </a:r>
-            <a:endParaRPr lang="en-US" dirty="0"/>
+              <a:t>Interact With Cisco Platform APIs Using Python Requests</a:t>
+            </a:r>
           </a:p>
         </p:txBody>
       </p:sp>
     </p:spTree>
     <p:extLst>
       <p:ext uri="{BB962C8B-B14F-4D97-AF65-F5344CB8AC3E}">
-        <p14:creationId xmlns:p14="http://schemas.microsoft.com/office/powerpoint/2010/main" val="2203929534"/>
+        <p14:creationId xmlns:p14="http://schemas.microsoft.com/office/powerpoint/2010/main" val="4218248441"/>
       </p:ext>
     </p:extLst>
   </p:cSld>
@@ -28605,37 +28384,21 @@
             <a:pPr lvl="1"/>
             <a:r>
               <a:rPr lang="en-US" dirty="0"/>
-              <a:t>Understand authentication methodology</a:t>
+              <a:t>Review authentication methodology</a:t>
             </a:r>
           </a:p>
           <a:p>
             <a:pPr lvl="1"/>
             <a:r>
               <a:rPr lang="en-US" dirty="0"/>
-              <a:t>Build </a:t>
-            </a:r>
-            <a:r>
-              <a:rPr lang="en-US" dirty="0" err="1"/>
-              <a:t>cURL</a:t>
-            </a:r>
+              <a:t>Build Python scripts to authenticate</a:t>
+            </a:r>
+          </a:p>
+          <a:p>
+            <a:pPr lvl="1"/>
             <a:r>
               <a:rPr lang="en-US" dirty="0"/>
-              <a:t> request to authenticate</a:t>
-            </a:r>
-          </a:p>
-          <a:p>
-            <a:pPr lvl="1"/>
-            <a:r>
-              <a:rPr lang="en-US" dirty="0"/>
-              <a:t>Build </a:t>
-            </a:r>
-            <a:r>
-              <a:rPr lang="en-US" dirty="0" err="1"/>
-              <a:t>cURL</a:t>
-            </a:r>
-            <a:r>
-              <a:rPr lang="en-US" dirty="0"/>
-              <a:t> request(s) to read/write data</a:t>
+              <a:t>Build Python scripts to read/write data</a:t>
             </a:r>
           </a:p>
         </p:txBody>
@@ -28702,7 +28465,7 @@
     </p:spTree>
     <p:extLst>
       <p:ext uri="{BB962C8B-B14F-4D97-AF65-F5344CB8AC3E}">
-        <p14:creationId xmlns:p14="http://schemas.microsoft.com/office/powerpoint/2010/main" val="2063027843"/>
+        <p14:creationId xmlns:p14="http://schemas.microsoft.com/office/powerpoint/2010/main" val="232106193"/>
       </p:ext>
     </p:extLst>
   </p:cSld>
@@ -28769,7 +28532,7 @@
           <a:p>
             <a:r>
               <a:rPr lang="en-US" dirty="0"/>
-              <a:t>Part VI</a:t>
+              <a:t>Part VII</a:t>
             </a:r>
           </a:p>
         </p:txBody>
@@ -28802,7 +28565,7 @@
           <a:p>
             <a:r>
               <a:rPr lang="en-US" dirty="0"/>
-              <a:t>Interact With Cisco Platform APIs Using Python Requests</a:t>
+              <a:t>Quiz, Practice Resources, &amp; References</a:t>
             </a:r>
           </a:p>
         </p:txBody>
@@ -28810,7 +28573,7 @@
     </p:spTree>
     <p:extLst>
       <p:ext uri="{BB962C8B-B14F-4D97-AF65-F5344CB8AC3E}">
-        <p14:creationId xmlns:p14="http://schemas.microsoft.com/office/powerpoint/2010/main" val="4218248441"/>
+        <p14:creationId xmlns:p14="http://schemas.microsoft.com/office/powerpoint/2010/main" val="3392886013"/>
       </p:ext>
     </p:extLst>
   </p:cSld>
@@ -28872,7 +28635,7 @@
           <a:p>
             <a:r>
               <a:rPr lang="en-US" dirty="0"/>
-              <a:t>Outline</a:t>
+              <a:t>Slide Template</a:t>
             </a:r>
           </a:p>
         </p:txBody>
@@ -28900,66 +28663,7 @@
           <a:p>
             <a:r>
               <a:rPr lang="en-US" dirty="0"/>
-              <a:t>For each of these platforms:</a:t>
-            </a:r>
-          </a:p>
-          <a:p>
-            <a:pPr lvl="1"/>
-            <a:r>
-              <a:rPr lang="en-US" dirty="0"/>
-              <a:t>DNAC</a:t>
-            </a:r>
-          </a:p>
-          <a:p>
-            <a:pPr lvl="1"/>
-            <a:r>
-              <a:rPr lang="en-US" dirty="0" err="1"/>
-              <a:t>Webex</a:t>
-            </a:r>
-            <a:r>
-              <a:rPr lang="en-US" dirty="0"/>
-              <a:t> Teams</a:t>
-            </a:r>
-          </a:p>
-          <a:p>
-            <a:pPr lvl="1"/>
-            <a:r>
-              <a:rPr lang="en-US" dirty="0"/>
-              <a:t>Meraki</a:t>
-            </a:r>
-          </a:p>
-          <a:p>
-            <a:pPr lvl="1"/>
-            <a:r>
-              <a:rPr lang="en-US" dirty="0"/>
-              <a:t>ACI</a:t>
-            </a:r>
-          </a:p>
-          <a:p>
-            <a:r>
-              <a:rPr lang="en-US" dirty="0"/>
-              <a:t>Perform the following tasks:</a:t>
-            </a:r>
-          </a:p>
-          <a:p>
-            <a:pPr lvl="1"/>
-            <a:r>
-              <a:rPr lang="en-US" dirty="0"/>
-              <a:t>Review authentication methodology</a:t>
-            </a:r>
-          </a:p>
-          <a:p>
-            <a:pPr lvl="1"/>
-            <a:r>
-              <a:rPr lang="en-US" dirty="0"/>
-              <a:t>Build Python scripts to authenticate</a:t>
-            </a:r>
-          </a:p>
-          <a:p>
-            <a:pPr lvl="1"/>
-            <a:r>
-              <a:rPr lang="en-US" dirty="0"/>
-              <a:t>Build Python scripts to read/write data</a:t>
+              <a:t>Body template</a:t>
             </a:r>
           </a:p>
         </p:txBody>
@@ -29026,7 +28730,7 @@
     </p:spTree>
     <p:extLst>
       <p:ext uri="{BB962C8B-B14F-4D97-AF65-F5344CB8AC3E}">
-        <p14:creationId xmlns:p14="http://schemas.microsoft.com/office/powerpoint/2010/main" val="232106193"/>
+        <p14:creationId xmlns:p14="http://schemas.microsoft.com/office/powerpoint/2010/main" val="2709408928"/>
       </p:ext>
     </p:extLst>
   </p:cSld>
@@ -29070,7 +28774,7 @@
           <p:cNvPr id="2" name="Title 1">
             <a:extLst>
               <a:ext uri="{FF2B5EF4-FFF2-40B4-BE49-F238E27FC236}">
-                <a16:creationId xmlns:a16="http://schemas.microsoft.com/office/drawing/2014/main" id="{9D8D6E4C-FC36-3E4C-9387-96DD20072D9D}"/>
+                <a16:creationId xmlns:a16="http://schemas.microsoft.com/office/drawing/2014/main" id="{EB7C4089-1746-624B-8E73-D3DAB8E88CDD}"/>
               </a:ext>
             </a:extLst>
           </p:cNvPr>
@@ -29078,32 +28782,27 @@
             <a:spLocks noGrp="1"/>
           </p:cNvSpPr>
           <p:nvPr>
-            <p:ph type="ctrTitle"/>
+            <p:ph type="title"/>
           </p:nvPr>
         </p:nvSpPr>
-        <p:spPr>
-          <a:xfrm>
-            <a:off x="1524000" y="914013"/>
-            <a:ext cx="9144000" cy="2387600"/>
-          </a:xfrm>
-        </p:spPr>
+        <p:spPr/>
         <p:txBody>
           <a:bodyPr/>
           <a:lstStyle/>
           <a:p>
             <a:r>
               <a:rPr lang="en-US" dirty="0"/>
-              <a:t>Part VII</a:t>
-            </a:r>
-          </a:p>
-        </p:txBody>
-      </p:sp>
-      <p:sp>
-        <p:nvSpPr>
-          <p:cNvPr id="3" name="Subtitle 2">
+              <a:t>References</a:t>
+            </a:r>
+          </a:p>
+        </p:txBody>
+      </p:sp>
+      <p:sp>
+        <p:nvSpPr>
+          <p:cNvPr id="3" name="Content Placeholder 2">
             <a:extLst>
               <a:ext uri="{FF2B5EF4-FFF2-40B4-BE49-F238E27FC236}">
-                <a16:creationId xmlns:a16="http://schemas.microsoft.com/office/drawing/2014/main" id="{0451A0DE-9D64-5A48-94B5-5B4E42709819}"/>
+                <a16:creationId xmlns:a16="http://schemas.microsoft.com/office/drawing/2014/main" id="{65426B10-0364-A849-B3A4-1D0DA409155A}"/>
               </a:ext>
             </a:extLst>
           </p:cNvPr>
@@ -29111,30 +28810,145 @@
             <a:spLocks noGrp="1"/>
           </p:cNvSpPr>
           <p:nvPr>
-            <p:ph type="subTitle" idx="1"/>
+            <p:ph idx="1"/>
           </p:nvPr>
         </p:nvSpPr>
-        <p:spPr>
-          <a:xfrm>
-            <a:off x="1524000" y="3393688"/>
-            <a:ext cx="9144000" cy="1655762"/>
-          </a:xfrm>
-        </p:spPr>
+        <p:spPr/>
+        <p:txBody>
+          <a:bodyPr>
+            <a:normAutofit lnSpcReduction="10000"/>
+          </a:bodyPr>
+          <a:lstStyle/>
+          <a:p>
+            <a:r>
+              <a:rPr lang="en-US" dirty="0">
+                <a:hlinkClick r:id="rId2"/>
+              </a:rPr>
+              <a:t>https://www.linkedin.com/pulse/why-rest-api-so-popular-mangesh-bulkar/</a:t>
+            </a:r>
+            <a:endParaRPr lang="en-US" dirty="0">
+              <a:hlinkClick r:id="rId3"/>
+            </a:endParaRPr>
+          </a:p>
+          <a:p>
+            <a:r>
+              <a:rPr lang="en-US" dirty="0">
+                <a:hlinkClick r:id="rId3"/>
+              </a:rPr>
+              <a:t>https://en.wikipedia.org/wiki/CURL</a:t>
+            </a:r>
+            <a:endParaRPr lang="en-US" dirty="0"/>
+          </a:p>
+          <a:p>
+            <a:r>
+              <a:rPr lang="en-US" dirty="0">
+                <a:hlinkClick r:id="rId4"/>
+              </a:rPr>
+              <a:t>https://en.wikipedia.org/wiki/Requests_%28software%29</a:t>
+            </a:r>
+            <a:endParaRPr lang="en-US" dirty="0"/>
+          </a:p>
+          <a:p>
+            <a:r>
+              <a:rPr lang="en-US" dirty="0">
+                <a:hlinkClick r:id="rId5"/>
+              </a:rPr>
+              <a:t>https://curl.haxx.se</a:t>
+            </a:r>
+            <a:endParaRPr lang="en-US" dirty="0"/>
+          </a:p>
+          <a:p>
+            <a:r>
+              <a:rPr lang="en-US" dirty="0">
+                <a:hlinkClick r:id="rId6"/>
+              </a:rPr>
+              <a:t>https://requests.readthedocs.io/en/master/</a:t>
+            </a:r>
+            <a:endParaRPr lang="en-US" dirty="0"/>
+          </a:p>
+          <a:p>
+            <a:r>
+              <a:rPr lang="en-US" dirty="0"/>
+              <a:t>Cisco API documentation #1</a:t>
+            </a:r>
+          </a:p>
+          <a:p>
+            <a:r>
+              <a:rPr lang="en-US" dirty="0"/>
+              <a:t>Cisco API documentation #2</a:t>
+            </a:r>
+          </a:p>
+          <a:p>
+            <a:r>
+              <a:rPr lang="en-US" dirty="0"/>
+              <a:t>Cisco API documentation #3</a:t>
+            </a:r>
+          </a:p>
+        </p:txBody>
+      </p:sp>
+      <p:sp>
+        <p:nvSpPr>
+          <p:cNvPr id="4" name="Date Placeholder 3">
+            <a:extLst>
+              <a:ext uri="{FF2B5EF4-FFF2-40B4-BE49-F238E27FC236}">
+                <a16:creationId xmlns:a16="http://schemas.microsoft.com/office/drawing/2014/main" id="{7ECEAF79-F4AC-E94E-9E55-220D0D396924}"/>
+              </a:ext>
+            </a:extLst>
+          </p:cNvPr>
+          <p:cNvSpPr>
+            <a:spLocks noGrp="1"/>
+          </p:cNvSpPr>
+          <p:nvPr>
+            <p:ph type="dt" sz="half" idx="10"/>
+          </p:nvPr>
+        </p:nvSpPr>
+        <p:spPr/>
         <p:txBody>
           <a:bodyPr/>
           <a:lstStyle/>
           <a:p>
             <a:r>
-              <a:rPr lang="en-US" dirty="0"/>
-              <a:t>Quiz, Practice Resources, &amp; References</a:t>
-            </a:r>
+              <a:rPr lang="en-US"/>
+              <a:t>World Wide Technology ©</a:t>
+            </a:r>
+            <a:endParaRPr lang="en-US" dirty="0"/>
+          </a:p>
+        </p:txBody>
+      </p:sp>
+      <p:sp>
+        <p:nvSpPr>
+          <p:cNvPr id="5" name="Slide Number Placeholder 4">
+            <a:extLst>
+              <a:ext uri="{FF2B5EF4-FFF2-40B4-BE49-F238E27FC236}">
+                <a16:creationId xmlns:a16="http://schemas.microsoft.com/office/drawing/2014/main" id="{372DC1A4-CE8B-DB4A-8F86-2508518C35D3}"/>
+              </a:ext>
+            </a:extLst>
+          </p:cNvPr>
+          <p:cNvSpPr>
+            <a:spLocks noGrp="1"/>
+          </p:cNvSpPr>
+          <p:nvPr>
+            <p:ph type="sldNum" sz="quarter" idx="12"/>
+          </p:nvPr>
+        </p:nvSpPr>
+        <p:spPr/>
+        <p:txBody>
+          <a:bodyPr/>
+          <a:lstStyle/>
+          <a:p>
+            <a:fld id="{A44B02FA-DD2D-1844-AE35-8B2EAB0CF4EF}" type="slidenum">
+              <a:rPr lang="en-US" smtClean="0"/>
+              <a:pPr/>
+              <a:t>49</a:t>
+            </a:fld>
+            <a:endParaRPr lang="en-US" dirty="0"/>
           </a:p>
         </p:txBody>
       </p:sp>
     </p:spTree>
     <p:extLst>
       <p:ext uri="{BB962C8B-B14F-4D97-AF65-F5344CB8AC3E}">
-        <p14:creationId xmlns:p14="http://schemas.microsoft.com/office/powerpoint/2010/main" val="3392886013"/>
+        <p14:creationId xmlns:p14="http://schemas.microsoft.com/office/powerpoint/2010/main" val="3225595977"/>
       </p:ext>
     </p:extLst>
   </p:cSld>
@@ -29283,381 +29097,6 @@
       </p:grpSpPr>
       <p:sp>
         <p:nvSpPr>
-          <p:cNvPr id="2" name="Title 1">
-            <a:extLst>
-              <a:ext uri="{FF2B5EF4-FFF2-40B4-BE49-F238E27FC236}">
-                <a16:creationId xmlns:a16="http://schemas.microsoft.com/office/drawing/2014/main" id="{EB7C4089-1746-624B-8E73-D3DAB8E88CDD}"/>
-              </a:ext>
-            </a:extLst>
-          </p:cNvPr>
-          <p:cNvSpPr>
-            <a:spLocks noGrp="1"/>
-          </p:cNvSpPr>
-          <p:nvPr>
-            <p:ph type="title"/>
-          </p:nvPr>
-        </p:nvSpPr>
-        <p:spPr/>
-        <p:txBody>
-          <a:bodyPr/>
-          <a:lstStyle/>
-          <a:p>
-            <a:r>
-              <a:rPr lang="en-US" dirty="0"/>
-              <a:t>Slide Template</a:t>
-            </a:r>
-          </a:p>
-        </p:txBody>
-      </p:sp>
-      <p:sp>
-        <p:nvSpPr>
-          <p:cNvPr id="3" name="Content Placeholder 2">
-            <a:extLst>
-              <a:ext uri="{FF2B5EF4-FFF2-40B4-BE49-F238E27FC236}">
-                <a16:creationId xmlns:a16="http://schemas.microsoft.com/office/drawing/2014/main" id="{65426B10-0364-A849-B3A4-1D0DA409155A}"/>
-              </a:ext>
-            </a:extLst>
-          </p:cNvPr>
-          <p:cNvSpPr>
-            <a:spLocks noGrp="1"/>
-          </p:cNvSpPr>
-          <p:nvPr>
-            <p:ph idx="1"/>
-          </p:nvPr>
-        </p:nvSpPr>
-        <p:spPr/>
-        <p:txBody>
-          <a:bodyPr/>
-          <a:lstStyle/>
-          <a:p>
-            <a:r>
-              <a:rPr lang="en-US" dirty="0"/>
-              <a:t>Body template</a:t>
-            </a:r>
-          </a:p>
-        </p:txBody>
-      </p:sp>
-      <p:sp>
-        <p:nvSpPr>
-          <p:cNvPr id="4" name="Date Placeholder 3">
-            <a:extLst>
-              <a:ext uri="{FF2B5EF4-FFF2-40B4-BE49-F238E27FC236}">
-                <a16:creationId xmlns:a16="http://schemas.microsoft.com/office/drawing/2014/main" id="{7ECEAF79-F4AC-E94E-9E55-220D0D396924}"/>
-              </a:ext>
-            </a:extLst>
-          </p:cNvPr>
-          <p:cNvSpPr>
-            <a:spLocks noGrp="1"/>
-          </p:cNvSpPr>
-          <p:nvPr>
-            <p:ph type="dt" sz="half" idx="10"/>
-          </p:nvPr>
-        </p:nvSpPr>
-        <p:spPr/>
-        <p:txBody>
-          <a:bodyPr/>
-          <a:lstStyle/>
-          <a:p>
-            <a:r>
-              <a:rPr lang="en-US"/>
-              <a:t>World Wide Technology ©</a:t>
-            </a:r>
-            <a:endParaRPr lang="en-US" dirty="0"/>
-          </a:p>
-        </p:txBody>
-      </p:sp>
-      <p:sp>
-        <p:nvSpPr>
-          <p:cNvPr id="5" name="Slide Number Placeholder 4">
-            <a:extLst>
-              <a:ext uri="{FF2B5EF4-FFF2-40B4-BE49-F238E27FC236}">
-                <a16:creationId xmlns:a16="http://schemas.microsoft.com/office/drawing/2014/main" id="{372DC1A4-CE8B-DB4A-8F86-2508518C35D3}"/>
-              </a:ext>
-            </a:extLst>
-          </p:cNvPr>
-          <p:cNvSpPr>
-            <a:spLocks noGrp="1"/>
-          </p:cNvSpPr>
-          <p:nvPr>
-            <p:ph type="sldNum" sz="quarter" idx="12"/>
-          </p:nvPr>
-        </p:nvSpPr>
-        <p:spPr/>
-        <p:txBody>
-          <a:bodyPr/>
-          <a:lstStyle/>
-          <a:p>
-            <a:fld id="{A44B02FA-DD2D-1844-AE35-8B2EAB0CF4EF}" type="slidenum">
-              <a:rPr lang="en-US" smtClean="0"/>
-              <a:pPr/>
-              <a:t>50</a:t>
-            </a:fld>
-            <a:endParaRPr lang="en-US" dirty="0"/>
-          </a:p>
-        </p:txBody>
-      </p:sp>
-    </p:spTree>
-    <p:extLst>
-      <p:ext uri="{BB962C8B-B14F-4D97-AF65-F5344CB8AC3E}">
-        <p14:creationId xmlns:p14="http://schemas.microsoft.com/office/powerpoint/2010/main" val="2709408928"/>
-      </p:ext>
-    </p:extLst>
-  </p:cSld>
-  <p:clrMapOvr>
-    <a:masterClrMapping/>
-  </p:clrMapOvr>
-  <mc:AlternateContent xmlns:mc="http://schemas.openxmlformats.org/markup-compatibility/2006" xmlns:p14="http://schemas.microsoft.com/office/powerpoint/2010/main">
-    <mc:Choice Requires="p14">
-      <p:transition spd="med" p14:dur="700">
-        <p:fade/>
-      </p:transition>
-    </mc:Choice>
-    <mc:Fallback xmlns="">
-      <p:transition spd="med">
-        <p:fade/>
-      </p:transition>
-    </mc:Fallback>
-  </mc:AlternateContent>
-</p:sld>
-</file>
-
-<file path=ppt/slides/slide51.xml><?xml version="1.0" encoding="utf-8"?>
-<p:sld xmlns:a="http://schemas.openxmlformats.org/drawingml/2006/main" xmlns:r="http://schemas.openxmlformats.org/officeDocument/2006/relationships" xmlns:p="http://schemas.openxmlformats.org/presentationml/2006/main">
-  <p:cSld>
-    <p:spTree>
-      <p:nvGrpSpPr>
-        <p:cNvPr id="1" name=""/>
-        <p:cNvGrpSpPr/>
-        <p:nvPr/>
-      </p:nvGrpSpPr>
-      <p:grpSpPr>
-        <a:xfrm>
-          <a:off x="0" y="0"/>
-          <a:ext cx="0" cy="0"/>
-          <a:chOff x="0" y="0"/>
-          <a:chExt cx="0" cy="0"/>
-        </a:xfrm>
-      </p:grpSpPr>
-      <p:sp>
-        <p:nvSpPr>
-          <p:cNvPr id="2" name="Title 1">
-            <a:extLst>
-              <a:ext uri="{FF2B5EF4-FFF2-40B4-BE49-F238E27FC236}">
-                <a16:creationId xmlns:a16="http://schemas.microsoft.com/office/drawing/2014/main" id="{EB7C4089-1746-624B-8E73-D3DAB8E88CDD}"/>
-              </a:ext>
-            </a:extLst>
-          </p:cNvPr>
-          <p:cNvSpPr>
-            <a:spLocks noGrp="1"/>
-          </p:cNvSpPr>
-          <p:nvPr>
-            <p:ph type="title"/>
-          </p:nvPr>
-        </p:nvSpPr>
-        <p:spPr/>
-        <p:txBody>
-          <a:bodyPr/>
-          <a:lstStyle/>
-          <a:p>
-            <a:r>
-              <a:rPr lang="en-US" dirty="0"/>
-              <a:t>References</a:t>
-            </a:r>
-          </a:p>
-        </p:txBody>
-      </p:sp>
-      <p:sp>
-        <p:nvSpPr>
-          <p:cNvPr id="3" name="Content Placeholder 2">
-            <a:extLst>
-              <a:ext uri="{FF2B5EF4-FFF2-40B4-BE49-F238E27FC236}">
-                <a16:creationId xmlns:a16="http://schemas.microsoft.com/office/drawing/2014/main" id="{65426B10-0364-A849-B3A4-1D0DA409155A}"/>
-              </a:ext>
-            </a:extLst>
-          </p:cNvPr>
-          <p:cNvSpPr>
-            <a:spLocks noGrp="1"/>
-          </p:cNvSpPr>
-          <p:nvPr>
-            <p:ph idx="1"/>
-          </p:nvPr>
-        </p:nvSpPr>
-        <p:spPr/>
-        <p:txBody>
-          <a:bodyPr>
-            <a:normAutofit lnSpcReduction="10000"/>
-          </a:bodyPr>
-          <a:lstStyle/>
-          <a:p>
-            <a:r>
-              <a:rPr lang="en-US" dirty="0">
-                <a:hlinkClick r:id="rId2"/>
-              </a:rPr>
-              <a:t>https://www.linkedin.com/pulse/why-rest-api-so-popular-mangesh-bulkar/</a:t>
-            </a:r>
-            <a:endParaRPr lang="en-US" dirty="0">
-              <a:hlinkClick r:id="rId3"/>
-            </a:endParaRPr>
-          </a:p>
-          <a:p>
-            <a:r>
-              <a:rPr lang="en-US" dirty="0">
-                <a:hlinkClick r:id="rId3"/>
-              </a:rPr>
-              <a:t>https://en.wikipedia.org/wiki/CURL</a:t>
-            </a:r>
-            <a:endParaRPr lang="en-US" dirty="0"/>
-          </a:p>
-          <a:p>
-            <a:r>
-              <a:rPr lang="en-US" dirty="0">
-                <a:hlinkClick r:id="rId4"/>
-              </a:rPr>
-              <a:t>https://en.wikipedia.org/wiki/Requests_%28software%29</a:t>
-            </a:r>
-            <a:endParaRPr lang="en-US" dirty="0"/>
-          </a:p>
-          <a:p>
-            <a:r>
-              <a:rPr lang="en-US" dirty="0">
-                <a:hlinkClick r:id="rId5"/>
-              </a:rPr>
-              <a:t>https://curl.haxx.se</a:t>
-            </a:r>
-            <a:endParaRPr lang="en-US" dirty="0"/>
-          </a:p>
-          <a:p>
-            <a:r>
-              <a:rPr lang="en-US" dirty="0">
-                <a:hlinkClick r:id="rId6"/>
-              </a:rPr>
-              <a:t>https://requests.readthedocs.io/en/master/</a:t>
-            </a:r>
-            <a:endParaRPr lang="en-US" dirty="0"/>
-          </a:p>
-          <a:p>
-            <a:r>
-              <a:rPr lang="en-US" dirty="0"/>
-              <a:t>Cisco API documentation #1</a:t>
-            </a:r>
-          </a:p>
-          <a:p>
-            <a:r>
-              <a:rPr lang="en-US" dirty="0"/>
-              <a:t>Cisco API documentation #2</a:t>
-            </a:r>
-          </a:p>
-          <a:p>
-            <a:r>
-              <a:rPr lang="en-US" dirty="0"/>
-              <a:t>Cisco API documentation #3</a:t>
-            </a:r>
-          </a:p>
-        </p:txBody>
-      </p:sp>
-      <p:sp>
-        <p:nvSpPr>
-          <p:cNvPr id="4" name="Date Placeholder 3">
-            <a:extLst>
-              <a:ext uri="{FF2B5EF4-FFF2-40B4-BE49-F238E27FC236}">
-                <a16:creationId xmlns:a16="http://schemas.microsoft.com/office/drawing/2014/main" id="{7ECEAF79-F4AC-E94E-9E55-220D0D396924}"/>
-              </a:ext>
-            </a:extLst>
-          </p:cNvPr>
-          <p:cNvSpPr>
-            <a:spLocks noGrp="1"/>
-          </p:cNvSpPr>
-          <p:nvPr>
-            <p:ph type="dt" sz="half" idx="10"/>
-          </p:nvPr>
-        </p:nvSpPr>
-        <p:spPr/>
-        <p:txBody>
-          <a:bodyPr/>
-          <a:lstStyle/>
-          <a:p>
-            <a:r>
-              <a:rPr lang="en-US"/>
-              <a:t>World Wide Technology ©</a:t>
-            </a:r>
-            <a:endParaRPr lang="en-US" dirty="0"/>
-          </a:p>
-        </p:txBody>
-      </p:sp>
-      <p:sp>
-        <p:nvSpPr>
-          <p:cNvPr id="5" name="Slide Number Placeholder 4">
-            <a:extLst>
-              <a:ext uri="{FF2B5EF4-FFF2-40B4-BE49-F238E27FC236}">
-                <a16:creationId xmlns:a16="http://schemas.microsoft.com/office/drawing/2014/main" id="{372DC1A4-CE8B-DB4A-8F86-2508518C35D3}"/>
-              </a:ext>
-            </a:extLst>
-          </p:cNvPr>
-          <p:cNvSpPr>
-            <a:spLocks noGrp="1"/>
-          </p:cNvSpPr>
-          <p:nvPr>
-            <p:ph type="sldNum" sz="quarter" idx="12"/>
-          </p:nvPr>
-        </p:nvSpPr>
-        <p:spPr/>
-        <p:txBody>
-          <a:bodyPr/>
-          <a:lstStyle/>
-          <a:p>
-            <a:fld id="{A44B02FA-DD2D-1844-AE35-8B2EAB0CF4EF}" type="slidenum">
-              <a:rPr lang="en-US" smtClean="0"/>
-              <a:pPr/>
-              <a:t>51</a:t>
-            </a:fld>
-            <a:endParaRPr lang="en-US" dirty="0"/>
-          </a:p>
-        </p:txBody>
-      </p:sp>
-    </p:spTree>
-    <p:extLst>
-      <p:ext uri="{BB962C8B-B14F-4D97-AF65-F5344CB8AC3E}">
-        <p14:creationId xmlns:p14="http://schemas.microsoft.com/office/powerpoint/2010/main" val="3225595977"/>
-      </p:ext>
-    </p:extLst>
-  </p:cSld>
-  <p:clrMapOvr>
-    <a:masterClrMapping/>
-  </p:clrMapOvr>
-  <mc:AlternateContent xmlns:mc="http://schemas.openxmlformats.org/markup-compatibility/2006" xmlns:p14="http://schemas.microsoft.com/office/powerpoint/2010/main">
-    <mc:Choice Requires="p14">
-      <p:transition spd="med" p14:dur="700">
-        <p:fade/>
-      </p:transition>
-    </mc:Choice>
-    <mc:Fallback xmlns="">
-      <p:transition spd="med">
-        <p:fade/>
-      </p:transition>
-    </mc:Fallback>
-  </mc:AlternateContent>
-</p:sld>
-</file>
-
-<file path=ppt/slides/slide52.xml><?xml version="1.0" encoding="utf-8"?>
-<p:sld xmlns:a="http://schemas.openxmlformats.org/drawingml/2006/main" xmlns:r="http://schemas.openxmlformats.org/officeDocument/2006/relationships" xmlns:p="http://schemas.openxmlformats.org/presentationml/2006/main">
-  <p:cSld>
-    <p:spTree>
-      <p:nvGrpSpPr>
-        <p:cNvPr id="1" name=""/>
-        <p:cNvGrpSpPr/>
-        <p:nvPr/>
-      </p:nvGrpSpPr>
-      <p:grpSpPr>
-        <a:xfrm>
-          <a:off x="0" y="0"/>
-          <a:ext cx="0" cy="0"/>
-          <a:chOff x="0" y="0"/>
-          <a:chExt cx="0" cy="0"/>
-        </a:xfrm>
-      </p:grpSpPr>
-      <p:sp>
-        <p:nvSpPr>
           <p:cNvPr id="4" name="Date Placeholder 3">
             <a:extLst>
               <a:ext uri="{FF2B5EF4-FFF2-40B4-BE49-F238E27FC236}">
@@ -29709,7 +29148,7 @@
             <a:fld id="{A44B02FA-DD2D-1844-AE35-8B2EAB0CF4EF}" type="slidenum">
               <a:rPr lang="en-US" smtClean="0"/>
               <a:pPr/>
-              <a:t>52</a:t>
+              <a:t>50</a:t>
             </a:fld>
             <a:endParaRPr lang="en-US" dirty="0"/>
           </a:p>

</xml_diff>

<commit_message>
Added reference URL for Python Response Object
</commit_message>
<xml_diff>
--- a/curl-requests-foundations.pptx
+++ b/curl-requests-foundations.pptx
@@ -18968,6 +18968,211 @@
           </a:p>
         </p:txBody>
       </p:sp>
+      <p:sp>
+        <p:nvSpPr>
+          <p:cNvPr id="6" name="Content Placeholder 2">
+            <a:extLst>
+              <a:ext uri="{FF2B5EF4-FFF2-40B4-BE49-F238E27FC236}">
+                <a16:creationId xmlns:a16="http://schemas.microsoft.com/office/drawing/2014/main" id="{5535A7F3-1A0A-B445-9EF3-844850395584}"/>
+              </a:ext>
+            </a:extLst>
+          </p:cNvPr>
+          <p:cNvSpPr txBox="1">
+            <a:spLocks/>
+          </p:cNvSpPr>
+          <p:nvPr/>
+        </p:nvSpPr>
+        <p:spPr>
+          <a:xfrm>
+            <a:off x="363880" y="5649892"/>
+            <a:ext cx="11676444" cy="613459"/>
+          </a:xfrm>
+          <a:prstGeom prst="rect">
+            <a:avLst/>
+          </a:prstGeom>
+        </p:spPr>
+        <p:txBody>
+          <a:bodyPr vert="horz" lIns="91440" tIns="45720" rIns="91440" bIns="45720" rtlCol="0">
+            <a:normAutofit/>
+          </a:bodyPr>
+          <a:lstStyle>
+            <a:lvl1pPr marL="228600" indent="-228600" algn="l" defTabSz="914400" rtl="0" eaLnBrk="1" latinLnBrk="0" hangingPunct="1">
+              <a:lnSpc>
+                <a:spcPct val="90000"/>
+              </a:lnSpc>
+              <a:spcBef>
+                <a:spcPts val="1000"/>
+              </a:spcBef>
+              <a:buFont typeface="Arial" panose="020B0604020202020204" pitchFamily="34" charset="0"/>
+              <a:buChar char="•"/>
+              <a:defRPr sz="2800" kern="1200">
+                <a:solidFill>
+                  <a:schemeClr val="tx1"/>
+                </a:solidFill>
+                <a:latin typeface="+mn-lt"/>
+                <a:ea typeface="+mn-ea"/>
+                <a:cs typeface="+mn-cs"/>
+              </a:defRPr>
+            </a:lvl1pPr>
+            <a:lvl2pPr marL="685800" indent="-228600" algn="l" defTabSz="914400" rtl="0" eaLnBrk="1" latinLnBrk="0" hangingPunct="1">
+              <a:lnSpc>
+                <a:spcPct val="90000"/>
+              </a:lnSpc>
+              <a:spcBef>
+                <a:spcPts val="500"/>
+              </a:spcBef>
+              <a:buFont typeface="Arial" panose="020B0604020202020204" pitchFamily="34" charset="0"/>
+              <a:buChar char="•"/>
+              <a:defRPr sz="2400" kern="1200">
+                <a:solidFill>
+                  <a:schemeClr val="tx1"/>
+                </a:solidFill>
+                <a:latin typeface="+mn-lt"/>
+                <a:ea typeface="+mn-ea"/>
+                <a:cs typeface="+mn-cs"/>
+              </a:defRPr>
+            </a:lvl2pPr>
+            <a:lvl3pPr marL="1143000" indent="-228600" algn="l" defTabSz="914400" rtl="0" eaLnBrk="1" latinLnBrk="0" hangingPunct="1">
+              <a:lnSpc>
+                <a:spcPct val="90000"/>
+              </a:lnSpc>
+              <a:spcBef>
+                <a:spcPts val="500"/>
+              </a:spcBef>
+              <a:buFont typeface="Arial" panose="020B0604020202020204" pitchFamily="34" charset="0"/>
+              <a:buChar char="•"/>
+              <a:defRPr sz="2000" kern="1200">
+                <a:solidFill>
+                  <a:schemeClr val="tx1"/>
+                </a:solidFill>
+                <a:latin typeface="+mn-lt"/>
+                <a:ea typeface="+mn-ea"/>
+                <a:cs typeface="+mn-cs"/>
+              </a:defRPr>
+            </a:lvl3pPr>
+            <a:lvl4pPr marL="1600200" indent="-228600" algn="l" defTabSz="914400" rtl="0" eaLnBrk="1" latinLnBrk="0" hangingPunct="1">
+              <a:lnSpc>
+                <a:spcPct val="90000"/>
+              </a:lnSpc>
+              <a:spcBef>
+                <a:spcPts val="500"/>
+              </a:spcBef>
+              <a:buFont typeface="Arial" panose="020B0604020202020204" pitchFamily="34" charset="0"/>
+              <a:buChar char="•"/>
+              <a:defRPr sz="1800" kern="1200">
+                <a:solidFill>
+                  <a:schemeClr val="tx1"/>
+                </a:solidFill>
+                <a:latin typeface="+mn-lt"/>
+                <a:ea typeface="+mn-ea"/>
+                <a:cs typeface="+mn-cs"/>
+              </a:defRPr>
+            </a:lvl4pPr>
+            <a:lvl5pPr marL="2057400" indent="-228600" algn="l" defTabSz="914400" rtl="0" eaLnBrk="1" latinLnBrk="0" hangingPunct="1">
+              <a:lnSpc>
+                <a:spcPct val="90000"/>
+              </a:lnSpc>
+              <a:spcBef>
+                <a:spcPts val="500"/>
+              </a:spcBef>
+              <a:buFont typeface="Arial" panose="020B0604020202020204" pitchFamily="34" charset="0"/>
+              <a:buChar char="•"/>
+              <a:defRPr sz="1800" kern="1200">
+                <a:solidFill>
+                  <a:schemeClr val="tx1"/>
+                </a:solidFill>
+                <a:latin typeface="+mn-lt"/>
+                <a:ea typeface="+mn-ea"/>
+                <a:cs typeface="+mn-cs"/>
+              </a:defRPr>
+            </a:lvl5pPr>
+            <a:lvl6pPr marL="2514600" indent="-228600" algn="l" defTabSz="914400" rtl="0" eaLnBrk="1" latinLnBrk="0" hangingPunct="1">
+              <a:lnSpc>
+                <a:spcPct val="90000"/>
+              </a:lnSpc>
+              <a:spcBef>
+                <a:spcPts val="500"/>
+              </a:spcBef>
+              <a:buFont typeface="Arial" panose="020B0604020202020204" pitchFamily="34" charset="0"/>
+              <a:buChar char="•"/>
+              <a:defRPr sz="1800" kern="1200">
+                <a:solidFill>
+                  <a:schemeClr val="tx1"/>
+                </a:solidFill>
+                <a:latin typeface="+mn-lt"/>
+                <a:ea typeface="+mn-ea"/>
+                <a:cs typeface="+mn-cs"/>
+              </a:defRPr>
+            </a:lvl6pPr>
+            <a:lvl7pPr marL="2971800" indent="-228600" algn="l" defTabSz="914400" rtl="0" eaLnBrk="1" latinLnBrk="0" hangingPunct="1">
+              <a:lnSpc>
+                <a:spcPct val="90000"/>
+              </a:lnSpc>
+              <a:spcBef>
+                <a:spcPts val="500"/>
+              </a:spcBef>
+              <a:buFont typeface="Arial" panose="020B0604020202020204" pitchFamily="34" charset="0"/>
+              <a:buChar char="•"/>
+              <a:defRPr sz="1800" kern="1200">
+                <a:solidFill>
+                  <a:schemeClr val="tx1"/>
+                </a:solidFill>
+                <a:latin typeface="+mn-lt"/>
+                <a:ea typeface="+mn-ea"/>
+                <a:cs typeface="+mn-cs"/>
+              </a:defRPr>
+            </a:lvl7pPr>
+            <a:lvl8pPr marL="3429000" indent="-228600" algn="l" defTabSz="914400" rtl="0" eaLnBrk="1" latinLnBrk="0" hangingPunct="1">
+              <a:lnSpc>
+                <a:spcPct val="90000"/>
+              </a:lnSpc>
+              <a:spcBef>
+                <a:spcPts val="500"/>
+              </a:spcBef>
+              <a:buFont typeface="Arial" panose="020B0604020202020204" pitchFamily="34" charset="0"/>
+              <a:buChar char="•"/>
+              <a:defRPr sz="1800" kern="1200">
+                <a:solidFill>
+                  <a:schemeClr val="tx1"/>
+                </a:solidFill>
+                <a:latin typeface="+mn-lt"/>
+                <a:ea typeface="+mn-ea"/>
+                <a:cs typeface="+mn-cs"/>
+              </a:defRPr>
+            </a:lvl8pPr>
+            <a:lvl9pPr marL="3886200" indent="-228600" algn="l" defTabSz="914400" rtl="0" eaLnBrk="1" latinLnBrk="0" hangingPunct="1">
+              <a:lnSpc>
+                <a:spcPct val="90000"/>
+              </a:lnSpc>
+              <a:spcBef>
+                <a:spcPts val="500"/>
+              </a:spcBef>
+              <a:buFont typeface="Arial" panose="020B0604020202020204" pitchFamily="34" charset="0"/>
+              <a:buChar char="•"/>
+              <a:defRPr sz="1800" kern="1200">
+                <a:solidFill>
+                  <a:schemeClr val="tx1"/>
+                </a:solidFill>
+                <a:latin typeface="+mn-lt"/>
+                <a:ea typeface="+mn-ea"/>
+                <a:cs typeface="+mn-cs"/>
+              </a:defRPr>
+            </a:lvl9pPr>
+          </a:lstStyle>
+          <a:p>
+            <a:pPr marL="0" indent="0" algn="ctr">
+              <a:buNone/>
+            </a:pPr>
+            <a:r>
+              <a:rPr lang="en-US" dirty="0">
+                <a:hlinkClick r:id="rId3"/>
+              </a:rPr>
+              <a:t>https://2.python-requests.org/en/master/api/#requests.Response</a:t>
+            </a:r>
+            <a:endParaRPr lang="en-US" dirty="0"/>
+          </a:p>
+        </p:txBody>
+      </p:sp>
     </p:spTree>
     <p:extLst>
       <p:ext uri="{BB962C8B-B14F-4D97-AF65-F5344CB8AC3E}">
@@ -19727,6 +19932,50 @@
                             </p:childTnLst>
                           </p:cTn>
                         </p:par>
+                        <p:par>
+                          <p:cTn id="63" fill="hold">
+                            <p:stCondLst>
+                              <p:cond delay="500"/>
+                            </p:stCondLst>
+                            <p:childTnLst>
+                              <p:par>
+                                <p:cTn id="64" presetID="9" presetClass="entr" presetSubtype="0" fill="hold" grpId="0" nodeType="afterEffect">
+                                  <p:stCondLst>
+                                    <p:cond delay="0"/>
+                                  </p:stCondLst>
+                                  <p:childTnLst>
+                                    <p:set>
+                                      <p:cBhvr>
+                                        <p:cTn id="65" dur="1" fill="hold">
+                                          <p:stCondLst>
+                                            <p:cond delay="0"/>
+                                          </p:stCondLst>
+                                        </p:cTn>
+                                        <p:tgtEl>
+                                          <p:spTgt spid="6"/>
+                                        </p:tgtEl>
+                                        <p:attrNameLst>
+                                          <p:attrName>style.visibility</p:attrName>
+                                        </p:attrNameLst>
+                                      </p:cBhvr>
+                                      <p:to>
+                                        <p:strVal val="visible"/>
+                                      </p:to>
+                                    </p:set>
+                                    <p:animEffect transition="in" filter="dissolve">
+                                      <p:cBhvr>
+                                        <p:cTn id="66" dur="500"/>
+                                        <p:tgtEl>
+                                          <p:spTgt spid="6"/>
+                                        </p:tgtEl>
+                                      </p:cBhvr>
+                                    </p:animEffect>
+                                  </p:childTnLst>
+                                </p:cTn>
+                              </p:par>
+                            </p:childTnLst>
+                          </p:cTn>
+                        </p:par>
                       </p:childTnLst>
                     </p:cTn>
                   </p:par>
@@ -19753,6 +20002,7 @@
     </p:tnLst>
     <p:bldLst>
       <p:bldP spid="3" grpId="0" build="p" bldLvl="2"/>
+      <p:bldP spid="6" grpId="0"/>
     </p:bldLst>
   </p:timing>
 </p:sld>
@@ -28816,7 +29066,7 @@
         <p:spPr/>
         <p:txBody>
           <a:bodyPr>
-            <a:normAutofit lnSpcReduction="10000"/>
+            <a:normAutofit fontScale="92500"/>
           </a:bodyPr>
           <a:lstStyle/>
           <a:p>
@@ -28863,6 +29113,15 @@
                 <a:hlinkClick r:id="rId6"/>
               </a:rPr>
               <a:t>https://requests.readthedocs.io/en/master/</a:t>
+            </a:r>
+            <a:endParaRPr lang="en-US" dirty="0"/>
+          </a:p>
+          <a:p>
+            <a:r>
+              <a:rPr lang="en-US" dirty="0">
+                <a:hlinkClick r:id="rId7"/>
+              </a:rPr>
+              <a:t>https://2.python-requests.org/en/master/api/#requests.Response</a:t>
             </a:r>
             <a:endParaRPr lang="en-US" dirty="0"/>
           </a:p>

</xml_diff>

<commit_message>
Added ACI slides to Platform Overview section
</commit_message>
<xml_diff>
--- a/curl-requests-foundations.pptx
+++ b/curl-requests-foundations.pptx
@@ -5,7 +5,7 @@
     <p:sldMasterId id="2147483660" r:id="rId1"/>
   </p:sldMasterIdLst>
   <p:notesMasterIdLst>
-    <p:notesMasterId r:id="rId52"/>
+    <p:notesMasterId r:id="rId55"/>
   </p:notesMasterIdLst>
   <p:sldIdLst>
     <p:sldId id="256" r:id="rId2"/>
@@ -50,14 +50,17 @@
     <p:sldId id="376" r:id="rId41"/>
     <p:sldId id="322" r:id="rId42"/>
     <p:sldId id="329" r:id="rId43"/>
-    <p:sldId id="330" r:id="rId44"/>
-    <p:sldId id="328" r:id="rId45"/>
-    <p:sldId id="333" r:id="rId46"/>
-    <p:sldId id="334" r:id="rId47"/>
-    <p:sldId id="335" r:id="rId48"/>
-    <p:sldId id="311" r:id="rId49"/>
-    <p:sldId id="321" r:id="rId50"/>
-    <p:sldId id="280" r:id="rId51"/>
+    <p:sldId id="379" r:id="rId44"/>
+    <p:sldId id="381" r:id="rId45"/>
+    <p:sldId id="380" r:id="rId46"/>
+    <p:sldId id="330" r:id="rId47"/>
+    <p:sldId id="328" r:id="rId48"/>
+    <p:sldId id="333" r:id="rId49"/>
+    <p:sldId id="334" r:id="rId50"/>
+    <p:sldId id="335" r:id="rId51"/>
+    <p:sldId id="311" r:id="rId52"/>
+    <p:sldId id="321" r:id="rId53"/>
+    <p:sldId id="280" r:id="rId54"/>
   </p:sldIdLst>
   <p:sldSz cx="12192000" cy="6858000"/>
   <p:notesSz cx="6858000" cy="9144000"/>
@@ -257,7 +260,7 @@
           <a:p>
             <a:fld id="{966F6F5D-167E-1849-B841-EB0817BB385A}" type="datetimeFigureOut">
               <a:rPr lang="en-US" smtClean="0"/>
-              <a:t>4/12/20</a:t>
+              <a:t>4/15/20</a:t>
             </a:fld>
             <a:endParaRPr lang="en-US"/>
           </a:p>
@@ -2482,27 +2485,7 @@
           <a:bodyPr/>
           <a:lstStyle/>
           <a:p>
-            <a:pPr marL="0" marR="0" lvl="0" indent="0" algn="l" defTabSz="914400" rtl="0" eaLnBrk="1" fontAlgn="auto" latinLnBrk="0" hangingPunct="1">
-              <a:lnSpc>
-                <a:spcPct val="100000"/>
-              </a:lnSpc>
-              <a:spcBef>
-                <a:spcPts val="0"/>
-              </a:spcBef>
-              <a:spcAft>
-                <a:spcPts val="0"/>
-              </a:spcAft>
-              <a:buClrTx/>
-              <a:buSzTx/>
-              <a:buFontTx/>
-              <a:buNone/>
-              <a:tabLst/>
-              <a:defRPr/>
-            </a:pPr>
-            <a:r>
-              <a:rPr lang="en-US" dirty="0"/>
-              <a:t>// TODO</a:t>
-            </a:r>
+            <a:endParaRPr lang="en-US" dirty="0"/>
           </a:p>
         </p:txBody>
       </p:sp>
@@ -2532,7 +2515,7 @@
     </p:spTree>
     <p:extLst>
       <p:ext uri="{BB962C8B-B14F-4D97-AF65-F5344CB8AC3E}">
-        <p14:creationId xmlns:p14="http://schemas.microsoft.com/office/powerpoint/2010/main" val="3481472389"/>
+        <p14:creationId xmlns:p14="http://schemas.microsoft.com/office/powerpoint/2010/main" val="3473359765"/>
       </p:ext>
     </p:extLst>
   </p:cSld>
@@ -2586,26 +2569,29 @@
           <a:bodyPr/>
           <a:lstStyle/>
           <a:p>
-            <a:pPr marL="0" marR="0" lvl="0" indent="0" algn="l" defTabSz="914400" rtl="0" eaLnBrk="1" fontAlgn="auto" latinLnBrk="0" hangingPunct="1">
-              <a:lnSpc>
-                <a:spcPct val="100000"/>
-              </a:lnSpc>
-              <a:spcBef>
-                <a:spcPts val="0"/>
-              </a:spcBef>
-              <a:spcAft>
-                <a:spcPts val="0"/>
-              </a:spcAft>
-              <a:buClrTx/>
-              <a:buSzTx/>
-              <a:buFontTx/>
-              <a:buNone/>
-              <a:tabLst/>
-              <a:defRPr/>
-            </a:pPr>
             <a:r>
               <a:rPr lang="en-US" dirty="0"/>
               <a:t>// TODO</a:t>
+            </a:r>
+          </a:p>
+          <a:p>
+            <a:pPr marL="171450" indent="-171450">
+              <a:buFont typeface="Arial" panose="020B0604020202020204" pitchFamily="34" charset="0"/>
+              <a:buChar char="•"/>
+            </a:pPr>
+            <a:r>
+              <a:rPr lang="en-US" dirty="0"/>
+              <a:t>The .json specifies the content type</a:t>
+            </a:r>
+          </a:p>
+          <a:p>
+            <a:pPr marL="628650" lvl="1" indent="-171450">
+              <a:buFont typeface="Arial" panose="020B0604020202020204" pitchFamily="34" charset="0"/>
+              <a:buChar char="•"/>
+            </a:pPr>
+            <a:r>
+              <a:rPr lang="en-US" dirty="0"/>
+              <a:t>Replace the .json with .xml for any API endpoint to interact using XML-formatted payloads</a:t>
             </a:r>
           </a:p>
         </p:txBody>
@@ -2627,7 +2613,7 @@
           <a:p>
             <a:fld id="{020CF8D1-BA82-5045-ACF9-1AA42AD6A519}" type="slidenum">
               <a:rPr lang="en-US" smtClean="0"/>
-              <a:t>45</a:t>
+              <a:t>44</a:t>
             </a:fld>
             <a:endParaRPr lang="en-US"/>
           </a:p>
@@ -2636,7 +2622,7 @@
     </p:spTree>
     <p:extLst>
       <p:ext uri="{BB962C8B-B14F-4D97-AF65-F5344CB8AC3E}">
-        <p14:creationId xmlns:p14="http://schemas.microsoft.com/office/powerpoint/2010/main" val="3252389655"/>
+        <p14:creationId xmlns:p14="http://schemas.microsoft.com/office/powerpoint/2010/main" val="2418575212"/>
       </p:ext>
     </p:extLst>
   </p:cSld>
@@ -2690,27 +2676,7 @@
           <a:bodyPr/>
           <a:lstStyle/>
           <a:p>
-            <a:pPr marL="0" marR="0" lvl="0" indent="0" algn="l" defTabSz="914400" rtl="0" eaLnBrk="1" fontAlgn="auto" latinLnBrk="0" hangingPunct="1">
-              <a:lnSpc>
-                <a:spcPct val="100000"/>
-              </a:lnSpc>
-              <a:spcBef>
-                <a:spcPts val="0"/>
-              </a:spcBef>
-              <a:spcAft>
-                <a:spcPts val="0"/>
-              </a:spcAft>
-              <a:buClrTx/>
-              <a:buSzTx/>
-              <a:buFontTx/>
-              <a:buNone/>
-              <a:tabLst/>
-              <a:defRPr/>
-            </a:pPr>
-            <a:r>
-              <a:rPr lang="en-US" dirty="0"/>
-              <a:t>// TODO</a:t>
-            </a:r>
+            <a:endParaRPr lang="en-US" dirty="0"/>
           </a:p>
         </p:txBody>
       </p:sp>
@@ -2731,7 +2697,7 @@
           <a:p>
             <a:fld id="{020CF8D1-BA82-5045-ACF9-1AA42AD6A519}" type="slidenum">
               <a:rPr lang="en-US" smtClean="0"/>
-              <a:t>47</a:t>
+              <a:t>45</a:t>
             </a:fld>
             <a:endParaRPr lang="en-US"/>
           </a:p>
@@ -2740,7 +2706,7 @@
     </p:spTree>
     <p:extLst>
       <p:ext uri="{BB962C8B-B14F-4D97-AF65-F5344CB8AC3E}">
-        <p14:creationId xmlns:p14="http://schemas.microsoft.com/office/powerpoint/2010/main" val="4152409612"/>
+        <p14:creationId xmlns:p14="http://schemas.microsoft.com/office/powerpoint/2010/main" val="1428853916"/>
       </p:ext>
     </p:extLst>
   </p:cSld>
@@ -2980,6 +2946,318 @@
     <p:extLst>
       <p:ext uri="{BB962C8B-B14F-4D97-AF65-F5344CB8AC3E}">
         <p14:creationId xmlns:p14="http://schemas.microsoft.com/office/powerpoint/2010/main" val="3892212133"/>
+      </p:ext>
+    </p:extLst>
+  </p:cSld>
+  <p:clrMapOvr>
+    <a:masterClrMapping/>
+  </p:clrMapOvr>
+</p:notes>
+</file>
+
+<file path=ppt/notesSlides/notesSlide30.xml><?xml version="1.0" encoding="utf-8"?>
+<p:notes xmlns:a="http://schemas.openxmlformats.org/drawingml/2006/main" xmlns:r="http://schemas.openxmlformats.org/officeDocument/2006/relationships" xmlns:p="http://schemas.openxmlformats.org/presentationml/2006/main">
+  <p:cSld>
+    <p:spTree>
+      <p:nvGrpSpPr>
+        <p:cNvPr id="1" name=""/>
+        <p:cNvGrpSpPr/>
+        <p:nvPr/>
+      </p:nvGrpSpPr>
+      <p:grpSpPr>
+        <a:xfrm>
+          <a:off x="0" y="0"/>
+          <a:ext cx="0" cy="0"/>
+          <a:chOff x="0" y="0"/>
+          <a:chExt cx="0" cy="0"/>
+        </a:xfrm>
+      </p:grpSpPr>
+      <p:sp>
+        <p:nvSpPr>
+          <p:cNvPr id="2" name="Slide Image Placeholder 1"/>
+          <p:cNvSpPr>
+            <a:spLocks noGrp="1" noRot="1" noChangeAspect="1"/>
+          </p:cNvSpPr>
+          <p:nvPr>
+            <p:ph type="sldImg"/>
+          </p:nvPr>
+        </p:nvSpPr>
+        <p:spPr/>
+      </p:sp>
+      <p:sp>
+        <p:nvSpPr>
+          <p:cNvPr id="3" name="Notes Placeholder 2"/>
+          <p:cNvSpPr>
+            <a:spLocks noGrp="1"/>
+          </p:cNvSpPr>
+          <p:nvPr>
+            <p:ph type="body" idx="1"/>
+          </p:nvPr>
+        </p:nvSpPr>
+        <p:spPr/>
+        <p:txBody>
+          <a:bodyPr/>
+          <a:lstStyle/>
+          <a:p>
+            <a:pPr marL="0" marR="0" lvl="0" indent="0" algn="l" defTabSz="914400" rtl="0" eaLnBrk="1" fontAlgn="auto" latinLnBrk="0" hangingPunct="1">
+              <a:lnSpc>
+                <a:spcPct val="100000"/>
+              </a:lnSpc>
+              <a:spcBef>
+                <a:spcPts val="0"/>
+              </a:spcBef>
+              <a:spcAft>
+                <a:spcPts val="0"/>
+              </a:spcAft>
+              <a:buClrTx/>
+              <a:buSzTx/>
+              <a:buFontTx/>
+              <a:buNone/>
+              <a:tabLst/>
+              <a:defRPr/>
+            </a:pPr>
+            <a:r>
+              <a:rPr lang="en-US" dirty="0"/>
+              <a:t>// TODO</a:t>
+            </a:r>
+          </a:p>
+        </p:txBody>
+      </p:sp>
+      <p:sp>
+        <p:nvSpPr>
+          <p:cNvPr id="4" name="Slide Number Placeholder 3"/>
+          <p:cNvSpPr>
+            <a:spLocks noGrp="1"/>
+          </p:cNvSpPr>
+          <p:nvPr>
+            <p:ph type="sldNum" sz="quarter" idx="5"/>
+          </p:nvPr>
+        </p:nvSpPr>
+        <p:spPr/>
+        <p:txBody>
+          <a:bodyPr/>
+          <a:lstStyle/>
+          <a:p>
+            <a:fld id="{020CF8D1-BA82-5045-ACF9-1AA42AD6A519}" type="slidenum">
+              <a:rPr lang="en-US" smtClean="0"/>
+              <a:t>46</a:t>
+            </a:fld>
+            <a:endParaRPr lang="en-US"/>
+          </a:p>
+        </p:txBody>
+      </p:sp>
+    </p:spTree>
+    <p:extLst>
+      <p:ext uri="{BB962C8B-B14F-4D97-AF65-F5344CB8AC3E}">
+        <p14:creationId xmlns:p14="http://schemas.microsoft.com/office/powerpoint/2010/main" val="3481472389"/>
+      </p:ext>
+    </p:extLst>
+  </p:cSld>
+  <p:clrMapOvr>
+    <a:masterClrMapping/>
+  </p:clrMapOvr>
+</p:notes>
+</file>
+
+<file path=ppt/notesSlides/notesSlide31.xml><?xml version="1.0" encoding="utf-8"?>
+<p:notes xmlns:a="http://schemas.openxmlformats.org/drawingml/2006/main" xmlns:r="http://schemas.openxmlformats.org/officeDocument/2006/relationships" xmlns:p="http://schemas.openxmlformats.org/presentationml/2006/main">
+  <p:cSld>
+    <p:spTree>
+      <p:nvGrpSpPr>
+        <p:cNvPr id="1" name=""/>
+        <p:cNvGrpSpPr/>
+        <p:nvPr/>
+      </p:nvGrpSpPr>
+      <p:grpSpPr>
+        <a:xfrm>
+          <a:off x="0" y="0"/>
+          <a:ext cx="0" cy="0"/>
+          <a:chOff x="0" y="0"/>
+          <a:chExt cx="0" cy="0"/>
+        </a:xfrm>
+      </p:grpSpPr>
+      <p:sp>
+        <p:nvSpPr>
+          <p:cNvPr id="2" name="Slide Image Placeholder 1"/>
+          <p:cNvSpPr>
+            <a:spLocks noGrp="1" noRot="1" noChangeAspect="1"/>
+          </p:cNvSpPr>
+          <p:nvPr>
+            <p:ph type="sldImg"/>
+          </p:nvPr>
+        </p:nvSpPr>
+        <p:spPr/>
+      </p:sp>
+      <p:sp>
+        <p:nvSpPr>
+          <p:cNvPr id="3" name="Notes Placeholder 2"/>
+          <p:cNvSpPr>
+            <a:spLocks noGrp="1"/>
+          </p:cNvSpPr>
+          <p:nvPr>
+            <p:ph type="body" idx="1"/>
+          </p:nvPr>
+        </p:nvSpPr>
+        <p:spPr/>
+        <p:txBody>
+          <a:bodyPr/>
+          <a:lstStyle/>
+          <a:p>
+            <a:pPr marL="0" marR="0" lvl="0" indent="0" algn="l" defTabSz="914400" rtl="0" eaLnBrk="1" fontAlgn="auto" latinLnBrk="0" hangingPunct="1">
+              <a:lnSpc>
+                <a:spcPct val="100000"/>
+              </a:lnSpc>
+              <a:spcBef>
+                <a:spcPts val="0"/>
+              </a:spcBef>
+              <a:spcAft>
+                <a:spcPts val="0"/>
+              </a:spcAft>
+              <a:buClrTx/>
+              <a:buSzTx/>
+              <a:buFontTx/>
+              <a:buNone/>
+              <a:tabLst/>
+              <a:defRPr/>
+            </a:pPr>
+            <a:r>
+              <a:rPr lang="en-US" dirty="0"/>
+              <a:t>// TODO</a:t>
+            </a:r>
+          </a:p>
+        </p:txBody>
+      </p:sp>
+      <p:sp>
+        <p:nvSpPr>
+          <p:cNvPr id="4" name="Slide Number Placeholder 3"/>
+          <p:cNvSpPr>
+            <a:spLocks noGrp="1"/>
+          </p:cNvSpPr>
+          <p:nvPr>
+            <p:ph type="sldNum" sz="quarter" idx="5"/>
+          </p:nvPr>
+        </p:nvSpPr>
+        <p:spPr/>
+        <p:txBody>
+          <a:bodyPr/>
+          <a:lstStyle/>
+          <a:p>
+            <a:fld id="{020CF8D1-BA82-5045-ACF9-1AA42AD6A519}" type="slidenum">
+              <a:rPr lang="en-US" smtClean="0"/>
+              <a:t>48</a:t>
+            </a:fld>
+            <a:endParaRPr lang="en-US"/>
+          </a:p>
+        </p:txBody>
+      </p:sp>
+    </p:spTree>
+    <p:extLst>
+      <p:ext uri="{BB962C8B-B14F-4D97-AF65-F5344CB8AC3E}">
+        <p14:creationId xmlns:p14="http://schemas.microsoft.com/office/powerpoint/2010/main" val="3252389655"/>
+      </p:ext>
+    </p:extLst>
+  </p:cSld>
+  <p:clrMapOvr>
+    <a:masterClrMapping/>
+  </p:clrMapOvr>
+</p:notes>
+</file>
+
+<file path=ppt/notesSlides/notesSlide32.xml><?xml version="1.0" encoding="utf-8"?>
+<p:notes xmlns:a="http://schemas.openxmlformats.org/drawingml/2006/main" xmlns:r="http://schemas.openxmlformats.org/officeDocument/2006/relationships" xmlns:p="http://schemas.openxmlformats.org/presentationml/2006/main">
+  <p:cSld>
+    <p:spTree>
+      <p:nvGrpSpPr>
+        <p:cNvPr id="1" name=""/>
+        <p:cNvGrpSpPr/>
+        <p:nvPr/>
+      </p:nvGrpSpPr>
+      <p:grpSpPr>
+        <a:xfrm>
+          <a:off x="0" y="0"/>
+          <a:ext cx="0" cy="0"/>
+          <a:chOff x="0" y="0"/>
+          <a:chExt cx="0" cy="0"/>
+        </a:xfrm>
+      </p:grpSpPr>
+      <p:sp>
+        <p:nvSpPr>
+          <p:cNvPr id="2" name="Slide Image Placeholder 1"/>
+          <p:cNvSpPr>
+            <a:spLocks noGrp="1" noRot="1" noChangeAspect="1"/>
+          </p:cNvSpPr>
+          <p:nvPr>
+            <p:ph type="sldImg"/>
+          </p:nvPr>
+        </p:nvSpPr>
+        <p:spPr/>
+      </p:sp>
+      <p:sp>
+        <p:nvSpPr>
+          <p:cNvPr id="3" name="Notes Placeholder 2"/>
+          <p:cNvSpPr>
+            <a:spLocks noGrp="1"/>
+          </p:cNvSpPr>
+          <p:nvPr>
+            <p:ph type="body" idx="1"/>
+          </p:nvPr>
+        </p:nvSpPr>
+        <p:spPr/>
+        <p:txBody>
+          <a:bodyPr/>
+          <a:lstStyle/>
+          <a:p>
+            <a:pPr marL="0" marR="0" lvl="0" indent="0" algn="l" defTabSz="914400" rtl="0" eaLnBrk="1" fontAlgn="auto" latinLnBrk="0" hangingPunct="1">
+              <a:lnSpc>
+                <a:spcPct val="100000"/>
+              </a:lnSpc>
+              <a:spcBef>
+                <a:spcPts val="0"/>
+              </a:spcBef>
+              <a:spcAft>
+                <a:spcPts val="0"/>
+              </a:spcAft>
+              <a:buClrTx/>
+              <a:buSzTx/>
+              <a:buFontTx/>
+              <a:buNone/>
+              <a:tabLst/>
+              <a:defRPr/>
+            </a:pPr>
+            <a:r>
+              <a:rPr lang="en-US" dirty="0"/>
+              <a:t>// TODO</a:t>
+            </a:r>
+          </a:p>
+        </p:txBody>
+      </p:sp>
+      <p:sp>
+        <p:nvSpPr>
+          <p:cNvPr id="4" name="Slide Number Placeholder 3"/>
+          <p:cNvSpPr>
+            <a:spLocks noGrp="1"/>
+          </p:cNvSpPr>
+          <p:nvPr>
+            <p:ph type="sldNum" sz="quarter" idx="5"/>
+          </p:nvPr>
+        </p:nvSpPr>
+        <p:spPr/>
+        <p:txBody>
+          <a:bodyPr/>
+          <a:lstStyle/>
+          <a:p>
+            <a:fld id="{020CF8D1-BA82-5045-ACF9-1AA42AD6A519}" type="slidenum">
+              <a:rPr lang="en-US" smtClean="0"/>
+              <a:t>50</a:t>
+            </a:fld>
+            <a:endParaRPr lang="en-US"/>
+          </a:p>
+        </p:txBody>
+      </p:sp>
+    </p:spTree>
+    <p:extLst>
+      <p:ext uri="{BB962C8B-B14F-4D97-AF65-F5344CB8AC3E}">
+        <p14:creationId xmlns:p14="http://schemas.microsoft.com/office/powerpoint/2010/main" val="4152409612"/>
       </p:ext>
     </p:extLst>
   </p:cSld>
@@ -27166,7 +27444,7 @@
                                         <p:tgtEl>
                                           <p:spTgt spid="3">
                                             <p:txEl>
-                                              <p:charRg st="282" end="335"/>
+                                              <p:pRg st="6" end="6"/>
                                             </p:txEl>
                                           </p:spTgt>
                                         </p:tgtEl>
@@ -27184,7 +27462,7 @@
                                         <p:tgtEl>
                                           <p:spTgt spid="3">
                                             <p:txEl>
-                                              <p:charRg st="282" end="335"/>
+                                              <p:pRg st="6" end="6"/>
                                             </p:txEl>
                                           </p:spTgt>
                                         </p:tgtEl>
@@ -27315,7 +27593,7 @@
                                         <p:tgtEl>
                                           <p:spTgt spid="3">
                                             <p:txEl>
-                                              <p:charRg st="335" end="382"/>
+                                              <p:pRg st="7" end="7"/>
                                             </p:txEl>
                                           </p:spTgt>
                                         </p:tgtEl>
@@ -27333,7 +27611,7 @@
                                         <p:tgtEl>
                                           <p:spTgt spid="3">
                                             <p:txEl>
-                                              <p:charRg st="335" end="382"/>
+                                              <p:pRg st="7" end="7"/>
                                             </p:txEl>
                                           </p:spTgt>
                                         </p:tgtEl>
@@ -27420,7 +27698,7 @@
                                         <p:tgtEl>
                                           <p:spTgt spid="3">
                                             <p:txEl>
-                                              <p:charRg st="382" end="446"/>
+                                              <p:pRg st="8" end="8"/>
                                             </p:txEl>
                                           </p:spTgt>
                                         </p:tgtEl>
@@ -27438,7 +27716,7 @@
                                         <p:tgtEl>
                                           <p:spTgt spid="3">
                                             <p:txEl>
-                                              <p:charRg st="382" end="446"/>
+                                              <p:pRg st="8" end="8"/>
                                             </p:txEl>
                                           </p:spTgt>
                                         </p:tgtEl>
@@ -27525,7 +27803,7 @@
                                         <p:tgtEl>
                                           <p:spTgt spid="3">
                                             <p:txEl>
-                                              <p:charRg st="446" end="521"/>
+                                              <p:pRg st="9" end="9"/>
                                             </p:txEl>
                                           </p:spTgt>
                                         </p:tgtEl>
@@ -27543,7 +27821,7 @@
                                         <p:tgtEl>
                                           <p:spTgt spid="3">
                                             <p:txEl>
-                                              <p:charRg st="446" end="521"/>
+                                              <p:pRg st="9" end="9"/>
                                             </p:txEl>
                                           </p:spTgt>
                                         </p:tgtEl>
@@ -28066,7 +28344,35 @@
             <a:pPr lvl="1"/>
             <a:r>
               <a:rPr lang="en-US" dirty="0"/>
+              <a:t>ACI</a:t>
+            </a:r>
+          </a:p>
+          <a:p>
+            <a:pPr lvl="1"/>
+            <a:r>
+              <a:rPr lang="en-US" dirty="0"/>
               <a:t>DNAC</a:t>
+            </a:r>
+          </a:p>
+          <a:p>
+            <a:pPr lvl="1"/>
+            <a:r>
+              <a:rPr lang="en-US" dirty="0"/>
+              <a:t>Firepower</a:t>
+            </a:r>
+          </a:p>
+          <a:p>
+            <a:pPr lvl="1"/>
+            <a:r>
+              <a:rPr lang="en-US" dirty="0"/>
+              <a:t>Meraki</a:t>
+            </a:r>
+          </a:p>
+          <a:p>
+            <a:pPr lvl="1"/>
+            <a:r>
+              <a:rPr lang="en-US" dirty="0"/>
+              <a:t>SD-WAN</a:t>
             </a:r>
           </a:p>
           <a:p>
@@ -28078,34 +28384,6 @@
             <a:r>
               <a:rPr lang="en-US" dirty="0"/>
               <a:t> Teams</a:t>
-            </a:r>
-          </a:p>
-          <a:p>
-            <a:pPr lvl="1"/>
-            <a:r>
-              <a:rPr lang="en-US" dirty="0"/>
-              <a:t>Meraki</a:t>
-            </a:r>
-          </a:p>
-          <a:p>
-            <a:pPr lvl="1"/>
-            <a:r>
-              <a:rPr lang="en-US" dirty="0"/>
-              <a:t>ACI</a:t>
-            </a:r>
-          </a:p>
-          <a:p>
-            <a:pPr lvl="1"/>
-            <a:r>
-              <a:rPr lang="en-US" dirty="0"/>
-              <a:t>Firepower</a:t>
-            </a:r>
-          </a:p>
-          <a:p>
-            <a:pPr lvl="1"/>
-            <a:r>
-              <a:rPr lang="en-US" dirty="0"/>
-              <a:t>SD-WAN</a:t>
             </a:r>
           </a:p>
           <a:p>
@@ -28243,7 +28521,7 @@
           <p:cNvPr id="2" name="Title 1">
             <a:extLst>
               <a:ext uri="{FF2B5EF4-FFF2-40B4-BE49-F238E27FC236}">
-                <a16:creationId xmlns:a16="http://schemas.microsoft.com/office/drawing/2014/main" id="{9D8D6E4C-FC36-3E4C-9387-96DD20072D9D}"/>
+                <a16:creationId xmlns:a16="http://schemas.microsoft.com/office/drawing/2014/main" id="{A2E3F575-354A-2940-BFCA-9CCF6B4D772D}"/>
               </a:ext>
             </a:extLst>
           </p:cNvPr>
@@ -28251,32 +28529,27 @@
             <a:spLocks noGrp="1"/>
           </p:cNvSpPr>
           <p:nvPr>
-            <p:ph type="ctrTitle"/>
+            <p:ph type="title"/>
           </p:nvPr>
         </p:nvSpPr>
-        <p:spPr>
-          <a:xfrm>
-            <a:off x="1524000" y="914013"/>
-            <a:ext cx="9144000" cy="2387600"/>
-          </a:xfrm>
-        </p:spPr>
+        <p:spPr/>
         <p:txBody>
           <a:bodyPr/>
           <a:lstStyle/>
           <a:p>
             <a:r>
               <a:rPr lang="en-US" dirty="0"/>
-              <a:t>Part V</a:t>
+              <a:t>Application Centric Infrastructure (ACI)</a:t>
             </a:r>
           </a:p>
         </p:txBody>
       </p:sp>
       <p:sp>
         <p:nvSpPr>
-          <p:cNvPr id="3" name="Subtitle 2">
+          <p:cNvPr id="3" name="Content Placeholder 2">
             <a:extLst>
               <a:ext uri="{FF2B5EF4-FFF2-40B4-BE49-F238E27FC236}">
-                <a16:creationId xmlns:a16="http://schemas.microsoft.com/office/drawing/2014/main" id="{0451A0DE-9D64-5A48-94B5-5B4E42709819}"/>
+                <a16:creationId xmlns:a16="http://schemas.microsoft.com/office/drawing/2014/main" id="{4382774F-7ED2-5544-84A3-E36874911B38}"/>
               </a:ext>
             </a:extLst>
           </p:cNvPr>
@@ -28284,27 +28557,125 @@
             <a:spLocks noGrp="1"/>
           </p:cNvSpPr>
           <p:nvPr>
-            <p:ph type="subTitle" idx="1"/>
+            <p:ph idx="1"/>
           </p:nvPr>
         </p:nvSpPr>
-        <p:spPr>
-          <a:xfrm>
-            <a:off x="1524000" y="3393688"/>
-            <a:ext cx="9144000" cy="1655762"/>
-          </a:xfrm>
-        </p:spPr>
+        <p:spPr/>
+        <p:txBody>
+          <a:bodyPr>
+            <a:normAutofit/>
+          </a:bodyPr>
+          <a:lstStyle/>
+          <a:p>
+            <a:r>
+              <a:rPr lang="en-US" dirty="0"/>
+              <a:t>What is it?</a:t>
+            </a:r>
+          </a:p>
+          <a:p>
+            <a:pPr lvl="1"/>
+            <a:r>
+              <a:rPr lang="en-US" dirty="0"/>
+              <a:t>Physical and virtual datacenter SDN switching solution</a:t>
+            </a:r>
+          </a:p>
+          <a:p>
+            <a:pPr lvl="1"/>
+            <a:r>
+              <a:rPr lang="en-US" dirty="0"/>
+              <a:t>Spans on-premises, co-location, public cloud environments</a:t>
+            </a:r>
+          </a:p>
+          <a:p>
+            <a:r>
+              <a:rPr lang="en-US" dirty="0"/>
+              <a:t>What is the controller?</a:t>
+            </a:r>
+          </a:p>
+          <a:p>
+            <a:pPr lvl="1"/>
+            <a:r>
+              <a:rPr lang="en-US" dirty="0"/>
+              <a:t>Application Policy Infrastructure Controller (APIC)</a:t>
+            </a:r>
+          </a:p>
+          <a:p>
+            <a:r>
+              <a:rPr lang="en-US" dirty="0"/>
+              <a:t>REST API Details:</a:t>
+            </a:r>
+          </a:p>
+          <a:p>
+            <a:pPr lvl="1"/>
+            <a:r>
+              <a:rPr lang="en-US" dirty="0"/>
+              <a:t>HTTP methods – GET, POST, &amp; DELETE</a:t>
+            </a:r>
+          </a:p>
+          <a:p>
+            <a:pPr lvl="1"/>
+            <a:r>
+              <a:rPr lang="en-US" dirty="0"/>
+              <a:t>Content types – JSON and XML</a:t>
+            </a:r>
+          </a:p>
+        </p:txBody>
+      </p:sp>
+      <p:sp>
+        <p:nvSpPr>
+          <p:cNvPr id="4" name="Date Placeholder 3">
+            <a:extLst>
+              <a:ext uri="{FF2B5EF4-FFF2-40B4-BE49-F238E27FC236}">
+                <a16:creationId xmlns:a16="http://schemas.microsoft.com/office/drawing/2014/main" id="{87334516-EE7D-424E-9D4B-979F8C53BB44}"/>
+              </a:ext>
+            </a:extLst>
+          </p:cNvPr>
+          <p:cNvSpPr>
+            <a:spLocks noGrp="1"/>
+          </p:cNvSpPr>
+          <p:nvPr>
+            <p:ph type="dt" sz="half" idx="10"/>
+          </p:nvPr>
+        </p:nvSpPr>
+        <p:spPr/>
         <p:txBody>
           <a:bodyPr/>
           <a:lstStyle/>
           <a:p>
             <a:r>
-              <a:rPr lang="en-US" dirty="0"/>
-              <a:t>Interact With Cisco Platform APIs Using </a:t>
-            </a:r>
-            <a:r>
-              <a:rPr lang="en-US" dirty="0" err="1"/>
-              <a:t>cURL</a:t>
-            </a:r>
+              <a:rPr lang="en-US"/>
+              <a:t>World Wide Technology ©</a:t>
+            </a:r>
+            <a:endParaRPr lang="en-US" dirty="0"/>
+          </a:p>
+        </p:txBody>
+      </p:sp>
+      <p:sp>
+        <p:nvSpPr>
+          <p:cNvPr id="5" name="Slide Number Placeholder 4">
+            <a:extLst>
+              <a:ext uri="{FF2B5EF4-FFF2-40B4-BE49-F238E27FC236}">
+                <a16:creationId xmlns:a16="http://schemas.microsoft.com/office/drawing/2014/main" id="{FBDCE2CF-870D-8442-9A14-D51A59D6E593}"/>
+              </a:ext>
+            </a:extLst>
+          </p:cNvPr>
+          <p:cNvSpPr>
+            <a:spLocks noGrp="1"/>
+          </p:cNvSpPr>
+          <p:nvPr>
+            <p:ph type="sldNum" sz="quarter" idx="12"/>
+          </p:nvPr>
+        </p:nvSpPr>
+        <p:spPr/>
+        <p:txBody>
+          <a:bodyPr/>
+          <a:lstStyle/>
+          <a:p>
+            <a:fld id="{A44B02FA-DD2D-1844-AE35-8B2EAB0CF4EF}" type="slidenum">
+              <a:rPr lang="en-US" smtClean="0"/>
+              <a:pPr/>
+              <a:t>43</a:t>
+            </a:fld>
             <a:endParaRPr lang="en-US" dirty="0"/>
           </a:p>
         </p:txBody>
@@ -28312,7 +28683,7 @@
     </p:spTree>
     <p:extLst>
       <p:ext uri="{BB962C8B-B14F-4D97-AF65-F5344CB8AC3E}">
-        <p14:creationId xmlns:p14="http://schemas.microsoft.com/office/powerpoint/2010/main" val="2203929534"/>
+        <p14:creationId xmlns:p14="http://schemas.microsoft.com/office/powerpoint/2010/main" val="3995493825"/>
       </p:ext>
     </p:extLst>
   </p:cSld>
@@ -28331,6 +28702,437 @@
       </p:transition>
     </mc:Fallback>
   </mc:AlternateContent>
+  <p:timing>
+    <p:tnLst>
+      <p:par>
+        <p:cTn id="1" dur="indefinite" restart="never" nodeType="tmRoot">
+          <p:childTnLst>
+            <p:seq concurrent="1" nextAc="seek">
+              <p:cTn id="2" dur="indefinite" nodeType="mainSeq">
+                <p:childTnLst>
+                  <p:par>
+                    <p:cTn id="3" fill="hold">
+                      <p:stCondLst>
+                        <p:cond delay="indefinite"/>
+                      </p:stCondLst>
+                      <p:childTnLst>
+                        <p:par>
+                          <p:cTn id="4" fill="hold">
+                            <p:stCondLst>
+                              <p:cond delay="0"/>
+                            </p:stCondLst>
+                            <p:childTnLst>
+                              <p:par>
+                                <p:cTn id="5" presetID="9" presetClass="entr" presetSubtype="0" fill="hold" grpId="0" nodeType="clickEffect">
+                                  <p:stCondLst>
+                                    <p:cond delay="0"/>
+                                  </p:stCondLst>
+                                  <p:childTnLst>
+                                    <p:set>
+                                      <p:cBhvr>
+                                        <p:cTn id="6" dur="1" fill="hold">
+                                          <p:stCondLst>
+                                            <p:cond delay="0"/>
+                                          </p:stCondLst>
+                                        </p:cTn>
+                                        <p:tgtEl>
+                                          <p:spTgt spid="3">
+                                            <p:txEl>
+                                              <p:pRg st="0" end="0"/>
+                                            </p:txEl>
+                                          </p:spTgt>
+                                        </p:tgtEl>
+                                        <p:attrNameLst>
+                                          <p:attrName>style.visibility</p:attrName>
+                                        </p:attrNameLst>
+                                      </p:cBhvr>
+                                      <p:to>
+                                        <p:strVal val="visible"/>
+                                      </p:to>
+                                    </p:set>
+                                    <p:animEffect transition="in" filter="dissolve">
+                                      <p:cBhvr>
+                                        <p:cTn id="7" dur="500"/>
+                                        <p:tgtEl>
+                                          <p:spTgt spid="3">
+                                            <p:txEl>
+                                              <p:pRg st="0" end="0"/>
+                                            </p:txEl>
+                                          </p:spTgt>
+                                        </p:tgtEl>
+                                      </p:cBhvr>
+                                    </p:animEffect>
+                                  </p:childTnLst>
+                                </p:cTn>
+                              </p:par>
+                              <p:par>
+                                <p:cTn id="8" presetID="9" presetClass="entr" presetSubtype="0" fill="hold" grpId="0" nodeType="withEffect">
+                                  <p:stCondLst>
+                                    <p:cond delay="0"/>
+                                  </p:stCondLst>
+                                  <p:childTnLst>
+                                    <p:set>
+                                      <p:cBhvr>
+                                        <p:cTn id="9" dur="1" fill="hold">
+                                          <p:stCondLst>
+                                            <p:cond delay="0"/>
+                                          </p:stCondLst>
+                                        </p:cTn>
+                                        <p:tgtEl>
+                                          <p:spTgt spid="3">
+                                            <p:txEl>
+                                              <p:pRg st="1" end="1"/>
+                                            </p:txEl>
+                                          </p:spTgt>
+                                        </p:tgtEl>
+                                        <p:attrNameLst>
+                                          <p:attrName>style.visibility</p:attrName>
+                                        </p:attrNameLst>
+                                      </p:cBhvr>
+                                      <p:to>
+                                        <p:strVal val="visible"/>
+                                      </p:to>
+                                    </p:set>
+                                    <p:animEffect transition="in" filter="dissolve">
+                                      <p:cBhvr>
+                                        <p:cTn id="10" dur="500"/>
+                                        <p:tgtEl>
+                                          <p:spTgt spid="3">
+                                            <p:txEl>
+                                              <p:pRg st="1" end="1"/>
+                                            </p:txEl>
+                                          </p:spTgt>
+                                        </p:tgtEl>
+                                      </p:cBhvr>
+                                    </p:animEffect>
+                                  </p:childTnLst>
+                                </p:cTn>
+                              </p:par>
+                              <p:par>
+                                <p:cTn id="11" presetID="9" presetClass="entr" presetSubtype="0" fill="hold" grpId="0" nodeType="withEffect">
+                                  <p:stCondLst>
+                                    <p:cond delay="0"/>
+                                  </p:stCondLst>
+                                  <p:childTnLst>
+                                    <p:set>
+                                      <p:cBhvr>
+                                        <p:cTn id="12" dur="1" fill="hold">
+                                          <p:stCondLst>
+                                            <p:cond delay="0"/>
+                                          </p:stCondLst>
+                                        </p:cTn>
+                                        <p:tgtEl>
+                                          <p:spTgt spid="3">
+                                            <p:txEl>
+                                              <p:pRg st="2" end="2"/>
+                                            </p:txEl>
+                                          </p:spTgt>
+                                        </p:tgtEl>
+                                        <p:attrNameLst>
+                                          <p:attrName>style.visibility</p:attrName>
+                                        </p:attrNameLst>
+                                      </p:cBhvr>
+                                      <p:to>
+                                        <p:strVal val="visible"/>
+                                      </p:to>
+                                    </p:set>
+                                    <p:animEffect transition="in" filter="dissolve">
+                                      <p:cBhvr>
+                                        <p:cTn id="13" dur="500"/>
+                                        <p:tgtEl>
+                                          <p:spTgt spid="3">
+                                            <p:txEl>
+                                              <p:pRg st="2" end="2"/>
+                                            </p:txEl>
+                                          </p:spTgt>
+                                        </p:tgtEl>
+                                      </p:cBhvr>
+                                    </p:animEffect>
+                                  </p:childTnLst>
+                                </p:cTn>
+                              </p:par>
+                            </p:childTnLst>
+                          </p:cTn>
+                        </p:par>
+                      </p:childTnLst>
+                    </p:cTn>
+                  </p:par>
+                  <p:par>
+                    <p:cTn id="14" fill="hold">
+                      <p:stCondLst>
+                        <p:cond delay="indefinite"/>
+                      </p:stCondLst>
+                      <p:childTnLst>
+                        <p:par>
+                          <p:cTn id="15" fill="hold">
+                            <p:stCondLst>
+                              <p:cond delay="0"/>
+                            </p:stCondLst>
+                            <p:childTnLst>
+                              <p:par>
+                                <p:cTn id="16" presetID="9" presetClass="entr" presetSubtype="0" fill="hold" grpId="0" nodeType="clickEffect">
+                                  <p:stCondLst>
+                                    <p:cond delay="0"/>
+                                  </p:stCondLst>
+                                  <p:childTnLst>
+                                    <p:set>
+                                      <p:cBhvr>
+                                        <p:cTn id="17" dur="1" fill="hold">
+                                          <p:stCondLst>
+                                            <p:cond delay="0"/>
+                                          </p:stCondLst>
+                                        </p:cTn>
+                                        <p:tgtEl>
+                                          <p:spTgt spid="3">
+                                            <p:txEl>
+                                              <p:pRg st="3" end="3"/>
+                                            </p:txEl>
+                                          </p:spTgt>
+                                        </p:tgtEl>
+                                        <p:attrNameLst>
+                                          <p:attrName>style.visibility</p:attrName>
+                                        </p:attrNameLst>
+                                      </p:cBhvr>
+                                      <p:to>
+                                        <p:strVal val="visible"/>
+                                      </p:to>
+                                    </p:set>
+                                    <p:animEffect transition="in" filter="dissolve">
+                                      <p:cBhvr>
+                                        <p:cTn id="18" dur="500"/>
+                                        <p:tgtEl>
+                                          <p:spTgt spid="3">
+                                            <p:txEl>
+                                              <p:pRg st="3" end="3"/>
+                                            </p:txEl>
+                                          </p:spTgt>
+                                        </p:tgtEl>
+                                      </p:cBhvr>
+                                    </p:animEffect>
+                                  </p:childTnLst>
+                                </p:cTn>
+                              </p:par>
+                              <p:par>
+                                <p:cTn id="19" presetID="9" presetClass="entr" presetSubtype="0" fill="hold" grpId="0" nodeType="withEffect">
+                                  <p:stCondLst>
+                                    <p:cond delay="0"/>
+                                  </p:stCondLst>
+                                  <p:childTnLst>
+                                    <p:set>
+                                      <p:cBhvr>
+                                        <p:cTn id="20" dur="1" fill="hold">
+                                          <p:stCondLst>
+                                            <p:cond delay="0"/>
+                                          </p:stCondLst>
+                                        </p:cTn>
+                                        <p:tgtEl>
+                                          <p:spTgt spid="3">
+                                            <p:txEl>
+                                              <p:pRg st="4" end="4"/>
+                                            </p:txEl>
+                                          </p:spTgt>
+                                        </p:tgtEl>
+                                        <p:attrNameLst>
+                                          <p:attrName>style.visibility</p:attrName>
+                                        </p:attrNameLst>
+                                      </p:cBhvr>
+                                      <p:to>
+                                        <p:strVal val="visible"/>
+                                      </p:to>
+                                    </p:set>
+                                    <p:animEffect transition="in" filter="dissolve">
+                                      <p:cBhvr>
+                                        <p:cTn id="21" dur="500"/>
+                                        <p:tgtEl>
+                                          <p:spTgt spid="3">
+                                            <p:txEl>
+                                              <p:pRg st="4" end="4"/>
+                                            </p:txEl>
+                                          </p:spTgt>
+                                        </p:tgtEl>
+                                      </p:cBhvr>
+                                    </p:animEffect>
+                                  </p:childTnLst>
+                                </p:cTn>
+                              </p:par>
+                            </p:childTnLst>
+                          </p:cTn>
+                        </p:par>
+                      </p:childTnLst>
+                    </p:cTn>
+                  </p:par>
+                  <p:par>
+                    <p:cTn id="22" fill="hold">
+                      <p:stCondLst>
+                        <p:cond delay="indefinite"/>
+                      </p:stCondLst>
+                      <p:childTnLst>
+                        <p:par>
+                          <p:cTn id="23" fill="hold">
+                            <p:stCondLst>
+                              <p:cond delay="0"/>
+                            </p:stCondLst>
+                            <p:childTnLst>
+                              <p:par>
+                                <p:cTn id="24" presetID="9" presetClass="entr" presetSubtype="0" fill="hold" grpId="0" nodeType="clickEffect">
+                                  <p:stCondLst>
+                                    <p:cond delay="0"/>
+                                  </p:stCondLst>
+                                  <p:childTnLst>
+                                    <p:set>
+                                      <p:cBhvr>
+                                        <p:cTn id="25" dur="1" fill="hold">
+                                          <p:stCondLst>
+                                            <p:cond delay="0"/>
+                                          </p:stCondLst>
+                                        </p:cTn>
+                                        <p:tgtEl>
+                                          <p:spTgt spid="3">
+                                            <p:txEl>
+                                              <p:pRg st="5" end="5"/>
+                                            </p:txEl>
+                                          </p:spTgt>
+                                        </p:tgtEl>
+                                        <p:attrNameLst>
+                                          <p:attrName>style.visibility</p:attrName>
+                                        </p:attrNameLst>
+                                      </p:cBhvr>
+                                      <p:to>
+                                        <p:strVal val="visible"/>
+                                      </p:to>
+                                    </p:set>
+                                    <p:animEffect transition="in" filter="dissolve">
+                                      <p:cBhvr>
+                                        <p:cTn id="26" dur="500"/>
+                                        <p:tgtEl>
+                                          <p:spTgt spid="3">
+                                            <p:txEl>
+                                              <p:pRg st="5" end="5"/>
+                                            </p:txEl>
+                                          </p:spTgt>
+                                        </p:tgtEl>
+                                      </p:cBhvr>
+                                    </p:animEffect>
+                                  </p:childTnLst>
+                                </p:cTn>
+                              </p:par>
+                              <p:par>
+                                <p:cTn id="27" presetID="9" presetClass="entr" presetSubtype="0" fill="hold" grpId="0" nodeType="withEffect">
+                                  <p:stCondLst>
+                                    <p:cond delay="0"/>
+                                  </p:stCondLst>
+                                  <p:childTnLst>
+                                    <p:set>
+                                      <p:cBhvr>
+                                        <p:cTn id="28" dur="1" fill="hold">
+                                          <p:stCondLst>
+                                            <p:cond delay="0"/>
+                                          </p:stCondLst>
+                                        </p:cTn>
+                                        <p:tgtEl>
+                                          <p:spTgt spid="3">
+                                            <p:txEl>
+                                              <p:pRg st="6" end="6"/>
+                                            </p:txEl>
+                                          </p:spTgt>
+                                        </p:tgtEl>
+                                        <p:attrNameLst>
+                                          <p:attrName>style.visibility</p:attrName>
+                                        </p:attrNameLst>
+                                      </p:cBhvr>
+                                      <p:to>
+                                        <p:strVal val="visible"/>
+                                      </p:to>
+                                    </p:set>
+                                    <p:animEffect transition="in" filter="dissolve">
+                                      <p:cBhvr>
+                                        <p:cTn id="29" dur="500"/>
+                                        <p:tgtEl>
+                                          <p:spTgt spid="3">
+                                            <p:txEl>
+                                              <p:pRg st="6" end="6"/>
+                                            </p:txEl>
+                                          </p:spTgt>
+                                        </p:tgtEl>
+                                      </p:cBhvr>
+                                    </p:animEffect>
+                                  </p:childTnLst>
+                                </p:cTn>
+                              </p:par>
+                              <p:par>
+                                <p:cTn id="30" presetID="9" presetClass="entr" presetSubtype="0" fill="hold" grpId="0" nodeType="withEffect">
+                                  <p:stCondLst>
+                                    <p:cond delay="0"/>
+                                  </p:stCondLst>
+                                  <p:childTnLst>
+                                    <p:set>
+                                      <p:cBhvr>
+                                        <p:cTn id="31" dur="1" fill="hold">
+                                          <p:stCondLst>
+                                            <p:cond delay="0"/>
+                                          </p:stCondLst>
+                                        </p:cTn>
+                                        <p:tgtEl>
+                                          <p:spTgt spid="3">
+                                            <p:txEl>
+                                              <p:pRg st="7" end="7"/>
+                                            </p:txEl>
+                                          </p:spTgt>
+                                        </p:tgtEl>
+                                        <p:attrNameLst>
+                                          <p:attrName>style.visibility</p:attrName>
+                                        </p:attrNameLst>
+                                      </p:cBhvr>
+                                      <p:to>
+                                        <p:strVal val="visible"/>
+                                      </p:to>
+                                    </p:set>
+                                    <p:animEffect transition="in" filter="dissolve">
+                                      <p:cBhvr>
+                                        <p:cTn id="32" dur="500"/>
+                                        <p:tgtEl>
+                                          <p:spTgt spid="3">
+                                            <p:txEl>
+                                              <p:pRg st="7" end="7"/>
+                                            </p:txEl>
+                                          </p:spTgt>
+                                        </p:tgtEl>
+                                      </p:cBhvr>
+                                    </p:animEffect>
+                                  </p:childTnLst>
+                                </p:cTn>
+                              </p:par>
+                            </p:childTnLst>
+                          </p:cTn>
+                        </p:par>
+                      </p:childTnLst>
+                    </p:cTn>
+                  </p:par>
+                </p:childTnLst>
+              </p:cTn>
+              <p:prevCondLst>
+                <p:cond evt="onPrev" delay="0">
+                  <p:tgtEl>
+                    <p:sldTgt/>
+                  </p:tgtEl>
+                </p:cond>
+              </p:prevCondLst>
+              <p:nextCondLst>
+                <p:cond evt="onNext" delay="0">
+                  <p:tgtEl>
+                    <p:sldTgt/>
+                  </p:tgtEl>
+                </p:cond>
+              </p:nextCondLst>
+            </p:seq>
+          </p:childTnLst>
+        </p:cTn>
+      </p:par>
+    </p:tnLst>
+    <p:bldLst>
+      <p:bldP spid="3" grpId="0" build="p"/>
+    </p:bldLst>
+  </p:timing>
 </p:sld>
 </file>
 
@@ -28356,7 +29158,7 @@
           <p:cNvPr id="2" name="Title 1">
             <a:extLst>
               <a:ext uri="{FF2B5EF4-FFF2-40B4-BE49-F238E27FC236}">
-                <a16:creationId xmlns:a16="http://schemas.microsoft.com/office/drawing/2014/main" id="{EB7C4089-1746-624B-8E73-D3DAB8E88CDD}"/>
+                <a16:creationId xmlns:a16="http://schemas.microsoft.com/office/drawing/2014/main" id="{A2E3F575-354A-2940-BFCA-9CCF6B4D772D}"/>
               </a:ext>
             </a:extLst>
           </p:cNvPr>
@@ -28374,7 +29176,7 @@
           <a:p>
             <a:r>
               <a:rPr lang="en-US" dirty="0"/>
-              <a:t>Outline</a:t>
+              <a:t>Application Centric Infrastructure (ACI)</a:t>
             </a:r>
           </a:p>
         </p:txBody>
@@ -28384,7 +29186,7 @@
           <p:cNvPr id="3" name="Content Placeholder 2">
             <a:extLst>
               <a:ext uri="{FF2B5EF4-FFF2-40B4-BE49-F238E27FC236}">
-                <a16:creationId xmlns:a16="http://schemas.microsoft.com/office/drawing/2014/main" id="{65426B10-0364-A849-B3A4-1D0DA409155A}"/>
+                <a16:creationId xmlns:a16="http://schemas.microsoft.com/office/drawing/2014/main" id="{4382774F-7ED2-5544-84A3-E36874911B38}"/>
               </a:ext>
             </a:extLst>
           </p:cNvPr>
@@ -28397,87 +29199,276 @@
         </p:nvSpPr>
         <p:spPr/>
         <p:txBody>
-          <a:bodyPr/>
+          <a:bodyPr>
+            <a:normAutofit/>
+          </a:bodyPr>
           <a:lstStyle/>
           <a:p>
             <a:r>
               <a:rPr lang="en-US" dirty="0"/>
-              <a:t>For each of these platforms:</a:t>
+              <a:t>API Authentication</a:t>
             </a:r>
           </a:p>
           <a:p>
             <a:pPr lvl="1"/>
             <a:r>
               <a:rPr lang="en-US" dirty="0"/>
-              <a:t>DNAC</a:t>
-            </a:r>
+              <a:t>URL – </a:t>
+            </a:r>
+            <a:r>
+              <a:rPr lang="en-US" b="1" i="1" dirty="0">
+                <a:solidFill>
+                  <a:srgbClr val="FFFF00"/>
+                </a:solidFill>
+              </a:rPr>
+              <a:t>https://</a:t>
+            </a:r>
+            <a:r>
+              <a:rPr lang="en-US" b="1" i="1" dirty="0" err="1">
+                <a:solidFill>
+                  <a:srgbClr val="FF0000"/>
+                </a:solidFill>
+              </a:rPr>
+              <a:t>apic</a:t>
+            </a:r>
+            <a:r>
+              <a:rPr lang="en-US" b="1" i="1" dirty="0">
+                <a:solidFill>
+                  <a:srgbClr val="FF0000"/>
+                </a:solidFill>
+              </a:rPr>
+              <a:t>-address</a:t>
+            </a:r>
+            <a:r>
+              <a:rPr lang="en-US" b="1" i="1" dirty="0">
+                <a:solidFill>
+                  <a:srgbClr val="FFFF00"/>
+                </a:solidFill>
+              </a:rPr>
+              <a:t>/api/</a:t>
+            </a:r>
+            <a:r>
+              <a:rPr lang="en-US" b="1" i="1" dirty="0" err="1">
+                <a:solidFill>
+                  <a:srgbClr val="FFFF00"/>
+                </a:solidFill>
+              </a:rPr>
+              <a:t>aaaLogin.json</a:t>
+            </a:r>
+            <a:r>
+              <a:rPr lang="en-US" dirty="0">
+                <a:solidFill>
+                  <a:srgbClr val="FFFF00"/>
+                </a:solidFill>
+              </a:rPr>
+              <a:t> </a:t>
+            </a:r>
+            <a:r>
+              <a:rPr lang="en-US" dirty="0"/>
+              <a:t>(for JSON)</a:t>
+            </a:r>
+            <a:endParaRPr lang="en-US" b="1" i="1" dirty="0"/>
           </a:p>
           <a:p>
             <a:pPr lvl="1"/>
             <a:r>
-              <a:rPr lang="en-US" dirty="0" err="1"/>
-              <a:t>Webex</a:t>
-            </a:r>
-            <a:r>
               <a:rPr lang="en-US" dirty="0"/>
-              <a:t> Teams</a:t>
-            </a:r>
+              <a:t>Username and password sent in the body of an HTTP POST</a:t>
+            </a:r>
+          </a:p>
+          <a:p>
+            <a:pPr marL="457200" lvl="1" indent="0">
+              <a:buNone/>
+            </a:pPr>
+            <a:r>
+              <a:rPr lang="en-US" b="1" i="1" dirty="0">
+                <a:solidFill>
+                  <a:srgbClr val="FFFF00"/>
+                </a:solidFill>
+              </a:rPr>
+              <a:t>{"</a:t>
+            </a:r>
+            <a:r>
+              <a:rPr lang="en-US" b="1" i="1" dirty="0" err="1">
+                <a:solidFill>
+                  <a:srgbClr val="FFFF00"/>
+                </a:solidFill>
+              </a:rPr>
+              <a:t>aaaUser</a:t>
+            </a:r>
+            <a:r>
+              <a:rPr lang="en-US" b="1" i="1" dirty="0">
+                <a:solidFill>
+                  <a:srgbClr val="FFFF00"/>
+                </a:solidFill>
+              </a:rPr>
+              <a:t>":{"attributes":{"</a:t>
+            </a:r>
+            <a:r>
+              <a:rPr lang="en-US" b="1" i="1" dirty="0" err="1">
+                <a:solidFill>
+                  <a:srgbClr val="FFFF00"/>
+                </a:solidFill>
+              </a:rPr>
+              <a:t>name":"</a:t>
+            </a:r>
+            <a:r>
+              <a:rPr lang="en-US" b="1" i="1" dirty="0" err="1">
+                <a:solidFill>
+                  <a:srgbClr val="FF0000"/>
+                </a:solidFill>
+              </a:rPr>
+              <a:t>username</a:t>
+            </a:r>
+            <a:r>
+              <a:rPr lang="en-US" b="1" i="1" dirty="0">
+                <a:solidFill>
+                  <a:srgbClr val="FFFF00"/>
+                </a:solidFill>
+              </a:rPr>
+              <a:t>", "</a:t>
+            </a:r>
+            <a:r>
+              <a:rPr lang="en-US" b="1" i="1" dirty="0" err="1">
+                <a:solidFill>
+                  <a:srgbClr val="FFFF00"/>
+                </a:solidFill>
+              </a:rPr>
+              <a:t>pwd</a:t>
+            </a:r>
+            <a:r>
+              <a:rPr lang="en-US" b="1" i="1" dirty="0">
+                <a:solidFill>
+                  <a:srgbClr val="FFFF00"/>
+                </a:solidFill>
+              </a:rPr>
+              <a:t>":"</a:t>
+            </a:r>
+            <a:r>
+              <a:rPr lang="en-US" b="1" i="1" dirty="0">
+                <a:solidFill>
+                  <a:srgbClr val="FF0000"/>
+                </a:solidFill>
+              </a:rPr>
+              <a:t>password</a:t>
+            </a:r>
+            <a:r>
+              <a:rPr lang="en-US" b="1" i="1" dirty="0">
+                <a:solidFill>
+                  <a:srgbClr val="FFFF00"/>
+                </a:solidFill>
+              </a:rPr>
+              <a:t>"}}}</a:t>
+            </a:r>
+          </a:p>
+          <a:p>
+            <a:pPr marL="457200" lvl="1" indent="0">
+              <a:buNone/>
+            </a:pPr>
+            <a:endParaRPr lang="en-US" b="1" i="1" dirty="0">
+              <a:solidFill>
+                <a:srgbClr val="FFFF00"/>
+              </a:solidFill>
+            </a:endParaRPr>
           </a:p>
           <a:p>
             <a:pPr lvl="1"/>
             <a:r>
               <a:rPr lang="en-US" dirty="0"/>
-              <a:t>Meraki</a:t>
-            </a:r>
+              <a:t>HTTP response includes a refreshable session token</a:t>
+            </a:r>
+          </a:p>
+          <a:p>
+            <a:pPr lvl="2"/>
+            <a:r>
+              <a:rPr lang="en-US" dirty="0"/>
+              <a:t>Expires after 5 minutes of inactivity</a:t>
+            </a:r>
+          </a:p>
+          <a:p>
+            <a:pPr marL="457200" lvl="1" indent="0">
+              <a:buNone/>
+            </a:pPr>
+            <a:r>
+              <a:rPr lang="en-US" b="1" i="1" dirty="0">
+                <a:solidFill>
+                  <a:srgbClr val="FFFF00"/>
+                </a:solidFill>
+              </a:rPr>
+              <a:t>{"</a:t>
+            </a:r>
+            <a:r>
+              <a:rPr lang="en-US" b="1" i="1" dirty="0" err="1">
+                <a:solidFill>
+                  <a:srgbClr val="FFFF00"/>
+                </a:solidFill>
+              </a:rPr>
+              <a:t>imdata</a:t>
+            </a:r>
+            <a:r>
+              <a:rPr lang="en-US" b="1" i="1" dirty="0">
+                <a:solidFill>
+                  <a:srgbClr val="FFFF00"/>
+                </a:solidFill>
+              </a:rPr>
+              <a:t>":[{"</a:t>
+            </a:r>
+            <a:r>
+              <a:rPr lang="en-US" b="1" i="1" dirty="0" err="1">
+                <a:solidFill>
+                  <a:srgbClr val="FFFF00"/>
+                </a:solidFill>
+              </a:rPr>
+              <a:t>aaaLogin</a:t>
+            </a:r>
+            <a:r>
+              <a:rPr lang="en-US" b="1" i="1" dirty="0">
+                <a:solidFill>
+                  <a:srgbClr val="FFFF00"/>
+                </a:solidFill>
+              </a:rPr>
+              <a:t>":{"attributes":{"token":"</a:t>
+            </a:r>
+            <a:r>
+              <a:rPr lang="en-US" b="1" i="1" dirty="0" err="1">
+                <a:solidFill>
+                  <a:srgbClr val="FF0000"/>
+                </a:solidFill>
+              </a:rPr>
+              <a:t>token_id</a:t>
+            </a:r>
+            <a:r>
+              <a:rPr lang="en-US" b="1" i="1" dirty="0">
+                <a:solidFill>
+                  <a:srgbClr val="FFFF00"/>
+                </a:solidFill>
+              </a:rPr>
+              <a:t>"}}}]}</a:t>
+            </a:r>
+          </a:p>
+          <a:p>
+            <a:pPr marL="457200" lvl="1" indent="0">
+              <a:buNone/>
+            </a:pPr>
+            <a:endParaRPr lang="en-US" b="1" i="1" dirty="0">
+              <a:solidFill>
+                <a:srgbClr val="FFFF00"/>
+              </a:solidFill>
+            </a:endParaRPr>
           </a:p>
           <a:p>
             <a:pPr lvl="1"/>
             <a:r>
               <a:rPr lang="en-US" dirty="0"/>
-              <a:t>ACI</a:t>
-            </a:r>
-          </a:p>
-          <a:p>
-            <a:r>
-              <a:rPr lang="en-US" dirty="0"/>
-              <a:t>Perform the following tasks:</a:t>
-            </a:r>
-          </a:p>
-          <a:p>
-            <a:pPr lvl="1"/>
-            <a:r>
-              <a:rPr lang="en-US" dirty="0"/>
-              <a:t>Understand authentication methodology</a:t>
-            </a:r>
-          </a:p>
-          <a:p>
-            <a:pPr lvl="1"/>
-            <a:r>
-              <a:rPr lang="en-US" dirty="0"/>
-              <a:t>Build </a:t>
-            </a:r>
-            <a:r>
-              <a:rPr lang="en-US" dirty="0" err="1"/>
-              <a:t>cURL</a:t>
-            </a:r>
-            <a:r>
-              <a:rPr lang="en-US" dirty="0"/>
-              <a:t> request to authenticate</a:t>
-            </a:r>
-          </a:p>
-          <a:p>
-            <a:pPr lvl="1"/>
-            <a:r>
-              <a:rPr lang="en-US" dirty="0"/>
-              <a:t>Build </a:t>
-            </a:r>
-            <a:r>
-              <a:rPr lang="en-US" dirty="0" err="1"/>
-              <a:t>cURL</a:t>
-            </a:r>
-            <a:r>
-              <a:rPr lang="en-US" dirty="0"/>
-              <a:t> request(s) to read/write data</a:t>
+              <a:t>Subsequent requests must include the token as a cookie named </a:t>
+            </a:r>
+            <a:r>
+              <a:rPr lang="en-US" b="1" i="1" dirty="0">
+                <a:solidFill>
+                  <a:srgbClr val="FFFF00"/>
+                </a:solidFill>
+              </a:rPr>
+              <a:t>APIC-Cookie</a:t>
             </a:r>
           </a:p>
         </p:txBody>
@@ -28487,7 +29478,7 @@
           <p:cNvPr id="4" name="Date Placeholder 3">
             <a:extLst>
               <a:ext uri="{FF2B5EF4-FFF2-40B4-BE49-F238E27FC236}">
-                <a16:creationId xmlns:a16="http://schemas.microsoft.com/office/drawing/2014/main" id="{7ECEAF79-F4AC-E94E-9E55-220D0D396924}"/>
+                <a16:creationId xmlns:a16="http://schemas.microsoft.com/office/drawing/2014/main" id="{87334516-EE7D-424E-9D4B-979F8C53BB44}"/>
               </a:ext>
             </a:extLst>
           </p:cNvPr>
@@ -28516,7 +29507,7 @@
           <p:cNvPr id="5" name="Slide Number Placeholder 4">
             <a:extLst>
               <a:ext uri="{FF2B5EF4-FFF2-40B4-BE49-F238E27FC236}">
-                <a16:creationId xmlns:a16="http://schemas.microsoft.com/office/drawing/2014/main" id="{372DC1A4-CE8B-DB4A-8F86-2508518C35D3}"/>
+                <a16:creationId xmlns:a16="http://schemas.microsoft.com/office/drawing/2014/main" id="{FBDCE2CF-870D-8442-9A14-D51A59D6E593}"/>
               </a:ext>
             </a:extLst>
           </p:cNvPr>
@@ -28544,7 +29535,7 @@
     </p:spTree>
     <p:extLst>
       <p:ext uri="{BB962C8B-B14F-4D97-AF65-F5344CB8AC3E}">
-        <p14:creationId xmlns:p14="http://schemas.microsoft.com/office/powerpoint/2010/main" val="2063027843"/>
+        <p14:creationId xmlns:p14="http://schemas.microsoft.com/office/powerpoint/2010/main" val="4216860406"/>
       </p:ext>
     </p:extLst>
   </p:cSld>
@@ -28563,6 +29554,437 @@
       </p:transition>
     </mc:Fallback>
   </mc:AlternateContent>
+  <p:timing>
+    <p:tnLst>
+      <p:par>
+        <p:cTn id="1" dur="indefinite" restart="never" nodeType="tmRoot">
+          <p:childTnLst>
+            <p:seq concurrent="1" nextAc="seek">
+              <p:cTn id="2" dur="indefinite" nodeType="mainSeq">
+                <p:childTnLst>
+                  <p:par>
+                    <p:cTn id="3" fill="hold">
+                      <p:stCondLst>
+                        <p:cond delay="indefinite"/>
+                      </p:stCondLst>
+                      <p:childTnLst>
+                        <p:par>
+                          <p:cTn id="4" fill="hold">
+                            <p:stCondLst>
+                              <p:cond delay="0"/>
+                            </p:stCondLst>
+                            <p:childTnLst>
+                              <p:par>
+                                <p:cTn id="5" presetID="9" presetClass="entr" presetSubtype="0" fill="hold" grpId="0" nodeType="clickEffect">
+                                  <p:stCondLst>
+                                    <p:cond delay="0"/>
+                                  </p:stCondLst>
+                                  <p:childTnLst>
+                                    <p:set>
+                                      <p:cBhvr>
+                                        <p:cTn id="6" dur="1" fill="hold">
+                                          <p:stCondLst>
+                                            <p:cond delay="0"/>
+                                          </p:stCondLst>
+                                        </p:cTn>
+                                        <p:tgtEl>
+                                          <p:spTgt spid="3">
+                                            <p:txEl>
+                                              <p:pRg st="0" end="0"/>
+                                            </p:txEl>
+                                          </p:spTgt>
+                                        </p:tgtEl>
+                                        <p:attrNameLst>
+                                          <p:attrName>style.visibility</p:attrName>
+                                        </p:attrNameLst>
+                                      </p:cBhvr>
+                                      <p:to>
+                                        <p:strVal val="visible"/>
+                                      </p:to>
+                                    </p:set>
+                                    <p:animEffect transition="in" filter="dissolve">
+                                      <p:cBhvr>
+                                        <p:cTn id="7" dur="500"/>
+                                        <p:tgtEl>
+                                          <p:spTgt spid="3">
+                                            <p:txEl>
+                                              <p:pRg st="0" end="0"/>
+                                            </p:txEl>
+                                          </p:spTgt>
+                                        </p:tgtEl>
+                                      </p:cBhvr>
+                                    </p:animEffect>
+                                  </p:childTnLst>
+                                </p:cTn>
+                              </p:par>
+                              <p:par>
+                                <p:cTn id="8" presetID="9" presetClass="entr" presetSubtype="0" fill="hold" grpId="0" nodeType="withEffect">
+                                  <p:stCondLst>
+                                    <p:cond delay="0"/>
+                                  </p:stCondLst>
+                                  <p:childTnLst>
+                                    <p:set>
+                                      <p:cBhvr>
+                                        <p:cTn id="9" dur="1" fill="hold">
+                                          <p:stCondLst>
+                                            <p:cond delay="0"/>
+                                          </p:stCondLst>
+                                        </p:cTn>
+                                        <p:tgtEl>
+                                          <p:spTgt spid="3">
+                                            <p:txEl>
+                                              <p:pRg st="1" end="1"/>
+                                            </p:txEl>
+                                          </p:spTgt>
+                                        </p:tgtEl>
+                                        <p:attrNameLst>
+                                          <p:attrName>style.visibility</p:attrName>
+                                        </p:attrNameLst>
+                                      </p:cBhvr>
+                                      <p:to>
+                                        <p:strVal val="visible"/>
+                                      </p:to>
+                                    </p:set>
+                                    <p:animEffect transition="in" filter="dissolve">
+                                      <p:cBhvr>
+                                        <p:cTn id="10" dur="500"/>
+                                        <p:tgtEl>
+                                          <p:spTgt spid="3">
+                                            <p:txEl>
+                                              <p:pRg st="1" end="1"/>
+                                            </p:txEl>
+                                          </p:spTgt>
+                                        </p:tgtEl>
+                                      </p:cBhvr>
+                                    </p:animEffect>
+                                  </p:childTnLst>
+                                </p:cTn>
+                              </p:par>
+                              <p:par>
+                                <p:cTn id="11" presetID="9" presetClass="entr" presetSubtype="0" fill="hold" grpId="0" nodeType="withEffect">
+                                  <p:stCondLst>
+                                    <p:cond delay="0"/>
+                                  </p:stCondLst>
+                                  <p:childTnLst>
+                                    <p:set>
+                                      <p:cBhvr>
+                                        <p:cTn id="12" dur="1" fill="hold">
+                                          <p:stCondLst>
+                                            <p:cond delay="0"/>
+                                          </p:stCondLst>
+                                        </p:cTn>
+                                        <p:tgtEl>
+                                          <p:spTgt spid="3">
+                                            <p:txEl>
+                                              <p:pRg st="2" end="2"/>
+                                            </p:txEl>
+                                          </p:spTgt>
+                                        </p:tgtEl>
+                                        <p:attrNameLst>
+                                          <p:attrName>style.visibility</p:attrName>
+                                        </p:attrNameLst>
+                                      </p:cBhvr>
+                                      <p:to>
+                                        <p:strVal val="visible"/>
+                                      </p:to>
+                                    </p:set>
+                                    <p:animEffect transition="in" filter="dissolve">
+                                      <p:cBhvr>
+                                        <p:cTn id="13" dur="500"/>
+                                        <p:tgtEl>
+                                          <p:spTgt spid="3">
+                                            <p:txEl>
+                                              <p:pRg st="2" end="2"/>
+                                            </p:txEl>
+                                          </p:spTgt>
+                                        </p:tgtEl>
+                                      </p:cBhvr>
+                                    </p:animEffect>
+                                  </p:childTnLst>
+                                </p:cTn>
+                              </p:par>
+                              <p:par>
+                                <p:cTn id="14" presetID="9" presetClass="entr" presetSubtype="0" fill="hold" grpId="0" nodeType="withEffect">
+                                  <p:stCondLst>
+                                    <p:cond delay="0"/>
+                                  </p:stCondLst>
+                                  <p:childTnLst>
+                                    <p:set>
+                                      <p:cBhvr>
+                                        <p:cTn id="15" dur="1" fill="hold">
+                                          <p:stCondLst>
+                                            <p:cond delay="0"/>
+                                          </p:stCondLst>
+                                        </p:cTn>
+                                        <p:tgtEl>
+                                          <p:spTgt spid="3">
+                                            <p:txEl>
+                                              <p:pRg st="3" end="3"/>
+                                            </p:txEl>
+                                          </p:spTgt>
+                                        </p:tgtEl>
+                                        <p:attrNameLst>
+                                          <p:attrName>style.visibility</p:attrName>
+                                        </p:attrNameLst>
+                                      </p:cBhvr>
+                                      <p:to>
+                                        <p:strVal val="visible"/>
+                                      </p:to>
+                                    </p:set>
+                                    <p:animEffect transition="in" filter="dissolve">
+                                      <p:cBhvr>
+                                        <p:cTn id="16" dur="500"/>
+                                        <p:tgtEl>
+                                          <p:spTgt spid="3">
+                                            <p:txEl>
+                                              <p:pRg st="3" end="3"/>
+                                            </p:txEl>
+                                          </p:spTgt>
+                                        </p:tgtEl>
+                                      </p:cBhvr>
+                                    </p:animEffect>
+                                  </p:childTnLst>
+                                </p:cTn>
+                              </p:par>
+                            </p:childTnLst>
+                          </p:cTn>
+                        </p:par>
+                      </p:childTnLst>
+                    </p:cTn>
+                  </p:par>
+                  <p:par>
+                    <p:cTn id="17" fill="hold">
+                      <p:stCondLst>
+                        <p:cond delay="indefinite"/>
+                      </p:stCondLst>
+                      <p:childTnLst>
+                        <p:par>
+                          <p:cTn id="18" fill="hold">
+                            <p:stCondLst>
+                              <p:cond delay="0"/>
+                            </p:stCondLst>
+                            <p:childTnLst>
+                              <p:par>
+                                <p:cTn id="19" presetID="9" presetClass="entr" presetSubtype="0" fill="hold" grpId="0" nodeType="clickEffect">
+                                  <p:stCondLst>
+                                    <p:cond delay="0"/>
+                                  </p:stCondLst>
+                                  <p:childTnLst>
+                                    <p:set>
+                                      <p:cBhvr>
+                                        <p:cTn id="20" dur="1" fill="hold">
+                                          <p:stCondLst>
+                                            <p:cond delay="0"/>
+                                          </p:stCondLst>
+                                        </p:cTn>
+                                        <p:tgtEl>
+                                          <p:spTgt spid="3">
+                                            <p:txEl>
+                                              <p:pRg st="5" end="5"/>
+                                            </p:txEl>
+                                          </p:spTgt>
+                                        </p:tgtEl>
+                                        <p:attrNameLst>
+                                          <p:attrName>style.visibility</p:attrName>
+                                        </p:attrNameLst>
+                                      </p:cBhvr>
+                                      <p:to>
+                                        <p:strVal val="visible"/>
+                                      </p:to>
+                                    </p:set>
+                                    <p:animEffect transition="in" filter="dissolve">
+                                      <p:cBhvr>
+                                        <p:cTn id="21" dur="500"/>
+                                        <p:tgtEl>
+                                          <p:spTgt spid="3">
+                                            <p:txEl>
+                                              <p:pRg st="5" end="5"/>
+                                            </p:txEl>
+                                          </p:spTgt>
+                                        </p:tgtEl>
+                                      </p:cBhvr>
+                                    </p:animEffect>
+                                  </p:childTnLst>
+                                </p:cTn>
+                              </p:par>
+                              <p:par>
+                                <p:cTn id="22" presetID="9" presetClass="entr" presetSubtype="0" fill="hold" grpId="0" nodeType="withEffect">
+                                  <p:stCondLst>
+                                    <p:cond delay="0"/>
+                                  </p:stCondLst>
+                                  <p:childTnLst>
+                                    <p:set>
+                                      <p:cBhvr>
+                                        <p:cTn id="23" dur="1" fill="hold">
+                                          <p:stCondLst>
+                                            <p:cond delay="0"/>
+                                          </p:stCondLst>
+                                        </p:cTn>
+                                        <p:tgtEl>
+                                          <p:spTgt spid="3">
+                                            <p:txEl>
+                                              <p:pRg st="6" end="6"/>
+                                            </p:txEl>
+                                          </p:spTgt>
+                                        </p:tgtEl>
+                                        <p:attrNameLst>
+                                          <p:attrName>style.visibility</p:attrName>
+                                        </p:attrNameLst>
+                                      </p:cBhvr>
+                                      <p:to>
+                                        <p:strVal val="visible"/>
+                                      </p:to>
+                                    </p:set>
+                                    <p:animEffect transition="in" filter="dissolve">
+                                      <p:cBhvr>
+                                        <p:cTn id="24" dur="500"/>
+                                        <p:tgtEl>
+                                          <p:spTgt spid="3">
+                                            <p:txEl>
+                                              <p:pRg st="6" end="6"/>
+                                            </p:txEl>
+                                          </p:spTgt>
+                                        </p:tgtEl>
+                                      </p:cBhvr>
+                                    </p:animEffect>
+                                  </p:childTnLst>
+                                </p:cTn>
+                              </p:par>
+                              <p:par>
+                                <p:cTn id="25" presetID="9" presetClass="entr" presetSubtype="0" fill="hold" grpId="0" nodeType="withEffect">
+                                  <p:stCondLst>
+                                    <p:cond delay="0"/>
+                                  </p:stCondLst>
+                                  <p:childTnLst>
+                                    <p:set>
+                                      <p:cBhvr>
+                                        <p:cTn id="26" dur="1" fill="hold">
+                                          <p:stCondLst>
+                                            <p:cond delay="0"/>
+                                          </p:stCondLst>
+                                        </p:cTn>
+                                        <p:tgtEl>
+                                          <p:spTgt spid="3">
+                                            <p:txEl>
+                                              <p:pRg st="7" end="7"/>
+                                            </p:txEl>
+                                          </p:spTgt>
+                                        </p:tgtEl>
+                                        <p:attrNameLst>
+                                          <p:attrName>style.visibility</p:attrName>
+                                        </p:attrNameLst>
+                                      </p:cBhvr>
+                                      <p:to>
+                                        <p:strVal val="visible"/>
+                                      </p:to>
+                                    </p:set>
+                                    <p:animEffect transition="in" filter="dissolve">
+                                      <p:cBhvr>
+                                        <p:cTn id="27" dur="500"/>
+                                        <p:tgtEl>
+                                          <p:spTgt spid="3">
+                                            <p:txEl>
+                                              <p:pRg st="7" end="7"/>
+                                            </p:txEl>
+                                          </p:spTgt>
+                                        </p:tgtEl>
+                                      </p:cBhvr>
+                                    </p:animEffect>
+                                  </p:childTnLst>
+                                </p:cTn>
+                              </p:par>
+                            </p:childTnLst>
+                          </p:cTn>
+                        </p:par>
+                      </p:childTnLst>
+                    </p:cTn>
+                  </p:par>
+                  <p:par>
+                    <p:cTn id="28" fill="hold">
+                      <p:stCondLst>
+                        <p:cond delay="indefinite"/>
+                      </p:stCondLst>
+                      <p:childTnLst>
+                        <p:par>
+                          <p:cTn id="29" fill="hold">
+                            <p:stCondLst>
+                              <p:cond delay="0"/>
+                            </p:stCondLst>
+                            <p:childTnLst>
+                              <p:par>
+                                <p:cTn id="30" presetID="9" presetClass="entr" presetSubtype="0" fill="hold" grpId="0" nodeType="clickEffect">
+                                  <p:stCondLst>
+                                    <p:cond delay="0"/>
+                                  </p:stCondLst>
+                                  <p:childTnLst>
+                                    <p:set>
+                                      <p:cBhvr>
+                                        <p:cTn id="31" dur="1" fill="hold">
+                                          <p:stCondLst>
+                                            <p:cond delay="0"/>
+                                          </p:stCondLst>
+                                        </p:cTn>
+                                        <p:tgtEl>
+                                          <p:spTgt spid="3">
+                                            <p:txEl>
+                                              <p:pRg st="9" end="9"/>
+                                            </p:txEl>
+                                          </p:spTgt>
+                                        </p:tgtEl>
+                                        <p:attrNameLst>
+                                          <p:attrName>style.visibility</p:attrName>
+                                        </p:attrNameLst>
+                                      </p:cBhvr>
+                                      <p:to>
+                                        <p:strVal val="visible"/>
+                                      </p:to>
+                                    </p:set>
+                                    <p:animEffect transition="in" filter="dissolve">
+                                      <p:cBhvr>
+                                        <p:cTn id="32" dur="500"/>
+                                        <p:tgtEl>
+                                          <p:spTgt spid="3">
+                                            <p:txEl>
+                                              <p:pRg st="9" end="9"/>
+                                            </p:txEl>
+                                          </p:spTgt>
+                                        </p:tgtEl>
+                                      </p:cBhvr>
+                                    </p:animEffect>
+                                  </p:childTnLst>
+                                </p:cTn>
+                              </p:par>
+                            </p:childTnLst>
+                          </p:cTn>
+                        </p:par>
+                      </p:childTnLst>
+                    </p:cTn>
+                  </p:par>
+                </p:childTnLst>
+              </p:cTn>
+              <p:prevCondLst>
+                <p:cond evt="onPrev" delay="0">
+                  <p:tgtEl>
+                    <p:sldTgt/>
+                  </p:tgtEl>
+                </p:cond>
+              </p:prevCondLst>
+              <p:nextCondLst>
+                <p:cond evt="onNext" delay="0">
+                  <p:tgtEl>
+                    <p:sldTgt/>
+                  </p:tgtEl>
+                </p:cond>
+              </p:nextCondLst>
+            </p:seq>
+          </p:childTnLst>
+        </p:cTn>
+      </p:par>
+    </p:tnLst>
+    <p:bldLst>
+      <p:bldP spid="3" grpId="0" uiExpand="1" build="p"/>
+    </p:bldLst>
+  </p:timing>
 </p:sld>
 </file>
 
@@ -28588,7 +30010,7 @@
           <p:cNvPr id="2" name="Title 1">
             <a:extLst>
               <a:ext uri="{FF2B5EF4-FFF2-40B4-BE49-F238E27FC236}">
-                <a16:creationId xmlns:a16="http://schemas.microsoft.com/office/drawing/2014/main" id="{9D8D6E4C-FC36-3E4C-9387-96DD20072D9D}"/>
+                <a16:creationId xmlns:a16="http://schemas.microsoft.com/office/drawing/2014/main" id="{A2E3F575-354A-2940-BFCA-9CCF6B4D772D}"/>
               </a:ext>
             </a:extLst>
           </p:cNvPr>
@@ -28596,32 +30018,27 @@
             <a:spLocks noGrp="1"/>
           </p:cNvSpPr>
           <p:nvPr>
-            <p:ph type="ctrTitle"/>
+            <p:ph type="title"/>
           </p:nvPr>
         </p:nvSpPr>
-        <p:spPr>
-          <a:xfrm>
-            <a:off x="1524000" y="914013"/>
-            <a:ext cx="9144000" cy="2387600"/>
-          </a:xfrm>
-        </p:spPr>
+        <p:spPr/>
         <p:txBody>
           <a:bodyPr/>
           <a:lstStyle/>
           <a:p>
             <a:r>
               <a:rPr lang="en-US" dirty="0"/>
-              <a:t>Part VI</a:t>
+              <a:t>Application Centric Infrastructure (ACI)</a:t>
             </a:r>
           </a:p>
         </p:txBody>
       </p:sp>
       <p:sp>
         <p:nvSpPr>
-          <p:cNvPr id="3" name="Subtitle 2">
+          <p:cNvPr id="3" name="Content Placeholder 2">
             <a:extLst>
               <a:ext uri="{FF2B5EF4-FFF2-40B4-BE49-F238E27FC236}">
-                <a16:creationId xmlns:a16="http://schemas.microsoft.com/office/drawing/2014/main" id="{0451A0DE-9D64-5A48-94B5-5B4E42709819}"/>
+                <a16:creationId xmlns:a16="http://schemas.microsoft.com/office/drawing/2014/main" id="{4382774F-7ED2-5544-84A3-E36874911B38}"/>
               </a:ext>
             </a:extLst>
           </p:cNvPr>
@@ -28629,30 +30046,168 @@
             <a:spLocks noGrp="1"/>
           </p:cNvSpPr>
           <p:nvPr>
-            <p:ph type="subTitle" idx="1"/>
+            <p:ph idx="1"/>
           </p:nvPr>
         </p:nvSpPr>
-        <p:spPr>
-          <a:xfrm>
-            <a:off x="1524000" y="3393688"/>
-            <a:ext cx="9144000" cy="1655762"/>
-          </a:xfrm>
-        </p:spPr>
+        <p:spPr/>
+        <p:txBody>
+          <a:bodyPr>
+            <a:normAutofit/>
+          </a:bodyPr>
+          <a:lstStyle/>
+          <a:p>
+            <a:r>
+              <a:rPr lang="en-US" dirty="0"/>
+              <a:t>API documentation:</a:t>
+            </a:r>
+          </a:p>
+          <a:p>
+            <a:pPr lvl="1"/>
+            <a:r>
+              <a:rPr lang="en-US" dirty="0">
+                <a:hlinkClick r:id="rId3"/>
+              </a:rPr>
+              <a:t>https://www.cisco.com/c/en/us/td/docs/switches/datacenter/aci/apic/sw/2-x/rest_cfg/2_1_x/b_Cisco_APIC_REST_API_Configuration_Guide.html</a:t>
+            </a:r>
+            <a:endParaRPr lang="en-US" dirty="0"/>
+          </a:p>
+          <a:p>
+            <a:r>
+              <a:rPr lang="en-US" dirty="0"/>
+              <a:t>Lab Resources</a:t>
+            </a:r>
+          </a:p>
+          <a:p>
+            <a:pPr lvl="1"/>
+            <a:r>
+              <a:rPr lang="en-US" dirty="0"/>
+              <a:t>WWT Platform</a:t>
+            </a:r>
+          </a:p>
+          <a:p>
+            <a:pPr lvl="2"/>
+            <a:r>
+              <a:rPr lang="en-US" dirty="0">
+                <a:hlinkClick r:id="rId4"/>
+              </a:rPr>
+              <a:t>https://www.wwt.com/lab/programmability-foundations-lab</a:t>
+            </a:r>
+            <a:endParaRPr lang="en-US" dirty="0"/>
+          </a:p>
+          <a:p>
+            <a:pPr lvl="2"/>
+            <a:r>
+              <a:rPr lang="en-US" dirty="0">
+                <a:hlinkClick r:id="rId5"/>
+              </a:rPr>
+              <a:t>https://www.wwt.com/lab/aci-ansible-sandbox</a:t>
+            </a:r>
+            <a:endParaRPr lang="en-US" dirty="0"/>
+          </a:p>
+          <a:p>
+            <a:pPr lvl="2"/>
+            <a:r>
+              <a:rPr lang="en-US" dirty="0">
+                <a:hlinkClick r:id="rId6"/>
+              </a:rPr>
+              <a:t>https://www.wwt.com/lab/aci-virtual-simulator-lab</a:t>
+            </a:r>
+            <a:endParaRPr lang="en-US" dirty="0"/>
+          </a:p>
+          <a:p>
+            <a:pPr lvl="1"/>
+            <a:r>
+              <a:rPr lang="en-US" dirty="0"/>
+              <a:t>Cisco </a:t>
+            </a:r>
+            <a:r>
+              <a:rPr lang="en-US" dirty="0" err="1"/>
+              <a:t>DevNet</a:t>
+            </a:r>
+            <a:endParaRPr lang="en-US" dirty="0"/>
+          </a:p>
+          <a:p>
+            <a:pPr lvl="2"/>
+            <a:r>
+              <a:rPr lang="en-US" dirty="0">
+                <a:hlinkClick r:id="rId7"/>
+              </a:rPr>
+              <a:t>https://developer.cisco.com/site/aci/</a:t>
+            </a:r>
+            <a:endParaRPr lang="en-US" dirty="0"/>
+          </a:p>
+          <a:p>
+            <a:pPr lvl="2"/>
+            <a:r>
+              <a:rPr lang="en-US" dirty="0"/>
+              <a:t>Includes always-on sandbox</a:t>
+            </a:r>
+          </a:p>
+        </p:txBody>
+      </p:sp>
+      <p:sp>
+        <p:nvSpPr>
+          <p:cNvPr id="4" name="Date Placeholder 3">
+            <a:extLst>
+              <a:ext uri="{FF2B5EF4-FFF2-40B4-BE49-F238E27FC236}">
+                <a16:creationId xmlns:a16="http://schemas.microsoft.com/office/drawing/2014/main" id="{87334516-EE7D-424E-9D4B-979F8C53BB44}"/>
+              </a:ext>
+            </a:extLst>
+          </p:cNvPr>
+          <p:cNvSpPr>
+            <a:spLocks noGrp="1"/>
+          </p:cNvSpPr>
+          <p:nvPr>
+            <p:ph type="dt" sz="half" idx="10"/>
+          </p:nvPr>
+        </p:nvSpPr>
+        <p:spPr/>
         <p:txBody>
           <a:bodyPr/>
           <a:lstStyle/>
           <a:p>
             <a:r>
-              <a:rPr lang="en-US" dirty="0"/>
-              <a:t>Interact With Cisco Platform APIs Using Python Requests</a:t>
-            </a:r>
+              <a:rPr lang="en-US"/>
+              <a:t>World Wide Technology ©</a:t>
+            </a:r>
+            <a:endParaRPr lang="en-US" dirty="0"/>
+          </a:p>
+        </p:txBody>
+      </p:sp>
+      <p:sp>
+        <p:nvSpPr>
+          <p:cNvPr id="5" name="Slide Number Placeholder 4">
+            <a:extLst>
+              <a:ext uri="{FF2B5EF4-FFF2-40B4-BE49-F238E27FC236}">
+                <a16:creationId xmlns:a16="http://schemas.microsoft.com/office/drawing/2014/main" id="{FBDCE2CF-870D-8442-9A14-D51A59D6E593}"/>
+              </a:ext>
+            </a:extLst>
+          </p:cNvPr>
+          <p:cNvSpPr>
+            <a:spLocks noGrp="1"/>
+          </p:cNvSpPr>
+          <p:nvPr>
+            <p:ph type="sldNum" sz="quarter" idx="12"/>
+          </p:nvPr>
+        </p:nvSpPr>
+        <p:spPr/>
+        <p:txBody>
+          <a:bodyPr/>
+          <a:lstStyle/>
+          <a:p>
+            <a:fld id="{A44B02FA-DD2D-1844-AE35-8B2EAB0CF4EF}" type="slidenum">
+              <a:rPr lang="en-US" smtClean="0"/>
+              <a:pPr/>
+              <a:t>45</a:t>
+            </a:fld>
+            <a:endParaRPr lang="en-US" dirty="0"/>
           </a:p>
         </p:txBody>
       </p:sp>
     </p:spTree>
     <p:extLst>
       <p:ext uri="{BB962C8B-B14F-4D97-AF65-F5344CB8AC3E}">
-        <p14:creationId xmlns:p14="http://schemas.microsoft.com/office/powerpoint/2010/main" val="4218248441"/>
+        <p14:creationId xmlns:p14="http://schemas.microsoft.com/office/powerpoint/2010/main" val="3702409648"/>
       </p:ext>
     </p:extLst>
   </p:cSld>
@@ -28671,6 +30226,505 @@
       </p:transition>
     </mc:Fallback>
   </mc:AlternateContent>
+  <p:timing>
+    <p:tnLst>
+      <p:par>
+        <p:cTn id="1" dur="indefinite" restart="never" nodeType="tmRoot">
+          <p:childTnLst>
+            <p:seq concurrent="1" nextAc="seek">
+              <p:cTn id="2" dur="indefinite" nodeType="mainSeq">
+                <p:childTnLst>
+                  <p:par>
+                    <p:cTn id="3" fill="hold">
+                      <p:stCondLst>
+                        <p:cond delay="indefinite"/>
+                      </p:stCondLst>
+                      <p:childTnLst>
+                        <p:par>
+                          <p:cTn id="4" fill="hold">
+                            <p:stCondLst>
+                              <p:cond delay="0"/>
+                            </p:stCondLst>
+                            <p:childTnLst>
+                              <p:par>
+                                <p:cTn id="5" presetID="9" presetClass="entr" presetSubtype="0" fill="hold" grpId="0" nodeType="clickEffect">
+                                  <p:stCondLst>
+                                    <p:cond delay="0"/>
+                                  </p:stCondLst>
+                                  <p:childTnLst>
+                                    <p:set>
+                                      <p:cBhvr>
+                                        <p:cTn id="6" dur="1" fill="hold">
+                                          <p:stCondLst>
+                                            <p:cond delay="0"/>
+                                          </p:stCondLst>
+                                        </p:cTn>
+                                        <p:tgtEl>
+                                          <p:spTgt spid="3">
+                                            <p:txEl>
+                                              <p:pRg st="0" end="0"/>
+                                            </p:txEl>
+                                          </p:spTgt>
+                                        </p:tgtEl>
+                                        <p:attrNameLst>
+                                          <p:attrName>style.visibility</p:attrName>
+                                        </p:attrNameLst>
+                                      </p:cBhvr>
+                                      <p:to>
+                                        <p:strVal val="visible"/>
+                                      </p:to>
+                                    </p:set>
+                                    <p:animEffect transition="in" filter="dissolve">
+                                      <p:cBhvr>
+                                        <p:cTn id="7" dur="500"/>
+                                        <p:tgtEl>
+                                          <p:spTgt spid="3">
+                                            <p:txEl>
+                                              <p:pRg st="0" end="0"/>
+                                            </p:txEl>
+                                          </p:spTgt>
+                                        </p:tgtEl>
+                                      </p:cBhvr>
+                                    </p:animEffect>
+                                  </p:childTnLst>
+                                </p:cTn>
+                              </p:par>
+                              <p:par>
+                                <p:cTn id="8" presetID="9" presetClass="entr" presetSubtype="0" fill="hold" grpId="0" nodeType="withEffect">
+                                  <p:stCondLst>
+                                    <p:cond delay="0"/>
+                                  </p:stCondLst>
+                                  <p:childTnLst>
+                                    <p:set>
+                                      <p:cBhvr>
+                                        <p:cTn id="9" dur="1" fill="hold">
+                                          <p:stCondLst>
+                                            <p:cond delay="0"/>
+                                          </p:stCondLst>
+                                        </p:cTn>
+                                        <p:tgtEl>
+                                          <p:spTgt spid="3">
+                                            <p:txEl>
+                                              <p:pRg st="1" end="1"/>
+                                            </p:txEl>
+                                          </p:spTgt>
+                                        </p:tgtEl>
+                                        <p:attrNameLst>
+                                          <p:attrName>style.visibility</p:attrName>
+                                        </p:attrNameLst>
+                                      </p:cBhvr>
+                                      <p:to>
+                                        <p:strVal val="visible"/>
+                                      </p:to>
+                                    </p:set>
+                                    <p:animEffect transition="in" filter="dissolve">
+                                      <p:cBhvr>
+                                        <p:cTn id="10" dur="500"/>
+                                        <p:tgtEl>
+                                          <p:spTgt spid="3">
+                                            <p:txEl>
+                                              <p:pRg st="1" end="1"/>
+                                            </p:txEl>
+                                          </p:spTgt>
+                                        </p:tgtEl>
+                                      </p:cBhvr>
+                                    </p:animEffect>
+                                  </p:childTnLst>
+                                </p:cTn>
+                              </p:par>
+                            </p:childTnLst>
+                          </p:cTn>
+                        </p:par>
+                      </p:childTnLst>
+                    </p:cTn>
+                  </p:par>
+                  <p:par>
+                    <p:cTn id="11" fill="hold">
+                      <p:stCondLst>
+                        <p:cond delay="indefinite"/>
+                      </p:stCondLst>
+                      <p:childTnLst>
+                        <p:par>
+                          <p:cTn id="12" fill="hold">
+                            <p:stCondLst>
+                              <p:cond delay="0"/>
+                            </p:stCondLst>
+                            <p:childTnLst>
+                              <p:par>
+                                <p:cTn id="13" presetID="9" presetClass="entr" presetSubtype="0" fill="hold" grpId="0" nodeType="clickEffect">
+                                  <p:stCondLst>
+                                    <p:cond delay="0"/>
+                                  </p:stCondLst>
+                                  <p:childTnLst>
+                                    <p:set>
+                                      <p:cBhvr>
+                                        <p:cTn id="14" dur="1" fill="hold">
+                                          <p:stCondLst>
+                                            <p:cond delay="0"/>
+                                          </p:stCondLst>
+                                        </p:cTn>
+                                        <p:tgtEl>
+                                          <p:spTgt spid="3">
+                                            <p:txEl>
+                                              <p:pRg st="2" end="2"/>
+                                            </p:txEl>
+                                          </p:spTgt>
+                                        </p:tgtEl>
+                                        <p:attrNameLst>
+                                          <p:attrName>style.visibility</p:attrName>
+                                        </p:attrNameLst>
+                                      </p:cBhvr>
+                                      <p:to>
+                                        <p:strVal val="visible"/>
+                                      </p:to>
+                                    </p:set>
+                                    <p:animEffect transition="in" filter="dissolve">
+                                      <p:cBhvr>
+                                        <p:cTn id="15" dur="500"/>
+                                        <p:tgtEl>
+                                          <p:spTgt spid="3">
+                                            <p:txEl>
+                                              <p:pRg st="2" end="2"/>
+                                            </p:txEl>
+                                          </p:spTgt>
+                                        </p:tgtEl>
+                                      </p:cBhvr>
+                                    </p:animEffect>
+                                  </p:childTnLst>
+                                </p:cTn>
+                              </p:par>
+                              <p:par>
+                                <p:cTn id="16" presetID="9" presetClass="entr" presetSubtype="0" fill="hold" grpId="0" nodeType="withEffect">
+                                  <p:stCondLst>
+                                    <p:cond delay="0"/>
+                                  </p:stCondLst>
+                                  <p:childTnLst>
+                                    <p:set>
+                                      <p:cBhvr>
+                                        <p:cTn id="17" dur="1" fill="hold">
+                                          <p:stCondLst>
+                                            <p:cond delay="0"/>
+                                          </p:stCondLst>
+                                        </p:cTn>
+                                        <p:tgtEl>
+                                          <p:spTgt spid="3">
+                                            <p:txEl>
+                                              <p:pRg st="3" end="3"/>
+                                            </p:txEl>
+                                          </p:spTgt>
+                                        </p:tgtEl>
+                                        <p:attrNameLst>
+                                          <p:attrName>style.visibility</p:attrName>
+                                        </p:attrNameLst>
+                                      </p:cBhvr>
+                                      <p:to>
+                                        <p:strVal val="visible"/>
+                                      </p:to>
+                                    </p:set>
+                                    <p:animEffect transition="in" filter="dissolve">
+                                      <p:cBhvr>
+                                        <p:cTn id="18" dur="500"/>
+                                        <p:tgtEl>
+                                          <p:spTgt spid="3">
+                                            <p:txEl>
+                                              <p:pRg st="3" end="3"/>
+                                            </p:txEl>
+                                          </p:spTgt>
+                                        </p:tgtEl>
+                                      </p:cBhvr>
+                                    </p:animEffect>
+                                  </p:childTnLst>
+                                </p:cTn>
+                              </p:par>
+                              <p:par>
+                                <p:cTn id="19" presetID="9" presetClass="entr" presetSubtype="0" fill="hold" grpId="0" nodeType="withEffect">
+                                  <p:stCondLst>
+                                    <p:cond delay="0"/>
+                                  </p:stCondLst>
+                                  <p:childTnLst>
+                                    <p:set>
+                                      <p:cBhvr>
+                                        <p:cTn id="20" dur="1" fill="hold">
+                                          <p:stCondLst>
+                                            <p:cond delay="0"/>
+                                          </p:stCondLst>
+                                        </p:cTn>
+                                        <p:tgtEl>
+                                          <p:spTgt spid="3">
+                                            <p:txEl>
+                                              <p:pRg st="4" end="4"/>
+                                            </p:txEl>
+                                          </p:spTgt>
+                                        </p:tgtEl>
+                                        <p:attrNameLst>
+                                          <p:attrName>style.visibility</p:attrName>
+                                        </p:attrNameLst>
+                                      </p:cBhvr>
+                                      <p:to>
+                                        <p:strVal val="visible"/>
+                                      </p:to>
+                                    </p:set>
+                                    <p:animEffect transition="in" filter="dissolve">
+                                      <p:cBhvr>
+                                        <p:cTn id="21" dur="500"/>
+                                        <p:tgtEl>
+                                          <p:spTgt spid="3">
+                                            <p:txEl>
+                                              <p:pRg st="4" end="4"/>
+                                            </p:txEl>
+                                          </p:spTgt>
+                                        </p:tgtEl>
+                                      </p:cBhvr>
+                                    </p:animEffect>
+                                  </p:childTnLst>
+                                </p:cTn>
+                              </p:par>
+                              <p:par>
+                                <p:cTn id="22" presetID="9" presetClass="entr" presetSubtype="0" fill="hold" grpId="0" nodeType="withEffect">
+                                  <p:stCondLst>
+                                    <p:cond delay="0"/>
+                                  </p:stCondLst>
+                                  <p:childTnLst>
+                                    <p:set>
+                                      <p:cBhvr>
+                                        <p:cTn id="23" dur="1" fill="hold">
+                                          <p:stCondLst>
+                                            <p:cond delay="0"/>
+                                          </p:stCondLst>
+                                        </p:cTn>
+                                        <p:tgtEl>
+                                          <p:spTgt spid="3">
+                                            <p:txEl>
+                                              <p:pRg st="5" end="5"/>
+                                            </p:txEl>
+                                          </p:spTgt>
+                                        </p:tgtEl>
+                                        <p:attrNameLst>
+                                          <p:attrName>style.visibility</p:attrName>
+                                        </p:attrNameLst>
+                                      </p:cBhvr>
+                                      <p:to>
+                                        <p:strVal val="visible"/>
+                                      </p:to>
+                                    </p:set>
+                                    <p:animEffect transition="in" filter="dissolve">
+                                      <p:cBhvr>
+                                        <p:cTn id="24" dur="500"/>
+                                        <p:tgtEl>
+                                          <p:spTgt spid="3">
+                                            <p:txEl>
+                                              <p:pRg st="5" end="5"/>
+                                            </p:txEl>
+                                          </p:spTgt>
+                                        </p:tgtEl>
+                                      </p:cBhvr>
+                                    </p:animEffect>
+                                  </p:childTnLst>
+                                </p:cTn>
+                              </p:par>
+                              <p:par>
+                                <p:cTn id="25" presetID="9" presetClass="entr" presetSubtype="0" fill="hold" grpId="0" nodeType="withEffect">
+                                  <p:stCondLst>
+                                    <p:cond delay="0"/>
+                                  </p:stCondLst>
+                                  <p:childTnLst>
+                                    <p:set>
+                                      <p:cBhvr>
+                                        <p:cTn id="26" dur="1" fill="hold">
+                                          <p:stCondLst>
+                                            <p:cond delay="0"/>
+                                          </p:stCondLst>
+                                        </p:cTn>
+                                        <p:tgtEl>
+                                          <p:spTgt spid="3">
+                                            <p:txEl>
+                                              <p:pRg st="6" end="6"/>
+                                            </p:txEl>
+                                          </p:spTgt>
+                                        </p:tgtEl>
+                                        <p:attrNameLst>
+                                          <p:attrName>style.visibility</p:attrName>
+                                        </p:attrNameLst>
+                                      </p:cBhvr>
+                                      <p:to>
+                                        <p:strVal val="visible"/>
+                                      </p:to>
+                                    </p:set>
+                                    <p:animEffect transition="in" filter="dissolve">
+                                      <p:cBhvr>
+                                        <p:cTn id="27" dur="500"/>
+                                        <p:tgtEl>
+                                          <p:spTgt spid="3">
+                                            <p:txEl>
+                                              <p:pRg st="6" end="6"/>
+                                            </p:txEl>
+                                          </p:spTgt>
+                                        </p:tgtEl>
+                                      </p:cBhvr>
+                                    </p:animEffect>
+                                  </p:childTnLst>
+                                </p:cTn>
+                              </p:par>
+                              <p:par>
+                                <p:cTn id="28" presetID="9" presetClass="entr" presetSubtype="0" fill="hold" grpId="0" nodeType="withEffect">
+                                  <p:stCondLst>
+                                    <p:cond delay="0"/>
+                                  </p:stCondLst>
+                                  <p:childTnLst>
+                                    <p:set>
+                                      <p:cBhvr>
+                                        <p:cTn id="29" dur="1" fill="hold">
+                                          <p:stCondLst>
+                                            <p:cond delay="0"/>
+                                          </p:stCondLst>
+                                        </p:cTn>
+                                        <p:tgtEl>
+                                          <p:spTgt spid="3">
+                                            <p:txEl>
+                                              <p:pRg st="7" end="7"/>
+                                            </p:txEl>
+                                          </p:spTgt>
+                                        </p:tgtEl>
+                                        <p:attrNameLst>
+                                          <p:attrName>style.visibility</p:attrName>
+                                        </p:attrNameLst>
+                                      </p:cBhvr>
+                                      <p:to>
+                                        <p:strVal val="visible"/>
+                                      </p:to>
+                                    </p:set>
+                                    <p:animEffect transition="in" filter="dissolve">
+                                      <p:cBhvr>
+                                        <p:cTn id="30" dur="500"/>
+                                        <p:tgtEl>
+                                          <p:spTgt spid="3">
+                                            <p:txEl>
+                                              <p:pRg st="7" end="7"/>
+                                            </p:txEl>
+                                          </p:spTgt>
+                                        </p:tgtEl>
+                                      </p:cBhvr>
+                                    </p:animEffect>
+                                  </p:childTnLst>
+                                </p:cTn>
+                              </p:par>
+                              <p:par>
+                                <p:cTn id="31" presetID="9" presetClass="entr" presetSubtype="0" fill="hold" grpId="0" nodeType="withEffect">
+                                  <p:stCondLst>
+                                    <p:cond delay="0"/>
+                                  </p:stCondLst>
+                                  <p:childTnLst>
+                                    <p:set>
+                                      <p:cBhvr>
+                                        <p:cTn id="32" dur="1" fill="hold">
+                                          <p:stCondLst>
+                                            <p:cond delay="0"/>
+                                          </p:stCondLst>
+                                        </p:cTn>
+                                        <p:tgtEl>
+                                          <p:spTgt spid="3">
+                                            <p:txEl>
+                                              <p:pRg st="8" end="8"/>
+                                            </p:txEl>
+                                          </p:spTgt>
+                                        </p:tgtEl>
+                                        <p:attrNameLst>
+                                          <p:attrName>style.visibility</p:attrName>
+                                        </p:attrNameLst>
+                                      </p:cBhvr>
+                                      <p:to>
+                                        <p:strVal val="visible"/>
+                                      </p:to>
+                                    </p:set>
+                                    <p:animEffect transition="in" filter="dissolve">
+                                      <p:cBhvr>
+                                        <p:cTn id="33" dur="500"/>
+                                        <p:tgtEl>
+                                          <p:spTgt spid="3">
+                                            <p:txEl>
+                                              <p:pRg st="8" end="8"/>
+                                            </p:txEl>
+                                          </p:spTgt>
+                                        </p:tgtEl>
+                                      </p:cBhvr>
+                                    </p:animEffect>
+                                  </p:childTnLst>
+                                </p:cTn>
+                              </p:par>
+                              <p:par>
+                                <p:cTn id="34" presetID="9" presetClass="entr" presetSubtype="0" fill="hold" grpId="0" nodeType="withEffect">
+                                  <p:stCondLst>
+                                    <p:cond delay="0"/>
+                                  </p:stCondLst>
+                                  <p:childTnLst>
+                                    <p:set>
+                                      <p:cBhvr>
+                                        <p:cTn id="35" dur="1" fill="hold">
+                                          <p:stCondLst>
+                                            <p:cond delay="0"/>
+                                          </p:stCondLst>
+                                        </p:cTn>
+                                        <p:tgtEl>
+                                          <p:spTgt spid="3">
+                                            <p:txEl>
+                                              <p:pRg st="9" end="9"/>
+                                            </p:txEl>
+                                          </p:spTgt>
+                                        </p:tgtEl>
+                                        <p:attrNameLst>
+                                          <p:attrName>style.visibility</p:attrName>
+                                        </p:attrNameLst>
+                                      </p:cBhvr>
+                                      <p:to>
+                                        <p:strVal val="visible"/>
+                                      </p:to>
+                                    </p:set>
+                                    <p:animEffect transition="in" filter="dissolve">
+                                      <p:cBhvr>
+                                        <p:cTn id="36" dur="500"/>
+                                        <p:tgtEl>
+                                          <p:spTgt spid="3">
+                                            <p:txEl>
+                                              <p:pRg st="9" end="9"/>
+                                            </p:txEl>
+                                          </p:spTgt>
+                                        </p:tgtEl>
+                                      </p:cBhvr>
+                                    </p:animEffect>
+                                  </p:childTnLst>
+                                </p:cTn>
+                              </p:par>
+                            </p:childTnLst>
+                          </p:cTn>
+                        </p:par>
+                      </p:childTnLst>
+                    </p:cTn>
+                  </p:par>
+                </p:childTnLst>
+              </p:cTn>
+              <p:prevCondLst>
+                <p:cond evt="onPrev" delay="0">
+                  <p:tgtEl>
+                    <p:sldTgt/>
+                  </p:tgtEl>
+                </p:cond>
+              </p:prevCondLst>
+              <p:nextCondLst>
+                <p:cond evt="onNext" delay="0">
+                  <p:tgtEl>
+                    <p:sldTgt/>
+                  </p:tgtEl>
+                </p:cond>
+              </p:nextCondLst>
+            </p:seq>
+          </p:childTnLst>
+        </p:cTn>
+      </p:par>
+    </p:tnLst>
+    <p:bldLst>
+      <p:bldP spid="3" grpId="0" build="p"/>
+    </p:bldLst>
+  </p:timing>
 </p:sld>
 </file>
 
@@ -28696,7 +30750,7 @@
           <p:cNvPr id="2" name="Title 1">
             <a:extLst>
               <a:ext uri="{FF2B5EF4-FFF2-40B4-BE49-F238E27FC236}">
-                <a16:creationId xmlns:a16="http://schemas.microsoft.com/office/drawing/2014/main" id="{EB7C4089-1746-624B-8E73-D3DAB8E88CDD}"/>
+                <a16:creationId xmlns:a16="http://schemas.microsoft.com/office/drawing/2014/main" id="{9D8D6E4C-FC36-3E4C-9387-96DD20072D9D}"/>
               </a:ext>
             </a:extLst>
           </p:cNvPr>
@@ -28704,27 +30758,32 @@
             <a:spLocks noGrp="1"/>
           </p:cNvSpPr>
           <p:nvPr>
-            <p:ph type="title"/>
+            <p:ph type="ctrTitle"/>
           </p:nvPr>
         </p:nvSpPr>
-        <p:spPr/>
+        <p:spPr>
+          <a:xfrm>
+            <a:off x="1524000" y="914013"/>
+            <a:ext cx="9144000" cy="2387600"/>
+          </a:xfrm>
+        </p:spPr>
         <p:txBody>
           <a:bodyPr/>
           <a:lstStyle/>
           <a:p>
             <a:r>
               <a:rPr lang="en-US" dirty="0"/>
-              <a:t>Outline</a:t>
+              <a:t>Part V</a:t>
             </a:r>
           </a:p>
         </p:txBody>
       </p:sp>
       <p:sp>
         <p:nvSpPr>
-          <p:cNvPr id="3" name="Content Placeholder 2">
+          <p:cNvPr id="3" name="Subtitle 2">
             <a:extLst>
               <a:ext uri="{FF2B5EF4-FFF2-40B4-BE49-F238E27FC236}">
-                <a16:creationId xmlns:a16="http://schemas.microsoft.com/office/drawing/2014/main" id="{65426B10-0364-A849-B3A4-1D0DA409155A}"/>
+                <a16:creationId xmlns:a16="http://schemas.microsoft.com/office/drawing/2014/main" id="{0451A0DE-9D64-5A48-94B5-5B4E42709819}"/>
               </a:ext>
             </a:extLst>
           </p:cNvPr>
@@ -28732,135 +30791,27 @@
             <a:spLocks noGrp="1"/>
           </p:cNvSpPr>
           <p:nvPr>
-            <p:ph idx="1"/>
+            <p:ph type="subTitle" idx="1"/>
           </p:nvPr>
         </p:nvSpPr>
-        <p:spPr/>
+        <p:spPr>
+          <a:xfrm>
+            <a:off x="1524000" y="3393688"/>
+            <a:ext cx="9144000" cy="1655762"/>
+          </a:xfrm>
+        </p:spPr>
         <p:txBody>
           <a:bodyPr/>
           <a:lstStyle/>
           <a:p>
             <a:r>
               <a:rPr lang="en-US" dirty="0"/>
-              <a:t>For each of these platforms:</a:t>
-            </a:r>
-          </a:p>
-          <a:p>
-            <a:pPr lvl="1"/>
-            <a:r>
-              <a:rPr lang="en-US" dirty="0"/>
-              <a:t>DNAC</a:t>
-            </a:r>
-          </a:p>
-          <a:p>
-            <a:pPr lvl="1"/>
+              <a:t>Interact With Cisco Platform APIs Using </a:t>
+            </a:r>
             <a:r>
               <a:rPr lang="en-US" dirty="0" err="1"/>
-              <a:t>Webex</a:t>
-            </a:r>
-            <a:r>
-              <a:rPr lang="en-US" dirty="0"/>
-              <a:t> Teams</a:t>
-            </a:r>
-          </a:p>
-          <a:p>
-            <a:pPr lvl="1"/>
-            <a:r>
-              <a:rPr lang="en-US" dirty="0"/>
-              <a:t>Meraki</a:t>
-            </a:r>
-          </a:p>
-          <a:p>
-            <a:pPr lvl="1"/>
-            <a:r>
-              <a:rPr lang="en-US" dirty="0"/>
-              <a:t>ACI</a:t>
-            </a:r>
-          </a:p>
-          <a:p>
-            <a:r>
-              <a:rPr lang="en-US" dirty="0"/>
-              <a:t>Perform the following tasks:</a:t>
-            </a:r>
-          </a:p>
-          <a:p>
-            <a:pPr lvl="1"/>
-            <a:r>
-              <a:rPr lang="en-US" dirty="0"/>
-              <a:t>Review authentication methodology</a:t>
-            </a:r>
-          </a:p>
-          <a:p>
-            <a:pPr lvl="1"/>
-            <a:r>
-              <a:rPr lang="en-US" dirty="0"/>
-              <a:t>Build Python scripts to authenticate</a:t>
-            </a:r>
-          </a:p>
-          <a:p>
-            <a:pPr lvl="1"/>
-            <a:r>
-              <a:rPr lang="en-US" dirty="0"/>
-              <a:t>Build Python scripts to read/write data</a:t>
-            </a:r>
-          </a:p>
-        </p:txBody>
-      </p:sp>
-      <p:sp>
-        <p:nvSpPr>
-          <p:cNvPr id="4" name="Date Placeholder 3">
-            <a:extLst>
-              <a:ext uri="{FF2B5EF4-FFF2-40B4-BE49-F238E27FC236}">
-                <a16:creationId xmlns:a16="http://schemas.microsoft.com/office/drawing/2014/main" id="{7ECEAF79-F4AC-E94E-9E55-220D0D396924}"/>
-              </a:ext>
-            </a:extLst>
-          </p:cNvPr>
-          <p:cNvSpPr>
-            <a:spLocks noGrp="1"/>
-          </p:cNvSpPr>
-          <p:nvPr>
-            <p:ph type="dt" sz="half" idx="10"/>
-          </p:nvPr>
-        </p:nvSpPr>
-        <p:spPr/>
-        <p:txBody>
-          <a:bodyPr/>
-          <a:lstStyle/>
-          <a:p>
-            <a:r>
-              <a:rPr lang="en-US"/>
-              <a:t>World Wide Technology ©</a:t>
-            </a:r>
-            <a:endParaRPr lang="en-US" dirty="0"/>
-          </a:p>
-        </p:txBody>
-      </p:sp>
-      <p:sp>
-        <p:nvSpPr>
-          <p:cNvPr id="5" name="Slide Number Placeholder 4">
-            <a:extLst>
-              <a:ext uri="{FF2B5EF4-FFF2-40B4-BE49-F238E27FC236}">
-                <a16:creationId xmlns:a16="http://schemas.microsoft.com/office/drawing/2014/main" id="{372DC1A4-CE8B-DB4A-8F86-2508518C35D3}"/>
-              </a:ext>
-            </a:extLst>
-          </p:cNvPr>
-          <p:cNvSpPr>
-            <a:spLocks noGrp="1"/>
-          </p:cNvSpPr>
-          <p:nvPr>
-            <p:ph type="sldNum" sz="quarter" idx="12"/>
-          </p:nvPr>
-        </p:nvSpPr>
-        <p:spPr/>
-        <p:txBody>
-          <a:bodyPr/>
-          <a:lstStyle/>
-          <a:p>
-            <a:fld id="{A44B02FA-DD2D-1844-AE35-8B2EAB0CF4EF}" type="slidenum">
-              <a:rPr lang="en-US" smtClean="0"/>
-              <a:pPr/>
-              <a:t>46</a:t>
-            </a:fld>
+              <a:t>cURL</a:t>
+            </a:r>
             <a:endParaRPr lang="en-US" dirty="0"/>
           </a:p>
         </p:txBody>
@@ -28868,7 +30819,7 @@
     </p:spTree>
     <p:extLst>
       <p:ext uri="{BB962C8B-B14F-4D97-AF65-F5344CB8AC3E}">
-        <p14:creationId xmlns:p14="http://schemas.microsoft.com/office/powerpoint/2010/main" val="232106193"/>
+        <p14:creationId xmlns:p14="http://schemas.microsoft.com/office/powerpoint/2010/main" val="2203929534"/>
       </p:ext>
     </p:extLst>
   </p:cSld>
@@ -28912,7 +30863,7 @@
           <p:cNvPr id="2" name="Title 1">
             <a:extLst>
               <a:ext uri="{FF2B5EF4-FFF2-40B4-BE49-F238E27FC236}">
-                <a16:creationId xmlns:a16="http://schemas.microsoft.com/office/drawing/2014/main" id="{9D8D6E4C-FC36-3E4C-9387-96DD20072D9D}"/>
+                <a16:creationId xmlns:a16="http://schemas.microsoft.com/office/drawing/2014/main" id="{EB7C4089-1746-624B-8E73-D3DAB8E88CDD}"/>
               </a:ext>
             </a:extLst>
           </p:cNvPr>
@@ -28920,32 +30871,27 @@
             <a:spLocks noGrp="1"/>
           </p:cNvSpPr>
           <p:nvPr>
-            <p:ph type="ctrTitle"/>
+            <p:ph type="title"/>
           </p:nvPr>
         </p:nvSpPr>
-        <p:spPr>
-          <a:xfrm>
-            <a:off x="1524000" y="914013"/>
-            <a:ext cx="9144000" cy="2387600"/>
-          </a:xfrm>
-        </p:spPr>
+        <p:spPr/>
         <p:txBody>
           <a:bodyPr/>
           <a:lstStyle/>
           <a:p>
             <a:r>
               <a:rPr lang="en-US" dirty="0"/>
-              <a:t>Part VII</a:t>
+              <a:t>Outline</a:t>
             </a:r>
           </a:p>
         </p:txBody>
       </p:sp>
       <p:sp>
         <p:nvSpPr>
-          <p:cNvPr id="3" name="Subtitle 2">
+          <p:cNvPr id="3" name="Content Placeholder 2">
             <a:extLst>
               <a:ext uri="{FF2B5EF4-FFF2-40B4-BE49-F238E27FC236}">
-                <a16:creationId xmlns:a16="http://schemas.microsoft.com/office/drawing/2014/main" id="{0451A0DE-9D64-5A48-94B5-5B4E42709819}"/>
+                <a16:creationId xmlns:a16="http://schemas.microsoft.com/office/drawing/2014/main" id="{65426B10-0364-A849-B3A4-1D0DA409155A}"/>
               </a:ext>
             </a:extLst>
           </p:cNvPr>
@@ -28953,30 +30899,159 @@
             <a:spLocks noGrp="1"/>
           </p:cNvSpPr>
           <p:nvPr>
-            <p:ph type="subTitle" idx="1"/>
+            <p:ph idx="1"/>
           </p:nvPr>
         </p:nvSpPr>
-        <p:spPr>
-          <a:xfrm>
-            <a:off x="1524000" y="3393688"/>
-            <a:ext cx="9144000" cy="1655762"/>
-          </a:xfrm>
-        </p:spPr>
+        <p:spPr/>
         <p:txBody>
           <a:bodyPr/>
           <a:lstStyle/>
           <a:p>
             <a:r>
               <a:rPr lang="en-US" dirty="0"/>
-              <a:t>Quiz, Practice Resources, &amp; References</a:t>
-            </a:r>
+              <a:t>For each of these platforms:</a:t>
+            </a:r>
+          </a:p>
+          <a:p>
+            <a:pPr lvl="1"/>
+            <a:r>
+              <a:rPr lang="en-US" dirty="0"/>
+              <a:t>DNAC</a:t>
+            </a:r>
+          </a:p>
+          <a:p>
+            <a:pPr lvl="1"/>
+            <a:r>
+              <a:rPr lang="en-US" dirty="0" err="1"/>
+              <a:t>Webex</a:t>
+            </a:r>
+            <a:r>
+              <a:rPr lang="en-US" dirty="0"/>
+              <a:t> Teams</a:t>
+            </a:r>
+          </a:p>
+          <a:p>
+            <a:pPr lvl="1"/>
+            <a:r>
+              <a:rPr lang="en-US" dirty="0"/>
+              <a:t>Meraki</a:t>
+            </a:r>
+          </a:p>
+          <a:p>
+            <a:pPr lvl="1"/>
+            <a:r>
+              <a:rPr lang="en-US" dirty="0"/>
+              <a:t>ACI</a:t>
+            </a:r>
+          </a:p>
+          <a:p>
+            <a:r>
+              <a:rPr lang="en-US" dirty="0"/>
+              <a:t>Perform the following tasks:</a:t>
+            </a:r>
+          </a:p>
+          <a:p>
+            <a:pPr lvl="1"/>
+            <a:r>
+              <a:rPr lang="en-US" dirty="0"/>
+              <a:t>Understand authentication methodology</a:t>
+            </a:r>
+          </a:p>
+          <a:p>
+            <a:pPr lvl="1"/>
+            <a:r>
+              <a:rPr lang="en-US" dirty="0"/>
+              <a:t>Build </a:t>
+            </a:r>
+            <a:r>
+              <a:rPr lang="en-US" dirty="0" err="1"/>
+              <a:t>cURL</a:t>
+            </a:r>
+            <a:r>
+              <a:rPr lang="en-US" dirty="0"/>
+              <a:t> request to authenticate</a:t>
+            </a:r>
+          </a:p>
+          <a:p>
+            <a:pPr lvl="1"/>
+            <a:r>
+              <a:rPr lang="en-US" dirty="0"/>
+              <a:t>Build </a:t>
+            </a:r>
+            <a:r>
+              <a:rPr lang="en-US" dirty="0" err="1"/>
+              <a:t>cURL</a:t>
+            </a:r>
+            <a:r>
+              <a:rPr lang="en-US" dirty="0"/>
+              <a:t> request(s) to read/write data</a:t>
+            </a:r>
+          </a:p>
+        </p:txBody>
+      </p:sp>
+      <p:sp>
+        <p:nvSpPr>
+          <p:cNvPr id="4" name="Date Placeholder 3">
+            <a:extLst>
+              <a:ext uri="{FF2B5EF4-FFF2-40B4-BE49-F238E27FC236}">
+                <a16:creationId xmlns:a16="http://schemas.microsoft.com/office/drawing/2014/main" id="{7ECEAF79-F4AC-E94E-9E55-220D0D396924}"/>
+              </a:ext>
+            </a:extLst>
+          </p:cNvPr>
+          <p:cNvSpPr>
+            <a:spLocks noGrp="1"/>
+          </p:cNvSpPr>
+          <p:nvPr>
+            <p:ph type="dt" sz="half" idx="10"/>
+          </p:nvPr>
+        </p:nvSpPr>
+        <p:spPr/>
+        <p:txBody>
+          <a:bodyPr/>
+          <a:lstStyle/>
+          <a:p>
+            <a:r>
+              <a:rPr lang="en-US"/>
+              <a:t>World Wide Technology ©</a:t>
+            </a:r>
+            <a:endParaRPr lang="en-US" dirty="0"/>
+          </a:p>
+        </p:txBody>
+      </p:sp>
+      <p:sp>
+        <p:nvSpPr>
+          <p:cNvPr id="5" name="Slide Number Placeholder 4">
+            <a:extLst>
+              <a:ext uri="{FF2B5EF4-FFF2-40B4-BE49-F238E27FC236}">
+                <a16:creationId xmlns:a16="http://schemas.microsoft.com/office/drawing/2014/main" id="{372DC1A4-CE8B-DB4A-8F86-2508518C35D3}"/>
+              </a:ext>
+            </a:extLst>
+          </p:cNvPr>
+          <p:cNvSpPr>
+            <a:spLocks noGrp="1"/>
+          </p:cNvSpPr>
+          <p:nvPr>
+            <p:ph type="sldNum" sz="quarter" idx="12"/>
+          </p:nvPr>
+        </p:nvSpPr>
+        <p:spPr/>
+        <p:txBody>
+          <a:bodyPr/>
+          <a:lstStyle/>
+          <a:p>
+            <a:fld id="{A44B02FA-DD2D-1844-AE35-8B2EAB0CF4EF}" type="slidenum">
+              <a:rPr lang="en-US" smtClean="0"/>
+              <a:pPr/>
+              <a:t>47</a:t>
+            </a:fld>
+            <a:endParaRPr lang="en-US" dirty="0"/>
           </a:p>
         </p:txBody>
       </p:sp>
     </p:spTree>
     <p:extLst>
       <p:ext uri="{BB962C8B-B14F-4D97-AF65-F5344CB8AC3E}">
-        <p14:creationId xmlns:p14="http://schemas.microsoft.com/office/powerpoint/2010/main" val="3392886013"/>
+        <p14:creationId xmlns:p14="http://schemas.microsoft.com/office/powerpoint/2010/main" val="2063027843"/>
       </p:ext>
     </p:extLst>
   </p:cSld>
@@ -29020,7 +31095,7 @@
           <p:cNvPr id="2" name="Title 1">
             <a:extLst>
               <a:ext uri="{FF2B5EF4-FFF2-40B4-BE49-F238E27FC236}">
-                <a16:creationId xmlns:a16="http://schemas.microsoft.com/office/drawing/2014/main" id="{EB7C4089-1746-624B-8E73-D3DAB8E88CDD}"/>
+                <a16:creationId xmlns:a16="http://schemas.microsoft.com/office/drawing/2014/main" id="{9D8D6E4C-FC36-3E4C-9387-96DD20072D9D}"/>
               </a:ext>
             </a:extLst>
           </p:cNvPr>
@@ -29028,27 +31103,32 @@
             <a:spLocks noGrp="1"/>
           </p:cNvSpPr>
           <p:nvPr>
-            <p:ph type="title"/>
+            <p:ph type="ctrTitle"/>
           </p:nvPr>
         </p:nvSpPr>
-        <p:spPr/>
+        <p:spPr>
+          <a:xfrm>
+            <a:off x="1524000" y="914013"/>
+            <a:ext cx="9144000" cy="2387600"/>
+          </a:xfrm>
+        </p:spPr>
         <p:txBody>
           <a:bodyPr/>
           <a:lstStyle/>
           <a:p>
             <a:r>
               <a:rPr lang="en-US" dirty="0"/>
-              <a:t>Slide Template</a:t>
+              <a:t>Part VI</a:t>
             </a:r>
           </a:p>
         </p:txBody>
       </p:sp>
       <p:sp>
         <p:nvSpPr>
-          <p:cNvPr id="3" name="Content Placeholder 2">
+          <p:cNvPr id="3" name="Subtitle 2">
             <a:extLst>
               <a:ext uri="{FF2B5EF4-FFF2-40B4-BE49-F238E27FC236}">
-                <a16:creationId xmlns:a16="http://schemas.microsoft.com/office/drawing/2014/main" id="{65426B10-0364-A849-B3A4-1D0DA409155A}"/>
+                <a16:creationId xmlns:a16="http://schemas.microsoft.com/office/drawing/2014/main" id="{0451A0DE-9D64-5A48-94B5-5B4E42709819}"/>
               </a:ext>
             </a:extLst>
           </p:cNvPr>
@@ -29056,84 +31136,30 @@
             <a:spLocks noGrp="1"/>
           </p:cNvSpPr>
           <p:nvPr>
-            <p:ph idx="1"/>
+            <p:ph type="subTitle" idx="1"/>
           </p:nvPr>
         </p:nvSpPr>
-        <p:spPr/>
+        <p:spPr>
+          <a:xfrm>
+            <a:off x="1524000" y="3393688"/>
+            <a:ext cx="9144000" cy="1655762"/>
+          </a:xfrm>
+        </p:spPr>
         <p:txBody>
           <a:bodyPr/>
           <a:lstStyle/>
           <a:p>
             <a:r>
               <a:rPr lang="en-US" dirty="0"/>
-              <a:t>Body template</a:t>
-            </a:r>
-          </a:p>
-        </p:txBody>
-      </p:sp>
-      <p:sp>
-        <p:nvSpPr>
-          <p:cNvPr id="4" name="Date Placeholder 3">
-            <a:extLst>
-              <a:ext uri="{FF2B5EF4-FFF2-40B4-BE49-F238E27FC236}">
-                <a16:creationId xmlns:a16="http://schemas.microsoft.com/office/drawing/2014/main" id="{7ECEAF79-F4AC-E94E-9E55-220D0D396924}"/>
-              </a:ext>
-            </a:extLst>
-          </p:cNvPr>
-          <p:cNvSpPr>
-            <a:spLocks noGrp="1"/>
-          </p:cNvSpPr>
-          <p:nvPr>
-            <p:ph type="dt" sz="half" idx="10"/>
-          </p:nvPr>
-        </p:nvSpPr>
-        <p:spPr/>
-        <p:txBody>
-          <a:bodyPr/>
-          <a:lstStyle/>
-          <a:p>
-            <a:r>
-              <a:rPr lang="en-US"/>
-              <a:t>World Wide Technology ©</a:t>
-            </a:r>
-            <a:endParaRPr lang="en-US" dirty="0"/>
-          </a:p>
-        </p:txBody>
-      </p:sp>
-      <p:sp>
-        <p:nvSpPr>
-          <p:cNvPr id="5" name="Slide Number Placeholder 4">
-            <a:extLst>
-              <a:ext uri="{FF2B5EF4-FFF2-40B4-BE49-F238E27FC236}">
-                <a16:creationId xmlns:a16="http://schemas.microsoft.com/office/drawing/2014/main" id="{372DC1A4-CE8B-DB4A-8F86-2508518C35D3}"/>
-              </a:ext>
-            </a:extLst>
-          </p:cNvPr>
-          <p:cNvSpPr>
-            <a:spLocks noGrp="1"/>
-          </p:cNvSpPr>
-          <p:nvPr>
-            <p:ph type="sldNum" sz="quarter" idx="12"/>
-          </p:nvPr>
-        </p:nvSpPr>
-        <p:spPr/>
-        <p:txBody>
-          <a:bodyPr/>
-          <a:lstStyle/>
-          <a:p>
-            <a:fld id="{A44B02FA-DD2D-1844-AE35-8B2EAB0CF4EF}" type="slidenum">
-              <a:rPr lang="en-US" smtClean="0"/>
-              <a:pPr/>
-              <a:t>48</a:t>
-            </a:fld>
-            <a:endParaRPr lang="en-US" dirty="0"/>
+              <a:t>Interact With Cisco Platform APIs Using Python Requests</a:t>
+            </a:r>
           </a:p>
         </p:txBody>
       </p:sp>
     </p:spTree>
     <p:extLst>
       <p:ext uri="{BB962C8B-B14F-4D97-AF65-F5344CB8AC3E}">
-        <p14:creationId xmlns:p14="http://schemas.microsoft.com/office/powerpoint/2010/main" val="2709408928"/>
+        <p14:creationId xmlns:p14="http://schemas.microsoft.com/office/powerpoint/2010/main" val="4218248441"/>
       </p:ext>
     </p:extLst>
   </p:cSld>
@@ -29195,7 +31221,7 @@
           <a:p>
             <a:r>
               <a:rPr lang="en-US" dirty="0"/>
-              <a:t>References</a:t>
+              <a:t>Outline</a:t>
             </a:r>
           </a:p>
         </p:txBody>
@@ -29218,82 +31244,71 @@
         </p:nvSpPr>
         <p:spPr/>
         <p:txBody>
-          <a:bodyPr>
-            <a:normAutofit fontScale="92500"/>
-          </a:bodyPr>
+          <a:bodyPr/>
           <a:lstStyle/>
           <a:p>
             <a:r>
-              <a:rPr lang="en-US" dirty="0">
-                <a:hlinkClick r:id="rId2"/>
-              </a:rPr>
-              <a:t>https://www.linkedin.com/pulse/why-rest-api-so-popular-mangesh-bulkar/</a:t>
-            </a:r>
-            <a:endParaRPr lang="en-US" dirty="0">
-              <a:hlinkClick r:id="rId3"/>
-            </a:endParaRPr>
-          </a:p>
-          <a:p>
-            <a:r>
-              <a:rPr lang="en-US" dirty="0">
-                <a:hlinkClick r:id="rId3"/>
-              </a:rPr>
-              <a:t>https://en.wikipedia.org/wiki/CURL</a:t>
-            </a:r>
-            <a:endParaRPr lang="en-US" dirty="0"/>
-          </a:p>
-          <a:p>
-            <a:r>
-              <a:rPr lang="en-US" dirty="0">
-                <a:hlinkClick r:id="rId4"/>
-              </a:rPr>
-              <a:t>https://en.wikipedia.org/wiki/Requests_%28software%29</a:t>
-            </a:r>
-            <a:endParaRPr lang="en-US" dirty="0"/>
-          </a:p>
-          <a:p>
-            <a:r>
-              <a:rPr lang="en-US" dirty="0">
-                <a:hlinkClick r:id="rId5"/>
-              </a:rPr>
-              <a:t>https://curl.haxx.se</a:t>
-            </a:r>
-            <a:endParaRPr lang="en-US" dirty="0"/>
-          </a:p>
-          <a:p>
-            <a:r>
-              <a:rPr lang="en-US" dirty="0">
-                <a:hlinkClick r:id="rId6"/>
-              </a:rPr>
-              <a:t>https://requests.readthedocs.io/en/master/</a:t>
-            </a:r>
-            <a:endParaRPr lang="en-US" dirty="0"/>
-          </a:p>
-          <a:p>
-            <a:r>
-              <a:rPr lang="en-US" dirty="0">
-                <a:hlinkClick r:id="rId7"/>
-              </a:rPr>
-              <a:t>https://2.python-requests.org/en/master/api/#requests.Response</a:t>
-            </a:r>
-            <a:endParaRPr lang="en-US" dirty="0"/>
-          </a:p>
-          <a:p>
-            <a:r>
               <a:rPr lang="en-US" dirty="0"/>
-              <a:t>Cisco API documentation #1</a:t>
-            </a:r>
-          </a:p>
-          <a:p>
+              <a:t>For each of these platforms:</a:t>
+            </a:r>
+          </a:p>
+          <a:p>
+            <a:pPr lvl="1"/>
             <a:r>
               <a:rPr lang="en-US" dirty="0"/>
-              <a:t>Cisco API documentation #2</a:t>
-            </a:r>
-          </a:p>
-          <a:p>
+              <a:t>DNAC</a:t>
+            </a:r>
+          </a:p>
+          <a:p>
+            <a:pPr lvl="1"/>
+            <a:r>
+              <a:rPr lang="en-US" dirty="0" err="1"/>
+              <a:t>Webex</a:t>
+            </a:r>
             <a:r>
               <a:rPr lang="en-US" dirty="0"/>
-              <a:t>Cisco API documentation #3</a:t>
+              <a:t> Teams</a:t>
+            </a:r>
+          </a:p>
+          <a:p>
+            <a:pPr lvl="1"/>
+            <a:r>
+              <a:rPr lang="en-US" dirty="0"/>
+              <a:t>Meraki</a:t>
+            </a:r>
+          </a:p>
+          <a:p>
+            <a:pPr lvl="1"/>
+            <a:r>
+              <a:rPr lang="en-US" dirty="0"/>
+              <a:t>ACI</a:t>
+            </a:r>
+          </a:p>
+          <a:p>
+            <a:r>
+              <a:rPr lang="en-US" dirty="0"/>
+              <a:t>Perform the following tasks:</a:t>
+            </a:r>
+          </a:p>
+          <a:p>
+            <a:pPr lvl="1"/>
+            <a:r>
+              <a:rPr lang="en-US" dirty="0"/>
+              <a:t>Review authentication methodology</a:t>
+            </a:r>
+          </a:p>
+          <a:p>
+            <a:pPr lvl="1"/>
+            <a:r>
+              <a:rPr lang="en-US" dirty="0"/>
+              <a:t>Build Python scripts to authenticate</a:t>
+            </a:r>
+          </a:p>
+          <a:p>
+            <a:pPr lvl="1"/>
+            <a:r>
+              <a:rPr lang="en-US" dirty="0"/>
+              <a:t>Build Python scripts to read/write data</a:t>
             </a:r>
           </a:p>
         </p:txBody>
@@ -29360,7 +31375,7 @@
     </p:spTree>
     <p:extLst>
       <p:ext uri="{BB962C8B-B14F-4D97-AF65-F5344CB8AC3E}">
-        <p14:creationId xmlns:p14="http://schemas.microsoft.com/office/powerpoint/2010/main" val="3225595977"/>
+        <p14:creationId xmlns:p14="http://schemas.microsoft.com/office/powerpoint/2010/main" val="232106193"/>
       </p:ext>
     </p:extLst>
   </p:cSld>
@@ -29509,6 +31524,498 @@
       </p:grpSpPr>
       <p:sp>
         <p:nvSpPr>
+          <p:cNvPr id="2" name="Title 1">
+            <a:extLst>
+              <a:ext uri="{FF2B5EF4-FFF2-40B4-BE49-F238E27FC236}">
+                <a16:creationId xmlns:a16="http://schemas.microsoft.com/office/drawing/2014/main" id="{9D8D6E4C-FC36-3E4C-9387-96DD20072D9D}"/>
+              </a:ext>
+            </a:extLst>
+          </p:cNvPr>
+          <p:cNvSpPr>
+            <a:spLocks noGrp="1"/>
+          </p:cNvSpPr>
+          <p:nvPr>
+            <p:ph type="ctrTitle"/>
+          </p:nvPr>
+        </p:nvSpPr>
+        <p:spPr>
+          <a:xfrm>
+            <a:off x="1524000" y="914013"/>
+            <a:ext cx="9144000" cy="2387600"/>
+          </a:xfrm>
+        </p:spPr>
+        <p:txBody>
+          <a:bodyPr/>
+          <a:lstStyle/>
+          <a:p>
+            <a:r>
+              <a:rPr lang="en-US" dirty="0"/>
+              <a:t>Part VII</a:t>
+            </a:r>
+          </a:p>
+        </p:txBody>
+      </p:sp>
+      <p:sp>
+        <p:nvSpPr>
+          <p:cNvPr id="3" name="Subtitle 2">
+            <a:extLst>
+              <a:ext uri="{FF2B5EF4-FFF2-40B4-BE49-F238E27FC236}">
+                <a16:creationId xmlns:a16="http://schemas.microsoft.com/office/drawing/2014/main" id="{0451A0DE-9D64-5A48-94B5-5B4E42709819}"/>
+              </a:ext>
+            </a:extLst>
+          </p:cNvPr>
+          <p:cNvSpPr>
+            <a:spLocks noGrp="1"/>
+          </p:cNvSpPr>
+          <p:nvPr>
+            <p:ph type="subTitle" idx="1"/>
+          </p:nvPr>
+        </p:nvSpPr>
+        <p:spPr>
+          <a:xfrm>
+            <a:off x="1524000" y="3393688"/>
+            <a:ext cx="9144000" cy="1655762"/>
+          </a:xfrm>
+        </p:spPr>
+        <p:txBody>
+          <a:bodyPr/>
+          <a:lstStyle/>
+          <a:p>
+            <a:r>
+              <a:rPr lang="en-US" dirty="0"/>
+              <a:t>Quiz, Practice Resources, &amp; References</a:t>
+            </a:r>
+          </a:p>
+        </p:txBody>
+      </p:sp>
+    </p:spTree>
+    <p:extLst>
+      <p:ext uri="{BB962C8B-B14F-4D97-AF65-F5344CB8AC3E}">
+        <p14:creationId xmlns:p14="http://schemas.microsoft.com/office/powerpoint/2010/main" val="3392886013"/>
+      </p:ext>
+    </p:extLst>
+  </p:cSld>
+  <p:clrMapOvr>
+    <a:masterClrMapping/>
+  </p:clrMapOvr>
+  <mc:AlternateContent xmlns:mc="http://schemas.openxmlformats.org/markup-compatibility/2006" xmlns:p14="http://schemas.microsoft.com/office/powerpoint/2010/main">
+    <mc:Choice Requires="p14">
+      <p:transition spd="med" p14:dur="700">
+        <p:fade/>
+      </p:transition>
+    </mc:Choice>
+    <mc:Fallback xmlns="">
+      <p:transition spd="med">
+        <p:fade/>
+      </p:transition>
+    </mc:Fallback>
+  </mc:AlternateContent>
+</p:sld>
+</file>
+
+<file path=ppt/slides/slide51.xml><?xml version="1.0" encoding="utf-8"?>
+<p:sld xmlns:a="http://schemas.openxmlformats.org/drawingml/2006/main" xmlns:r="http://schemas.openxmlformats.org/officeDocument/2006/relationships" xmlns:p="http://schemas.openxmlformats.org/presentationml/2006/main">
+  <p:cSld>
+    <p:spTree>
+      <p:nvGrpSpPr>
+        <p:cNvPr id="1" name=""/>
+        <p:cNvGrpSpPr/>
+        <p:nvPr/>
+      </p:nvGrpSpPr>
+      <p:grpSpPr>
+        <a:xfrm>
+          <a:off x="0" y="0"/>
+          <a:ext cx="0" cy="0"/>
+          <a:chOff x="0" y="0"/>
+          <a:chExt cx="0" cy="0"/>
+        </a:xfrm>
+      </p:grpSpPr>
+      <p:sp>
+        <p:nvSpPr>
+          <p:cNvPr id="2" name="Title 1">
+            <a:extLst>
+              <a:ext uri="{FF2B5EF4-FFF2-40B4-BE49-F238E27FC236}">
+                <a16:creationId xmlns:a16="http://schemas.microsoft.com/office/drawing/2014/main" id="{EB7C4089-1746-624B-8E73-D3DAB8E88CDD}"/>
+              </a:ext>
+            </a:extLst>
+          </p:cNvPr>
+          <p:cNvSpPr>
+            <a:spLocks noGrp="1"/>
+          </p:cNvSpPr>
+          <p:nvPr>
+            <p:ph type="title"/>
+          </p:nvPr>
+        </p:nvSpPr>
+        <p:spPr/>
+        <p:txBody>
+          <a:bodyPr/>
+          <a:lstStyle/>
+          <a:p>
+            <a:r>
+              <a:rPr lang="en-US" dirty="0"/>
+              <a:t>Slide Template</a:t>
+            </a:r>
+          </a:p>
+        </p:txBody>
+      </p:sp>
+      <p:sp>
+        <p:nvSpPr>
+          <p:cNvPr id="3" name="Content Placeholder 2">
+            <a:extLst>
+              <a:ext uri="{FF2B5EF4-FFF2-40B4-BE49-F238E27FC236}">
+                <a16:creationId xmlns:a16="http://schemas.microsoft.com/office/drawing/2014/main" id="{65426B10-0364-A849-B3A4-1D0DA409155A}"/>
+              </a:ext>
+            </a:extLst>
+          </p:cNvPr>
+          <p:cNvSpPr>
+            <a:spLocks noGrp="1"/>
+          </p:cNvSpPr>
+          <p:nvPr>
+            <p:ph idx="1"/>
+          </p:nvPr>
+        </p:nvSpPr>
+        <p:spPr/>
+        <p:txBody>
+          <a:bodyPr/>
+          <a:lstStyle/>
+          <a:p>
+            <a:r>
+              <a:rPr lang="en-US" dirty="0"/>
+              <a:t>Body template</a:t>
+            </a:r>
+          </a:p>
+        </p:txBody>
+      </p:sp>
+      <p:sp>
+        <p:nvSpPr>
+          <p:cNvPr id="4" name="Date Placeholder 3">
+            <a:extLst>
+              <a:ext uri="{FF2B5EF4-FFF2-40B4-BE49-F238E27FC236}">
+                <a16:creationId xmlns:a16="http://schemas.microsoft.com/office/drawing/2014/main" id="{7ECEAF79-F4AC-E94E-9E55-220D0D396924}"/>
+              </a:ext>
+            </a:extLst>
+          </p:cNvPr>
+          <p:cNvSpPr>
+            <a:spLocks noGrp="1"/>
+          </p:cNvSpPr>
+          <p:nvPr>
+            <p:ph type="dt" sz="half" idx="10"/>
+          </p:nvPr>
+        </p:nvSpPr>
+        <p:spPr/>
+        <p:txBody>
+          <a:bodyPr/>
+          <a:lstStyle/>
+          <a:p>
+            <a:r>
+              <a:rPr lang="en-US"/>
+              <a:t>World Wide Technology ©</a:t>
+            </a:r>
+            <a:endParaRPr lang="en-US" dirty="0"/>
+          </a:p>
+        </p:txBody>
+      </p:sp>
+      <p:sp>
+        <p:nvSpPr>
+          <p:cNvPr id="5" name="Slide Number Placeholder 4">
+            <a:extLst>
+              <a:ext uri="{FF2B5EF4-FFF2-40B4-BE49-F238E27FC236}">
+                <a16:creationId xmlns:a16="http://schemas.microsoft.com/office/drawing/2014/main" id="{372DC1A4-CE8B-DB4A-8F86-2508518C35D3}"/>
+              </a:ext>
+            </a:extLst>
+          </p:cNvPr>
+          <p:cNvSpPr>
+            <a:spLocks noGrp="1"/>
+          </p:cNvSpPr>
+          <p:nvPr>
+            <p:ph type="sldNum" sz="quarter" idx="12"/>
+          </p:nvPr>
+        </p:nvSpPr>
+        <p:spPr/>
+        <p:txBody>
+          <a:bodyPr/>
+          <a:lstStyle/>
+          <a:p>
+            <a:fld id="{A44B02FA-DD2D-1844-AE35-8B2EAB0CF4EF}" type="slidenum">
+              <a:rPr lang="en-US" smtClean="0"/>
+              <a:pPr/>
+              <a:t>51</a:t>
+            </a:fld>
+            <a:endParaRPr lang="en-US" dirty="0"/>
+          </a:p>
+        </p:txBody>
+      </p:sp>
+    </p:spTree>
+    <p:extLst>
+      <p:ext uri="{BB962C8B-B14F-4D97-AF65-F5344CB8AC3E}">
+        <p14:creationId xmlns:p14="http://schemas.microsoft.com/office/powerpoint/2010/main" val="2709408928"/>
+      </p:ext>
+    </p:extLst>
+  </p:cSld>
+  <p:clrMapOvr>
+    <a:masterClrMapping/>
+  </p:clrMapOvr>
+  <mc:AlternateContent xmlns:mc="http://schemas.openxmlformats.org/markup-compatibility/2006" xmlns:p14="http://schemas.microsoft.com/office/powerpoint/2010/main">
+    <mc:Choice Requires="p14">
+      <p:transition spd="med" p14:dur="700">
+        <p:fade/>
+      </p:transition>
+    </mc:Choice>
+    <mc:Fallback xmlns="">
+      <p:transition spd="med">
+        <p:fade/>
+      </p:transition>
+    </mc:Fallback>
+  </mc:AlternateContent>
+</p:sld>
+</file>
+
+<file path=ppt/slides/slide52.xml><?xml version="1.0" encoding="utf-8"?>
+<p:sld xmlns:a="http://schemas.openxmlformats.org/drawingml/2006/main" xmlns:r="http://schemas.openxmlformats.org/officeDocument/2006/relationships" xmlns:p="http://schemas.openxmlformats.org/presentationml/2006/main">
+  <p:cSld>
+    <p:spTree>
+      <p:nvGrpSpPr>
+        <p:cNvPr id="1" name=""/>
+        <p:cNvGrpSpPr/>
+        <p:nvPr/>
+      </p:nvGrpSpPr>
+      <p:grpSpPr>
+        <a:xfrm>
+          <a:off x="0" y="0"/>
+          <a:ext cx="0" cy="0"/>
+          <a:chOff x="0" y="0"/>
+          <a:chExt cx="0" cy="0"/>
+        </a:xfrm>
+      </p:grpSpPr>
+      <p:sp>
+        <p:nvSpPr>
+          <p:cNvPr id="2" name="Title 1">
+            <a:extLst>
+              <a:ext uri="{FF2B5EF4-FFF2-40B4-BE49-F238E27FC236}">
+                <a16:creationId xmlns:a16="http://schemas.microsoft.com/office/drawing/2014/main" id="{EB7C4089-1746-624B-8E73-D3DAB8E88CDD}"/>
+              </a:ext>
+            </a:extLst>
+          </p:cNvPr>
+          <p:cNvSpPr>
+            <a:spLocks noGrp="1"/>
+          </p:cNvSpPr>
+          <p:nvPr>
+            <p:ph type="title"/>
+          </p:nvPr>
+        </p:nvSpPr>
+        <p:spPr/>
+        <p:txBody>
+          <a:bodyPr/>
+          <a:lstStyle/>
+          <a:p>
+            <a:r>
+              <a:rPr lang="en-US" dirty="0"/>
+              <a:t>References</a:t>
+            </a:r>
+          </a:p>
+        </p:txBody>
+      </p:sp>
+      <p:sp>
+        <p:nvSpPr>
+          <p:cNvPr id="3" name="Content Placeholder 2">
+            <a:extLst>
+              <a:ext uri="{FF2B5EF4-FFF2-40B4-BE49-F238E27FC236}">
+                <a16:creationId xmlns:a16="http://schemas.microsoft.com/office/drawing/2014/main" id="{65426B10-0364-A849-B3A4-1D0DA409155A}"/>
+              </a:ext>
+            </a:extLst>
+          </p:cNvPr>
+          <p:cNvSpPr>
+            <a:spLocks noGrp="1"/>
+          </p:cNvSpPr>
+          <p:nvPr>
+            <p:ph idx="1"/>
+          </p:nvPr>
+        </p:nvSpPr>
+        <p:spPr/>
+        <p:txBody>
+          <a:bodyPr>
+            <a:normAutofit fontScale="92500"/>
+          </a:bodyPr>
+          <a:lstStyle/>
+          <a:p>
+            <a:r>
+              <a:rPr lang="en-US" dirty="0">
+                <a:hlinkClick r:id="rId2"/>
+              </a:rPr>
+              <a:t>https://www.linkedin.com/pulse/why-rest-api-so-popular-mangesh-bulkar/</a:t>
+            </a:r>
+            <a:endParaRPr lang="en-US" dirty="0">
+              <a:hlinkClick r:id="rId3"/>
+            </a:endParaRPr>
+          </a:p>
+          <a:p>
+            <a:r>
+              <a:rPr lang="en-US" dirty="0">
+                <a:hlinkClick r:id="rId3"/>
+              </a:rPr>
+              <a:t>https://en.wikipedia.org/wiki/CURL</a:t>
+            </a:r>
+            <a:endParaRPr lang="en-US" dirty="0"/>
+          </a:p>
+          <a:p>
+            <a:r>
+              <a:rPr lang="en-US" dirty="0">
+                <a:hlinkClick r:id="rId4"/>
+              </a:rPr>
+              <a:t>https://en.wikipedia.org/wiki/Requests_%28software%29</a:t>
+            </a:r>
+            <a:endParaRPr lang="en-US" dirty="0"/>
+          </a:p>
+          <a:p>
+            <a:r>
+              <a:rPr lang="en-US" dirty="0">
+                <a:hlinkClick r:id="rId5"/>
+              </a:rPr>
+              <a:t>https://curl.haxx.se</a:t>
+            </a:r>
+            <a:endParaRPr lang="en-US" dirty="0"/>
+          </a:p>
+          <a:p>
+            <a:r>
+              <a:rPr lang="en-US" dirty="0">
+                <a:hlinkClick r:id="rId6"/>
+              </a:rPr>
+              <a:t>https://requests.readthedocs.io/en/master/</a:t>
+            </a:r>
+            <a:endParaRPr lang="en-US" dirty="0"/>
+          </a:p>
+          <a:p>
+            <a:r>
+              <a:rPr lang="en-US" dirty="0">
+                <a:hlinkClick r:id="rId7"/>
+              </a:rPr>
+              <a:t>https://2.python-requests.org/en/master/api/#requests.Response</a:t>
+            </a:r>
+            <a:endParaRPr lang="en-US" dirty="0"/>
+          </a:p>
+          <a:p>
+            <a:r>
+              <a:rPr lang="en-US" dirty="0"/>
+              <a:t>Cisco API documentation #1</a:t>
+            </a:r>
+          </a:p>
+          <a:p>
+            <a:r>
+              <a:rPr lang="en-US" dirty="0"/>
+              <a:t>Cisco API documentation #2</a:t>
+            </a:r>
+          </a:p>
+          <a:p>
+            <a:r>
+              <a:rPr lang="en-US" dirty="0"/>
+              <a:t>Cisco API documentation #3</a:t>
+            </a:r>
+          </a:p>
+        </p:txBody>
+      </p:sp>
+      <p:sp>
+        <p:nvSpPr>
+          <p:cNvPr id="4" name="Date Placeholder 3">
+            <a:extLst>
+              <a:ext uri="{FF2B5EF4-FFF2-40B4-BE49-F238E27FC236}">
+                <a16:creationId xmlns:a16="http://schemas.microsoft.com/office/drawing/2014/main" id="{7ECEAF79-F4AC-E94E-9E55-220D0D396924}"/>
+              </a:ext>
+            </a:extLst>
+          </p:cNvPr>
+          <p:cNvSpPr>
+            <a:spLocks noGrp="1"/>
+          </p:cNvSpPr>
+          <p:nvPr>
+            <p:ph type="dt" sz="half" idx="10"/>
+          </p:nvPr>
+        </p:nvSpPr>
+        <p:spPr/>
+        <p:txBody>
+          <a:bodyPr/>
+          <a:lstStyle/>
+          <a:p>
+            <a:r>
+              <a:rPr lang="en-US"/>
+              <a:t>World Wide Technology ©</a:t>
+            </a:r>
+            <a:endParaRPr lang="en-US" dirty="0"/>
+          </a:p>
+        </p:txBody>
+      </p:sp>
+      <p:sp>
+        <p:nvSpPr>
+          <p:cNvPr id="5" name="Slide Number Placeholder 4">
+            <a:extLst>
+              <a:ext uri="{FF2B5EF4-FFF2-40B4-BE49-F238E27FC236}">
+                <a16:creationId xmlns:a16="http://schemas.microsoft.com/office/drawing/2014/main" id="{372DC1A4-CE8B-DB4A-8F86-2508518C35D3}"/>
+              </a:ext>
+            </a:extLst>
+          </p:cNvPr>
+          <p:cNvSpPr>
+            <a:spLocks noGrp="1"/>
+          </p:cNvSpPr>
+          <p:nvPr>
+            <p:ph type="sldNum" sz="quarter" idx="12"/>
+          </p:nvPr>
+        </p:nvSpPr>
+        <p:spPr/>
+        <p:txBody>
+          <a:bodyPr/>
+          <a:lstStyle/>
+          <a:p>
+            <a:fld id="{A44B02FA-DD2D-1844-AE35-8B2EAB0CF4EF}" type="slidenum">
+              <a:rPr lang="en-US" smtClean="0"/>
+              <a:pPr/>
+              <a:t>52</a:t>
+            </a:fld>
+            <a:endParaRPr lang="en-US" dirty="0"/>
+          </a:p>
+        </p:txBody>
+      </p:sp>
+    </p:spTree>
+    <p:extLst>
+      <p:ext uri="{BB962C8B-B14F-4D97-AF65-F5344CB8AC3E}">
+        <p14:creationId xmlns:p14="http://schemas.microsoft.com/office/powerpoint/2010/main" val="3225595977"/>
+      </p:ext>
+    </p:extLst>
+  </p:cSld>
+  <p:clrMapOvr>
+    <a:masterClrMapping/>
+  </p:clrMapOvr>
+  <mc:AlternateContent xmlns:mc="http://schemas.openxmlformats.org/markup-compatibility/2006" xmlns:p14="http://schemas.microsoft.com/office/powerpoint/2010/main">
+    <mc:Choice Requires="p14">
+      <p:transition spd="med" p14:dur="700">
+        <p:fade/>
+      </p:transition>
+    </mc:Choice>
+    <mc:Fallback xmlns="">
+      <p:transition spd="med">
+        <p:fade/>
+      </p:transition>
+    </mc:Fallback>
+  </mc:AlternateContent>
+</p:sld>
+</file>
+
+<file path=ppt/slides/slide53.xml><?xml version="1.0" encoding="utf-8"?>
+<p:sld xmlns:a="http://schemas.openxmlformats.org/drawingml/2006/main" xmlns:r="http://schemas.openxmlformats.org/officeDocument/2006/relationships" xmlns:p="http://schemas.openxmlformats.org/presentationml/2006/main">
+  <p:cSld>
+    <p:spTree>
+      <p:nvGrpSpPr>
+        <p:cNvPr id="1" name=""/>
+        <p:cNvGrpSpPr/>
+        <p:nvPr/>
+      </p:nvGrpSpPr>
+      <p:grpSpPr>
+        <a:xfrm>
+          <a:off x="0" y="0"/>
+          <a:ext cx="0" cy="0"/>
+          <a:chOff x="0" y="0"/>
+          <a:chExt cx="0" cy="0"/>
+        </a:xfrm>
+      </p:grpSpPr>
+      <p:sp>
+        <p:nvSpPr>
           <p:cNvPr id="4" name="Date Placeholder 3">
             <a:extLst>
               <a:ext uri="{FF2B5EF4-FFF2-40B4-BE49-F238E27FC236}">
@@ -29560,7 +32067,7 @@
             <a:fld id="{A44B02FA-DD2D-1844-AE35-8B2EAB0CF4EF}" type="slidenum">
               <a:rPr lang="en-US" smtClean="0"/>
               <a:pPr/>
-              <a:t>50</a:t>
+              <a:t>53</a:t>
             </a:fld>
             <a:endParaRPr lang="en-US" dirty="0"/>
           </a:p>

</xml_diff>

<commit_message>
Corrections/edits to Platform Overview section
</commit_message>
<xml_diff>
--- a/curl-requests-foundations.pptx
+++ b/curl-requests-foundations.pptx
@@ -271,7 +271,7 @@
           <a:p>
             <a:fld id="{966F6F5D-167E-1849-B841-EB0817BB385A}" type="datetimeFigureOut">
               <a:rPr lang="en-US" smtClean="0"/>
-              <a:t>4/15/20</a:t>
+              <a:t>4/16/20</a:t>
             </a:fld>
             <a:endParaRPr lang="en-US"/>
           </a:p>
@@ -32586,6 +32586,35 @@
               <a:t>X-Auth-Token</a:t>
             </a:r>
           </a:p>
+          <a:p>
+            <a:pPr marL="457200" lvl="1" indent="0">
+              <a:buNone/>
+            </a:pPr>
+            <a:r>
+              <a:rPr lang="en-US" b="1" i="1" dirty="0">
+                <a:solidFill>
+                  <a:srgbClr val="FFFF00"/>
+                </a:solidFill>
+              </a:rPr>
+              <a:t>{"X-Auth-Token":"</a:t>
+            </a:r>
+            <a:r>
+              <a:rPr lang="en-US" b="1" i="1" dirty="0" err="1">
+                <a:solidFill>
+                  <a:srgbClr val="FF0000"/>
+                </a:solidFill>
+              </a:rPr>
+              <a:t>token_id</a:t>
+            </a:r>
+            <a:r>
+              <a:rPr lang="en-US" b="1" i="1" dirty="0">
+                <a:solidFill>
+                  <a:srgbClr val="FFFF00"/>
+                </a:solidFill>
+              </a:rPr>
+              <a:t>"}</a:t>
+            </a:r>
+          </a:p>
         </p:txBody>
       </p:sp>
       <p:sp>
@@ -32975,6 +33004,49 @@
                                           <p:spTgt spid="3">
                                             <p:txEl>
                                               <p:pRg st="7" end="7"/>
+                                            </p:txEl>
+                                          </p:spTgt>
+                                        </p:tgtEl>
+                                      </p:cBhvr>
+                                    </p:animEffect>
+                                  </p:childTnLst>
+                                </p:cTn>
+                              </p:par>
+                              <p:par>
+                                <p:cTn id="27" presetID="9" presetClass="entr" presetSubtype="0" fill="hold" grpId="0" nodeType="withEffect">
+                                  <p:stCondLst>
+                                    <p:cond delay="0"/>
+                                  </p:stCondLst>
+                                  <p:childTnLst>
+                                    <p:set>
+                                      <p:cBhvr>
+                                        <p:cTn id="28" dur="1" fill="hold">
+                                          <p:stCondLst>
+                                            <p:cond delay="0"/>
+                                          </p:stCondLst>
+                                        </p:cTn>
+                                        <p:tgtEl>
+                                          <p:spTgt spid="3">
+                                            <p:txEl>
+                                              <p:pRg st="8" end="8"/>
+                                            </p:txEl>
+                                          </p:spTgt>
+                                        </p:tgtEl>
+                                        <p:attrNameLst>
+                                          <p:attrName>style.visibility</p:attrName>
+                                        </p:attrNameLst>
+                                      </p:cBhvr>
+                                      <p:to>
+                                        <p:strVal val="visible"/>
+                                      </p:to>
+                                    </p:set>
+                                    <p:animEffect transition="in" filter="dissolve">
+                                      <p:cBhvr>
+                                        <p:cTn id="29" dur="500"/>
+                                        <p:tgtEl>
+                                          <p:spTgt spid="3">
+                                            <p:txEl>
+                                              <p:pRg st="8" end="8"/>
                                             </p:txEl>
                                           </p:spTgt>
                                         </p:tgtEl>
@@ -35837,7 +35909,7 @@
             <a:pPr lvl="1"/>
             <a:r>
               <a:rPr lang="en-US" dirty="0"/>
-              <a:t>Content types – JSON</a:t>
+              <a:t>Content type – JSON</a:t>
             </a:r>
           </a:p>
         </p:txBody>
@@ -38419,7 +38491,7 @@
             <a:pPr lvl="1"/>
             <a:r>
               <a:rPr lang="en-US" dirty="0"/>
-              <a:t>Content type – JSON</a:t>
+              <a:t>Content types – Accepts JSON &amp; URL encoded form data, returns JSON</a:t>
             </a:r>
           </a:p>
         </p:txBody>
@@ -39635,7 +39707,7 @@
               <a:rPr lang="en-US" dirty="0">
                 <a:hlinkClick r:id="rId3"/>
               </a:rPr>
-              <a:t>https://developer.webex.com/docs/platform-introduction</a:t>
+              <a:t>https://developer.webex.com/docs/api/getting-started</a:t>
             </a:r>
             <a:endParaRPr lang="en-US" dirty="0"/>
           </a:p>

</xml_diff>

<commit_message>
Added ACI cURL commands
</commit_message>
<xml_diff>
--- a/curl-requests-foundations.pptx
+++ b/curl-requests-foundations.pptx
@@ -5,7 +5,7 @@
     <p:sldMasterId id="2147483660" r:id="rId1"/>
   </p:sldMasterIdLst>
   <p:notesMasterIdLst>
-    <p:notesMasterId r:id="rId66"/>
+    <p:notesMasterId r:id="rId68"/>
   </p:notesMasterIdLst>
   <p:sldIdLst>
     <p:sldId id="256" r:id="rId2"/>
@@ -66,12 +66,14 @@
     <p:sldId id="393" r:id="rId57"/>
     <p:sldId id="330" r:id="rId58"/>
     <p:sldId id="328" r:id="rId59"/>
-    <p:sldId id="333" r:id="rId60"/>
-    <p:sldId id="334" r:id="rId61"/>
-    <p:sldId id="335" r:id="rId62"/>
-    <p:sldId id="311" r:id="rId63"/>
-    <p:sldId id="321" r:id="rId64"/>
-    <p:sldId id="280" r:id="rId65"/>
+    <p:sldId id="394" r:id="rId60"/>
+    <p:sldId id="395" r:id="rId61"/>
+    <p:sldId id="333" r:id="rId62"/>
+    <p:sldId id="334" r:id="rId63"/>
+    <p:sldId id="335" r:id="rId64"/>
+    <p:sldId id="311" r:id="rId65"/>
+    <p:sldId id="321" r:id="rId66"/>
+    <p:sldId id="280" r:id="rId67"/>
   </p:sldIdLst>
   <p:sldSz cx="12192000" cy="6858000"/>
   <p:notesSz cx="6858000" cy="9144000"/>
@@ -4369,6 +4371,130 @@
               <a:t>// TODO</a:t>
             </a:r>
           </a:p>
+          <a:p>
+            <a:pPr marL="171450" marR="0" lvl="0" indent="-171450" algn="l" defTabSz="914400" rtl="0" eaLnBrk="1" fontAlgn="auto" latinLnBrk="0" hangingPunct="1">
+              <a:lnSpc>
+                <a:spcPct val="100000"/>
+              </a:lnSpc>
+              <a:spcBef>
+                <a:spcPts val="0"/>
+              </a:spcBef>
+              <a:spcAft>
+                <a:spcPts val="0"/>
+              </a:spcAft>
+              <a:buClrTx/>
+              <a:buSzTx/>
+              <a:buFont typeface="Arial" panose="020B0604020202020204" pitchFamily="34" charset="0"/>
+              <a:buChar char="•"/>
+              <a:tabLst/>
+              <a:defRPr/>
+            </a:pPr>
+            <a:r>
+              <a:rPr lang="en-US" dirty="0"/>
+              <a:t>The .</a:t>
+            </a:r>
+            <a:r>
+              <a:rPr lang="en-US" dirty="0" err="1"/>
+              <a:t>cookie_jar</a:t>
+            </a:r>
+            <a:r>
+              <a:rPr lang="en-US" dirty="0"/>
+              <a:t> name is arbitrary</a:t>
+            </a:r>
+          </a:p>
+          <a:p>
+            <a:pPr marL="171450" marR="0" lvl="0" indent="-171450" algn="l" defTabSz="914400" rtl="0" eaLnBrk="1" fontAlgn="auto" latinLnBrk="0" hangingPunct="1">
+              <a:lnSpc>
+                <a:spcPct val="100000"/>
+              </a:lnSpc>
+              <a:spcBef>
+                <a:spcPts val="0"/>
+              </a:spcBef>
+              <a:spcAft>
+                <a:spcPts val="0"/>
+              </a:spcAft>
+              <a:buClrTx/>
+              <a:buSzTx/>
+              <a:buFont typeface="Arial" panose="020B0604020202020204" pitchFamily="34" charset="0"/>
+              <a:buChar char="•"/>
+              <a:tabLst/>
+              <a:defRPr/>
+            </a:pPr>
+            <a:r>
+              <a:rPr lang="en-US" dirty="0"/>
+              <a:t>Notice the location of the token</a:t>
+            </a:r>
+          </a:p>
+          <a:p>
+            <a:pPr marL="628650" marR="0" lvl="1" indent="-171450" algn="l" defTabSz="914400" rtl="0" eaLnBrk="1" fontAlgn="auto" latinLnBrk="0" hangingPunct="1">
+              <a:lnSpc>
+                <a:spcPct val="100000"/>
+              </a:lnSpc>
+              <a:spcBef>
+                <a:spcPts val="0"/>
+              </a:spcBef>
+              <a:spcAft>
+                <a:spcPts val="0"/>
+              </a:spcAft>
+              <a:buClrTx/>
+              <a:buSzTx/>
+              <a:buFont typeface="Arial" panose="020B0604020202020204" pitchFamily="34" charset="0"/>
+              <a:buChar char="•"/>
+              <a:tabLst/>
+              <a:defRPr/>
+            </a:pPr>
+            <a:r>
+              <a:rPr lang="en-US" dirty="0"/>
+              <a:t>In the cookie response header</a:t>
+            </a:r>
+          </a:p>
+          <a:p>
+            <a:pPr marL="628650" marR="0" lvl="1" indent="-171450" algn="l" defTabSz="914400" rtl="0" eaLnBrk="1" fontAlgn="auto" latinLnBrk="0" hangingPunct="1">
+              <a:lnSpc>
+                <a:spcPct val="100000"/>
+              </a:lnSpc>
+              <a:spcBef>
+                <a:spcPts val="0"/>
+              </a:spcBef>
+              <a:spcAft>
+                <a:spcPts val="0"/>
+              </a:spcAft>
+              <a:buClrTx/>
+              <a:buSzTx/>
+              <a:buFont typeface="Arial" panose="020B0604020202020204" pitchFamily="34" charset="0"/>
+              <a:buChar char="•"/>
+              <a:tabLst/>
+              <a:defRPr/>
+            </a:pPr>
+            <a:r>
+              <a:rPr lang="en-US" dirty="0"/>
+              <a:t>In the body {"</a:t>
+            </a:r>
+            <a:r>
+              <a:rPr lang="en-US" dirty="0" err="1"/>
+              <a:t>imdata</a:t>
+            </a:r>
+            <a:r>
+              <a:rPr lang="en-US" dirty="0"/>
+              <a:t>":[{"</a:t>
+            </a:r>
+            <a:r>
+              <a:rPr lang="en-US" dirty="0" err="1"/>
+              <a:t>aaaLogin</a:t>
+            </a:r>
+            <a:r>
+              <a:rPr lang="en-US" dirty="0"/>
+              <a:t>":{"attributes":{"token":"</a:t>
+            </a:r>
+            <a:r>
+              <a:rPr lang="en-US" dirty="0" err="1"/>
+              <a:t>token_id</a:t>
+            </a:r>
+            <a:r>
+              <a:rPr lang="en-US" dirty="0"/>
+              <a:t>"}}}]}</a:t>
+            </a:r>
+          </a:p>
         </p:txBody>
       </p:sp>
       <p:sp>
@@ -4397,7 +4523,7 @@
     </p:spTree>
     <p:extLst>
       <p:ext uri="{BB962C8B-B14F-4D97-AF65-F5344CB8AC3E}">
-        <p14:creationId xmlns:p14="http://schemas.microsoft.com/office/powerpoint/2010/main" val="3252389655"/>
+        <p14:creationId xmlns:p14="http://schemas.microsoft.com/office/powerpoint/2010/main" val="382958508"/>
       </p:ext>
     </p:extLst>
   </p:cSld>
@@ -4451,6 +4577,101 @@
           <a:bodyPr/>
           <a:lstStyle/>
           <a:p>
+            <a:r>
+              <a:rPr lang="en-US" dirty="0"/>
+              <a:t>The .</a:t>
+            </a:r>
+            <a:r>
+              <a:rPr lang="en-US" dirty="0" err="1"/>
+              <a:t>cookie_jar</a:t>
+            </a:r>
+            <a:r>
+              <a:rPr lang="en-US" dirty="0"/>
+              <a:t> name is arbitrary</a:t>
+            </a:r>
+          </a:p>
+        </p:txBody>
+      </p:sp>
+      <p:sp>
+        <p:nvSpPr>
+          <p:cNvPr id="4" name="Slide Number Placeholder 3"/>
+          <p:cNvSpPr>
+            <a:spLocks noGrp="1"/>
+          </p:cNvSpPr>
+          <p:nvPr>
+            <p:ph type="sldNum" sz="quarter" idx="5"/>
+          </p:nvPr>
+        </p:nvSpPr>
+        <p:spPr/>
+        <p:txBody>
+          <a:bodyPr/>
+          <a:lstStyle/>
+          <a:p>
+            <a:fld id="{020CF8D1-BA82-5045-ACF9-1AA42AD6A519}" type="slidenum">
+              <a:rPr lang="en-US" smtClean="0"/>
+              <a:t>60</a:t>
+            </a:fld>
+            <a:endParaRPr lang="en-US"/>
+          </a:p>
+        </p:txBody>
+      </p:sp>
+    </p:spTree>
+    <p:extLst>
+      <p:ext uri="{BB962C8B-B14F-4D97-AF65-F5344CB8AC3E}">
+        <p14:creationId xmlns:p14="http://schemas.microsoft.com/office/powerpoint/2010/main" val="4026632504"/>
+      </p:ext>
+    </p:extLst>
+  </p:cSld>
+  <p:clrMapOvr>
+    <a:masterClrMapping/>
+  </p:clrMapOvr>
+</p:notes>
+</file>
+
+<file path=ppt/notesSlides/notesSlide45.xml><?xml version="1.0" encoding="utf-8"?>
+<p:notes xmlns:a="http://schemas.openxmlformats.org/drawingml/2006/main" xmlns:r="http://schemas.openxmlformats.org/officeDocument/2006/relationships" xmlns:p="http://schemas.openxmlformats.org/presentationml/2006/main">
+  <p:cSld>
+    <p:spTree>
+      <p:nvGrpSpPr>
+        <p:cNvPr id="1" name=""/>
+        <p:cNvGrpSpPr/>
+        <p:nvPr/>
+      </p:nvGrpSpPr>
+      <p:grpSpPr>
+        <a:xfrm>
+          <a:off x="0" y="0"/>
+          <a:ext cx="0" cy="0"/>
+          <a:chOff x="0" y="0"/>
+          <a:chExt cx="0" cy="0"/>
+        </a:xfrm>
+      </p:grpSpPr>
+      <p:sp>
+        <p:nvSpPr>
+          <p:cNvPr id="2" name="Slide Image Placeholder 1"/>
+          <p:cNvSpPr>
+            <a:spLocks noGrp="1" noRot="1" noChangeAspect="1"/>
+          </p:cNvSpPr>
+          <p:nvPr>
+            <p:ph type="sldImg"/>
+          </p:nvPr>
+        </p:nvSpPr>
+        <p:spPr/>
+      </p:sp>
+      <p:sp>
+        <p:nvSpPr>
+          <p:cNvPr id="3" name="Notes Placeholder 2"/>
+          <p:cNvSpPr>
+            <a:spLocks noGrp="1"/>
+          </p:cNvSpPr>
+          <p:nvPr>
+            <p:ph type="body" idx="1"/>
+          </p:nvPr>
+        </p:nvSpPr>
+        <p:spPr/>
+        <p:txBody>
+          <a:bodyPr/>
+          <a:lstStyle/>
+          <a:p>
             <a:pPr marL="0" marR="0" lvl="0" indent="0" algn="l" defTabSz="914400" rtl="0" eaLnBrk="1" fontAlgn="auto" latinLnBrk="0" hangingPunct="1">
               <a:lnSpc>
                 <a:spcPct val="100000"/>
@@ -4493,6 +4714,110 @@
             <a:fld id="{020CF8D1-BA82-5045-ACF9-1AA42AD6A519}" type="slidenum">
               <a:rPr lang="en-US" smtClean="0"/>
               <a:t>61</a:t>
+            </a:fld>
+            <a:endParaRPr lang="en-US"/>
+          </a:p>
+        </p:txBody>
+      </p:sp>
+    </p:spTree>
+    <p:extLst>
+      <p:ext uri="{BB962C8B-B14F-4D97-AF65-F5344CB8AC3E}">
+        <p14:creationId xmlns:p14="http://schemas.microsoft.com/office/powerpoint/2010/main" val="3252389655"/>
+      </p:ext>
+    </p:extLst>
+  </p:cSld>
+  <p:clrMapOvr>
+    <a:masterClrMapping/>
+  </p:clrMapOvr>
+</p:notes>
+</file>
+
+<file path=ppt/notesSlides/notesSlide46.xml><?xml version="1.0" encoding="utf-8"?>
+<p:notes xmlns:a="http://schemas.openxmlformats.org/drawingml/2006/main" xmlns:r="http://schemas.openxmlformats.org/officeDocument/2006/relationships" xmlns:p="http://schemas.openxmlformats.org/presentationml/2006/main">
+  <p:cSld>
+    <p:spTree>
+      <p:nvGrpSpPr>
+        <p:cNvPr id="1" name=""/>
+        <p:cNvGrpSpPr/>
+        <p:nvPr/>
+      </p:nvGrpSpPr>
+      <p:grpSpPr>
+        <a:xfrm>
+          <a:off x="0" y="0"/>
+          <a:ext cx="0" cy="0"/>
+          <a:chOff x="0" y="0"/>
+          <a:chExt cx="0" cy="0"/>
+        </a:xfrm>
+      </p:grpSpPr>
+      <p:sp>
+        <p:nvSpPr>
+          <p:cNvPr id="2" name="Slide Image Placeholder 1"/>
+          <p:cNvSpPr>
+            <a:spLocks noGrp="1" noRot="1" noChangeAspect="1"/>
+          </p:cNvSpPr>
+          <p:nvPr>
+            <p:ph type="sldImg"/>
+          </p:nvPr>
+        </p:nvSpPr>
+        <p:spPr/>
+      </p:sp>
+      <p:sp>
+        <p:nvSpPr>
+          <p:cNvPr id="3" name="Notes Placeholder 2"/>
+          <p:cNvSpPr>
+            <a:spLocks noGrp="1"/>
+          </p:cNvSpPr>
+          <p:nvPr>
+            <p:ph type="body" idx="1"/>
+          </p:nvPr>
+        </p:nvSpPr>
+        <p:spPr/>
+        <p:txBody>
+          <a:bodyPr/>
+          <a:lstStyle/>
+          <a:p>
+            <a:pPr marL="0" marR="0" lvl="0" indent="0" algn="l" defTabSz="914400" rtl="0" eaLnBrk="1" fontAlgn="auto" latinLnBrk="0" hangingPunct="1">
+              <a:lnSpc>
+                <a:spcPct val="100000"/>
+              </a:lnSpc>
+              <a:spcBef>
+                <a:spcPts val="0"/>
+              </a:spcBef>
+              <a:spcAft>
+                <a:spcPts val="0"/>
+              </a:spcAft>
+              <a:buClrTx/>
+              <a:buSzTx/>
+              <a:buFontTx/>
+              <a:buNone/>
+              <a:tabLst/>
+              <a:defRPr/>
+            </a:pPr>
+            <a:r>
+              <a:rPr lang="en-US" dirty="0"/>
+              <a:t>// TODO</a:t>
+            </a:r>
+          </a:p>
+        </p:txBody>
+      </p:sp>
+      <p:sp>
+        <p:nvSpPr>
+          <p:cNvPr id="4" name="Slide Number Placeholder 3"/>
+          <p:cNvSpPr>
+            <a:spLocks noGrp="1"/>
+          </p:cNvSpPr>
+          <p:nvPr>
+            <p:ph type="sldNum" sz="quarter" idx="5"/>
+          </p:nvPr>
+        </p:nvSpPr>
+        <p:spPr/>
+        <p:txBody>
+          <a:bodyPr/>
+          <a:lstStyle/>
+          <a:p>
+            <a:fld id="{020CF8D1-BA82-5045-ACF9-1AA42AD6A519}" type="slidenum">
+              <a:rPr lang="en-US" smtClean="0"/>
+              <a:t>63</a:t>
             </a:fld>
             <a:endParaRPr lang="en-US"/>
           </a:p>
@@ -9070,10 +9395,15 @@
             <p:ph idx="1"/>
           </p:nvPr>
         </p:nvSpPr>
-        <p:spPr/>
+        <p:spPr>
+          <a:xfrm>
+            <a:off x="838200" y="1825625"/>
+            <a:ext cx="10515600" cy="4530725"/>
+          </a:xfrm>
+        </p:spPr>
         <p:txBody>
           <a:bodyPr>
-            <a:normAutofit fontScale="92500" lnSpcReduction="10000"/>
+            <a:normAutofit fontScale="92500" lnSpcReduction="20000"/>
           </a:bodyPr>
           <a:lstStyle/>
           <a:p>
@@ -9189,6 +9519,92 @@
             <a:r>
               <a:rPr lang="en-US" dirty="0"/>
               <a:t>– HTTP client header(s)</a:t>
+            </a:r>
+          </a:p>
+          <a:p>
+            <a:pPr lvl="1"/>
+            <a:r>
+              <a:rPr lang="en-US" dirty="0">
+                <a:solidFill>
+                  <a:srgbClr val="FFFF00"/>
+                </a:solidFill>
+              </a:rPr>
+              <a:t>-c </a:t>
+            </a:r>
+            <a:r>
+              <a:rPr lang="en-US" dirty="0"/>
+              <a:t>or</a:t>
+            </a:r>
+            <a:r>
+              <a:rPr lang="en-US" dirty="0">
+                <a:solidFill>
+                  <a:srgbClr val="FFFF00"/>
+                </a:solidFill>
+              </a:rPr>
+              <a:t> --cookie-jar &lt;</a:t>
+            </a:r>
+            <a:r>
+              <a:rPr lang="en-US" dirty="0" err="1">
+                <a:solidFill>
+                  <a:srgbClr val="FFFF00"/>
+                </a:solidFill>
+              </a:rPr>
+              <a:t>file_name</a:t>
+            </a:r>
+            <a:r>
+              <a:rPr lang="en-US" dirty="0">
+                <a:solidFill>
+                  <a:srgbClr val="FFFF00"/>
+                </a:solidFill>
+              </a:rPr>
+              <a:t>&gt; </a:t>
+            </a:r>
+            <a:r>
+              <a:rPr lang="en-US" dirty="0"/>
+              <a:t>– write session cookies to a file</a:t>
+            </a:r>
+          </a:p>
+          <a:p>
+            <a:pPr lvl="1"/>
+            <a:r>
+              <a:rPr lang="en-US" dirty="0">
+                <a:solidFill>
+                  <a:srgbClr val="FFFF00"/>
+                </a:solidFill>
+              </a:rPr>
+              <a:t>-b </a:t>
+            </a:r>
+            <a:r>
+              <a:rPr lang="en-US" dirty="0"/>
+              <a:t>or</a:t>
+            </a:r>
+            <a:r>
+              <a:rPr lang="en-US" dirty="0">
+                <a:solidFill>
+                  <a:srgbClr val="FFFF00"/>
+                </a:solidFill>
+              </a:rPr>
+              <a:t> --cookie &lt;</a:t>
+            </a:r>
+            <a:r>
+              <a:rPr lang="en-US" dirty="0" err="1">
+                <a:solidFill>
+                  <a:srgbClr val="FFFF00"/>
+                </a:solidFill>
+              </a:rPr>
+              <a:t>file_name</a:t>
+            </a:r>
+            <a:r>
+              <a:rPr lang="en-US" dirty="0">
+                <a:solidFill>
+                  <a:srgbClr val="FFFF00"/>
+                </a:solidFill>
+              </a:rPr>
+              <a:t>&gt; </a:t>
+            </a:r>
+            <a:r>
+              <a:rPr lang="en-US" dirty="0"/>
+              <a:t>– send session cookies from a file</a:t>
             </a:r>
           </a:p>
           <a:p>
@@ -10324,6 +10740,128 @@
                                           <p:spTgt spid="3">
                                             <p:txEl>
                                               <p:pRg st="11" end="11"/>
+                                            </p:txEl>
+                                          </p:spTgt>
+                                        </p:tgtEl>
+                                      </p:cBhvr>
+                                    </p:animEffect>
+                                  </p:childTnLst>
+                                </p:cTn>
+                              </p:par>
+                            </p:childTnLst>
+                          </p:cTn>
+                        </p:par>
+                      </p:childTnLst>
+                    </p:cTn>
+                  </p:par>
+                  <p:par>
+                    <p:cTn id="63" fill="hold">
+                      <p:stCondLst>
+                        <p:cond delay="indefinite"/>
+                      </p:stCondLst>
+                      <p:childTnLst>
+                        <p:par>
+                          <p:cTn id="64" fill="hold">
+                            <p:stCondLst>
+                              <p:cond delay="0"/>
+                            </p:stCondLst>
+                            <p:childTnLst>
+                              <p:par>
+                                <p:cTn id="65" presetID="9" presetClass="entr" presetSubtype="0" fill="hold" grpId="0" nodeType="clickEffect">
+                                  <p:stCondLst>
+                                    <p:cond delay="0"/>
+                                  </p:stCondLst>
+                                  <p:childTnLst>
+                                    <p:set>
+                                      <p:cBhvr>
+                                        <p:cTn id="66" dur="1" fill="hold">
+                                          <p:stCondLst>
+                                            <p:cond delay="0"/>
+                                          </p:stCondLst>
+                                        </p:cTn>
+                                        <p:tgtEl>
+                                          <p:spTgt spid="3">
+                                            <p:txEl>
+                                              <p:pRg st="12" end="12"/>
+                                            </p:txEl>
+                                          </p:spTgt>
+                                        </p:tgtEl>
+                                        <p:attrNameLst>
+                                          <p:attrName>style.visibility</p:attrName>
+                                        </p:attrNameLst>
+                                      </p:cBhvr>
+                                      <p:to>
+                                        <p:strVal val="visible"/>
+                                      </p:to>
+                                    </p:set>
+                                    <p:animEffect transition="in" filter="dissolve">
+                                      <p:cBhvr>
+                                        <p:cTn id="67" dur="500"/>
+                                        <p:tgtEl>
+                                          <p:spTgt spid="3">
+                                            <p:txEl>
+                                              <p:pRg st="12" end="12"/>
+                                            </p:txEl>
+                                          </p:spTgt>
+                                        </p:tgtEl>
+                                      </p:cBhvr>
+                                    </p:animEffect>
+                                  </p:childTnLst>
+                                </p:cTn>
+                              </p:par>
+                            </p:childTnLst>
+                          </p:cTn>
+                        </p:par>
+                      </p:childTnLst>
+                    </p:cTn>
+                  </p:par>
+                  <p:par>
+                    <p:cTn id="68" fill="hold">
+                      <p:stCondLst>
+                        <p:cond delay="indefinite"/>
+                      </p:stCondLst>
+                      <p:childTnLst>
+                        <p:par>
+                          <p:cTn id="69" fill="hold">
+                            <p:stCondLst>
+                              <p:cond delay="0"/>
+                            </p:stCondLst>
+                            <p:childTnLst>
+                              <p:par>
+                                <p:cTn id="70" presetID="9" presetClass="entr" presetSubtype="0" fill="hold" grpId="0" nodeType="clickEffect">
+                                  <p:stCondLst>
+                                    <p:cond delay="0"/>
+                                  </p:stCondLst>
+                                  <p:childTnLst>
+                                    <p:set>
+                                      <p:cBhvr>
+                                        <p:cTn id="71" dur="1" fill="hold">
+                                          <p:stCondLst>
+                                            <p:cond delay="0"/>
+                                          </p:stCondLst>
+                                        </p:cTn>
+                                        <p:tgtEl>
+                                          <p:spTgt spid="3">
+                                            <p:txEl>
+                                              <p:pRg st="13" end="13"/>
+                                            </p:txEl>
+                                          </p:spTgt>
+                                        </p:tgtEl>
+                                        <p:attrNameLst>
+                                          <p:attrName>style.visibility</p:attrName>
+                                        </p:attrNameLst>
+                                      </p:cBhvr>
+                                      <p:to>
+                                        <p:strVal val="visible"/>
+                                      </p:to>
+                                    </p:set>
+                                    <p:animEffect transition="in" filter="dissolve">
+                                      <p:cBhvr>
+                                        <p:cTn id="72" dur="500"/>
+                                        <p:tgtEl>
+                                          <p:spTgt spid="3">
+                                            <p:txEl>
+                                              <p:pRg st="13" end="13"/>
                                             </p:txEl>
                                           </p:spTgt>
                                         </p:tgtEl>
@@ -40479,7 +41017,21 @@
             <a:pPr lvl="1"/>
             <a:r>
               <a:rPr lang="en-US" dirty="0"/>
+              <a:t>ACI</a:t>
+            </a:r>
+          </a:p>
+          <a:p>
+            <a:pPr lvl="1"/>
+            <a:r>
+              <a:rPr lang="en-US" dirty="0"/>
               <a:t>DNAC</a:t>
+            </a:r>
+          </a:p>
+          <a:p>
+            <a:pPr lvl="1"/>
+            <a:r>
+              <a:rPr lang="en-US" dirty="0"/>
+              <a:t>Meraki</a:t>
             </a:r>
           </a:p>
           <a:p>
@@ -40491,20 +41043,6 @@
             <a:r>
               <a:rPr lang="en-US" dirty="0"/>
               <a:t> Teams</a:t>
-            </a:r>
-          </a:p>
-          <a:p>
-            <a:pPr lvl="1"/>
-            <a:r>
-              <a:rPr lang="en-US" dirty="0"/>
-              <a:t>Meraki</a:t>
-            </a:r>
-          </a:p>
-          <a:p>
-            <a:pPr lvl="1"/>
-            <a:r>
-              <a:rPr lang="en-US" dirty="0"/>
-              <a:t>ACI</a:t>
             </a:r>
           </a:p>
           <a:p>
@@ -40658,7 +41196,7 @@
           <p:cNvPr id="2" name="Title 1">
             <a:extLst>
               <a:ext uri="{FF2B5EF4-FFF2-40B4-BE49-F238E27FC236}">
-                <a16:creationId xmlns:a16="http://schemas.microsoft.com/office/drawing/2014/main" id="{9D8D6E4C-FC36-3E4C-9387-96DD20072D9D}"/>
+                <a16:creationId xmlns:a16="http://schemas.microsoft.com/office/drawing/2014/main" id="{9B4DF7CD-7263-9840-AE80-6F1B7FA6AF3C}"/>
               </a:ext>
             </a:extLst>
           </p:cNvPr>
@@ -40666,32 +41204,39 @@
             <a:spLocks noGrp="1"/>
           </p:cNvSpPr>
           <p:nvPr>
-            <p:ph type="ctrTitle"/>
+            <p:ph type="title"/>
           </p:nvPr>
         </p:nvSpPr>
-        <p:spPr>
-          <a:xfrm>
-            <a:off x="1524000" y="914013"/>
-            <a:ext cx="9144000" cy="2387600"/>
-          </a:xfrm>
-        </p:spPr>
+        <p:spPr/>
         <p:txBody>
           <a:bodyPr/>
           <a:lstStyle/>
           <a:p>
             <a:r>
+              <a:rPr lang="en-US" dirty="0" err="1"/>
+              <a:t>cURL</a:t>
+            </a:r>
+            <a:r>
               <a:rPr lang="en-US" dirty="0"/>
-              <a:t>Part VI</a:t>
+              <a:t> – </a:t>
+            </a:r>
+            <a:r>
+              <a:rPr lang="en-US" dirty="0" err="1"/>
+              <a:t>DevNet</a:t>
+            </a:r>
+            <a:r>
+              <a:rPr lang="en-US" dirty="0"/>
+              <a:t> Always-On ACI Sandbox</a:t>
             </a:r>
           </a:p>
         </p:txBody>
       </p:sp>
       <p:sp>
         <p:nvSpPr>
-          <p:cNvPr id="3" name="Subtitle 2">
+          <p:cNvPr id="3" name="Content Placeholder 2">
             <a:extLst>
               <a:ext uri="{FF2B5EF4-FFF2-40B4-BE49-F238E27FC236}">
-                <a16:creationId xmlns:a16="http://schemas.microsoft.com/office/drawing/2014/main" id="{0451A0DE-9D64-5A48-94B5-5B4E42709819}"/>
+                <a16:creationId xmlns:a16="http://schemas.microsoft.com/office/drawing/2014/main" id="{A610A140-16FE-F54F-9766-D3A50E4E4F0B}"/>
               </a:ext>
             </a:extLst>
           </p:cNvPr>
@@ -40699,30 +41244,399 @@
             <a:spLocks noGrp="1"/>
           </p:cNvSpPr>
           <p:nvPr>
-            <p:ph type="subTitle" idx="1"/>
+            <p:ph idx="1"/>
           </p:nvPr>
         </p:nvSpPr>
-        <p:spPr>
-          <a:xfrm>
-            <a:off x="1524000" y="3393688"/>
-            <a:ext cx="9144000" cy="1655762"/>
-          </a:xfrm>
-        </p:spPr>
+        <p:spPr/>
         <p:txBody>
           <a:bodyPr/>
           <a:lstStyle/>
           <a:p>
             <a:r>
               <a:rPr lang="en-US" dirty="0"/>
-              <a:t>Interact With Cisco Platform APIs Using Python Requests</a:t>
-            </a:r>
+              <a:t>Step 1 – Authenticate &amp; store token in a cookie file</a:t>
+            </a:r>
+          </a:p>
+          <a:p>
+            <a:pPr marL="457200" lvl="1" indent="0">
+              <a:buNone/>
+            </a:pPr>
+            <a:r>
+              <a:rPr lang="en-US" b="1" i="1" dirty="0">
+                <a:solidFill>
+                  <a:srgbClr val="FFFF00"/>
+                </a:solidFill>
+              </a:rPr>
+              <a:t>curl -X POST --</a:t>
+            </a:r>
+            <a:r>
+              <a:rPr lang="en-US" b="1" i="1" dirty="0" err="1">
+                <a:solidFill>
+                  <a:srgbClr val="FFFF00"/>
+                </a:solidFill>
+              </a:rPr>
+              <a:t>url</a:t>
+            </a:r>
+            <a:r>
+              <a:rPr lang="en-US" b="1" i="1" dirty="0">
+                <a:solidFill>
+                  <a:srgbClr val="FFFF00"/>
+                </a:solidFill>
+              </a:rPr>
+              <a:t> https://</a:t>
+            </a:r>
+            <a:r>
+              <a:rPr lang="en-US" b="1" i="1" dirty="0" err="1">
+                <a:solidFill>
+                  <a:srgbClr val="FFFF00"/>
+                </a:solidFill>
+              </a:rPr>
+              <a:t>sandboxapicdc.cisco.com</a:t>
+            </a:r>
+            <a:r>
+              <a:rPr lang="en-US" b="1" i="1" dirty="0">
+                <a:solidFill>
+                  <a:srgbClr val="FFFF00"/>
+                </a:solidFill>
+              </a:rPr>
+              <a:t>/</a:t>
+            </a:r>
+            <a:r>
+              <a:rPr lang="en-US" b="1" i="1" dirty="0" err="1">
+                <a:solidFill>
+                  <a:srgbClr val="FFFF00"/>
+                </a:solidFill>
+              </a:rPr>
+              <a:t>api</a:t>
+            </a:r>
+            <a:r>
+              <a:rPr lang="en-US" b="1" i="1" dirty="0">
+                <a:solidFill>
+                  <a:srgbClr val="FFFF00"/>
+                </a:solidFill>
+              </a:rPr>
+              <a:t>/</a:t>
+            </a:r>
+            <a:r>
+              <a:rPr lang="en-US" b="1" i="1" dirty="0" err="1">
+                <a:solidFill>
+                  <a:srgbClr val="FFFF00"/>
+                </a:solidFill>
+              </a:rPr>
+              <a:t>aaaLogin.json</a:t>
+            </a:r>
+            <a:r>
+              <a:rPr lang="en-US" b="1" i="1" dirty="0">
+                <a:solidFill>
+                  <a:srgbClr val="FFFF00"/>
+                </a:solidFill>
+              </a:rPr>
+              <a:t> \</a:t>
+            </a:r>
+          </a:p>
+          <a:p>
+            <a:pPr marL="457200" lvl="1" indent="0">
+              <a:buNone/>
+            </a:pPr>
+            <a:r>
+              <a:rPr lang="en-US" b="1" i="1" dirty="0">
+                <a:solidFill>
+                  <a:srgbClr val="FFFF00"/>
+                </a:solidFill>
+              </a:rPr>
+              <a:t>--data '{"</a:t>
+            </a:r>
+            <a:r>
+              <a:rPr lang="en-US" b="1" i="1" dirty="0" err="1">
+                <a:solidFill>
+                  <a:srgbClr val="FFFF00"/>
+                </a:solidFill>
+              </a:rPr>
+              <a:t>aaaUser</a:t>
+            </a:r>
+            <a:r>
+              <a:rPr lang="en-US" b="1" i="1" dirty="0">
+                <a:solidFill>
+                  <a:srgbClr val="FFFF00"/>
+                </a:solidFill>
+              </a:rPr>
+              <a:t>":{"attributes":{"name":"admin","</a:t>
+            </a:r>
+            <a:r>
+              <a:rPr lang="en-US" b="1" i="1" dirty="0" err="1">
+                <a:solidFill>
+                  <a:srgbClr val="FFFF00"/>
+                </a:solidFill>
+              </a:rPr>
+              <a:t>pwd</a:t>
+            </a:r>
+            <a:r>
+              <a:rPr lang="en-US" b="1" i="1" dirty="0">
+                <a:solidFill>
+                  <a:srgbClr val="FFFF00"/>
+                </a:solidFill>
+              </a:rPr>
+              <a:t>":"</a:t>
+            </a:r>
+            <a:r>
+              <a:rPr lang="en-US" b="1" i="1" dirty="0" err="1">
+                <a:solidFill>
+                  <a:srgbClr val="FFFF00"/>
+                </a:solidFill>
+              </a:rPr>
+              <a:t>ciscopsdt</a:t>
+            </a:r>
+            <a:r>
+              <a:rPr lang="en-US" b="1" i="1" dirty="0">
+                <a:solidFill>
+                  <a:srgbClr val="FFFF00"/>
+                </a:solidFill>
+              </a:rPr>
+              <a:t>"}}}' \</a:t>
+            </a:r>
+          </a:p>
+          <a:p>
+            <a:pPr marL="457200" lvl="1" indent="0">
+              <a:buNone/>
+            </a:pPr>
+            <a:r>
+              <a:rPr lang="en-US" b="1" i="1" dirty="0">
+                <a:solidFill>
+                  <a:srgbClr val="FFFF00"/>
+                </a:solidFill>
+              </a:rPr>
+              <a:t>-</a:t>
+            </a:r>
+            <a:r>
+              <a:rPr lang="en-US" b="1" i="1" dirty="0" err="1">
+                <a:solidFill>
+                  <a:srgbClr val="FFFF00"/>
+                </a:solidFill>
+              </a:rPr>
+              <a:t>kic</a:t>
+            </a:r>
+            <a:r>
+              <a:rPr lang="en-US" b="1" i="1" dirty="0">
+                <a:solidFill>
+                  <a:srgbClr val="FFFF00"/>
+                </a:solidFill>
+              </a:rPr>
+              <a:t> .</a:t>
+            </a:r>
+            <a:r>
+              <a:rPr lang="en-US" b="1" i="1" dirty="0" err="1">
+                <a:solidFill>
+                  <a:srgbClr val="FFFF00"/>
+                </a:solidFill>
+              </a:rPr>
+              <a:t>cookie_jar</a:t>
+            </a:r>
+            <a:endParaRPr lang="en-US" b="1" i="1" dirty="0">
+              <a:solidFill>
+                <a:srgbClr val="FFFF00"/>
+              </a:solidFill>
+            </a:endParaRPr>
+          </a:p>
+          <a:p>
+            <a:pPr marL="457200" lvl="1" indent="0">
+              <a:buNone/>
+            </a:pPr>
+            <a:r>
+              <a:rPr lang="en-US" b="1" i="1" dirty="0"/>
+              <a:t>	</a:t>
+            </a:r>
+            <a:endParaRPr lang="en-US" dirty="0"/>
+          </a:p>
+          <a:p>
+            <a:r>
+              <a:rPr lang="en-US" dirty="0"/>
+              <a:t>Step 2 – Get a list of APIC Tenants with the stored token</a:t>
+            </a:r>
+          </a:p>
+          <a:p>
+            <a:pPr marL="457200" lvl="1" indent="0">
+              <a:buNone/>
+            </a:pPr>
+            <a:r>
+              <a:rPr lang="en-US" b="1" i="1" dirty="0">
+                <a:solidFill>
+                  <a:srgbClr val="FFFF00"/>
+                </a:solidFill>
+              </a:rPr>
+              <a:t>curl --</a:t>
+            </a:r>
+            <a:r>
+              <a:rPr lang="en-US" b="1" i="1" dirty="0" err="1">
+                <a:solidFill>
+                  <a:srgbClr val="FFFF00"/>
+                </a:solidFill>
+              </a:rPr>
+              <a:t>url</a:t>
+            </a:r>
+            <a:r>
+              <a:rPr lang="en-US" b="1" i="1" dirty="0">
+                <a:solidFill>
+                  <a:srgbClr val="FFFF00"/>
+                </a:solidFill>
+              </a:rPr>
+              <a:t> https://</a:t>
+            </a:r>
+            <a:r>
+              <a:rPr lang="en-US" b="1" i="1" dirty="0" err="1">
+                <a:solidFill>
+                  <a:srgbClr val="FFFF00"/>
+                </a:solidFill>
+              </a:rPr>
+              <a:t>sandboxapicdc.cisco.com</a:t>
+            </a:r>
+            <a:r>
+              <a:rPr lang="en-US" b="1" i="1" dirty="0">
+                <a:solidFill>
+                  <a:srgbClr val="FFFF00"/>
+                </a:solidFill>
+              </a:rPr>
+              <a:t>/</a:t>
+            </a:r>
+            <a:r>
+              <a:rPr lang="en-US" b="1" i="1" dirty="0" err="1">
+                <a:solidFill>
+                  <a:srgbClr val="FFFF00"/>
+                </a:solidFill>
+              </a:rPr>
+              <a:t>api</a:t>
+            </a:r>
+            <a:r>
+              <a:rPr lang="en-US" b="1" i="1" dirty="0">
+                <a:solidFill>
+                  <a:srgbClr val="FFFF00"/>
+                </a:solidFill>
+              </a:rPr>
+              <a:t>/node/class/</a:t>
+            </a:r>
+            <a:r>
+              <a:rPr lang="en-US" b="1" i="1" dirty="0" err="1">
+                <a:solidFill>
+                  <a:srgbClr val="FFFF00"/>
+                </a:solidFill>
+              </a:rPr>
+              <a:t>fvTenant.json</a:t>
+            </a:r>
+            <a:r>
+              <a:rPr lang="en-US" b="1" i="1" dirty="0">
+                <a:solidFill>
+                  <a:srgbClr val="FFFF00"/>
+                </a:solidFill>
+              </a:rPr>
+              <a:t> \</a:t>
+            </a:r>
+          </a:p>
+          <a:p>
+            <a:pPr marL="457200" lvl="1" indent="0">
+              <a:buNone/>
+            </a:pPr>
+            <a:r>
+              <a:rPr lang="en-US" b="1" i="1" dirty="0">
+                <a:solidFill>
+                  <a:srgbClr val="FFFF00"/>
+                </a:solidFill>
+              </a:rPr>
+              <a:t>-</a:t>
+            </a:r>
+            <a:r>
+              <a:rPr lang="en-US" b="1" i="1" dirty="0" err="1">
+                <a:solidFill>
+                  <a:srgbClr val="FFFF00"/>
+                </a:solidFill>
+              </a:rPr>
+              <a:t>kib</a:t>
+            </a:r>
+            <a:r>
+              <a:rPr lang="en-US" b="1" i="1" dirty="0">
+                <a:solidFill>
+                  <a:srgbClr val="FFFF00"/>
+                </a:solidFill>
+              </a:rPr>
+              <a:t> .</a:t>
+            </a:r>
+            <a:r>
+              <a:rPr lang="en-US" b="1" i="1" dirty="0" err="1">
+                <a:solidFill>
+                  <a:srgbClr val="FFFF00"/>
+                </a:solidFill>
+              </a:rPr>
+              <a:t>cookie_jar</a:t>
+            </a:r>
+            <a:endParaRPr lang="en-US" b="1" i="1" dirty="0">
+              <a:solidFill>
+                <a:srgbClr val="FFFF00"/>
+              </a:solidFill>
+            </a:endParaRPr>
+          </a:p>
+        </p:txBody>
+      </p:sp>
+      <p:sp>
+        <p:nvSpPr>
+          <p:cNvPr id="4" name="Date Placeholder 3">
+            <a:extLst>
+              <a:ext uri="{FF2B5EF4-FFF2-40B4-BE49-F238E27FC236}">
+                <a16:creationId xmlns:a16="http://schemas.microsoft.com/office/drawing/2014/main" id="{D7D9528C-333D-BF4A-844C-7BCC7757E858}"/>
+              </a:ext>
+            </a:extLst>
+          </p:cNvPr>
+          <p:cNvSpPr>
+            <a:spLocks noGrp="1"/>
+          </p:cNvSpPr>
+          <p:nvPr>
+            <p:ph type="dt" sz="half" idx="10"/>
+          </p:nvPr>
+        </p:nvSpPr>
+        <p:spPr/>
+        <p:txBody>
+          <a:bodyPr/>
+          <a:lstStyle/>
+          <a:p>
+            <a:r>
+              <a:rPr lang="en-US"/>
+              <a:t>World Wide Technology ©</a:t>
+            </a:r>
+            <a:endParaRPr lang="en-US" dirty="0"/>
+          </a:p>
+        </p:txBody>
+      </p:sp>
+      <p:sp>
+        <p:nvSpPr>
+          <p:cNvPr id="5" name="Slide Number Placeholder 4">
+            <a:extLst>
+              <a:ext uri="{FF2B5EF4-FFF2-40B4-BE49-F238E27FC236}">
+                <a16:creationId xmlns:a16="http://schemas.microsoft.com/office/drawing/2014/main" id="{0798D1A2-1CD4-4A47-A0BC-C1215D1CD611}"/>
+              </a:ext>
+            </a:extLst>
+          </p:cNvPr>
+          <p:cNvSpPr>
+            <a:spLocks noGrp="1"/>
+          </p:cNvSpPr>
+          <p:nvPr>
+            <p:ph type="sldNum" sz="quarter" idx="12"/>
+          </p:nvPr>
+        </p:nvSpPr>
+        <p:spPr/>
+        <p:txBody>
+          <a:bodyPr/>
+          <a:lstStyle/>
+          <a:p>
+            <a:fld id="{A44B02FA-DD2D-1844-AE35-8B2EAB0CF4EF}" type="slidenum">
+              <a:rPr lang="en-US" smtClean="0"/>
+              <a:pPr/>
+              <a:t>59</a:t>
+            </a:fld>
+            <a:endParaRPr lang="en-US" dirty="0"/>
           </a:p>
         </p:txBody>
       </p:sp>
     </p:spTree>
     <p:extLst>
       <p:ext uri="{BB962C8B-B14F-4D97-AF65-F5344CB8AC3E}">
-        <p14:creationId xmlns:p14="http://schemas.microsoft.com/office/powerpoint/2010/main" val="4218248441"/>
+        <p14:creationId xmlns:p14="http://schemas.microsoft.com/office/powerpoint/2010/main" val="4141060202"/>
       </p:ext>
     </p:extLst>
   </p:cSld>
@@ -41540,7 +42454,7 @@
           <p:cNvPr id="2" name="Title 1">
             <a:extLst>
               <a:ext uri="{FF2B5EF4-FFF2-40B4-BE49-F238E27FC236}">
-                <a16:creationId xmlns:a16="http://schemas.microsoft.com/office/drawing/2014/main" id="{EB7C4089-1746-624B-8E73-D3DAB8E88CDD}"/>
+                <a16:creationId xmlns:a16="http://schemas.microsoft.com/office/drawing/2014/main" id="{9B4DF7CD-7263-9840-AE80-6F1B7FA6AF3C}"/>
               </a:ext>
             </a:extLst>
           </p:cNvPr>
@@ -41557,8 +42471,20 @@
           <a:lstStyle/>
           <a:p>
             <a:r>
+              <a:rPr lang="en-US" dirty="0" err="1"/>
+              <a:t>cURL</a:t>
+            </a:r>
+            <a:r>
               <a:rPr lang="en-US" dirty="0"/>
-              <a:t>Outline</a:t>
+              <a:t> – </a:t>
+            </a:r>
+            <a:r>
+              <a:rPr lang="en-US" dirty="0" err="1"/>
+              <a:t>DevNet</a:t>
+            </a:r>
+            <a:r>
+              <a:rPr lang="en-US" dirty="0"/>
+              <a:t> Always-On ACI Sandbox</a:t>
             </a:r>
           </a:p>
         </p:txBody>
@@ -41568,7 +42494,7 @@
           <p:cNvPr id="3" name="Content Placeholder 2">
             <a:extLst>
               <a:ext uri="{FF2B5EF4-FFF2-40B4-BE49-F238E27FC236}">
-                <a16:creationId xmlns:a16="http://schemas.microsoft.com/office/drawing/2014/main" id="{65426B10-0364-A849-B3A4-1D0DA409155A}"/>
+                <a16:creationId xmlns:a16="http://schemas.microsoft.com/office/drawing/2014/main" id="{A610A140-16FE-F54F-9766-D3A50E4E4F0B}"/>
               </a:ext>
             </a:extLst>
           </p:cNvPr>
@@ -41586,67 +42512,194 @@
           <a:p>
             <a:r>
               <a:rPr lang="en-US" dirty="0"/>
-              <a:t>For each of these platforms:</a:t>
-            </a:r>
-          </a:p>
-          <a:p>
-            <a:pPr lvl="1"/>
-            <a:r>
-              <a:rPr lang="en-US" dirty="0"/>
-              <a:t>DNAC</a:t>
-            </a:r>
-          </a:p>
-          <a:p>
-            <a:pPr lvl="1"/>
-            <a:r>
-              <a:rPr lang="en-US" dirty="0" err="1"/>
-              <a:t>Webex</a:t>
-            </a:r>
-            <a:r>
-              <a:rPr lang="en-US" dirty="0"/>
-              <a:t> Teams</a:t>
-            </a:r>
-          </a:p>
-          <a:p>
-            <a:pPr lvl="1"/>
-            <a:r>
-              <a:rPr lang="en-US" dirty="0"/>
-              <a:t>Meraki</a:t>
-            </a:r>
-          </a:p>
-          <a:p>
-            <a:pPr lvl="1"/>
-            <a:r>
-              <a:rPr lang="en-US" dirty="0"/>
-              <a:t>ACI</a:t>
-            </a:r>
-          </a:p>
-          <a:p>
-            <a:r>
-              <a:rPr lang="en-US" dirty="0"/>
-              <a:t>Perform the following tasks:</a:t>
-            </a:r>
-          </a:p>
-          <a:p>
-            <a:pPr lvl="1"/>
-            <a:r>
-              <a:rPr lang="en-US" dirty="0"/>
-              <a:t>Review authentication methodology</a:t>
-            </a:r>
-          </a:p>
-          <a:p>
-            <a:pPr lvl="1"/>
-            <a:r>
-              <a:rPr lang="en-US" dirty="0"/>
-              <a:t>Build Python scripts to authenticate</a:t>
-            </a:r>
-          </a:p>
-          <a:p>
-            <a:pPr lvl="1"/>
-            <a:r>
-              <a:rPr lang="en-US" dirty="0"/>
-              <a:t>Build Python scripts to read/write data</a:t>
-            </a:r>
+              <a:t>Step 3 – Create a new Tenant</a:t>
+            </a:r>
+          </a:p>
+          <a:p>
+            <a:pPr marL="457200" lvl="1" indent="0">
+              <a:buNone/>
+            </a:pPr>
+            <a:r>
+              <a:rPr lang="en-US" b="1" i="1" dirty="0">
+                <a:solidFill>
+                  <a:srgbClr val="FFFF00"/>
+                </a:solidFill>
+              </a:rPr>
+              <a:t>curl -X POST --</a:t>
+            </a:r>
+            <a:r>
+              <a:rPr lang="en-US" b="1" i="1" dirty="0" err="1">
+                <a:solidFill>
+                  <a:srgbClr val="FFFF00"/>
+                </a:solidFill>
+              </a:rPr>
+              <a:t>url</a:t>
+            </a:r>
+            <a:r>
+              <a:rPr lang="en-US" b="1" i="1" dirty="0">
+                <a:solidFill>
+                  <a:srgbClr val="FFFF00"/>
+                </a:solidFill>
+              </a:rPr>
+              <a:t> https://</a:t>
+            </a:r>
+            <a:r>
+              <a:rPr lang="en-US" b="1" i="1" dirty="0" err="1">
+                <a:solidFill>
+                  <a:srgbClr val="FFFF00"/>
+                </a:solidFill>
+              </a:rPr>
+              <a:t>sandboxapicdc.cisco.com</a:t>
+            </a:r>
+            <a:r>
+              <a:rPr lang="en-US" b="1" i="1" dirty="0">
+                <a:solidFill>
+                  <a:srgbClr val="FFFF00"/>
+                </a:solidFill>
+              </a:rPr>
+              <a:t>/</a:t>
+            </a:r>
+            <a:r>
+              <a:rPr lang="en-US" b="1" i="1" dirty="0" err="1">
+                <a:solidFill>
+                  <a:srgbClr val="FFFF00"/>
+                </a:solidFill>
+              </a:rPr>
+              <a:t>api</a:t>
+            </a:r>
+            <a:r>
+              <a:rPr lang="en-US" b="1" i="1" dirty="0">
+                <a:solidFill>
+                  <a:srgbClr val="FFFF00"/>
+                </a:solidFill>
+              </a:rPr>
+              <a:t>/</a:t>
+            </a:r>
+            <a:r>
+              <a:rPr lang="en-US" b="1" i="1" dirty="0" err="1">
+                <a:solidFill>
+                  <a:srgbClr val="FFFF00"/>
+                </a:solidFill>
+              </a:rPr>
+              <a:t>mo</a:t>
+            </a:r>
+            <a:r>
+              <a:rPr lang="en-US" b="1" i="1" dirty="0">
+                <a:solidFill>
+                  <a:srgbClr val="FFFF00"/>
+                </a:solidFill>
+              </a:rPr>
+              <a:t>/</a:t>
+            </a:r>
+            <a:r>
+              <a:rPr lang="en-US" b="1" i="1" dirty="0" err="1">
+                <a:solidFill>
+                  <a:srgbClr val="FFFF00"/>
+                </a:solidFill>
+              </a:rPr>
+              <a:t>uni.json</a:t>
+            </a:r>
+            <a:r>
+              <a:rPr lang="en-US" b="1" i="1" dirty="0">
+                <a:solidFill>
+                  <a:srgbClr val="FFFF00"/>
+                </a:solidFill>
+              </a:rPr>
+              <a:t> \</a:t>
+            </a:r>
+          </a:p>
+          <a:p>
+            <a:pPr marL="457200" lvl="1" indent="0">
+              <a:buNone/>
+            </a:pPr>
+            <a:r>
+              <a:rPr lang="en-US" b="1" i="1" dirty="0">
+                <a:solidFill>
+                  <a:srgbClr val="FFFF00"/>
+                </a:solidFill>
+              </a:rPr>
+              <a:t>--data '{"</a:t>
+            </a:r>
+            <a:r>
+              <a:rPr lang="en-US" b="1" i="1" dirty="0" err="1">
+                <a:solidFill>
+                  <a:srgbClr val="FFFF00"/>
+                </a:solidFill>
+              </a:rPr>
+              <a:t>fvTenant</a:t>
+            </a:r>
+            <a:r>
+              <a:rPr lang="en-US" b="1" i="1" dirty="0">
+                <a:solidFill>
+                  <a:srgbClr val="FFFF00"/>
+                </a:solidFill>
+              </a:rPr>
+              <a:t>":{"attributes":{"name":"</a:t>
+            </a:r>
+            <a:r>
+              <a:rPr lang="en-US" b="1" i="1" dirty="0" err="1">
+                <a:solidFill>
+                  <a:srgbClr val="FFFF00"/>
+                </a:solidFill>
+              </a:rPr>
+              <a:t>my_new_tenant</a:t>
+            </a:r>
+            <a:r>
+              <a:rPr lang="en-US" b="1" i="1" dirty="0">
+                <a:solidFill>
+                  <a:srgbClr val="FFFF00"/>
+                </a:solidFill>
+              </a:rPr>
+              <a:t>"}}}' \</a:t>
+            </a:r>
+          </a:p>
+          <a:p>
+            <a:pPr marL="457200" lvl="1" indent="0">
+              <a:buNone/>
+            </a:pPr>
+            <a:r>
+              <a:rPr lang="en-US" b="1" i="1" dirty="0">
+                <a:solidFill>
+                  <a:srgbClr val="FFFF00"/>
+                </a:solidFill>
+              </a:rPr>
+              <a:t>-</a:t>
+            </a:r>
+            <a:r>
+              <a:rPr lang="en-US" b="1" i="1" dirty="0" err="1">
+                <a:solidFill>
+                  <a:srgbClr val="FFFF00"/>
+                </a:solidFill>
+              </a:rPr>
+              <a:t>kib</a:t>
+            </a:r>
+            <a:r>
+              <a:rPr lang="en-US" b="1" i="1" dirty="0">
+                <a:solidFill>
+                  <a:srgbClr val="FFFF00"/>
+                </a:solidFill>
+              </a:rPr>
+              <a:t> .</a:t>
+            </a:r>
+            <a:r>
+              <a:rPr lang="en-US" b="1" i="1" dirty="0" err="1">
+                <a:solidFill>
+                  <a:srgbClr val="FFFF00"/>
+                </a:solidFill>
+              </a:rPr>
+              <a:t>cookie_jar</a:t>
+            </a:r>
+            <a:endParaRPr lang="en-US" b="1" i="1" dirty="0">
+              <a:solidFill>
+                <a:srgbClr val="FFFF00"/>
+              </a:solidFill>
+            </a:endParaRPr>
+          </a:p>
+          <a:p>
+            <a:pPr marL="0" indent="0">
+              <a:buNone/>
+            </a:pPr>
+            <a:endParaRPr lang="en-US" dirty="0"/>
           </a:p>
         </p:txBody>
       </p:sp>
@@ -41655,7 +42708,7 @@
           <p:cNvPr id="4" name="Date Placeholder 3">
             <a:extLst>
               <a:ext uri="{FF2B5EF4-FFF2-40B4-BE49-F238E27FC236}">
-                <a16:creationId xmlns:a16="http://schemas.microsoft.com/office/drawing/2014/main" id="{7ECEAF79-F4AC-E94E-9E55-220D0D396924}"/>
+                <a16:creationId xmlns:a16="http://schemas.microsoft.com/office/drawing/2014/main" id="{D7D9528C-333D-BF4A-844C-7BCC7757E858}"/>
               </a:ext>
             </a:extLst>
           </p:cNvPr>
@@ -41684,7 +42737,7 @@
           <p:cNvPr id="5" name="Slide Number Placeholder 4">
             <a:extLst>
               <a:ext uri="{FF2B5EF4-FFF2-40B4-BE49-F238E27FC236}">
-                <a16:creationId xmlns:a16="http://schemas.microsoft.com/office/drawing/2014/main" id="{372DC1A4-CE8B-DB4A-8F86-2508518C35D3}"/>
+                <a16:creationId xmlns:a16="http://schemas.microsoft.com/office/drawing/2014/main" id="{0798D1A2-1CD4-4A47-A0BC-C1215D1CD611}"/>
               </a:ext>
             </a:extLst>
           </p:cNvPr>
@@ -41712,7 +42765,7 @@
     </p:spTree>
     <p:extLst>
       <p:ext uri="{BB962C8B-B14F-4D97-AF65-F5344CB8AC3E}">
-        <p14:creationId xmlns:p14="http://schemas.microsoft.com/office/powerpoint/2010/main" val="232106193"/>
+        <p14:creationId xmlns:p14="http://schemas.microsoft.com/office/powerpoint/2010/main" val="1189830946"/>
       </p:ext>
     </p:extLst>
   </p:cSld>
@@ -41779,7 +42832,7 @@
           <a:p>
             <a:r>
               <a:rPr lang="en-US" dirty="0"/>
-              <a:t>Part VII</a:t>
+              <a:t>Part VI</a:t>
             </a:r>
           </a:p>
         </p:txBody>
@@ -41812,7 +42865,7 @@
           <a:p>
             <a:r>
               <a:rPr lang="en-US" dirty="0"/>
-              <a:t>Quiz, Practice Resources, &amp; References</a:t>
+              <a:t>Interact With Cisco Platform APIs Using Python Requests</a:t>
             </a:r>
           </a:p>
         </p:txBody>
@@ -41820,7 +42873,7 @@
     </p:spTree>
     <p:extLst>
       <p:ext uri="{BB962C8B-B14F-4D97-AF65-F5344CB8AC3E}">
-        <p14:creationId xmlns:p14="http://schemas.microsoft.com/office/powerpoint/2010/main" val="3392886013"/>
+        <p14:creationId xmlns:p14="http://schemas.microsoft.com/office/powerpoint/2010/main" val="4218248441"/>
       </p:ext>
     </p:extLst>
   </p:cSld>
@@ -41882,7 +42935,7 @@
           <a:p>
             <a:r>
               <a:rPr lang="en-US" dirty="0"/>
-              <a:t>Slide Template</a:t>
+              <a:t>Outline</a:t>
             </a:r>
           </a:p>
         </p:txBody>
@@ -41910,7 +42963,66 @@
           <a:p>
             <a:r>
               <a:rPr lang="en-US" dirty="0"/>
-              <a:t>Body template</a:t>
+              <a:t>For each of these platforms:</a:t>
+            </a:r>
+          </a:p>
+          <a:p>
+            <a:pPr lvl="1"/>
+            <a:r>
+              <a:rPr lang="en-US" dirty="0"/>
+              <a:t>ACI</a:t>
+            </a:r>
+          </a:p>
+          <a:p>
+            <a:pPr lvl="1"/>
+            <a:r>
+              <a:rPr lang="en-US" dirty="0"/>
+              <a:t>DNAC</a:t>
+            </a:r>
+          </a:p>
+          <a:p>
+            <a:pPr lvl="1"/>
+            <a:r>
+              <a:rPr lang="en-US" dirty="0"/>
+              <a:t>Meraki</a:t>
+            </a:r>
+          </a:p>
+          <a:p>
+            <a:pPr lvl="1"/>
+            <a:r>
+              <a:rPr lang="en-US" dirty="0" err="1"/>
+              <a:t>Webex</a:t>
+            </a:r>
+            <a:r>
+              <a:rPr lang="en-US" dirty="0"/>
+              <a:t> Teams</a:t>
+            </a:r>
+          </a:p>
+          <a:p>
+            <a:r>
+              <a:rPr lang="en-US" dirty="0"/>
+              <a:t>Perform the following tasks:</a:t>
+            </a:r>
+          </a:p>
+          <a:p>
+            <a:pPr lvl="1"/>
+            <a:r>
+              <a:rPr lang="en-US" dirty="0"/>
+              <a:t>Review authentication methodology</a:t>
+            </a:r>
+          </a:p>
+          <a:p>
+            <a:pPr lvl="1"/>
+            <a:r>
+              <a:rPr lang="en-US" dirty="0"/>
+              <a:t>Build Python scripts to authenticate</a:t>
+            </a:r>
+          </a:p>
+          <a:p>
+            <a:pPr lvl="1"/>
+            <a:r>
+              <a:rPr lang="en-US" dirty="0"/>
+              <a:t>Build Python scripts to read/write data</a:t>
             </a:r>
           </a:p>
         </p:txBody>
@@ -41977,7 +43089,7 @@
     </p:spTree>
     <p:extLst>
       <p:ext uri="{BB962C8B-B14F-4D97-AF65-F5344CB8AC3E}">
-        <p14:creationId xmlns:p14="http://schemas.microsoft.com/office/powerpoint/2010/main" val="2709408928"/>
+        <p14:creationId xmlns:p14="http://schemas.microsoft.com/office/powerpoint/2010/main" val="232106193"/>
       </p:ext>
     </p:extLst>
   </p:cSld>
@@ -42021,7 +43133,7 @@
           <p:cNvPr id="2" name="Title 1">
             <a:extLst>
               <a:ext uri="{FF2B5EF4-FFF2-40B4-BE49-F238E27FC236}">
-                <a16:creationId xmlns:a16="http://schemas.microsoft.com/office/drawing/2014/main" id="{EB7C4089-1746-624B-8E73-D3DAB8E88CDD}"/>
+                <a16:creationId xmlns:a16="http://schemas.microsoft.com/office/drawing/2014/main" id="{9D8D6E4C-FC36-3E4C-9387-96DD20072D9D}"/>
               </a:ext>
             </a:extLst>
           </p:cNvPr>
@@ -42029,27 +43141,32 @@
             <a:spLocks noGrp="1"/>
           </p:cNvSpPr>
           <p:nvPr>
-            <p:ph type="title"/>
+            <p:ph type="ctrTitle"/>
           </p:nvPr>
         </p:nvSpPr>
-        <p:spPr/>
+        <p:spPr>
+          <a:xfrm>
+            <a:off x="1524000" y="914013"/>
+            <a:ext cx="9144000" cy="2387600"/>
+          </a:xfrm>
+        </p:spPr>
         <p:txBody>
           <a:bodyPr/>
           <a:lstStyle/>
           <a:p>
             <a:r>
               <a:rPr lang="en-US" dirty="0"/>
-              <a:t>References</a:t>
+              <a:t>Part VII</a:t>
             </a:r>
           </a:p>
         </p:txBody>
       </p:sp>
       <p:sp>
         <p:nvSpPr>
-          <p:cNvPr id="3" name="Content Placeholder 2">
+          <p:cNvPr id="3" name="Subtitle 2">
             <a:extLst>
               <a:ext uri="{FF2B5EF4-FFF2-40B4-BE49-F238E27FC236}">
-                <a16:creationId xmlns:a16="http://schemas.microsoft.com/office/drawing/2014/main" id="{65426B10-0364-A849-B3A4-1D0DA409155A}"/>
+                <a16:creationId xmlns:a16="http://schemas.microsoft.com/office/drawing/2014/main" id="{0451A0DE-9D64-5A48-94B5-5B4E42709819}"/>
               </a:ext>
             </a:extLst>
           </p:cNvPr>
@@ -42057,154 +43174,30 @@
             <a:spLocks noGrp="1"/>
           </p:cNvSpPr>
           <p:nvPr>
-            <p:ph idx="1"/>
+            <p:ph type="subTitle" idx="1"/>
           </p:nvPr>
         </p:nvSpPr>
-        <p:spPr/>
-        <p:txBody>
-          <a:bodyPr>
-            <a:normAutofit fontScale="92500"/>
-          </a:bodyPr>
-          <a:lstStyle/>
-          <a:p>
-            <a:r>
-              <a:rPr lang="en-US" dirty="0">
-                <a:hlinkClick r:id="rId2"/>
-              </a:rPr>
-              <a:t>https://www.linkedin.com/pulse/why-rest-api-so-popular-mangesh-bulkar/</a:t>
-            </a:r>
-            <a:endParaRPr lang="en-US" dirty="0">
-              <a:hlinkClick r:id="rId3"/>
-            </a:endParaRPr>
-          </a:p>
-          <a:p>
-            <a:r>
-              <a:rPr lang="en-US" dirty="0">
-                <a:hlinkClick r:id="rId3"/>
-              </a:rPr>
-              <a:t>https://en.wikipedia.org/wiki/CURL</a:t>
-            </a:r>
-            <a:endParaRPr lang="en-US" dirty="0"/>
-          </a:p>
-          <a:p>
-            <a:r>
-              <a:rPr lang="en-US" dirty="0">
-                <a:hlinkClick r:id="rId4"/>
-              </a:rPr>
-              <a:t>https://en.wikipedia.org/wiki/Requests_%28software%29</a:t>
-            </a:r>
-            <a:endParaRPr lang="en-US" dirty="0"/>
-          </a:p>
-          <a:p>
-            <a:r>
-              <a:rPr lang="en-US" dirty="0">
-                <a:hlinkClick r:id="rId5"/>
-              </a:rPr>
-              <a:t>https://curl.haxx.se</a:t>
-            </a:r>
-            <a:endParaRPr lang="en-US" dirty="0"/>
-          </a:p>
-          <a:p>
-            <a:r>
-              <a:rPr lang="en-US" dirty="0">
-                <a:hlinkClick r:id="rId6"/>
-              </a:rPr>
-              <a:t>https://requests.readthedocs.io/en/master/</a:t>
-            </a:r>
-            <a:endParaRPr lang="en-US" dirty="0"/>
-          </a:p>
-          <a:p>
-            <a:r>
-              <a:rPr lang="en-US" dirty="0">
-                <a:hlinkClick r:id="rId7"/>
-              </a:rPr>
-              <a:t>https://2.python-requests.org/en/master/api/#requests.Response</a:t>
-            </a:r>
-            <a:endParaRPr lang="en-US" dirty="0"/>
-          </a:p>
-          <a:p>
-            <a:r>
-              <a:rPr lang="en-US" dirty="0"/>
-              <a:t>Cisco API documentation #1</a:t>
-            </a:r>
-          </a:p>
-          <a:p>
-            <a:r>
-              <a:rPr lang="en-US" dirty="0"/>
-              <a:t>Cisco API documentation #2</a:t>
-            </a:r>
-          </a:p>
-          <a:p>
-            <a:r>
-              <a:rPr lang="en-US" dirty="0"/>
-              <a:t>Cisco API documentation #3</a:t>
-            </a:r>
-          </a:p>
-        </p:txBody>
-      </p:sp>
-      <p:sp>
-        <p:nvSpPr>
-          <p:cNvPr id="4" name="Date Placeholder 3">
-            <a:extLst>
-              <a:ext uri="{FF2B5EF4-FFF2-40B4-BE49-F238E27FC236}">
-                <a16:creationId xmlns:a16="http://schemas.microsoft.com/office/drawing/2014/main" id="{7ECEAF79-F4AC-E94E-9E55-220D0D396924}"/>
-              </a:ext>
-            </a:extLst>
-          </p:cNvPr>
-          <p:cNvSpPr>
-            <a:spLocks noGrp="1"/>
-          </p:cNvSpPr>
-          <p:nvPr>
-            <p:ph type="dt" sz="half" idx="10"/>
-          </p:nvPr>
-        </p:nvSpPr>
-        <p:spPr/>
+        <p:spPr>
+          <a:xfrm>
+            <a:off x="1524000" y="3393688"/>
+            <a:ext cx="9144000" cy="1655762"/>
+          </a:xfrm>
+        </p:spPr>
         <p:txBody>
           <a:bodyPr/>
           <a:lstStyle/>
           <a:p>
             <a:r>
-              <a:rPr lang="en-US"/>
-              <a:t>World Wide Technology ©</a:t>
-            </a:r>
-            <a:endParaRPr lang="en-US" dirty="0"/>
-          </a:p>
-        </p:txBody>
-      </p:sp>
-      <p:sp>
-        <p:nvSpPr>
-          <p:cNvPr id="5" name="Slide Number Placeholder 4">
-            <a:extLst>
-              <a:ext uri="{FF2B5EF4-FFF2-40B4-BE49-F238E27FC236}">
-                <a16:creationId xmlns:a16="http://schemas.microsoft.com/office/drawing/2014/main" id="{372DC1A4-CE8B-DB4A-8F86-2508518C35D3}"/>
-              </a:ext>
-            </a:extLst>
-          </p:cNvPr>
-          <p:cNvSpPr>
-            <a:spLocks noGrp="1"/>
-          </p:cNvSpPr>
-          <p:nvPr>
-            <p:ph type="sldNum" sz="quarter" idx="12"/>
-          </p:nvPr>
-        </p:nvSpPr>
-        <p:spPr/>
-        <p:txBody>
-          <a:bodyPr/>
-          <a:lstStyle/>
-          <a:p>
-            <a:fld id="{A44B02FA-DD2D-1844-AE35-8B2EAB0CF4EF}" type="slidenum">
-              <a:rPr lang="en-US" smtClean="0"/>
-              <a:pPr/>
-              <a:t>63</a:t>
-            </a:fld>
-            <a:endParaRPr lang="en-US" dirty="0"/>
+              <a:rPr lang="en-US" dirty="0"/>
+              <a:t>Quiz, Practice Resources, &amp; References</a:t>
+            </a:r>
           </a:p>
         </p:txBody>
       </p:sp>
     </p:spTree>
     <p:extLst>
       <p:ext uri="{BB962C8B-B14F-4D97-AF65-F5344CB8AC3E}">
-        <p14:creationId xmlns:p14="http://schemas.microsoft.com/office/powerpoint/2010/main" val="3225595977"/>
+        <p14:creationId xmlns:p14="http://schemas.microsoft.com/office/powerpoint/2010/main" val="3392886013"/>
       </p:ext>
     </p:extLst>
   </p:cSld>
@@ -42245,6 +43238,390 @@
       </p:grpSpPr>
       <p:sp>
         <p:nvSpPr>
+          <p:cNvPr id="2" name="Title 1">
+            <a:extLst>
+              <a:ext uri="{FF2B5EF4-FFF2-40B4-BE49-F238E27FC236}">
+                <a16:creationId xmlns:a16="http://schemas.microsoft.com/office/drawing/2014/main" id="{EB7C4089-1746-624B-8E73-D3DAB8E88CDD}"/>
+              </a:ext>
+            </a:extLst>
+          </p:cNvPr>
+          <p:cNvSpPr>
+            <a:spLocks noGrp="1"/>
+          </p:cNvSpPr>
+          <p:nvPr>
+            <p:ph type="title"/>
+          </p:nvPr>
+        </p:nvSpPr>
+        <p:spPr/>
+        <p:txBody>
+          <a:bodyPr/>
+          <a:lstStyle/>
+          <a:p>
+            <a:r>
+              <a:rPr lang="en-US" dirty="0"/>
+              <a:t>Slide Template</a:t>
+            </a:r>
+          </a:p>
+        </p:txBody>
+      </p:sp>
+      <p:sp>
+        <p:nvSpPr>
+          <p:cNvPr id="3" name="Content Placeholder 2">
+            <a:extLst>
+              <a:ext uri="{FF2B5EF4-FFF2-40B4-BE49-F238E27FC236}">
+                <a16:creationId xmlns:a16="http://schemas.microsoft.com/office/drawing/2014/main" id="{65426B10-0364-A849-B3A4-1D0DA409155A}"/>
+              </a:ext>
+            </a:extLst>
+          </p:cNvPr>
+          <p:cNvSpPr>
+            <a:spLocks noGrp="1"/>
+          </p:cNvSpPr>
+          <p:nvPr>
+            <p:ph idx="1"/>
+          </p:nvPr>
+        </p:nvSpPr>
+        <p:spPr/>
+        <p:txBody>
+          <a:bodyPr/>
+          <a:lstStyle/>
+          <a:p>
+            <a:r>
+              <a:rPr lang="en-US" dirty="0"/>
+              <a:t>Body template</a:t>
+            </a:r>
+          </a:p>
+        </p:txBody>
+      </p:sp>
+      <p:sp>
+        <p:nvSpPr>
+          <p:cNvPr id="4" name="Date Placeholder 3">
+            <a:extLst>
+              <a:ext uri="{FF2B5EF4-FFF2-40B4-BE49-F238E27FC236}">
+                <a16:creationId xmlns:a16="http://schemas.microsoft.com/office/drawing/2014/main" id="{7ECEAF79-F4AC-E94E-9E55-220D0D396924}"/>
+              </a:ext>
+            </a:extLst>
+          </p:cNvPr>
+          <p:cNvSpPr>
+            <a:spLocks noGrp="1"/>
+          </p:cNvSpPr>
+          <p:nvPr>
+            <p:ph type="dt" sz="half" idx="10"/>
+          </p:nvPr>
+        </p:nvSpPr>
+        <p:spPr/>
+        <p:txBody>
+          <a:bodyPr/>
+          <a:lstStyle/>
+          <a:p>
+            <a:r>
+              <a:rPr lang="en-US"/>
+              <a:t>World Wide Technology ©</a:t>
+            </a:r>
+            <a:endParaRPr lang="en-US" dirty="0"/>
+          </a:p>
+        </p:txBody>
+      </p:sp>
+      <p:sp>
+        <p:nvSpPr>
+          <p:cNvPr id="5" name="Slide Number Placeholder 4">
+            <a:extLst>
+              <a:ext uri="{FF2B5EF4-FFF2-40B4-BE49-F238E27FC236}">
+                <a16:creationId xmlns:a16="http://schemas.microsoft.com/office/drawing/2014/main" id="{372DC1A4-CE8B-DB4A-8F86-2508518C35D3}"/>
+              </a:ext>
+            </a:extLst>
+          </p:cNvPr>
+          <p:cNvSpPr>
+            <a:spLocks noGrp="1"/>
+          </p:cNvSpPr>
+          <p:nvPr>
+            <p:ph type="sldNum" sz="quarter" idx="12"/>
+          </p:nvPr>
+        </p:nvSpPr>
+        <p:spPr/>
+        <p:txBody>
+          <a:bodyPr/>
+          <a:lstStyle/>
+          <a:p>
+            <a:fld id="{A44B02FA-DD2D-1844-AE35-8B2EAB0CF4EF}" type="slidenum">
+              <a:rPr lang="en-US" smtClean="0"/>
+              <a:pPr/>
+              <a:t>64</a:t>
+            </a:fld>
+            <a:endParaRPr lang="en-US" dirty="0"/>
+          </a:p>
+        </p:txBody>
+      </p:sp>
+    </p:spTree>
+    <p:extLst>
+      <p:ext uri="{BB962C8B-B14F-4D97-AF65-F5344CB8AC3E}">
+        <p14:creationId xmlns:p14="http://schemas.microsoft.com/office/powerpoint/2010/main" val="2709408928"/>
+      </p:ext>
+    </p:extLst>
+  </p:cSld>
+  <p:clrMapOvr>
+    <a:masterClrMapping/>
+  </p:clrMapOvr>
+  <mc:AlternateContent xmlns:mc="http://schemas.openxmlformats.org/markup-compatibility/2006" xmlns:p14="http://schemas.microsoft.com/office/powerpoint/2010/main">
+    <mc:Choice Requires="p14">
+      <p:transition spd="med" p14:dur="700">
+        <p:fade/>
+      </p:transition>
+    </mc:Choice>
+    <mc:Fallback xmlns="">
+      <p:transition spd="med">
+        <p:fade/>
+      </p:transition>
+    </mc:Fallback>
+  </mc:AlternateContent>
+</p:sld>
+</file>
+
+<file path=ppt/slides/slide65.xml><?xml version="1.0" encoding="utf-8"?>
+<p:sld xmlns:a="http://schemas.openxmlformats.org/drawingml/2006/main" xmlns:r="http://schemas.openxmlformats.org/officeDocument/2006/relationships" xmlns:p="http://schemas.openxmlformats.org/presentationml/2006/main">
+  <p:cSld>
+    <p:spTree>
+      <p:nvGrpSpPr>
+        <p:cNvPr id="1" name=""/>
+        <p:cNvGrpSpPr/>
+        <p:nvPr/>
+      </p:nvGrpSpPr>
+      <p:grpSpPr>
+        <a:xfrm>
+          <a:off x="0" y="0"/>
+          <a:ext cx="0" cy="0"/>
+          <a:chOff x="0" y="0"/>
+          <a:chExt cx="0" cy="0"/>
+        </a:xfrm>
+      </p:grpSpPr>
+      <p:sp>
+        <p:nvSpPr>
+          <p:cNvPr id="2" name="Title 1">
+            <a:extLst>
+              <a:ext uri="{FF2B5EF4-FFF2-40B4-BE49-F238E27FC236}">
+                <a16:creationId xmlns:a16="http://schemas.microsoft.com/office/drawing/2014/main" id="{EB7C4089-1746-624B-8E73-D3DAB8E88CDD}"/>
+              </a:ext>
+            </a:extLst>
+          </p:cNvPr>
+          <p:cNvSpPr>
+            <a:spLocks noGrp="1"/>
+          </p:cNvSpPr>
+          <p:nvPr>
+            <p:ph type="title"/>
+          </p:nvPr>
+        </p:nvSpPr>
+        <p:spPr/>
+        <p:txBody>
+          <a:bodyPr/>
+          <a:lstStyle/>
+          <a:p>
+            <a:r>
+              <a:rPr lang="en-US" dirty="0"/>
+              <a:t>References</a:t>
+            </a:r>
+          </a:p>
+        </p:txBody>
+      </p:sp>
+      <p:sp>
+        <p:nvSpPr>
+          <p:cNvPr id="3" name="Content Placeholder 2">
+            <a:extLst>
+              <a:ext uri="{FF2B5EF4-FFF2-40B4-BE49-F238E27FC236}">
+                <a16:creationId xmlns:a16="http://schemas.microsoft.com/office/drawing/2014/main" id="{65426B10-0364-A849-B3A4-1D0DA409155A}"/>
+              </a:ext>
+            </a:extLst>
+          </p:cNvPr>
+          <p:cNvSpPr>
+            <a:spLocks noGrp="1"/>
+          </p:cNvSpPr>
+          <p:nvPr>
+            <p:ph idx="1"/>
+          </p:nvPr>
+        </p:nvSpPr>
+        <p:spPr/>
+        <p:txBody>
+          <a:bodyPr>
+            <a:normAutofit fontScale="92500"/>
+          </a:bodyPr>
+          <a:lstStyle/>
+          <a:p>
+            <a:r>
+              <a:rPr lang="en-US" dirty="0">
+                <a:hlinkClick r:id="rId2"/>
+              </a:rPr>
+              <a:t>https://www.linkedin.com/pulse/why-rest-api-so-popular-mangesh-bulkar/</a:t>
+            </a:r>
+            <a:endParaRPr lang="en-US" dirty="0">
+              <a:hlinkClick r:id="rId3"/>
+            </a:endParaRPr>
+          </a:p>
+          <a:p>
+            <a:r>
+              <a:rPr lang="en-US" dirty="0">
+                <a:hlinkClick r:id="rId3"/>
+              </a:rPr>
+              <a:t>https://en.wikipedia.org/wiki/CURL</a:t>
+            </a:r>
+            <a:endParaRPr lang="en-US" dirty="0"/>
+          </a:p>
+          <a:p>
+            <a:r>
+              <a:rPr lang="en-US" dirty="0">
+                <a:hlinkClick r:id="rId4"/>
+              </a:rPr>
+              <a:t>https://en.wikipedia.org/wiki/Requests_%28software%29</a:t>
+            </a:r>
+            <a:endParaRPr lang="en-US" dirty="0"/>
+          </a:p>
+          <a:p>
+            <a:r>
+              <a:rPr lang="en-US" dirty="0">
+                <a:hlinkClick r:id="rId5"/>
+              </a:rPr>
+              <a:t>https://curl.haxx.se</a:t>
+            </a:r>
+            <a:endParaRPr lang="en-US" dirty="0"/>
+          </a:p>
+          <a:p>
+            <a:r>
+              <a:rPr lang="en-US" dirty="0">
+                <a:hlinkClick r:id="rId6"/>
+              </a:rPr>
+              <a:t>https://requests.readthedocs.io/en/master/</a:t>
+            </a:r>
+            <a:endParaRPr lang="en-US" dirty="0"/>
+          </a:p>
+          <a:p>
+            <a:r>
+              <a:rPr lang="en-US" dirty="0">
+                <a:hlinkClick r:id="rId7"/>
+              </a:rPr>
+              <a:t>https://2.python-requests.org/en/master/api/#requests.Response</a:t>
+            </a:r>
+            <a:endParaRPr lang="en-US" dirty="0"/>
+          </a:p>
+          <a:p>
+            <a:r>
+              <a:rPr lang="en-US" dirty="0"/>
+              <a:t>Cisco API documentation #1</a:t>
+            </a:r>
+          </a:p>
+          <a:p>
+            <a:r>
+              <a:rPr lang="en-US" dirty="0"/>
+              <a:t>Cisco API documentation #2</a:t>
+            </a:r>
+          </a:p>
+          <a:p>
+            <a:r>
+              <a:rPr lang="en-US" dirty="0"/>
+              <a:t>Cisco API documentation #3</a:t>
+            </a:r>
+          </a:p>
+        </p:txBody>
+      </p:sp>
+      <p:sp>
+        <p:nvSpPr>
+          <p:cNvPr id="4" name="Date Placeholder 3">
+            <a:extLst>
+              <a:ext uri="{FF2B5EF4-FFF2-40B4-BE49-F238E27FC236}">
+                <a16:creationId xmlns:a16="http://schemas.microsoft.com/office/drawing/2014/main" id="{7ECEAF79-F4AC-E94E-9E55-220D0D396924}"/>
+              </a:ext>
+            </a:extLst>
+          </p:cNvPr>
+          <p:cNvSpPr>
+            <a:spLocks noGrp="1"/>
+          </p:cNvSpPr>
+          <p:nvPr>
+            <p:ph type="dt" sz="half" idx="10"/>
+          </p:nvPr>
+        </p:nvSpPr>
+        <p:spPr/>
+        <p:txBody>
+          <a:bodyPr/>
+          <a:lstStyle/>
+          <a:p>
+            <a:r>
+              <a:rPr lang="en-US"/>
+              <a:t>World Wide Technology ©</a:t>
+            </a:r>
+            <a:endParaRPr lang="en-US" dirty="0"/>
+          </a:p>
+        </p:txBody>
+      </p:sp>
+      <p:sp>
+        <p:nvSpPr>
+          <p:cNvPr id="5" name="Slide Number Placeholder 4">
+            <a:extLst>
+              <a:ext uri="{FF2B5EF4-FFF2-40B4-BE49-F238E27FC236}">
+                <a16:creationId xmlns:a16="http://schemas.microsoft.com/office/drawing/2014/main" id="{372DC1A4-CE8B-DB4A-8F86-2508518C35D3}"/>
+              </a:ext>
+            </a:extLst>
+          </p:cNvPr>
+          <p:cNvSpPr>
+            <a:spLocks noGrp="1"/>
+          </p:cNvSpPr>
+          <p:nvPr>
+            <p:ph type="sldNum" sz="quarter" idx="12"/>
+          </p:nvPr>
+        </p:nvSpPr>
+        <p:spPr/>
+        <p:txBody>
+          <a:bodyPr/>
+          <a:lstStyle/>
+          <a:p>
+            <a:fld id="{A44B02FA-DD2D-1844-AE35-8B2EAB0CF4EF}" type="slidenum">
+              <a:rPr lang="en-US" smtClean="0"/>
+              <a:pPr/>
+              <a:t>65</a:t>
+            </a:fld>
+            <a:endParaRPr lang="en-US" dirty="0"/>
+          </a:p>
+        </p:txBody>
+      </p:sp>
+    </p:spTree>
+    <p:extLst>
+      <p:ext uri="{BB962C8B-B14F-4D97-AF65-F5344CB8AC3E}">
+        <p14:creationId xmlns:p14="http://schemas.microsoft.com/office/powerpoint/2010/main" val="3225595977"/>
+      </p:ext>
+    </p:extLst>
+  </p:cSld>
+  <p:clrMapOvr>
+    <a:masterClrMapping/>
+  </p:clrMapOvr>
+  <mc:AlternateContent xmlns:mc="http://schemas.openxmlformats.org/markup-compatibility/2006" xmlns:p14="http://schemas.microsoft.com/office/powerpoint/2010/main">
+    <mc:Choice Requires="p14">
+      <p:transition spd="med" p14:dur="700">
+        <p:fade/>
+      </p:transition>
+    </mc:Choice>
+    <mc:Fallback xmlns="">
+      <p:transition spd="med">
+        <p:fade/>
+      </p:transition>
+    </mc:Fallback>
+  </mc:AlternateContent>
+</p:sld>
+</file>
+
+<file path=ppt/slides/slide66.xml><?xml version="1.0" encoding="utf-8"?>
+<p:sld xmlns:a="http://schemas.openxmlformats.org/drawingml/2006/main" xmlns:r="http://schemas.openxmlformats.org/officeDocument/2006/relationships" xmlns:p="http://schemas.openxmlformats.org/presentationml/2006/main">
+  <p:cSld>
+    <p:spTree>
+      <p:nvGrpSpPr>
+        <p:cNvPr id="1" name=""/>
+        <p:cNvGrpSpPr/>
+        <p:nvPr/>
+      </p:nvGrpSpPr>
+      <p:grpSpPr>
+        <a:xfrm>
+          <a:off x="0" y="0"/>
+          <a:ext cx="0" cy="0"/>
+          <a:chOff x="0" y="0"/>
+          <a:chExt cx="0" cy="0"/>
+        </a:xfrm>
+      </p:grpSpPr>
+      <p:sp>
+        <p:nvSpPr>
           <p:cNvPr id="4" name="Date Placeholder 3">
             <a:extLst>
               <a:ext uri="{FF2B5EF4-FFF2-40B4-BE49-F238E27FC236}">
@@ -42296,7 +43673,7 @@
             <a:fld id="{A44B02FA-DD2D-1844-AE35-8B2EAB0CF4EF}" type="slidenum">
               <a:rPr lang="en-US" smtClean="0"/>
               <a:pPr/>
-              <a:t>64</a:t>
+              <a:t>66</a:t>
             </a:fld>
             <a:endParaRPr lang="en-US" dirty="0"/>
           </a:p>

</xml_diff>

<commit_message>
Added ACI Python commands
</commit_message>
<xml_diff>
--- a/curl-requests-foundations.pptx
+++ b/curl-requests-foundations.pptx
@@ -5,7 +5,7 @@
     <p:sldMasterId id="2147483660" r:id="rId1"/>
   </p:sldMasterIdLst>
   <p:notesMasterIdLst>
-    <p:notesMasterId r:id="rId68"/>
+    <p:notesMasterId r:id="rId78"/>
   </p:notesMasterIdLst>
   <p:sldIdLst>
     <p:sldId id="256" r:id="rId2"/>
@@ -67,13 +67,23 @@
     <p:sldId id="330" r:id="rId58"/>
     <p:sldId id="328" r:id="rId59"/>
     <p:sldId id="394" r:id="rId60"/>
-    <p:sldId id="395" r:id="rId61"/>
-    <p:sldId id="333" r:id="rId62"/>
-    <p:sldId id="334" r:id="rId63"/>
-    <p:sldId id="335" r:id="rId64"/>
-    <p:sldId id="311" r:id="rId65"/>
-    <p:sldId id="321" r:id="rId66"/>
-    <p:sldId id="280" r:id="rId67"/>
+    <p:sldId id="397" r:id="rId61"/>
+    <p:sldId id="395" r:id="rId62"/>
+    <p:sldId id="398" r:id="rId63"/>
+    <p:sldId id="396" r:id="rId64"/>
+    <p:sldId id="401" r:id="rId65"/>
+    <p:sldId id="400" r:id="rId66"/>
+    <p:sldId id="403" r:id="rId67"/>
+    <p:sldId id="402" r:id="rId68"/>
+    <p:sldId id="399" r:id="rId69"/>
+    <p:sldId id="404" r:id="rId70"/>
+    <p:sldId id="405" r:id="rId71"/>
+    <p:sldId id="333" r:id="rId72"/>
+    <p:sldId id="334" r:id="rId73"/>
+    <p:sldId id="335" r:id="rId74"/>
+    <p:sldId id="311" r:id="rId75"/>
+    <p:sldId id="321" r:id="rId76"/>
+    <p:sldId id="280" r:id="rId77"/>
   </p:sldIdLst>
   <p:sldSz cx="12192000" cy="6858000"/>
   <p:notesSz cx="6858000" cy="9144000"/>
@@ -4609,7 +4619,7 @@
           <a:p>
             <a:fld id="{020CF8D1-BA82-5045-ACF9-1AA42AD6A519}" type="slidenum">
               <a:rPr lang="en-US" smtClean="0"/>
-              <a:t>60</a:t>
+              <a:t>61</a:t>
             </a:fld>
             <a:endParaRPr lang="en-US"/>
           </a:p>
@@ -4689,10 +4699,7 @@
               <a:tabLst/>
               <a:defRPr/>
             </a:pPr>
-            <a:r>
-              <a:rPr lang="en-US" dirty="0"/>
-              <a:t>// TODO</a:t>
-            </a:r>
+            <a:endParaRPr lang="en-US" dirty="0"/>
           </a:p>
         </p:txBody>
       </p:sp>
@@ -4713,7 +4720,7 @@
           <a:p>
             <a:fld id="{020CF8D1-BA82-5045-ACF9-1AA42AD6A519}" type="slidenum">
               <a:rPr lang="en-US" smtClean="0"/>
-              <a:t>61</a:t>
+              <a:t>63</a:t>
             </a:fld>
             <a:endParaRPr lang="en-US"/>
           </a:p>
@@ -4722,7 +4729,7 @@
     </p:spTree>
     <p:extLst>
       <p:ext uri="{BB962C8B-B14F-4D97-AF65-F5344CB8AC3E}">
-        <p14:creationId xmlns:p14="http://schemas.microsoft.com/office/powerpoint/2010/main" val="3252389655"/>
+        <p14:creationId xmlns:p14="http://schemas.microsoft.com/office/powerpoint/2010/main" val="338162197"/>
       </p:ext>
     </p:extLst>
   </p:cSld>
@@ -4793,10 +4800,7 @@
               <a:tabLst/>
               <a:defRPr/>
             </a:pPr>
-            <a:r>
-              <a:rPr lang="en-US" dirty="0"/>
-              <a:t>// TODO</a:t>
-            </a:r>
+            <a:endParaRPr lang="en-US" dirty="0"/>
           </a:p>
         </p:txBody>
       </p:sp>
@@ -4817,7 +4821,7 @@
           <a:p>
             <a:fld id="{020CF8D1-BA82-5045-ACF9-1AA42AD6A519}" type="slidenum">
               <a:rPr lang="en-US" smtClean="0"/>
-              <a:t>63</a:t>
+              <a:t>65</a:t>
             </a:fld>
             <a:endParaRPr lang="en-US"/>
           </a:p>
@@ -4826,7 +4830,313 @@
     </p:spTree>
     <p:extLst>
       <p:ext uri="{BB962C8B-B14F-4D97-AF65-F5344CB8AC3E}">
-        <p14:creationId xmlns:p14="http://schemas.microsoft.com/office/powerpoint/2010/main" val="4152409612"/>
+        <p14:creationId xmlns:p14="http://schemas.microsoft.com/office/powerpoint/2010/main" val="3382595832"/>
+      </p:ext>
+    </p:extLst>
+  </p:cSld>
+  <p:clrMapOvr>
+    <a:masterClrMapping/>
+  </p:clrMapOvr>
+</p:notes>
+</file>
+
+<file path=ppt/notesSlides/notesSlide47.xml><?xml version="1.0" encoding="utf-8"?>
+<p:notes xmlns:a="http://schemas.openxmlformats.org/drawingml/2006/main" xmlns:r="http://schemas.openxmlformats.org/officeDocument/2006/relationships" xmlns:p="http://schemas.openxmlformats.org/presentationml/2006/main">
+  <p:cSld>
+    <p:spTree>
+      <p:nvGrpSpPr>
+        <p:cNvPr id="1" name=""/>
+        <p:cNvGrpSpPr/>
+        <p:nvPr/>
+      </p:nvGrpSpPr>
+      <p:grpSpPr>
+        <a:xfrm>
+          <a:off x="0" y="0"/>
+          <a:ext cx="0" cy="0"/>
+          <a:chOff x="0" y="0"/>
+          <a:chExt cx="0" cy="0"/>
+        </a:xfrm>
+      </p:grpSpPr>
+      <p:sp>
+        <p:nvSpPr>
+          <p:cNvPr id="2" name="Slide Image Placeholder 1"/>
+          <p:cNvSpPr>
+            <a:spLocks noGrp="1" noRot="1" noChangeAspect="1"/>
+          </p:cNvSpPr>
+          <p:nvPr>
+            <p:ph type="sldImg"/>
+          </p:nvPr>
+        </p:nvSpPr>
+        <p:spPr/>
+      </p:sp>
+      <p:sp>
+        <p:nvSpPr>
+          <p:cNvPr id="3" name="Notes Placeholder 2"/>
+          <p:cNvSpPr>
+            <a:spLocks noGrp="1"/>
+          </p:cNvSpPr>
+          <p:nvPr>
+            <p:ph type="body" idx="1"/>
+          </p:nvPr>
+        </p:nvSpPr>
+        <p:spPr/>
+        <p:txBody>
+          <a:bodyPr/>
+          <a:lstStyle/>
+          <a:p>
+            <a:pPr marL="0" marR="0" lvl="0" indent="0" algn="l" defTabSz="914400" rtl="0" eaLnBrk="1" fontAlgn="auto" latinLnBrk="0" hangingPunct="1">
+              <a:lnSpc>
+                <a:spcPct val="100000"/>
+              </a:lnSpc>
+              <a:spcBef>
+                <a:spcPts val="0"/>
+              </a:spcBef>
+              <a:spcAft>
+                <a:spcPts val="0"/>
+              </a:spcAft>
+              <a:buClrTx/>
+              <a:buSzTx/>
+              <a:buFontTx/>
+              <a:buNone/>
+              <a:tabLst/>
+              <a:defRPr/>
+            </a:pPr>
+            <a:endParaRPr lang="en-US" dirty="0"/>
+          </a:p>
+        </p:txBody>
+      </p:sp>
+      <p:sp>
+        <p:nvSpPr>
+          <p:cNvPr id="4" name="Slide Number Placeholder 3"/>
+          <p:cNvSpPr>
+            <a:spLocks noGrp="1"/>
+          </p:cNvSpPr>
+          <p:nvPr>
+            <p:ph type="sldNum" sz="quarter" idx="5"/>
+          </p:nvPr>
+        </p:nvSpPr>
+        <p:spPr/>
+        <p:txBody>
+          <a:bodyPr/>
+          <a:lstStyle/>
+          <a:p>
+            <a:fld id="{020CF8D1-BA82-5045-ACF9-1AA42AD6A519}" type="slidenum">
+              <a:rPr lang="en-US" smtClean="0"/>
+              <a:t>67</a:t>
+            </a:fld>
+            <a:endParaRPr lang="en-US"/>
+          </a:p>
+        </p:txBody>
+      </p:sp>
+    </p:spTree>
+    <p:extLst>
+      <p:ext uri="{BB962C8B-B14F-4D97-AF65-F5344CB8AC3E}">
+        <p14:creationId xmlns:p14="http://schemas.microsoft.com/office/powerpoint/2010/main" val="2758655105"/>
+      </p:ext>
+    </p:extLst>
+  </p:cSld>
+  <p:clrMapOvr>
+    <a:masterClrMapping/>
+  </p:clrMapOvr>
+</p:notes>
+</file>
+
+<file path=ppt/notesSlides/notesSlide48.xml><?xml version="1.0" encoding="utf-8"?>
+<p:notes xmlns:a="http://schemas.openxmlformats.org/drawingml/2006/main" xmlns:r="http://schemas.openxmlformats.org/officeDocument/2006/relationships" xmlns:p="http://schemas.openxmlformats.org/presentationml/2006/main">
+  <p:cSld>
+    <p:spTree>
+      <p:nvGrpSpPr>
+        <p:cNvPr id="1" name=""/>
+        <p:cNvGrpSpPr/>
+        <p:nvPr/>
+      </p:nvGrpSpPr>
+      <p:grpSpPr>
+        <a:xfrm>
+          <a:off x="0" y="0"/>
+          <a:ext cx="0" cy="0"/>
+          <a:chOff x="0" y="0"/>
+          <a:chExt cx="0" cy="0"/>
+        </a:xfrm>
+      </p:grpSpPr>
+      <p:sp>
+        <p:nvSpPr>
+          <p:cNvPr id="2" name="Slide Image Placeholder 1"/>
+          <p:cNvSpPr>
+            <a:spLocks noGrp="1" noRot="1" noChangeAspect="1"/>
+          </p:cNvSpPr>
+          <p:nvPr>
+            <p:ph type="sldImg"/>
+          </p:nvPr>
+        </p:nvSpPr>
+        <p:spPr/>
+      </p:sp>
+      <p:sp>
+        <p:nvSpPr>
+          <p:cNvPr id="3" name="Notes Placeholder 2"/>
+          <p:cNvSpPr>
+            <a:spLocks noGrp="1"/>
+          </p:cNvSpPr>
+          <p:nvPr>
+            <p:ph type="body" idx="1"/>
+          </p:nvPr>
+        </p:nvSpPr>
+        <p:spPr/>
+        <p:txBody>
+          <a:bodyPr/>
+          <a:lstStyle/>
+          <a:p>
+            <a:pPr marL="0" marR="0" lvl="0" indent="0" algn="l" defTabSz="914400" rtl="0" eaLnBrk="1" fontAlgn="auto" latinLnBrk="0" hangingPunct="1">
+              <a:lnSpc>
+                <a:spcPct val="100000"/>
+              </a:lnSpc>
+              <a:spcBef>
+                <a:spcPts val="0"/>
+              </a:spcBef>
+              <a:spcAft>
+                <a:spcPts val="0"/>
+              </a:spcAft>
+              <a:buClrTx/>
+              <a:buSzTx/>
+              <a:buFontTx/>
+              <a:buNone/>
+              <a:tabLst/>
+              <a:defRPr/>
+            </a:pPr>
+            <a:endParaRPr lang="en-US" dirty="0"/>
+          </a:p>
+        </p:txBody>
+      </p:sp>
+      <p:sp>
+        <p:nvSpPr>
+          <p:cNvPr id="4" name="Slide Number Placeholder 3"/>
+          <p:cNvSpPr>
+            <a:spLocks noGrp="1"/>
+          </p:cNvSpPr>
+          <p:nvPr>
+            <p:ph type="sldNum" sz="quarter" idx="5"/>
+          </p:nvPr>
+        </p:nvSpPr>
+        <p:spPr/>
+        <p:txBody>
+          <a:bodyPr/>
+          <a:lstStyle/>
+          <a:p>
+            <a:fld id="{020CF8D1-BA82-5045-ACF9-1AA42AD6A519}" type="slidenum">
+              <a:rPr lang="en-US" smtClean="0"/>
+              <a:t>69</a:t>
+            </a:fld>
+            <a:endParaRPr lang="en-US"/>
+          </a:p>
+        </p:txBody>
+      </p:sp>
+    </p:spTree>
+    <p:extLst>
+      <p:ext uri="{BB962C8B-B14F-4D97-AF65-F5344CB8AC3E}">
+        <p14:creationId xmlns:p14="http://schemas.microsoft.com/office/powerpoint/2010/main" val="4106649840"/>
+      </p:ext>
+    </p:extLst>
+  </p:cSld>
+  <p:clrMapOvr>
+    <a:masterClrMapping/>
+  </p:clrMapOvr>
+</p:notes>
+</file>
+
+<file path=ppt/notesSlides/notesSlide49.xml><?xml version="1.0" encoding="utf-8"?>
+<p:notes xmlns:a="http://schemas.openxmlformats.org/drawingml/2006/main" xmlns:r="http://schemas.openxmlformats.org/officeDocument/2006/relationships" xmlns:p="http://schemas.openxmlformats.org/presentationml/2006/main">
+  <p:cSld>
+    <p:spTree>
+      <p:nvGrpSpPr>
+        <p:cNvPr id="1" name=""/>
+        <p:cNvGrpSpPr/>
+        <p:nvPr/>
+      </p:nvGrpSpPr>
+      <p:grpSpPr>
+        <a:xfrm>
+          <a:off x="0" y="0"/>
+          <a:ext cx="0" cy="0"/>
+          <a:chOff x="0" y="0"/>
+          <a:chExt cx="0" cy="0"/>
+        </a:xfrm>
+      </p:grpSpPr>
+      <p:sp>
+        <p:nvSpPr>
+          <p:cNvPr id="2" name="Slide Image Placeholder 1"/>
+          <p:cNvSpPr>
+            <a:spLocks noGrp="1" noRot="1" noChangeAspect="1"/>
+          </p:cNvSpPr>
+          <p:nvPr>
+            <p:ph type="sldImg"/>
+          </p:nvPr>
+        </p:nvSpPr>
+        <p:spPr/>
+      </p:sp>
+      <p:sp>
+        <p:nvSpPr>
+          <p:cNvPr id="3" name="Notes Placeholder 2"/>
+          <p:cNvSpPr>
+            <a:spLocks noGrp="1"/>
+          </p:cNvSpPr>
+          <p:nvPr>
+            <p:ph type="body" idx="1"/>
+          </p:nvPr>
+        </p:nvSpPr>
+        <p:spPr/>
+        <p:txBody>
+          <a:bodyPr/>
+          <a:lstStyle/>
+          <a:p>
+            <a:pPr marL="0" marR="0" lvl="0" indent="0" algn="l" defTabSz="914400" rtl="0" eaLnBrk="1" fontAlgn="auto" latinLnBrk="0" hangingPunct="1">
+              <a:lnSpc>
+                <a:spcPct val="100000"/>
+              </a:lnSpc>
+              <a:spcBef>
+                <a:spcPts val="0"/>
+              </a:spcBef>
+              <a:spcAft>
+                <a:spcPts val="0"/>
+              </a:spcAft>
+              <a:buClrTx/>
+              <a:buSzTx/>
+              <a:buFontTx/>
+              <a:buNone/>
+              <a:tabLst/>
+              <a:defRPr/>
+            </a:pPr>
+            <a:r>
+              <a:rPr lang="en-US" dirty="0"/>
+              <a:t>// TODO</a:t>
+            </a:r>
+          </a:p>
+        </p:txBody>
+      </p:sp>
+      <p:sp>
+        <p:nvSpPr>
+          <p:cNvPr id="4" name="Slide Number Placeholder 3"/>
+          <p:cNvSpPr>
+            <a:spLocks noGrp="1"/>
+          </p:cNvSpPr>
+          <p:nvPr>
+            <p:ph type="sldNum" sz="quarter" idx="5"/>
+          </p:nvPr>
+        </p:nvSpPr>
+        <p:spPr/>
+        <p:txBody>
+          <a:bodyPr/>
+          <a:lstStyle/>
+          <a:p>
+            <a:fld id="{020CF8D1-BA82-5045-ACF9-1AA42AD6A519}" type="slidenum">
+              <a:rPr lang="en-US" smtClean="0"/>
+              <a:t>71</a:t>
+            </a:fld>
+            <a:endParaRPr lang="en-US"/>
+          </a:p>
+        </p:txBody>
+      </p:sp>
+    </p:spTree>
+    <p:extLst>
+      <p:ext uri="{BB962C8B-B14F-4D97-AF65-F5344CB8AC3E}">
+        <p14:creationId xmlns:p14="http://schemas.microsoft.com/office/powerpoint/2010/main" val="3252389655"/>
       </p:ext>
     </p:extLst>
   </p:cSld>
@@ -5253,6 +5563,110 @@
     <p:extLst>
       <p:ext uri="{BB962C8B-B14F-4D97-AF65-F5344CB8AC3E}">
         <p14:creationId xmlns:p14="http://schemas.microsoft.com/office/powerpoint/2010/main" val="3043503657"/>
+      </p:ext>
+    </p:extLst>
+  </p:cSld>
+  <p:clrMapOvr>
+    <a:masterClrMapping/>
+  </p:clrMapOvr>
+</p:notes>
+</file>
+
+<file path=ppt/notesSlides/notesSlide50.xml><?xml version="1.0" encoding="utf-8"?>
+<p:notes xmlns:a="http://schemas.openxmlformats.org/drawingml/2006/main" xmlns:r="http://schemas.openxmlformats.org/officeDocument/2006/relationships" xmlns:p="http://schemas.openxmlformats.org/presentationml/2006/main">
+  <p:cSld>
+    <p:spTree>
+      <p:nvGrpSpPr>
+        <p:cNvPr id="1" name=""/>
+        <p:cNvGrpSpPr/>
+        <p:nvPr/>
+      </p:nvGrpSpPr>
+      <p:grpSpPr>
+        <a:xfrm>
+          <a:off x="0" y="0"/>
+          <a:ext cx="0" cy="0"/>
+          <a:chOff x="0" y="0"/>
+          <a:chExt cx="0" cy="0"/>
+        </a:xfrm>
+      </p:grpSpPr>
+      <p:sp>
+        <p:nvSpPr>
+          <p:cNvPr id="2" name="Slide Image Placeholder 1"/>
+          <p:cNvSpPr>
+            <a:spLocks noGrp="1" noRot="1" noChangeAspect="1"/>
+          </p:cNvSpPr>
+          <p:nvPr>
+            <p:ph type="sldImg"/>
+          </p:nvPr>
+        </p:nvSpPr>
+        <p:spPr/>
+      </p:sp>
+      <p:sp>
+        <p:nvSpPr>
+          <p:cNvPr id="3" name="Notes Placeholder 2"/>
+          <p:cNvSpPr>
+            <a:spLocks noGrp="1"/>
+          </p:cNvSpPr>
+          <p:nvPr>
+            <p:ph type="body" idx="1"/>
+          </p:nvPr>
+        </p:nvSpPr>
+        <p:spPr/>
+        <p:txBody>
+          <a:bodyPr/>
+          <a:lstStyle/>
+          <a:p>
+            <a:pPr marL="0" marR="0" lvl="0" indent="0" algn="l" defTabSz="914400" rtl="0" eaLnBrk="1" fontAlgn="auto" latinLnBrk="0" hangingPunct="1">
+              <a:lnSpc>
+                <a:spcPct val="100000"/>
+              </a:lnSpc>
+              <a:spcBef>
+                <a:spcPts val="0"/>
+              </a:spcBef>
+              <a:spcAft>
+                <a:spcPts val="0"/>
+              </a:spcAft>
+              <a:buClrTx/>
+              <a:buSzTx/>
+              <a:buFontTx/>
+              <a:buNone/>
+              <a:tabLst/>
+              <a:defRPr/>
+            </a:pPr>
+            <a:r>
+              <a:rPr lang="en-US" dirty="0"/>
+              <a:t>// TODO</a:t>
+            </a:r>
+          </a:p>
+        </p:txBody>
+      </p:sp>
+      <p:sp>
+        <p:nvSpPr>
+          <p:cNvPr id="4" name="Slide Number Placeholder 3"/>
+          <p:cNvSpPr>
+            <a:spLocks noGrp="1"/>
+          </p:cNvSpPr>
+          <p:nvPr>
+            <p:ph type="sldNum" sz="quarter" idx="5"/>
+          </p:nvPr>
+        </p:nvSpPr>
+        <p:spPr/>
+        <p:txBody>
+          <a:bodyPr/>
+          <a:lstStyle/>
+          <a:p>
+            <a:fld id="{020CF8D1-BA82-5045-ACF9-1AA42AD6A519}" type="slidenum">
+              <a:rPr lang="en-US" smtClean="0"/>
+              <a:t>73</a:t>
+            </a:fld>
+            <a:endParaRPr lang="en-US"/>
+          </a:p>
+        </p:txBody>
+      </p:sp>
+    </p:spTree>
+    <p:extLst>
+      <p:ext uri="{BB962C8B-B14F-4D97-AF65-F5344CB8AC3E}">
+        <p14:creationId xmlns:p14="http://schemas.microsoft.com/office/powerpoint/2010/main" val="4152409612"/>
       </p:ext>
     </p:extLst>
   </p:cSld>
@@ -42451,264 +42865,10 @@
       </p:grpSpPr>
       <p:sp>
         <p:nvSpPr>
-          <p:cNvPr id="2" name="Title 1">
-            <a:extLst>
-              <a:ext uri="{FF2B5EF4-FFF2-40B4-BE49-F238E27FC236}">
-                <a16:creationId xmlns:a16="http://schemas.microsoft.com/office/drawing/2014/main" id="{9B4DF7CD-7263-9840-AE80-6F1B7FA6AF3C}"/>
-              </a:ext>
-            </a:extLst>
-          </p:cNvPr>
-          <p:cNvSpPr>
-            <a:spLocks noGrp="1"/>
-          </p:cNvSpPr>
-          <p:nvPr>
-            <p:ph type="title"/>
-          </p:nvPr>
-        </p:nvSpPr>
-        <p:spPr/>
-        <p:txBody>
-          <a:bodyPr/>
-          <a:lstStyle/>
-          <a:p>
-            <a:r>
-              <a:rPr lang="en-US" dirty="0" err="1"/>
-              <a:t>cURL</a:t>
-            </a:r>
-            <a:r>
-              <a:rPr lang="en-US" dirty="0"/>
-              <a:t> – </a:t>
-            </a:r>
-            <a:r>
-              <a:rPr lang="en-US" dirty="0" err="1"/>
-              <a:t>DevNet</a:t>
-            </a:r>
-            <a:r>
-              <a:rPr lang="en-US" dirty="0"/>
-              <a:t> Always-On ACI Sandbox</a:t>
-            </a:r>
-          </a:p>
-        </p:txBody>
-      </p:sp>
-      <p:sp>
-        <p:nvSpPr>
-          <p:cNvPr id="3" name="Content Placeholder 2">
-            <a:extLst>
-              <a:ext uri="{FF2B5EF4-FFF2-40B4-BE49-F238E27FC236}">
-                <a16:creationId xmlns:a16="http://schemas.microsoft.com/office/drawing/2014/main" id="{A610A140-16FE-F54F-9766-D3A50E4E4F0B}"/>
-              </a:ext>
-            </a:extLst>
-          </p:cNvPr>
-          <p:cNvSpPr>
-            <a:spLocks noGrp="1"/>
-          </p:cNvSpPr>
-          <p:nvPr>
-            <p:ph idx="1"/>
-          </p:nvPr>
-        </p:nvSpPr>
-        <p:spPr/>
-        <p:txBody>
-          <a:bodyPr/>
-          <a:lstStyle/>
-          <a:p>
-            <a:r>
-              <a:rPr lang="en-US" dirty="0"/>
-              <a:t>Step 3 – Create a new Tenant</a:t>
-            </a:r>
-          </a:p>
-          <a:p>
-            <a:pPr marL="457200" lvl="1" indent="0">
-              <a:buNone/>
-            </a:pPr>
-            <a:r>
-              <a:rPr lang="en-US" b="1" i="1" dirty="0">
-                <a:solidFill>
-                  <a:srgbClr val="FFFF00"/>
-                </a:solidFill>
-              </a:rPr>
-              <a:t>curl -X POST --</a:t>
-            </a:r>
-            <a:r>
-              <a:rPr lang="en-US" b="1" i="1" dirty="0" err="1">
-                <a:solidFill>
-                  <a:srgbClr val="FFFF00"/>
-                </a:solidFill>
-              </a:rPr>
-              <a:t>url</a:t>
-            </a:r>
-            <a:r>
-              <a:rPr lang="en-US" b="1" i="1" dirty="0">
-                <a:solidFill>
-                  <a:srgbClr val="FFFF00"/>
-                </a:solidFill>
-              </a:rPr>
-              <a:t> https://</a:t>
-            </a:r>
-            <a:r>
-              <a:rPr lang="en-US" b="1" i="1" dirty="0" err="1">
-                <a:solidFill>
-                  <a:srgbClr val="FFFF00"/>
-                </a:solidFill>
-              </a:rPr>
-              <a:t>sandboxapicdc.cisco.com</a:t>
-            </a:r>
-            <a:r>
-              <a:rPr lang="en-US" b="1" i="1" dirty="0">
-                <a:solidFill>
-                  <a:srgbClr val="FFFF00"/>
-                </a:solidFill>
-              </a:rPr>
-              <a:t>/</a:t>
-            </a:r>
-            <a:r>
-              <a:rPr lang="en-US" b="1" i="1" dirty="0" err="1">
-                <a:solidFill>
-                  <a:srgbClr val="FFFF00"/>
-                </a:solidFill>
-              </a:rPr>
-              <a:t>api</a:t>
-            </a:r>
-            <a:r>
-              <a:rPr lang="en-US" b="1" i="1" dirty="0">
-                <a:solidFill>
-                  <a:srgbClr val="FFFF00"/>
-                </a:solidFill>
-              </a:rPr>
-              <a:t>/</a:t>
-            </a:r>
-            <a:r>
-              <a:rPr lang="en-US" b="1" i="1" dirty="0" err="1">
-                <a:solidFill>
-                  <a:srgbClr val="FFFF00"/>
-                </a:solidFill>
-              </a:rPr>
-              <a:t>mo</a:t>
-            </a:r>
-            <a:r>
-              <a:rPr lang="en-US" b="1" i="1" dirty="0">
-                <a:solidFill>
-                  <a:srgbClr val="FFFF00"/>
-                </a:solidFill>
-              </a:rPr>
-              <a:t>/</a:t>
-            </a:r>
-            <a:r>
-              <a:rPr lang="en-US" b="1" i="1" dirty="0" err="1">
-                <a:solidFill>
-                  <a:srgbClr val="FFFF00"/>
-                </a:solidFill>
-              </a:rPr>
-              <a:t>uni.json</a:t>
-            </a:r>
-            <a:r>
-              <a:rPr lang="en-US" b="1" i="1" dirty="0">
-                <a:solidFill>
-                  <a:srgbClr val="FFFF00"/>
-                </a:solidFill>
-              </a:rPr>
-              <a:t> \</a:t>
-            </a:r>
-          </a:p>
-          <a:p>
-            <a:pPr marL="457200" lvl="1" indent="0">
-              <a:buNone/>
-            </a:pPr>
-            <a:r>
-              <a:rPr lang="en-US" b="1" i="1" dirty="0">
-                <a:solidFill>
-                  <a:srgbClr val="FFFF00"/>
-                </a:solidFill>
-              </a:rPr>
-              <a:t>--data '{"</a:t>
-            </a:r>
-            <a:r>
-              <a:rPr lang="en-US" b="1" i="1" dirty="0" err="1">
-                <a:solidFill>
-                  <a:srgbClr val="FFFF00"/>
-                </a:solidFill>
-              </a:rPr>
-              <a:t>fvTenant</a:t>
-            </a:r>
-            <a:r>
-              <a:rPr lang="en-US" b="1" i="1" dirty="0">
-                <a:solidFill>
-                  <a:srgbClr val="FFFF00"/>
-                </a:solidFill>
-              </a:rPr>
-              <a:t>":{"attributes":{"name":"</a:t>
-            </a:r>
-            <a:r>
-              <a:rPr lang="en-US" b="1" i="1" dirty="0" err="1">
-                <a:solidFill>
-                  <a:srgbClr val="FFFF00"/>
-                </a:solidFill>
-              </a:rPr>
-              <a:t>my_new_tenant</a:t>
-            </a:r>
-            <a:r>
-              <a:rPr lang="en-US" b="1" i="1" dirty="0">
-                <a:solidFill>
-                  <a:srgbClr val="FFFF00"/>
-                </a:solidFill>
-              </a:rPr>
-              <a:t>"}}}' \</a:t>
-            </a:r>
-          </a:p>
-          <a:p>
-            <a:pPr marL="457200" lvl="1" indent="0">
-              <a:buNone/>
-            </a:pPr>
-            <a:r>
-              <a:rPr lang="en-US" b="1" i="1" dirty="0">
-                <a:solidFill>
-                  <a:srgbClr val="FFFF00"/>
-                </a:solidFill>
-              </a:rPr>
-              <a:t>-</a:t>
-            </a:r>
-            <a:r>
-              <a:rPr lang="en-US" b="1" i="1" dirty="0" err="1">
-                <a:solidFill>
-                  <a:srgbClr val="FFFF00"/>
-                </a:solidFill>
-              </a:rPr>
-              <a:t>kib</a:t>
-            </a:r>
-            <a:r>
-              <a:rPr lang="en-US" b="1" i="1" dirty="0">
-                <a:solidFill>
-                  <a:srgbClr val="FFFF00"/>
-                </a:solidFill>
-              </a:rPr>
-              <a:t> .</a:t>
-            </a:r>
-            <a:r>
-              <a:rPr lang="en-US" b="1" i="1" dirty="0" err="1">
-                <a:solidFill>
-                  <a:srgbClr val="FFFF00"/>
-                </a:solidFill>
-              </a:rPr>
-              <a:t>cookie_jar</a:t>
-            </a:r>
-            <a:endParaRPr lang="en-US" b="1" i="1" dirty="0">
-              <a:solidFill>
-                <a:srgbClr val="FFFF00"/>
-              </a:solidFill>
-            </a:endParaRPr>
-          </a:p>
-          <a:p>
-            <a:pPr marL="0" indent="0">
-              <a:buNone/>
-            </a:pPr>
-            <a:endParaRPr lang="en-US" dirty="0"/>
-          </a:p>
-        </p:txBody>
-      </p:sp>
-      <p:sp>
-        <p:nvSpPr>
           <p:cNvPr id="4" name="Date Placeholder 3">
             <a:extLst>
               <a:ext uri="{FF2B5EF4-FFF2-40B4-BE49-F238E27FC236}">
-                <a16:creationId xmlns:a16="http://schemas.microsoft.com/office/drawing/2014/main" id="{D7D9528C-333D-BF4A-844C-7BCC7757E858}"/>
+                <a16:creationId xmlns:a16="http://schemas.microsoft.com/office/drawing/2014/main" id="{0CD670A9-B06A-3448-BABA-FAD627500859}"/>
               </a:ext>
             </a:extLst>
           </p:cNvPr>
@@ -42737,7 +42897,7 @@
           <p:cNvPr id="5" name="Slide Number Placeholder 4">
             <a:extLst>
               <a:ext uri="{FF2B5EF4-FFF2-40B4-BE49-F238E27FC236}">
-                <a16:creationId xmlns:a16="http://schemas.microsoft.com/office/drawing/2014/main" id="{0798D1A2-1CD4-4A47-A0BC-C1215D1CD611}"/>
+                <a16:creationId xmlns:a16="http://schemas.microsoft.com/office/drawing/2014/main" id="{119DACAD-17C1-C249-A498-C4A1A1ADD334}"/>
               </a:ext>
             </a:extLst>
           </p:cNvPr>
@@ -42765,7 +42925,7 @@
     </p:spTree>
     <p:extLst>
       <p:ext uri="{BB962C8B-B14F-4D97-AF65-F5344CB8AC3E}">
-        <p14:creationId xmlns:p14="http://schemas.microsoft.com/office/powerpoint/2010/main" val="1189830946"/>
+        <p14:creationId xmlns:p14="http://schemas.microsoft.com/office/powerpoint/2010/main" val="1031851442"/>
       </p:ext>
     </p:extLst>
   </p:cSld>
@@ -42809,7 +42969,7 @@
           <p:cNvPr id="2" name="Title 1">
             <a:extLst>
               <a:ext uri="{FF2B5EF4-FFF2-40B4-BE49-F238E27FC236}">
-                <a16:creationId xmlns:a16="http://schemas.microsoft.com/office/drawing/2014/main" id="{9D8D6E4C-FC36-3E4C-9387-96DD20072D9D}"/>
+                <a16:creationId xmlns:a16="http://schemas.microsoft.com/office/drawing/2014/main" id="{9B4DF7CD-7263-9840-AE80-6F1B7FA6AF3C}"/>
               </a:ext>
             </a:extLst>
           </p:cNvPr>
@@ -42817,32 +42977,39 @@
             <a:spLocks noGrp="1"/>
           </p:cNvSpPr>
           <p:nvPr>
-            <p:ph type="ctrTitle"/>
+            <p:ph type="title"/>
           </p:nvPr>
         </p:nvSpPr>
-        <p:spPr>
-          <a:xfrm>
-            <a:off x="1524000" y="914013"/>
-            <a:ext cx="9144000" cy="2387600"/>
-          </a:xfrm>
-        </p:spPr>
+        <p:spPr/>
         <p:txBody>
           <a:bodyPr/>
           <a:lstStyle/>
           <a:p>
             <a:r>
+              <a:rPr lang="en-US" dirty="0" err="1"/>
+              <a:t>cURL</a:t>
+            </a:r>
+            <a:r>
               <a:rPr lang="en-US" dirty="0"/>
-              <a:t>Part VI</a:t>
+              <a:t> – </a:t>
+            </a:r>
+            <a:r>
+              <a:rPr lang="en-US" dirty="0" err="1"/>
+              <a:t>DevNet</a:t>
+            </a:r>
+            <a:r>
+              <a:rPr lang="en-US" dirty="0"/>
+              <a:t> Always-On ACI Sandbox</a:t>
             </a:r>
           </a:p>
         </p:txBody>
       </p:sp>
       <p:sp>
         <p:nvSpPr>
-          <p:cNvPr id="3" name="Subtitle 2">
+          <p:cNvPr id="3" name="Content Placeholder 2">
             <a:extLst>
               <a:ext uri="{FF2B5EF4-FFF2-40B4-BE49-F238E27FC236}">
-                <a16:creationId xmlns:a16="http://schemas.microsoft.com/office/drawing/2014/main" id="{0451A0DE-9D64-5A48-94B5-5B4E42709819}"/>
+                <a16:creationId xmlns:a16="http://schemas.microsoft.com/office/drawing/2014/main" id="{A610A140-16FE-F54F-9766-D3A50E4E4F0B}"/>
               </a:ext>
             </a:extLst>
           </p:cNvPr>
@@ -42850,30 +43017,309 @@
             <a:spLocks noGrp="1"/>
           </p:cNvSpPr>
           <p:nvPr>
-            <p:ph type="subTitle" idx="1"/>
+            <p:ph idx="1"/>
           </p:nvPr>
         </p:nvSpPr>
-        <p:spPr>
-          <a:xfrm>
-            <a:off x="1524000" y="3393688"/>
-            <a:ext cx="9144000" cy="1655762"/>
-          </a:xfrm>
-        </p:spPr>
+        <p:spPr/>
         <p:txBody>
           <a:bodyPr/>
           <a:lstStyle/>
           <a:p>
             <a:r>
               <a:rPr lang="en-US" dirty="0"/>
-              <a:t>Interact With Cisco Platform APIs Using Python Requests</a:t>
-            </a:r>
+              <a:t>Step 3 – Create a new Tenant</a:t>
+            </a:r>
+          </a:p>
+          <a:p>
+            <a:pPr marL="457200" lvl="1" indent="0">
+              <a:buNone/>
+            </a:pPr>
+            <a:r>
+              <a:rPr lang="en-US" b="1" i="1" dirty="0">
+                <a:solidFill>
+                  <a:srgbClr val="FFFF00"/>
+                </a:solidFill>
+              </a:rPr>
+              <a:t>curl -X POST --</a:t>
+            </a:r>
+            <a:r>
+              <a:rPr lang="en-US" b="1" i="1" dirty="0" err="1">
+                <a:solidFill>
+                  <a:srgbClr val="FFFF00"/>
+                </a:solidFill>
+              </a:rPr>
+              <a:t>url</a:t>
+            </a:r>
+            <a:r>
+              <a:rPr lang="en-US" b="1" i="1" dirty="0">
+                <a:solidFill>
+                  <a:srgbClr val="FFFF00"/>
+                </a:solidFill>
+              </a:rPr>
+              <a:t> https://</a:t>
+            </a:r>
+            <a:r>
+              <a:rPr lang="en-US" b="1" i="1" dirty="0" err="1">
+                <a:solidFill>
+                  <a:srgbClr val="FFFF00"/>
+                </a:solidFill>
+              </a:rPr>
+              <a:t>sandboxapicdc.cisco.com</a:t>
+            </a:r>
+            <a:r>
+              <a:rPr lang="en-US" b="1" i="1" dirty="0">
+                <a:solidFill>
+                  <a:srgbClr val="FFFF00"/>
+                </a:solidFill>
+              </a:rPr>
+              <a:t>/</a:t>
+            </a:r>
+            <a:r>
+              <a:rPr lang="en-US" b="1" i="1" dirty="0" err="1">
+                <a:solidFill>
+                  <a:srgbClr val="FFFF00"/>
+                </a:solidFill>
+              </a:rPr>
+              <a:t>api</a:t>
+            </a:r>
+            <a:r>
+              <a:rPr lang="en-US" b="1" i="1" dirty="0">
+                <a:solidFill>
+                  <a:srgbClr val="FFFF00"/>
+                </a:solidFill>
+              </a:rPr>
+              <a:t>/</a:t>
+            </a:r>
+            <a:r>
+              <a:rPr lang="en-US" b="1" i="1" dirty="0" err="1">
+                <a:solidFill>
+                  <a:srgbClr val="FFFF00"/>
+                </a:solidFill>
+              </a:rPr>
+              <a:t>mo</a:t>
+            </a:r>
+            <a:r>
+              <a:rPr lang="en-US" b="1" i="1" dirty="0">
+                <a:solidFill>
+                  <a:srgbClr val="FFFF00"/>
+                </a:solidFill>
+              </a:rPr>
+              <a:t>/</a:t>
+            </a:r>
+            <a:r>
+              <a:rPr lang="en-US" b="1" i="1" dirty="0" err="1">
+                <a:solidFill>
+                  <a:srgbClr val="FFFF00"/>
+                </a:solidFill>
+              </a:rPr>
+              <a:t>uni.json</a:t>
+            </a:r>
+            <a:r>
+              <a:rPr lang="en-US" b="1" i="1" dirty="0">
+                <a:solidFill>
+                  <a:srgbClr val="FFFF00"/>
+                </a:solidFill>
+              </a:rPr>
+              <a:t> \</a:t>
+            </a:r>
+          </a:p>
+          <a:p>
+            <a:pPr marL="457200" lvl="1" indent="0">
+              <a:buNone/>
+            </a:pPr>
+            <a:r>
+              <a:rPr lang="en-US" b="1" i="1" dirty="0">
+                <a:solidFill>
+                  <a:srgbClr val="FFFF00"/>
+                </a:solidFill>
+              </a:rPr>
+              <a:t>--data '{"</a:t>
+            </a:r>
+            <a:r>
+              <a:rPr lang="en-US" b="1" i="1" dirty="0" err="1">
+                <a:solidFill>
+                  <a:srgbClr val="FFFF00"/>
+                </a:solidFill>
+              </a:rPr>
+              <a:t>fvTenant</a:t>
+            </a:r>
+            <a:r>
+              <a:rPr lang="en-US" b="1" i="1" dirty="0">
+                <a:solidFill>
+                  <a:srgbClr val="FFFF00"/>
+                </a:solidFill>
+              </a:rPr>
+              <a:t>":{"attributes":{"name":"</a:t>
+            </a:r>
+            <a:r>
+              <a:rPr lang="en-US" b="1" i="1" dirty="0" err="1">
+                <a:solidFill>
+                  <a:srgbClr val="FFFF00"/>
+                </a:solidFill>
+              </a:rPr>
+              <a:t>my_new_tenant</a:t>
+            </a:r>
+            <a:r>
+              <a:rPr lang="en-US" b="1" i="1" dirty="0">
+                <a:solidFill>
+                  <a:srgbClr val="FFFF00"/>
+                </a:solidFill>
+              </a:rPr>
+              <a:t>"}}}' \</a:t>
+            </a:r>
+          </a:p>
+          <a:p>
+            <a:pPr marL="457200" lvl="1" indent="0">
+              <a:buNone/>
+            </a:pPr>
+            <a:r>
+              <a:rPr lang="en-US" b="1" i="1" dirty="0">
+                <a:solidFill>
+                  <a:srgbClr val="FFFF00"/>
+                </a:solidFill>
+              </a:rPr>
+              <a:t>-</a:t>
+            </a:r>
+            <a:r>
+              <a:rPr lang="en-US" b="1" i="1" dirty="0" err="1">
+                <a:solidFill>
+                  <a:srgbClr val="FFFF00"/>
+                </a:solidFill>
+              </a:rPr>
+              <a:t>kib</a:t>
+            </a:r>
+            <a:r>
+              <a:rPr lang="en-US" b="1" i="1" dirty="0">
+                <a:solidFill>
+                  <a:srgbClr val="FFFF00"/>
+                </a:solidFill>
+              </a:rPr>
+              <a:t> .</a:t>
+            </a:r>
+            <a:r>
+              <a:rPr lang="en-US" b="1" i="1" dirty="0" err="1">
+                <a:solidFill>
+                  <a:srgbClr val="FFFF00"/>
+                </a:solidFill>
+              </a:rPr>
+              <a:t>cookie_jar</a:t>
+            </a:r>
+            <a:endParaRPr lang="en-US" b="1" i="1" dirty="0">
+              <a:solidFill>
+                <a:srgbClr val="FFFF00"/>
+              </a:solidFill>
+            </a:endParaRPr>
+          </a:p>
+          <a:p>
+            <a:pPr marL="457200" lvl="1" indent="0">
+              <a:buNone/>
+            </a:pPr>
+            <a:endParaRPr lang="en-US" b="1" i="1" dirty="0">
+              <a:solidFill>
+                <a:srgbClr val="FFFF00"/>
+              </a:solidFill>
+            </a:endParaRPr>
+          </a:p>
+          <a:p>
+            <a:pPr lvl="1"/>
+            <a:r>
+              <a:rPr lang="en-US" dirty="0"/>
+              <a:t>The 200 OK response will have an empty body</a:t>
+            </a:r>
+          </a:p>
+          <a:p>
+            <a:pPr lvl="1"/>
+            <a:r>
+              <a:rPr lang="en-US" dirty="0"/>
+              <a:t>The </a:t>
+            </a:r>
+            <a:r>
+              <a:rPr lang="en-US" dirty="0" err="1"/>
+              <a:t>DevNet</a:t>
+            </a:r>
+            <a:r>
+              <a:rPr lang="en-US" dirty="0"/>
+              <a:t> Sandbox does not allow POST/PUT operations</a:t>
+            </a:r>
+          </a:p>
+          <a:p>
+            <a:pPr lvl="1"/>
+            <a:r>
+              <a:rPr lang="en-US" dirty="0"/>
+              <a:t>A live APIC will return JSON data with new Tenant details</a:t>
+            </a:r>
+          </a:p>
+          <a:p>
+            <a:pPr marL="0" indent="0">
+              <a:buNone/>
+            </a:pPr>
+            <a:endParaRPr lang="en-US" dirty="0"/>
+          </a:p>
+        </p:txBody>
+      </p:sp>
+      <p:sp>
+        <p:nvSpPr>
+          <p:cNvPr id="4" name="Date Placeholder 3">
+            <a:extLst>
+              <a:ext uri="{FF2B5EF4-FFF2-40B4-BE49-F238E27FC236}">
+                <a16:creationId xmlns:a16="http://schemas.microsoft.com/office/drawing/2014/main" id="{D7D9528C-333D-BF4A-844C-7BCC7757E858}"/>
+              </a:ext>
+            </a:extLst>
+          </p:cNvPr>
+          <p:cNvSpPr>
+            <a:spLocks noGrp="1"/>
+          </p:cNvSpPr>
+          <p:nvPr>
+            <p:ph type="dt" sz="half" idx="10"/>
+          </p:nvPr>
+        </p:nvSpPr>
+        <p:spPr/>
+        <p:txBody>
+          <a:bodyPr/>
+          <a:lstStyle/>
+          <a:p>
+            <a:r>
+              <a:rPr lang="en-US"/>
+              <a:t>World Wide Technology ©</a:t>
+            </a:r>
+            <a:endParaRPr lang="en-US" dirty="0"/>
+          </a:p>
+        </p:txBody>
+      </p:sp>
+      <p:sp>
+        <p:nvSpPr>
+          <p:cNvPr id="5" name="Slide Number Placeholder 4">
+            <a:extLst>
+              <a:ext uri="{FF2B5EF4-FFF2-40B4-BE49-F238E27FC236}">
+                <a16:creationId xmlns:a16="http://schemas.microsoft.com/office/drawing/2014/main" id="{0798D1A2-1CD4-4A47-A0BC-C1215D1CD611}"/>
+              </a:ext>
+            </a:extLst>
+          </p:cNvPr>
+          <p:cNvSpPr>
+            <a:spLocks noGrp="1"/>
+          </p:cNvSpPr>
+          <p:nvPr>
+            <p:ph type="sldNum" sz="quarter" idx="12"/>
+          </p:nvPr>
+        </p:nvSpPr>
+        <p:spPr/>
+        <p:txBody>
+          <a:bodyPr/>
+          <a:lstStyle/>
+          <a:p>
+            <a:fld id="{A44B02FA-DD2D-1844-AE35-8B2EAB0CF4EF}" type="slidenum">
+              <a:rPr lang="en-US" smtClean="0"/>
+              <a:pPr/>
+              <a:t>61</a:t>
+            </a:fld>
+            <a:endParaRPr lang="en-US" dirty="0"/>
           </a:p>
         </p:txBody>
       </p:sp>
     </p:spTree>
     <p:extLst>
       <p:ext uri="{BB962C8B-B14F-4D97-AF65-F5344CB8AC3E}">
-        <p14:creationId xmlns:p14="http://schemas.microsoft.com/office/powerpoint/2010/main" val="4218248441"/>
+        <p14:creationId xmlns:p14="http://schemas.microsoft.com/office/powerpoint/2010/main" val="1189830946"/>
       </p:ext>
     </p:extLst>
   </p:cSld>
@@ -42914,125 +43360,10 @@
       </p:grpSpPr>
       <p:sp>
         <p:nvSpPr>
-          <p:cNvPr id="2" name="Title 1">
-            <a:extLst>
-              <a:ext uri="{FF2B5EF4-FFF2-40B4-BE49-F238E27FC236}">
-                <a16:creationId xmlns:a16="http://schemas.microsoft.com/office/drawing/2014/main" id="{EB7C4089-1746-624B-8E73-D3DAB8E88CDD}"/>
-              </a:ext>
-            </a:extLst>
-          </p:cNvPr>
-          <p:cNvSpPr>
-            <a:spLocks noGrp="1"/>
-          </p:cNvSpPr>
-          <p:nvPr>
-            <p:ph type="title"/>
-          </p:nvPr>
-        </p:nvSpPr>
-        <p:spPr/>
-        <p:txBody>
-          <a:bodyPr/>
-          <a:lstStyle/>
-          <a:p>
-            <a:r>
-              <a:rPr lang="en-US" dirty="0"/>
-              <a:t>Outline</a:t>
-            </a:r>
-          </a:p>
-        </p:txBody>
-      </p:sp>
-      <p:sp>
-        <p:nvSpPr>
-          <p:cNvPr id="3" name="Content Placeholder 2">
-            <a:extLst>
-              <a:ext uri="{FF2B5EF4-FFF2-40B4-BE49-F238E27FC236}">
-                <a16:creationId xmlns:a16="http://schemas.microsoft.com/office/drawing/2014/main" id="{65426B10-0364-A849-B3A4-1D0DA409155A}"/>
-              </a:ext>
-            </a:extLst>
-          </p:cNvPr>
-          <p:cNvSpPr>
-            <a:spLocks noGrp="1"/>
-          </p:cNvSpPr>
-          <p:nvPr>
-            <p:ph idx="1"/>
-          </p:nvPr>
-        </p:nvSpPr>
-        <p:spPr/>
-        <p:txBody>
-          <a:bodyPr/>
-          <a:lstStyle/>
-          <a:p>
-            <a:r>
-              <a:rPr lang="en-US" dirty="0"/>
-              <a:t>For each of these platforms:</a:t>
-            </a:r>
-          </a:p>
-          <a:p>
-            <a:pPr lvl="1"/>
-            <a:r>
-              <a:rPr lang="en-US" dirty="0"/>
-              <a:t>ACI</a:t>
-            </a:r>
-          </a:p>
-          <a:p>
-            <a:pPr lvl="1"/>
-            <a:r>
-              <a:rPr lang="en-US" dirty="0"/>
-              <a:t>DNAC</a:t>
-            </a:r>
-          </a:p>
-          <a:p>
-            <a:pPr lvl="1"/>
-            <a:r>
-              <a:rPr lang="en-US" dirty="0"/>
-              <a:t>Meraki</a:t>
-            </a:r>
-          </a:p>
-          <a:p>
-            <a:pPr lvl="1"/>
-            <a:r>
-              <a:rPr lang="en-US" dirty="0" err="1"/>
-              <a:t>Webex</a:t>
-            </a:r>
-            <a:r>
-              <a:rPr lang="en-US" dirty="0"/>
-              <a:t> Teams</a:t>
-            </a:r>
-          </a:p>
-          <a:p>
-            <a:r>
-              <a:rPr lang="en-US" dirty="0"/>
-              <a:t>Perform the following tasks:</a:t>
-            </a:r>
-          </a:p>
-          <a:p>
-            <a:pPr lvl="1"/>
-            <a:r>
-              <a:rPr lang="en-US" dirty="0"/>
-              <a:t>Review authentication methodology</a:t>
-            </a:r>
-          </a:p>
-          <a:p>
-            <a:pPr lvl="1"/>
-            <a:r>
-              <a:rPr lang="en-US" dirty="0"/>
-              <a:t>Build Python scripts to authenticate</a:t>
-            </a:r>
-          </a:p>
-          <a:p>
-            <a:pPr lvl="1"/>
-            <a:r>
-              <a:rPr lang="en-US" dirty="0"/>
-              <a:t>Build Python scripts to read/write data</a:t>
-            </a:r>
-          </a:p>
-        </p:txBody>
-      </p:sp>
-      <p:sp>
-        <p:nvSpPr>
           <p:cNvPr id="4" name="Date Placeholder 3">
             <a:extLst>
               <a:ext uri="{FF2B5EF4-FFF2-40B4-BE49-F238E27FC236}">
-                <a16:creationId xmlns:a16="http://schemas.microsoft.com/office/drawing/2014/main" id="{7ECEAF79-F4AC-E94E-9E55-220D0D396924}"/>
+                <a16:creationId xmlns:a16="http://schemas.microsoft.com/office/drawing/2014/main" id="{0CD670A9-B06A-3448-BABA-FAD627500859}"/>
               </a:ext>
             </a:extLst>
           </p:cNvPr>
@@ -43061,7 +43392,7 @@
           <p:cNvPr id="5" name="Slide Number Placeholder 4">
             <a:extLst>
               <a:ext uri="{FF2B5EF4-FFF2-40B4-BE49-F238E27FC236}">
-                <a16:creationId xmlns:a16="http://schemas.microsoft.com/office/drawing/2014/main" id="{372DC1A4-CE8B-DB4A-8F86-2508518C35D3}"/>
+                <a16:creationId xmlns:a16="http://schemas.microsoft.com/office/drawing/2014/main" id="{119DACAD-17C1-C249-A498-C4A1A1ADD334}"/>
               </a:ext>
             </a:extLst>
           </p:cNvPr>
@@ -43089,7 +43420,7 @@
     </p:spTree>
     <p:extLst>
       <p:ext uri="{BB962C8B-B14F-4D97-AF65-F5344CB8AC3E}">
-        <p14:creationId xmlns:p14="http://schemas.microsoft.com/office/powerpoint/2010/main" val="232106193"/>
+        <p14:creationId xmlns:p14="http://schemas.microsoft.com/office/powerpoint/2010/main" val="920448738"/>
       </p:ext>
     </p:extLst>
   </p:cSld>
@@ -43133,7 +43464,7 @@
           <p:cNvPr id="2" name="Title 1">
             <a:extLst>
               <a:ext uri="{FF2B5EF4-FFF2-40B4-BE49-F238E27FC236}">
-                <a16:creationId xmlns:a16="http://schemas.microsoft.com/office/drawing/2014/main" id="{9D8D6E4C-FC36-3E4C-9387-96DD20072D9D}"/>
+                <a16:creationId xmlns:a16="http://schemas.microsoft.com/office/drawing/2014/main" id="{9B4DF7CD-7263-9840-AE80-6F1B7FA6AF3C}"/>
               </a:ext>
             </a:extLst>
           </p:cNvPr>
@@ -43141,32 +43472,35 @@
             <a:spLocks noGrp="1"/>
           </p:cNvSpPr>
           <p:nvPr>
-            <p:ph type="ctrTitle"/>
+            <p:ph type="title"/>
           </p:nvPr>
         </p:nvSpPr>
-        <p:spPr>
-          <a:xfrm>
-            <a:off x="1524000" y="914013"/>
-            <a:ext cx="9144000" cy="2387600"/>
-          </a:xfrm>
-        </p:spPr>
+        <p:spPr/>
         <p:txBody>
           <a:bodyPr/>
           <a:lstStyle/>
           <a:p>
             <a:r>
               <a:rPr lang="en-US" dirty="0"/>
-              <a:t>Part VII</a:t>
+              <a:t>Python – </a:t>
+            </a:r>
+            <a:r>
+              <a:rPr lang="en-US" dirty="0" err="1"/>
+              <a:t>DevNet</a:t>
+            </a:r>
+            <a:r>
+              <a:rPr lang="en-US" dirty="0"/>
+              <a:t> Always-On ACI Sandbox</a:t>
             </a:r>
           </a:p>
         </p:txBody>
       </p:sp>
       <p:sp>
         <p:nvSpPr>
-          <p:cNvPr id="3" name="Subtitle 2">
+          <p:cNvPr id="3" name="Content Placeholder 2">
             <a:extLst>
               <a:ext uri="{FF2B5EF4-FFF2-40B4-BE49-F238E27FC236}">
-                <a16:creationId xmlns:a16="http://schemas.microsoft.com/office/drawing/2014/main" id="{0451A0DE-9D64-5A48-94B5-5B4E42709819}"/>
+                <a16:creationId xmlns:a16="http://schemas.microsoft.com/office/drawing/2014/main" id="{A610A140-16FE-F54F-9766-D3A50E4E4F0B}"/>
               </a:ext>
             </a:extLst>
           </p:cNvPr>
@@ -43174,30 +43508,426 @@
             <a:spLocks noGrp="1"/>
           </p:cNvSpPr>
           <p:nvPr>
-            <p:ph type="subTitle" idx="1"/>
+            <p:ph idx="1"/>
           </p:nvPr>
         </p:nvSpPr>
-        <p:spPr>
-          <a:xfrm>
-            <a:off x="1524000" y="3393688"/>
-            <a:ext cx="9144000" cy="1655762"/>
-          </a:xfrm>
-        </p:spPr>
+        <p:spPr/>
+        <p:txBody>
+          <a:bodyPr>
+            <a:normAutofit/>
+          </a:bodyPr>
+          <a:lstStyle/>
+          <a:p>
+            <a:r>
+              <a:rPr lang="en-US" dirty="0"/>
+              <a:t>Step 1 – Authenticate &amp; retrieve a session token</a:t>
+            </a:r>
+          </a:p>
+          <a:p>
+            <a:pPr marL="457200" lvl="1" indent="0">
+              <a:buNone/>
+            </a:pPr>
+            <a:r>
+              <a:rPr lang="en-US" b="1" i="1" dirty="0">
+                <a:solidFill>
+                  <a:srgbClr val="FFFF00"/>
+                </a:solidFill>
+              </a:rPr>
+              <a:t>import requests</a:t>
+            </a:r>
+          </a:p>
+          <a:p>
+            <a:pPr marL="457200" lvl="1" indent="0">
+              <a:buNone/>
+            </a:pPr>
+            <a:r>
+              <a:rPr lang="en-US" b="1" i="1" dirty="0">
+                <a:solidFill>
+                  <a:srgbClr val="FFFF00"/>
+                </a:solidFill>
+              </a:rPr>
+              <a:t>requests.packages.urllib3.disable_warnings()</a:t>
+            </a:r>
+            <a:r>
+              <a:rPr lang="en-US" b="1" i="1" dirty="0"/>
+              <a:t> # disable insecure SSL warnings</a:t>
+            </a:r>
+          </a:p>
+          <a:p>
+            <a:pPr marL="457200" lvl="1" indent="0">
+              <a:buNone/>
+            </a:pPr>
+            <a:r>
+              <a:rPr lang="en-US" b="1" i="1" dirty="0" err="1">
+                <a:solidFill>
+                  <a:srgbClr val="FFFF00"/>
+                </a:solidFill>
+              </a:rPr>
+              <a:t>url</a:t>
+            </a:r>
+            <a:r>
+              <a:rPr lang="en-US" b="1" i="1" dirty="0">
+                <a:solidFill>
+                  <a:srgbClr val="FFFF00"/>
+                </a:solidFill>
+              </a:rPr>
+              <a:t> = 'https://</a:t>
+            </a:r>
+            <a:r>
+              <a:rPr lang="en-US" b="1" i="1" dirty="0" err="1">
+                <a:solidFill>
+                  <a:srgbClr val="FFFF00"/>
+                </a:solidFill>
+              </a:rPr>
+              <a:t>sandboxapicdc.cisco.com</a:t>
+            </a:r>
+            <a:r>
+              <a:rPr lang="en-US" b="1" i="1" dirty="0">
+                <a:solidFill>
+                  <a:srgbClr val="FFFF00"/>
+                </a:solidFill>
+              </a:rPr>
+              <a:t>/</a:t>
+            </a:r>
+            <a:r>
+              <a:rPr lang="en-US" b="1" i="1" dirty="0" err="1">
+                <a:solidFill>
+                  <a:srgbClr val="FFFF00"/>
+                </a:solidFill>
+              </a:rPr>
+              <a:t>api</a:t>
+            </a:r>
+            <a:r>
+              <a:rPr lang="en-US" b="1" i="1" dirty="0">
+                <a:solidFill>
+                  <a:srgbClr val="FFFF00"/>
+                </a:solidFill>
+              </a:rPr>
+              <a:t>/</a:t>
+            </a:r>
+            <a:r>
+              <a:rPr lang="en-US" b="1" i="1" dirty="0" err="1">
+                <a:solidFill>
+                  <a:srgbClr val="FFFF00"/>
+                </a:solidFill>
+              </a:rPr>
+              <a:t>aaaLogin.json</a:t>
+            </a:r>
+            <a:r>
+              <a:rPr lang="en-US" b="1" i="1" dirty="0">
+                <a:solidFill>
+                  <a:srgbClr val="FFFF00"/>
+                </a:solidFill>
+              </a:rPr>
+              <a:t>'</a:t>
+            </a:r>
+          </a:p>
+          <a:p>
+            <a:pPr marL="457200" lvl="1" indent="0">
+              <a:buNone/>
+            </a:pPr>
+            <a:r>
+              <a:rPr lang="en-US" b="1" i="1" dirty="0" err="1">
+                <a:solidFill>
+                  <a:srgbClr val="FFFF00"/>
+                </a:solidFill>
+              </a:rPr>
+              <a:t>json_data</a:t>
+            </a:r>
+            <a:r>
+              <a:rPr lang="en-US" b="1" i="1" dirty="0">
+                <a:solidFill>
+                  <a:srgbClr val="FFFF00"/>
+                </a:solidFill>
+              </a:rPr>
+              <a:t> = {'</a:t>
+            </a:r>
+            <a:r>
+              <a:rPr lang="en-US" b="1" i="1" dirty="0" err="1">
+                <a:solidFill>
+                  <a:srgbClr val="FFFF00"/>
+                </a:solidFill>
+              </a:rPr>
+              <a:t>aaaUser</a:t>
+            </a:r>
+            <a:r>
+              <a:rPr lang="en-US" b="1" i="1" dirty="0">
+                <a:solidFill>
+                  <a:srgbClr val="FFFF00"/>
+                </a:solidFill>
+              </a:rPr>
+              <a:t>':{'attributes':{'</a:t>
+            </a:r>
+            <a:r>
+              <a:rPr lang="en-US" b="1" i="1" dirty="0" err="1">
+                <a:solidFill>
+                  <a:srgbClr val="FFFF00"/>
+                </a:solidFill>
+              </a:rPr>
+              <a:t>name':'admin</a:t>
+            </a:r>
+            <a:r>
+              <a:rPr lang="en-US" b="1" i="1" dirty="0">
+                <a:solidFill>
+                  <a:srgbClr val="FFFF00"/>
+                </a:solidFill>
+              </a:rPr>
+              <a:t>', '</a:t>
+            </a:r>
+            <a:r>
+              <a:rPr lang="en-US" b="1" i="1" dirty="0" err="1">
+                <a:solidFill>
+                  <a:srgbClr val="FFFF00"/>
+                </a:solidFill>
+              </a:rPr>
+              <a:t>pwd</a:t>
+            </a:r>
+            <a:r>
+              <a:rPr lang="en-US" b="1" i="1" dirty="0">
+                <a:solidFill>
+                  <a:srgbClr val="FFFF00"/>
+                </a:solidFill>
+              </a:rPr>
+              <a:t>':'</a:t>
+            </a:r>
+            <a:r>
+              <a:rPr lang="en-US" b="1" i="1" dirty="0" err="1">
+                <a:solidFill>
+                  <a:srgbClr val="FFFF00"/>
+                </a:solidFill>
+              </a:rPr>
+              <a:t>ciscopsdt</a:t>
+            </a:r>
+            <a:r>
+              <a:rPr lang="en-US" b="1" i="1" dirty="0">
+                <a:solidFill>
+                  <a:srgbClr val="FFFF00"/>
+                </a:solidFill>
+              </a:rPr>
+              <a:t>'}}}</a:t>
+            </a:r>
+          </a:p>
+          <a:p>
+            <a:pPr marL="457200" lvl="1" indent="0">
+              <a:buNone/>
+            </a:pPr>
+            <a:r>
+              <a:rPr lang="en-US" b="1" i="1" dirty="0">
+                <a:solidFill>
+                  <a:srgbClr val="FFFF00"/>
+                </a:solidFill>
+              </a:rPr>
+              <a:t>session = </a:t>
+            </a:r>
+            <a:r>
+              <a:rPr lang="en-US" b="1" i="1" dirty="0" err="1">
+                <a:solidFill>
+                  <a:srgbClr val="FFFF00"/>
+                </a:solidFill>
+              </a:rPr>
+              <a:t>requests.session</a:t>
+            </a:r>
+            <a:r>
+              <a:rPr lang="en-US" b="1" i="1" dirty="0">
+                <a:solidFill>
+                  <a:srgbClr val="FFFF00"/>
+                </a:solidFill>
+              </a:rPr>
+              <a:t>()</a:t>
+            </a:r>
+          </a:p>
+          <a:p>
+            <a:pPr marL="457200" lvl="1" indent="0">
+              <a:buNone/>
+            </a:pPr>
+            <a:r>
+              <a:rPr lang="en-US" b="1" i="1" dirty="0" err="1">
+                <a:solidFill>
+                  <a:srgbClr val="FFFF00"/>
+                </a:solidFill>
+              </a:rPr>
+              <a:t>session.verify</a:t>
+            </a:r>
+            <a:r>
+              <a:rPr lang="en-US" b="1" i="1" dirty="0">
+                <a:solidFill>
+                  <a:srgbClr val="FFFF00"/>
+                </a:solidFill>
+              </a:rPr>
+              <a:t> = False</a:t>
+            </a:r>
+            <a:r>
+              <a:rPr lang="en-US" b="1" i="1" dirty="0"/>
+              <a:t> # To permit self-signed certificates</a:t>
+            </a:r>
+          </a:p>
+          <a:p>
+            <a:pPr marL="457200" lvl="1" indent="0">
+              <a:buNone/>
+            </a:pPr>
+            <a:r>
+              <a:rPr lang="en-US" b="1" i="1" dirty="0">
+                <a:solidFill>
+                  <a:srgbClr val="FFFF00"/>
+                </a:solidFill>
+              </a:rPr>
+              <a:t>response = </a:t>
+            </a:r>
+            <a:r>
+              <a:rPr lang="en-US" b="1" i="1" dirty="0" err="1">
+                <a:solidFill>
+                  <a:srgbClr val="FFFF00"/>
+                </a:solidFill>
+              </a:rPr>
+              <a:t>session.post</a:t>
+            </a:r>
+            <a:r>
+              <a:rPr lang="en-US" b="1" i="1" dirty="0">
+                <a:solidFill>
+                  <a:srgbClr val="FFFF00"/>
+                </a:solidFill>
+              </a:rPr>
+              <a:t>(</a:t>
+            </a:r>
+            <a:r>
+              <a:rPr lang="en-US" b="1" i="1" dirty="0" err="1">
+                <a:solidFill>
+                  <a:srgbClr val="FFFF00"/>
+                </a:solidFill>
+              </a:rPr>
+              <a:t>url</a:t>
+            </a:r>
+            <a:r>
+              <a:rPr lang="en-US" b="1" i="1" dirty="0">
+                <a:solidFill>
+                  <a:srgbClr val="FFFF00"/>
+                </a:solidFill>
+              </a:rPr>
+              <a:t>, json=</a:t>
+            </a:r>
+            <a:r>
+              <a:rPr lang="en-US" b="1" i="1" dirty="0" err="1">
+                <a:solidFill>
+                  <a:srgbClr val="FFFF00"/>
+                </a:solidFill>
+              </a:rPr>
+              <a:t>json_data</a:t>
+            </a:r>
+            <a:r>
+              <a:rPr lang="en-US" b="1" i="1" dirty="0">
+                <a:solidFill>
+                  <a:srgbClr val="FFFF00"/>
+                </a:solidFill>
+              </a:rPr>
+              <a:t>)</a:t>
+            </a:r>
+          </a:p>
+          <a:p>
+            <a:pPr marL="457200" lvl="1" indent="0">
+              <a:buNone/>
+            </a:pPr>
+            <a:r>
+              <a:rPr lang="en-US" b="1" i="1" dirty="0" err="1">
+                <a:solidFill>
+                  <a:srgbClr val="FFFF00"/>
+                </a:solidFill>
+              </a:rPr>
+              <a:t>response.cookies</a:t>
+            </a:r>
+            <a:r>
+              <a:rPr lang="en-US" b="1" i="1" dirty="0">
+                <a:solidFill>
+                  <a:srgbClr val="FFFF00"/>
+                </a:solidFill>
+              </a:rPr>
+              <a:t>, </a:t>
+            </a:r>
+            <a:r>
+              <a:rPr lang="en-US" b="1" i="1" dirty="0" err="1">
+                <a:solidFill>
+                  <a:srgbClr val="FFFF00"/>
+                </a:solidFill>
+              </a:rPr>
+              <a:t>response.json</a:t>
+            </a:r>
+            <a:r>
+              <a:rPr lang="en-US" b="1" i="1" dirty="0">
+                <a:solidFill>
+                  <a:srgbClr val="FFFF00"/>
+                </a:solidFill>
+              </a:rPr>
+              <a:t>() </a:t>
+            </a:r>
+            <a:r>
+              <a:rPr lang="en-US" b="1" i="1" dirty="0"/>
+              <a:t># two options to display the session token</a:t>
+            </a:r>
+          </a:p>
+        </p:txBody>
+      </p:sp>
+      <p:sp>
+        <p:nvSpPr>
+          <p:cNvPr id="4" name="Date Placeholder 3">
+            <a:extLst>
+              <a:ext uri="{FF2B5EF4-FFF2-40B4-BE49-F238E27FC236}">
+                <a16:creationId xmlns:a16="http://schemas.microsoft.com/office/drawing/2014/main" id="{D7D9528C-333D-BF4A-844C-7BCC7757E858}"/>
+              </a:ext>
+            </a:extLst>
+          </p:cNvPr>
+          <p:cNvSpPr>
+            <a:spLocks noGrp="1"/>
+          </p:cNvSpPr>
+          <p:nvPr>
+            <p:ph type="dt" sz="half" idx="10"/>
+          </p:nvPr>
+        </p:nvSpPr>
+        <p:spPr/>
         <p:txBody>
           <a:bodyPr/>
           <a:lstStyle/>
           <a:p>
             <a:r>
-              <a:rPr lang="en-US" dirty="0"/>
-              <a:t>Quiz, Practice Resources, &amp; References</a:t>
-            </a:r>
+              <a:rPr lang="en-US"/>
+              <a:t>World Wide Technology ©</a:t>
+            </a:r>
+            <a:endParaRPr lang="en-US" dirty="0"/>
+          </a:p>
+        </p:txBody>
+      </p:sp>
+      <p:sp>
+        <p:nvSpPr>
+          <p:cNvPr id="5" name="Slide Number Placeholder 4">
+            <a:extLst>
+              <a:ext uri="{FF2B5EF4-FFF2-40B4-BE49-F238E27FC236}">
+                <a16:creationId xmlns:a16="http://schemas.microsoft.com/office/drawing/2014/main" id="{0798D1A2-1CD4-4A47-A0BC-C1215D1CD611}"/>
+              </a:ext>
+            </a:extLst>
+          </p:cNvPr>
+          <p:cNvSpPr>
+            <a:spLocks noGrp="1"/>
+          </p:cNvSpPr>
+          <p:nvPr>
+            <p:ph type="sldNum" sz="quarter" idx="12"/>
+          </p:nvPr>
+        </p:nvSpPr>
+        <p:spPr/>
+        <p:txBody>
+          <a:bodyPr/>
+          <a:lstStyle/>
+          <a:p>
+            <a:fld id="{A44B02FA-DD2D-1844-AE35-8B2EAB0CF4EF}" type="slidenum">
+              <a:rPr lang="en-US" smtClean="0"/>
+              <a:pPr/>
+              <a:t>63</a:t>
+            </a:fld>
+            <a:endParaRPr lang="en-US" dirty="0"/>
           </a:p>
         </p:txBody>
       </p:sp>
     </p:spTree>
     <p:extLst>
       <p:ext uri="{BB962C8B-B14F-4D97-AF65-F5344CB8AC3E}">
-        <p14:creationId xmlns:p14="http://schemas.microsoft.com/office/powerpoint/2010/main" val="3392886013"/>
+        <p14:creationId xmlns:p14="http://schemas.microsoft.com/office/powerpoint/2010/main" val="4035971623"/>
       </p:ext>
     </p:extLst>
   </p:cSld>
@@ -43238,66 +43968,10 @@
       </p:grpSpPr>
       <p:sp>
         <p:nvSpPr>
-          <p:cNvPr id="2" name="Title 1">
-            <a:extLst>
-              <a:ext uri="{FF2B5EF4-FFF2-40B4-BE49-F238E27FC236}">
-                <a16:creationId xmlns:a16="http://schemas.microsoft.com/office/drawing/2014/main" id="{EB7C4089-1746-624B-8E73-D3DAB8E88CDD}"/>
-              </a:ext>
-            </a:extLst>
-          </p:cNvPr>
-          <p:cNvSpPr>
-            <a:spLocks noGrp="1"/>
-          </p:cNvSpPr>
-          <p:nvPr>
-            <p:ph type="title"/>
-          </p:nvPr>
-        </p:nvSpPr>
-        <p:spPr/>
-        <p:txBody>
-          <a:bodyPr/>
-          <a:lstStyle/>
-          <a:p>
-            <a:r>
-              <a:rPr lang="en-US" dirty="0"/>
-              <a:t>Slide Template</a:t>
-            </a:r>
-          </a:p>
-        </p:txBody>
-      </p:sp>
-      <p:sp>
-        <p:nvSpPr>
-          <p:cNvPr id="3" name="Content Placeholder 2">
-            <a:extLst>
-              <a:ext uri="{FF2B5EF4-FFF2-40B4-BE49-F238E27FC236}">
-                <a16:creationId xmlns:a16="http://schemas.microsoft.com/office/drawing/2014/main" id="{65426B10-0364-A849-B3A4-1D0DA409155A}"/>
-              </a:ext>
-            </a:extLst>
-          </p:cNvPr>
-          <p:cNvSpPr>
-            <a:spLocks noGrp="1"/>
-          </p:cNvSpPr>
-          <p:nvPr>
-            <p:ph idx="1"/>
-          </p:nvPr>
-        </p:nvSpPr>
-        <p:spPr/>
-        <p:txBody>
-          <a:bodyPr/>
-          <a:lstStyle/>
-          <a:p>
-            <a:r>
-              <a:rPr lang="en-US" dirty="0"/>
-              <a:t>Body template</a:t>
-            </a:r>
-          </a:p>
-        </p:txBody>
-      </p:sp>
-      <p:sp>
-        <p:nvSpPr>
           <p:cNvPr id="4" name="Date Placeholder 3">
             <a:extLst>
               <a:ext uri="{FF2B5EF4-FFF2-40B4-BE49-F238E27FC236}">
-                <a16:creationId xmlns:a16="http://schemas.microsoft.com/office/drawing/2014/main" id="{7ECEAF79-F4AC-E94E-9E55-220D0D396924}"/>
+                <a16:creationId xmlns:a16="http://schemas.microsoft.com/office/drawing/2014/main" id="{0CD670A9-B06A-3448-BABA-FAD627500859}"/>
               </a:ext>
             </a:extLst>
           </p:cNvPr>
@@ -43326,7 +44000,7 @@
           <p:cNvPr id="5" name="Slide Number Placeholder 4">
             <a:extLst>
               <a:ext uri="{FF2B5EF4-FFF2-40B4-BE49-F238E27FC236}">
-                <a16:creationId xmlns:a16="http://schemas.microsoft.com/office/drawing/2014/main" id="{372DC1A4-CE8B-DB4A-8F86-2508518C35D3}"/>
+                <a16:creationId xmlns:a16="http://schemas.microsoft.com/office/drawing/2014/main" id="{119DACAD-17C1-C249-A498-C4A1A1ADD334}"/>
               </a:ext>
             </a:extLst>
           </p:cNvPr>
@@ -43354,7 +44028,7 @@
     </p:spTree>
     <p:extLst>
       <p:ext uri="{BB962C8B-B14F-4D97-AF65-F5344CB8AC3E}">
-        <p14:creationId xmlns:p14="http://schemas.microsoft.com/office/powerpoint/2010/main" val="2709408928"/>
+        <p14:creationId xmlns:p14="http://schemas.microsoft.com/office/powerpoint/2010/main" val="345542901"/>
       </p:ext>
     </p:extLst>
   </p:cSld>
@@ -43398,7 +44072,7 @@
           <p:cNvPr id="2" name="Title 1">
             <a:extLst>
               <a:ext uri="{FF2B5EF4-FFF2-40B4-BE49-F238E27FC236}">
-                <a16:creationId xmlns:a16="http://schemas.microsoft.com/office/drawing/2014/main" id="{EB7C4089-1746-624B-8E73-D3DAB8E88CDD}"/>
+                <a16:creationId xmlns:a16="http://schemas.microsoft.com/office/drawing/2014/main" id="{9B4DF7CD-7263-9840-AE80-6F1B7FA6AF3C}"/>
               </a:ext>
             </a:extLst>
           </p:cNvPr>
@@ -43416,7 +44090,15 @@
           <a:p>
             <a:r>
               <a:rPr lang="en-US" dirty="0"/>
-              <a:t>References</a:t>
+              <a:t>Python – </a:t>
+            </a:r>
+            <a:r>
+              <a:rPr lang="en-US" dirty="0" err="1"/>
+              <a:t>DevNet</a:t>
+            </a:r>
+            <a:r>
+              <a:rPr lang="en-US" dirty="0"/>
+              <a:t> Always-On ACI Sandbox</a:t>
             </a:r>
           </a:p>
         </p:txBody>
@@ -43426,7 +44108,7 @@
           <p:cNvPr id="3" name="Content Placeholder 2">
             <a:extLst>
               <a:ext uri="{FF2B5EF4-FFF2-40B4-BE49-F238E27FC236}">
-                <a16:creationId xmlns:a16="http://schemas.microsoft.com/office/drawing/2014/main" id="{65426B10-0364-A849-B3A4-1D0DA409155A}"/>
+                <a16:creationId xmlns:a16="http://schemas.microsoft.com/office/drawing/2014/main" id="{A610A140-16FE-F54F-9766-D3A50E4E4F0B}"/>
               </a:ext>
             </a:extLst>
           </p:cNvPr>
@@ -43437,85 +44119,175 @@
             <p:ph idx="1"/>
           </p:nvPr>
         </p:nvSpPr>
-        <p:spPr/>
+        <p:spPr>
+          <a:xfrm>
+            <a:off x="838200" y="1825625"/>
+            <a:ext cx="10782782" cy="4351338"/>
+          </a:xfrm>
+        </p:spPr>
         <p:txBody>
           <a:bodyPr>
-            <a:normAutofit fontScale="92500"/>
+            <a:normAutofit/>
           </a:bodyPr>
           <a:lstStyle/>
           <a:p>
             <a:r>
-              <a:rPr lang="en-US" dirty="0">
-                <a:hlinkClick r:id="rId2"/>
-              </a:rPr>
-              <a:t>https://www.linkedin.com/pulse/why-rest-api-so-popular-mangesh-bulkar/</a:t>
-            </a:r>
-            <a:endParaRPr lang="en-US" dirty="0">
-              <a:hlinkClick r:id="rId3"/>
+              <a:rPr lang="en-US" dirty="0"/>
+              <a:t>Step 2 – Store the session token in a variable</a:t>
+            </a:r>
+          </a:p>
+          <a:p>
+            <a:pPr marL="457200" lvl="1" indent="0">
+              <a:buNone/>
+            </a:pPr>
+            <a:r>
+              <a:rPr lang="en-US" b="1" i="1" dirty="0">
+                <a:solidFill>
+                  <a:srgbClr val="FFFF00"/>
+                </a:solidFill>
+              </a:rPr>
+              <a:t>token = </a:t>
+            </a:r>
+            <a:r>
+              <a:rPr lang="en-US" b="1" i="1" dirty="0" err="1">
+                <a:solidFill>
+                  <a:srgbClr val="FFFF00"/>
+                </a:solidFill>
+              </a:rPr>
+              <a:t>session.cookies</a:t>
+            </a:r>
+            <a:r>
+              <a:rPr lang="en-US" b="1" i="1" dirty="0">
+                <a:solidFill>
+                  <a:srgbClr val="FFFF00"/>
+                </a:solidFill>
+              </a:rPr>
+              <a:t>['APIC-cookie'] </a:t>
+            </a:r>
+            <a:r>
+              <a:rPr lang="en-US" b="1" i="1" dirty="0"/>
+              <a:t># option1</a:t>
+            </a:r>
+          </a:p>
+          <a:p>
+            <a:pPr marL="457200" lvl="1" indent="0">
+              <a:buNone/>
+            </a:pPr>
+            <a:r>
+              <a:rPr lang="en-US" b="1" i="1" dirty="0">
+                <a:solidFill>
+                  <a:srgbClr val="FFFF00"/>
+                </a:solidFill>
+              </a:rPr>
+              <a:t>token = </a:t>
+            </a:r>
+            <a:r>
+              <a:rPr lang="en-US" b="1" i="1" dirty="0" err="1">
+                <a:solidFill>
+                  <a:srgbClr val="FFFF00"/>
+                </a:solidFill>
+              </a:rPr>
+              <a:t>response.json</a:t>
+            </a:r>
+            <a:r>
+              <a:rPr lang="en-US" b="1" i="1" dirty="0">
+                <a:solidFill>
+                  <a:srgbClr val="FFFF00"/>
+                </a:solidFill>
+              </a:rPr>
+              <a:t>()['</a:t>
+            </a:r>
+            <a:r>
+              <a:rPr lang="en-US" b="1" i="1" dirty="0" err="1">
+                <a:solidFill>
+                  <a:srgbClr val="FFFF00"/>
+                </a:solidFill>
+              </a:rPr>
+              <a:t>imdata</a:t>
+            </a:r>
+            <a:r>
+              <a:rPr lang="en-US" b="1" i="1" dirty="0">
+                <a:solidFill>
+                  <a:srgbClr val="FFFF00"/>
+                </a:solidFill>
+              </a:rPr>
+              <a:t>'][0]['</a:t>
+            </a:r>
+            <a:r>
+              <a:rPr lang="en-US" b="1" i="1" dirty="0" err="1">
+                <a:solidFill>
+                  <a:srgbClr val="FFFF00"/>
+                </a:solidFill>
+              </a:rPr>
+              <a:t>aaaLogin</a:t>
+            </a:r>
+            <a:r>
+              <a:rPr lang="en-US" b="1" i="1" dirty="0">
+                <a:solidFill>
+                  <a:srgbClr val="FFFF00"/>
+                </a:solidFill>
+              </a:rPr>
+              <a:t>']['attributes']['token'] </a:t>
+            </a:r>
+            <a:r>
+              <a:rPr lang="en-US" b="1" i="1" dirty="0"/>
+              <a:t># option2</a:t>
+            </a:r>
+          </a:p>
+          <a:p>
+            <a:pPr marL="457200" lvl="1" indent="0">
+              <a:buNone/>
+            </a:pPr>
+            <a:r>
+              <a:rPr lang="en-US" b="1" i="1" dirty="0" err="1">
+                <a:solidFill>
+                  <a:srgbClr val="FFFF00"/>
+                </a:solidFill>
+              </a:rPr>
+              <a:t>session_cookie</a:t>
+            </a:r>
+            <a:r>
+              <a:rPr lang="en-US" b="1" i="1" dirty="0">
+                <a:solidFill>
+                  <a:srgbClr val="FFFF00"/>
+                </a:solidFill>
+              </a:rPr>
+              <a:t> = {'</a:t>
+            </a:r>
+            <a:r>
+              <a:rPr lang="en-US" b="1" i="1" dirty="0" err="1">
+                <a:solidFill>
+                  <a:srgbClr val="FFFF00"/>
+                </a:solidFill>
+              </a:rPr>
+              <a:t>APIC-Cookie':token</a:t>
+            </a:r>
+            <a:r>
+              <a:rPr lang="en-US" b="1" i="1" dirty="0">
+                <a:solidFill>
+                  <a:srgbClr val="FFFF00"/>
+                </a:solidFill>
+              </a:rPr>
+              <a:t>}</a:t>
+            </a:r>
+          </a:p>
+          <a:p>
+            <a:pPr marL="457200" lvl="1" indent="0">
+              <a:buNone/>
+            </a:pPr>
+            <a:r>
+              <a:rPr lang="en-US" b="1" i="1" dirty="0" err="1">
+                <a:solidFill>
+                  <a:srgbClr val="FFFF00"/>
+                </a:solidFill>
+              </a:rPr>
+              <a:t>session_cookie</a:t>
+            </a:r>
+            <a:endParaRPr lang="en-US" b="1" i="1" dirty="0">
+              <a:solidFill>
+                <a:srgbClr val="FFFF00"/>
+              </a:solidFill>
             </a:endParaRPr>
-          </a:p>
-          <a:p>
-            <a:r>
-              <a:rPr lang="en-US" dirty="0">
-                <a:hlinkClick r:id="rId3"/>
-              </a:rPr>
-              <a:t>https://en.wikipedia.org/wiki/CURL</a:t>
-            </a:r>
-            <a:endParaRPr lang="en-US" dirty="0"/>
-          </a:p>
-          <a:p>
-            <a:r>
-              <a:rPr lang="en-US" dirty="0">
-                <a:hlinkClick r:id="rId4"/>
-              </a:rPr>
-              <a:t>https://en.wikipedia.org/wiki/Requests_%28software%29</a:t>
-            </a:r>
-            <a:endParaRPr lang="en-US" dirty="0"/>
-          </a:p>
-          <a:p>
-            <a:r>
-              <a:rPr lang="en-US" dirty="0">
-                <a:hlinkClick r:id="rId5"/>
-              </a:rPr>
-              <a:t>https://curl.haxx.se</a:t>
-            </a:r>
-            <a:endParaRPr lang="en-US" dirty="0"/>
-          </a:p>
-          <a:p>
-            <a:r>
-              <a:rPr lang="en-US" dirty="0">
-                <a:hlinkClick r:id="rId6"/>
-              </a:rPr>
-              <a:t>https://requests.readthedocs.io/en/master/</a:t>
-            </a:r>
-            <a:endParaRPr lang="en-US" dirty="0"/>
-          </a:p>
-          <a:p>
-            <a:r>
-              <a:rPr lang="en-US" dirty="0">
-                <a:hlinkClick r:id="rId7"/>
-              </a:rPr>
-              <a:t>https://2.python-requests.org/en/master/api/#requests.Response</a:t>
-            </a:r>
-            <a:endParaRPr lang="en-US" dirty="0"/>
-          </a:p>
-          <a:p>
-            <a:r>
-              <a:rPr lang="en-US" dirty="0"/>
-              <a:t>Cisco API documentation #1</a:t>
-            </a:r>
-          </a:p>
-          <a:p>
-            <a:r>
-              <a:rPr lang="en-US" dirty="0"/>
-              <a:t>Cisco API documentation #2</a:t>
-            </a:r>
-          </a:p>
-          <a:p>
-            <a:r>
-              <a:rPr lang="en-US" dirty="0"/>
-              <a:t>Cisco API documentation #3</a:t>
-            </a:r>
           </a:p>
         </p:txBody>
       </p:sp>
@@ -43524,7 +44296,7 @@
           <p:cNvPr id="4" name="Date Placeholder 3">
             <a:extLst>
               <a:ext uri="{FF2B5EF4-FFF2-40B4-BE49-F238E27FC236}">
-                <a16:creationId xmlns:a16="http://schemas.microsoft.com/office/drawing/2014/main" id="{7ECEAF79-F4AC-E94E-9E55-220D0D396924}"/>
+                <a16:creationId xmlns:a16="http://schemas.microsoft.com/office/drawing/2014/main" id="{D7D9528C-333D-BF4A-844C-7BCC7757E858}"/>
               </a:ext>
             </a:extLst>
           </p:cNvPr>
@@ -43553,7 +44325,7 @@
           <p:cNvPr id="5" name="Slide Number Placeholder 4">
             <a:extLst>
               <a:ext uri="{FF2B5EF4-FFF2-40B4-BE49-F238E27FC236}">
-                <a16:creationId xmlns:a16="http://schemas.microsoft.com/office/drawing/2014/main" id="{372DC1A4-CE8B-DB4A-8F86-2508518C35D3}"/>
+                <a16:creationId xmlns:a16="http://schemas.microsoft.com/office/drawing/2014/main" id="{0798D1A2-1CD4-4A47-A0BC-C1215D1CD611}"/>
               </a:ext>
             </a:extLst>
           </p:cNvPr>
@@ -43581,7 +44353,7 @@
     </p:spTree>
     <p:extLst>
       <p:ext uri="{BB962C8B-B14F-4D97-AF65-F5344CB8AC3E}">
-        <p14:creationId xmlns:p14="http://schemas.microsoft.com/office/powerpoint/2010/main" val="3225595977"/>
+        <p14:creationId xmlns:p14="http://schemas.microsoft.com/office/powerpoint/2010/main" val="2559491654"/>
       </p:ext>
     </p:extLst>
   </p:cSld>
@@ -43682,7 +44454,953 @@
     </p:spTree>
     <p:extLst>
       <p:ext uri="{BB962C8B-B14F-4D97-AF65-F5344CB8AC3E}">
-        <p14:creationId xmlns:p14="http://schemas.microsoft.com/office/powerpoint/2010/main" val="756638364"/>
+        <p14:creationId xmlns:p14="http://schemas.microsoft.com/office/powerpoint/2010/main" val="1193617147"/>
+      </p:ext>
+    </p:extLst>
+  </p:cSld>
+  <p:clrMapOvr>
+    <a:masterClrMapping/>
+  </p:clrMapOvr>
+  <mc:AlternateContent xmlns:mc="http://schemas.openxmlformats.org/markup-compatibility/2006" xmlns:p14="http://schemas.microsoft.com/office/powerpoint/2010/main">
+    <mc:Choice Requires="p14">
+      <p:transition spd="med" p14:dur="700">
+        <p:fade/>
+      </p:transition>
+    </mc:Choice>
+    <mc:Fallback xmlns="">
+      <p:transition spd="med">
+        <p:fade/>
+      </p:transition>
+    </mc:Fallback>
+  </mc:AlternateContent>
+</p:sld>
+</file>
+
+<file path=ppt/slides/slide67.xml><?xml version="1.0" encoding="utf-8"?>
+<p:sld xmlns:a="http://schemas.openxmlformats.org/drawingml/2006/main" xmlns:r="http://schemas.openxmlformats.org/officeDocument/2006/relationships" xmlns:p="http://schemas.openxmlformats.org/presentationml/2006/main">
+  <p:cSld>
+    <p:spTree>
+      <p:nvGrpSpPr>
+        <p:cNvPr id="1" name=""/>
+        <p:cNvGrpSpPr/>
+        <p:nvPr/>
+      </p:nvGrpSpPr>
+      <p:grpSpPr>
+        <a:xfrm>
+          <a:off x="0" y="0"/>
+          <a:ext cx="0" cy="0"/>
+          <a:chOff x="0" y="0"/>
+          <a:chExt cx="0" cy="0"/>
+        </a:xfrm>
+      </p:grpSpPr>
+      <p:sp>
+        <p:nvSpPr>
+          <p:cNvPr id="2" name="Title 1">
+            <a:extLst>
+              <a:ext uri="{FF2B5EF4-FFF2-40B4-BE49-F238E27FC236}">
+                <a16:creationId xmlns:a16="http://schemas.microsoft.com/office/drawing/2014/main" id="{9B4DF7CD-7263-9840-AE80-6F1B7FA6AF3C}"/>
+              </a:ext>
+            </a:extLst>
+          </p:cNvPr>
+          <p:cNvSpPr>
+            <a:spLocks noGrp="1"/>
+          </p:cNvSpPr>
+          <p:nvPr>
+            <p:ph type="title"/>
+          </p:nvPr>
+        </p:nvSpPr>
+        <p:spPr/>
+        <p:txBody>
+          <a:bodyPr/>
+          <a:lstStyle/>
+          <a:p>
+            <a:r>
+              <a:rPr lang="en-US" dirty="0"/>
+              <a:t>Python – </a:t>
+            </a:r>
+            <a:r>
+              <a:rPr lang="en-US" dirty="0" err="1"/>
+              <a:t>DevNet</a:t>
+            </a:r>
+            <a:r>
+              <a:rPr lang="en-US" dirty="0"/>
+              <a:t> Always-On ACI Sandbox</a:t>
+            </a:r>
+          </a:p>
+        </p:txBody>
+      </p:sp>
+      <p:sp>
+        <p:nvSpPr>
+          <p:cNvPr id="3" name="Content Placeholder 2">
+            <a:extLst>
+              <a:ext uri="{FF2B5EF4-FFF2-40B4-BE49-F238E27FC236}">
+                <a16:creationId xmlns:a16="http://schemas.microsoft.com/office/drawing/2014/main" id="{A610A140-16FE-F54F-9766-D3A50E4E4F0B}"/>
+              </a:ext>
+            </a:extLst>
+          </p:cNvPr>
+          <p:cNvSpPr>
+            <a:spLocks noGrp="1"/>
+          </p:cNvSpPr>
+          <p:nvPr>
+            <p:ph idx="1"/>
+          </p:nvPr>
+        </p:nvSpPr>
+        <p:spPr>
+          <a:xfrm>
+            <a:off x="838200" y="1825625"/>
+            <a:ext cx="10782782" cy="4351338"/>
+          </a:xfrm>
+        </p:spPr>
+        <p:txBody>
+          <a:bodyPr>
+            <a:normAutofit/>
+          </a:bodyPr>
+          <a:lstStyle/>
+          <a:p>
+            <a:r>
+              <a:rPr lang="en-US" dirty="0"/>
+              <a:t>Step 3 – Get a list of APIC Tenants with the stored token</a:t>
+            </a:r>
+          </a:p>
+          <a:p>
+            <a:pPr marL="457200" lvl="1" indent="0">
+              <a:buNone/>
+            </a:pPr>
+            <a:r>
+              <a:rPr lang="en-US" b="1" i="1" dirty="0" err="1">
+                <a:solidFill>
+                  <a:srgbClr val="FFFF00"/>
+                </a:solidFill>
+              </a:rPr>
+              <a:t>get_url</a:t>
+            </a:r>
+            <a:r>
+              <a:rPr lang="en-US" b="1" i="1" dirty="0">
+                <a:solidFill>
+                  <a:srgbClr val="FFFF00"/>
+                </a:solidFill>
+              </a:rPr>
+              <a:t> = 'https://</a:t>
+            </a:r>
+            <a:r>
+              <a:rPr lang="en-US" b="1" i="1" dirty="0" err="1">
+                <a:solidFill>
+                  <a:srgbClr val="FFFF00"/>
+                </a:solidFill>
+              </a:rPr>
+              <a:t>sandboxapicdc.cisco.com</a:t>
+            </a:r>
+            <a:r>
+              <a:rPr lang="en-US" b="1" i="1" dirty="0">
+                <a:solidFill>
+                  <a:srgbClr val="FFFF00"/>
+                </a:solidFill>
+              </a:rPr>
+              <a:t>/</a:t>
+            </a:r>
+            <a:r>
+              <a:rPr lang="en-US" b="1" i="1" dirty="0" err="1">
+                <a:solidFill>
+                  <a:srgbClr val="FFFF00"/>
+                </a:solidFill>
+              </a:rPr>
+              <a:t>api</a:t>
+            </a:r>
+            <a:r>
+              <a:rPr lang="en-US" b="1" i="1" dirty="0">
+                <a:solidFill>
+                  <a:srgbClr val="FFFF00"/>
+                </a:solidFill>
+              </a:rPr>
+              <a:t>/node/class/</a:t>
+            </a:r>
+            <a:r>
+              <a:rPr lang="en-US" b="1" i="1" dirty="0" err="1">
+                <a:solidFill>
+                  <a:srgbClr val="FFFF00"/>
+                </a:solidFill>
+              </a:rPr>
+              <a:t>fvTenant.json</a:t>
+            </a:r>
+            <a:r>
+              <a:rPr lang="en-US" b="1" i="1" dirty="0">
+                <a:solidFill>
+                  <a:srgbClr val="FFFF00"/>
+                </a:solidFill>
+              </a:rPr>
+              <a:t>'</a:t>
+            </a:r>
+          </a:p>
+          <a:p>
+            <a:pPr marL="457200" lvl="1" indent="0">
+              <a:buNone/>
+            </a:pPr>
+            <a:r>
+              <a:rPr lang="en-US" b="1" i="1" dirty="0" err="1">
+                <a:solidFill>
+                  <a:srgbClr val="FFFF00"/>
+                </a:solidFill>
+              </a:rPr>
+              <a:t>get_response</a:t>
+            </a:r>
+            <a:r>
+              <a:rPr lang="en-US" b="1" i="1" dirty="0">
+                <a:solidFill>
+                  <a:srgbClr val="FFFF00"/>
+                </a:solidFill>
+              </a:rPr>
+              <a:t> = </a:t>
+            </a:r>
+            <a:r>
+              <a:rPr lang="en-US" b="1" i="1" dirty="0" err="1">
+                <a:solidFill>
+                  <a:srgbClr val="FFFF00"/>
+                </a:solidFill>
+              </a:rPr>
+              <a:t>session.get</a:t>
+            </a:r>
+            <a:r>
+              <a:rPr lang="en-US" b="1" i="1" dirty="0">
+                <a:solidFill>
+                  <a:srgbClr val="FFFF00"/>
+                </a:solidFill>
+              </a:rPr>
+              <a:t>(</a:t>
+            </a:r>
+            <a:r>
+              <a:rPr lang="en-US" b="1" i="1" dirty="0" err="1">
+                <a:solidFill>
+                  <a:srgbClr val="FFFF00"/>
+                </a:solidFill>
+              </a:rPr>
+              <a:t>get_url</a:t>
+            </a:r>
+            <a:r>
+              <a:rPr lang="en-US" b="1" i="1" dirty="0">
+                <a:solidFill>
+                  <a:srgbClr val="FFFF00"/>
+                </a:solidFill>
+              </a:rPr>
+              <a:t>, cookies=</a:t>
+            </a:r>
+            <a:r>
+              <a:rPr lang="en-US" b="1" i="1" dirty="0" err="1">
+                <a:solidFill>
+                  <a:srgbClr val="FFFF00"/>
+                </a:solidFill>
+              </a:rPr>
+              <a:t>session_cookie</a:t>
+            </a:r>
+            <a:r>
+              <a:rPr lang="en-US" b="1" i="1" dirty="0">
+                <a:solidFill>
+                  <a:srgbClr val="FFFF00"/>
+                </a:solidFill>
+              </a:rPr>
+              <a:t>)</a:t>
+            </a:r>
+          </a:p>
+          <a:p>
+            <a:pPr marL="457200" lvl="1" indent="0">
+              <a:buNone/>
+            </a:pPr>
+            <a:r>
+              <a:rPr lang="en-US" b="1" i="1" dirty="0" err="1">
+                <a:solidFill>
+                  <a:srgbClr val="FFFF00"/>
+                </a:solidFill>
+              </a:rPr>
+              <a:t>get_response.json</a:t>
+            </a:r>
+            <a:r>
+              <a:rPr lang="en-US" b="1" i="1" dirty="0">
+                <a:solidFill>
+                  <a:srgbClr val="FFFF00"/>
+                </a:solidFill>
+              </a:rPr>
+              <a:t>() </a:t>
+            </a:r>
+            <a:r>
+              <a:rPr lang="en-US" b="1" i="1" dirty="0"/>
+              <a:t># display all tenants</a:t>
+            </a:r>
+          </a:p>
+          <a:p>
+            <a:pPr marL="457200" lvl="1" indent="0">
+              <a:buNone/>
+            </a:pPr>
+            <a:r>
+              <a:rPr lang="en-US" b="1" i="1" dirty="0" err="1">
+                <a:solidFill>
+                  <a:srgbClr val="FFFF00"/>
+                </a:solidFill>
+              </a:rPr>
+              <a:t>get_response.json</a:t>
+            </a:r>
+            <a:r>
+              <a:rPr lang="en-US" b="1" i="1" dirty="0">
+                <a:solidFill>
+                  <a:srgbClr val="FFFF00"/>
+                </a:solidFill>
+              </a:rPr>
+              <a:t>()['</a:t>
+            </a:r>
+            <a:r>
+              <a:rPr lang="en-US" b="1" i="1" dirty="0" err="1">
+                <a:solidFill>
+                  <a:srgbClr val="FFFF00"/>
+                </a:solidFill>
+              </a:rPr>
+              <a:t>imdata</a:t>
+            </a:r>
+            <a:r>
+              <a:rPr lang="en-US" b="1" i="1" dirty="0">
+                <a:solidFill>
+                  <a:srgbClr val="FFFF00"/>
+                </a:solidFill>
+              </a:rPr>
+              <a:t>'][0] </a:t>
+            </a:r>
+            <a:r>
+              <a:rPr lang="en-US" b="1" i="1" dirty="0"/>
+              <a:t>#display the first tenant in the response</a:t>
+            </a:r>
+          </a:p>
+        </p:txBody>
+      </p:sp>
+      <p:sp>
+        <p:nvSpPr>
+          <p:cNvPr id="4" name="Date Placeholder 3">
+            <a:extLst>
+              <a:ext uri="{FF2B5EF4-FFF2-40B4-BE49-F238E27FC236}">
+                <a16:creationId xmlns:a16="http://schemas.microsoft.com/office/drawing/2014/main" id="{D7D9528C-333D-BF4A-844C-7BCC7757E858}"/>
+              </a:ext>
+            </a:extLst>
+          </p:cNvPr>
+          <p:cNvSpPr>
+            <a:spLocks noGrp="1"/>
+          </p:cNvSpPr>
+          <p:nvPr>
+            <p:ph type="dt" sz="half" idx="10"/>
+          </p:nvPr>
+        </p:nvSpPr>
+        <p:spPr/>
+        <p:txBody>
+          <a:bodyPr/>
+          <a:lstStyle/>
+          <a:p>
+            <a:r>
+              <a:rPr lang="en-US"/>
+              <a:t>World Wide Technology ©</a:t>
+            </a:r>
+            <a:endParaRPr lang="en-US" dirty="0"/>
+          </a:p>
+        </p:txBody>
+      </p:sp>
+      <p:sp>
+        <p:nvSpPr>
+          <p:cNvPr id="5" name="Slide Number Placeholder 4">
+            <a:extLst>
+              <a:ext uri="{FF2B5EF4-FFF2-40B4-BE49-F238E27FC236}">
+                <a16:creationId xmlns:a16="http://schemas.microsoft.com/office/drawing/2014/main" id="{0798D1A2-1CD4-4A47-A0BC-C1215D1CD611}"/>
+              </a:ext>
+            </a:extLst>
+          </p:cNvPr>
+          <p:cNvSpPr>
+            <a:spLocks noGrp="1"/>
+          </p:cNvSpPr>
+          <p:nvPr>
+            <p:ph type="sldNum" sz="quarter" idx="12"/>
+          </p:nvPr>
+        </p:nvSpPr>
+        <p:spPr/>
+        <p:txBody>
+          <a:bodyPr/>
+          <a:lstStyle/>
+          <a:p>
+            <a:fld id="{A44B02FA-DD2D-1844-AE35-8B2EAB0CF4EF}" type="slidenum">
+              <a:rPr lang="en-US" smtClean="0"/>
+              <a:pPr/>
+              <a:t>67</a:t>
+            </a:fld>
+            <a:endParaRPr lang="en-US" dirty="0"/>
+          </a:p>
+        </p:txBody>
+      </p:sp>
+    </p:spTree>
+    <p:extLst>
+      <p:ext uri="{BB962C8B-B14F-4D97-AF65-F5344CB8AC3E}">
+        <p14:creationId xmlns:p14="http://schemas.microsoft.com/office/powerpoint/2010/main" val="3001644796"/>
+      </p:ext>
+    </p:extLst>
+  </p:cSld>
+  <p:clrMapOvr>
+    <a:masterClrMapping/>
+  </p:clrMapOvr>
+  <mc:AlternateContent xmlns:mc="http://schemas.openxmlformats.org/markup-compatibility/2006" xmlns:p14="http://schemas.microsoft.com/office/powerpoint/2010/main">
+    <mc:Choice Requires="p14">
+      <p:transition spd="med" p14:dur="700">
+        <p:fade/>
+      </p:transition>
+    </mc:Choice>
+    <mc:Fallback xmlns="">
+      <p:transition spd="med">
+        <p:fade/>
+      </p:transition>
+    </mc:Fallback>
+  </mc:AlternateContent>
+</p:sld>
+</file>
+
+<file path=ppt/slides/slide68.xml><?xml version="1.0" encoding="utf-8"?>
+<p:sld xmlns:a="http://schemas.openxmlformats.org/drawingml/2006/main" xmlns:r="http://schemas.openxmlformats.org/officeDocument/2006/relationships" xmlns:p="http://schemas.openxmlformats.org/presentationml/2006/main">
+  <p:cSld>
+    <p:spTree>
+      <p:nvGrpSpPr>
+        <p:cNvPr id="1" name=""/>
+        <p:cNvGrpSpPr/>
+        <p:nvPr/>
+      </p:nvGrpSpPr>
+      <p:grpSpPr>
+        <a:xfrm>
+          <a:off x="0" y="0"/>
+          <a:ext cx="0" cy="0"/>
+          <a:chOff x="0" y="0"/>
+          <a:chExt cx="0" cy="0"/>
+        </a:xfrm>
+      </p:grpSpPr>
+      <p:sp>
+        <p:nvSpPr>
+          <p:cNvPr id="4" name="Date Placeholder 3">
+            <a:extLst>
+              <a:ext uri="{FF2B5EF4-FFF2-40B4-BE49-F238E27FC236}">
+                <a16:creationId xmlns:a16="http://schemas.microsoft.com/office/drawing/2014/main" id="{0CD670A9-B06A-3448-BABA-FAD627500859}"/>
+              </a:ext>
+            </a:extLst>
+          </p:cNvPr>
+          <p:cNvSpPr>
+            <a:spLocks noGrp="1"/>
+          </p:cNvSpPr>
+          <p:nvPr>
+            <p:ph type="dt" sz="half" idx="10"/>
+          </p:nvPr>
+        </p:nvSpPr>
+        <p:spPr/>
+        <p:txBody>
+          <a:bodyPr/>
+          <a:lstStyle/>
+          <a:p>
+            <a:r>
+              <a:rPr lang="en-US"/>
+              <a:t>World Wide Technology ©</a:t>
+            </a:r>
+            <a:endParaRPr lang="en-US" dirty="0"/>
+          </a:p>
+        </p:txBody>
+      </p:sp>
+      <p:sp>
+        <p:nvSpPr>
+          <p:cNvPr id="5" name="Slide Number Placeholder 4">
+            <a:extLst>
+              <a:ext uri="{FF2B5EF4-FFF2-40B4-BE49-F238E27FC236}">
+                <a16:creationId xmlns:a16="http://schemas.microsoft.com/office/drawing/2014/main" id="{119DACAD-17C1-C249-A498-C4A1A1ADD334}"/>
+              </a:ext>
+            </a:extLst>
+          </p:cNvPr>
+          <p:cNvSpPr>
+            <a:spLocks noGrp="1"/>
+          </p:cNvSpPr>
+          <p:nvPr>
+            <p:ph type="sldNum" sz="quarter" idx="12"/>
+          </p:nvPr>
+        </p:nvSpPr>
+        <p:spPr/>
+        <p:txBody>
+          <a:bodyPr/>
+          <a:lstStyle/>
+          <a:p>
+            <a:fld id="{A44B02FA-DD2D-1844-AE35-8B2EAB0CF4EF}" type="slidenum">
+              <a:rPr lang="en-US" smtClean="0"/>
+              <a:pPr/>
+              <a:t>68</a:t>
+            </a:fld>
+            <a:endParaRPr lang="en-US" dirty="0"/>
+          </a:p>
+        </p:txBody>
+      </p:sp>
+    </p:spTree>
+    <p:extLst>
+      <p:ext uri="{BB962C8B-B14F-4D97-AF65-F5344CB8AC3E}">
+        <p14:creationId xmlns:p14="http://schemas.microsoft.com/office/powerpoint/2010/main" val="475655133"/>
+      </p:ext>
+    </p:extLst>
+  </p:cSld>
+  <p:clrMapOvr>
+    <a:masterClrMapping/>
+  </p:clrMapOvr>
+  <mc:AlternateContent xmlns:mc="http://schemas.openxmlformats.org/markup-compatibility/2006" xmlns:p14="http://schemas.microsoft.com/office/powerpoint/2010/main">
+    <mc:Choice Requires="p14">
+      <p:transition spd="med" p14:dur="700">
+        <p:fade/>
+      </p:transition>
+    </mc:Choice>
+    <mc:Fallback xmlns="">
+      <p:transition spd="med">
+        <p:fade/>
+      </p:transition>
+    </mc:Fallback>
+  </mc:AlternateContent>
+</p:sld>
+</file>
+
+<file path=ppt/slides/slide69.xml><?xml version="1.0" encoding="utf-8"?>
+<p:sld xmlns:a="http://schemas.openxmlformats.org/drawingml/2006/main" xmlns:r="http://schemas.openxmlformats.org/officeDocument/2006/relationships" xmlns:p="http://schemas.openxmlformats.org/presentationml/2006/main">
+  <p:cSld>
+    <p:spTree>
+      <p:nvGrpSpPr>
+        <p:cNvPr id="1" name=""/>
+        <p:cNvGrpSpPr/>
+        <p:nvPr/>
+      </p:nvGrpSpPr>
+      <p:grpSpPr>
+        <a:xfrm>
+          <a:off x="0" y="0"/>
+          <a:ext cx="0" cy="0"/>
+          <a:chOff x="0" y="0"/>
+          <a:chExt cx="0" cy="0"/>
+        </a:xfrm>
+      </p:grpSpPr>
+      <p:sp>
+        <p:nvSpPr>
+          <p:cNvPr id="2" name="Title 1">
+            <a:extLst>
+              <a:ext uri="{FF2B5EF4-FFF2-40B4-BE49-F238E27FC236}">
+                <a16:creationId xmlns:a16="http://schemas.microsoft.com/office/drawing/2014/main" id="{9B4DF7CD-7263-9840-AE80-6F1B7FA6AF3C}"/>
+              </a:ext>
+            </a:extLst>
+          </p:cNvPr>
+          <p:cNvSpPr>
+            <a:spLocks noGrp="1"/>
+          </p:cNvSpPr>
+          <p:nvPr>
+            <p:ph type="title"/>
+          </p:nvPr>
+        </p:nvSpPr>
+        <p:spPr/>
+        <p:txBody>
+          <a:bodyPr/>
+          <a:lstStyle/>
+          <a:p>
+            <a:r>
+              <a:rPr lang="en-US" dirty="0"/>
+              <a:t>Python – </a:t>
+            </a:r>
+            <a:r>
+              <a:rPr lang="en-US" dirty="0" err="1"/>
+              <a:t>DevNet</a:t>
+            </a:r>
+            <a:r>
+              <a:rPr lang="en-US" dirty="0"/>
+              <a:t> Always-On ACI Sandbox</a:t>
+            </a:r>
+          </a:p>
+        </p:txBody>
+      </p:sp>
+      <p:sp>
+        <p:nvSpPr>
+          <p:cNvPr id="3" name="Content Placeholder 2">
+            <a:extLst>
+              <a:ext uri="{FF2B5EF4-FFF2-40B4-BE49-F238E27FC236}">
+                <a16:creationId xmlns:a16="http://schemas.microsoft.com/office/drawing/2014/main" id="{A610A140-16FE-F54F-9766-D3A50E4E4F0B}"/>
+              </a:ext>
+            </a:extLst>
+          </p:cNvPr>
+          <p:cNvSpPr>
+            <a:spLocks noGrp="1"/>
+          </p:cNvSpPr>
+          <p:nvPr>
+            <p:ph idx="1"/>
+          </p:nvPr>
+        </p:nvSpPr>
+        <p:spPr>
+          <a:xfrm>
+            <a:off x="838200" y="1825625"/>
+            <a:ext cx="11049000" cy="4351338"/>
+          </a:xfrm>
+        </p:spPr>
+        <p:txBody>
+          <a:bodyPr>
+            <a:normAutofit/>
+          </a:bodyPr>
+          <a:lstStyle/>
+          <a:p>
+            <a:r>
+              <a:rPr lang="en-US" dirty="0"/>
+              <a:t>Step 4 – Create a new Tenant</a:t>
+            </a:r>
+          </a:p>
+          <a:p>
+            <a:pPr marL="457200" lvl="1" indent="0">
+              <a:buNone/>
+            </a:pPr>
+            <a:r>
+              <a:rPr lang="en-US" b="1" i="1" dirty="0" err="1">
+                <a:solidFill>
+                  <a:srgbClr val="FFFF00"/>
+                </a:solidFill>
+              </a:rPr>
+              <a:t>new_tenant</a:t>
+            </a:r>
+            <a:r>
+              <a:rPr lang="en-US" b="1" i="1" dirty="0">
+                <a:solidFill>
+                  <a:srgbClr val="FFFF00"/>
+                </a:solidFill>
+              </a:rPr>
+              <a:t> = {'</a:t>
+            </a:r>
+            <a:r>
+              <a:rPr lang="en-US" b="1" i="1" dirty="0" err="1">
+                <a:solidFill>
+                  <a:srgbClr val="FFFF00"/>
+                </a:solidFill>
+              </a:rPr>
+              <a:t>fvTenant</a:t>
+            </a:r>
+            <a:r>
+              <a:rPr lang="en-US" b="1" i="1" dirty="0">
+                <a:solidFill>
+                  <a:srgbClr val="FFFF00"/>
+                </a:solidFill>
+              </a:rPr>
+              <a:t>':{'attributes':{'name':'</a:t>
+            </a:r>
+            <a:r>
+              <a:rPr lang="en-US" b="1" i="1" dirty="0" err="1">
+                <a:solidFill>
+                  <a:srgbClr val="FFFF00"/>
+                </a:solidFill>
+              </a:rPr>
+              <a:t>my_new_tenant</a:t>
+            </a:r>
+            <a:r>
+              <a:rPr lang="en-US" b="1" i="1" dirty="0">
+                <a:solidFill>
+                  <a:srgbClr val="FFFF00"/>
+                </a:solidFill>
+              </a:rPr>
+              <a:t>'}}}</a:t>
+            </a:r>
+          </a:p>
+          <a:p>
+            <a:pPr marL="457200" lvl="1" indent="0">
+              <a:buNone/>
+            </a:pPr>
+            <a:r>
+              <a:rPr lang="en-US" b="1" i="1" dirty="0" err="1">
+                <a:solidFill>
+                  <a:srgbClr val="FFFF00"/>
+                </a:solidFill>
+              </a:rPr>
+              <a:t>post_url</a:t>
+            </a:r>
+            <a:r>
+              <a:rPr lang="en-US" b="1" i="1" dirty="0">
+                <a:solidFill>
+                  <a:srgbClr val="FFFF00"/>
+                </a:solidFill>
+              </a:rPr>
+              <a:t> = 'https://</a:t>
+            </a:r>
+            <a:r>
+              <a:rPr lang="en-US" b="1" i="1" dirty="0" err="1">
+                <a:solidFill>
+                  <a:srgbClr val="FFFF00"/>
+                </a:solidFill>
+              </a:rPr>
+              <a:t>sandboxapicdc.cisco.com</a:t>
+            </a:r>
+            <a:r>
+              <a:rPr lang="en-US" b="1" i="1" dirty="0">
+                <a:solidFill>
+                  <a:srgbClr val="FFFF00"/>
+                </a:solidFill>
+              </a:rPr>
+              <a:t>/</a:t>
+            </a:r>
+            <a:r>
+              <a:rPr lang="en-US" b="1" i="1" dirty="0" err="1">
+                <a:solidFill>
+                  <a:srgbClr val="FFFF00"/>
+                </a:solidFill>
+              </a:rPr>
+              <a:t>api</a:t>
+            </a:r>
+            <a:r>
+              <a:rPr lang="en-US" b="1" i="1" dirty="0">
+                <a:solidFill>
+                  <a:srgbClr val="FFFF00"/>
+                </a:solidFill>
+              </a:rPr>
+              <a:t>/</a:t>
+            </a:r>
+            <a:r>
+              <a:rPr lang="en-US" b="1" i="1" dirty="0" err="1">
+                <a:solidFill>
+                  <a:srgbClr val="FFFF00"/>
+                </a:solidFill>
+              </a:rPr>
+              <a:t>mo</a:t>
+            </a:r>
+            <a:r>
+              <a:rPr lang="en-US" b="1" i="1" dirty="0">
+                <a:solidFill>
+                  <a:srgbClr val="FFFF00"/>
+                </a:solidFill>
+              </a:rPr>
+              <a:t>/</a:t>
+            </a:r>
+            <a:r>
+              <a:rPr lang="en-US" b="1" i="1" dirty="0" err="1">
+                <a:solidFill>
+                  <a:srgbClr val="FFFF00"/>
+                </a:solidFill>
+              </a:rPr>
+              <a:t>uni.json</a:t>
+            </a:r>
+            <a:r>
+              <a:rPr lang="en-US" b="1" i="1" dirty="0">
+                <a:solidFill>
+                  <a:srgbClr val="FFFF00"/>
+                </a:solidFill>
+              </a:rPr>
+              <a:t>'</a:t>
+            </a:r>
+          </a:p>
+          <a:p>
+            <a:pPr marL="457200" lvl="1" indent="0">
+              <a:buNone/>
+            </a:pPr>
+            <a:r>
+              <a:rPr lang="en-US" b="1" i="1" dirty="0" err="1">
+                <a:solidFill>
+                  <a:srgbClr val="FFFF00"/>
+                </a:solidFill>
+              </a:rPr>
+              <a:t>post_response</a:t>
+            </a:r>
+            <a:r>
+              <a:rPr lang="en-US" b="1" i="1" dirty="0">
+                <a:solidFill>
+                  <a:srgbClr val="FFFF00"/>
+                </a:solidFill>
+              </a:rPr>
+              <a:t> = </a:t>
+            </a:r>
+            <a:r>
+              <a:rPr lang="en-US" b="1" i="1" dirty="0" err="1">
+                <a:solidFill>
+                  <a:srgbClr val="FFFF00"/>
+                </a:solidFill>
+              </a:rPr>
+              <a:t>session.post</a:t>
+            </a:r>
+            <a:r>
+              <a:rPr lang="en-US" b="1" i="1" dirty="0">
+                <a:solidFill>
+                  <a:srgbClr val="FFFF00"/>
+                </a:solidFill>
+              </a:rPr>
+              <a:t>(</a:t>
+            </a:r>
+            <a:r>
+              <a:rPr lang="en-US" b="1" i="1" dirty="0" err="1">
+                <a:solidFill>
+                  <a:srgbClr val="FFFF00"/>
+                </a:solidFill>
+              </a:rPr>
+              <a:t>post_url</a:t>
+            </a:r>
+            <a:r>
+              <a:rPr lang="en-US" b="1" i="1" dirty="0">
+                <a:solidFill>
+                  <a:srgbClr val="FFFF00"/>
+                </a:solidFill>
+              </a:rPr>
+              <a:t>, json=</a:t>
+            </a:r>
+            <a:r>
+              <a:rPr lang="en-US" b="1" i="1" dirty="0" err="1">
+                <a:solidFill>
+                  <a:srgbClr val="FFFF00"/>
+                </a:solidFill>
+              </a:rPr>
+              <a:t>new_tenant</a:t>
+            </a:r>
+            <a:r>
+              <a:rPr lang="en-US" b="1" i="1" dirty="0">
+                <a:solidFill>
+                  <a:srgbClr val="FFFF00"/>
+                </a:solidFill>
+              </a:rPr>
+              <a:t>, cookies=</a:t>
+            </a:r>
+            <a:r>
+              <a:rPr lang="en-US" b="1" i="1" dirty="0" err="1">
+                <a:solidFill>
+                  <a:srgbClr val="FFFF00"/>
+                </a:solidFill>
+              </a:rPr>
+              <a:t>session_cookie</a:t>
+            </a:r>
+            <a:r>
+              <a:rPr lang="en-US" b="1" i="1" dirty="0">
+                <a:solidFill>
+                  <a:srgbClr val="FFFF00"/>
+                </a:solidFill>
+              </a:rPr>
+              <a:t>)</a:t>
+            </a:r>
+          </a:p>
+          <a:p>
+            <a:pPr marL="457200" lvl="1" indent="0">
+              <a:buNone/>
+            </a:pPr>
+            <a:r>
+              <a:rPr lang="en-US" b="1" i="1" dirty="0">
+                <a:solidFill>
+                  <a:srgbClr val="FFFF00"/>
+                </a:solidFill>
+              </a:rPr>
+              <a:t>print(f'{</a:t>
+            </a:r>
+            <a:r>
+              <a:rPr lang="en-US" b="1" i="1" dirty="0" err="1">
+                <a:solidFill>
+                  <a:srgbClr val="FFFF00"/>
+                </a:solidFill>
+              </a:rPr>
+              <a:t>post_response.status_code</a:t>
+            </a:r>
+            <a:r>
+              <a:rPr lang="en-US" b="1" i="1" dirty="0">
+                <a:solidFill>
+                  <a:srgbClr val="FFFF00"/>
+                </a:solidFill>
+              </a:rPr>
+              <a:t>} {</a:t>
+            </a:r>
+            <a:r>
+              <a:rPr lang="en-US" b="1" i="1" dirty="0" err="1">
+                <a:solidFill>
+                  <a:srgbClr val="FFFF00"/>
+                </a:solidFill>
+              </a:rPr>
+              <a:t>post_response.reason</a:t>
+            </a:r>
+            <a:r>
+              <a:rPr lang="en-US" b="1" i="1" dirty="0">
+                <a:solidFill>
+                  <a:srgbClr val="FFFF00"/>
+                </a:solidFill>
+              </a:rPr>
+              <a:t>}’)</a:t>
+            </a:r>
+          </a:p>
+          <a:p>
+            <a:pPr marL="457200" lvl="1" indent="0">
+              <a:buNone/>
+            </a:pPr>
+            <a:r>
+              <a:rPr lang="en-US" b="1" i="1" dirty="0">
+                <a:solidFill>
+                  <a:srgbClr val="FFFF00"/>
+                </a:solidFill>
+              </a:rPr>
+              <a:t>print(</a:t>
+            </a:r>
+            <a:r>
+              <a:rPr lang="en-US" b="1" i="1" dirty="0" err="1">
+                <a:solidFill>
+                  <a:srgbClr val="FFFF00"/>
+                </a:solidFill>
+              </a:rPr>
+              <a:t>post_response.json</a:t>
+            </a:r>
+            <a:r>
+              <a:rPr lang="en-US" b="1" i="1" dirty="0">
+                <a:solidFill>
+                  <a:srgbClr val="FFFF00"/>
+                </a:solidFill>
+              </a:rPr>
+              <a:t>())</a:t>
+            </a:r>
+          </a:p>
+        </p:txBody>
+      </p:sp>
+      <p:sp>
+        <p:nvSpPr>
+          <p:cNvPr id="4" name="Date Placeholder 3">
+            <a:extLst>
+              <a:ext uri="{FF2B5EF4-FFF2-40B4-BE49-F238E27FC236}">
+                <a16:creationId xmlns:a16="http://schemas.microsoft.com/office/drawing/2014/main" id="{D7D9528C-333D-BF4A-844C-7BCC7757E858}"/>
+              </a:ext>
+            </a:extLst>
+          </p:cNvPr>
+          <p:cNvSpPr>
+            <a:spLocks noGrp="1"/>
+          </p:cNvSpPr>
+          <p:nvPr>
+            <p:ph type="dt" sz="half" idx="10"/>
+          </p:nvPr>
+        </p:nvSpPr>
+        <p:spPr/>
+        <p:txBody>
+          <a:bodyPr/>
+          <a:lstStyle/>
+          <a:p>
+            <a:r>
+              <a:rPr lang="en-US"/>
+              <a:t>World Wide Technology ©</a:t>
+            </a:r>
+            <a:endParaRPr lang="en-US" dirty="0"/>
+          </a:p>
+        </p:txBody>
+      </p:sp>
+      <p:sp>
+        <p:nvSpPr>
+          <p:cNvPr id="5" name="Slide Number Placeholder 4">
+            <a:extLst>
+              <a:ext uri="{FF2B5EF4-FFF2-40B4-BE49-F238E27FC236}">
+                <a16:creationId xmlns:a16="http://schemas.microsoft.com/office/drawing/2014/main" id="{0798D1A2-1CD4-4A47-A0BC-C1215D1CD611}"/>
+              </a:ext>
+            </a:extLst>
+          </p:cNvPr>
+          <p:cNvSpPr>
+            <a:spLocks noGrp="1"/>
+          </p:cNvSpPr>
+          <p:nvPr>
+            <p:ph type="sldNum" sz="quarter" idx="12"/>
+          </p:nvPr>
+        </p:nvSpPr>
+        <p:spPr/>
+        <p:txBody>
+          <a:bodyPr/>
+          <a:lstStyle/>
+          <a:p>
+            <a:fld id="{A44B02FA-DD2D-1844-AE35-8B2EAB0CF4EF}" type="slidenum">
+              <a:rPr lang="en-US" smtClean="0"/>
+              <a:pPr/>
+              <a:t>69</a:t>
+            </a:fld>
+            <a:endParaRPr lang="en-US" dirty="0"/>
+          </a:p>
+        </p:txBody>
+      </p:sp>
+    </p:spTree>
+    <p:extLst>
+      <p:ext uri="{BB962C8B-B14F-4D97-AF65-F5344CB8AC3E}">
+        <p14:creationId xmlns:p14="http://schemas.microsoft.com/office/powerpoint/2010/main" val="1227167181"/>
       </p:ext>
     </p:extLst>
   </p:cSld>
@@ -43796,6 +45514,1024 @@
     <p:extLst>
       <p:ext uri="{BB962C8B-B14F-4D97-AF65-F5344CB8AC3E}">
         <p14:creationId xmlns:p14="http://schemas.microsoft.com/office/powerpoint/2010/main" val="3846466957"/>
+      </p:ext>
+    </p:extLst>
+  </p:cSld>
+  <p:clrMapOvr>
+    <a:masterClrMapping/>
+  </p:clrMapOvr>
+  <mc:AlternateContent xmlns:mc="http://schemas.openxmlformats.org/markup-compatibility/2006" xmlns:p14="http://schemas.microsoft.com/office/powerpoint/2010/main">
+    <mc:Choice Requires="p14">
+      <p:transition spd="med" p14:dur="700">
+        <p:fade/>
+      </p:transition>
+    </mc:Choice>
+    <mc:Fallback xmlns="">
+      <p:transition spd="med">
+        <p:fade/>
+      </p:transition>
+    </mc:Fallback>
+  </mc:AlternateContent>
+</p:sld>
+</file>
+
+<file path=ppt/slides/slide70.xml><?xml version="1.0" encoding="utf-8"?>
+<p:sld xmlns:a="http://schemas.openxmlformats.org/drawingml/2006/main" xmlns:r="http://schemas.openxmlformats.org/officeDocument/2006/relationships" xmlns:p="http://schemas.openxmlformats.org/presentationml/2006/main">
+  <p:cSld>
+    <p:spTree>
+      <p:nvGrpSpPr>
+        <p:cNvPr id="1" name=""/>
+        <p:cNvGrpSpPr/>
+        <p:nvPr/>
+      </p:nvGrpSpPr>
+      <p:grpSpPr>
+        <a:xfrm>
+          <a:off x="0" y="0"/>
+          <a:ext cx="0" cy="0"/>
+          <a:chOff x="0" y="0"/>
+          <a:chExt cx="0" cy="0"/>
+        </a:xfrm>
+      </p:grpSpPr>
+      <p:sp>
+        <p:nvSpPr>
+          <p:cNvPr id="4" name="Date Placeholder 3">
+            <a:extLst>
+              <a:ext uri="{FF2B5EF4-FFF2-40B4-BE49-F238E27FC236}">
+                <a16:creationId xmlns:a16="http://schemas.microsoft.com/office/drawing/2014/main" id="{0CD670A9-B06A-3448-BABA-FAD627500859}"/>
+              </a:ext>
+            </a:extLst>
+          </p:cNvPr>
+          <p:cNvSpPr>
+            <a:spLocks noGrp="1"/>
+          </p:cNvSpPr>
+          <p:nvPr>
+            <p:ph type="dt" sz="half" idx="10"/>
+          </p:nvPr>
+        </p:nvSpPr>
+        <p:spPr/>
+        <p:txBody>
+          <a:bodyPr/>
+          <a:lstStyle/>
+          <a:p>
+            <a:r>
+              <a:rPr lang="en-US"/>
+              <a:t>World Wide Technology ©</a:t>
+            </a:r>
+            <a:endParaRPr lang="en-US" dirty="0"/>
+          </a:p>
+        </p:txBody>
+      </p:sp>
+      <p:sp>
+        <p:nvSpPr>
+          <p:cNvPr id="5" name="Slide Number Placeholder 4">
+            <a:extLst>
+              <a:ext uri="{FF2B5EF4-FFF2-40B4-BE49-F238E27FC236}">
+                <a16:creationId xmlns:a16="http://schemas.microsoft.com/office/drawing/2014/main" id="{119DACAD-17C1-C249-A498-C4A1A1ADD334}"/>
+              </a:ext>
+            </a:extLst>
+          </p:cNvPr>
+          <p:cNvSpPr>
+            <a:spLocks noGrp="1"/>
+          </p:cNvSpPr>
+          <p:nvPr>
+            <p:ph type="sldNum" sz="quarter" idx="12"/>
+          </p:nvPr>
+        </p:nvSpPr>
+        <p:spPr/>
+        <p:txBody>
+          <a:bodyPr/>
+          <a:lstStyle/>
+          <a:p>
+            <a:fld id="{A44B02FA-DD2D-1844-AE35-8B2EAB0CF4EF}" type="slidenum">
+              <a:rPr lang="en-US" smtClean="0"/>
+              <a:pPr/>
+              <a:t>70</a:t>
+            </a:fld>
+            <a:endParaRPr lang="en-US" dirty="0"/>
+          </a:p>
+        </p:txBody>
+      </p:sp>
+    </p:spTree>
+    <p:extLst>
+      <p:ext uri="{BB962C8B-B14F-4D97-AF65-F5344CB8AC3E}">
+        <p14:creationId xmlns:p14="http://schemas.microsoft.com/office/powerpoint/2010/main" val="2434503880"/>
+      </p:ext>
+    </p:extLst>
+  </p:cSld>
+  <p:clrMapOvr>
+    <a:masterClrMapping/>
+  </p:clrMapOvr>
+  <mc:AlternateContent xmlns:mc="http://schemas.openxmlformats.org/markup-compatibility/2006" xmlns:p14="http://schemas.microsoft.com/office/powerpoint/2010/main">
+    <mc:Choice Requires="p14">
+      <p:transition spd="med" p14:dur="700">
+        <p:fade/>
+      </p:transition>
+    </mc:Choice>
+    <mc:Fallback xmlns="">
+      <p:transition spd="med">
+        <p:fade/>
+      </p:transition>
+    </mc:Fallback>
+  </mc:AlternateContent>
+</p:sld>
+</file>
+
+<file path=ppt/slides/slide71.xml><?xml version="1.0" encoding="utf-8"?>
+<p:sld xmlns:a="http://schemas.openxmlformats.org/drawingml/2006/main" xmlns:r="http://schemas.openxmlformats.org/officeDocument/2006/relationships" xmlns:p="http://schemas.openxmlformats.org/presentationml/2006/main">
+  <p:cSld>
+    <p:spTree>
+      <p:nvGrpSpPr>
+        <p:cNvPr id="1" name=""/>
+        <p:cNvGrpSpPr/>
+        <p:nvPr/>
+      </p:nvGrpSpPr>
+      <p:grpSpPr>
+        <a:xfrm>
+          <a:off x="0" y="0"/>
+          <a:ext cx="0" cy="0"/>
+          <a:chOff x="0" y="0"/>
+          <a:chExt cx="0" cy="0"/>
+        </a:xfrm>
+      </p:grpSpPr>
+      <p:sp>
+        <p:nvSpPr>
+          <p:cNvPr id="2" name="Title 1">
+            <a:extLst>
+              <a:ext uri="{FF2B5EF4-FFF2-40B4-BE49-F238E27FC236}">
+                <a16:creationId xmlns:a16="http://schemas.microsoft.com/office/drawing/2014/main" id="{9D8D6E4C-FC36-3E4C-9387-96DD20072D9D}"/>
+              </a:ext>
+            </a:extLst>
+          </p:cNvPr>
+          <p:cNvSpPr>
+            <a:spLocks noGrp="1"/>
+          </p:cNvSpPr>
+          <p:nvPr>
+            <p:ph type="ctrTitle"/>
+          </p:nvPr>
+        </p:nvSpPr>
+        <p:spPr>
+          <a:xfrm>
+            <a:off x="1524000" y="914013"/>
+            <a:ext cx="9144000" cy="2387600"/>
+          </a:xfrm>
+        </p:spPr>
+        <p:txBody>
+          <a:bodyPr/>
+          <a:lstStyle/>
+          <a:p>
+            <a:r>
+              <a:rPr lang="en-US" dirty="0"/>
+              <a:t>Part VI</a:t>
+            </a:r>
+          </a:p>
+        </p:txBody>
+      </p:sp>
+      <p:sp>
+        <p:nvSpPr>
+          <p:cNvPr id="3" name="Subtitle 2">
+            <a:extLst>
+              <a:ext uri="{FF2B5EF4-FFF2-40B4-BE49-F238E27FC236}">
+                <a16:creationId xmlns:a16="http://schemas.microsoft.com/office/drawing/2014/main" id="{0451A0DE-9D64-5A48-94B5-5B4E42709819}"/>
+              </a:ext>
+            </a:extLst>
+          </p:cNvPr>
+          <p:cNvSpPr>
+            <a:spLocks noGrp="1"/>
+          </p:cNvSpPr>
+          <p:nvPr>
+            <p:ph type="subTitle" idx="1"/>
+          </p:nvPr>
+        </p:nvSpPr>
+        <p:spPr>
+          <a:xfrm>
+            <a:off x="1524000" y="3393688"/>
+            <a:ext cx="9144000" cy="1655762"/>
+          </a:xfrm>
+        </p:spPr>
+        <p:txBody>
+          <a:bodyPr/>
+          <a:lstStyle/>
+          <a:p>
+            <a:r>
+              <a:rPr lang="en-US" dirty="0"/>
+              <a:t>Interact With Cisco Platform APIs Using Python Requests</a:t>
+            </a:r>
+          </a:p>
+        </p:txBody>
+      </p:sp>
+    </p:spTree>
+    <p:extLst>
+      <p:ext uri="{BB962C8B-B14F-4D97-AF65-F5344CB8AC3E}">
+        <p14:creationId xmlns:p14="http://schemas.microsoft.com/office/powerpoint/2010/main" val="4218248441"/>
+      </p:ext>
+    </p:extLst>
+  </p:cSld>
+  <p:clrMapOvr>
+    <a:masterClrMapping/>
+  </p:clrMapOvr>
+  <mc:AlternateContent xmlns:mc="http://schemas.openxmlformats.org/markup-compatibility/2006" xmlns:p14="http://schemas.microsoft.com/office/powerpoint/2010/main">
+    <mc:Choice Requires="p14">
+      <p:transition spd="med" p14:dur="700">
+        <p:fade/>
+      </p:transition>
+    </mc:Choice>
+    <mc:Fallback xmlns="">
+      <p:transition spd="med">
+        <p:fade/>
+      </p:transition>
+    </mc:Fallback>
+  </mc:AlternateContent>
+</p:sld>
+</file>
+
+<file path=ppt/slides/slide72.xml><?xml version="1.0" encoding="utf-8"?>
+<p:sld xmlns:a="http://schemas.openxmlformats.org/drawingml/2006/main" xmlns:r="http://schemas.openxmlformats.org/officeDocument/2006/relationships" xmlns:p="http://schemas.openxmlformats.org/presentationml/2006/main">
+  <p:cSld>
+    <p:spTree>
+      <p:nvGrpSpPr>
+        <p:cNvPr id="1" name=""/>
+        <p:cNvGrpSpPr/>
+        <p:nvPr/>
+      </p:nvGrpSpPr>
+      <p:grpSpPr>
+        <a:xfrm>
+          <a:off x="0" y="0"/>
+          <a:ext cx="0" cy="0"/>
+          <a:chOff x="0" y="0"/>
+          <a:chExt cx="0" cy="0"/>
+        </a:xfrm>
+      </p:grpSpPr>
+      <p:sp>
+        <p:nvSpPr>
+          <p:cNvPr id="2" name="Title 1">
+            <a:extLst>
+              <a:ext uri="{FF2B5EF4-FFF2-40B4-BE49-F238E27FC236}">
+                <a16:creationId xmlns:a16="http://schemas.microsoft.com/office/drawing/2014/main" id="{EB7C4089-1746-624B-8E73-D3DAB8E88CDD}"/>
+              </a:ext>
+            </a:extLst>
+          </p:cNvPr>
+          <p:cNvSpPr>
+            <a:spLocks noGrp="1"/>
+          </p:cNvSpPr>
+          <p:nvPr>
+            <p:ph type="title"/>
+          </p:nvPr>
+        </p:nvSpPr>
+        <p:spPr/>
+        <p:txBody>
+          <a:bodyPr/>
+          <a:lstStyle/>
+          <a:p>
+            <a:r>
+              <a:rPr lang="en-US" dirty="0"/>
+              <a:t>Outline</a:t>
+            </a:r>
+          </a:p>
+        </p:txBody>
+      </p:sp>
+      <p:sp>
+        <p:nvSpPr>
+          <p:cNvPr id="3" name="Content Placeholder 2">
+            <a:extLst>
+              <a:ext uri="{FF2B5EF4-FFF2-40B4-BE49-F238E27FC236}">
+                <a16:creationId xmlns:a16="http://schemas.microsoft.com/office/drawing/2014/main" id="{65426B10-0364-A849-B3A4-1D0DA409155A}"/>
+              </a:ext>
+            </a:extLst>
+          </p:cNvPr>
+          <p:cNvSpPr>
+            <a:spLocks noGrp="1"/>
+          </p:cNvSpPr>
+          <p:nvPr>
+            <p:ph idx="1"/>
+          </p:nvPr>
+        </p:nvSpPr>
+        <p:spPr/>
+        <p:txBody>
+          <a:bodyPr/>
+          <a:lstStyle/>
+          <a:p>
+            <a:r>
+              <a:rPr lang="en-US" dirty="0"/>
+              <a:t>For each of these platforms:</a:t>
+            </a:r>
+          </a:p>
+          <a:p>
+            <a:pPr lvl="1"/>
+            <a:r>
+              <a:rPr lang="en-US" dirty="0"/>
+              <a:t>ACI</a:t>
+            </a:r>
+          </a:p>
+          <a:p>
+            <a:pPr lvl="1"/>
+            <a:r>
+              <a:rPr lang="en-US" dirty="0"/>
+              <a:t>DNAC</a:t>
+            </a:r>
+          </a:p>
+          <a:p>
+            <a:pPr lvl="1"/>
+            <a:r>
+              <a:rPr lang="en-US" dirty="0"/>
+              <a:t>Meraki</a:t>
+            </a:r>
+          </a:p>
+          <a:p>
+            <a:pPr lvl="1"/>
+            <a:r>
+              <a:rPr lang="en-US" dirty="0" err="1"/>
+              <a:t>Webex</a:t>
+            </a:r>
+            <a:r>
+              <a:rPr lang="en-US" dirty="0"/>
+              <a:t> Teams</a:t>
+            </a:r>
+          </a:p>
+          <a:p>
+            <a:r>
+              <a:rPr lang="en-US" dirty="0"/>
+              <a:t>Perform the following tasks:</a:t>
+            </a:r>
+          </a:p>
+          <a:p>
+            <a:pPr lvl="1"/>
+            <a:r>
+              <a:rPr lang="en-US" dirty="0"/>
+              <a:t>Review authentication methodology</a:t>
+            </a:r>
+          </a:p>
+          <a:p>
+            <a:pPr lvl="1"/>
+            <a:r>
+              <a:rPr lang="en-US" dirty="0"/>
+              <a:t>Build Python scripts to authenticate</a:t>
+            </a:r>
+          </a:p>
+          <a:p>
+            <a:pPr lvl="1"/>
+            <a:r>
+              <a:rPr lang="en-US" dirty="0"/>
+              <a:t>Build Python scripts to read/write data</a:t>
+            </a:r>
+          </a:p>
+        </p:txBody>
+      </p:sp>
+      <p:sp>
+        <p:nvSpPr>
+          <p:cNvPr id="4" name="Date Placeholder 3">
+            <a:extLst>
+              <a:ext uri="{FF2B5EF4-FFF2-40B4-BE49-F238E27FC236}">
+                <a16:creationId xmlns:a16="http://schemas.microsoft.com/office/drawing/2014/main" id="{7ECEAF79-F4AC-E94E-9E55-220D0D396924}"/>
+              </a:ext>
+            </a:extLst>
+          </p:cNvPr>
+          <p:cNvSpPr>
+            <a:spLocks noGrp="1"/>
+          </p:cNvSpPr>
+          <p:nvPr>
+            <p:ph type="dt" sz="half" idx="10"/>
+          </p:nvPr>
+        </p:nvSpPr>
+        <p:spPr/>
+        <p:txBody>
+          <a:bodyPr/>
+          <a:lstStyle/>
+          <a:p>
+            <a:r>
+              <a:rPr lang="en-US"/>
+              <a:t>World Wide Technology ©</a:t>
+            </a:r>
+            <a:endParaRPr lang="en-US" dirty="0"/>
+          </a:p>
+        </p:txBody>
+      </p:sp>
+      <p:sp>
+        <p:nvSpPr>
+          <p:cNvPr id="5" name="Slide Number Placeholder 4">
+            <a:extLst>
+              <a:ext uri="{FF2B5EF4-FFF2-40B4-BE49-F238E27FC236}">
+                <a16:creationId xmlns:a16="http://schemas.microsoft.com/office/drawing/2014/main" id="{372DC1A4-CE8B-DB4A-8F86-2508518C35D3}"/>
+              </a:ext>
+            </a:extLst>
+          </p:cNvPr>
+          <p:cNvSpPr>
+            <a:spLocks noGrp="1"/>
+          </p:cNvSpPr>
+          <p:nvPr>
+            <p:ph type="sldNum" sz="quarter" idx="12"/>
+          </p:nvPr>
+        </p:nvSpPr>
+        <p:spPr/>
+        <p:txBody>
+          <a:bodyPr/>
+          <a:lstStyle/>
+          <a:p>
+            <a:fld id="{A44B02FA-DD2D-1844-AE35-8B2EAB0CF4EF}" type="slidenum">
+              <a:rPr lang="en-US" smtClean="0"/>
+              <a:pPr/>
+              <a:t>72</a:t>
+            </a:fld>
+            <a:endParaRPr lang="en-US" dirty="0"/>
+          </a:p>
+        </p:txBody>
+      </p:sp>
+    </p:spTree>
+    <p:extLst>
+      <p:ext uri="{BB962C8B-B14F-4D97-AF65-F5344CB8AC3E}">
+        <p14:creationId xmlns:p14="http://schemas.microsoft.com/office/powerpoint/2010/main" val="232106193"/>
+      </p:ext>
+    </p:extLst>
+  </p:cSld>
+  <p:clrMapOvr>
+    <a:masterClrMapping/>
+  </p:clrMapOvr>
+  <mc:AlternateContent xmlns:mc="http://schemas.openxmlformats.org/markup-compatibility/2006" xmlns:p14="http://schemas.microsoft.com/office/powerpoint/2010/main">
+    <mc:Choice Requires="p14">
+      <p:transition spd="med" p14:dur="700">
+        <p:fade/>
+      </p:transition>
+    </mc:Choice>
+    <mc:Fallback xmlns="">
+      <p:transition spd="med">
+        <p:fade/>
+      </p:transition>
+    </mc:Fallback>
+  </mc:AlternateContent>
+</p:sld>
+</file>
+
+<file path=ppt/slides/slide73.xml><?xml version="1.0" encoding="utf-8"?>
+<p:sld xmlns:a="http://schemas.openxmlformats.org/drawingml/2006/main" xmlns:r="http://schemas.openxmlformats.org/officeDocument/2006/relationships" xmlns:p="http://schemas.openxmlformats.org/presentationml/2006/main">
+  <p:cSld>
+    <p:spTree>
+      <p:nvGrpSpPr>
+        <p:cNvPr id="1" name=""/>
+        <p:cNvGrpSpPr/>
+        <p:nvPr/>
+      </p:nvGrpSpPr>
+      <p:grpSpPr>
+        <a:xfrm>
+          <a:off x="0" y="0"/>
+          <a:ext cx="0" cy="0"/>
+          <a:chOff x="0" y="0"/>
+          <a:chExt cx="0" cy="0"/>
+        </a:xfrm>
+      </p:grpSpPr>
+      <p:sp>
+        <p:nvSpPr>
+          <p:cNvPr id="2" name="Title 1">
+            <a:extLst>
+              <a:ext uri="{FF2B5EF4-FFF2-40B4-BE49-F238E27FC236}">
+                <a16:creationId xmlns:a16="http://schemas.microsoft.com/office/drawing/2014/main" id="{9D8D6E4C-FC36-3E4C-9387-96DD20072D9D}"/>
+              </a:ext>
+            </a:extLst>
+          </p:cNvPr>
+          <p:cNvSpPr>
+            <a:spLocks noGrp="1"/>
+          </p:cNvSpPr>
+          <p:nvPr>
+            <p:ph type="ctrTitle"/>
+          </p:nvPr>
+        </p:nvSpPr>
+        <p:spPr>
+          <a:xfrm>
+            <a:off x="1524000" y="914013"/>
+            <a:ext cx="9144000" cy="2387600"/>
+          </a:xfrm>
+        </p:spPr>
+        <p:txBody>
+          <a:bodyPr/>
+          <a:lstStyle/>
+          <a:p>
+            <a:r>
+              <a:rPr lang="en-US" dirty="0"/>
+              <a:t>Part VII</a:t>
+            </a:r>
+          </a:p>
+        </p:txBody>
+      </p:sp>
+      <p:sp>
+        <p:nvSpPr>
+          <p:cNvPr id="3" name="Subtitle 2">
+            <a:extLst>
+              <a:ext uri="{FF2B5EF4-FFF2-40B4-BE49-F238E27FC236}">
+                <a16:creationId xmlns:a16="http://schemas.microsoft.com/office/drawing/2014/main" id="{0451A0DE-9D64-5A48-94B5-5B4E42709819}"/>
+              </a:ext>
+            </a:extLst>
+          </p:cNvPr>
+          <p:cNvSpPr>
+            <a:spLocks noGrp="1"/>
+          </p:cNvSpPr>
+          <p:nvPr>
+            <p:ph type="subTitle" idx="1"/>
+          </p:nvPr>
+        </p:nvSpPr>
+        <p:spPr>
+          <a:xfrm>
+            <a:off x="1524000" y="3393688"/>
+            <a:ext cx="9144000" cy="1655762"/>
+          </a:xfrm>
+        </p:spPr>
+        <p:txBody>
+          <a:bodyPr/>
+          <a:lstStyle/>
+          <a:p>
+            <a:r>
+              <a:rPr lang="en-US" dirty="0"/>
+              <a:t>Quiz, Practice Resources, &amp; References</a:t>
+            </a:r>
+          </a:p>
+        </p:txBody>
+      </p:sp>
+    </p:spTree>
+    <p:extLst>
+      <p:ext uri="{BB962C8B-B14F-4D97-AF65-F5344CB8AC3E}">
+        <p14:creationId xmlns:p14="http://schemas.microsoft.com/office/powerpoint/2010/main" val="3392886013"/>
+      </p:ext>
+    </p:extLst>
+  </p:cSld>
+  <p:clrMapOvr>
+    <a:masterClrMapping/>
+  </p:clrMapOvr>
+  <mc:AlternateContent xmlns:mc="http://schemas.openxmlformats.org/markup-compatibility/2006" xmlns:p14="http://schemas.microsoft.com/office/powerpoint/2010/main">
+    <mc:Choice Requires="p14">
+      <p:transition spd="med" p14:dur="700">
+        <p:fade/>
+      </p:transition>
+    </mc:Choice>
+    <mc:Fallback xmlns="">
+      <p:transition spd="med">
+        <p:fade/>
+      </p:transition>
+    </mc:Fallback>
+  </mc:AlternateContent>
+</p:sld>
+</file>
+
+<file path=ppt/slides/slide74.xml><?xml version="1.0" encoding="utf-8"?>
+<p:sld xmlns:a="http://schemas.openxmlformats.org/drawingml/2006/main" xmlns:r="http://schemas.openxmlformats.org/officeDocument/2006/relationships" xmlns:p="http://schemas.openxmlformats.org/presentationml/2006/main">
+  <p:cSld>
+    <p:spTree>
+      <p:nvGrpSpPr>
+        <p:cNvPr id="1" name=""/>
+        <p:cNvGrpSpPr/>
+        <p:nvPr/>
+      </p:nvGrpSpPr>
+      <p:grpSpPr>
+        <a:xfrm>
+          <a:off x="0" y="0"/>
+          <a:ext cx="0" cy="0"/>
+          <a:chOff x="0" y="0"/>
+          <a:chExt cx="0" cy="0"/>
+        </a:xfrm>
+      </p:grpSpPr>
+      <p:sp>
+        <p:nvSpPr>
+          <p:cNvPr id="2" name="Title 1">
+            <a:extLst>
+              <a:ext uri="{FF2B5EF4-FFF2-40B4-BE49-F238E27FC236}">
+                <a16:creationId xmlns:a16="http://schemas.microsoft.com/office/drawing/2014/main" id="{EB7C4089-1746-624B-8E73-D3DAB8E88CDD}"/>
+              </a:ext>
+            </a:extLst>
+          </p:cNvPr>
+          <p:cNvSpPr>
+            <a:spLocks noGrp="1"/>
+          </p:cNvSpPr>
+          <p:nvPr>
+            <p:ph type="title"/>
+          </p:nvPr>
+        </p:nvSpPr>
+        <p:spPr/>
+        <p:txBody>
+          <a:bodyPr/>
+          <a:lstStyle/>
+          <a:p>
+            <a:r>
+              <a:rPr lang="en-US" dirty="0"/>
+              <a:t>Slide Template</a:t>
+            </a:r>
+          </a:p>
+        </p:txBody>
+      </p:sp>
+      <p:sp>
+        <p:nvSpPr>
+          <p:cNvPr id="3" name="Content Placeholder 2">
+            <a:extLst>
+              <a:ext uri="{FF2B5EF4-FFF2-40B4-BE49-F238E27FC236}">
+                <a16:creationId xmlns:a16="http://schemas.microsoft.com/office/drawing/2014/main" id="{65426B10-0364-A849-B3A4-1D0DA409155A}"/>
+              </a:ext>
+            </a:extLst>
+          </p:cNvPr>
+          <p:cNvSpPr>
+            <a:spLocks noGrp="1"/>
+          </p:cNvSpPr>
+          <p:nvPr>
+            <p:ph idx="1"/>
+          </p:nvPr>
+        </p:nvSpPr>
+        <p:spPr/>
+        <p:txBody>
+          <a:bodyPr/>
+          <a:lstStyle/>
+          <a:p>
+            <a:r>
+              <a:rPr lang="en-US" dirty="0"/>
+              <a:t>Body template</a:t>
+            </a:r>
+          </a:p>
+        </p:txBody>
+      </p:sp>
+      <p:sp>
+        <p:nvSpPr>
+          <p:cNvPr id="4" name="Date Placeholder 3">
+            <a:extLst>
+              <a:ext uri="{FF2B5EF4-FFF2-40B4-BE49-F238E27FC236}">
+                <a16:creationId xmlns:a16="http://schemas.microsoft.com/office/drawing/2014/main" id="{7ECEAF79-F4AC-E94E-9E55-220D0D396924}"/>
+              </a:ext>
+            </a:extLst>
+          </p:cNvPr>
+          <p:cNvSpPr>
+            <a:spLocks noGrp="1"/>
+          </p:cNvSpPr>
+          <p:nvPr>
+            <p:ph type="dt" sz="half" idx="10"/>
+          </p:nvPr>
+        </p:nvSpPr>
+        <p:spPr/>
+        <p:txBody>
+          <a:bodyPr/>
+          <a:lstStyle/>
+          <a:p>
+            <a:r>
+              <a:rPr lang="en-US"/>
+              <a:t>World Wide Technology ©</a:t>
+            </a:r>
+            <a:endParaRPr lang="en-US" dirty="0"/>
+          </a:p>
+        </p:txBody>
+      </p:sp>
+      <p:sp>
+        <p:nvSpPr>
+          <p:cNvPr id="5" name="Slide Number Placeholder 4">
+            <a:extLst>
+              <a:ext uri="{FF2B5EF4-FFF2-40B4-BE49-F238E27FC236}">
+                <a16:creationId xmlns:a16="http://schemas.microsoft.com/office/drawing/2014/main" id="{372DC1A4-CE8B-DB4A-8F86-2508518C35D3}"/>
+              </a:ext>
+            </a:extLst>
+          </p:cNvPr>
+          <p:cNvSpPr>
+            <a:spLocks noGrp="1"/>
+          </p:cNvSpPr>
+          <p:nvPr>
+            <p:ph type="sldNum" sz="quarter" idx="12"/>
+          </p:nvPr>
+        </p:nvSpPr>
+        <p:spPr/>
+        <p:txBody>
+          <a:bodyPr/>
+          <a:lstStyle/>
+          <a:p>
+            <a:fld id="{A44B02FA-DD2D-1844-AE35-8B2EAB0CF4EF}" type="slidenum">
+              <a:rPr lang="en-US" smtClean="0"/>
+              <a:pPr/>
+              <a:t>74</a:t>
+            </a:fld>
+            <a:endParaRPr lang="en-US" dirty="0"/>
+          </a:p>
+        </p:txBody>
+      </p:sp>
+    </p:spTree>
+    <p:extLst>
+      <p:ext uri="{BB962C8B-B14F-4D97-AF65-F5344CB8AC3E}">
+        <p14:creationId xmlns:p14="http://schemas.microsoft.com/office/powerpoint/2010/main" val="2709408928"/>
+      </p:ext>
+    </p:extLst>
+  </p:cSld>
+  <p:clrMapOvr>
+    <a:masterClrMapping/>
+  </p:clrMapOvr>
+  <mc:AlternateContent xmlns:mc="http://schemas.openxmlformats.org/markup-compatibility/2006" xmlns:p14="http://schemas.microsoft.com/office/powerpoint/2010/main">
+    <mc:Choice Requires="p14">
+      <p:transition spd="med" p14:dur="700">
+        <p:fade/>
+      </p:transition>
+    </mc:Choice>
+    <mc:Fallback xmlns="">
+      <p:transition spd="med">
+        <p:fade/>
+      </p:transition>
+    </mc:Fallback>
+  </mc:AlternateContent>
+</p:sld>
+</file>
+
+<file path=ppt/slides/slide75.xml><?xml version="1.0" encoding="utf-8"?>
+<p:sld xmlns:a="http://schemas.openxmlformats.org/drawingml/2006/main" xmlns:r="http://schemas.openxmlformats.org/officeDocument/2006/relationships" xmlns:p="http://schemas.openxmlformats.org/presentationml/2006/main">
+  <p:cSld>
+    <p:spTree>
+      <p:nvGrpSpPr>
+        <p:cNvPr id="1" name=""/>
+        <p:cNvGrpSpPr/>
+        <p:nvPr/>
+      </p:nvGrpSpPr>
+      <p:grpSpPr>
+        <a:xfrm>
+          <a:off x="0" y="0"/>
+          <a:ext cx="0" cy="0"/>
+          <a:chOff x="0" y="0"/>
+          <a:chExt cx="0" cy="0"/>
+        </a:xfrm>
+      </p:grpSpPr>
+      <p:sp>
+        <p:nvSpPr>
+          <p:cNvPr id="2" name="Title 1">
+            <a:extLst>
+              <a:ext uri="{FF2B5EF4-FFF2-40B4-BE49-F238E27FC236}">
+                <a16:creationId xmlns:a16="http://schemas.microsoft.com/office/drawing/2014/main" id="{EB7C4089-1746-624B-8E73-D3DAB8E88CDD}"/>
+              </a:ext>
+            </a:extLst>
+          </p:cNvPr>
+          <p:cNvSpPr>
+            <a:spLocks noGrp="1"/>
+          </p:cNvSpPr>
+          <p:nvPr>
+            <p:ph type="title"/>
+          </p:nvPr>
+        </p:nvSpPr>
+        <p:spPr/>
+        <p:txBody>
+          <a:bodyPr/>
+          <a:lstStyle/>
+          <a:p>
+            <a:r>
+              <a:rPr lang="en-US" dirty="0"/>
+              <a:t>References</a:t>
+            </a:r>
+          </a:p>
+        </p:txBody>
+      </p:sp>
+      <p:sp>
+        <p:nvSpPr>
+          <p:cNvPr id="3" name="Content Placeholder 2">
+            <a:extLst>
+              <a:ext uri="{FF2B5EF4-FFF2-40B4-BE49-F238E27FC236}">
+                <a16:creationId xmlns:a16="http://schemas.microsoft.com/office/drawing/2014/main" id="{65426B10-0364-A849-B3A4-1D0DA409155A}"/>
+              </a:ext>
+            </a:extLst>
+          </p:cNvPr>
+          <p:cNvSpPr>
+            <a:spLocks noGrp="1"/>
+          </p:cNvSpPr>
+          <p:nvPr>
+            <p:ph idx="1"/>
+          </p:nvPr>
+        </p:nvSpPr>
+        <p:spPr/>
+        <p:txBody>
+          <a:bodyPr>
+            <a:normAutofit fontScale="92500"/>
+          </a:bodyPr>
+          <a:lstStyle/>
+          <a:p>
+            <a:r>
+              <a:rPr lang="en-US" dirty="0">
+                <a:hlinkClick r:id="rId2"/>
+              </a:rPr>
+              <a:t>https://www.linkedin.com/pulse/why-rest-api-so-popular-mangesh-bulkar/</a:t>
+            </a:r>
+            <a:endParaRPr lang="en-US" dirty="0">
+              <a:hlinkClick r:id="rId3"/>
+            </a:endParaRPr>
+          </a:p>
+          <a:p>
+            <a:r>
+              <a:rPr lang="en-US" dirty="0">
+                <a:hlinkClick r:id="rId3"/>
+              </a:rPr>
+              <a:t>https://en.wikipedia.org/wiki/CURL</a:t>
+            </a:r>
+            <a:endParaRPr lang="en-US" dirty="0"/>
+          </a:p>
+          <a:p>
+            <a:r>
+              <a:rPr lang="en-US" dirty="0">
+                <a:hlinkClick r:id="rId4"/>
+              </a:rPr>
+              <a:t>https://en.wikipedia.org/wiki/Requests_%28software%29</a:t>
+            </a:r>
+            <a:endParaRPr lang="en-US" dirty="0"/>
+          </a:p>
+          <a:p>
+            <a:r>
+              <a:rPr lang="en-US" dirty="0">
+                <a:hlinkClick r:id="rId5"/>
+              </a:rPr>
+              <a:t>https://curl.haxx.se</a:t>
+            </a:r>
+            <a:endParaRPr lang="en-US" dirty="0"/>
+          </a:p>
+          <a:p>
+            <a:r>
+              <a:rPr lang="en-US" dirty="0">
+                <a:hlinkClick r:id="rId6"/>
+              </a:rPr>
+              <a:t>https://requests.readthedocs.io/en/master/</a:t>
+            </a:r>
+            <a:endParaRPr lang="en-US" dirty="0"/>
+          </a:p>
+          <a:p>
+            <a:r>
+              <a:rPr lang="en-US" dirty="0">
+                <a:hlinkClick r:id="rId7"/>
+              </a:rPr>
+              <a:t>https://2.python-requests.org/en/master/api/#requests.Response</a:t>
+            </a:r>
+            <a:endParaRPr lang="en-US" dirty="0"/>
+          </a:p>
+          <a:p>
+            <a:r>
+              <a:rPr lang="en-US" dirty="0"/>
+              <a:t>Cisco API documentation #1</a:t>
+            </a:r>
+          </a:p>
+          <a:p>
+            <a:r>
+              <a:rPr lang="en-US" dirty="0"/>
+              <a:t>Cisco API documentation #2</a:t>
+            </a:r>
+          </a:p>
+          <a:p>
+            <a:r>
+              <a:rPr lang="en-US" dirty="0"/>
+              <a:t>Cisco API documentation #3</a:t>
+            </a:r>
+          </a:p>
+        </p:txBody>
+      </p:sp>
+      <p:sp>
+        <p:nvSpPr>
+          <p:cNvPr id="4" name="Date Placeholder 3">
+            <a:extLst>
+              <a:ext uri="{FF2B5EF4-FFF2-40B4-BE49-F238E27FC236}">
+                <a16:creationId xmlns:a16="http://schemas.microsoft.com/office/drawing/2014/main" id="{7ECEAF79-F4AC-E94E-9E55-220D0D396924}"/>
+              </a:ext>
+            </a:extLst>
+          </p:cNvPr>
+          <p:cNvSpPr>
+            <a:spLocks noGrp="1"/>
+          </p:cNvSpPr>
+          <p:nvPr>
+            <p:ph type="dt" sz="half" idx="10"/>
+          </p:nvPr>
+        </p:nvSpPr>
+        <p:spPr/>
+        <p:txBody>
+          <a:bodyPr/>
+          <a:lstStyle/>
+          <a:p>
+            <a:r>
+              <a:rPr lang="en-US"/>
+              <a:t>World Wide Technology ©</a:t>
+            </a:r>
+            <a:endParaRPr lang="en-US" dirty="0"/>
+          </a:p>
+        </p:txBody>
+      </p:sp>
+      <p:sp>
+        <p:nvSpPr>
+          <p:cNvPr id="5" name="Slide Number Placeholder 4">
+            <a:extLst>
+              <a:ext uri="{FF2B5EF4-FFF2-40B4-BE49-F238E27FC236}">
+                <a16:creationId xmlns:a16="http://schemas.microsoft.com/office/drawing/2014/main" id="{372DC1A4-CE8B-DB4A-8F86-2508518C35D3}"/>
+              </a:ext>
+            </a:extLst>
+          </p:cNvPr>
+          <p:cNvSpPr>
+            <a:spLocks noGrp="1"/>
+          </p:cNvSpPr>
+          <p:nvPr>
+            <p:ph type="sldNum" sz="quarter" idx="12"/>
+          </p:nvPr>
+        </p:nvSpPr>
+        <p:spPr/>
+        <p:txBody>
+          <a:bodyPr/>
+          <a:lstStyle/>
+          <a:p>
+            <a:fld id="{A44B02FA-DD2D-1844-AE35-8B2EAB0CF4EF}" type="slidenum">
+              <a:rPr lang="en-US" smtClean="0"/>
+              <a:pPr/>
+              <a:t>75</a:t>
+            </a:fld>
+            <a:endParaRPr lang="en-US" dirty="0"/>
+          </a:p>
+        </p:txBody>
+      </p:sp>
+    </p:spTree>
+    <p:extLst>
+      <p:ext uri="{BB962C8B-B14F-4D97-AF65-F5344CB8AC3E}">
+        <p14:creationId xmlns:p14="http://schemas.microsoft.com/office/powerpoint/2010/main" val="3225595977"/>
+      </p:ext>
+    </p:extLst>
+  </p:cSld>
+  <p:clrMapOvr>
+    <a:masterClrMapping/>
+  </p:clrMapOvr>
+  <mc:AlternateContent xmlns:mc="http://schemas.openxmlformats.org/markup-compatibility/2006" xmlns:p14="http://schemas.microsoft.com/office/powerpoint/2010/main">
+    <mc:Choice Requires="p14">
+      <p:transition spd="med" p14:dur="700">
+        <p:fade/>
+      </p:transition>
+    </mc:Choice>
+    <mc:Fallback xmlns="">
+      <p:transition spd="med">
+        <p:fade/>
+      </p:transition>
+    </mc:Fallback>
+  </mc:AlternateContent>
+</p:sld>
+</file>
+
+<file path=ppt/slides/slide76.xml><?xml version="1.0" encoding="utf-8"?>
+<p:sld xmlns:a="http://schemas.openxmlformats.org/drawingml/2006/main" xmlns:r="http://schemas.openxmlformats.org/officeDocument/2006/relationships" xmlns:p="http://schemas.openxmlformats.org/presentationml/2006/main">
+  <p:cSld>
+    <p:spTree>
+      <p:nvGrpSpPr>
+        <p:cNvPr id="1" name=""/>
+        <p:cNvGrpSpPr/>
+        <p:nvPr/>
+      </p:nvGrpSpPr>
+      <p:grpSpPr>
+        <a:xfrm>
+          <a:off x="0" y="0"/>
+          <a:ext cx="0" cy="0"/>
+          <a:chOff x="0" y="0"/>
+          <a:chExt cx="0" cy="0"/>
+        </a:xfrm>
+      </p:grpSpPr>
+      <p:sp>
+        <p:nvSpPr>
+          <p:cNvPr id="4" name="Date Placeholder 3">
+            <a:extLst>
+              <a:ext uri="{FF2B5EF4-FFF2-40B4-BE49-F238E27FC236}">
+                <a16:creationId xmlns:a16="http://schemas.microsoft.com/office/drawing/2014/main" id="{0CD670A9-B06A-3448-BABA-FAD627500859}"/>
+              </a:ext>
+            </a:extLst>
+          </p:cNvPr>
+          <p:cNvSpPr>
+            <a:spLocks noGrp="1"/>
+          </p:cNvSpPr>
+          <p:nvPr>
+            <p:ph type="dt" sz="half" idx="10"/>
+          </p:nvPr>
+        </p:nvSpPr>
+        <p:spPr/>
+        <p:txBody>
+          <a:bodyPr/>
+          <a:lstStyle/>
+          <a:p>
+            <a:r>
+              <a:rPr lang="en-US"/>
+              <a:t>World Wide Technology ©</a:t>
+            </a:r>
+            <a:endParaRPr lang="en-US" dirty="0"/>
+          </a:p>
+        </p:txBody>
+      </p:sp>
+      <p:sp>
+        <p:nvSpPr>
+          <p:cNvPr id="5" name="Slide Number Placeholder 4">
+            <a:extLst>
+              <a:ext uri="{FF2B5EF4-FFF2-40B4-BE49-F238E27FC236}">
+                <a16:creationId xmlns:a16="http://schemas.microsoft.com/office/drawing/2014/main" id="{119DACAD-17C1-C249-A498-C4A1A1ADD334}"/>
+              </a:ext>
+            </a:extLst>
+          </p:cNvPr>
+          <p:cNvSpPr>
+            <a:spLocks noGrp="1"/>
+          </p:cNvSpPr>
+          <p:nvPr>
+            <p:ph type="sldNum" sz="quarter" idx="12"/>
+          </p:nvPr>
+        </p:nvSpPr>
+        <p:spPr/>
+        <p:txBody>
+          <a:bodyPr/>
+          <a:lstStyle/>
+          <a:p>
+            <a:fld id="{A44B02FA-DD2D-1844-AE35-8B2EAB0CF4EF}" type="slidenum">
+              <a:rPr lang="en-US" smtClean="0"/>
+              <a:pPr/>
+              <a:t>76</a:t>
+            </a:fld>
+            <a:endParaRPr lang="en-US" dirty="0"/>
+          </a:p>
+        </p:txBody>
+      </p:sp>
+    </p:spTree>
+    <p:extLst>
+      <p:ext uri="{BB962C8B-B14F-4D97-AF65-F5344CB8AC3E}">
+        <p14:creationId xmlns:p14="http://schemas.microsoft.com/office/powerpoint/2010/main" val="756638364"/>
       </p:ext>
     </p:extLst>
   </p:cSld>

</xml_diff>

<commit_message>
Added DNAC cURL commands
</commit_message>
<xml_diff>
--- a/curl-requests-foundations.pptx
+++ b/curl-requests-foundations.pptx
@@ -5,7 +5,7 @@
     <p:sldMasterId id="2147483660" r:id="rId1"/>
   </p:sldMasterIdLst>
   <p:notesMasterIdLst>
-    <p:notesMasterId r:id="rId78"/>
+    <p:notesMasterId r:id="rId90"/>
   </p:notesMasterIdLst>
   <p:sldIdLst>
     <p:sldId id="256" r:id="rId2"/>
@@ -78,12 +78,24 @@
     <p:sldId id="399" r:id="rId69"/>
     <p:sldId id="404" r:id="rId70"/>
     <p:sldId id="405" r:id="rId71"/>
-    <p:sldId id="333" r:id="rId72"/>
-    <p:sldId id="334" r:id="rId73"/>
-    <p:sldId id="335" r:id="rId74"/>
-    <p:sldId id="311" r:id="rId75"/>
-    <p:sldId id="321" r:id="rId76"/>
-    <p:sldId id="280" r:id="rId77"/>
+    <p:sldId id="406" r:id="rId72"/>
+    <p:sldId id="407" r:id="rId73"/>
+    <p:sldId id="418" r:id="rId74"/>
+    <p:sldId id="409" r:id="rId75"/>
+    <p:sldId id="410" r:id="rId76"/>
+    <p:sldId id="411" r:id="rId77"/>
+    <p:sldId id="412" r:id="rId78"/>
+    <p:sldId id="413" r:id="rId79"/>
+    <p:sldId id="414" r:id="rId80"/>
+    <p:sldId id="415" r:id="rId81"/>
+    <p:sldId id="416" r:id="rId82"/>
+    <p:sldId id="417" r:id="rId83"/>
+    <p:sldId id="333" r:id="rId84"/>
+    <p:sldId id="334" r:id="rId85"/>
+    <p:sldId id="335" r:id="rId86"/>
+    <p:sldId id="311" r:id="rId87"/>
+    <p:sldId id="321" r:id="rId88"/>
+    <p:sldId id="280" r:id="rId89"/>
   </p:sldIdLst>
   <p:sldSz cx="12192000" cy="6858000"/>
   <p:notesSz cx="6858000" cy="9144000"/>
@@ -5108,6 +5120,130 @@
               <a:t>// TODO</a:t>
             </a:r>
           </a:p>
+          <a:p>
+            <a:pPr marL="171450" marR="0" lvl="0" indent="-171450" algn="l" defTabSz="914400" rtl="0" eaLnBrk="1" fontAlgn="auto" latinLnBrk="0" hangingPunct="1">
+              <a:lnSpc>
+                <a:spcPct val="100000"/>
+              </a:lnSpc>
+              <a:spcBef>
+                <a:spcPts val="0"/>
+              </a:spcBef>
+              <a:spcAft>
+                <a:spcPts val="0"/>
+              </a:spcAft>
+              <a:buClrTx/>
+              <a:buSzTx/>
+              <a:buFont typeface="Arial" panose="020B0604020202020204" pitchFamily="34" charset="0"/>
+              <a:buChar char="•"/>
+              <a:tabLst/>
+              <a:defRPr/>
+            </a:pPr>
+            <a:r>
+              <a:rPr lang="en-US" dirty="0"/>
+              <a:t>The .</a:t>
+            </a:r>
+            <a:r>
+              <a:rPr lang="en-US" dirty="0" err="1"/>
+              <a:t>cookie_jar</a:t>
+            </a:r>
+            <a:r>
+              <a:rPr lang="en-US" dirty="0"/>
+              <a:t> name is arbitrary</a:t>
+            </a:r>
+          </a:p>
+          <a:p>
+            <a:pPr marL="171450" marR="0" lvl="0" indent="-171450" algn="l" defTabSz="914400" rtl="0" eaLnBrk="1" fontAlgn="auto" latinLnBrk="0" hangingPunct="1">
+              <a:lnSpc>
+                <a:spcPct val="100000"/>
+              </a:lnSpc>
+              <a:spcBef>
+                <a:spcPts val="0"/>
+              </a:spcBef>
+              <a:spcAft>
+                <a:spcPts val="0"/>
+              </a:spcAft>
+              <a:buClrTx/>
+              <a:buSzTx/>
+              <a:buFont typeface="Arial" panose="020B0604020202020204" pitchFamily="34" charset="0"/>
+              <a:buChar char="•"/>
+              <a:tabLst/>
+              <a:defRPr/>
+            </a:pPr>
+            <a:r>
+              <a:rPr lang="en-US" dirty="0"/>
+              <a:t>Notice the location of the token</a:t>
+            </a:r>
+          </a:p>
+          <a:p>
+            <a:pPr marL="628650" marR="0" lvl="1" indent="-171450" algn="l" defTabSz="914400" rtl="0" eaLnBrk="1" fontAlgn="auto" latinLnBrk="0" hangingPunct="1">
+              <a:lnSpc>
+                <a:spcPct val="100000"/>
+              </a:lnSpc>
+              <a:spcBef>
+                <a:spcPts val="0"/>
+              </a:spcBef>
+              <a:spcAft>
+                <a:spcPts val="0"/>
+              </a:spcAft>
+              <a:buClrTx/>
+              <a:buSzTx/>
+              <a:buFont typeface="Arial" panose="020B0604020202020204" pitchFamily="34" charset="0"/>
+              <a:buChar char="•"/>
+              <a:tabLst/>
+              <a:defRPr/>
+            </a:pPr>
+            <a:r>
+              <a:rPr lang="en-US" dirty="0"/>
+              <a:t>In the cookie response header</a:t>
+            </a:r>
+          </a:p>
+          <a:p>
+            <a:pPr marL="628650" marR="0" lvl="1" indent="-171450" algn="l" defTabSz="914400" rtl="0" eaLnBrk="1" fontAlgn="auto" latinLnBrk="0" hangingPunct="1">
+              <a:lnSpc>
+                <a:spcPct val="100000"/>
+              </a:lnSpc>
+              <a:spcBef>
+                <a:spcPts val="0"/>
+              </a:spcBef>
+              <a:spcAft>
+                <a:spcPts val="0"/>
+              </a:spcAft>
+              <a:buClrTx/>
+              <a:buSzTx/>
+              <a:buFont typeface="Arial" panose="020B0604020202020204" pitchFamily="34" charset="0"/>
+              <a:buChar char="•"/>
+              <a:tabLst/>
+              <a:defRPr/>
+            </a:pPr>
+            <a:r>
+              <a:rPr lang="en-US" dirty="0"/>
+              <a:t>In the body {"</a:t>
+            </a:r>
+            <a:r>
+              <a:rPr lang="en-US" dirty="0" err="1"/>
+              <a:t>imdata</a:t>
+            </a:r>
+            <a:r>
+              <a:rPr lang="en-US" dirty="0"/>
+              <a:t>":[{"</a:t>
+            </a:r>
+            <a:r>
+              <a:rPr lang="en-US" dirty="0" err="1"/>
+              <a:t>aaaLogin</a:t>
+            </a:r>
+            <a:r>
+              <a:rPr lang="en-US" dirty="0"/>
+              <a:t>":{"attributes":{"token":"</a:t>
+            </a:r>
+            <a:r>
+              <a:rPr lang="en-US" dirty="0" err="1"/>
+              <a:t>token_id</a:t>
+            </a:r>
+            <a:r>
+              <a:rPr lang="en-US" dirty="0"/>
+              <a:t>"}}}]}</a:t>
+            </a:r>
+          </a:p>
         </p:txBody>
       </p:sp>
       <p:sp>
@@ -5136,7 +5272,7 @@
     </p:spTree>
     <p:extLst>
       <p:ext uri="{BB962C8B-B14F-4D97-AF65-F5344CB8AC3E}">
-        <p14:creationId xmlns:p14="http://schemas.microsoft.com/office/powerpoint/2010/main" val="3252389655"/>
+        <p14:creationId xmlns:p14="http://schemas.microsoft.com/office/powerpoint/2010/main" val="10997211"/>
       </p:ext>
     </p:extLst>
   </p:cSld>
@@ -5658,6 +5794,618 @@
             <a:fld id="{020CF8D1-BA82-5045-ACF9-1AA42AD6A519}" type="slidenum">
               <a:rPr lang="en-US" smtClean="0"/>
               <a:t>73</a:t>
+            </a:fld>
+            <a:endParaRPr lang="en-US"/>
+          </a:p>
+        </p:txBody>
+      </p:sp>
+    </p:spTree>
+    <p:extLst>
+      <p:ext uri="{BB962C8B-B14F-4D97-AF65-F5344CB8AC3E}">
+        <p14:creationId xmlns:p14="http://schemas.microsoft.com/office/powerpoint/2010/main" val="2235399144"/>
+      </p:ext>
+    </p:extLst>
+  </p:cSld>
+  <p:clrMapOvr>
+    <a:masterClrMapping/>
+  </p:clrMapOvr>
+</p:notes>
+</file>
+
+<file path=ppt/notesSlides/notesSlide51.xml><?xml version="1.0" encoding="utf-8"?>
+<p:notes xmlns:a="http://schemas.openxmlformats.org/drawingml/2006/main" xmlns:r="http://schemas.openxmlformats.org/officeDocument/2006/relationships" xmlns:p="http://schemas.openxmlformats.org/presentationml/2006/main">
+  <p:cSld>
+    <p:spTree>
+      <p:nvGrpSpPr>
+        <p:cNvPr id="1" name=""/>
+        <p:cNvGrpSpPr/>
+        <p:nvPr/>
+      </p:nvGrpSpPr>
+      <p:grpSpPr>
+        <a:xfrm>
+          <a:off x="0" y="0"/>
+          <a:ext cx="0" cy="0"/>
+          <a:chOff x="0" y="0"/>
+          <a:chExt cx="0" cy="0"/>
+        </a:xfrm>
+      </p:grpSpPr>
+      <p:sp>
+        <p:nvSpPr>
+          <p:cNvPr id="2" name="Slide Image Placeholder 1"/>
+          <p:cNvSpPr>
+            <a:spLocks noGrp="1" noRot="1" noChangeAspect="1"/>
+          </p:cNvSpPr>
+          <p:nvPr>
+            <p:ph type="sldImg"/>
+          </p:nvPr>
+        </p:nvSpPr>
+        <p:spPr/>
+      </p:sp>
+      <p:sp>
+        <p:nvSpPr>
+          <p:cNvPr id="3" name="Notes Placeholder 2"/>
+          <p:cNvSpPr>
+            <a:spLocks noGrp="1"/>
+          </p:cNvSpPr>
+          <p:nvPr>
+            <p:ph type="body" idx="1"/>
+          </p:nvPr>
+        </p:nvSpPr>
+        <p:spPr/>
+        <p:txBody>
+          <a:bodyPr/>
+          <a:lstStyle/>
+          <a:p>
+            <a:pPr marL="0" marR="0" lvl="0" indent="0" algn="l" defTabSz="914400" rtl="0" eaLnBrk="1" fontAlgn="auto" latinLnBrk="0" hangingPunct="1">
+              <a:lnSpc>
+                <a:spcPct val="100000"/>
+              </a:lnSpc>
+              <a:spcBef>
+                <a:spcPts val="0"/>
+              </a:spcBef>
+              <a:spcAft>
+                <a:spcPts val="0"/>
+              </a:spcAft>
+              <a:buClrTx/>
+              <a:buSzTx/>
+              <a:buFontTx/>
+              <a:buNone/>
+              <a:tabLst/>
+              <a:defRPr/>
+            </a:pPr>
+            <a:endParaRPr lang="en-US" dirty="0"/>
+          </a:p>
+        </p:txBody>
+      </p:sp>
+      <p:sp>
+        <p:nvSpPr>
+          <p:cNvPr id="4" name="Slide Number Placeholder 3"/>
+          <p:cNvSpPr>
+            <a:spLocks noGrp="1"/>
+          </p:cNvSpPr>
+          <p:nvPr>
+            <p:ph type="sldNum" sz="quarter" idx="5"/>
+          </p:nvPr>
+        </p:nvSpPr>
+        <p:spPr/>
+        <p:txBody>
+          <a:bodyPr/>
+          <a:lstStyle/>
+          <a:p>
+            <a:fld id="{020CF8D1-BA82-5045-ACF9-1AA42AD6A519}" type="slidenum">
+              <a:rPr lang="en-US" smtClean="0"/>
+              <a:t>75</a:t>
+            </a:fld>
+            <a:endParaRPr lang="en-US"/>
+          </a:p>
+        </p:txBody>
+      </p:sp>
+    </p:spTree>
+    <p:extLst>
+      <p:ext uri="{BB962C8B-B14F-4D97-AF65-F5344CB8AC3E}">
+        <p14:creationId xmlns:p14="http://schemas.microsoft.com/office/powerpoint/2010/main" val="3696591209"/>
+      </p:ext>
+    </p:extLst>
+  </p:cSld>
+  <p:clrMapOvr>
+    <a:masterClrMapping/>
+  </p:clrMapOvr>
+</p:notes>
+</file>
+
+<file path=ppt/notesSlides/notesSlide52.xml><?xml version="1.0" encoding="utf-8"?>
+<p:notes xmlns:a="http://schemas.openxmlformats.org/drawingml/2006/main" xmlns:r="http://schemas.openxmlformats.org/officeDocument/2006/relationships" xmlns:p="http://schemas.openxmlformats.org/presentationml/2006/main">
+  <p:cSld>
+    <p:spTree>
+      <p:nvGrpSpPr>
+        <p:cNvPr id="1" name=""/>
+        <p:cNvGrpSpPr/>
+        <p:nvPr/>
+      </p:nvGrpSpPr>
+      <p:grpSpPr>
+        <a:xfrm>
+          <a:off x="0" y="0"/>
+          <a:ext cx="0" cy="0"/>
+          <a:chOff x="0" y="0"/>
+          <a:chExt cx="0" cy="0"/>
+        </a:xfrm>
+      </p:grpSpPr>
+      <p:sp>
+        <p:nvSpPr>
+          <p:cNvPr id="2" name="Slide Image Placeholder 1"/>
+          <p:cNvSpPr>
+            <a:spLocks noGrp="1" noRot="1" noChangeAspect="1"/>
+          </p:cNvSpPr>
+          <p:nvPr>
+            <p:ph type="sldImg"/>
+          </p:nvPr>
+        </p:nvSpPr>
+        <p:spPr/>
+      </p:sp>
+      <p:sp>
+        <p:nvSpPr>
+          <p:cNvPr id="3" name="Notes Placeholder 2"/>
+          <p:cNvSpPr>
+            <a:spLocks noGrp="1"/>
+          </p:cNvSpPr>
+          <p:nvPr>
+            <p:ph type="body" idx="1"/>
+          </p:nvPr>
+        </p:nvSpPr>
+        <p:spPr/>
+        <p:txBody>
+          <a:bodyPr/>
+          <a:lstStyle/>
+          <a:p>
+            <a:pPr marL="0" marR="0" lvl="0" indent="0" algn="l" defTabSz="914400" rtl="0" eaLnBrk="1" fontAlgn="auto" latinLnBrk="0" hangingPunct="1">
+              <a:lnSpc>
+                <a:spcPct val="100000"/>
+              </a:lnSpc>
+              <a:spcBef>
+                <a:spcPts val="0"/>
+              </a:spcBef>
+              <a:spcAft>
+                <a:spcPts val="0"/>
+              </a:spcAft>
+              <a:buClrTx/>
+              <a:buSzTx/>
+              <a:buFontTx/>
+              <a:buNone/>
+              <a:tabLst/>
+              <a:defRPr/>
+            </a:pPr>
+            <a:endParaRPr lang="en-US" dirty="0"/>
+          </a:p>
+        </p:txBody>
+      </p:sp>
+      <p:sp>
+        <p:nvSpPr>
+          <p:cNvPr id="4" name="Slide Number Placeholder 3"/>
+          <p:cNvSpPr>
+            <a:spLocks noGrp="1"/>
+          </p:cNvSpPr>
+          <p:nvPr>
+            <p:ph type="sldNum" sz="quarter" idx="5"/>
+          </p:nvPr>
+        </p:nvSpPr>
+        <p:spPr/>
+        <p:txBody>
+          <a:bodyPr/>
+          <a:lstStyle/>
+          <a:p>
+            <a:fld id="{020CF8D1-BA82-5045-ACF9-1AA42AD6A519}" type="slidenum">
+              <a:rPr lang="en-US" smtClean="0"/>
+              <a:t>77</a:t>
+            </a:fld>
+            <a:endParaRPr lang="en-US"/>
+          </a:p>
+        </p:txBody>
+      </p:sp>
+    </p:spTree>
+    <p:extLst>
+      <p:ext uri="{BB962C8B-B14F-4D97-AF65-F5344CB8AC3E}">
+        <p14:creationId xmlns:p14="http://schemas.microsoft.com/office/powerpoint/2010/main" val="3457428814"/>
+      </p:ext>
+    </p:extLst>
+  </p:cSld>
+  <p:clrMapOvr>
+    <a:masterClrMapping/>
+  </p:clrMapOvr>
+</p:notes>
+</file>
+
+<file path=ppt/notesSlides/notesSlide53.xml><?xml version="1.0" encoding="utf-8"?>
+<p:notes xmlns:a="http://schemas.openxmlformats.org/drawingml/2006/main" xmlns:r="http://schemas.openxmlformats.org/officeDocument/2006/relationships" xmlns:p="http://schemas.openxmlformats.org/presentationml/2006/main">
+  <p:cSld>
+    <p:spTree>
+      <p:nvGrpSpPr>
+        <p:cNvPr id="1" name=""/>
+        <p:cNvGrpSpPr/>
+        <p:nvPr/>
+      </p:nvGrpSpPr>
+      <p:grpSpPr>
+        <a:xfrm>
+          <a:off x="0" y="0"/>
+          <a:ext cx="0" cy="0"/>
+          <a:chOff x="0" y="0"/>
+          <a:chExt cx="0" cy="0"/>
+        </a:xfrm>
+      </p:grpSpPr>
+      <p:sp>
+        <p:nvSpPr>
+          <p:cNvPr id="2" name="Slide Image Placeholder 1"/>
+          <p:cNvSpPr>
+            <a:spLocks noGrp="1" noRot="1" noChangeAspect="1"/>
+          </p:cNvSpPr>
+          <p:nvPr>
+            <p:ph type="sldImg"/>
+          </p:nvPr>
+        </p:nvSpPr>
+        <p:spPr/>
+      </p:sp>
+      <p:sp>
+        <p:nvSpPr>
+          <p:cNvPr id="3" name="Notes Placeholder 2"/>
+          <p:cNvSpPr>
+            <a:spLocks noGrp="1"/>
+          </p:cNvSpPr>
+          <p:nvPr>
+            <p:ph type="body" idx="1"/>
+          </p:nvPr>
+        </p:nvSpPr>
+        <p:spPr/>
+        <p:txBody>
+          <a:bodyPr/>
+          <a:lstStyle/>
+          <a:p>
+            <a:pPr marL="0" marR="0" lvl="0" indent="0" algn="l" defTabSz="914400" rtl="0" eaLnBrk="1" fontAlgn="auto" latinLnBrk="0" hangingPunct="1">
+              <a:lnSpc>
+                <a:spcPct val="100000"/>
+              </a:lnSpc>
+              <a:spcBef>
+                <a:spcPts val="0"/>
+              </a:spcBef>
+              <a:spcAft>
+                <a:spcPts val="0"/>
+              </a:spcAft>
+              <a:buClrTx/>
+              <a:buSzTx/>
+              <a:buFontTx/>
+              <a:buNone/>
+              <a:tabLst/>
+              <a:defRPr/>
+            </a:pPr>
+            <a:endParaRPr lang="en-US" dirty="0"/>
+          </a:p>
+        </p:txBody>
+      </p:sp>
+      <p:sp>
+        <p:nvSpPr>
+          <p:cNvPr id="4" name="Slide Number Placeholder 3"/>
+          <p:cNvSpPr>
+            <a:spLocks noGrp="1"/>
+          </p:cNvSpPr>
+          <p:nvPr>
+            <p:ph type="sldNum" sz="quarter" idx="5"/>
+          </p:nvPr>
+        </p:nvSpPr>
+        <p:spPr/>
+        <p:txBody>
+          <a:bodyPr/>
+          <a:lstStyle/>
+          <a:p>
+            <a:fld id="{020CF8D1-BA82-5045-ACF9-1AA42AD6A519}" type="slidenum">
+              <a:rPr lang="en-US" smtClean="0"/>
+              <a:t>79</a:t>
+            </a:fld>
+            <a:endParaRPr lang="en-US"/>
+          </a:p>
+        </p:txBody>
+      </p:sp>
+    </p:spTree>
+    <p:extLst>
+      <p:ext uri="{BB962C8B-B14F-4D97-AF65-F5344CB8AC3E}">
+        <p14:creationId xmlns:p14="http://schemas.microsoft.com/office/powerpoint/2010/main" val="1624023553"/>
+      </p:ext>
+    </p:extLst>
+  </p:cSld>
+  <p:clrMapOvr>
+    <a:masterClrMapping/>
+  </p:clrMapOvr>
+</p:notes>
+</file>
+
+<file path=ppt/notesSlides/notesSlide54.xml><?xml version="1.0" encoding="utf-8"?>
+<p:notes xmlns:a="http://schemas.openxmlformats.org/drawingml/2006/main" xmlns:r="http://schemas.openxmlformats.org/officeDocument/2006/relationships" xmlns:p="http://schemas.openxmlformats.org/presentationml/2006/main">
+  <p:cSld>
+    <p:spTree>
+      <p:nvGrpSpPr>
+        <p:cNvPr id="1" name=""/>
+        <p:cNvGrpSpPr/>
+        <p:nvPr/>
+      </p:nvGrpSpPr>
+      <p:grpSpPr>
+        <a:xfrm>
+          <a:off x="0" y="0"/>
+          <a:ext cx="0" cy="0"/>
+          <a:chOff x="0" y="0"/>
+          <a:chExt cx="0" cy="0"/>
+        </a:xfrm>
+      </p:grpSpPr>
+      <p:sp>
+        <p:nvSpPr>
+          <p:cNvPr id="2" name="Slide Image Placeholder 1"/>
+          <p:cNvSpPr>
+            <a:spLocks noGrp="1" noRot="1" noChangeAspect="1"/>
+          </p:cNvSpPr>
+          <p:nvPr>
+            <p:ph type="sldImg"/>
+          </p:nvPr>
+        </p:nvSpPr>
+        <p:spPr/>
+      </p:sp>
+      <p:sp>
+        <p:nvSpPr>
+          <p:cNvPr id="3" name="Notes Placeholder 2"/>
+          <p:cNvSpPr>
+            <a:spLocks noGrp="1"/>
+          </p:cNvSpPr>
+          <p:nvPr>
+            <p:ph type="body" idx="1"/>
+          </p:nvPr>
+        </p:nvSpPr>
+        <p:spPr/>
+        <p:txBody>
+          <a:bodyPr/>
+          <a:lstStyle/>
+          <a:p>
+            <a:pPr marL="0" marR="0" lvl="0" indent="0" algn="l" defTabSz="914400" rtl="0" eaLnBrk="1" fontAlgn="auto" latinLnBrk="0" hangingPunct="1">
+              <a:lnSpc>
+                <a:spcPct val="100000"/>
+              </a:lnSpc>
+              <a:spcBef>
+                <a:spcPts val="0"/>
+              </a:spcBef>
+              <a:spcAft>
+                <a:spcPts val="0"/>
+              </a:spcAft>
+              <a:buClrTx/>
+              <a:buSzTx/>
+              <a:buFontTx/>
+              <a:buNone/>
+              <a:tabLst/>
+              <a:defRPr/>
+            </a:pPr>
+            <a:endParaRPr lang="en-US" dirty="0"/>
+          </a:p>
+        </p:txBody>
+      </p:sp>
+      <p:sp>
+        <p:nvSpPr>
+          <p:cNvPr id="4" name="Slide Number Placeholder 3"/>
+          <p:cNvSpPr>
+            <a:spLocks noGrp="1"/>
+          </p:cNvSpPr>
+          <p:nvPr>
+            <p:ph type="sldNum" sz="quarter" idx="5"/>
+          </p:nvPr>
+        </p:nvSpPr>
+        <p:spPr/>
+        <p:txBody>
+          <a:bodyPr/>
+          <a:lstStyle/>
+          <a:p>
+            <a:fld id="{020CF8D1-BA82-5045-ACF9-1AA42AD6A519}" type="slidenum">
+              <a:rPr lang="en-US" smtClean="0"/>
+              <a:t>81</a:t>
+            </a:fld>
+            <a:endParaRPr lang="en-US"/>
+          </a:p>
+        </p:txBody>
+      </p:sp>
+    </p:spTree>
+    <p:extLst>
+      <p:ext uri="{BB962C8B-B14F-4D97-AF65-F5344CB8AC3E}">
+        <p14:creationId xmlns:p14="http://schemas.microsoft.com/office/powerpoint/2010/main" val="2741533901"/>
+      </p:ext>
+    </p:extLst>
+  </p:cSld>
+  <p:clrMapOvr>
+    <a:masterClrMapping/>
+  </p:clrMapOvr>
+</p:notes>
+</file>
+
+<file path=ppt/notesSlides/notesSlide55.xml><?xml version="1.0" encoding="utf-8"?>
+<p:notes xmlns:a="http://schemas.openxmlformats.org/drawingml/2006/main" xmlns:r="http://schemas.openxmlformats.org/officeDocument/2006/relationships" xmlns:p="http://schemas.openxmlformats.org/presentationml/2006/main">
+  <p:cSld>
+    <p:spTree>
+      <p:nvGrpSpPr>
+        <p:cNvPr id="1" name=""/>
+        <p:cNvGrpSpPr/>
+        <p:nvPr/>
+      </p:nvGrpSpPr>
+      <p:grpSpPr>
+        <a:xfrm>
+          <a:off x="0" y="0"/>
+          <a:ext cx="0" cy="0"/>
+          <a:chOff x="0" y="0"/>
+          <a:chExt cx="0" cy="0"/>
+        </a:xfrm>
+      </p:grpSpPr>
+      <p:sp>
+        <p:nvSpPr>
+          <p:cNvPr id="2" name="Slide Image Placeholder 1"/>
+          <p:cNvSpPr>
+            <a:spLocks noGrp="1" noRot="1" noChangeAspect="1"/>
+          </p:cNvSpPr>
+          <p:nvPr>
+            <p:ph type="sldImg"/>
+          </p:nvPr>
+        </p:nvSpPr>
+        <p:spPr/>
+      </p:sp>
+      <p:sp>
+        <p:nvSpPr>
+          <p:cNvPr id="3" name="Notes Placeholder 2"/>
+          <p:cNvSpPr>
+            <a:spLocks noGrp="1"/>
+          </p:cNvSpPr>
+          <p:nvPr>
+            <p:ph type="body" idx="1"/>
+          </p:nvPr>
+        </p:nvSpPr>
+        <p:spPr/>
+        <p:txBody>
+          <a:bodyPr/>
+          <a:lstStyle/>
+          <a:p>
+            <a:pPr marL="0" marR="0" lvl="0" indent="0" algn="l" defTabSz="914400" rtl="0" eaLnBrk="1" fontAlgn="auto" latinLnBrk="0" hangingPunct="1">
+              <a:lnSpc>
+                <a:spcPct val="100000"/>
+              </a:lnSpc>
+              <a:spcBef>
+                <a:spcPts val="0"/>
+              </a:spcBef>
+              <a:spcAft>
+                <a:spcPts val="0"/>
+              </a:spcAft>
+              <a:buClrTx/>
+              <a:buSzTx/>
+              <a:buFontTx/>
+              <a:buNone/>
+              <a:tabLst/>
+              <a:defRPr/>
+            </a:pPr>
+            <a:r>
+              <a:rPr lang="en-US" dirty="0"/>
+              <a:t>// TODO</a:t>
+            </a:r>
+          </a:p>
+        </p:txBody>
+      </p:sp>
+      <p:sp>
+        <p:nvSpPr>
+          <p:cNvPr id="4" name="Slide Number Placeholder 3"/>
+          <p:cNvSpPr>
+            <a:spLocks noGrp="1"/>
+          </p:cNvSpPr>
+          <p:nvPr>
+            <p:ph type="sldNum" sz="quarter" idx="5"/>
+          </p:nvPr>
+        </p:nvSpPr>
+        <p:spPr/>
+        <p:txBody>
+          <a:bodyPr/>
+          <a:lstStyle/>
+          <a:p>
+            <a:fld id="{020CF8D1-BA82-5045-ACF9-1AA42AD6A519}" type="slidenum">
+              <a:rPr lang="en-US" smtClean="0"/>
+              <a:t>83</a:t>
+            </a:fld>
+            <a:endParaRPr lang="en-US"/>
+          </a:p>
+        </p:txBody>
+      </p:sp>
+    </p:spTree>
+    <p:extLst>
+      <p:ext uri="{BB962C8B-B14F-4D97-AF65-F5344CB8AC3E}">
+        <p14:creationId xmlns:p14="http://schemas.microsoft.com/office/powerpoint/2010/main" val="3252389655"/>
+      </p:ext>
+    </p:extLst>
+  </p:cSld>
+  <p:clrMapOvr>
+    <a:masterClrMapping/>
+  </p:clrMapOvr>
+</p:notes>
+</file>
+
+<file path=ppt/notesSlides/notesSlide56.xml><?xml version="1.0" encoding="utf-8"?>
+<p:notes xmlns:a="http://schemas.openxmlformats.org/drawingml/2006/main" xmlns:r="http://schemas.openxmlformats.org/officeDocument/2006/relationships" xmlns:p="http://schemas.openxmlformats.org/presentationml/2006/main">
+  <p:cSld>
+    <p:spTree>
+      <p:nvGrpSpPr>
+        <p:cNvPr id="1" name=""/>
+        <p:cNvGrpSpPr/>
+        <p:nvPr/>
+      </p:nvGrpSpPr>
+      <p:grpSpPr>
+        <a:xfrm>
+          <a:off x="0" y="0"/>
+          <a:ext cx="0" cy="0"/>
+          <a:chOff x="0" y="0"/>
+          <a:chExt cx="0" cy="0"/>
+        </a:xfrm>
+      </p:grpSpPr>
+      <p:sp>
+        <p:nvSpPr>
+          <p:cNvPr id="2" name="Slide Image Placeholder 1"/>
+          <p:cNvSpPr>
+            <a:spLocks noGrp="1" noRot="1" noChangeAspect="1"/>
+          </p:cNvSpPr>
+          <p:nvPr>
+            <p:ph type="sldImg"/>
+          </p:nvPr>
+        </p:nvSpPr>
+        <p:spPr/>
+      </p:sp>
+      <p:sp>
+        <p:nvSpPr>
+          <p:cNvPr id="3" name="Notes Placeholder 2"/>
+          <p:cNvSpPr>
+            <a:spLocks noGrp="1"/>
+          </p:cNvSpPr>
+          <p:nvPr>
+            <p:ph type="body" idx="1"/>
+          </p:nvPr>
+        </p:nvSpPr>
+        <p:spPr/>
+        <p:txBody>
+          <a:bodyPr/>
+          <a:lstStyle/>
+          <a:p>
+            <a:pPr marL="0" marR="0" lvl="0" indent="0" algn="l" defTabSz="914400" rtl="0" eaLnBrk="1" fontAlgn="auto" latinLnBrk="0" hangingPunct="1">
+              <a:lnSpc>
+                <a:spcPct val="100000"/>
+              </a:lnSpc>
+              <a:spcBef>
+                <a:spcPts val="0"/>
+              </a:spcBef>
+              <a:spcAft>
+                <a:spcPts val="0"/>
+              </a:spcAft>
+              <a:buClrTx/>
+              <a:buSzTx/>
+              <a:buFontTx/>
+              <a:buNone/>
+              <a:tabLst/>
+              <a:defRPr/>
+            </a:pPr>
+            <a:r>
+              <a:rPr lang="en-US" dirty="0"/>
+              <a:t>// TODO</a:t>
+            </a:r>
+          </a:p>
+        </p:txBody>
+      </p:sp>
+      <p:sp>
+        <p:nvSpPr>
+          <p:cNvPr id="4" name="Slide Number Placeholder 3"/>
+          <p:cNvSpPr>
+            <a:spLocks noGrp="1"/>
+          </p:cNvSpPr>
+          <p:nvPr>
+            <p:ph type="sldNum" sz="quarter" idx="5"/>
+          </p:nvPr>
+        </p:nvSpPr>
+        <p:spPr/>
+        <p:txBody>
+          <a:bodyPr/>
+          <a:lstStyle/>
+          <a:p>
+            <a:fld id="{020CF8D1-BA82-5045-ACF9-1AA42AD6A519}" type="slidenum">
+              <a:rPr lang="en-US" smtClean="0"/>
+              <a:t>85</a:t>
             </a:fld>
             <a:endParaRPr lang="en-US"/>
           </a:p>
@@ -33477,7 +34225,7 @@
                   <a:srgbClr val="FFFF00"/>
                 </a:solidFill>
               </a:rPr>
-              <a:t>header</a:t>
+              <a:t>body</a:t>
             </a:r>
             <a:r>
               <a:rPr lang="en-US" dirty="0"/>
@@ -43224,7 +43972,15 @@
             <a:pPr lvl="1"/>
             <a:r>
               <a:rPr lang="en-US" dirty="0"/>
-              <a:t>The 200 OK response will have an empty body</a:t>
+              <a:t>The </a:t>
+            </a:r>
+            <a:r>
+              <a:rPr lang="en-US" dirty="0" err="1"/>
+              <a:t>DevNet</a:t>
+            </a:r>
+            <a:r>
+              <a:rPr lang="en-US" dirty="0"/>
+              <a:t> Sandbox does not allow POST/PUT operations </a:t>
             </a:r>
           </a:p>
           <a:p>
@@ -43234,12 +43990,12 @@
               <a:t>The </a:t>
             </a:r>
             <a:r>
-              <a:rPr lang="en-US" dirty="0" err="1"/>
-              <a:t>DevNet</a:t>
+              <a:rPr lang="en-US" i="1" dirty="0"/>
+              <a:t>200 OK</a:t>
             </a:r>
             <a:r>
               <a:rPr lang="en-US" dirty="0"/>
-              <a:t> Sandbox does not allow POST/PUT operations</a:t>
+              <a:t> response will have an empty body</a:t>
             </a:r>
           </a:p>
           <a:p>
@@ -45658,7 +46414,7 @@
           <p:cNvPr id="2" name="Title 1">
             <a:extLst>
               <a:ext uri="{FF2B5EF4-FFF2-40B4-BE49-F238E27FC236}">
-                <a16:creationId xmlns:a16="http://schemas.microsoft.com/office/drawing/2014/main" id="{9D8D6E4C-FC36-3E4C-9387-96DD20072D9D}"/>
+                <a16:creationId xmlns:a16="http://schemas.microsoft.com/office/drawing/2014/main" id="{9B4DF7CD-7263-9840-AE80-6F1B7FA6AF3C}"/>
               </a:ext>
             </a:extLst>
           </p:cNvPr>
@@ -45666,32 +46422,39 @@
             <a:spLocks noGrp="1"/>
           </p:cNvSpPr>
           <p:nvPr>
-            <p:ph type="ctrTitle"/>
+            <p:ph type="title"/>
           </p:nvPr>
         </p:nvSpPr>
-        <p:spPr>
-          <a:xfrm>
-            <a:off x="1524000" y="914013"/>
-            <a:ext cx="9144000" cy="2387600"/>
-          </a:xfrm>
-        </p:spPr>
+        <p:spPr/>
         <p:txBody>
           <a:bodyPr/>
           <a:lstStyle/>
           <a:p>
             <a:r>
+              <a:rPr lang="en-US" dirty="0" err="1"/>
+              <a:t>cURL</a:t>
+            </a:r>
+            <a:r>
               <a:rPr lang="en-US" dirty="0"/>
-              <a:t>Part VI</a:t>
+              <a:t> – </a:t>
+            </a:r>
+            <a:r>
+              <a:rPr lang="en-US" dirty="0" err="1"/>
+              <a:t>DevNet</a:t>
+            </a:r>
+            <a:r>
+              <a:rPr lang="en-US" dirty="0"/>
+              <a:t> Always-On DNAC Sandbox</a:t>
             </a:r>
           </a:p>
         </p:txBody>
       </p:sp>
       <p:sp>
         <p:nvSpPr>
-          <p:cNvPr id="3" name="Subtitle 2">
+          <p:cNvPr id="3" name="Content Placeholder 2">
             <a:extLst>
               <a:ext uri="{FF2B5EF4-FFF2-40B4-BE49-F238E27FC236}">
-                <a16:creationId xmlns:a16="http://schemas.microsoft.com/office/drawing/2014/main" id="{0451A0DE-9D64-5A48-94B5-5B4E42709819}"/>
+                <a16:creationId xmlns:a16="http://schemas.microsoft.com/office/drawing/2014/main" id="{A610A140-16FE-F54F-9766-D3A50E4E4F0B}"/>
               </a:ext>
             </a:extLst>
           </p:cNvPr>
@@ -45699,30 +46462,368 @@
             <a:spLocks noGrp="1"/>
           </p:cNvSpPr>
           <p:nvPr>
-            <p:ph type="subTitle" idx="1"/>
+            <p:ph idx="1"/>
           </p:nvPr>
         </p:nvSpPr>
         <p:spPr>
           <a:xfrm>
-            <a:off x="1524000" y="3393688"/>
-            <a:ext cx="9144000" cy="1655762"/>
+            <a:off x="838199" y="1825625"/>
+            <a:ext cx="10667035" cy="4351338"/>
           </a:xfrm>
         </p:spPr>
         <p:txBody>
+          <a:bodyPr>
+            <a:normAutofit/>
+          </a:bodyPr>
+          <a:lstStyle/>
+          <a:p>
+            <a:r>
+              <a:rPr lang="en-US" dirty="0"/>
+              <a:t>Step 1 – Authenticate &amp; obtain a token</a:t>
+            </a:r>
+          </a:p>
+          <a:p>
+            <a:pPr marL="457200" lvl="1" indent="0">
+              <a:buNone/>
+            </a:pPr>
+            <a:r>
+              <a:rPr lang="en-US" b="1" i="1" dirty="0">
+                <a:solidFill>
+                  <a:srgbClr val="FFFF00"/>
+                </a:solidFill>
+              </a:rPr>
+              <a:t>curl -X POST -</a:t>
+            </a:r>
+            <a:r>
+              <a:rPr lang="en-US" b="1" i="1" dirty="0" err="1">
+                <a:solidFill>
+                  <a:srgbClr val="FFFF00"/>
+                </a:solidFill>
+              </a:rPr>
+              <a:t>iu</a:t>
+            </a:r>
+            <a:r>
+              <a:rPr lang="en-US" b="1" i="1" dirty="0">
+                <a:solidFill>
+                  <a:srgbClr val="FFFF00"/>
+                </a:solidFill>
+              </a:rPr>
+              <a:t> 'devnetuser:Cisco123!' -H 'Content-Type: application/json' \</a:t>
+            </a:r>
+          </a:p>
+          <a:p>
+            <a:pPr marL="457200" lvl="1" indent="0">
+              <a:buNone/>
+            </a:pPr>
+            <a:r>
+              <a:rPr lang="en-US" b="1" i="1" dirty="0">
+                <a:solidFill>
+                  <a:srgbClr val="FFFF00"/>
+                </a:solidFill>
+              </a:rPr>
+              <a:t>--</a:t>
+            </a:r>
+            <a:r>
+              <a:rPr lang="en-US" b="1" i="1" dirty="0" err="1">
+                <a:solidFill>
+                  <a:srgbClr val="FFFF00"/>
+                </a:solidFill>
+              </a:rPr>
+              <a:t>url</a:t>
+            </a:r>
+            <a:r>
+              <a:rPr lang="en-US" b="1" i="1" dirty="0">
+                <a:solidFill>
+                  <a:srgbClr val="FFFF00"/>
+                </a:solidFill>
+              </a:rPr>
+              <a:t> https://</a:t>
+            </a:r>
+            <a:r>
+              <a:rPr lang="en-US" b="1" i="1" dirty="0" err="1">
+                <a:solidFill>
+                  <a:srgbClr val="FFFF00"/>
+                </a:solidFill>
+              </a:rPr>
+              <a:t>sandboxdnac.cisco.com</a:t>
+            </a:r>
+            <a:r>
+              <a:rPr lang="en-US" b="1" i="1" dirty="0">
+                <a:solidFill>
+                  <a:srgbClr val="FFFF00"/>
+                </a:solidFill>
+              </a:rPr>
+              <a:t>/</a:t>
+            </a:r>
+            <a:r>
+              <a:rPr lang="en-US" b="1" i="1" dirty="0" err="1">
+                <a:solidFill>
+                  <a:srgbClr val="FFFF00"/>
+                </a:solidFill>
+              </a:rPr>
+              <a:t>dna</a:t>
+            </a:r>
+            <a:r>
+              <a:rPr lang="en-US" b="1" i="1" dirty="0">
+                <a:solidFill>
+                  <a:srgbClr val="FFFF00"/>
+                </a:solidFill>
+              </a:rPr>
+              <a:t>/system/</a:t>
+            </a:r>
+            <a:r>
+              <a:rPr lang="en-US" b="1" i="1" dirty="0" err="1">
+                <a:solidFill>
+                  <a:srgbClr val="FFFF00"/>
+                </a:solidFill>
+              </a:rPr>
+              <a:t>api</a:t>
+            </a:r>
+            <a:r>
+              <a:rPr lang="en-US" b="1" i="1" dirty="0">
+                <a:solidFill>
+                  <a:srgbClr val="FFFF00"/>
+                </a:solidFill>
+              </a:rPr>
+              <a:t>/v1/auth/token</a:t>
+            </a:r>
+          </a:p>
+          <a:p>
+            <a:pPr marL="457200" lvl="1" indent="0">
+              <a:buNone/>
+            </a:pPr>
+            <a:r>
+              <a:rPr lang="en-US" b="1" i="1" dirty="0">
+                <a:solidFill>
+                  <a:srgbClr val="FFFF00"/>
+                </a:solidFill>
+              </a:rPr>
+              <a:t>	</a:t>
+            </a:r>
+          </a:p>
+          <a:p>
+            <a:r>
+              <a:rPr lang="en-US" dirty="0"/>
+              <a:t>Step 2 – Store the token in an environment variable</a:t>
+            </a:r>
+          </a:p>
+          <a:p>
+            <a:pPr marL="457200" lvl="1" indent="0">
+              <a:buNone/>
+            </a:pPr>
+            <a:r>
+              <a:rPr lang="en-US" b="1" i="1" dirty="0">
+                <a:solidFill>
+                  <a:srgbClr val="FFFF00"/>
+                </a:solidFill>
+              </a:rPr>
+              <a:t>export DNAC_TOKEN=</a:t>
+            </a:r>
+            <a:r>
+              <a:rPr lang="en-US" b="1" i="1" dirty="0" err="1">
+                <a:solidFill>
+                  <a:srgbClr val="FF0000"/>
+                </a:solidFill>
+              </a:rPr>
+              <a:t>token_id</a:t>
+            </a:r>
+            <a:r>
+              <a:rPr lang="en-US" b="1" i="1" dirty="0">
+                <a:solidFill>
+                  <a:srgbClr val="FF0000"/>
+                </a:solidFill>
+              </a:rPr>
+              <a:t> </a:t>
+            </a:r>
+            <a:r>
+              <a:rPr lang="en-US" b="1" i="1" dirty="0"/>
+              <a:t># copy/paste the token from the response</a:t>
+            </a:r>
+          </a:p>
+          <a:p>
+            <a:pPr marL="457200" lvl="1" indent="0">
+              <a:buNone/>
+            </a:pPr>
+            <a:r>
+              <a:rPr lang="en-US" b="1" i="1" dirty="0"/>
+              <a:t>	</a:t>
+            </a:r>
+            <a:endParaRPr lang="en-US" dirty="0"/>
+          </a:p>
+          <a:p>
+            <a:r>
+              <a:rPr lang="en-US" dirty="0"/>
+              <a:t>Step 3 – Get a list of devices</a:t>
+            </a:r>
+          </a:p>
+          <a:p>
+            <a:pPr marL="457200" lvl="1" indent="0">
+              <a:buNone/>
+            </a:pPr>
+            <a:r>
+              <a:rPr lang="en-US" b="1" i="1" dirty="0">
+                <a:solidFill>
+                  <a:srgbClr val="FFFF00"/>
+                </a:solidFill>
+              </a:rPr>
+              <a:t>curl --</a:t>
+            </a:r>
+            <a:r>
+              <a:rPr lang="en-US" b="1" i="1" dirty="0" err="1">
+                <a:solidFill>
+                  <a:srgbClr val="FFFF00"/>
+                </a:solidFill>
+              </a:rPr>
+              <a:t>url</a:t>
+            </a:r>
+            <a:r>
+              <a:rPr lang="en-US" b="1" i="1" dirty="0">
+                <a:solidFill>
+                  <a:srgbClr val="FFFF00"/>
+                </a:solidFill>
+              </a:rPr>
+              <a:t> https://</a:t>
+            </a:r>
+            <a:r>
+              <a:rPr lang="en-US" b="1" i="1" dirty="0" err="1">
+                <a:solidFill>
+                  <a:srgbClr val="FFFF00"/>
+                </a:solidFill>
+              </a:rPr>
+              <a:t>sandboxdnac.cisco.com</a:t>
+            </a:r>
+            <a:r>
+              <a:rPr lang="en-US" b="1" i="1" dirty="0">
+                <a:solidFill>
+                  <a:srgbClr val="FFFF00"/>
+                </a:solidFill>
+              </a:rPr>
+              <a:t>/</a:t>
+            </a:r>
+            <a:r>
+              <a:rPr lang="en-US" b="1" i="1" dirty="0" err="1">
+                <a:solidFill>
+                  <a:srgbClr val="FFFF00"/>
+                </a:solidFill>
+              </a:rPr>
+              <a:t>dna</a:t>
+            </a:r>
+            <a:r>
+              <a:rPr lang="en-US" b="1" i="1" dirty="0">
+                <a:solidFill>
+                  <a:srgbClr val="FFFF00"/>
+                </a:solidFill>
+              </a:rPr>
+              <a:t>/intent/</a:t>
+            </a:r>
+            <a:r>
+              <a:rPr lang="en-US" b="1" i="1" dirty="0" err="1">
+                <a:solidFill>
+                  <a:srgbClr val="FFFF00"/>
+                </a:solidFill>
+              </a:rPr>
+              <a:t>api</a:t>
+            </a:r>
+            <a:r>
+              <a:rPr lang="en-US" b="1" i="1" dirty="0">
+                <a:solidFill>
+                  <a:srgbClr val="FFFF00"/>
+                </a:solidFill>
+              </a:rPr>
+              <a:t>/v1/network-device \</a:t>
+            </a:r>
+          </a:p>
+          <a:p>
+            <a:pPr marL="457200" lvl="1" indent="0">
+              <a:buNone/>
+            </a:pPr>
+            <a:r>
+              <a:rPr lang="en-US" b="1" i="1" dirty="0">
+                <a:solidFill>
+                  <a:srgbClr val="FFFF00"/>
+                </a:solidFill>
+              </a:rPr>
+              <a:t>-H 'Content-Type: application/json' -H 'X-Auth-Token:'$DNAC_TOKEN -</a:t>
+            </a:r>
+            <a:r>
+              <a:rPr lang="en-US" b="1" i="1" dirty="0" err="1">
+                <a:solidFill>
+                  <a:srgbClr val="FFFF00"/>
+                </a:solidFill>
+              </a:rPr>
+              <a:t>i</a:t>
+            </a:r>
+            <a:endParaRPr lang="en-US" b="1" i="1" dirty="0">
+              <a:solidFill>
+                <a:srgbClr val="FFFF00"/>
+              </a:solidFill>
+            </a:endParaRPr>
+          </a:p>
+        </p:txBody>
+      </p:sp>
+      <p:sp>
+        <p:nvSpPr>
+          <p:cNvPr id="4" name="Date Placeholder 3">
+            <a:extLst>
+              <a:ext uri="{FF2B5EF4-FFF2-40B4-BE49-F238E27FC236}">
+                <a16:creationId xmlns:a16="http://schemas.microsoft.com/office/drawing/2014/main" id="{D7D9528C-333D-BF4A-844C-7BCC7757E858}"/>
+              </a:ext>
+            </a:extLst>
+          </p:cNvPr>
+          <p:cNvSpPr>
+            <a:spLocks noGrp="1"/>
+          </p:cNvSpPr>
+          <p:nvPr>
+            <p:ph type="dt" sz="half" idx="10"/>
+          </p:nvPr>
+        </p:nvSpPr>
+        <p:spPr/>
+        <p:txBody>
           <a:bodyPr/>
           <a:lstStyle/>
           <a:p>
             <a:r>
-              <a:rPr lang="en-US" dirty="0"/>
-              <a:t>Interact With Cisco Platform APIs Using Python Requests</a:t>
-            </a:r>
+              <a:rPr lang="en-US"/>
+              <a:t>World Wide Technology ©</a:t>
+            </a:r>
+            <a:endParaRPr lang="en-US" dirty="0"/>
+          </a:p>
+        </p:txBody>
+      </p:sp>
+      <p:sp>
+        <p:nvSpPr>
+          <p:cNvPr id="5" name="Slide Number Placeholder 4">
+            <a:extLst>
+              <a:ext uri="{FF2B5EF4-FFF2-40B4-BE49-F238E27FC236}">
+                <a16:creationId xmlns:a16="http://schemas.microsoft.com/office/drawing/2014/main" id="{0798D1A2-1CD4-4A47-A0BC-C1215D1CD611}"/>
+              </a:ext>
+            </a:extLst>
+          </p:cNvPr>
+          <p:cNvSpPr>
+            <a:spLocks noGrp="1"/>
+          </p:cNvSpPr>
+          <p:nvPr>
+            <p:ph type="sldNum" sz="quarter" idx="12"/>
+          </p:nvPr>
+        </p:nvSpPr>
+        <p:spPr/>
+        <p:txBody>
+          <a:bodyPr/>
+          <a:lstStyle/>
+          <a:p>
+            <a:fld id="{A44B02FA-DD2D-1844-AE35-8B2EAB0CF4EF}" type="slidenum">
+              <a:rPr lang="en-US" smtClean="0"/>
+              <a:pPr/>
+              <a:t>71</a:t>
+            </a:fld>
+            <a:endParaRPr lang="en-US" dirty="0"/>
           </a:p>
         </p:txBody>
       </p:sp>
     </p:spTree>
     <p:extLst>
       <p:ext uri="{BB962C8B-B14F-4D97-AF65-F5344CB8AC3E}">
-        <p14:creationId xmlns:p14="http://schemas.microsoft.com/office/powerpoint/2010/main" val="4218248441"/>
+        <p14:creationId xmlns:p14="http://schemas.microsoft.com/office/powerpoint/2010/main" val="869520292"/>
       </p:ext>
     </p:extLst>
   </p:cSld>
@@ -45763,125 +46864,10 @@
       </p:grpSpPr>
       <p:sp>
         <p:nvSpPr>
-          <p:cNvPr id="2" name="Title 1">
-            <a:extLst>
-              <a:ext uri="{FF2B5EF4-FFF2-40B4-BE49-F238E27FC236}">
-                <a16:creationId xmlns:a16="http://schemas.microsoft.com/office/drawing/2014/main" id="{EB7C4089-1746-624B-8E73-D3DAB8E88CDD}"/>
-              </a:ext>
-            </a:extLst>
-          </p:cNvPr>
-          <p:cNvSpPr>
-            <a:spLocks noGrp="1"/>
-          </p:cNvSpPr>
-          <p:nvPr>
-            <p:ph type="title"/>
-          </p:nvPr>
-        </p:nvSpPr>
-        <p:spPr/>
-        <p:txBody>
-          <a:bodyPr/>
-          <a:lstStyle/>
-          <a:p>
-            <a:r>
-              <a:rPr lang="en-US" dirty="0"/>
-              <a:t>Outline</a:t>
-            </a:r>
-          </a:p>
-        </p:txBody>
-      </p:sp>
-      <p:sp>
-        <p:nvSpPr>
-          <p:cNvPr id="3" name="Content Placeholder 2">
-            <a:extLst>
-              <a:ext uri="{FF2B5EF4-FFF2-40B4-BE49-F238E27FC236}">
-                <a16:creationId xmlns:a16="http://schemas.microsoft.com/office/drawing/2014/main" id="{65426B10-0364-A849-B3A4-1D0DA409155A}"/>
-              </a:ext>
-            </a:extLst>
-          </p:cNvPr>
-          <p:cNvSpPr>
-            <a:spLocks noGrp="1"/>
-          </p:cNvSpPr>
-          <p:nvPr>
-            <p:ph idx="1"/>
-          </p:nvPr>
-        </p:nvSpPr>
-        <p:spPr/>
-        <p:txBody>
-          <a:bodyPr/>
-          <a:lstStyle/>
-          <a:p>
-            <a:r>
-              <a:rPr lang="en-US" dirty="0"/>
-              <a:t>For each of these platforms:</a:t>
-            </a:r>
-          </a:p>
-          <a:p>
-            <a:pPr lvl="1"/>
-            <a:r>
-              <a:rPr lang="en-US" dirty="0"/>
-              <a:t>ACI</a:t>
-            </a:r>
-          </a:p>
-          <a:p>
-            <a:pPr lvl="1"/>
-            <a:r>
-              <a:rPr lang="en-US" dirty="0"/>
-              <a:t>DNAC</a:t>
-            </a:r>
-          </a:p>
-          <a:p>
-            <a:pPr lvl="1"/>
-            <a:r>
-              <a:rPr lang="en-US" dirty="0"/>
-              <a:t>Meraki</a:t>
-            </a:r>
-          </a:p>
-          <a:p>
-            <a:pPr lvl="1"/>
-            <a:r>
-              <a:rPr lang="en-US" dirty="0" err="1"/>
-              <a:t>Webex</a:t>
-            </a:r>
-            <a:r>
-              <a:rPr lang="en-US" dirty="0"/>
-              <a:t> Teams</a:t>
-            </a:r>
-          </a:p>
-          <a:p>
-            <a:r>
-              <a:rPr lang="en-US" dirty="0"/>
-              <a:t>Perform the following tasks:</a:t>
-            </a:r>
-          </a:p>
-          <a:p>
-            <a:pPr lvl="1"/>
-            <a:r>
-              <a:rPr lang="en-US" dirty="0"/>
-              <a:t>Review authentication methodology</a:t>
-            </a:r>
-          </a:p>
-          <a:p>
-            <a:pPr lvl="1"/>
-            <a:r>
-              <a:rPr lang="en-US" dirty="0"/>
-              <a:t>Build Python scripts to authenticate</a:t>
-            </a:r>
-          </a:p>
-          <a:p>
-            <a:pPr lvl="1"/>
-            <a:r>
-              <a:rPr lang="en-US" dirty="0"/>
-              <a:t>Build Python scripts to read/write data</a:t>
-            </a:r>
-          </a:p>
-        </p:txBody>
-      </p:sp>
-      <p:sp>
-        <p:nvSpPr>
           <p:cNvPr id="4" name="Date Placeholder 3">
             <a:extLst>
               <a:ext uri="{FF2B5EF4-FFF2-40B4-BE49-F238E27FC236}">
-                <a16:creationId xmlns:a16="http://schemas.microsoft.com/office/drawing/2014/main" id="{7ECEAF79-F4AC-E94E-9E55-220D0D396924}"/>
+                <a16:creationId xmlns:a16="http://schemas.microsoft.com/office/drawing/2014/main" id="{0CD670A9-B06A-3448-BABA-FAD627500859}"/>
               </a:ext>
             </a:extLst>
           </p:cNvPr>
@@ -45910,7 +46896,7 @@
           <p:cNvPr id="5" name="Slide Number Placeholder 4">
             <a:extLst>
               <a:ext uri="{FF2B5EF4-FFF2-40B4-BE49-F238E27FC236}">
-                <a16:creationId xmlns:a16="http://schemas.microsoft.com/office/drawing/2014/main" id="{372DC1A4-CE8B-DB4A-8F86-2508518C35D3}"/>
+                <a16:creationId xmlns:a16="http://schemas.microsoft.com/office/drawing/2014/main" id="{119DACAD-17C1-C249-A498-C4A1A1ADD334}"/>
               </a:ext>
             </a:extLst>
           </p:cNvPr>
@@ -45938,7 +46924,7 @@
     </p:spTree>
     <p:extLst>
       <p:ext uri="{BB962C8B-B14F-4D97-AF65-F5344CB8AC3E}">
-        <p14:creationId xmlns:p14="http://schemas.microsoft.com/office/powerpoint/2010/main" val="232106193"/>
+        <p14:creationId xmlns:p14="http://schemas.microsoft.com/office/powerpoint/2010/main" val="1057143513"/>
       </p:ext>
     </p:extLst>
   </p:cSld>
@@ -45982,7 +46968,7 @@
           <p:cNvPr id="2" name="Title 1">
             <a:extLst>
               <a:ext uri="{FF2B5EF4-FFF2-40B4-BE49-F238E27FC236}">
-                <a16:creationId xmlns:a16="http://schemas.microsoft.com/office/drawing/2014/main" id="{9D8D6E4C-FC36-3E4C-9387-96DD20072D9D}"/>
+                <a16:creationId xmlns:a16="http://schemas.microsoft.com/office/drawing/2014/main" id="{9B4DF7CD-7263-9840-AE80-6F1B7FA6AF3C}"/>
               </a:ext>
             </a:extLst>
           </p:cNvPr>
@@ -45990,32 +46976,39 @@
             <a:spLocks noGrp="1"/>
           </p:cNvSpPr>
           <p:nvPr>
-            <p:ph type="ctrTitle"/>
+            <p:ph type="title"/>
           </p:nvPr>
         </p:nvSpPr>
-        <p:spPr>
-          <a:xfrm>
-            <a:off x="1524000" y="914013"/>
-            <a:ext cx="9144000" cy="2387600"/>
-          </a:xfrm>
-        </p:spPr>
+        <p:spPr/>
         <p:txBody>
           <a:bodyPr/>
           <a:lstStyle/>
           <a:p>
             <a:r>
+              <a:rPr lang="en-US" dirty="0" err="1"/>
+              <a:t>cURL</a:t>
+            </a:r>
+            <a:r>
               <a:rPr lang="en-US" dirty="0"/>
-              <a:t>Part VII</a:t>
+              <a:t> – </a:t>
+            </a:r>
+            <a:r>
+              <a:rPr lang="en-US" dirty="0" err="1"/>
+              <a:t>DevNet</a:t>
+            </a:r>
+            <a:r>
+              <a:rPr lang="en-US" dirty="0"/>
+              <a:t> Always-On DNAC Sandbox</a:t>
             </a:r>
           </a:p>
         </p:txBody>
       </p:sp>
       <p:sp>
         <p:nvSpPr>
-          <p:cNvPr id="3" name="Subtitle 2">
+          <p:cNvPr id="3" name="Content Placeholder 2">
             <a:extLst>
               <a:ext uri="{FF2B5EF4-FFF2-40B4-BE49-F238E27FC236}">
-                <a16:creationId xmlns:a16="http://schemas.microsoft.com/office/drawing/2014/main" id="{0451A0DE-9D64-5A48-94B5-5B4E42709819}"/>
+                <a16:creationId xmlns:a16="http://schemas.microsoft.com/office/drawing/2014/main" id="{A610A140-16FE-F54F-9766-D3A50E4E4F0B}"/>
               </a:ext>
             </a:extLst>
           </p:cNvPr>
@@ -46023,13 +47016,13 @@
             <a:spLocks noGrp="1"/>
           </p:cNvSpPr>
           <p:nvPr>
-            <p:ph type="subTitle" idx="1"/>
+            <p:ph idx="1"/>
           </p:nvPr>
         </p:nvSpPr>
         <p:spPr>
           <a:xfrm>
-            <a:off x="1524000" y="3393688"/>
-            <a:ext cx="9144000" cy="1655762"/>
+            <a:off x="838199" y="1825625"/>
+            <a:ext cx="10667035" cy="4351338"/>
           </a:xfrm>
         </p:spPr>
         <p:txBody>
@@ -46038,15 +47031,323 @@
           <a:p>
             <a:r>
               <a:rPr lang="en-US" dirty="0"/>
-              <a:t>Quiz, Practice Resources, &amp; References</a:t>
-            </a:r>
+              <a:t>Step 4 – Run a ‘show version’ command on a device</a:t>
+            </a:r>
+          </a:p>
+          <a:p>
+            <a:pPr marL="457200" lvl="1" indent="0">
+              <a:buNone/>
+            </a:pPr>
+            <a:r>
+              <a:rPr lang="en-US" b="1" i="1" dirty="0">
+                <a:solidFill>
+                  <a:srgbClr val="FFFF00"/>
+                </a:solidFill>
+              </a:rPr>
+              <a:t>curl -</a:t>
+            </a:r>
+            <a:r>
+              <a:rPr lang="en-US" b="1" i="1" dirty="0" err="1">
+                <a:solidFill>
+                  <a:srgbClr val="FFFF00"/>
+                </a:solidFill>
+              </a:rPr>
+              <a:t>iX</a:t>
+            </a:r>
+            <a:r>
+              <a:rPr lang="en-US" b="1" i="1" dirty="0">
+                <a:solidFill>
+                  <a:srgbClr val="FFFF00"/>
+                </a:solidFill>
+              </a:rPr>
+              <a:t> POST \</a:t>
+            </a:r>
+          </a:p>
+          <a:p>
+            <a:pPr marL="457200" lvl="1" indent="0">
+              <a:buNone/>
+            </a:pPr>
+            <a:r>
+              <a:rPr lang="en-US" b="1" i="1" dirty="0">
+                <a:solidFill>
+                  <a:srgbClr val="FFFF00"/>
+                </a:solidFill>
+              </a:rPr>
+              <a:t>-H 'Content-Type: application/json' -H 'X-Auth-Token:'$DNAC_TOKEN \</a:t>
+            </a:r>
+          </a:p>
+          <a:p>
+            <a:pPr marL="457200" lvl="1" indent="0">
+              <a:buNone/>
+            </a:pPr>
+            <a:r>
+              <a:rPr lang="en-US" b="1" i="1" dirty="0">
+                <a:solidFill>
+                  <a:srgbClr val="FFFF00"/>
+                </a:solidFill>
+              </a:rPr>
+              <a:t>--</a:t>
+            </a:r>
+            <a:r>
+              <a:rPr lang="en-US" b="1" i="1" dirty="0" err="1">
+                <a:solidFill>
+                  <a:srgbClr val="FFFF00"/>
+                </a:solidFill>
+              </a:rPr>
+              <a:t>url</a:t>
+            </a:r>
+            <a:r>
+              <a:rPr lang="en-US" b="1" i="1" dirty="0">
+                <a:solidFill>
+                  <a:srgbClr val="FFFF00"/>
+                </a:solidFill>
+              </a:rPr>
+              <a:t> https://</a:t>
+            </a:r>
+            <a:r>
+              <a:rPr lang="en-US" b="1" i="1" dirty="0" err="1">
+                <a:solidFill>
+                  <a:srgbClr val="FFFF00"/>
+                </a:solidFill>
+              </a:rPr>
+              <a:t>sandboxdnac.cisco.com</a:t>
+            </a:r>
+            <a:r>
+              <a:rPr lang="en-US" b="1" i="1" dirty="0">
+                <a:solidFill>
+                  <a:srgbClr val="FFFF00"/>
+                </a:solidFill>
+              </a:rPr>
+              <a:t>/</a:t>
+            </a:r>
+            <a:r>
+              <a:rPr lang="en-US" b="1" i="1" dirty="0" err="1">
+                <a:solidFill>
+                  <a:srgbClr val="FFFF00"/>
+                </a:solidFill>
+              </a:rPr>
+              <a:t>dna</a:t>
+            </a:r>
+            <a:r>
+              <a:rPr lang="en-US" b="1" i="1" dirty="0">
+                <a:solidFill>
+                  <a:srgbClr val="FFFF00"/>
+                </a:solidFill>
+              </a:rPr>
+              <a:t>/intent/</a:t>
+            </a:r>
+            <a:r>
+              <a:rPr lang="en-US" b="1" i="1" dirty="0" err="1">
+                <a:solidFill>
+                  <a:srgbClr val="FFFF00"/>
+                </a:solidFill>
+              </a:rPr>
+              <a:t>api</a:t>
+            </a:r>
+            <a:r>
+              <a:rPr lang="en-US" b="1" i="1" dirty="0">
+                <a:solidFill>
+                  <a:srgbClr val="FFFF00"/>
+                </a:solidFill>
+              </a:rPr>
+              <a:t>/v1/network-device-</a:t>
+            </a:r>
+            <a:r>
+              <a:rPr lang="en-US" b="1" i="1" dirty="0" err="1">
+                <a:solidFill>
+                  <a:srgbClr val="FFFF00"/>
+                </a:solidFill>
+              </a:rPr>
+              <a:t>poller</a:t>
+            </a:r>
+            <a:r>
+              <a:rPr lang="en-US" b="1" i="1" dirty="0">
+                <a:solidFill>
+                  <a:srgbClr val="FFFF00"/>
+                </a:solidFill>
+              </a:rPr>
+              <a:t>/cli/read-request \</a:t>
+            </a:r>
+          </a:p>
+          <a:p>
+            <a:pPr marL="457200" lvl="1" indent="0">
+              <a:buNone/>
+            </a:pPr>
+            <a:r>
+              <a:rPr lang="en-US" b="1" i="1" dirty="0">
+                <a:solidFill>
+                  <a:srgbClr val="FFFF00"/>
+                </a:solidFill>
+              </a:rPr>
+              <a:t>--data '{"</a:t>
+            </a:r>
+            <a:r>
+              <a:rPr lang="en-US" b="1" i="1" dirty="0" err="1">
+                <a:solidFill>
+                  <a:srgbClr val="FFFF00"/>
+                </a:solidFill>
+              </a:rPr>
+              <a:t>name":"show</a:t>
+            </a:r>
+            <a:r>
+              <a:rPr lang="en-US" b="1" i="1" dirty="0">
+                <a:solidFill>
+                  <a:srgbClr val="FFFF00"/>
+                </a:solidFill>
+              </a:rPr>
+              <a:t> </a:t>
+            </a:r>
+            <a:r>
+              <a:rPr lang="en-US" b="1" i="1" dirty="0" err="1">
+                <a:solidFill>
+                  <a:srgbClr val="FFFF00"/>
+                </a:solidFill>
+              </a:rPr>
+              <a:t>ver</a:t>
+            </a:r>
+            <a:r>
+              <a:rPr lang="en-US" b="1" i="1" dirty="0">
+                <a:solidFill>
+                  <a:srgbClr val="FFFF00"/>
+                </a:solidFill>
+              </a:rPr>
+              <a:t>","commands":["show </a:t>
+            </a:r>
+            <a:r>
+              <a:rPr lang="en-US" b="1" i="1" dirty="0" err="1">
+                <a:solidFill>
+                  <a:srgbClr val="FFFF00"/>
+                </a:solidFill>
+              </a:rPr>
+              <a:t>ver</a:t>
+            </a:r>
+            <a:r>
+              <a:rPr lang="en-US" b="1" i="1" dirty="0">
+                <a:solidFill>
+                  <a:srgbClr val="FFFF00"/>
+                </a:solidFill>
+              </a:rPr>
+              <a:t>"],"</a:t>
+            </a:r>
+            <a:r>
+              <a:rPr lang="en-US" b="1" i="1" dirty="0" err="1">
+                <a:solidFill>
+                  <a:srgbClr val="FFFF00"/>
+                </a:solidFill>
+              </a:rPr>
+              <a:t>deviceUuids</a:t>
+            </a:r>
+            <a:r>
+              <a:rPr lang="en-US" b="1" i="1" dirty="0">
+                <a:solidFill>
+                  <a:srgbClr val="FFFF00"/>
+                </a:solidFill>
+              </a:rPr>
+              <a:t>":["3e48558a-237a-4bca-8823-0580b88c6acf"]}'</a:t>
+            </a:r>
+          </a:p>
+          <a:p>
+            <a:pPr lvl="1"/>
+            <a:endParaRPr lang="en-US" dirty="0"/>
+          </a:p>
+          <a:p>
+            <a:pPr lvl="1"/>
+            <a:r>
+              <a:rPr lang="en-US" dirty="0"/>
+              <a:t>The </a:t>
+            </a:r>
+            <a:r>
+              <a:rPr lang="en-US" dirty="0" err="1"/>
+              <a:t>DevNet</a:t>
+            </a:r>
+            <a:r>
+              <a:rPr lang="en-US" dirty="0"/>
+              <a:t> Sandbox does not allow POST/PUT operations </a:t>
+            </a:r>
+          </a:p>
+          <a:p>
+            <a:pPr lvl="1"/>
+            <a:r>
+              <a:rPr lang="en-US" dirty="0"/>
+              <a:t>The response code and reason will be </a:t>
+            </a:r>
+            <a:r>
+              <a:rPr lang="en-US" i="1" dirty="0"/>
+              <a:t>403 Forbidden</a:t>
+            </a:r>
+          </a:p>
+          <a:p>
+            <a:pPr lvl="1"/>
+            <a:r>
+              <a:rPr lang="en-US" dirty="0"/>
+              <a:t>A live DNAC system will return JSON data with new Tenant details</a:t>
+            </a:r>
+          </a:p>
+        </p:txBody>
+      </p:sp>
+      <p:sp>
+        <p:nvSpPr>
+          <p:cNvPr id="4" name="Date Placeholder 3">
+            <a:extLst>
+              <a:ext uri="{FF2B5EF4-FFF2-40B4-BE49-F238E27FC236}">
+                <a16:creationId xmlns:a16="http://schemas.microsoft.com/office/drawing/2014/main" id="{D7D9528C-333D-BF4A-844C-7BCC7757E858}"/>
+              </a:ext>
+            </a:extLst>
+          </p:cNvPr>
+          <p:cNvSpPr>
+            <a:spLocks noGrp="1"/>
+          </p:cNvSpPr>
+          <p:nvPr>
+            <p:ph type="dt" sz="half" idx="10"/>
+          </p:nvPr>
+        </p:nvSpPr>
+        <p:spPr/>
+        <p:txBody>
+          <a:bodyPr/>
+          <a:lstStyle/>
+          <a:p>
+            <a:r>
+              <a:rPr lang="en-US"/>
+              <a:t>World Wide Technology ©</a:t>
+            </a:r>
+            <a:endParaRPr lang="en-US" dirty="0"/>
+          </a:p>
+        </p:txBody>
+      </p:sp>
+      <p:sp>
+        <p:nvSpPr>
+          <p:cNvPr id="5" name="Slide Number Placeholder 4">
+            <a:extLst>
+              <a:ext uri="{FF2B5EF4-FFF2-40B4-BE49-F238E27FC236}">
+                <a16:creationId xmlns:a16="http://schemas.microsoft.com/office/drawing/2014/main" id="{0798D1A2-1CD4-4A47-A0BC-C1215D1CD611}"/>
+              </a:ext>
+            </a:extLst>
+          </p:cNvPr>
+          <p:cNvSpPr>
+            <a:spLocks noGrp="1"/>
+          </p:cNvSpPr>
+          <p:nvPr>
+            <p:ph type="sldNum" sz="quarter" idx="12"/>
+          </p:nvPr>
+        </p:nvSpPr>
+        <p:spPr/>
+        <p:txBody>
+          <a:bodyPr/>
+          <a:lstStyle/>
+          <a:p>
+            <a:fld id="{A44B02FA-DD2D-1844-AE35-8B2EAB0CF4EF}" type="slidenum">
+              <a:rPr lang="en-US" smtClean="0"/>
+              <a:pPr/>
+              <a:t>73</a:t>
+            </a:fld>
+            <a:endParaRPr lang="en-US" dirty="0"/>
           </a:p>
         </p:txBody>
       </p:sp>
     </p:spTree>
     <p:extLst>
       <p:ext uri="{BB962C8B-B14F-4D97-AF65-F5344CB8AC3E}">
-        <p14:creationId xmlns:p14="http://schemas.microsoft.com/office/powerpoint/2010/main" val="3392886013"/>
+        <p14:creationId xmlns:p14="http://schemas.microsoft.com/office/powerpoint/2010/main" val="3118696803"/>
       </p:ext>
     </p:extLst>
   </p:cSld>
@@ -46087,66 +47388,10 @@
       </p:grpSpPr>
       <p:sp>
         <p:nvSpPr>
-          <p:cNvPr id="2" name="Title 1">
-            <a:extLst>
-              <a:ext uri="{FF2B5EF4-FFF2-40B4-BE49-F238E27FC236}">
-                <a16:creationId xmlns:a16="http://schemas.microsoft.com/office/drawing/2014/main" id="{EB7C4089-1746-624B-8E73-D3DAB8E88CDD}"/>
-              </a:ext>
-            </a:extLst>
-          </p:cNvPr>
-          <p:cNvSpPr>
-            <a:spLocks noGrp="1"/>
-          </p:cNvSpPr>
-          <p:nvPr>
-            <p:ph type="title"/>
-          </p:nvPr>
-        </p:nvSpPr>
-        <p:spPr/>
-        <p:txBody>
-          <a:bodyPr/>
-          <a:lstStyle/>
-          <a:p>
-            <a:r>
-              <a:rPr lang="en-US" dirty="0"/>
-              <a:t>Slide Template</a:t>
-            </a:r>
-          </a:p>
-        </p:txBody>
-      </p:sp>
-      <p:sp>
-        <p:nvSpPr>
-          <p:cNvPr id="3" name="Content Placeholder 2">
-            <a:extLst>
-              <a:ext uri="{FF2B5EF4-FFF2-40B4-BE49-F238E27FC236}">
-                <a16:creationId xmlns:a16="http://schemas.microsoft.com/office/drawing/2014/main" id="{65426B10-0364-A849-B3A4-1D0DA409155A}"/>
-              </a:ext>
-            </a:extLst>
-          </p:cNvPr>
-          <p:cNvSpPr>
-            <a:spLocks noGrp="1"/>
-          </p:cNvSpPr>
-          <p:nvPr>
-            <p:ph idx="1"/>
-          </p:nvPr>
-        </p:nvSpPr>
-        <p:spPr/>
-        <p:txBody>
-          <a:bodyPr/>
-          <a:lstStyle/>
-          <a:p>
-            <a:r>
-              <a:rPr lang="en-US" dirty="0"/>
-              <a:t>Body template</a:t>
-            </a:r>
-          </a:p>
-        </p:txBody>
-      </p:sp>
-      <p:sp>
-        <p:nvSpPr>
           <p:cNvPr id="4" name="Date Placeholder 3">
             <a:extLst>
               <a:ext uri="{FF2B5EF4-FFF2-40B4-BE49-F238E27FC236}">
-                <a16:creationId xmlns:a16="http://schemas.microsoft.com/office/drawing/2014/main" id="{7ECEAF79-F4AC-E94E-9E55-220D0D396924}"/>
+                <a16:creationId xmlns:a16="http://schemas.microsoft.com/office/drawing/2014/main" id="{0CD670A9-B06A-3448-BABA-FAD627500859}"/>
               </a:ext>
             </a:extLst>
           </p:cNvPr>
@@ -46175,7 +47420,7 @@
           <p:cNvPr id="5" name="Slide Number Placeholder 4">
             <a:extLst>
               <a:ext uri="{FF2B5EF4-FFF2-40B4-BE49-F238E27FC236}">
-                <a16:creationId xmlns:a16="http://schemas.microsoft.com/office/drawing/2014/main" id="{372DC1A4-CE8B-DB4A-8F86-2508518C35D3}"/>
+                <a16:creationId xmlns:a16="http://schemas.microsoft.com/office/drawing/2014/main" id="{119DACAD-17C1-C249-A498-C4A1A1ADD334}"/>
               </a:ext>
             </a:extLst>
           </p:cNvPr>
@@ -46203,7 +47448,7 @@
     </p:spTree>
     <p:extLst>
       <p:ext uri="{BB962C8B-B14F-4D97-AF65-F5344CB8AC3E}">
-        <p14:creationId xmlns:p14="http://schemas.microsoft.com/office/powerpoint/2010/main" val="2709408928"/>
+        <p14:creationId xmlns:p14="http://schemas.microsoft.com/office/powerpoint/2010/main" val="368496199"/>
       </p:ext>
     </p:extLst>
   </p:cSld>
@@ -46247,7 +47492,7 @@
           <p:cNvPr id="2" name="Title 1">
             <a:extLst>
               <a:ext uri="{FF2B5EF4-FFF2-40B4-BE49-F238E27FC236}">
-                <a16:creationId xmlns:a16="http://schemas.microsoft.com/office/drawing/2014/main" id="{EB7C4089-1746-624B-8E73-D3DAB8E88CDD}"/>
+                <a16:creationId xmlns:a16="http://schemas.microsoft.com/office/drawing/2014/main" id="{9B4DF7CD-7263-9840-AE80-6F1B7FA6AF3C}"/>
               </a:ext>
             </a:extLst>
           </p:cNvPr>
@@ -46265,7 +47510,15 @@
           <a:p>
             <a:r>
               <a:rPr lang="en-US" dirty="0"/>
-              <a:t>References</a:t>
+              <a:t>Python – </a:t>
+            </a:r>
+            <a:r>
+              <a:rPr lang="en-US" dirty="0" err="1"/>
+              <a:t>DevNet</a:t>
+            </a:r>
+            <a:r>
+              <a:rPr lang="en-US" dirty="0"/>
+              <a:t> Always-On DNAC Sandbox</a:t>
             </a:r>
           </a:p>
         </p:txBody>
@@ -46275,7 +47528,7 @@
           <p:cNvPr id="3" name="Content Placeholder 2">
             <a:extLst>
               <a:ext uri="{FF2B5EF4-FFF2-40B4-BE49-F238E27FC236}">
-                <a16:creationId xmlns:a16="http://schemas.microsoft.com/office/drawing/2014/main" id="{65426B10-0364-A849-B3A4-1D0DA409155A}"/>
+                <a16:creationId xmlns:a16="http://schemas.microsoft.com/office/drawing/2014/main" id="{A610A140-16FE-F54F-9766-D3A50E4E4F0B}"/>
               </a:ext>
             </a:extLst>
           </p:cNvPr>
@@ -46289,81 +47542,353 @@
         <p:spPr/>
         <p:txBody>
           <a:bodyPr>
-            <a:normAutofit fontScale="92500"/>
+            <a:normAutofit/>
           </a:bodyPr>
           <a:lstStyle/>
           <a:p>
             <a:r>
-              <a:rPr lang="en-US" dirty="0">
-                <a:hlinkClick r:id="rId2"/>
-              </a:rPr>
-              <a:t>https://www.linkedin.com/pulse/why-rest-api-so-popular-mangesh-bulkar/</a:t>
-            </a:r>
-            <a:endParaRPr lang="en-US" dirty="0">
-              <a:hlinkClick r:id="rId3"/>
-            </a:endParaRPr>
-          </a:p>
-          <a:p>
-            <a:r>
-              <a:rPr lang="en-US" dirty="0">
-                <a:hlinkClick r:id="rId3"/>
-              </a:rPr>
-              <a:t>https://en.wikipedia.org/wiki/CURL</a:t>
-            </a:r>
-            <a:endParaRPr lang="en-US" dirty="0"/>
-          </a:p>
-          <a:p>
-            <a:r>
-              <a:rPr lang="en-US" dirty="0">
-                <a:hlinkClick r:id="rId4"/>
-              </a:rPr>
-              <a:t>https://en.wikipedia.org/wiki/Requests_%28software%29</a:t>
-            </a:r>
-            <a:endParaRPr lang="en-US" dirty="0"/>
-          </a:p>
-          <a:p>
-            <a:r>
-              <a:rPr lang="en-US" dirty="0">
-                <a:hlinkClick r:id="rId5"/>
-              </a:rPr>
-              <a:t>https://curl.haxx.se</a:t>
-            </a:r>
-            <a:endParaRPr lang="en-US" dirty="0"/>
-          </a:p>
-          <a:p>
-            <a:r>
-              <a:rPr lang="en-US" dirty="0">
-                <a:hlinkClick r:id="rId6"/>
-              </a:rPr>
-              <a:t>https://requests.readthedocs.io/en/master/</a:t>
-            </a:r>
-            <a:endParaRPr lang="en-US" dirty="0"/>
-          </a:p>
-          <a:p>
-            <a:r>
-              <a:rPr lang="en-US" dirty="0">
-                <a:hlinkClick r:id="rId7"/>
-              </a:rPr>
-              <a:t>https://2.python-requests.org/en/master/api/#requests.Response</a:t>
-            </a:r>
-            <a:endParaRPr lang="en-US" dirty="0"/>
-          </a:p>
-          <a:p>
-            <a:r>
               <a:rPr lang="en-US" dirty="0"/>
-              <a:t>Cisco API documentation #1</a:t>
-            </a:r>
-          </a:p>
-          <a:p>
-            <a:r>
-              <a:rPr lang="en-US" dirty="0"/>
-              <a:t>Cisco API documentation #2</a:t>
-            </a:r>
-          </a:p>
-          <a:p>
-            <a:r>
-              <a:rPr lang="en-US" dirty="0"/>
-              <a:t>Cisco API documentation #3</a:t>
+              <a:t>Step 1 – Authenticate &amp; retrieve a session token</a:t>
+            </a:r>
+          </a:p>
+          <a:p>
+            <a:pPr marL="457200" lvl="1" indent="0">
+              <a:buNone/>
+            </a:pPr>
+            <a:r>
+              <a:rPr lang="en-US" b="1" i="1" dirty="0">
+                <a:solidFill>
+                  <a:srgbClr val="FFFF00"/>
+                </a:solidFill>
+              </a:rPr>
+              <a:t>import requests</a:t>
+            </a:r>
+          </a:p>
+          <a:p>
+            <a:pPr marL="457200" lvl="1" indent="0">
+              <a:buNone/>
+            </a:pPr>
+            <a:r>
+              <a:rPr lang="en-US" b="1" i="1" dirty="0">
+                <a:solidFill>
+                  <a:srgbClr val="FFFF00"/>
+                </a:solidFill>
+              </a:rPr>
+              <a:t>requests.packages.urllib3.disable_warnings()</a:t>
+            </a:r>
+            <a:r>
+              <a:rPr lang="en-US" b="1" i="1" dirty="0"/>
+              <a:t> # disable insecure SSL warnings</a:t>
+            </a:r>
+          </a:p>
+          <a:p>
+            <a:pPr marL="457200" lvl="1" indent="0">
+              <a:buNone/>
+            </a:pPr>
+            <a:r>
+              <a:rPr lang="en-US" b="1" i="1" dirty="0" err="1">
+                <a:solidFill>
+                  <a:srgbClr val="FFFF00"/>
+                </a:solidFill>
+              </a:rPr>
+              <a:t>url</a:t>
+            </a:r>
+            <a:r>
+              <a:rPr lang="en-US" b="1" i="1" dirty="0">
+                <a:solidFill>
+                  <a:srgbClr val="FFFF00"/>
+                </a:solidFill>
+              </a:rPr>
+              <a:t> = 'https://</a:t>
+            </a:r>
+            <a:r>
+              <a:rPr lang="en-US" b="1" i="1" dirty="0" err="1">
+                <a:solidFill>
+                  <a:srgbClr val="FFFF00"/>
+                </a:solidFill>
+              </a:rPr>
+              <a:t>sandboxapicdc.cisco.com</a:t>
+            </a:r>
+            <a:r>
+              <a:rPr lang="en-US" b="1" i="1" dirty="0">
+                <a:solidFill>
+                  <a:srgbClr val="FFFF00"/>
+                </a:solidFill>
+              </a:rPr>
+              <a:t>/</a:t>
+            </a:r>
+            <a:r>
+              <a:rPr lang="en-US" b="1" i="1" dirty="0" err="1">
+                <a:solidFill>
+                  <a:srgbClr val="FFFF00"/>
+                </a:solidFill>
+              </a:rPr>
+              <a:t>api</a:t>
+            </a:r>
+            <a:r>
+              <a:rPr lang="en-US" b="1" i="1" dirty="0">
+                <a:solidFill>
+                  <a:srgbClr val="FFFF00"/>
+                </a:solidFill>
+              </a:rPr>
+              <a:t>/</a:t>
+            </a:r>
+            <a:r>
+              <a:rPr lang="en-US" b="1" i="1" dirty="0" err="1">
+                <a:solidFill>
+                  <a:srgbClr val="FFFF00"/>
+                </a:solidFill>
+              </a:rPr>
+              <a:t>aaaLogin.json</a:t>
+            </a:r>
+            <a:r>
+              <a:rPr lang="en-US" b="1" i="1" dirty="0">
+                <a:solidFill>
+                  <a:srgbClr val="FFFF00"/>
+                </a:solidFill>
+              </a:rPr>
+              <a:t>'</a:t>
+            </a:r>
+          </a:p>
+          <a:p>
+            <a:pPr marL="457200" lvl="1" indent="0">
+              <a:buNone/>
+            </a:pPr>
+            <a:r>
+              <a:rPr lang="en-US" b="1" i="1" dirty="0" err="1">
+                <a:solidFill>
+                  <a:srgbClr val="FFFF00"/>
+                </a:solidFill>
+              </a:rPr>
+              <a:t>json_data</a:t>
+            </a:r>
+            <a:r>
+              <a:rPr lang="en-US" b="1" i="1" dirty="0">
+                <a:solidFill>
+                  <a:srgbClr val="FFFF00"/>
+                </a:solidFill>
+              </a:rPr>
+              <a:t> = {'</a:t>
+            </a:r>
+            <a:r>
+              <a:rPr lang="en-US" b="1" i="1" dirty="0" err="1">
+                <a:solidFill>
+                  <a:srgbClr val="FFFF00"/>
+                </a:solidFill>
+              </a:rPr>
+              <a:t>aaaUser</a:t>
+            </a:r>
+            <a:r>
+              <a:rPr lang="en-US" b="1" i="1" dirty="0">
+                <a:solidFill>
+                  <a:srgbClr val="FFFF00"/>
+                </a:solidFill>
+              </a:rPr>
+              <a:t>':{'attributes':{'</a:t>
+            </a:r>
+            <a:r>
+              <a:rPr lang="en-US" b="1" i="1" dirty="0" err="1">
+                <a:solidFill>
+                  <a:srgbClr val="FFFF00"/>
+                </a:solidFill>
+              </a:rPr>
+              <a:t>name':'admin</a:t>
+            </a:r>
+            <a:r>
+              <a:rPr lang="en-US" b="1" i="1" dirty="0">
+                <a:solidFill>
+                  <a:srgbClr val="FFFF00"/>
+                </a:solidFill>
+              </a:rPr>
+              <a:t>', '</a:t>
+            </a:r>
+            <a:r>
+              <a:rPr lang="en-US" b="1" i="1" dirty="0" err="1">
+                <a:solidFill>
+                  <a:srgbClr val="FFFF00"/>
+                </a:solidFill>
+              </a:rPr>
+              <a:t>pwd</a:t>
+            </a:r>
+            <a:r>
+              <a:rPr lang="en-US" b="1" i="1" dirty="0">
+                <a:solidFill>
+                  <a:srgbClr val="FFFF00"/>
+                </a:solidFill>
+              </a:rPr>
+              <a:t>':'</a:t>
+            </a:r>
+            <a:r>
+              <a:rPr lang="en-US" b="1" i="1" dirty="0" err="1">
+                <a:solidFill>
+                  <a:srgbClr val="FFFF00"/>
+                </a:solidFill>
+              </a:rPr>
+              <a:t>ciscopsdt</a:t>
+            </a:r>
+            <a:r>
+              <a:rPr lang="en-US" b="1" i="1" dirty="0">
+                <a:solidFill>
+                  <a:srgbClr val="FFFF00"/>
+                </a:solidFill>
+              </a:rPr>
+              <a:t>'}}}</a:t>
+            </a:r>
+          </a:p>
+          <a:p>
+            <a:pPr marL="457200" lvl="1" indent="0">
+              <a:buNone/>
+            </a:pPr>
+            <a:r>
+              <a:rPr lang="en-US" b="1" i="1" dirty="0">
+                <a:solidFill>
+                  <a:srgbClr val="FFFF00"/>
+                </a:solidFill>
+              </a:rPr>
+              <a:t>session = </a:t>
+            </a:r>
+            <a:r>
+              <a:rPr lang="en-US" b="1" i="1" dirty="0" err="1">
+                <a:solidFill>
+                  <a:srgbClr val="FFFF00"/>
+                </a:solidFill>
+              </a:rPr>
+              <a:t>requests.session</a:t>
+            </a:r>
+            <a:r>
+              <a:rPr lang="en-US" b="1" i="1" dirty="0">
+                <a:solidFill>
+                  <a:srgbClr val="FFFF00"/>
+                </a:solidFill>
+              </a:rPr>
+              <a:t>()</a:t>
+            </a:r>
+          </a:p>
+          <a:p>
+            <a:pPr marL="457200" lvl="1" indent="0">
+              <a:buNone/>
+            </a:pPr>
+            <a:r>
+              <a:rPr lang="en-US" b="1" i="1" dirty="0" err="1">
+                <a:solidFill>
+                  <a:srgbClr val="FFFF00"/>
+                </a:solidFill>
+              </a:rPr>
+              <a:t>session.verify</a:t>
+            </a:r>
+            <a:r>
+              <a:rPr lang="en-US" b="1" i="1" dirty="0">
+                <a:solidFill>
+                  <a:srgbClr val="FFFF00"/>
+                </a:solidFill>
+              </a:rPr>
+              <a:t> = False</a:t>
+            </a:r>
+            <a:r>
+              <a:rPr lang="en-US" b="1" i="1" dirty="0"/>
+              <a:t> # To permit self-signed certificates</a:t>
+            </a:r>
+          </a:p>
+          <a:p>
+            <a:pPr marL="457200" lvl="1" indent="0">
+              <a:buNone/>
+            </a:pPr>
+            <a:r>
+              <a:rPr lang="en-US" b="1" i="1" dirty="0">
+                <a:solidFill>
+                  <a:srgbClr val="FFFF00"/>
+                </a:solidFill>
+              </a:rPr>
+              <a:t>response = </a:t>
+            </a:r>
+            <a:r>
+              <a:rPr lang="en-US" b="1" i="1" dirty="0" err="1">
+                <a:solidFill>
+                  <a:srgbClr val="FFFF00"/>
+                </a:solidFill>
+              </a:rPr>
+              <a:t>session.post</a:t>
+            </a:r>
+            <a:r>
+              <a:rPr lang="en-US" b="1" i="1" dirty="0">
+                <a:solidFill>
+                  <a:srgbClr val="FFFF00"/>
+                </a:solidFill>
+              </a:rPr>
+              <a:t>(</a:t>
+            </a:r>
+            <a:r>
+              <a:rPr lang="en-US" b="1" i="1" dirty="0" err="1">
+                <a:solidFill>
+                  <a:srgbClr val="FFFF00"/>
+                </a:solidFill>
+              </a:rPr>
+              <a:t>url</a:t>
+            </a:r>
+            <a:r>
+              <a:rPr lang="en-US" b="1" i="1" dirty="0">
+                <a:solidFill>
+                  <a:srgbClr val="FFFF00"/>
+                </a:solidFill>
+              </a:rPr>
+              <a:t>, json=</a:t>
+            </a:r>
+            <a:r>
+              <a:rPr lang="en-US" b="1" i="1" dirty="0" err="1">
+                <a:solidFill>
+                  <a:srgbClr val="FFFF00"/>
+                </a:solidFill>
+              </a:rPr>
+              <a:t>json_data</a:t>
+            </a:r>
+            <a:r>
+              <a:rPr lang="en-US" b="1" i="1" dirty="0">
+                <a:solidFill>
+                  <a:srgbClr val="FFFF00"/>
+                </a:solidFill>
+              </a:rPr>
+              <a:t>)</a:t>
+            </a:r>
+          </a:p>
+          <a:p>
+            <a:pPr marL="457200" lvl="1" indent="0">
+              <a:buNone/>
+            </a:pPr>
+            <a:r>
+              <a:rPr lang="en-US" b="1" i="1" dirty="0" err="1">
+                <a:solidFill>
+                  <a:srgbClr val="FFFF00"/>
+                </a:solidFill>
+              </a:rPr>
+              <a:t>response.cookies</a:t>
+            </a:r>
+            <a:r>
+              <a:rPr lang="en-US" b="1" i="1" dirty="0">
+                <a:solidFill>
+                  <a:srgbClr val="FFFF00"/>
+                </a:solidFill>
+              </a:rPr>
+              <a:t>, </a:t>
+            </a:r>
+            <a:r>
+              <a:rPr lang="en-US" b="1" i="1" dirty="0" err="1">
+                <a:solidFill>
+                  <a:srgbClr val="FFFF00"/>
+                </a:solidFill>
+              </a:rPr>
+              <a:t>response.json</a:t>
+            </a:r>
+            <a:r>
+              <a:rPr lang="en-US" b="1" i="1" dirty="0">
+                <a:solidFill>
+                  <a:srgbClr val="FFFF00"/>
+                </a:solidFill>
+              </a:rPr>
+              <a:t>() </a:t>
+            </a:r>
+            <a:r>
+              <a:rPr lang="en-US" b="1" i="1" dirty="0"/>
+              <a:t># two options to display the session token</a:t>
             </a:r>
           </a:p>
         </p:txBody>
@@ -46373,7 +47898,7 @@
           <p:cNvPr id="4" name="Date Placeholder 3">
             <a:extLst>
               <a:ext uri="{FF2B5EF4-FFF2-40B4-BE49-F238E27FC236}">
-                <a16:creationId xmlns:a16="http://schemas.microsoft.com/office/drawing/2014/main" id="{7ECEAF79-F4AC-E94E-9E55-220D0D396924}"/>
+                <a16:creationId xmlns:a16="http://schemas.microsoft.com/office/drawing/2014/main" id="{D7D9528C-333D-BF4A-844C-7BCC7757E858}"/>
               </a:ext>
             </a:extLst>
           </p:cNvPr>
@@ -46402,7 +47927,7 @@
           <p:cNvPr id="5" name="Slide Number Placeholder 4">
             <a:extLst>
               <a:ext uri="{FF2B5EF4-FFF2-40B4-BE49-F238E27FC236}">
-                <a16:creationId xmlns:a16="http://schemas.microsoft.com/office/drawing/2014/main" id="{372DC1A4-CE8B-DB4A-8F86-2508518C35D3}"/>
+                <a16:creationId xmlns:a16="http://schemas.microsoft.com/office/drawing/2014/main" id="{0798D1A2-1CD4-4A47-A0BC-C1215D1CD611}"/>
               </a:ext>
             </a:extLst>
           </p:cNvPr>
@@ -46430,7 +47955,7 @@
     </p:spTree>
     <p:extLst>
       <p:ext uri="{BB962C8B-B14F-4D97-AF65-F5344CB8AC3E}">
-        <p14:creationId xmlns:p14="http://schemas.microsoft.com/office/powerpoint/2010/main" val="3225595977"/>
+        <p14:creationId xmlns:p14="http://schemas.microsoft.com/office/powerpoint/2010/main" val="2586319712"/>
       </p:ext>
     </p:extLst>
   </p:cSld>
@@ -46531,7 +48056,809 @@
     </p:spTree>
     <p:extLst>
       <p:ext uri="{BB962C8B-B14F-4D97-AF65-F5344CB8AC3E}">
-        <p14:creationId xmlns:p14="http://schemas.microsoft.com/office/powerpoint/2010/main" val="756638364"/>
+        <p14:creationId xmlns:p14="http://schemas.microsoft.com/office/powerpoint/2010/main" val="1325497621"/>
+      </p:ext>
+    </p:extLst>
+  </p:cSld>
+  <p:clrMapOvr>
+    <a:masterClrMapping/>
+  </p:clrMapOvr>
+  <mc:AlternateContent xmlns:mc="http://schemas.openxmlformats.org/markup-compatibility/2006" xmlns:p14="http://schemas.microsoft.com/office/powerpoint/2010/main">
+    <mc:Choice Requires="p14">
+      <p:transition spd="med" p14:dur="700">
+        <p:fade/>
+      </p:transition>
+    </mc:Choice>
+    <mc:Fallback xmlns="">
+      <p:transition spd="med">
+        <p:fade/>
+      </p:transition>
+    </mc:Fallback>
+  </mc:AlternateContent>
+</p:sld>
+</file>
+
+<file path=ppt/slides/slide77.xml><?xml version="1.0" encoding="utf-8"?>
+<p:sld xmlns:a="http://schemas.openxmlformats.org/drawingml/2006/main" xmlns:r="http://schemas.openxmlformats.org/officeDocument/2006/relationships" xmlns:p="http://schemas.openxmlformats.org/presentationml/2006/main">
+  <p:cSld>
+    <p:spTree>
+      <p:nvGrpSpPr>
+        <p:cNvPr id="1" name=""/>
+        <p:cNvGrpSpPr/>
+        <p:nvPr/>
+      </p:nvGrpSpPr>
+      <p:grpSpPr>
+        <a:xfrm>
+          <a:off x="0" y="0"/>
+          <a:ext cx="0" cy="0"/>
+          <a:chOff x="0" y="0"/>
+          <a:chExt cx="0" cy="0"/>
+        </a:xfrm>
+      </p:grpSpPr>
+      <p:sp>
+        <p:nvSpPr>
+          <p:cNvPr id="2" name="Title 1">
+            <a:extLst>
+              <a:ext uri="{FF2B5EF4-FFF2-40B4-BE49-F238E27FC236}">
+                <a16:creationId xmlns:a16="http://schemas.microsoft.com/office/drawing/2014/main" id="{9B4DF7CD-7263-9840-AE80-6F1B7FA6AF3C}"/>
+              </a:ext>
+            </a:extLst>
+          </p:cNvPr>
+          <p:cNvSpPr>
+            <a:spLocks noGrp="1"/>
+          </p:cNvSpPr>
+          <p:nvPr>
+            <p:ph type="title"/>
+          </p:nvPr>
+        </p:nvSpPr>
+        <p:spPr/>
+        <p:txBody>
+          <a:bodyPr/>
+          <a:lstStyle/>
+          <a:p>
+            <a:r>
+              <a:rPr lang="en-US" dirty="0"/>
+              <a:t>Python – </a:t>
+            </a:r>
+            <a:r>
+              <a:rPr lang="en-US" dirty="0" err="1"/>
+              <a:t>DevNet</a:t>
+            </a:r>
+            <a:r>
+              <a:rPr lang="en-US" dirty="0"/>
+              <a:t> Always-On DNAC Sandbox</a:t>
+            </a:r>
+          </a:p>
+        </p:txBody>
+      </p:sp>
+      <p:sp>
+        <p:nvSpPr>
+          <p:cNvPr id="3" name="Content Placeholder 2">
+            <a:extLst>
+              <a:ext uri="{FF2B5EF4-FFF2-40B4-BE49-F238E27FC236}">
+                <a16:creationId xmlns:a16="http://schemas.microsoft.com/office/drawing/2014/main" id="{A610A140-16FE-F54F-9766-D3A50E4E4F0B}"/>
+              </a:ext>
+            </a:extLst>
+          </p:cNvPr>
+          <p:cNvSpPr>
+            <a:spLocks noGrp="1"/>
+          </p:cNvSpPr>
+          <p:nvPr>
+            <p:ph idx="1"/>
+          </p:nvPr>
+        </p:nvSpPr>
+        <p:spPr>
+          <a:xfrm>
+            <a:off x="838200" y="1825625"/>
+            <a:ext cx="10782782" cy="4351338"/>
+          </a:xfrm>
+        </p:spPr>
+        <p:txBody>
+          <a:bodyPr>
+            <a:normAutofit/>
+          </a:bodyPr>
+          <a:lstStyle/>
+          <a:p>
+            <a:r>
+              <a:rPr lang="en-US" dirty="0"/>
+              <a:t>Step 2 – Store the session token in a variable</a:t>
+            </a:r>
+          </a:p>
+          <a:p>
+            <a:pPr marL="457200" lvl="1" indent="0">
+              <a:buNone/>
+            </a:pPr>
+            <a:r>
+              <a:rPr lang="en-US" b="1" i="1" dirty="0">
+                <a:solidFill>
+                  <a:srgbClr val="FFFF00"/>
+                </a:solidFill>
+              </a:rPr>
+              <a:t>token = </a:t>
+            </a:r>
+            <a:r>
+              <a:rPr lang="en-US" b="1" i="1" dirty="0" err="1">
+                <a:solidFill>
+                  <a:srgbClr val="FFFF00"/>
+                </a:solidFill>
+              </a:rPr>
+              <a:t>session.cookies</a:t>
+            </a:r>
+            <a:r>
+              <a:rPr lang="en-US" b="1" i="1" dirty="0">
+                <a:solidFill>
+                  <a:srgbClr val="FFFF00"/>
+                </a:solidFill>
+              </a:rPr>
+              <a:t>['APIC-cookie'] </a:t>
+            </a:r>
+            <a:r>
+              <a:rPr lang="en-US" b="1" i="1" dirty="0"/>
+              <a:t># option1</a:t>
+            </a:r>
+          </a:p>
+          <a:p>
+            <a:pPr marL="457200" lvl="1" indent="0">
+              <a:buNone/>
+            </a:pPr>
+            <a:r>
+              <a:rPr lang="en-US" b="1" i="1" dirty="0">
+                <a:solidFill>
+                  <a:srgbClr val="FFFF00"/>
+                </a:solidFill>
+              </a:rPr>
+              <a:t>token = </a:t>
+            </a:r>
+            <a:r>
+              <a:rPr lang="en-US" b="1" i="1" dirty="0" err="1">
+                <a:solidFill>
+                  <a:srgbClr val="FFFF00"/>
+                </a:solidFill>
+              </a:rPr>
+              <a:t>response.json</a:t>
+            </a:r>
+            <a:r>
+              <a:rPr lang="en-US" b="1" i="1" dirty="0">
+                <a:solidFill>
+                  <a:srgbClr val="FFFF00"/>
+                </a:solidFill>
+              </a:rPr>
+              <a:t>()['</a:t>
+            </a:r>
+            <a:r>
+              <a:rPr lang="en-US" b="1" i="1" dirty="0" err="1">
+                <a:solidFill>
+                  <a:srgbClr val="FFFF00"/>
+                </a:solidFill>
+              </a:rPr>
+              <a:t>imdata</a:t>
+            </a:r>
+            <a:r>
+              <a:rPr lang="en-US" b="1" i="1" dirty="0">
+                <a:solidFill>
+                  <a:srgbClr val="FFFF00"/>
+                </a:solidFill>
+              </a:rPr>
+              <a:t>'][0]['</a:t>
+            </a:r>
+            <a:r>
+              <a:rPr lang="en-US" b="1" i="1" dirty="0" err="1">
+                <a:solidFill>
+                  <a:srgbClr val="FFFF00"/>
+                </a:solidFill>
+              </a:rPr>
+              <a:t>aaaLogin</a:t>
+            </a:r>
+            <a:r>
+              <a:rPr lang="en-US" b="1" i="1" dirty="0">
+                <a:solidFill>
+                  <a:srgbClr val="FFFF00"/>
+                </a:solidFill>
+              </a:rPr>
+              <a:t>']['attributes']['token'] </a:t>
+            </a:r>
+            <a:r>
+              <a:rPr lang="en-US" b="1" i="1" dirty="0"/>
+              <a:t># option2</a:t>
+            </a:r>
+          </a:p>
+          <a:p>
+            <a:pPr marL="457200" lvl="1" indent="0">
+              <a:buNone/>
+            </a:pPr>
+            <a:r>
+              <a:rPr lang="en-US" b="1" i="1" dirty="0" err="1">
+                <a:solidFill>
+                  <a:srgbClr val="FFFF00"/>
+                </a:solidFill>
+              </a:rPr>
+              <a:t>session_cookie</a:t>
+            </a:r>
+            <a:r>
+              <a:rPr lang="en-US" b="1" i="1" dirty="0">
+                <a:solidFill>
+                  <a:srgbClr val="FFFF00"/>
+                </a:solidFill>
+              </a:rPr>
+              <a:t> = {'</a:t>
+            </a:r>
+            <a:r>
+              <a:rPr lang="en-US" b="1" i="1" dirty="0" err="1">
+                <a:solidFill>
+                  <a:srgbClr val="FFFF00"/>
+                </a:solidFill>
+              </a:rPr>
+              <a:t>APIC-Cookie':token</a:t>
+            </a:r>
+            <a:r>
+              <a:rPr lang="en-US" b="1" i="1" dirty="0">
+                <a:solidFill>
+                  <a:srgbClr val="FFFF00"/>
+                </a:solidFill>
+              </a:rPr>
+              <a:t>}</a:t>
+            </a:r>
+          </a:p>
+          <a:p>
+            <a:pPr marL="457200" lvl="1" indent="0">
+              <a:buNone/>
+            </a:pPr>
+            <a:r>
+              <a:rPr lang="en-US" b="1" i="1" dirty="0" err="1">
+                <a:solidFill>
+                  <a:srgbClr val="FFFF00"/>
+                </a:solidFill>
+              </a:rPr>
+              <a:t>session_cookie</a:t>
+            </a:r>
+            <a:endParaRPr lang="en-US" b="1" i="1" dirty="0">
+              <a:solidFill>
+                <a:srgbClr val="FFFF00"/>
+              </a:solidFill>
+            </a:endParaRPr>
+          </a:p>
+        </p:txBody>
+      </p:sp>
+      <p:sp>
+        <p:nvSpPr>
+          <p:cNvPr id="4" name="Date Placeholder 3">
+            <a:extLst>
+              <a:ext uri="{FF2B5EF4-FFF2-40B4-BE49-F238E27FC236}">
+                <a16:creationId xmlns:a16="http://schemas.microsoft.com/office/drawing/2014/main" id="{D7D9528C-333D-BF4A-844C-7BCC7757E858}"/>
+              </a:ext>
+            </a:extLst>
+          </p:cNvPr>
+          <p:cNvSpPr>
+            <a:spLocks noGrp="1"/>
+          </p:cNvSpPr>
+          <p:nvPr>
+            <p:ph type="dt" sz="half" idx="10"/>
+          </p:nvPr>
+        </p:nvSpPr>
+        <p:spPr/>
+        <p:txBody>
+          <a:bodyPr/>
+          <a:lstStyle/>
+          <a:p>
+            <a:r>
+              <a:rPr lang="en-US"/>
+              <a:t>World Wide Technology ©</a:t>
+            </a:r>
+            <a:endParaRPr lang="en-US" dirty="0"/>
+          </a:p>
+        </p:txBody>
+      </p:sp>
+      <p:sp>
+        <p:nvSpPr>
+          <p:cNvPr id="5" name="Slide Number Placeholder 4">
+            <a:extLst>
+              <a:ext uri="{FF2B5EF4-FFF2-40B4-BE49-F238E27FC236}">
+                <a16:creationId xmlns:a16="http://schemas.microsoft.com/office/drawing/2014/main" id="{0798D1A2-1CD4-4A47-A0BC-C1215D1CD611}"/>
+              </a:ext>
+            </a:extLst>
+          </p:cNvPr>
+          <p:cNvSpPr>
+            <a:spLocks noGrp="1"/>
+          </p:cNvSpPr>
+          <p:nvPr>
+            <p:ph type="sldNum" sz="quarter" idx="12"/>
+          </p:nvPr>
+        </p:nvSpPr>
+        <p:spPr/>
+        <p:txBody>
+          <a:bodyPr/>
+          <a:lstStyle/>
+          <a:p>
+            <a:fld id="{A44B02FA-DD2D-1844-AE35-8B2EAB0CF4EF}" type="slidenum">
+              <a:rPr lang="en-US" smtClean="0"/>
+              <a:pPr/>
+              <a:t>77</a:t>
+            </a:fld>
+            <a:endParaRPr lang="en-US" dirty="0"/>
+          </a:p>
+        </p:txBody>
+      </p:sp>
+    </p:spTree>
+    <p:extLst>
+      <p:ext uri="{BB962C8B-B14F-4D97-AF65-F5344CB8AC3E}">
+        <p14:creationId xmlns:p14="http://schemas.microsoft.com/office/powerpoint/2010/main" val="1951586938"/>
+      </p:ext>
+    </p:extLst>
+  </p:cSld>
+  <p:clrMapOvr>
+    <a:masterClrMapping/>
+  </p:clrMapOvr>
+  <mc:AlternateContent xmlns:mc="http://schemas.openxmlformats.org/markup-compatibility/2006" xmlns:p14="http://schemas.microsoft.com/office/powerpoint/2010/main">
+    <mc:Choice Requires="p14">
+      <p:transition spd="med" p14:dur="700">
+        <p:fade/>
+      </p:transition>
+    </mc:Choice>
+    <mc:Fallback xmlns="">
+      <p:transition spd="med">
+        <p:fade/>
+      </p:transition>
+    </mc:Fallback>
+  </mc:AlternateContent>
+</p:sld>
+</file>
+
+<file path=ppt/slides/slide78.xml><?xml version="1.0" encoding="utf-8"?>
+<p:sld xmlns:a="http://schemas.openxmlformats.org/drawingml/2006/main" xmlns:r="http://schemas.openxmlformats.org/officeDocument/2006/relationships" xmlns:p="http://schemas.openxmlformats.org/presentationml/2006/main">
+  <p:cSld>
+    <p:spTree>
+      <p:nvGrpSpPr>
+        <p:cNvPr id="1" name=""/>
+        <p:cNvGrpSpPr/>
+        <p:nvPr/>
+      </p:nvGrpSpPr>
+      <p:grpSpPr>
+        <a:xfrm>
+          <a:off x="0" y="0"/>
+          <a:ext cx="0" cy="0"/>
+          <a:chOff x="0" y="0"/>
+          <a:chExt cx="0" cy="0"/>
+        </a:xfrm>
+      </p:grpSpPr>
+      <p:sp>
+        <p:nvSpPr>
+          <p:cNvPr id="4" name="Date Placeholder 3">
+            <a:extLst>
+              <a:ext uri="{FF2B5EF4-FFF2-40B4-BE49-F238E27FC236}">
+                <a16:creationId xmlns:a16="http://schemas.microsoft.com/office/drawing/2014/main" id="{0CD670A9-B06A-3448-BABA-FAD627500859}"/>
+              </a:ext>
+            </a:extLst>
+          </p:cNvPr>
+          <p:cNvSpPr>
+            <a:spLocks noGrp="1"/>
+          </p:cNvSpPr>
+          <p:nvPr>
+            <p:ph type="dt" sz="half" idx="10"/>
+          </p:nvPr>
+        </p:nvSpPr>
+        <p:spPr/>
+        <p:txBody>
+          <a:bodyPr/>
+          <a:lstStyle/>
+          <a:p>
+            <a:r>
+              <a:rPr lang="en-US"/>
+              <a:t>World Wide Technology ©</a:t>
+            </a:r>
+            <a:endParaRPr lang="en-US" dirty="0"/>
+          </a:p>
+        </p:txBody>
+      </p:sp>
+      <p:sp>
+        <p:nvSpPr>
+          <p:cNvPr id="5" name="Slide Number Placeholder 4">
+            <a:extLst>
+              <a:ext uri="{FF2B5EF4-FFF2-40B4-BE49-F238E27FC236}">
+                <a16:creationId xmlns:a16="http://schemas.microsoft.com/office/drawing/2014/main" id="{119DACAD-17C1-C249-A498-C4A1A1ADD334}"/>
+              </a:ext>
+            </a:extLst>
+          </p:cNvPr>
+          <p:cNvSpPr>
+            <a:spLocks noGrp="1"/>
+          </p:cNvSpPr>
+          <p:nvPr>
+            <p:ph type="sldNum" sz="quarter" idx="12"/>
+          </p:nvPr>
+        </p:nvSpPr>
+        <p:spPr/>
+        <p:txBody>
+          <a:bodyPr/>
+          <a:lstStyle/>
+          <a:p>
+            <a:fld id="{A44B02FA-DD2D-1844-AE35-8B2EAB0CF4EF}" type="slidenum">
+              <a:rPr lang="en-US" smtClean="0"/>
+              <a:pPr/>
+              <a:t>78</a:t>
+            </a:fld>
+            <a:endParaRPr lang="en-US" dirty="0"/>
+          </a:p>
+        </p:txBody>
+      </p:sp>
+    </p:spTree>
+    <p:extLst>
+      <p:ext uri="{BB962C8B-B14F-4D97-AF65-F5344CB8AC3E}">
+        <p14:creationId xmlns:p14="http://schemas.microsoft.com/office/powerpoint/2010/main" val="2884409040"/>
+      </p:ext>
+    </p:extLst>
+  </p:cSld>
+  <p:clrMapOvr>
+    <a:masterClrMapping/>
+  </p:clrMapOvr>
+  <mc:AlternateContent xmlns:mc="http://schemas.openxmlformats.org/markup-compatibility/2006" xmlns:p14="http://schemas.microsoft.com/office/powerpoint/2010/main">
+    <mc:Choice Requires="p14">
+      <p:transition spd="med" p14:dur="700">
+        <p:fade/>
+      </p:transition>
+    </mc:Choice>
+    <mc:Fallback xmlns="">
+      <p:transition spd="med">
+        <p:fade/>
+      </p:transition>
+    </mc:Fallback>
+  </mc:AlternateContent>
+</p:sld>
+</file>
+
+<file path=ppt/slides/slide79.xml><?xml version="1.0" encoding="utf-8"?>
+<p:sld xmlns:a="http://schemas.openxmlformats.org/drawingml/2006/main" xmlns:r="http://schemas.openxmlformats.org/officeDocument/2006/relationships" xmlns:p="http://schemas.openxmlformats.org/presentationml/2006/main">
+  <p:cSld>
+    <p:spTree>
+      <p:nvGrpSpPr>
+        <p:cNvPr id="1" name=""/>
+        <p:cNvGrpSpPr/>
+        <p:nvPr/>
+      </p:nvGrpSpPr>
+      <p:grpSpPr>
+        <a:xfrm>
+          <a:off x="0" y="0"/>
+          <a:ext cx="0" cy="0"/>
+          <a:chOff x="0" y="0"/>
+          <a:chExt cx="0" cy="0"/>
+        </a:xfrm>
+      </p:grpSpPr>
+      <p:sp>
+        <p:nvSpPr>
+          <p:cNvPr id="2" name="Title 1">
+            <a:extLst>
+              <a:ext uri="{FF2B5EF4-FFF2-40B4-BE49-F238E27FC236}">
+                <a16:creationId xmlns:a16="http://schemas.microsoft.com/office/drawing/2014/main" id="{9B4DF7CD-7263-9840-AE80-6F1B7FA6AF3C}"/>
+              </a:ext>
+            </a:extLst>
+          </p:cNvPr>
+          <p:cNvSpPr>
+            <a:spLocks noGrp="1"/>
+          </p:cNvSpPr>
+          <p:nvPr>
+            <p:ph type="title"/>
+          </p:nvPr>
+        </p:nvSpPr>
+        <p:spPr/>
+        <p:txBody>
+          <a:bodyPr/>
+          <a:lstStyle/>
+          <a:p>
+            <a:r>
+              <a:rPr lang="en-US" dirty="0"/>
+              <a:t>Python – </a:t>
+            </a:r>
+            <a:r>
+              <a:rPr lang="en-US" dirty="0" err="1"/>
+              <a:t>DevNet</a:t>
+            </a:r>
+            <a:r>
+              <a:rPr lang="en-US" dirty="0"/>
+              <a:t> Always-On DNAC Sandbox</a:t>
+            </a:r>
+          </a:p>
+        </p:txBody>
+      </p:sp>
+      <p:sp>
+        <p:nvSpPr>
+          <p:cNvPr id="3" name="Content Placeholder 2">
+            <a:extLst>
+              <a:ext uri="{FF2B5EF4-FFF2-40B4-BE49-F238E27FC236}">
+                <a16:creationId xmlns:a16="http://schemas.microsoft.com/office/drawing/2014/main" id="{A610A140-16FE-F54F-9766-D3A50E4E4F0B}"/>
+              </a:ext>
+            </a:extLst>
+          </p:cNvPr>
+          <p:cNvSpPr>
+            <a:spLocks noGrp="1"/>
+          </p:cNvSpPr>
+          <p:nvPr>
+            <p:ph idx="1"/>
+          </p:nvPr>
+        </p:nvSpPr>
+        <p:spPr>
+          <a:xfrm>
+            <a:off x="838200" y="1825625"/>
+            <a:ext cx="10782782" cy="4351338"/>
+          </a:xfrm>
+        </p:spPr>
+        <p:txBody>
+          <a:bodyPr>
+            <a:normAutofit/>
+          </a:bodyPr>
+          <a:lstStyle/>
+          <a:p>
+            <a:r>
+              <a:rPr lang="en-US" dirty="0"/>
+              <a:t>Step 3 – Get a list of APIC Tenants with the stored token</a:t>
+            </a:r>
+          </a:p>
+          <a:p>
+            <a:pPr marL="457200" lvl="1" indent="0">
+              <a:buNone/>
+            </a:pPr>
+            <a:r>
+              <a:rPr lang="en-US" b="1" i="1" dirty="0" err="1">
+                <a:solidFill>
+                  <a:srgbClr val="FFFF00"/>
+                </a:solidFill>
+              </a:rPr>
+              <a:t>get_url</a:t>
+            </a:r>
+            <a:r>
+              <a:rPr lang="en-US" b="1" i="1" dirty="0">
+                <a:solidFill>
+                  <a:srgbClr val="FFFF00"/>
+                </a:solidFill>
+              </a:rPr>
+              <a:t> = 'https://</a:t>
+            </a:r>
+            <a:r>
+              <a:rPr lang="en-US" b="1" i="1" dirty="0" err="1">
+                <a:solidFill>
+                  <a:srgbClr val="FFFF00"/>
+                </a:solidFill>
+              </a:rPr>
+              <a:t>sandboxapicdc.cisco.com</a:t>
+            </a:r>
+            <a:r>
+              <a:rPr lang="en-US" b="1" i="1" dirty="0">
+                <a:solidFill>
+                  <a:srgbClr val="FFFF00"/>
+                </a:solidFill>
+              </a:rPr>
+              <a:t>/</a:t>
+            </a:r>
+            <a:r>
+              <a:rPr lang="en-US" b="1" i="1" dirty="0" err="1">
+                <a:solidFill>
+                  <a:srgbClr val="FFFF00"/>
+                </a:solidFill>
+              </a:rPr>
+              <a:t>api</a:t>
+            </a:r>
+            <a:r>
+              <a:rPr lang="en-US" b="1" i="1" dirty="0">
+                <a:solidFill>
+                  <a:srgbClr val="FFFF00"/>
+                </a:solidFill>
+              </a:rPr>
+              <a:t>/node/class/</a:t>
+            </a:r>
+            <a:r>
+              <a:rPr lang="en-US" b="1" i="1" dirty="0" err="1">
+                <a:solidFill>
+                  <a:srgbClr val="FFFF00"/>
+                </a:solidFill>
+              </a:rPr>
+              <a:t>fvTenant.json</a:t>
+            </a:r>
+            <a:r>
+              <a:rPr lang="en-US" b="1" i="1" dirty="0">
+                <a:solidFill>
+                  <a:srgbClr val="FFFF00"/>
+                </a:solidFill>
+              </a:rPr>
+              <a:t>'</a:t>
+            </a:r>
+          </a:p>
+          <a:p>
+            <a:pPr marL="457200" lvl="1" indent="0">
+              <a:buNone/>
+            </a:pPr>
+            <a:r>
+              <a:rPr lang="en-US" b="1" i="1" dirty="0" err="1">
+                <a:solidFill>
+                  <a:srgbClr val="FFFF00"/>
+                </a:solidFill>
+              </a:rPr>
+              <a:t>get_response</a:t>
+            </a:r>
+            <a:r>
+              <a:rPr lang="en-US" b="1" i="1" dirty="0">
+                <a:solidFill>
+                  <a:srgbClr val="FFFF00"/>
+                </a:solidFill>
+              </a:rPr>
+              <a:t> = </a:t>
+            </a:r>
+            <a:r>
+              <a:rPr lang="en-US" b="1" i="1" dirty="0" err="1">
+                <a:solidFill>
+                  <a:srgbClr val="FFFF00"/>
+                </a:solidFill>
+              </a:rPr>
+              <a:t>session.get</a:t>
+            </a:r>
+            <a:r>
+              <a:rPr lang="en-US" b="1" i="1" dirty="0">
+                <a:solidFill>
+                  <a:srgbClr val="FFFF00"/>
+                </a:solidFill>
+              </a:rPr>
+              <a:t>(</a:t>
+            </a:r>
+            <a:r>
+              <a:rPr lang="en-US" b="1" i="1" dirty="0" err="1">
+                <a:solidFill>
+                  <a:srgbClr val="FFFF00"/>
+                </a:solidFill>
+              </a:rPr>
+              <a:t>get_url</a:t>
+            </a:r>
+            <a:r>
+              <a:rPr lang="en-US" b="1" i="1" dirty="0">
+                <a:solidFill>
+                  <a:srgbClr val="FFFF00"/>
+                </a:solidFill>
+              </a:rPr>
+              <a:t>, cookies=</a:t>
+            </a:r>
+            <a:r>
+              <a:rPr lang="en-US" b="1" i="1" dirty="0" err="1">
+                <a:solidFill>
+                  <a:srgbClr val="FFFF00"/>
+                </a:solidFill>
+              </a:rPr>
+              <a:t>session_cookie</a:t>
+            </a:r>
+            <a:r>
+              <a:rPr lang="en-US" b="1" i="1" dirty="0">
+                <a:solidFill>
+                  <a:srgbClr val="FFFF00"/>
+                </a:solidFill>
+              </a:rPr>
+              <a:t>)</a:t>
+            </a:r>
+          </a:p>
+          <a:p>
+            <a:pPr marL="457200" lvl="1" indent="0">
+              <a:buNone/>
+            </a:pPr>
+            <a:r>
+              <a:rPr lang="en-US" b="1" i="1" dirty="0" err="1">
+                <a:solidFill>
+                  <a:srgbClr val="FFFF00"/>
+                </a:solidFill>
+              </a:rPr>
+              <a:t>get_response.json</a:t>
+            </a:r>
+            <a:r>
+              <a:rPr lang="en-US" b="1" i="1" dirty="0">
+                <a:solidFill>
+                  <a:srgbClr val="FFFF00"/>
+                </a:solidFill>
+              </a:rPr>
+              <a:t>() </a:t>
+            </a:r>
+            <a:r>
+              <a:rPr lang="en-US" b="1" i="1" dirty="0"/>
+              <a:t># display all tenants</a:t>
+            </a:r>
+          </a:p>
+          <a:p>
+            <a:pPr marL="457200" lvl="1" indent="0">
+              <a:buNone/>
+            </a:pPr>
+            <a:r>
+              <a:rPr lang="en-US" b="1" i="1" dirty="0" err="1">
+                <a:solidFill>
+                  <a:srgbClr val="FFFF00"/>
+                </a:solidFill>
+              </a:rPr>
+              <a:t>get_response.json</a:t>
+            </a:r>
+            <a:r>
+              <a:rPr lang="en-US" b="1" i="1" dirty="0">
+                <a:solidFill>
+                  <a:srgbClr val="FFFF00"/>
+                </a:solidFill>
+              </a:rPr>
+              <a:t>()['</a:t>
+            </a:r>
+            <a:r>
+              <a:rPr lang="en-US" b="1" i="1" dirty="0" err="1">
+                <a:solidFill>
+                  <a:srgbClr val="FFFF00"/>
+                </a:solidFill>
+              </a:rPr>
+              <a:t>imdata</a:t>
+            </a:r>
+            <a:r>
+              <a:rPr lang="en-US" b="1" i="1" dirty="0">
+                <a:solidFill>
+                  <a:srgbClr val="FFFF00"/>
+                </a:solidFill>
+              </a:rPr>
+              <a:t>'][0] </a:t>
+            </a:r>
+            <a:r>
+              <a:rPr lang="en-US" b="1" i="1" dirty="0"/>
+              <a:t>#display the first tenant in the response</a:t>
+            </a:r>
+          </a:p>
+        </p:txBody>
+      </p:sp>
+      <p:sp>
+        <p:nvSpPr>
+          <p:cNvPr id="4" name="Date Placeholder 3">
+            <a:extLst>
+              <a:ext uri="{FF2B5EF4-FFF2-40B4-BE49-F238E27FC236}">
+                <a16:creationId xmlns:a16="http://schemas.microsoft.com/office/drawing/2014/main" id="{D7D9528C-333D-BF4A-844C-7BCC7757E858}"/>
+              </a:ext>
+            </a:extLst>
+          </p:cNvPr>
+          <p:cNvSpPr>
+            <a:spLocks noGrp="1"/>
+          </p:cNvSpPr>
+          <p:nvPr>
+            <p:ph type="dt" sz="half" idx="10"/>
+          </p:nvPr>
+        </p:nvSpPr>
+        <p:spPr/>
+        <p:txBody>
+          <a:bodyPr/>
+          <a:lstStyle/>
+          <a:p>
+            <a:r>
+              <a:rPr lang="en-US"/>
+              <a:t>World Wide Technology ©</a:t>
+            </a:r>
+            <a:endParaRPr lang="en-US" dirty="0"/>
+          </a:p>
+        </p:txBody>
+      </p:sp>
+      <p:sp>
+        <p:nvSpPr>
+          <p:cNvPr id="5" name="Slide Number Placeholder 4">
+            <a:extLst>
+              <a:ext uri="{FF2B5EF4-FFF2-40B4-BE49-F238E27FC236}">
+                <a16:creationId xmlns:a16="http://schemas.microsoft.com/office/drawing/2014/main" id="{0798D1A2-1CD4-4A47-A0BC-C1215D1CD611}"/>
+              </a:ext>
+            </a:extLst>
+          </p:cNvPr>
+          <p:cNvSpPr>
+            <a:spLocks noGrp="1"/>
+          </p:cNvSpPr>
+          <p:nvPr>
+            <p:ph type="sldNum" sz="quarter" idx="12"/>
+          </p:nvPr>
+        </p:nvSpPr>
+        <p:spPr/>
+        <p:txBody>
+          <a:bodyPr/>
+          <a:lstStyle/>
+          <a:p>
+            <a:fld id="{A44B02FA-DD2D-1844-AE35-8B2EAB0CF4EF}" type="slidenum">
+              <a:rPr lang="en-US" smtClean="0"/>
+              <a:pPr/>
+              <a:t>79</a:t>
+            </a:fld>
+            <a:endParaRPr lang="en-US" dirty="0"/>
+          </a:p>
+        </p:txBody>
+      </p:sp>
+    </p:spTree>
+    <p:extLst>
+      <p:ext uri="{BB962C8B-B14F-4D97-AF65-F5344CB8AC3E}">
+        <p14:creationId xmlns:p14="http://schemas.microsoft.com/office/powerpoint/2010/main" val="106406197"/>
       </p:ext>
     </p:extLst>
   </p:cSld>
@@ -47102,6 +49429,1594 @@
       <p:bldP spid="5" grpId="0"/>
     </p:bldLst>
   </p:timing>
+</p:sld>
+</file>
+
+<file path=ppt/slides/slide80.xml><?xml version="1.0" encoding="utf-8"?>
+<p:sld xmlns:a="http://schemas.openxmlformats.org/drawingml/2006/main" xmlns:r="http://schemas.openxmlformats.org/officeDocument/2006/relationships" xmlns:p="http://schemas.openxmlformats.org/presentationml/2006/main">
+  <p:cSld>
+    <p:spTree>
+      <p:nvGrpSpPr>
+        <p:cNvPr id="1" name=""/>
+        <p:cNvGrpSpPr/>
+        <p:nvPr/>
+      </p:nvGrpSpPr>
+      <p:grpSpPr>
+        <a:xfrm>
+          <a:off x="0" y="0"/>
+          <a:ext cx="0" cy="0"/>
+          <a:chOff x="0" y="0"/>
+          <a:chExt cx="0" cy="0"/>
+        </a:xfrm>
+      </p:grpSpPr>
+      <p:sp>
+        <p:nvSpPr>
+          <p:cNvPr id="4" name="Date Placeholder 3">
+            <a:extLst>
+              <a:ext uri="{FF2B5EF4-FFF2-40B4-BE49-F238E27FC236}">
+                <a16:creationId xmlns:a16="http://schemas.microsoft.com/office/drawing/2014/main" id="{0CD670A9-B06A-3448-BABA-FAD627500859}"/>
+              </a:ext>
+            </a:extLst>
+          </p:cNvPr>
+          <p:cNvSpPr>
+            <a:spLocks noGrp="1"/>
+          </p:cNvSpPr>
+          <p:nvPr>
+            <p:ph type="dt" sz="half" idx="10"/>
+          </p:nvPr>
+        </p:nvSpPr>
+        <p:spPr/>
+        <p:txBody>
+          <a:bodyPr/>
+          <a:lstStyle/>
+          <a:p>
+            <a:r>
+              <a:rPr lang="en-US"/>
+              <a:t>World Wide Technology ©</a:t>
+            </a:r>
+            <a:endParaRPr lang="en-US" dirty="0"/>
+          </a:p>
+        </p:txBody>
+      </p:sp>
+      <p:sp>
+        <p:nvSpPr>
+          <p:cNvPr id="5" name="Slide Number Placeholder 4">
+            <a:extLst>
+              <a:ext uri="{FF2B5EF4-FFF2-40B4-BE49-F238E27FC236}">
+                <a16:creationId xmlns:a16="http://schemas.microsoft.com/office/drawing/2014/main" id="{119DACAD-17C1-C249-A498-C4A1A1ADD334}"/>
+              </a:ext>
+            </a:extLst>
+          </p:cNvPr>
+          <p:cNvSpPr>
+            <a:spLocks noGrp="1"/>
+          </p:cNvSpPr>
+          <p:nvPr>
+            <p:ph type="sldNum" sz="quarter" idx="12"/>
+          </p:nvPr>
+        </p:nvSpPr>
+        <p:spPr/>
+        <p:txBody>
+          <a:bodyPr/>
+          <a:lstStyle/>
+          <a:p>
+            <a:fld id="{A44B02FA-DD2D-1844-AE35-8B2EAB0CF4EF}" type="slidenum">
+              <a:rPr lang="en-US" smtClean="0"/>
+              <a:pPr/>
+              <a:t>80</a:t>
+            </a:fld>
+            <a:endParaRPr lang="en-US" dirty="0"/>
+          </a:p>
+        </p:txBody>
+      </p:sp>
+    </p:spTree>
+    <p:extLst>
+      <p:ext uri="{BB962C8B-B14F-4D97-AF65-F5344CB8AC3E}">
+        <p14:creationId xmlns:p14="http://schemas.microsoft.com/office/powerpoint/2010/main" val="3820490776"/>
+      </p:ext>
+    </p:extLst>
+  </p:cSld>
+  <p:clrMapOvr>
+    <a:masterClrMapping/>
+  </p:clrMapOvr>
+  <mc:AlternateContent xmlns:mc="http://schemas.openxmlformats.org/markup-compatibility/2006" xmlns:p14="http://schemas.microsoft.com/office/powerpoint/2010/main">
+    <mc:Choice Requires="p14">
+      <p:transition spd="med" p14:dur="700">
+        <p:fade/>
+      </p:transition>
+    </mc:Choice>
+    <mc:Fallback xmlns="">
+      <p:transition spd="med">
+        <p:fade/>
+      </p:transition>
+    </mc:Fallback>
+  </mc:AlternateContent>
+</p:sld>
+</file>
+
+<file path=ppt/slides/slide81.xml><?xml version="1.0" encoding="utf-8"?>
+<p:sld xmlns:a="http://schemas.openxmlformats.org/drawingml/2006/main" xmlns:r="http://schemas.openxmlformats.org/officeDocument/2006/relationships" xmlns:p="http://schemas.openxmlformats.org/presentationml/2006/main">
+  <p:cSld>
+    <p:spTree>
+      <p:nvGrpSpPr>
+        <p:cNvPr id="1" name=""/>
+        <p:cNvGrpSpPr/>
+        <p:nvPr/>
+      </p:nvGrpSpPr>
+      <p:grpSpPr>
+        <a:xfrm>
+          <a:off x="0" y="0"/>
+          <a:ext cx="0" cy="0"/>
+          <a:chOff x="0" y="0"/>
+          <a:chExt cx="0" cy="0"/>
+        </a:xfrm>
+      </p:grpSpPr>
+      <p:sp>
+        <p:nvSpPr>
+          <p:cNvPr id="2" name="Title 1">
+            <a:extLst>
+              <a:ext uri="{FF2B5EF4-FFF2-40B4-BE49-F238E27FC236}">
+                <a16:creationId xmlns:a16="http://schemas.microsoft.com/office/drawing/2014/main" id="{9B4DF7CD-7263-9840-AE80-6F1B7FA6AF3C}"/>
+              </a:ext>
+            </a:extLst>
+          </p:cNvPr>
+          <p:cNvSpPr>
+            <a:spLocks noGrp="1"/>
+          </p:cNvSpPr>
+          <p:nvPr>
+            <p:ph type="title"/>
+          </p:nvPr>
+        </p:nvSpPr>
+        <p:spPr/>
+        <p:txBody>
+          <a:bodyPr/>
+          <a:lstStyle/>
+          <a:p>
+            <a:r>
+              <a:rPr lang="en-US" dirty="0"/>
+              <a:t>Python – </a:t>
+            </a:r>
+            <a:r>
+              <a:rPr lang="en-US" dirty="0" err="1"/>
+              <a:t>DevNet</a:t>
+            </a:r>
+            <a:r>
+              <a:rPr lang="en-US" dirty="0"/>
+              <a:t> Always-On DNAC Sandbox</a:t>
+            </a:r>
+          </a:p>
+        </p:txBody>
+      </p:sp>
+      <p:sp>
+        <p:nvSpPr>
+          <p:cNvPr id="3" name="Content Placeholder 2">
+            <a:extLst>
+              <a:ext uri="{FF2B5EF4-FFF2-40B4-BE49-F238E27FC236}">
+                <a16:creationId xmlns:a16="http://schemas.microsoft.com/office/drawing/2014/main" id="{A610A140-16FE-F54F-9766-D3A50E4E4F0B}"/>
+              </a:ext>
+            </a:extLst>
+          </p:cNvPr>
+          <p:cNvSpPr>
+            <a:spLocks noGrp="1"/>
+          </p:cNvSpPr>
+          <p:nvPr>
+            <p:ph idx="1"/>
+          </p:nvPr>
+        </p:nvSpPr>
+        <p:spPr>
+          <a:xfrm>
+            <a:off x="838200" y="1825625"/>
+            <a:ext cx="11049000" cy="4351338"/>
+          </a:xfrm>
+        </p:spPr>
+        <p:txBody>
+          <a:bodyPr>
+            <a:normAutofit/>
+          </a:bodyPr>
+          <a:lstStyle/>
+          <a:p>
+            <a:r>
+              <a:rPr lang="en-US" dirty="0"/>
+              <a:t>Step 4 – Create a new Tenant</a:t>
+            </a:r>
+          </a:p>
+          <a:p>
+            <a:pPr marL="457200" lvl="1" indent="0">
+              <a:buNone/>
+            </a:pPr>
+            <a:r>
+              <a:rPr lang="en-US" b="1" i="1" dirty="0" err="1">
+                <a:solidFill>
+                  <a:srgbClr val="FFFF00"/>
+                </a:solidFill>
+              </a:rPr>
+              <a:t>new_tenant</a:t>
+            </a:r>
+            <a:r>
+              <a:rPr lang="en-US" b="1" i="1" dirty="0">
+                <a:solidFill>
+                  <a:srgbClr val="FFFF00"/>
+                </a:solidFill>
+              </a:rPr>
+              <a:t> = {'</a:t>
+            </a:r>
+            <a:r>
+              <a:rPr lang="en-US" b="1" i="1" dirty="0" err="1">
+                <a:solidFill>
+                  <a:srgbClr val="FFFF00"/>
+                </a:solidFill>
+              </a:rPr>
+              <a:t>fvTenant</a:t>
+            </a:r>
+            <a:r>
+              <a:rPr lang="en-US" b="1" i="1" dirty="0">
+                <a:solidFill>
+                  <a:srgbClr val="FFFF00"/>
+                </a:solidFill>
+              </a:rPr>
+              <a:t>':{'attributes':{'name':'</a:t>
+            </a:r>
+            <a:r>
+              <a:rPr lang="en-US" b="1" i="1" dirty="0" err="1">
+                <a:solidFill>
+                  <a:srgbClr val="FFFF00"/>
+                </a:solidFill>
+              </a:rPr>
+              <a:t>my_new_tenant</a:t>
+            </a:r>
+            <a:r>
+              <a:rPr lang="en-US" b="1" i="1" dirty="0">
+                <a:solidFill>
+                  <a:srgbClr val="FFFF00"/>
+                </a:solidFill>
+              </a:rPr>
+              <a:t>'}}}</a:t>
+            </a:r>
+          </a:p>
+          <a:p>
+            <a:pPr marL="457200" lvl="1" indent="0">
+              <a:buNone/>
+            </a:pPr>
+            <a:r>
+              <a:rPr lang="en-US" b="1" i="1" dirty="0" err="1">
+                <a:solidFill>
+                  <a:srgbClr val="FFFF00"/>
+                </a:solidFill>
+              </a:rPr>
+              <a:t>post_url</a:t>
+            </a:r>
+            <a:r>
+              <a:rPr lang="en-US" b="1" i="1" dirty="0">
+                <a:solidFill>
+                  <a:srgbClr val="FFFF00"/>
+                </a:solidFill>
+              </a:rPr>
+              <a:t> = 'https://</a:t>
+            </a:r>
+            <a:r>
+              <a:rPr lang="en-US" b="1" i="1" dirty="0" err="1">
+                <a:solidFill>
+                  <a:srgbClr val="FFFF00"/>
+                </a:solidFill>
+              </a:rPr>
+              <a:t>sandboxapicdc.cisco.com</a:t>
+            </a:r>
+            <a:r>
+              <a:rPr lang="en-US" b="1" i="1" dirty="0">
+                <a:solidFill>
+                  <a:srgbClr val="FFFF00"/>
+                </a:solidFill>
+              </a:rPr>
+              <a:t>/</a:t>
+            </a:r>
+            <a:r>
+              <a:rPr lang="en-US" b="1" i="1" dirty="0" err="1">
+                <a:solidFill>
+                  <a:srgbClr val="FFFF00"/>
+                </a:solidFill>
+              </a:rPr>
+              <a:t>api</a:t>
+            </a:r>
+            <a:r>
+              <a:rPr lang="en-US" b="1" i="1" dirty="0">
+                <a:solidFill>
+                  <a:srgbClr val="FFFF00"/>
+                </a:solidFill>
+              </a:rPr>
+              <a:t>/</a:t>
+            </a:r>
+            <a:r>
+              <a:rPr lang="en-US" b="1" i="1" dirty="0" err="1">
+                <a:solidFill>
+                  <a:srgbClr val="FFFF00"/>
+                </a:solidFill>
+              </a:rPr>
+              <a:t>mo</a:t>
+            </a:r>
+            <a:r>
+              <a:rPr lang="en-US" b="1" i="1" dirty="0">
+                <a:solidFill>
+                  <a:srgbClr val="FFFF00"/>
+                </a:solidFill>
+              </a:rPr>
+              <a:t>/</a:t>
+            </a:r>
+            <a:r>
+              <a:rPr lang="en-US" b="1" i="1" dirty="0" err="1">
+                <a:solidFill>
+                  <a:srgbClr val="FFFF00"/>
+                </a:solidFill>
+              </a:rPr>
+              <a:t>uni.json</a:t>
+            </a:r>
+            <a:r>
+              <a:rPr lang="en-US" b="1" i="1" dirty="0">
+                <a:solidFill>
+                  <a:srgbClr val="FFFF00"/>
+                </a:solidFill>
+              </a:rPr>
+              <a:t>'</a:t>
+            </a:r>
+          </a:p>
+          <a:p>
+            <a:pPr marL="457200" lvl="1" indent="0">
+              <a:buNone/>
+            </a:pPr>
+            <a:r>
+              <a:rPr lang="en-US" b="1" i="1" dirty="0" err="1">
+                <a:solidFill>
+                  <a:srgbClr val="FFFF00"/>
+                </a:solidFill>
+              </a:rPr>
+              <a:t>post_response</a:t>
+            </a:r>
+            <a:r>
+              <a:rPr lang="en-US" b="1" i="1" dirty="0">
+                <a:solidFill>
+                  <a:srgbClr val="FFFF00"/>
+                </a:solidFill>
+              </a:rPr>
+              <a:t> = </a:t>
+            </a:r>
+            <a:r>
+              <a:rPr lang="en-US" b="1" i="1" dirty="0" err="1">
+                <a:solidFill>
+                  <a:srgbClr val="FFFF00"/>
+                </a:solidFill>
+              </a:rPr>
+              <a:t>session.post</a:t>
+            </a:r>
+            <a:r>
+              <a:rPr lang="en-US" b="1" i="1" dirty="0">
+                <a:solidFill>
+                  <a:srgbClr val="FFFF00"/>
+                </a:solidFill>
+              </a:rPr>
+              <a:t>(</a:t>
+            </a:r>
+            <a:r>
+              <a:rPr lang="en-US" b="1" i="1" dirty="0" err="1">
+                <a:solidFill>
+                  <a:srgbClr val="FFFF00"/>
+                </a:solidFill>
+              </a:rPr>
+              <a:t>post_url</a:t>
+            </a:r>
+            <a:r>
+              <a:rPr lang="en-US" b="1" i="1" dirty="0">
+                <a:solidFill>
+                  <a:srgbClr val="FFFF00"/>
+                </a:solidFill>
+              </a:rPr>
+              <a:t>, json=</a:t>
+            </a:r>
+            <a:r>
+              <a:rPr lang="en-US" b="1" i="1" dirty="0" err="1">
+                <a:solidFill>
+                  <a:srgbClr val="FFFF00"/>
+                </a:solidFill>
+              </a:rPr>
+              <a:t>new_tenant</a:t>
+            </a:r>
+            <a:r>
+              <a:rPr lang="en-US" b="1" i="1" dirty="0">
+                <a:solidFill>
+                  <a:srgbClr val="FFFF00"/>
+                </a:solidFill>
+              </a:rPr>
+              <a:t>, cookies=</a:t>
+            </a:r>
+            <a:r>
+              <a:rPr lang="en-US" b="1" i="1" dirty="0" err="1">
+                <a:solidFill>
+                  <a:srgbClr val="FFFF00"/>
+                </a:solidFill>
+              </a:rPr>
+              <a:t>session_cookie</a:t>
+            </a:r>
+            <a:r>
+              <a:rPr lang="en-US" b="1" i="1" dirty="0">
+                <a:solidFill>
+                  <a:srgbClr val="FFFF00"/>
+                </a:solidFill>
+              </a:rPr>
+              <a:t>)</a:t>
+            </a:r>
+          </a:p>
+          <a:p>
+            <a:pPr marL="457200" lvl="1" indent="0">
+              <a:buNone/>
+            </a:pPr>
+            <a:r>
+              <a:rPr lang="en-US" b="1" i="1" dirty="0">
+                <a:solidFill>
+                  <a:srgbClr val="FFFF00"/>
+                </a:solidFill>
+              </a:rPr>
+              <a:t>print(f'{</a:t>
+            </a:r>
+            <a:r>
+              <a:rPr lang="en-US" b="1" i="1" dirty="0" err="1">
+                <a:solidFill>
+                  <a:srgbClr val="FFFF00"/>
+                </a:solidFill>
+              </a:rPr>
+              <a:t>post_response.status_code</a:t>
+            </a:r>
+            <a:r>
+              <a:rPr lang="en-US" b="1" i="1" dirty="0">
+                <a:solidFill>
+                  <a:srgbClr val="FFFF00"/>
+                </a:solidFill>
+              </a:rPr>
+              <a:t>} {</a:t>
+            </a:r>
+            <a:r>
+              <a:rPr lang="en-US" b="1" i="1" dirty="0" err="1">
+                <a:solidFill>
+                  <a:srgbClr val="FFFF00"/>
+                </a:solidFill>
+              </a:rPr>
+              <a:t>post_response.reason</a:t>
+            </a:r>
+            <a:r>
+              <a:rPr lang="en-US" b="1" i="1" dirty="0">
+                <a:solidFill>
+                  <a:srgbClr val="FFFF00"/>
+                </a:solidFill>
+              </a:rPr>
+              <a:t>}’)</a:t>
+            </a:r>
+          </a:p>
+          <a:p>
+            <a:pPr marL="457200" lvl="1" indent="0">
+              <a:buNone/>
+            </a:pPr>
+            <a:r>
+              <a:rPr lang="en-US" b="1" i="1" dirty="0">
+                <a:solidFill>
+                  <a:srgbClr val="FFFF00"/>
+                </a:solidFill>
+              </a:rPr>
+              <a:t>print(</a:t>
+            </a:r>
+            <a:r>
+              <a:rPr lang="en-US" b="1" i="1" dirty="0" err="1">
+                <a:solidFill>
+                  <a:srgbClr val="FFFF00"/>
+                </a:solidFill>
+              </a:rPr>
+              <a:t>post_response.json</a:t>
+            </a:r>
+            <a:r>
+              <a:rPr lang="en-US" b="1" i="1" dirty="0">
+                <a:solidFill>
+                  <a:srgbClr val="FFFF00"/>
+                </a:solidFill>
+              </a:rPr>
+              <a:t>())</a:t>
+            </a:r>
+          </a:p>
+        </p:txBody>
+      </p:sp>
+      <p:sp>
+        <p:nvSpPr>
+          <p:cNvPr id="4" name="Date Placeholder 3">
+            <a:extLst>
+              <a:ext uri="{FF2B5EF4-FFF2-40B4-BE49-F238E27FC236}">
+                <a16:creationId xmlns:a16="http://schemas.microsoft.com/office/drawing/2014/main" id="{D7D9528C-333D-BF4A-844C-7BCC7757E858}"/>
+              </a:ext>
+            </a:extLst>
+          </p:cNvPr>
+          <p:cNvSpPr>
+            <a:spLocks noGrp="1"/>
+          </p:cNvSpPr>
+          <p:nvPr>
+            <p:ph type="dt" sz="half" idx="10"/>
+          </p:nvPr>
+        </p:nvSpPr>
+        <p:spPr/>
+        <p:txBody>
+          <a:bodyPr/>
+          <a:lstStyle/>
+          <a:p>
+            <a:r>
+              <a:rPr lang="en-US"/>
+              <a:t>World Wide Technology ©</a:t>
+            </a:r>
+            <a:endParaRPr lang="en-US" dirty="0"/>
+          </a:p>
+        </p:txBody>
+      </p:sp>
+      <p:sp>
+        <p:nvSpPr>
+          <p:cNvPr id="5" name="Slide Number Placeholder 4">
+            <a:extLst>
+              <a:ext uri="{FF2B5EF4-FFF2-40B4-BE49-F238E27FC236}">
+                <a16:creationId xmlns:a16="http://schemas.microsoft.com/office/drawing/2014/main" id="{0798D1A2-1CD4-4A47-A0BC-C1215D1CD611}"/>
+              </a:ext>
+            </a:extLst>
+          </p:cNvPr>
+          <p:cNvSpPr>
+            <a:spLocks noGrp="1"/>
+          </p:cNvSpPr>
+          <p:nvPr>
+            <p:ph type="sldNum" sz="quarter" idx="12"/>
+          </p:nvPr>
+        </p:nvSpPr>
+        <p:spPr/>
+        <p:txBody>
+          <a:bodyPr/>
+          <a:lstStyle/>
+          <a:p>
+            <a:fld id="{A44B02FA-DD2D-1844-AE35-8B2EAB0CF4EF}" type="slidenum">
+              <a:rPr lang="en-US" smtClean="0"/>
+              <a:pPr/>
+              <a:t>81</a:t>
+            </a:fld>
+            <a:endParaRPr lang="en-US" dirty="0"/>
+          </a:p>
+        </p:txBody>
+      </p:sp>
+    </p:spTree>
+    <p:extLst>
+      <p:ext uri="{BB962C8B-B14F-4D97-AF65-F5344CB8AC3E}">
+        <p14:creationId xmlns:p14="http://schemas.microsoft.com/office/powerpoint/2010/main" val="3329322259"/>
+      </p:ext>
+    </p:extLst>
+  </p:cSld>
+  <p:clrMapOvr>
+    <a:masterClrMapping/>
+  </p:clrMapOvr>
+  <mc:AlternateContent xmlns:mc="http://schemas.openxmlformats.org/markup-compatibility/2006" xmlns:p14="http://schemas.microsoft.com/office/powerpoint/2010/main">
+    <mc:Choice Requires="p14">
+      <p:transition spd="med" p14:dur="700">
+        <p:fade/>
+      </p:transition>
+    </mc:Choice>
+    <mc:Fallback xmlns="">
+      <p:transition spd="med">
+        <p:fade/>
+      </p:transition>
+    </mc:Fallback>
+  </mc:AlternateContent>
+</p:sld>
+</file>
+
+<file path=ppt/slides/slide82.xml><?xml version="1.0" encoding="utf-8"?>
+<p:sld xmlns:a="http://schemas.openxmlformats.org/drawingml/2006/main" xmlns:r="http://schemas.openxmlformats.org/officeDocument/2006/relationships" xmlns:p="http://schemas.openxmlformats.org/presentationml/2006/main">
+  <p:cSld>
+    <p:spTree>
+      <p:nvGrpSpPr>
+        <p:cNvPr id="1" name=""/>
+        <p:cNvGrpSpPr/>
+        <p:nvPr/>
+      </p:nvGrpSpPr>
+      <p:grpSpPr>
+        <a:xfrm>
+          <a:off x="0" y="0"/>
+          <a:ext cx="0" cy="0"/>
+          <a:chOff x="0" y="0"/>
+          <a:chExt cx="0" cy="0"/>
+        </a:xfrm>
+      </p:grpSpPr>
+      <p:sp>
+        <p:nvSpPr>
+          <p:cNvPr id="4" name="Date Placeholder 3">
+            <a:extLst>
+              <a:ext uri="{FF2B5EF4-FFF2-40B4-BE49-F238E27FC236}">
+                <a16:creationId xmlns:a16="http://schemas.microsoft.com/office/drawing/2014/main" id="{0CD670A9-B06A-3448-BABA-FAD627500859}"/>
+              </a:ext>
+            </a:extLst>
+          </p:cNvPr>
+          <p:cNvSpPr>
+            <a:spLocks noGrp="1"/>
+          </p:cNvSpPr>
+          <p:nvPr>
+            <p:ph type="dt" sz="half" idx="10"/>
+          </p:nvPr>
+        </p:nvSpPr>
+        <p:spPr/>
+        <p:txBody>
+          <a:bodyPr/>
+          <a:lstStyle/>
+          <a:p>
+            <a:r>
+              <a:rPr lang="en-US"/>
+              <a:t>World Wide Technology ©</a:t>
+            </a:r>
+            <a:endParaRPr lang="en-US" dirty="0"/>
+          </a:p>
+        </p:txBody>
+      </p:sp>
+      <p:sp>
+        <p:nvSpPr>
+          <p:cNvPr id="5" name="Slide Number Placeholder 4">
+            <a:extLst>
+              <a:ext uri="{FF2B5EF4-FFF2-40B4-BE49-F238E27FC236}">
+                <a16:creationId xmlns:a16="http://schemas.microsoft.com/office/drawing/2014/main" id="{119DACAD-17C1-C249-A498-C4A1A1ADD334}"/>
+              </a:ext>
+            </a:extLst>
+          </p:cNvPr>
+          <p:cNvSpPr>
+            <a:spLocks noGrp="1"/>
+          </p:cNvSpPr>
+          <p:nvPr>
+            <p:ph type="sldNum" sz="quarter" idx="12"/>
+          </p:nvPr>
+        </p:nvSpPr>
+        <p:spPr/>
+        <p:txBody>
+          <a:bodyPr/>
+          <a:lstStyle/>
+          <a:p>
+            <a:fld id="{A44B02FA-DD2D-1844-AE35-8B2EAB0CF4EF}" type="slidenum">
+              <a:rPr lang="en-US" smtClean="0"/>
+              <a:pPr/>
+              <a:t>82</a:t>
+            </a:fld>
+            <a:endParaRPr lang="en-US" dirty="0"/>
+          </a:p>
+        </p:txBody>
+      </p:sp>
+    </p:spTree>
+    <p:extLst>
+      <p:ext uri="{BB962C8B-B14F-4D97-AF65-F5344CB8AC3E}">
+        <p14:creationId xmlns:p14="http://schemas.microsoft.com/office/powerpoint/2010/main" val="1732490110"/>
+      </p:ext>
+    </p:extLst>
+  </p:cSld>
+  <p:clrMapOvr>
+    <a:masterClrMapping/>
+  </p:clrMapOvr>
+  <mc:AlternateContent xmlns:mc="http://schemas.openxmlformats.org/markup-compatibility/2006" xmlns:p14="http://schemas.microsoft.com/office/powerpoint/2010/main">
+    <mc:Choice Requires="p14">
+      <p:transition spd="med" p14:dur="700">
+        <p:fade/>
+      </p:transition>
+    </mc:Choice>
+    <mc:Fallback xmlns="">
+      <p:transition spd="med">
+        <p:fade/>
+      </p:transition>
+    </mc:Fallback>
+  </mc:AlternateContent>
+</p:sld>
+</file>
+
+<file path=ppt/slides/slide83.xml><?xml version="1.0" encoding="utf-8"?>
+<p:sld xmlns:a="http://schemas.openxmlformats.org/drawingml/2006/main" xmlns:r="http://schemas.openxmlformats.org/officeDocument/2006/relationships" xmlns:p="http://schemas.openxmlformats.org/presentationml/2006/main">
+  <p:cSld>
+    <p:spTree>
+      <p:nvGrpSpPr>
+        <p:cNvPr id="1" name=""/>
+        <p:cNvGrpSpPr/>
+        <p:nvPr/>
+      </p:nvGrpSpPr>
+      <p:grpSpPr>
+        <a:xfrm>
+          <a:off x="0" y="0"/>
+          <a:ext cx="0" cy="0"/>
+          <a:chOff x="0" y="0"/>
+          <a:chExt cx="0" cy="0"/>
+        </a:xfrm>
+      </p:grpSpPr>
+      <p:sp>
+        <p:nvSpPr>
+          <p:cNvPr id="2" name="Title 1">
+            <a:extLst>
+              <a:ext uri="{FF2B5EF4-FFF2-40B4-BE49-F238E27FC236}">
+                <a16:creationId xmlns:a16="http://schemas.microsoft.com/office/drawing/2014/main" id="{9D8D6E4C-FC36-3E4C-9387-96DD20072D9D}"/>
+              </a:ext>
+            </a:extLst>
+          </p:cNvPr>
+          <p:cNvSpPr>
+            <a:spLocks noGrp="1"/>
+          </p:cNvSpPr>
+          <p:nvPr>
+            <p:ph type="ctrTitle"/>
+          </p:nvPr>
+        </p:nvSpPr>
+        <p:spPr>
+          <a:xfrm>
+            <a:off x="1524000" y="914013"/>
+            <a:ext cx="9144000" cy="2387600"/>
+          </a:xfrm>
+        </p:spPr>
+        <p:txBody>
+          <a:bodyPr/>
+          <a:lstStyle/>
+          <a:p>
+            <a:r>
+              <a:rPr lang="en-US" dirty="0"/>
+              <a:t>Part VI</a:t>
+            </a:r>
+          </a:p>
+        </p:txBody>
+      </p:sp>
+      <p:sp>
+        <p:nvSpPr>
+          <p:cNvPr id="3" name="Subtitle 2">
+            <a:extLst>
+              <a:ext uri="{FF2B5EF4-FFF2-40B4-BE49-F238E27FC236}">
+                <a16:creationId xmlns:a16="http://schemas.microsoft.com/office/drawing/2014/main" id="{0451A0DE-9D64-5A48-94B5-5B4E42709819}"/>
+              </a:ext>
+            </a:extLst>
+          </p:cNvPr>
+          <p:cNvSpPr>
+            <a:spLocks noGrp="1"/>
+          </p:cNvSpPr>
+          <p:nvPr>
+            <p:ph type="subTitle" idx="1"/>
+          </p:nvPr>
+        </p:nvSpPr>
+        <p:spPr>
+          <a:xfrm>
+            <a:off x="1524000" y="3393688"/>
+            <a:ext cx="9144000" cy="1655762"/>
+          </a:xfrm>
+        </p:spPr>
+        <p:txBody>
+          <a:bodyPr/>
+          <a:lstStyle/>
+          <a:p>
+            <a:r>
+              <a:rPr lang="en-US" dirty="0"/>
+              <a:t>Interact With Cisco Platform APIs Using Python Requests</a:t>
+            </a:r>
+          </a:p>
+        </p:txBody>
+      </p:sp>
+    </p:spTree>
+    <p:extLst>
+      <p:ext uri="{BB962C8B-B14F-4D97-AF65-F5344CB8AC3E}">
+        <p14:creationId xmlns:p14="http://schemas.microsoft.com/office/powerpoint/2010/main" val="4218248441"/>
+      </p:ext>
+    </p:extLst>
+  </p:cSld>
+  <p:clrMapOvr>
+    <a:masterClrMapping/>
+  </p:clrMapOvr>
+  <mc:AlternateContent xmlns:mc="http://schemas.openxmlformats.org/markup-compatibility/2006" xmlns:p14="http://schemas.microsoft.com/office/powerpoint/2010/main">
+    <mc:Choice Requires="p14">
+      <p:transition spd="med" p14:dur="700">
+        <p:fade/>
+      </p:transition>
+    </mc:Choice>
+    <mc:Fallback xmlns="">
+      <p:transition spd="med">
+        <p:fade/>
+      </p:transition>
+    </mc:Fallback>
+  </mc:AlternateContent>
+</p:sld>
+</file>
+
+<file path=ppt/slides/slide84.xml><?xml version="1.0" encoding="utf-8"?>
+<p:sld xmlns:a="http://schemas.openxmlformats.org/drawingml/2006/main" xmlns:r="http://schemas.openxmlformats.org/officeDocument/2006/relationships" xmlns:p="http://schemas.openxmlformats.org/presentationml/2006/main">
+  <p:cSld>
+    <p:spTree>
+      <p:nvGrpSpPr>
+        <p:cNvPr id="1" name=""/>
+        <p:cNvGrpSpPr/>
+        <p:nvPr/>
+      </p:nvGrpSpPr>
+      <p:grpSpPr>
+        <a:xfrm>
+          <a:off x="0" y="0"/>
+          <a:ext cx="0" cy="0"/>
+          <a:chOff x="0" y="0"/>
+          <a:chExt cx="0" cy="0"/>
+        </a:xfrm>
+      </p:grpSpPr>
+      <p:sp>
+        <p:nvSpPr>
+          <p:cNvPr id="2" name="Title 1">
+            <a:extLst>
+              <a:ext uri="{FF2B5EF4-FFF2-40B4-BE49-F238E27FC236}">
+                <a16:creationId xmlns:a16="http://schemas.microsoft.com/office/drawing/2014/main" id="{EB7C4089-1746-624B-8E73-D3DAB8E88CDD}"/>
+              </a:ext>
+            </a:extLst>
+          </p:cNvPr>
+          <p:cNvSpPr>
+            <a:spLocks noGrp="1"/>
+          </p:cNvSpPr>
+          <p:nvPr>
+            <p:ph type="title"/>
+          </p:nvPr>
+        </p:nvSpPr>
+        <p:spPr/>
+        <p:txBody>
+          <a:bodyPr/>
+          <a:lstStyle/>
+          <a:p>
+            <a:r>
+              <a:rPr lang="en-US" dirty="0"/>
+              <a:t>Outline</a:t>
+            </a:r>
+          </a:p>
+        </p:txBody>
+      </p:sp>
+      <p:sp>
+        <p:nvSpPr>
+          <p:cNvPr id="3" name="Content Placeholder 2">
+            <a:extLst>
+              <a:ext uri="{FF2B5EF4-FFF2-40B4-BE49-F238E27FC236}">
+                <a16:creationId xmlns:a16="http://schemas.microsoft.com/office/drawing/2014/main" id="{65426B10-0364-A849-B3A4-1D0DA409155A}"/>
+              </a:ext>
+            </a:extLst>
+          </p:cNvPr>
+          <p:cNvSpPr>
+            <a:spLocks noGrp="1"/>
+          </p:cNvSpPr>
+          <p:nvPr>
+            <p:ph idx="1"/>
+          </p:nvPr>
+        </p:nvSpPr>
+        <p:spPr/>
+        <p:txBody>
+          <a:bodyPr/>
+          <a:lstStyle/>
+          <a:p>
+            <a:r>
+              <a:rPr lang="en-US" dirty="0"/>
+              <a:t>For each of these platforms:</a:t>
+            </a:r>
+          </a:p>
+          <a:p>
+            <a:pPr lvl="1"/>
+            <a:r>
+              <a:rPr lang="en-US" dirty="0"/>
+              <a:t>ACI</a:t>
+            </a:r>
+          </a:p>
+          <a:p>
+            <a:pPr lvl="1"/>
+            <a:r>
+              <a:rPr lang="en-US" dirty="0"/>
+              <a:t>DNAC</a:t>
+            </a:r>
+          </a:p>
+          <a:p>
+            <a:pPr lvl="1"/>
+            <a:r>
+              <a:rPr lang="en-US" dirty="0"/>
+              <a:t>Meraki</a:t>
+            </a:r>
+          </a:p>
+          <a:p>
+            <a:pPr lvl="1"/>
+            <a:r>
+              <a:rPr lang="en-US" dirty="0" err="1"/>
+              <a:t>Webex</a:t>
+            </a:r>
+            <a:r>
+              <a:rPr lang="en-US" dirty="0"/>
+              <a:t> Teams</a:t>
+            </a:r>
+          </a:p>
+          <a:p>
+            <a:r>
+              <a:rPr lang="en-US" dirty="0"/>
+              <a:t>Perform the following tasks:</a:t>
+            </a:r>
+          </a:p>
+          <a:p>
+            <a:pPr lvl="1"/>
+            <a:r>
+              <a:rPr lang="en-US" dirty="0"/>
+              <a:t>Review authentication methodology</a:t>
+            </a:r>
+          </a:p>
+          <a:p>
+            <a:pPr lvl="1"/>
+            <a:r>
+              <a:rPr lang="en-US" dirty="0"/>
+              <a:t>Build Python scripts to authenticate</a:t>
+            </a:r>
+          </a:p>
+          <a:p>
+            <a:pPr lvl="1"/>
+            <a:r>
+              <a:rPr lang="en-US" dirty="0"/>
+              <a:t>Build Python scripts to read/write data</a:t>
+            </a:r>
+          </a:p>
+        </p:txBody>
+      </p:sp>
+      <p:sp>
+        <p:nvSpPr>
+          <p:cNvPr id="4" name="Date Placeholder 3">
+            <a:extLst>
+              <a:ext uri="{FF2B5EF4-FFF2-40B4-BE49-F238E27FC236}">
+                <a16:creationId xmlns:a16="http://schemas.microsoft.com/office/drawing/2014/main" id="{7ECEAF79-F4AC-E94E-9E55-220D0D396924}"/>
+              </a:ext>
+            </a:extLst>
+          </p:cNvPr>
+          <p:cNvSpPr>
+            <a:spLocks noGrp="1"/>
+          </p:cNvSpPr>
+          <p:nvPr>
+            <p:ph type="dt" sz="half" idx="10"/>
+          </p:nvPr>
+        </p:nvSpPr>
+        <p:spPr/>
+        <p:txBody>
+          <a:bodyPr/>
+          <a:lstStyle/>
+          <a:p>
+            <a:r>
+              <a:rPr lang="en-US"/>
+              <a:t>World Wide Technology ©</a:t>
+            </a:r>
+            <a:endParaRPr lang="en-US" dirty="0"/>
+          </a:p>
+        </p:txBody>
+      </p:sp>
+      <p:sp>
+        <p:nvSpPr>
+          <p:cNvPr id="5" name="Slide Number Placeholder 4">
+            <a:extLst>
+              <a:ext uri="{FF2B5EF4-FFF2-40B4-BE49-F238E27FC236}">
+                <a16:creationId xmlns:a16="http://schemas.microsoft.com/office/drawing/2014/main" id="{372DC1A4-CE8B-DB4A-8F86-2508518C35D3}"/>
+              </a:ext>
+            </a:extLst>
+          </p:cNvPr>
+          <p:cNvSpPr>
+            <a:spLocks noGrp="1"/>
+          </p:cNvSpPr>
+          <p:nvPr>
+            <p:ph type="sldNum" sz="quarter" idx="12"/>
+          </p:nvPr>
+        </p:nvSpPr>
+        <p:spPr/>
+        <p:txBody>
+          <a:bodyPr/>
+          <a:lstStyle/>
+          <a:p>
+            <a:fld id="{A44B02FA-DD2D-1844-AE35-8B2EAB0CF4EF}" type="slidenum">
+              <a:rPr lang="en-US" smtClean="0"/>
+              <a:pPr/>
+              <a:t>84</a:t>
+            </a:fld>
+            <a:endParaRPr lang="en-US" dirty="0"/>
+          </a:p>
+        </p:txBody>
+      </p:sp>
+    </p:spTree>
+    <p:extLst>
+      <p:ext uri="{BB962C8B-B14F-4D97-AF65-F5344CB8AC3E}">
+        <p14:creationId xmlns:p14="http://schemas.microsoft.com/office/powerpoint/2010/main" val="232106193"/>
+      </p:ext>
+    </p:extLst>
+  </p:cSld>
+  <p:clrMapOvr>
+    <a:masterClrMapping/>
+  </p:clrMapOvr>
+  <mc:AlternateContent xmlns:mc="http://schemas.openxmlformats.org/markup-compatibility/2006" xmlns:p14="http://schemas.microsoft.com/office/powerpoint/2010/main">
+    <mc:Choice Requires="p14">
+      <p:transition spd="med" p14:dur="700">
+        <p:fade/>
+      </p:transition>
+    </mc:Choice>
+    <mc:Fallback xmlns="">
+      <p:transition spd="med">
+        <p:fade/>
+      </p:transition>
+    </mc:Fallback>
+  </mc:AlternateContent>
+</p:sld>
+</file>
+
+<file path=ppt/slides/slide85.xml><?xml version="1.0" encoding="utf-8"?>
+<p:sld xmlns:a="http://schemas.openxmlformats.org/drawingml/2006/main" xmlns:r="http://schemas.openxmlformats.org/officeDocument/2006/relationships" xmlns:p="http://schemas.openxmlformats.org/presentationml/2006/main">
+  <p:cSld>
+    <p:spTree>
+      <p:nvGrpSpPr>
+        <p:cNvPr id="1" name=""/>
+        <p:cNvGrpSpPr/>
+        <p:nvPr/>
+      </p:nvGrpSpPr>
+      <p:grpSpPr>
+        <a:xfrm>
+          <a:off x="0" y="0"/>
+          <a:ext cx="0" cy="0"/>
+          <a:chOff x="0" y="0"/>
+          <a:chExt cx="0" cy="0"/>
+        </a:xfrm>
+      </p:grpSpPr>
+      <p:sp>
+        <p:nvSpPr>
+          <p:cNvPr id="2" name="Title 1">
+            <a:extLst>
+              <a:ext uri="{FF2B5EF4-FFF2-40B4-BE49-F238E27FC236}">
+                <a16:creationId xmlns:a16="http://schemas.microsoft.com/office/drawing/2014/main" id="{9D8D6E4C-FC36-3E4C-9387-96DD20072D9D}"/>
+              </a:ext>
+            </a:extLst>
+          </p:cNvPr>
+          <p:cNvSpPr>
+            <a:spLocks noGrp="1"/>
+          </p:cNvSpPr>
+          <p:nvPr>
+            <p:ph type="ctrTitle"/>
+          </p:nvPr>
+        </p:nvSpPr>
+        <p:spPr>
+          <a:xfrm>
+            <a:off x="1524000" y="914013"/>
+            <a:ext cx="9144000" cy="2387600"/>
+          </a:xfrm>
+        </p:spPr>
+        <p:txBody>
+          <a:bodyPr/>
+          <a:lstStyle/>
+          <a:p>
+            <a:r>
+              <a:rPr lang="en-US" dirty="0"/>
+              <a:t>Part VII</a:t>
+            </a:r>
+          </a:p>
+        </p:txBody>
+      </p:sp>
+      <p:sp>
+        <p:nvSpPr>
+          <p:cNvPr id="3" name="Subtitle 2">
+            <a:extLst>
+              <a:ext uri="{FF2B5EF4-FFF2-40B4-BE49-F238E27FC236}">
+                <a16:creationId xmlns:a16="http://schemas.microsoft.com/office/drawing/2014/main" id="{0451A0DE-9D64-5A48-94B5-5B4E42709819}"/>
+              </a:ext>
+            </a:extLst>
+          </p:cNvPr>
+          <p:cNvSpPr>
+            <a:spLocks noGrp="1"/>
+          </p:cNvSpPr>
+          <p:nvPr>
+            <p:ph type="subTitle" idx="1"/>
+          </p:nvPr>
+        </p:nvSpPr>
+        <p:spPr>
+          <a:xfrm>
+            <a:off x="1524000" y="3393688"/>
+            <a:ext cx="9144000" cy="1655762"/>
+          </a:xfrm>
+        </p:spPr>
+        <p:txBody>
+          <a:bodyPr/>
+          <a:lstStyle/>
+          <a:p>
+            <a:r>
+              <a:rPr lang="en-US" dirty="0"/>
+              <a:t>Quiz, Practice Resources, &amp; References</a:t>
+            </a:r>
+          </a:p>
+        </p:txBody>
+      </p:sp>
+    </p:spTree>
+    <p:extLst>
+      <p:ext uri="{BB962C8B-B14F-4D97-AF65-F5344CB8AC3E}">
+        <p14:creationId xmlns:p14="http://schemas.microsoft.com/office/powerpoint/2010/main" val="3392886013"/>
+      </p:ext>
+    </p:extLst>
+  </p:cSld>
+  <p:clrMapOvr>
+    <a:masterClrMapping/>
+  </p:clrMapOvr>
+  <mc:AlternateContent xmlns:mc="http://schemas.openxmlformats.org/markup-compatibility/2006" xmlns:p14="http://schemas.microsoft.com/office/powerpoint/2010/main">
+    <mc:Choice Requires="p14">
+      <p:transition spd="med" p14:dur="700">
+        <p:fade/>
+      </p:transition>
+    </mc:Choice>
+    <mc:Fallback xmlns="">
+      <p:transition spd="med">
+        <p:fade/>
+      </p:transition>
+    </mc:Fallback>
+  </mc:AlternateContent>
+</p:sld>
+</file>
+
+<file path=ppt/slides/slide86.xml><?xml version="1.0" encoding="utf-8"?>
+<p:sld xmlns:a="http://schemas.openxmlformats.org/drawingml/2006/main" xmlns:r="http://schemas.openxmlformats.org/officeDocument/2006/relationships" xmlns:p="http://schemas.openxmlformats.org/presentationml/2006/main">
+  <p:cSld>
+    <p:spTree>
+      <p:nvGrpSpPr>
+        <p:cNvPr id="1" name=""/>
+        <p:cNvGrpSpPr/>
+        <p:nvPr/>
+      </p:nvGrpSpPr>
+      <p:grpSpPr>
+        <a:xfrm>
+          <a:off x="0" y="0"/>
+          <a:ext cx="0" cy="0"/>
+          <a:chOff x="0" y="0"/>
+          <a:chExt cx="0" cy="0"/>
+        </a:xfrm>
+      </p:grpSpPr>
+      <p:sp>
+        <p:nvSpPr>
+          <p:cNvPr id="2" name="Title 1">
+            <a:extLst>
+              <a:ext uri="{FF2B5EF4-FFF2-40B4-BE49-F238E27FC236}">
+                <a16:creationId xmlns:a16="http://schemas.microsoft.com/office/drawing/2014/main" id="{EB7C4089-1746-624B-8E73-D3DAB8E88CDD}"/>
+              </a:ext>
+            </a:extLst>
+          </p:cNvPr>
+          <p:cNvSpPr>
+            <a:spLocks noGrp="1"/>
+          </p:cNvSpPr>
+          <p:nvPr>
+            <p:ph type="title"/>
+          </p:nvPr>
+        </p:nvSpPr>
+        <p:spPr/>
+        <p:txBody>
+          <a:bodyPr/>
+          <a:lstStyle/>
+          <a:p>
+            <a:r>
+              <a:rPr lang="en-US" dirty="0"/>
+              <a:t>Slide Template</a:t>
+            </a:r>
+          </a:p>
+        </p:txBody>
+      </p:sp>
+      <p:sp>
+        <p:nvSpPr>
+          <p:cNvPr id="3" name="Content Placeholder 2">
+            <a:extLst>
+              <a:ext uri="{FF2B5EF4-FFF2-40B4-BE49-F238E27FC236}">
+                <a16:creationId xmlns:a16="http://schemas.microsoft.com/office/drawing/2014/main" id="{65426B10-0364-A849-B3A4-1D0DA409155A}"/>
+              </a:ext>
+            </a:extLst>
+          </p:cNvPr>
+          <p:cNvSpPr>
+            <a:spLocks noGrp="1"/>
+          </p:cNvSpPr>
+          <p:nvPr>
+            <p:ph idx="1"/>
+          </p:nvPr>
+        </p:nvSpPr>
+        <p:spPr/>
+        <p:txBody>
+          <a:bodyPr/>
+          <a:lstStyle/>
+          <a:p>
+            <a:r>
+              <a:rPr lang="en-US" dirty="0"/>
+              <a:t>Body template</a:t>
+            </a:r>
+          </a:p>
+        </p:txBody>
+      </p:sp>
+      <p:sp>
+        <p:nvSpPr>
+          <p:cNvPr id="4" name="Date Placeholder 3">
+            <a:extLst>
+              <a:ext uri="{FF2B5EF4-FFF2-40B4-BE49-F238E27FC236}">
+                <a16:creationId xmlns:a16="http://schemas.microsoft.com/office/drawing/2014/main" id="{7ECEAF79-F4AC-E94E-9E55-220D0D396924}"/>
+              </a:ext>
+            </a:extLst>
+          </p:cNvPr>
+          <p:cNvSpPr>
+            <a:spLocks noGrp="1"/>
+          </p:cNvSpPr>
+          <p:nvPr>
+            <p:ph type="dt" sz="half" idx="10"/>
+          </p:nvPr>
+        </p:nvSpPr>
+        <p:spPr/>
+        <p:txBody>
+          <a:bodyPr/>
+          <a:lstStyle/>
+          <a:p>
+            <a:r>
+              <a:rPr lang="en-US"/>
+              <a:t>World Wide Technology ©</a:t>
+            </a:r>
+            <a:endParaRPr lang="en-US" dirty="0"/>
+          </a:p>
+        </p:txBody>
+      </p:sp>
+      <p:sp>
+        <p:nvSpPr>
+          <p:cNvPr id="5" name="Slide Number Placeholder 4">
+            <a:extLst>
+              <a:ext uri="{FF2B5EF4-FFF2-40B4-BE49-F238E27FC236}">
+                <a16:creationId xmlns:a16="http://schemas.microsoft.com/office/drawing/2014/main" id="{372DC1A4-CE8B-DB4A-8F86-2508518C35D3}"/>
+              </a:ext>
+            </a:extLst>
+          </p:cNvPr>
+          <p:cNvSpPr>
+            <a:spLocks noGrp="1"/>
+          </p:cNvSpPr>
+          <p:nvPr>
+            <p:ph type="sldNum" sz="quarter" idx="12"/>
+          </p:nvPr>
+        </p:nvSpPr>
+        <p:spPr/>
+        <p:txBody>
+          <a:bodyPr/>
+          <a:lstStyle/>
+          <a:p>
+            <a:fld id="{A44B02FA-DD2D-1844-AE35-8B2EAB0CF4EF}" type="slidenum">
+              <a:rPr lang="en-US" smtClean="0"/>
+              <a:pPr/>
+              <a:t>86</a:t>
+            </a:fld>
+            <a:endParaRPr lang="en-US" dirty="0"/>
+          </a:p>
+        </p:txBody>
+      </p:sp>
+    </p:spTree>
+    <p:extLst>
+      <p:ext uri="{BB962C8B-B14F-4D97-AF65-F5344CB8AC3E}">
+        <p14:creationId xmlns:p14="http://schemas.microsoft.com/office/powerpoint/2010/main" val="2709408928"/>
+      </p:ext>
+    </p:extLst>
+  </p:cSld>
+  <p:clrMapOvr>
+    <a:masterClrMapping/>
+  </p:clrMapOvr>
+  <mc:AlternateContent xmlns:mc="http://schemas.openxmlformats.org/markup-compatibility/2006" xmlns:p14="http://schemas.microsoft.com/office/powerpoint/2010/main">
+    <mc:Choice Requires="p14">
+      <p:transition spd="med" p14:dur="700">
+        <p:fade/>
+      </p:transition>
+    </mc:Choice>
+    <mc:Fallback xmlns="">
+      <p:transition spd="med">
+        <p:fade/>
+      </p:transition>
+    </mc:Fallback>
+  </mc:AlternateContent>
+</p:sld>
+</file>
+
+<file path=ppt/slides/slide87.xml><?xml version="1.0" encoding="utf-8"?>
+<p:sld xmlns:a="http://schemas.openxmlformats.org/drawingml/2006/main" xmlns:r="http://schemas.openxmlformats.org/officeDocument/2006/relationships" xmlns:p="http://schemas.openxmlformats.org/presentationml/2006/main">
+  <p:cSld>
+    <p:spTree>
+      <p:nvGrpSpPr>
+        <p:cNvPr id="1" name=""/>
+        <p:cNvGrpSpPr/>
+        <p:nvPr/>
+      </p:nvGrpSpPr>
+      <p:grpSpPr>
+        <a:xfrm>
+          <a:off x="0" y="0"/>
+          <a:ext cx="0" cy="0"/>
+          <a:chOff x="0" y="0"/>
+          <a:chExt cx="0" cy="0"/>
+        </a:xfrm>
+      </p:grpSpPr>
+      <p:sp>
+        <p:nvSpPr>
+          <p:cNvPr id="2" name="Title 1">
+            <a:extLst>
+              <a:ext uri="{FF2B5EF4-FFF2-40B4-BE49-F238E27FC236}">
+                <a16:creationId xmlns:a16="http://schemas.microsoft.com/office/drawing/2014/main" id="{EB7C4089-1746-624B-8E73-D3DAB8E88CDD}"/>
+              </a:ext>
+            </a:extLst>
+          </p:cNvPr>
+          <p:cNvSpPr>
+            <a:spLocks noGrp="1"/>
+          </p:cNvSpPr>
+          <p:nvPr>
+            <p:ph type="title"/>
+          </p:nvPr>
+        </p:nvSpPr>
+        <p:spPr/>
+        <p:txBody>
+          <a:bodyPr/>
+          <a:lstStyle/>
+          <a:p>
+            <a:r>
+              <a:rPr lang="en-US" dirty="0"/>
+              <a:t>References</a:t>
+            </a:r>
+          </a:p>
+        </p:txBody>
+      </p:sp>
+      <p:sp>
+        <p:nvSpPr>
+          <p:cNvPr id="3" name="Content Placeholder 2">
+            <a:extLst>
+              <a:ext uri="{FF2B5EF4-FFF2-40B4-BE49-F238E27FC236}">
+                <a16:creationId xmlns:a16="http://schemas.microsoft.com/office/drawing/2014/main" id="{65426B10-0364-A849-B3A4-1D0DA409155A}"/>
+              </a:ext>
+            </a:extLst>
+          </p:cNvPr>
+          <p:cNvSpPr>
+            <a:spLocks noGrp="1"/>
+          </p:cNvSpPr>
+          <p:nvPr>
+            <p:ph idx="1"/>
+          </p:nvPr>
+        </p:nvSpPr>
+        <p:spPr/>
+        <p:txBody>
+          <a:bodyPr>
+            <a:normAutofit fontScale="92500"/>
+          </a:bodyPr>
+          <a:lstStyle/>
+          <a:p>
+            <a:r>
+              <a:rPr lang="en-US" dirty="0">
+                <a:hlinkClick r:id="rId2"/>
+              </a:rPr>
+              <a:t>https://www.linkedin.com/pulse/why-rest-api-so-popular-mangesh-bulkar/</a:t>
+            </a:r>
+            <a:endParaRPr lang="en-US" dirty="0">
+              <a:hlinkClick r:id="rId3"/>
+            </a:endParaRPr>
+          </a:p>
+          <a:p>
+            <a:r>
+              <a:rPr lang="en-US" dirty="0">
+                <a:hlinkClick r:id="rId3"/>
+              </a:rPr>
+              <a:t>https://en.wikipedia.org/wiki/CURL</a:t>
+            </a:r>
+            <a:endParaRPr lang="en-US" dirty="0"/>
+          </a:p>
+          <a:p>
+            <a:r>
+              <a:rPr lang="en-US" dirty="0">
+                <a:hlinkClick r:id="rId4"/>
+              </a:rPr>
+              <a:t>https://en.wikipedia.org/wiki/Requests_%28software%29</a:t>
+            </a:r>
+            <a:endParaRPr lang="en-US" dirty="0"/>
+          </a:p>
+          <a:p>
+            <a:r>
+              <a:rPr lang="en-US" dirty="0">
+                <a:hlinkClick r:id="rId5"/>
+              </a:rPr>
+              <a:t>https://curl.haxx.se</a:t>
+            </a:r>
+            <a:endParaRPr lang="en-US" dirty="0"/>
+          </a:p>
+          <a:p>
+            <a:r>
+              <a:rPr lang="en-US" dirty="0">
+                <a:hlinkClick r:id="rId6"/>
+              </a:rPr>
+              <a:t>https://requests.readthedocs.io/en/master/</a:t>
+            </a:r>
+            <a:endParaRPr lang="en-US" dirty="0"/>
+          </a:p>
+          <a:p>
+            <a:r>
+              <a:rPr lang="en-US" dirty="0">
+                <a:hlinkClick r:id="rId7"/>
+              </a:rPr>
+              <a:t>https://2.python-requests.org/en/master/api/#requests.Response</a:t>
+            </a:r>
+            <a:endParaRPr lang="en-US" dirty="0"/>
+          </a:p>
+          <a:p>
+            <a:r>
+              <a:rPr lang="en-US" dirty="0"/>
+              <a:t>Cisco API documentation #1</a:t>
+            </a:r>
+          </a:p>
+          <a:p>
+            <a:r>
+              <a:rPr lang="en-US" dirty="0"/>
+              <a:t>Cisco API documentation #2</a:t>
+            </a:r>
+          </a:p>
+          <a:p>
+            <a:r>
+              <a:rPr lang="en-US" dirty="0"/>
+              <a:t>Cisco API documentation #3</a:t>
+            </a:r>
+          </a:p>
+        </p:txBody>
+      </p:sp>
+      <p:sp>
+        <p:nvSpPr>
+          <p:cNvPr id="4" name="Date Placeholder 3">
+            <a:extLst>
+              <a:ext uri="{FF2B5EF4-FFF2-40B4-BE49-F238E27FC236}">
+                <a16:creationId xmlns:a16="http://schemas.microsoft.com/office/drawing/2014/main" id="{7ECEAF79-F4AC-E94E-9E55-220D0D396924}"/>
+              </a:ext>
+            </a:extLst>
+          </p:cNvPr>
+          <p:cNvSpPr>
+            <a:spLocks noGrp="1"/>
+          </p:cNvSpPr>
+          <p:nvPr>
+            <p:ph type="dt" sz="half" idx="10"/>
+          </p:nvPr>
+        </p:nvSpPr>
+        <p:spPr/>
+        <p:txBody>
+          <a:bodyPr/>
+          <a:lstStyle/>
+          <a:p>
+            <a:r>
+              <a:rPr lang="en-US"/>
+              <a:t>World Wide Technology ©</a:t>
+            </a:r>
+            <a:endParaRPr lang="en-US" dirty="0"/>
+          </a:p>
+        </p:txBody>
+      </p:sp>
+      <p:sp>
+        <p:nvSpPr>
+          <p:cNvPr id="5" name="Slide Number Placeholder 4">
+            <a:extLst>
+              <a:ext uri="{FF2B5EF4-FFF2-40B4-BE49-F238E27FC236}">
+                <a16:creationId xmlns:a16="http://schemas.microsoft.com/office/drawing/2014/main" id="{372DC1A4-CE8B-DB4A-8F86-2508518C35D3}"/>
+              </a:ext>
+            </a:extLst>
+          </p:cNvPr>
+          <p:cNvSpPr>
+            <a:spLocks noGrp="1"/>
+          </p:cNvSpPr>
+          <p:nvPr>
+            <p:ph type="sldNum" sz="quarter" idx="12"/>
+          </p:nvPr>
+        </p:nvSpPr>
+        <p:spPr/>
+        <p:txBody>
+          <a:bodyPr/>
+          <a:lstStyle/>
+          <a:p>
+            <a:fld id="{A44B02FA-DD2D-1844-AE35-8B2EAB0CF4EF}" type="slidenum">
+              <a:rPr lang="en-US" smtClean="0"/>
+              <a:pPr/>
+              <a:t>87</a:t>
+            </a:fld>
+            <a:endParaRPr lang="en-US" dirty="0"/>
+          </a:p>
+        </p:txBody>
+      </p:sp>
+    </p:spTree>
+    <p:extLst>
+      <p:ext uri="{BB962C8B-B14F-4D97-AF65-F5344CB8AC3E}">
+        <p14:creationId xmlns:p14="http://schemas.microsoft.com/office/powerpoint/2010/main" val="3225595977"/>
+      </p:ext>
+    </p:extLst>
+  </p:cSld>
+  <p:clrMapOvr>
+    <a:masterClrMapping/>
+  </p:clrMapOvr>
+  <mc:AlternateContent xmlns:mc="http://schemas.openxmlformats.org/markup-compatibility/2006" xmlns:p14="http://schemas.microsoft.com/office/powerpoint/2010/main">
+    <mc:Choice Requires="p14">
+      <p:transition spd="med" p14:dur="700">
+        <p:fade/>
+      </p:transition>
+    </mc:Choice>
+    <mc:Fallback xmlns="">
+      <p:transition spd="med">
+        <p:fade/>
+      </p:transition>
+    </mc:Fallback>
+  </mc:AlternateContent>
+</p:sld>
+</file>
+
+<file path=ppt/slides/slide88.xml><?xml version="1.0" encoding="utf-8"?>
+<p:sld xmlns:a="http://schemas.openxmlformats.org/drawingml/2006/main" xmlns:r="http://schemas.openxmlformats.org/officeDocument/2006/relationships" xmlns:p="http://schemas.openxmlformats.org/presentationml/2006/main">
+  <p:cSld>
+    <p:spTree>
+      <p:nvGrpSpPr>
+        <p:cNvPr id="1" name=""/>
+        <p:cNvGrpSpPr/>
+        <p:nvPr/>
+      </p:nvGrpSpPr>
+      <p:grpSpPr>
+        <a:xfrm>
+          <a:off x="0" y="0"/>
+          <a:ext cx="0" cy="0"/>
+          <a:chOff x="0" y="0"/>
+          <a:chExt cx="0" cy="0"/>
+        </a:xfrm>
+      </p:grpSpPr>
+      <p:sp>
+        <p:nvSpPr>
+          <p:cNvPr id="4" name="Date Placeholder 3">
+            <a:extLst>
+              <a:ext uri="{FF2B5EF4-FFF2-40B4-BE49-F238E27FC236}">
+                <a16:creationId xmlns:a16="http://schemas.microsoft.com/office/drawing/2014/main" id="{0CD670A9-B06A-3448-BABA-FAD627500859}"/>
+              </a:ext>
+            </a:extLst>
+          </p:cNvPr>
+          <p:cNvSpPr>
+            <a:spLocks noGrp="1"/>
+          </p:cNvSpPr>
+          <p:nvPr>
+            <p:ph type="dt" sz="half" idx="10"/>
+          </p:nvPr>
+        </p:nvSpPr>
+        <p:spPr/>
+        <p:txBody>
+          <a:bodyPr/>
+          <a:lstStyle/>
+          <a:p>
+            <a:r>
+              <a:rPr lang="en-US"/>
+              <a:t>World Wide Technology ©</a:t>
+            </a:r>
+            <a:endParaRPr lang="en-US" dirty="0"/>
+          </a:p>
+        </p:txBody>
+      </p:sp>
+      <p:sp>
+        <p:nvSpPr>
+          <p:cNvPr id="5" name="Slide Number Placeholder 4">
+            <a:extLst>
+              <a:ext uri="{FF2B5EF4-FFF2-40B4-BE49-F238E27FC236}">
+                <a16:creationId xmlns:a16="http://schemas.microsoft.com/office/drawing/2014/main" id="{119DACAD-17C1-C249-A498-C4A1A1ADD334}"/>
+              </a:ext>
+            </a:extLst>
+          </p:cNvPr>
+          <p:cNvSpPr>
+            <a:spLocks noGrp="1"/>
+          </p:cNvSpPr>
+          <p:nvPr>
+            <p:ph type="sldNum" sz="quarter" idx="12"/>
+          </p:nvPr>
+        </p:nvSpPr>
+        <p:spPr/>
+        <p:txBody>
+          <a:bodyPr/>
+          <a:lstStyle/>
+          <a:p>
+            <a:fld id="{A44B02FA-DD2D-1844-AE35-8B2EAB0CF4EF}" type="slidenum">
+              <a:rPr lang="en-US" smtClean="0"/>
+              <a:pPr/>
+              <a:t>88</a:t>
+            </a:fld>
+            <a:endParaRPr lang="en-US" dirty="0"/>
+          </a:p>
+        </p:txBody>
+      </p:sp>
+    </p:spTree>
+    <p:extLst>
+      <p:ext uri="{BB962C8B-B14F-4D97-AF65-F5344CB8AC3E}">
+        <p14:creationId xmlns:p14="http://schemas.microsoft.com/office/powerpoint/2010/main" val="756638364"/>
+      </p:ext>
+    </p:extLst>
+  </p:cSld>
+  <p:clrMapOvr>
+    <a:masterClrMapping/>
+  </p:clrMapOvr>
+  <mc:AlternateContent xmlns:mc="http://schemas.openxmlformats.org/markup-compatibility/2006" xmlns:p14="http://schemas.microsoft.com/office/powerpoint/2010/main">
+    <mc:Choice Requires="p14">
+      <p:transition spd="med" p14:dur="700">
+        <p:fade/>
+      </p:transition>
+    </mc:Choice>
+    <mc:Fallback xmlns="">
+      <p:transition spd="med">
+        <p:fade/>
+      </p:transition>
+    </mc:Fallback>
+  </mc:AlternateContent>
 </p:sld>
 </file>
 

</xml_diff>